<commit_message>
Added the trojan controller(receiver) UI.
</commit_message>
<xml_diff>
--- a/doc/designDoc.pptx
+++ b/doc/designDoc.pptx
@@ -108,6 +108,11 @@
       </a:defRPr>
     </a:lvl9pPr>
   </p:defaultTextStyle>
+  <p:extLst>
+    <p:ext uri="{EFAFB233-063F-42B5-8137-9DF3F51BA10A}">
+      <p15:sldGuideLst xmlns:p15="http://schemas.microsoft.com/office/powerpoint/2012/main"/>
+    </p:ext>
+  </p:extLst>
 </p:presentation>
 </file>
 
@@ -193,7 +198,7 @@
           <a:p>
             <a:fld id="{30462BEA-6C65-41CB-B521-7C9DB089D720}" type="datetimeFigureOut">
               <a:rPr lang="en-SG" smtClean="0"/>
-              <a:t>19/10/2023</a:t>
+              <a:t>26/10/2023</a:t>
             </a:fld>
             <a:endParaRPr lang="en-SG"/>
           </a:p>
@@ -694,7 +699,7 @@
           <a:p>
             <a:fld id="{435F7F91-36DA-4AC3-B0AA-56077EB606D8}" type="datetimeFigureOut">
               <a:rPr lang="en-SG" smtClean="0"/>
-              <a:t>19/10/2023</a:t>
+              <a:t>26/10/2023</a:t>
             </a:fld>
             <a:endParaRPr lang="en-SG"/>
           </a:p>
@@ -894,7 +899,7 @@
           <a:p>
             <a:fld id="{435F7F91-36DA-4AC3-B0AA-56077EB606D8}" type="datetimeFigureOut">
               <a:rPr lang="en-SG" smtClean="0"/>
-              <a:t>19/10/2023</a:t>
+              <a:t>26/10/2023</a:t>
             </a:fld>
             <a:endParaRPr lang="en-SG"/>
           </a:p>
@@ -1104,7 +1109,7 @@
           <a:p>
             <a:fld id="{435F7F91-36DA-4AC3-B0AA-56077EB606D8}" type="datetimeFigureOut">
               <a:rPr lang="en-SG" smtClean="0"/>
-              <a:t>19/10/2023</a:t>
+              <a:t>26/10/2023</a:t>
             </a:fld>
             <a:endParaRPr lang="en-SG"/>
           </a:p>
@@ -1304,7 +1309,7 @@
           <a:p>
             <a:fld id="{435F7F91-36DA-4AC3-B0AA-56077EB606D8}" type="datetimeFigureOut">
               <a:rPr lang="en-SG" smtClean="0"/>
-              <a:t>19/10/2023</a:t>
+              <a:t>26/10/2023</a:t>
             </a:fld>
             <a:endParaRPr lang="en-SG"/>
           </a:p>
@@ -1580,7 +1585,7 @@
           <a:p>
             <a:fld id="{435F7F91-36DA-4AC3-B0AA-56077EB606D8}" type="datetimeFigureOut">
               <a:rPr lang="en-SG" smtClean="0"/>
-              <a:t>19/10/2023</a:t>
+              <a:t>26/10/2023</a:t>
             </a:fld>
             <a:endParaRPr lang="en-SG"/>
           </a:p>
@@ -1848,7 +1853,7 @@
           <a:p>
             <a:fld id="{435F7F91-36DA-4AC3-B0AA-56077EB606D8}" type="datetimeFigureOut">
               <a:rPr lang="en-SG" smtClean="0"/>
-              <a:t>19/10/2023</a:t>
+              <a:t>26/10/2023</a:t>
             </a:fld>
             <a:endParaRPr lang="en-SG"/>
           </a:p>
@@ -2263,7 +2268,7 @@
           <a:p>
             <a:fld id="{435F7F91-36DA-4AC3-B0AA-56077EB606D8}" type="datetimeFigureOut">
               <a:rPr lang="en-SG" smtClean="0"/>
-              <a:t>19/10/2023</a:t>
+              <a:t>26/10/2023</a:t>
             </a:fld>
             <a:endParaRPr lang="en-SG"/>
           </a:p>
@@ -2405,7 +2410,7 @@
           <a:p>
             <a:fld id="{435F7F91-36DA-4AC3-B0AA-56077EB606D8}" type="datetimeFigureOut">
               <a:rPr lang="en-SG" smtClean="0"/>
-              <a:t>19/10/2023</a:t>
+              <a:t>26/10/2023</a:t>
             </a:fld>
             <a:endParaRPr lang="en-SG"/>
           </a:p>
@@ -2518,7 +2523,7 @@
           <a:p>
             <a:fld id="{435F7F91-36DA-4AC3-B0AA-56077EB606D8}" type="datetimeFigureOut">
               <a:rPr lang="en-SG" smtClean="0"/>
-              <a:t>19/10/2023</a:t>
+              <a:t>26/10/2023</a:t>
             </a:fld>
             <a:endParaRPr lang="en-SG"/>
           </a:p>
@@ -2831,7 +2836,7 @@
           <a:p>
             <a:fld id="{435F7F91-36DA-4AC3-B0AA-56077EB606D8}" type="datetimeFigureOut">
               <a:rPr lang="en-SG" smtClean="0"/>
-              <a:t>19/10/2023</a:t>
+              <a:t>26/10/2023</a:t>
             </a:fld>
             <a:endParaRPr lang="en-SG"/>
           </a:p>
@@ -3120,7 +3125,7 @@
           <a:p>
             <a:fld id="{435F7F91-36DA-4AC3-B0AA-56077EB606D8}" type="datetimeFigureOut">
               <a:rPr lang="en-SG" smtClean="0"/>
-              <a:t>19/10/2023</a:t>
+              <a:t>26/10/2023</a:t>
             </a:fld>
             <a:endParaRPr lang="en-SG"/>
           </a:p>
@@ -3363,7 +3368,7 @@
           <a:p>
             <a:fld id="{435F7F91-36DA-4AC3-B0AA-56077EB606D8}" type="datetimeFigureOut">
               <a:rPr lang="en-SG" smtClean="0"/>
-              <a:t>19/10/2023</a:t>
+              <a:t>26/10/2023</a:t>
             </a:fld>
             <a:endParaRPr lang="en-SG"/>
           </a:p>
@@ -3780,56 +3785,516 @@
           <a:chExt cx="0" cy="0"/>
         </a:xfrm>
       </p:grpSpPr>
-      <p:sp>
-        <p:nvSpPr>
-          <p:cNvPr id="2" name="Title 1">
-            <a:extLst>
-              <a:ext uri="{FF2B5EF4-FFF2-40B4-BE49-F238E27FC236}">
-                <a16:creationId xmlns:a16="http://schemas.microsoft.com/office/drawing/2014/main" id="{17569438-F343-A423-D07F-F1CBEA4109F1}"/>
-              </a:ext>
-            </a:extLst>
-          </p:cNvPr>
-          <p:cNvSpPr>
-            <a:spLocks noGrp="1"/>
-          </p:cNvSpPr>
-          <p:nvPr>
-            <p:ph type="ctrTitle"/>
-          </p:nvPr>
-        </p:nvSpPr>
-        <p:spPr/>
-        <p:txBody>
-          <a:bodyPr/>
-          <a:lstStyle/>
-          <a:p>
-            <a:endParaRPr lang="en-SG"/>
-          </a:p>
-        </p:txBody>
-      </p:sp>
-      <p:sp>
-        <p:nvSpPr>
-          <p:cNvPr id="3" name="Subtitle 2">
-            <a:extLst>
-              <a:ext uri="{FF2B5EF4-FFF2-40B4-BE49-F238E27FC236}">
-                <a16:creationId xmlns:a16="http://schemas.microsoft.com/office/drawing/2014/main" id="{8A7C8874-6230-DB4C-1BC9-2D1B86910A5D}"/>
-              </a:ext>
-            </a:extLst>
-          </p:cNvPr>
-          <p:cNvSpPr>
-            <a:spLocks noGrp="1"/>
-          </p:cNvSpPr>
-          <p:nvPr>
-            <p:ph type="subTitle" idx="1"/>
-          </p:nvPr>
-        </p:nvSpPr>
-        <p:spPr/>
-        <p:txBody>
-          <a:bodyPr/>
-          <a:lstStyle/>
-          <a:p>
-            <a:endParaRPr lang="en-SG"/>
-          </a:p>
-        </p:txBody>
-      </p:sp>
+      <p:pic>
+        <p:nvPicPr>
+          <p:cNvPr id="9" name="Picture 8" descr="A red logo with a circle and a circle with a letter&#10;&#10;Description automatically generated">
+            <a:extLst>
+              <a:ext uri="{FF2B5EF4-FFF2-40B4-BE49-F238E27FC236}">
+                <a16:creationId xmlns:a16="http://schemas.microsoft.com/office/drawing/2014/main" id="{798F547A-85B8-4CCC-2E5A-8B50295F08C5}"/>
+              </a:ext>
+            </a:extLst>
+          </p:cNvPr>
+          <p:cNvPicPr>
+            <a:picLocks noChangeAspect="1"/>
+          </p:cNvPicPr>
+          <p:nvPr/>
+        </p:nvPicPr>
+        <p:blipFill>
+          <a:blip r:embed="rId2">
+            <a:extLst>
+              <a:ext uri="{28A0092B-C50C-407E-A947-70E740481C1C}">
+                <a14:useLocalDpi xmlns:a14="http://schemas.microsoft.com/office/drawing/2010/main" val="0"/>
+              </a:ext>
+            </a:extLst>
+          </a:blip>
+          <a:stretch>
+            <a:fillRect/>
+          </a:stretch>
+        </p:blipFill>
+        <p:spPr>
+          <a:xfrm>
+            <a:off x="2034095" y="1757571"/>
+            <a:ext cx="8123809" cy="3342857"/>
+          </a:xfrm>
+          <a:prstGeom prst="rect">
+            <a:avLst/>
+          </a:prstGeom>
+        </p:spPr>
+      </p:pic>
+      <p:pic>
+        <p:nvPicPr>
+          <p:cNvPr id="11" name="Picture 10" descr="A red horse on wheels&#10;&#10;Description automatically generated">
+            <a:extLst>
+              <a:ext uri="{FF2B5EF4-FFF2-40B4-BE49-F238E27FC236}">
+                <a16:creationId xmlns:a16="http://schemas.microsoft.com/office/drawing/2014/main" id="{7D44EF3A-85A3-97B8-8AAB-9092C4103FCC}"/>
+              </a:ext>
+            </a:extLst>
+          </p:cNvPr>
+          <p:cNvPicPr>
+            <a:picLocks noChangeAspect="1"/>
+          </p:cNvPicPr>
+          <p:nvPr/>
+        </p:nvPicPr>
+        <p:blipFill>
+          <a:blip r:embed="rId3">
+            <a:extLst>
+              <a:ext uri="{28A0092B-C50C-407E-A947-70E740481C1C}">
+                <a14:useLocalDpi xmlns:a14="http://schemas.microsoft.com/office/drawing/2010/main" val="0"/>
+              </a:ext>
+            </a:extLst>
+          </a:blip>
+          <a:stretch>
+            <a:fillRect/>
+          </a:stretch>
+        </p:blipFill>
+        <p:spPr>
+          <a:xfrm>
+            <a:off x="8840898" y="1886640"/>
+            <a:ext cx="942087" cy="942087"/>
+          </a:xfrm>
+          <a:prstGeom prst="rect">
+            <a:avLst/>
+          </a:prstGeom>
+        </p:spPr>
+      </p:pic>
+      <p:pic>
+        <p:nvPicPr>
+          <p:cNvPr id="12" name="Picture 11" descr="A red horse on wheels&#10;&#10;Description automatically generated">
+            <a:extLst>
+              <a:ext uri="{FF2B5EF4-FFF2-40B4-BE49-F238E27FC236}">
+                <a16:creationId xmlns:a16="http://schemas.microsoft.com/office/drawing/2014/main" id="{15DC1F0A-A3B3-BA08-F68E-6FB562AEC7A2}"/>
+              </a:ext>
+            </a:extLst>
+          </p:cNvPr>
+          <p:cNvPicPr>
+            <a:picLocks noChangeAspect="1"/>
+          </p:cNvPicPr>
+          <p:nvPr/>
+        </p:nvPicPr>
+        <p:blipFill>
+          <a:blip r:embed="rId3">
+            <a:extLst>
+              <a:ext uri="{28A0092B-C50C-407E-A947-70E740481C1C}">
+                <a14:useLocalDpi xmlns:a14="http://schemas.microsoft.com/office/drawing/2010/main" val="0"/>
+              </a:ext>
+            </a:extLst>
+          </a:blip>
+          <a:stretch>
+            <a:fillRect/>
+          </a:stretch>
+        </p:blipFill>
+        <p:spPr>
+          <a:xfrm>
+            <a:off x="8840898" y="3169691"/>
+            <a:ext cx="942087" cy="942087"/>
+          </a:xfrm>
+          <a:prstGeom prst="rect">
+            <a:avLst/>
+          </a:prstGeom>
+        </p:spPr>
+      </p:pic>
+      <p:pic>
+        <p:nvPicPr>
+          <p:cNvPr id="13" name="Picture 12" descr="A red horse on wheels&#10;&#10;Description automatically generated">
+            <a:extLst>
+              <a:ext uri="{FF2B5EF4-FFF2-40B4-BE49-F238E27FC236}">
+                <a16:creationId xmlns:a16="http://schemas.microsoft.com/office/drawing/2014/main" id="{CE80410A-611A-50E1-B7DD-30353C907D35}"/>
+              </a:ext>
+            </a:extLst>
+          </p:cNvPr>
+          <p:cNvPicPr>
+            <a:picLocks noChangeAspect="1"/>
+          </p:cNvPicPr>
+          <p:nvPr/>
+        </p:nvPicPr>
+        <p:blipFill>
+          <a:blip r:embed="rId3">
+            <a:extLst>
+              <a:ext uri="{28A0092B-C50C-407E-A947-70E740481C1C}">
+                <a14:useLocalDpi xmlns:a14="http://schemas.microsoft.com/office/drawing/2010/main" val="0"/>
+              </a:ext>
+            </a:extLst>
+          </a:blip>
+          <a:stretch>
+            <a:fillRect/>
+          </a:stretch>
+        </p:blipFill>
+        <p:spPr>
+          <a:xfrm>
+            <a:off x="7867496" y="2468078"/>
+            <a:ext cx="942087" cy="942087"/>
+          </a:xfrm>
+          <a:prstGeom prst="rect">
+            <a:avLst/>
+          </a:prstGeom>
+        </p:spPr>
+      </p:pic>
+      <p:pic>
+        <p:nvPicPr>
+          <p:cNvPr id="14" name="Picture 13" descr="A red horse on wheels&#10;&#10;Description automatically generated">
+            <a:extLst>
+              <a:ext uri="{FF2B5EF4-FFF2-40B4-BE49-F238E27FC236}">
+                <a16:creationId xmlns:a16="http://schemas.microsoft.com/office/drawing/2014/main" id="{50C2D75A-21AB-1F81-2738-EB93C84380E6}"/>
+              </a:ext>
+            </a:extLst>
+          </p:cNvPr>
+          <p:cNvPicPr>
+            <a:picLocks noChangeAspect="1"/>
+          </p:cNvPicPr>
+          <p:nvPr/>
+        </p:nvPicPr>
+        <p:blipFill>
+          <a:blip r:embed="rId3">
+            <a:extLst>
+              <a:ext uri="{28A0092B-C50C-407E-A947-70E740481C1C}">
+                <a14:useLocalDpi xmlns:a14="http://schemas.microsoft.com/office/drawing/2010/main" val="0"/>
+              </a:ext>
+            </a:extLst>
+          </a:blip>
+          <a:stretch>
+            <a:fillRect/>
+          </a:stretch>
+        </p:blipFill>
+        <p:spPr>
+          <a:xfrm flipH="1">
+            <a:off x="2392693" y="1886641"/>
+            <a:ext cx="942087" cy="942087"/>
+          </a:xfrm>
+          <a:prstGeom prst="rect">
+            <a:avLst/>
+          </a:prstGeom>
+        </p:spPr>
+      </p:pic>
+      <p:pic>
+        <p:nvPicPr>
+          <p:cNvPr id="15" name="Picture 14" descr="A red horse on wheels&#10;&#10;Description automatically generated">
+            <a:extLst>
+              <a:ext uri="{FF2B5EF4-FFF2-40B4-BE49-F238E27FC236}">
+                <a16:creationId xmlns:a16="http://schemas.microsoft.com/office/drawing/2014/main" id="{3449A035-1A6A-677A-DFEB-FFEFBDCD21BD}"/>
+              </a:ext>
+            </a:extLst>
+          </p:cNvPr>
+          <p:cNvPicPr>
+            <a:picLocks noChangeAspect="1"/>
+          </p:cNvPicPr>
+          <p:nvPr/>
+        </p:nvPicPr>
+        <p:blipFill>
+          <a:blip r:embed="rId3">
+            <a:extLst>
+              <a:ext uri="{28A0092B-C50C-407E-A947-70E740481C1C}">
+                <a14:useLocalDpi xmlns:a14="http://schemas.microsoft.com/office/drawing/2010/main" val="0"/>
+              </a:ext>
+            </a:extLst>
+          </a:blip>
+          <a:stretch>
+            <a:fillRect/>
+          </a:stretch>
+        </p:blipFill>
+        <p:spPr>
+          <a:xfrm flipH="1">
+            <a:off x="3334780" y="2425980"/>
+            <a:ext cx="942087" cy="942087"/>
+          </a:xfrm>
+          <a:prstGeom prst="rect">
+            <a:avLst/>
+          </a:prstGeom>
+        </p:spPr>
+      </p:pic>
+      <p:pic>
+        <p:nvPicPr>
+          <p:cNvPr id="16" name="Picture 15" descr="A red horse on wheels&#10;&#10;Description automatically generated">
+            <a:extLst>
+              <a:ext uri="{FF2B5EF4-FFF2-40B4-BE49-F238E27FC236}">
+                <a16:creationId xmlns:a16="http://schemas.microsoft.com/office/drawing/2014/main" id="{349D22AC-6231-C7FE-3C20-DCD1F9A263E1}"/>
+              </a:ext>
+            </a:extLst>
+          </p:cNvPr>
+          <p:cNvPicPr>
+            <a:picLocks noChangeAspect="1"/>
+          </p:cNvPicPr>
+          <p:nvPr/>
+        </p:nvPicPr>
+        <p:blipFill>
+          <a:blip r:embed="rId3">
+            <a:extLst>
+              <a:ext uri="{28A0092B-C50C-407E-A947-70E740481C1C}">
+                <a14:useLocalDpi xmlns:a14="http://schemas.microsoft.com/office/drawing/2010/main" val="0"/>
+              </a:ext>
+            </a:extLst>
+          </a:blip>
+          <a:stretch>
+            <a:fillRect/>
+          </a:stretch>
+        </p:blipFill>
+        <p:spPr>
+          <a:xfrm flipH="1">
+            <a:off x="2513739" y="3217265"/>
+            <a:ext cx="942087" cy="942087"/>
+          </a:xfrm>
+          <a:prstGeom prst="rect">
+            <a:avLst/>
+          </a:prstGeom>
+        </p:spPr>
+      </p:pic>
+      <p:cxnSp>
+        <p:nvCxnSpPr>
+          <p:cNvPr id="18" name="Straight Connector 17">
+            <a:extLst>
+              <a:ext uri="{FF2B5EF4-FFF2-40B4-BE49-F238E27FC236}">
+                <a16:creationId xmlns:a16="http://schemas.microsoft.com/office/drawing/2014/main" id="{60CE8FCF-9DB8-653A-328F-828C2818543C}"/>
+              </a:ext>
+            </a:extLst>
+          </p:cNvPr>
+          <p:cNvCxnSpPr>
+            <a:cxnSpLocks/>
+          </p:cNvCxnSpPr>
+          <p:nvPr/>
+        </p:nvCxnSpPr>
+        <p:spPr>
+          <a:xfrm flipH="1">
+            <a:off x="4011691" y="2897023"/>
+            <a:ext cx="615173" cy="0"/>
+          </a:xfrm>
+          <a:prstGeom prst="line">
+            <a:avLst/>
+          </a:prstGeom>
+          <a:ln w="57150">
+            <a:solidFill>
+              <a:srgbClr val="FF0000"/>
+            </a:solidFill>
+          </a:ln>
+        </p:spPr>
+        <p:style>
+          <a:lnRef idx="1">
+            <a:schemeClr val="accent1"/>
+          </a:lnRef>
+          <a:fillRef idx="0">
+            <a:schemeClr val="accent1"/>
+          </a:fillRef>
+          <a:effectRef idx="0">
+            <a:schemeClr val="accent1"/>
+          </a:effectRef>
+          <a:fontRef idx="minor">
+            <a:schemeClr val="tx1"/>
+          </a:fontRef>
+        </p:style>
+      </p:cxnSp>
+      <p:cxnSp>
+        <p:nvCxnSpPr>
+          <p:cNvPr id="20" name="Straight Connector 19">
+            <a:extLst>
+              <a:ext uri="{FF2B5EF4-FFF2-40B4-BE49-F238E27FC236}">
+                <a16:creationId xmlns:a16="http://schemas.microsoft.com/office/drawing/2014/main" id="{5923C55F-DCA4-23D7-B17D-4853B80064D0}"/>
+              </a:ext>
+            </a:extLst>
+          </p:cNvPr>
+          <p:cNvCxnSpPr>
+            <a:cxnSpLocks/>
+          </p:cNvCxnSpPr>
+          <p:nvPr/>
+        </p:nvCxnSpPr>
+        <p:spPr>
+          <a:xfrm flipH="1">
+            <a:off x="3010824" y="2357683"/>
+            <a:ext cx="1616040" cy="0"/>
+          </a:xfrm>
+          <a:prstGeom prst="line">
+            <a:avLst/>
+          </a:prstGeom>
+          <a:ln w="57150">
+            <a:solidFill>
+              <a:srgbClr val="FF0000"/>
+            </a:solidFill>
+          </a:ln>
+        </p:spPr>
+        <p:style>
+          <a:lnRef idx="1">
+            <a:schemeClr val="accent1"/>
+          </a:lnRef>
+          <a:fillRef idx="0">
+            <a:schemeClr val="accent1"/>
+          </a:fillRef>
+          <a:effectRef idx="0">
+            <a:schemeClr val="accent1"/>
+          </a:effectRef>
+          <a:fontRef idx="minor">
+            <a:schemeClr val="tx1"/>
+          </a:fontRef>
+        </p:style>
+      </p:cxnSp>
+      <p:cxnSp>
+        <p:nvCxnSpPr>
+          <p:cNvPr id="22" name="Straight Connector 21">
+            <a:extLst>
+              <a:ext uri="{FF2B5EF4-FFF2-40B4-BE49-F238E27FC236}">
+                <a16:creationId xmlns:a16="http://schemas.microsoft.com/office/drawing/2014/main" id="{C2AC3E51-3388-5D86-CE52-86E4EC5B7E55}"/>
+              </a:ext>
+            </a:extLst>
+          </p:cNvPr>
+          <p:cNvCxnSpPr>
+            <a:cxnSpLocks/>
+          </p:cNvCxnSpPr>
+          <p:nvPr/>
+        </p:nvCxnSpPr>
+        <p:spPr>
+          <a:xfrm flipH="1">
+            <a:off x="3203671" y="3640735"/>
+            <a:ext cx="1616040" cy="0"/>
+          </a:xfrm>
+          <a:prstGeom prst="line">
+            <a:avLst/>
+          </a:prstGeom>
+          <a:ln w="57150">
+            <a:solidFill>
+              <a:srgbClr val="FF0000"/>
+            </a:solidFill>
+          </a:ln>
+        </p:spPr>
+        <p:style>
+          <a:lnRef idx="1">
+            <a:schemeClr val="accent1"/>
+          </a:lnRef>
+          <a:fillRef idx="0">
+            <a:schemeClr val="accent1"/>
+          </a:fillRef>
+          <a:effectRef idx="0">
+            <a:schemeClr val="accent1"/>
+          </a:effectRef>
+          <a:fontRef idx="minor">
+            <a:schemeClr val="tx1"/>
+          </a:fontRef>
+        </p:style>
+      </p:cxnSp>
+      <p:cxnSp>
+        <p:nvCxnSpPr>
+          <p:cNvPr id="23" name="Straight Connector 22">
+            <a:extLst>
+              <a:ext uri="{FF2B5EF4-FFF2-40B4-BE49-F238E27FC236}">
+                <a16:creationId xmlns:a16="http://schemas.microsoft.com/office/drawing/2014/main" id="{B135FAD3-89A9-9949-DB2F-C8A171F32BDB}"/>
+              </a:ext>
+            </a:extLst>
+          </p:cNvPr>
+          <p:cNvCxnSpPr>
+            <a:cxnSpLocks/>
+          </p:cNvCxnSpPr>
+          <p:nvPr/>
+        </p:nvCxnSpPr>
+        <p:spPr>
+          <a:xfrm flipH="1">
+            <a:off x="7496664" y="2357683"/>
+            <a:ext cx="1616040" cy="0"/>
+          </a:xfrm>
+          <a:prstGeom prst="line">
+            <a:avLst/>
+          </a:prstGeom>
+          <a:ln w="57150">
+            <a:solidFill>
+              <a:srgbClr val="FF0000"/>
+            </a:solidFill>
+          </a:ln>
+        </p:spPr>
+        <p:style>
+          <a:lnRef idx="1">
+            <a:schemeClr val="accent1"/>
+          </a:lnRef>
+          <a:fillRef idx="0">
+            <a:schemeClr val="accent1"/>
+          </a:fillRef>
+          <a:effectRef idx="0">
+            <a:schemeClr val="accent1"/>
+          </a:effectRef>
+          <a:fontRef idx="minor">
+            <a:schemeClr val="tx1"/>
+          </a:fontRef>
+        </p:style>
+      </p:cxnSp>
+      <p:cxnSp>
+        <p:nvCxnSpPr>
+          <p:cNvPr id="24" name="Straight Connector 23">
+            <a:extLst>
+              <a:ext uri="{FF2B5EF4-FFF2-40B4-BE49-F238E27FC236}">
+                <a16:creationId xmlns:a16="http://schemas.microsoft.com/office/drawing/2014/main" id="{55A6E127-0CA7-C3B0-A750-982E9AC24BDC}"/>
+              </a:ext>
+            </a:extLst>
+          </p:cNvPr>
+          <p:cNvCxnSpPr>
+            <a:cxnSpLocks/>
+          </p:cNvCxnSpPr>
+          <p:nvPr/>
+        </p:nvCxnSpPr>
+        <p:spPr>
+          <a:xfrm flipH="1">
+            <a:off x="7496664" y="2907406"/>
+            <a:ext cx="615173" cy="0"/>
+          </a:xfrm>
+          <a:prstGeom prst="line">
+            <a:avLst/>
+          </a:prstGeom>
+          <a:ln w="57150">
+            <a:solidFill>
+              <a:srgbClr val="FF0000"/>
+            </a:solidFill>
+          </a:ln>
+        </p:spPr>
+        <p:style>
+          <a:lnRef idx="1">
+            <a:schemeClr val="accent1"/>
+          </a:lnRef>
+          <a:fillRef idx="0">
+            <a:schemeClr val="accent1"/>
+          </a:fillRef>
+          <a:effectRef idx="0">
+            <a:schemeClr val="accent1"/>
+          </a:effectRef>
+          <a:fontRef idx="minor">
+            <a:schemeClr val="tx1"/>
+          </a:fontRef>
+        </p:style>
+      </p:cxnSp>
+      <p:cxnSp>
+        <p:nvCxnSpPr>
+          <p:cNvPr id="25" name="Straight Connector 24">
+            <a:extLst>
+              <a:ext uri="{FF2B5EF4-FFF2-40B4-BE49-F238E27FC236}">
+                <a16:creationId xmlns:a16="http://schemas.microsoft.com/office/drawing/2014/main" id="{45732420-8C76-9CF7-3A7B-1DAB72B78140}"/>
+              </a:ext>
+            </a:extLst>
+          </p:cNvPr>
+          <p:cNvCxnSpPr>
+            <a:cxnSpLocks/>
+          </p:cNvCxnSpPr>
+          <p:nvPr/>
+        </p:nvCxnSpPr>
+        <p:spPr>
+          <a:xfrm flipH="1">
+            <a:off x="7496664" y="3599642"/>
+            <a:ext cx="1616040" cy="0"/>
+          </a:xfrm>
+          <a:prstGeom prst="line">
+            <a:avLst/>
+          </a:prstGeom>
+          <a:ln w="57150">
+            <a:solidFill>
+              <a:srgbClr val="FF0000"/>
+            </a:solidFill>
+          </a:ln>
+        </p:spPr>
+        <p:style>
+          <a:lnRef idx="1">
+            <a:schemeClr val="accent1"/>
+          </a:lnRef>
+          <a:fillRef idx="0">
+            <a:schemeClr val="accent1"/>
+          </a:fillRef>
+          <a:effectRef idx="0">
+            <a:schemeClr val="accent1"/>
+          </a:effectRef>
+          <a:fontRef idx="minor">
+            <a:schemeClr val="tx1"/>
+          </a:fontRef>
+        </p:style>
+      </p:cxnSp>
     </p:spTree>
     <p:extLst>
       <p:ext uri="{BB962C8B-B14F-4D97-AF65-F5344CB8AC3E}">

</xml_diff>

<commit_message>
Added the trojan system readme file.
</commit_message>
<xml_diff>
--- a/doc/designDoc.pptx
+++ b/doc/designDoc.pptx
@@ -5,11 +5,12 @@
     <p:sldMasterId id="2147483648" r:id="rId1"/>
   </p:sldMasterIdLst>
   <p:notesMasterIdLst>
-    <p:notesMasterId r:id="rId4"/>
+    <p:notesMasterId r:id="rId5"/>
   </p:notesMasterIdLst>
   <p:sldIdLst>
     <p:sldId id="256" r:id="rId2"/>
-    <p:sldId id="290" r:id="rId3"/>
+    <p:sldId id="291" r:id="rId3"/>
+    <p:sldId id="290" r:id="rId4"/>
   </p:sldIdLst>
   <p:sldSz cx="12192000" cy="6858000"/>
   <p:notesSz cx="6858000" cy="9144000"/>
@@ -531,7 +532,7 @@
           <a:p>
             <a:fld id="{5FBC0B8D-E944-47E8-BC23-785C2866B408}" type="slidenum">
               <a:rPr lang="en-SG" smtClean="0"/>
-              <a:t>2</a:t>
+              <a:t>3</a:t>
             </a:fld>
             <a:endParaRPr lang="en-SG"/>
           </a:p>
@@ -4309,6 +4310,1610 @@
 </file>
 
 <file path=ppt/slides/slide2.xml><?xml version="1.0" encoding="utf-8"?>
+<p:sld xmlns:a="http://schemas.openxmlformats.org/drawingml/2006/main" xmlns:r="http://schemas.openxmlformats.org/officeDocument/2006/relationships" xmlns:p="http://schemas.openxmlformats.org/presentationml/2006/main">
+  <p:cSld>
+    <p:spTree>
+      <p:nvGrpSpPr>
+        <p:cNvPr id="1" name=""/>
+        <p:cNvGrpSpPr/>
+        <p:nvPr/>
+      </p:nvGrpSpPr>
+      <p:grpSpPr>
+        <a:xfrm>
+          <a:off x="0" y="0"/>
+          <a:ext cx="0" cy="0"/>
+          <a:chOff x="0" y="0"/>
+          <a:chExt cx="0" cy="0"/>
+        </a:xfrm>
+      </p:grpSpPr>
+      <p:sp>
+        <p:nvSpPr>
+          <p:cNvPr id="7" name="Rectangle 6">
+            <a:extLst>
+              <a:ext uri="{FF2B5EF4-FFF2-40B4-BE49-F238E27FC236}">
+                <a16:creationId xmlns:a16="http://schemas.microsoft.com/office/drawing/2014/main" id="{363C7AB4-5F14-8D80-679C-EF6CD8C02360}"/>
+              </a:ext>
+            </a:extLst>
+          </p:cNvPr>
+          <p:cNvSpPr/>
+          <p:nvPr/>
+        </p:nvSpPr>
+        <p:spPr>
+          <a:xfrm>
+            <a:off x="1060704" y="2679191"/>
+            <a:ext cx="5394960" cy="1248997"/>
+          </a:xfrm>
+          <a:prstGeom prst="rect">
+            <a:avLst/>
+          </a:prstGeom>
+          <a:ln>
+            <a:prstDash val="sysDash"/>
+          </a:ln>
+        </p:spPr>
+        <p:style>
+          <a:lnRef idx="2">
+            <a:schemeClr val="dk1"/>
+          </a:lnRef>
+          <a:fillRef idx="1">
+            <a:schemeClr val="lt1"/>
+          </a:fillRef>
+          <a:effectRef idx="0">
+            <a:schemeClr val="dk1"/>
+          </a:effectRef>
+          <a:fontRef idx="minor">
+            <a:schemeClr val="dk1"/>
+          </a:fontRef>
+        </p:style>
+        <p:txBody>
+          <a:bodyPr rtlCol="0" anchor="ctr"/>
+          <a:lstStyle/>
+          <a:p>
+            <a:pPr algn="ctr"/>
+            <a:endParaRPr lang="en-SG" dirty="0"/>
+          </a:p>
+        </p:txBody>
+      </p:sp>
+      <p:pic>
+        <p:nvPicPr>
+          <p:cNvPr id="5" name="Picture 4">
+            <a:extLst>
+              <a:ext uri="{FF2B5EF4-FFF2-40B4-BE49-F238E27FC236}">
+                <a16:creationId xmlns:a16="http://schemas.microsoft.com/office/drawing/2014/main" id="{D70044B1-7965-A052-8BD4-4E08DADD15D1}"/>
+              </a:ext>
+            </a:extLst>
+          </p:cNvPr>
+          <p:cNvPicPr>
+            <a:picLocks noChangeAspect="1"/>
+          </p:cNvPicPr>
+          <p:nvPr/>
+        </p:nvPicPr>
+        <p:blipFill>
+          <a:blip r:embed="rId2"/>
+          <a:stretch>
+            <a:fillRect/>
+          </a:stretch>
+        </p:blipFill>
+        <p:spPr>
+          <a:xfrm>
+            <a:off x="1208436" y="3129908"/>
+            <a:ext cx="1059283" cy="598183"/>
+          </a:xfrm>
+          <a:prstGeom prst="rect">
+            <a:avLst/>
+          </a:prstGeom>
+        </p:spPr>
+      </p:pic>
+      <p:pic>
+        <p:nvPicPr>
+          <p:cNvPr id="6" name="Picture 5" descr="A red horse on wheels&#10;&#10;Description automatically generated">
+            <a:extLst>
+              <a:ext uri="{FF2B5EF4-FFF2-40B4-BE49-F238E27FC236}">
+                <a16:creationId xmlns:a16="http://schemas.microsoft.com/office/drawing/2014/main" id="{5C57AF07-69E2-DA2A-D843-D98E231AF67E}"/>
+              </a:ext>
+            </a:extLst>
+          </p:cNvPr>
+          <p:cNvPicPr>
+            <a:picLocks noChangeAspect="1"/>
+          </p:cNvPicPr>
+          <p:nvPr/>
+        </p:nvPicPr>
+        <p:blipFill>
+          <a:blip r:embed="rId3">
+            <a:extLst>
+              <a:ext uri="{28A0092B-C50C-407E-A947-70E740481C1C}">
+                <a14:useLocalDpi xmlns:a14="http://schemas.microsoft.com/office/drawing/2010/main" val="0"/>
+              </a:ext>
+            </a:extLst>
+          </a:blip>
+          <a:stretch>
+            <a:fillRect/>
+          </a:stretch>
+        </p:blipFill>
+        <p:spPr>
+          <a:xfrm flipH="1">
+            <a:off x="1374104" y="3037035"/>
+            <a:ext cx="483067" cy="483067"/>
+          </a:xfrm>
+          <a:prstGeom prst="rect">
+            <a:avLst/>
+          </a:prstGeom>
+        </p:spPr>
+      </p:pic>
+      <p:pic>
+        <p:nvPicPr>
+          <p:cNvPr id="8" name="Picture 7">
+            <a:extLst>
+              <a:ext uri="{FF2B5EF4-FFF2-40B4-BE49-F238E27FC236}">
+                <a16:creationId xmlns:a16="http://schemas.microsoft.com/office/drawing/2014/main" id="{B3B45D33-4FAD-FE56-4DF2-6689F248662A}"/>
+              </a:ext>
+            </a:extLst>
+          </p:cNvPr>
+          <p:cNvPicPr>
+            <a:picLocks noChangeAspect="1"/>
+          </p:cNvPicPr>
+          <p:nvPr/>
+        </p:nvPicPr>
+        <p:blipFill>
+          <a:blip r:embed="rId2"/>
+          <a:stretch>
+            <a:fillRect/>
+          </a:stretch>
+        </p:blipFill>
+        <p:spPr>
+          <a:xfrm>
+            <a:off x="2433387" y="3129908"/>
+            <a:ext cx="1059283" cy="598183"/>
+          </a:xfrm>
+          <a:prstGeom prst="rect">
+            <a:avLst/>
+          </a:prstGeom>
+        </p:spPr>
+      </p:pic>
+      <p:pic>
+        <p:nvPicPr>
+          <p:cNvPr id="9" name="Picture 8" descr="A red horse on wheels&#10;&#10;Description automatically generated">
+            <a:extLst>
+              <a:ext uri="{FF2B5EF4-FFF2-40B4-BE49-F238E27FC236}">
+                <a16:creationId xmlns:a16="http://schemas.microsoft.com/office/drawing/2014/main" id="{BF1DE1BA-F4F8-2E97-6D0F-B4D73DFE1741}"/>
+              </a:ext>
+            </a:extLst>
+          </p:cNvPr>
+          <p:cNvPicPr>
+            <a:picLocks noChangeAspect="1"/>
+          </p:cNvPicPr>
+          <p:nvPr/>
+        </p:nvPicPr>
+        <p:blipFill>
+          <a:blip r:embed="rId3">
+            <a:extLst>
+              <a:ext uri="{28A0092B-C50C-407E-A947-70E740481C1C}">
+                <a14:useLocalDpi xmlns:a14="http://schemas.microsoft.com/office/drawing/2010/main" val="0"/>
+              </a:ext>
+            </a:extLst>
+          </a:blip>
+          <a:stretch>
+            <a:fillRect/>
+          </a:stretch>
+        </p:blipFill>
+        <p:spPr>
+          <a:xfrm flipH="1">
+            <a:off x="2599055" y="3037035"/>
+            <a:ext cx="483067" cy="483067"/>
+          </a:xfrm>
+          <a:prstGeom prst="rect">
+            <a:avLst/>
+          </a:prstGeom>
+        </p:spPr>
+      </p:pic>
+      <p:pic>
+        <p:nvPicPr>
+          <p:cNvPr id="10" name="Picture 9">
+            <a:extLst>
+              <a:ext uri="{FF2B5EF4-FFF2-40B4-BE49-F238E27FC236}">
+                <a16:creationId xmlns:a16="http://schemas.microsoft.com/office/drawing/2014/main" id="{E18FC91D-7CEC-1427-4AD4-D272C8F36AE0}"/>
+              </a:ext>
+            </a:extLst>
+          </p:cNvPr>
+          <p:cNvPicPr>
+            <a:picLocks noChangeAspect="1"/>
+          </p:cNvPicPr>
+          <p:nvPr/>
+        </p:nvPicPr>
+        <p:blipFill>
+          <a:blip r:embed="rId2"/>
+          <a:stretch>
+            <a:fillRect/>
+          </a:stretch>
+        </p:blipFill>
+        <p:spPr>
+          <a:xfrm>
+            <a:off x="3658940" y="3108561"/>
+            <a:ext cx="1059283" cy="598183"/>
+          </a:xfrm>
+          <a:prstGeom prst="rect">
+            <a:avLst/>
+          </a:prstGeom>
+        </p:spPr>
+      </p:pic>
+      <p:pic>
+        <p:nvPicPr>
+          <p:cNvPr id="11" name="Picture 10" descr="A red horse on wheels&#10;&#10;Description automatically generated">
+            <a:extLst>
+              <a:ext uri="{FF2B5EF4-FFF2-40B4-BE49-F238E27FC236}">
+                <a16:creationId xmlns:a16="http://schemas.microsoft.com/office/drawing/2014/main" id="{16D12BD4-BCD5-646C-1CE6-D6ACE8B20635}"/>
+              </a:ext>
+            </a:extLst>
+          </p:cNvPr>
+          <p:cNvPicPr>
+            <a:picLocks noChangeAspect="1"/>
+          </p:cNvPicPr>
+          <p:nvPr/>
+        </p:nvPicPr>
+        <p:blipFill>
+          <a:blip r:embed="rId3">
+            <a:extLst>
+              <a:ext uri="{28A0092B-C50C-407E-A947-70E740481C1C}">
+                <a14:useLocalDpi xmlns:a14="http://schemas.microsoft.com/office/drawing/2010/main" val="0"/>
+              </a:ext>
+            </a:extLst>
+          </a:blip>
+          <a:stretch>
+            <a:fillRect/>
+          </a:stretch>
+        </p:blipFill>
+        <p:spPr>
+          <a:xfrm flipH="1">
+            <a:off x="3824006" y="3037035"/>
+            <a:ext cx="483067" cy="483067"/>
+          </a:xfrm>
+          <a:prstGeom prst="rect">
+            <a:avLst/>
+          </a:prstGeom>
+        </p:spPr>
+      </p:pic>
+      <p:pic>
+        <p:nvPicPr>
+          <p:cNvPr id="12" name="Picture 11" descr="A red horse on wheels&#10;&#10;Description automatically generated">
+            <a:extLst>
+              <a:ext uri="{FF2B5EF4-FFF2-40B4-BE49-F238E27FC236}">
+                <a16:creationId xmlns:a16="http://schemas.microsoft.com/office/drawing/2014/main" id="{182E1790-8672-3AF2-FE36-26856E8DEFD2}"/>
+              </a:ext>
+            </a:extLst>
+          </p:cNvPr>
+          <p:cNvPicPr>
+            <a:picLocks noChangeAspect="1"/>
+          </p:cNvPicPr>
+          <p:nvPr/>
+        </p:nvPicPr>
+        <p:blipFill>
+          <a:blip r:embed="rId3">
+            <a:extLst>
+              <a:ext uri="{28A0092B-C50C-407E-A947-70E740481C1C}">
+                <a14:useLocalDpi xmlns:a14="http://schemas.microsoft.com/office/drawing/2010/main" val="0"/>
+              </a:ext>
+            </a:extLst>
+          </a:blip>
+          <a:stretch>
+            <a:fillRect/>
+          </a:stretch>
+        </p:blipFill>
+        <p:spPr>
+          <a:xfrm flipH="1">
+            <a:off x="5370877" y="2949994"/>
+            <a:ext cx="433728" cy="433728"/>
+          </a:xfrm>
+          <a:prstGeom prst="rect">
+            <a:avLst/>
+          </a:prstGeom>
+        </p:spPr>
+      </p:pic>
+      <p:pic>
+        <p:nvPicPr>
+          <p:cNvPr id="14" name="Picture 13">
+            <a:extLst>
+              <a:ext uri="{FF2B5EF4-FFF2-40B4-BE49-F238E27FC236}">
+                <a16:creationId xmlns:a16="http://schemas.microsoft.com/office/drawing/2014/main" id="{E895F98F-4F0A-A5A3-0B49-274BD40C72F4}"/>
+              </a:ext>
+            </a:extLst>
+          </p:cNvPr>
+          <p:cNvPicPr>
+            <a:picLocks noChangeAspect="1"/>
+          </p:cNvPicPr>
+          <p:nvPr/>
+        </p:nvPicPr>
+        <p:blipFill>
+          <a:blip r:embed="rId4"/>
+          <a:stretch>
+            <a:fillRect/>
+          </a:stretch>
+        </p:blipFill>
+        <p:spPr>
+          <a:xfrm>
+            <a:off x="5254766" y="3172597"/>
+            <a:ext cx="610172" cy="512804"/>
+          </a:xfrm>
+          <a:prstGeom prst="rect">
+            <a:avLst/>
+          </a:prstGeom>
+        </p:spPr>
+      </p:pic>
+      <p:pic>
+        <p:nvPicPr>
+          <p:cNvPr id="15" name="Picture 14">
+            <a:extLst>
+              <a:ext uri="{FF2B5EF4-FFF2-40B4-BE49-F238E27FC236}">
+                <a16:creationId xmlns:a16="http://schemas.microsoft.com/office/drawing/2014/main" id="{9FE97EF0-155B-D202-1AF1-E67769CCAA80}"/>
+              </a:ext>
+            </a:extLst>
+          </p:cNvPr>
+          <p:cNvPicPr>
+            <a:picLocks noChangeAspect="1"/>
+          </p:cNvPicPr>
+          <p:nvPr/>
+        </p:nvPicPr>
+        <p:blipFill>
+          <a:blip r:embed="rId5"/>
+          <a:stretch>
+            <a:fillRect/>
+          </a:stretch>
+        </p:blipFill>
+        <p:spPr>
+          <a:xfrm>
+            <a:off x="6240563" y="3142686"/>
+            <a:ext cx="489507" cy="542715"/>
+          </a:xfrm>
+          <a:prstGeom prst="rect">
+            <a:avLst/>
+          </a:prstGeom>
+          <a:ln w="9525">
+            <a:solidFill>
+              <a:schemeClr val="tx1"/>
+            </a:solidFill>
+          </a:ln>
+        </p:spPr>
+      </p:pic>
+      <p:pic>
+        <p:nvPicPr>
+          <p:cNvPr id="16" name="Picture 15">
+            <a:extLst>
+              <a:ext uri="{FF2B5EF4-FFF2-40B4-BE49-F238E27FC236}">
+                <a16:creationId xmlns:a16="http://schemas.microsoft.com/office/drawing/2014/main" id="{4334EDC3-FD74-A992-3B25-16C195D84B18}"/>
+              </a:ext>
+            </a:extLst>
+          </p:cNvPr>
+          <p:cNvPicPr>
+            <a:picLocks noChangeAspect="1"/>
+          </p:cNvPicPr>
+          <p:nvPr/>
+        </p:nvPicPr>
+        <p:blipFill>
+          <a:blip r:embed="rId6"/>
+          <a:stretch>
+            <a:fillRect/>
+          </a:stretch>
+        </p:blipFill>
+        <p:spPr>
+          <a:xfrm>
+            <a:off x="2840588" y="2334709"/>
+            <a:ext cx="630909" cy="465947"/>
+          </a:xfrm>
+          <a:prstGeom prst="rect">
+            <a:avLst/>
+          </a:prstGeom>
+          <a:ln w="6350">
+            <a:solidFill>
+              <a:schemeClr val="tx1"/>
+            </a:solidFill>
+          </a:ln>
+        </p:spPr>
+      </p:pic>
+      <p:cxnSp>
+        <p:nvCxnSpPr>
+          <p:cNvPr id="20" name="Connector: Elbow 19">
+            <a:extLst>
+              <a:ext uri="{FF2B5EF4-FFF2-40B4-BE49-F238E27FC236}">
+                <a16:creationId xmlns:a16="http://schemas.microsoft.com/office/drawing/2014/main" id="{5487652D-0369-F1B2-F27F-4D74EDA039DC}"/>
+              </a:ext>
+            </a:extLst>
+          </p:cNvPr>
+          <p:cNvCxnSpPr>
+            <a:stCxn id="14" idx="1"/>
+            <a:endCxn id="11" idx="0"/>
+          </p:cNvCxnSpPr>
+          <p:nvPr/>
+        </p:nvCxnSpPr>
+        <p:spPr>
+          <a:xfrm rot="10800000">
+            <a:off x="4065540" y="3037035"/>
+            <a:ext cx="1189227" cy="391964"/>
+          </a:xfrm>
+          <a:prstGeom prst="bentConnector4">
+            <a:avLst>
+              <a:gd name="adj1" fmla="val 39845"/>
+              <a:gd name="adj2" fmla="val 158322"/>
+            </a:avLst>
+          </a:prstGeom>
+          <a:ln w="28575">
+            <a:solidFill>
+              <a:srgbClr val="FF0000"/>
+            </a:solidFill>
+            <a:prstDash val="sysDash"/>
+            <a:tailEnd type="triangle"/>
+          </a:ln>
+        </p:spPr>
+        <p:style>
+          <a:lnRef idx="1">
+            <a:schemeClr val="accent1"/>
+          </a:lnRef>
+          <a:fillRef idx="0">
+            <a:schemeClr val="accent1"/>
+          </a:fillRef>
+          <a:effectRef idx="0">
+            <a:schemeClr val="accent1"/>
+          </a:effectRef>
+          <a:fontRef idx="minor">
+            <a:schemeClr val="tx1"/>
+          </a:fontRef>
+        </p:style>
+      </p:cxnSp>
+      <p:sp>
+        <p:nvSpPr>
+          <p:cNvPr id="21" name="TextBox 20">
+            <a:extLst>
+              <a:ext uri="{FF2B5EF4-FFF2-40B4-BE49-F238E27FC236}">
+                <a16:creationId xmlns:a16="http://schemas.microsoft.com/office/drawing/2014/main" id="{9AE74098-EA27-8BC8-C893-B115F6AB1902}"/>
+              </a:ext>
+            </a:extLst>
+          </p:cNvPr>
+          <p:cNvSpPr txBox="1"/>
+          <p:nvPr/>
+        </p:nvSpPr>
+        <p:spPr>
+          <a:xfrm>
+            <a:off x="1265804" y="3685401"/>
+            <a:ext cx="832526" cy="276999"/>
+          </a:xfrm>
+          <a:prstGeom prst="rect">
+            <a:avLst/>
+          </a:prstGeom>
+          <a:noFill/>
+        </p:spPr>
+        <p:txBody>
+          <a:bodyPr wrap="square" rtlCol="0">
+            <a:spAutoFit/>
+          </a:bodyPr>
+          <a:lstStyle/>
+          <a:p>
+            <a:r>
+              <a:rPr lang="en-SG" sz="1200" b="1" dirty="0"/>
+              <a:t>Victim_00</a:t>
+            </a:r>
+          </a:p>
+        </p:txBody>
+      </p:sp>
+      <p:sp>
+        <p:nvSpPr>
+          <p:cNvPr id="22" name="TextBox 21">
+            <a:extLst>
+              <a:ext uri="{FF2B5EF4-FFF2-40B4-BE49-F238E27FC236}">
+                <a16:creationId xmlns:a16="http://schemas.microsoft.com/office/drawing/2014/main" id="{CC4FE3AF-1839-731B-985C-509FB8EA2775}"/>
+              </a:ext>
+            </a:extLst>
+          </p:cNvPr>
+          <p:cNvSpPr txBox="1"/>
+          <p:nvPr/>
+        </p:nvSpPr>
+        <p:spPr>
+          <a:xfrm>
+            <a:off x="2472819" y="3693820"/>
+            <a:ext cx="832526" cy="276999"/>
+          </a:xfrm>
+          <a:prstGeom prst="rect">
+            <a:avLst/>
+          </a:prstGeom>
+          <a:noFill/>
+        </p:spPr>
+        <p:txBody>
+          <a:bodyPr wrap="square" rtlCol="0">
+            <a:spAutoFit/>
+          </a:bodyPr>
+          <a:lstStyle/>
+          <a:p>
+            <a:r>
+              <a:rPr lang="en-SG" sz="1200" b="1" dirty="0"/>
+              <a:t>Victim_01</a:t>
+            </a:r>
+          </a:p>
+        </p:txBody>
+      </p:sp>
+      <p:sp>
+        <p:nvSpPr>
+          <p:cNvPr id="23" name="TextBox 22">
+            <a:extLst>
+              <a:ext uri="{FF2B5EF4-FFF2-40B4-BE49-F238E27FC236}">
+                <a16:creationId xmlns:a16="http://schemas.microsoft.com/office/drawing/2014/main" id="{0A250996-3AEF-B541-8328-494BAAA06371}"/>
+              </a:ext>
+            </a:extLst>
+          </p:cNvPr>
+          <p:cNvSpPr txBox="1"/>
+          <p:nvPr/>
+        </p:nvSpPr>
+        <p:spPr>
+          <a:xfrm>
+            <a:off x="3765295" y="3693819"/>
+            <a:ext cx="832526" cy="276999"/>
+          </a:xfrm>
+          <a:prstGeom prst="rect">
+            <a:avLst/>
+          </a:prstGeom>
+          <a:noFill/>
+        </p:spPr>
+        <p:txBody>
+          <a:bodyPr wrap="square" rtlCol="0">
+            <a:spAutoFit/>
+          </a:bodyPr>
+          <a:lstStyle/>
+          <a:p>
+            <a:r>
+              <a:rPr lang="en-SG" sz="1200" b="1" dirty="0"/>
+              <a:t>Victim_02</a:t>
+            </a:r>
+          </a:p>
+        </p:txBody>
+      </p:sp>
+      <p:sp>
+        <p:nvSpPr>
+          <p:cNvPr id="24" name="TextBox 23">
+            <a:extLst>
+              <a:ext uri="{FF2B5EF4-FFF2-40B4-BE49-F238E27FC236}">
+                <a16:creationId xmlns:a16="http://schemas.microsoft.com/office/drawing/2014/main" id="{D34D7D99-B90C-3289-F8AF-279E06D23950}"/>
+              </a:ext>
+            </a:extLst>
+          </p:cNvPr>
+          <p:cNvSpPr txBox="1"/>
+          <p:nvPr/>
+        </p:nvSpPr>
+        <p:spPr>
+          <a:xfrm>
+            <a:off x="6707554" y="3299173"/>
+            <a:ext cx="1689699" cy="461665"/>
+          </a:xfrm>
+          <a:prstGeom prst="rect">
+            <a:avLst/>
+          </a:prstGeom>
+          <a:noFill/>
+        </p:spPr>
+        <p:txBody>
+          <a:bodyPr wrap="square" rtlCol="0">
+            <a:spAutoFit/>
+          </a:bodyPr>
+          <a:lstStyle/>
+          <a:p>
+            <a:r>
+              <a:rPr lang="en-SG" sz="1200" b="1" dirty="0"/>
+              <a:t>Hacker inside company internal subnet</a:t>
+            </a:r>
+          </a:p>
+        </p:txBody>
+      </p:sp>
+      <p:sp>
+        <p:nvSpPr>
+          <p:cNvPr id="25" name="TextBox 24">
+            <a:extLst>
+              <a:ext uri="{FF2B5EF4-FFF2-40B4-BE49-F238E27FC236}">
+                <a16:creationId xmlns:a16="http://schemas.microsoft.com/office/drawing/2014/main" id="{074E3AF3-45DD-9E59-6F75-D39BE55256CC}"/>
+              </a:ext>
+            </a:extLst>
+          </p:cNvPr>
+          <p:cNvSpPr txBox="1"/>
+          <p:nvPr/>
+        </p:nvSpPr>
+        <p:spPr>
+          <a:xfrm>
+            <a:off x="4738325" y="2321813"/>
+            <a:ext cx="1402228" cy="646331"/>
+          </a:xfrm>
+          <a:prstGeom prst="rect">
+            <a:avLst/>
+          </a:prstGeom>
+          <a:noFill/>
+        </p:spPr>
+        <p:txBody>
+          <a:bodyPr wrap="square" rtlCol="0">
+            <a:spAutoFit/>
+          </a:bodyPr>
+          <a:lstStyle/>
+          <a:p>
+            <a:r>
+              <a:rPr lang="en-SG" sz="1200" b="1" dirty="0">
+                <a:solidFill>
+                  <a:srgbClr val="FF0000"/>
+                </a:solidFill>
+              </a:rPr>
+              <a:t>Peer to peer direct trojan control [fetch mode]</a:t>
+            </a:r>
+          </a:p>
+        </p:txBody>
+      </p:sp>
+      <p:sp>
+        <p:nvSpPr>
+          <p:cNvPr id="26" name="TextBox 25">
+            <a:extLst>
+              <a:ext uri="{FF2B5EF4-FFF2-40B4-BE49-F238E27FC236}">
+                <a16:creationId xmlns:a16="http://schemas.microsoft.com/office/drawing/2014/main" id="{31F69A0B-026E-F3C8-3AEF-AB26D8FF7277}"/>
+              </a:ext>
+            </a:extLst>
+          </p:cNvPr>
+          <p:cNvSpPr txBox="1"/>
+          <p:nvPr/>
+        </p:nvSpPr>
+        <p:spPr>
+          <a:xfrm>
+            <a:off x="4849711" y="3689291"/>
+            <a:ext cx="1352643" cy="276999"/>
+          </a:xfrm>
+          <a:prstGeom prst="rect">
+            <a:avLst/>
+          </a:prstGeom>
+          <a:noFill/>
+        </p:spPr>
+        <p:txBody>
+          <a:bodyPr wrap="square" rtlCol="0">
+            <a:spAutoFit/>
+          </a:bodyPr>
+          <a:lstStyle/>
+          <a:p>
+            <a:r>
+              <a:rPr lang="en-SG" sz="1200" b="1" dirty="0"/>
+              <a:t>Trojan connector </a:t>
+            </a:r>
+          </a:p>
+        </p:txBody>
+      </p:sp>
+      <p:cxnSp>
+        <p:nvCxnSpPr>
+          <p:cNvPr id="38" name="Straight Arrow Connector 37">
+            <a:extLst>
+              <a:ext uri="{FF2B5EF4-FFF2-40B4-BE49-F238E27FC236}">
+                <a16:creationId xmlns:a16="http://schemas.microsoft.com/office/drawing/2014/main" id="{E4B00079-8136-A9B3-55B0-2EF63BCA47EA}"/>
+              </a:ext>
+            </a:extLst>
+          </p:cNvPr>
+          <p:cNvCxnSpPr>
+            <a:stCxn id="6" idx="1"/>
+            <a:endCxn id="16" idx="2"/>
+          </p:cNvCxnSpPr>
+          <p:nvPr/>
+        </p:nvCxnSpPr>
+        <p:spPr>
+          <a:xfrm flipV="1">
+            <a:off x="1857171" y="2800656"/>
+            <a:ext cx="1298872" cy="477913"/>
+          </a:xfrm>
+          <a:prstGeom prst="straightConnector1">
+            <a:avLst/>
+          </a:prstGeom>
+          <a:ln w="28575">
+            <a:solidFill>
+              <a:srgbClr val="FF0000"/>
+            </a:solidFill>
+            <a:headEnd type="triangle"/>
+            <a:tailEnd type="triangle"/>
+          </a:ln>
+        </p:spPr>
+        <p:style>
+          <a:lnRef idx="1">
+            <a:schemeClr val="accent1"/>
+          </a:lnRef>
+          <a:fillRef idx="0">
+            <a:schemeClr val="accent1"/>
+          </a:fillRef>
+          <a:effectRef idx="0">
+            <a:schemeClr val="accent1"/>
+          </a:effectRef>
+          <a:fontRef idx="minor">
+            <a:schemeClr val="tx1"/>
+          </a:fontRef>
+        </p:style>
+      </p:cxnSp>
+      <p:cxnSp>
+        <p:nvCxnSpPr>
+          <p:cNvPr id="39" name="Straight Arrow Connector 38">
+            <a:extLst>
+              <a:ext uri="{FF2B5EF4-FFF2-40B4-BE49-F238E27FC236}">
+                <a16:creationId xmlns:a16="http://schemas.microsoft.com/office/drawing/2014/main" id="{5260A1E9-026F-EB8F-0740-5EF94CF5422A}"/>
+              </a:ext>
+            </a:extLst>
+          </p:cNvPr>
+          <p:cNvCxnSpPr>
+            <a:cxnSpLocks/>
+            <a:stCxn id="9" idx="1"/>
+            <a:endCxn id="16" idx="2"/>
+          </p:cNvCxnSpPr>
+          <p:nvPr/>
+        </p:nvCxnSpPr>
+        <p:spPr>
+          <a:xfrm flipV="1">
+            <a:off x="3082122" y="2800656"/>
+            <a:ext cx="73921" cy="477913"/>
+          </a:xfrm>
+          <a:prstGeom prst="straightConnector1">
+            <a:avLst/>
+          </a:prstGeom>
+          <a:ln w="28575">
+            <a:solidFill>
+              <a:srgbClr val="FF0000"/>
+            </a:solidFill>
+            <a:headEnd type="triangle"/>
+            <a:tailEnd type="triangle"/>
+          </a:ln>
+        </p:spPr>
+        <p:style>
+          <a:lnRef idx="1">
+            <a:schemeClr val="accent1"/>
+          </a:lnRef>
+          <a:fillRef idx="0">
+            <a:schemeClr val="accent1"/>
+          </a:fillRef>
+          <a:effectRef idx="0">
+            <a:schemeClr val="accent1"/>
+          </a:effectRef>
+          <a:fontRef idx="minor">
+            <a:schemeClr val="tx1"/>
+          </a:fontRef>
+        </p:style>
+      </p:cxnSp>
+      <p:cxnSp>
+        <p:nvCxnSpPr>
+          <p:cNvPr id="42" name="Straight Arrow Connector 41">
+            <a:extLst>
+              <a:ext uri="{FF2B5EF4-FFF2-40B4-BE49-F238E27FC236}">
+                <a16:creationId xmlns:a16="http://schemas.microsoft.com/office/drawing/2014/main" id="{5FEB129C-D401-E24C-97FB-E9DAE8726F58}"/>
+              </a:ext>
+            </a:extLst>
+          </p:cNvPr>
+          <p:cNvCxnSpPr>
+            <a:cxnSpLocks/>
+            <a:stCxn id="11" idx="3"/>
+            <a:endCxn id="16" idx="2"/>
+          </p:cNvCxnSpPr>
+          <p:nvPr/>
+        </p:nvCxnSpPr>
+        <p:spPr>
+          <a:xfrm flipH="1" flipV="1">
+            <a:off x="3156043" y="2800656"/>
+            <a:ext cx="667963" cy="477913"/>
+          </a:xfrm>
+          <a:prstGeom prst="straightConnector1">
+            <a:avLst/>
+          </a:prstGeom>
+          <a:ln w="28575">
+            <a:solidFill>
+              <a:srgbClr val="FF0000"/>
+            </a:solidFill>
+            <a:headEnd type="triangle"/>
+            <a:tailEnd type="triangle"/>
+          </a:ln>
+        </p:spPr>
+        <p:style>
+          <a:lnRef idx="1">
+            <a:schemeClr val="accent1"/>
+          </a:lnRef>
+          <a:fillRef idx="0">
+            <a:schemeClr val="accent1"/>
+          </a:fillRef>
+          <a:effectRef idx="0">
+            <a:schemeClr val="accent1"/>
+          </a:effectRef>
+          <a:fontRef idx="minor">
+            <a:schemeClr val="tx1"/>
+          </a:fontRef>
+        </p:style>
+      </p:cxnSp>
+      <p:sp>
+        <p:nvSpPr>
+          <p:cNvPr id="45" name="Cloud 44">
+            <a:extLst>
+              <a:ext uri="{FF2B5EF4-FFF2-40B4-BE49-F238E27FC236}">
+                <a16:creationId xmlns:a16="http://schemas.microsoft.com/office/drawing/2014/main" id="{095AD8AE-043E-73B1-82A7-2B2FF14B9156}"/>
+              </a:ext>
+            </a:extLst>
+          </p:cNvPr>
+          <p:cNvSpPr/>
+          <p:nvPr/>
+        </p:nvSpPr>
+        <p:spPr>
+          <a:xfrm>
+            <a:off x="3824006" y="1658757"/>
+            <a:ext cx="1026560" cy="471301"/>
+          </a:xfrm>
+          <a:prstGeom prst="cloud">
+            <a:avLst/>
+          </a:prstGeom>
+        </p:spPr>
+        <p:style>
+          <a:lnRef idx="2">
+            <a:schemeClr val="accent1">
+              <a:shade val="15000"/>
+            </a:schemeClr>
+          </a:lnRef>
+          <a:fillRef idx="1">
+            <a:schemeClr val="accent1"/>
+          </a:fillRef>
+          <a:effectRef idx="0">
+            <a:schemeClr val="accent1"/>
+          </a:effectRef>
+          <a:fontRef idx="minor">
+            <a:schemeClr val="lt1"/>
+          </a:fontRef>
+        </p:style>
+        <p:txBody>
+          <a:bodyPr rtlCol="0" anchor="ctr"/>
+          <a:lstStyle/>
+          <a:p>
+            <a:pPr algn="ctr"/>
+            <a:r>
+              <a:rPr lang="en-SG" sz="1100" b="1" dirty="0"/>
+              <a:t>Internet</a:t>
+            </a:r>
+            <a:r>
+              <a:rPr lang="en-SG" dirty="0"/>
+              <a:t> </a:t>
+            </a:r>
+          </a:p>
+        </p:txBody>
+      </p:sp>
+      <p:cxnSp>
+        <p:nvCxnSpPr>
+          <p:cNvPr id="47" name="Connector: Elbow 46">
+            <a:extLst>
+              <a:ext uri="{FF2B5EF4-FFF2-40B4-BE49-F238E27FC236}">
+                <a16:creationId xmlns:a16="http://schemas.microsoft.com/office/drawing/2014/main" id="{E26B272D-9F9A-7518-DCDD-E747D95853C2}"/>
+              </a:ext>
+            </a:extLst>
+          </p:cNvPr>
+          <p:cNvCxnSpPr>
+            <a:stCxn id="16" idx="0"/>
+            <a:endCxn id="45" idx="2"/>
+          </p:cNvCxnSpPr>
+          <p:nvPr/>
+        </p:nvCxnSpPr>
+        <p:spPr>
+          <a:xfrm rot="5400000" flipH="1" flipV="1">
+            <a:off x="3271466" y="1778986"/>
+            <a:ext cx="440301" cy="671147"/>
+          </a:xfrm>
+          <a:prstGeom prst="bentConnector2">
+            <a:avLst/>
+          </a:prstGeom>
+          <a:ln w="28575">
+            <a:solidFill>
+              <a:srgbClr val="FF0000"/>
+            </a:solidFill>
+            <a:headEnd type="triangle"/>
+            <a:tailEnd type="triangle"/>
+          </a:ln>
+        </p:spPr>
+        <p:style>
+          <a:lnRef idx="1">
+            <a:schemeClr val="accent1"/>
+          </a:lnRef>
+          <a:fillRef idx="0">
+            <a:schemeClr val="accent1"/>
+          </a:fillRef>
+          <a:effectRef idx="0">
+            <a:schemeClr val="accent1"/>
+          </a:effectRef>
+          <a:fontRef idx="minor">
+            <a:schemeClr val="tx1"/>
+          </a:fontRef>
+        </p:style>
+      </p:cxnSp>
+      <p:cxnSp>
+        <p:nvCxnSpPr>
+          <p:cNvPr id="48" name="Straight Arrow Connector 47">
+            <a:extLst>
+              <a:ext uri="{FF2B5EF4-FFF2-40B4-BE49-F238E27FC236}">
+                <a16:creationId xmlns:a16="http://schemas.microsoft.com/office/drawing/2014/main" id="{4A0167FA-E0E4-C729-1F18-4D75F72A53B5}"/>
+              </a:ext>
+            </a:extLst>
+          </p:cNvPr>
+          <p:cNvCxnSpPr>
+            <a:cxnSpLocks/>
+            <a:endCxn id="45" idx="0"/>
+          </p:cNvCxnSpPr>
+          <p:nvPr/>
+        </p:nvCxnSpPr>
+        <p:spPr>
+          <a:xfrm flipH="1">
+            <a:off x="4849711" y="1894407"/>
+            <a:ext cx="1087669" cy="1"/>
+          </a:xfrm>
+          <a:prstGeom prst="straightConnector1">
+            <a:avLst/>
+          </a:prstGeom>
+          <a:ln w="28575">
+            <a:solidFill>
+              <a:srgbClr val="FF0000"/>
+            </a:solidFill>
+            <a:headEnd type="triangle"/>
+            <a:tailEnd type="triangle"/>
+          </a:ln>
+        </p:spPr>
+        <p:style>
+          <a:lnRef idx="1">
+            <a:schemeClr val="accent1"/>
+          </a:lnRef>
+          <a:fillRef idx="0">
+            <a:schemeClr val="accent1"/>
+          </a:fillRef>
+          <a:effectRef idx="0">
+            <a:schemeClr val="accent1"/>
+          </a:effectRef>
+          <a:fontRef idx="minor">
+            <a:schemeClr val="tx1"/>
+          </a:fontRef>
+        </p:style>
+      </p:cxnSp>
+      <p:pic>
+        <p:nvPicPr>
+          <p:cNvPr id="52" name="Picture 51" descr="A logo with a letter t&#10;&#10;Description automatically generated with medium confidence">
+            <a:extLst>
+              <a:ext uri="{FF2B5EF4-FFF2-40B4-BE49-F238E27FC236}">
+                <a16:creationId xmlns:a16="http://schemas.microsoft.com/office/drawing/2014/main" id="{D0F06259-C8C7-9AE6-ABAE-C31D02081040}"/>
+              </a:ext>
+            </a:extLst>
+          </p:cNvPr>
+          <p:cNvPicPr>
+            <a:picLocks noChangeAspect="1"/>
+          </p:cNvPicPr>
+          <p:nvPr/>
+        </p:nvPicPr>
+        <p:blipFill>
+          <a:blip r:embed="rId7">
+            <a:extLst>
+              <a:ext uri="{28A0092B-C50C-407E-A947-70E740481C1C}">
+                <a14:useLocalDpi xmlns:a14="http://schemas.microsoft.com/office/drawing/2010/main" val="0"/>
+              </a:ext>
+            </a:extLst>
+          </a:blip>
+          <a:stretch>
+            <a:fillRect/>
+          </a:stretch>
+        </p:blipFill>
+        <p:spPr>
+          <a:xfrm>
+            <a:off x="5937380" y="1627738"/>
+            <a:ext cx="1202644" cy="501101"/>
+          </a:xfrm>
+          <a:prstGeom prst="rect">
+            <a:avLst/>
+          </a:prstGeom>
+        </p:spPr>
+      </p:pic>
+      <p:pic>
+        <p:nvPicPr>
+          <p:cNvPr id="53" name="Picture 52">
+            <a:extLst>
+              <a:ext uri="{FF2B5EF4-FFF2-40B4-BE49-F238E27FC236}">
+                <a16:creationId xmlns:a16="http://schemas.microsoft.com/office/drawing/2014/main" id="{641CA9C8-9F42-D077-0173-61167BDA88FA}"/>
+              </a:ext>
+            </a:extLst>
+          </p:cNvPr>
+          <p:cNvPicPr>
+            <a:picLocks noChangeAspect="1"/>
+          </p:cNvPicPr>
+          <p:nvPr/>
+        </p:nvPicPr>
+        <p:blipFill>
+          <a:blip r:embed="rId5"/>
+          <a:stretch>
+            <a:fillRect/>
+          </a:stretch>
+        </p:blipFill>
+        <p:spPr>
+          <a:xfrm>
+            <a:off x="7534042" y="1586124"/>
+            <a:ext cx="489507" cy="542715"/>
+          </a:xfrm>
+          <a:prstGeom prst="rect">
+            <a:avLst/>
+          </a:prstGeom>
+          <a:ln w="9525">
+            <a:solidFill>
+              <a:schemeClr val="tx1"/>
+            </a:solidFill>
+          </a:ln>
+        </p:spPr>
+      </p:pic>
+      <p:sp>
+        <p:nvSpPr>
+          <p:cNvPr id="54" name="TextBox 53">
+            <a:extLst>
+              <a:ext uri="{FF2B5EF4-FFF2-40B4-BE49-F238E27FC236}">
+                <a16:creationId xmlns:a16="http://schemas.microsoft.com/office/drawing/2014/main" id="{447BE786-B82D-E22D-EA49-377FC30E7E67}"/>
+              </a:ext>
+            </a:extLst>
+          </p:cNvPr>
+          <p:cNvSpPr txBox="1"/>
+          <p:nvPr/>
+        </p:nvSpPr>
+        <p:spPr>
+          <a:xfrm>
+            <a:off x="7031033" y="2228483"/>
+            <a:ext cx="2140399" cy="461665"/>
+          </a:xfrm>
+          <a:prstGeom prst="rect">
+            <a:avLst/>
+          </a:prstGeom>
+          <a:noFill/>
+        </p:spPr>
+        <p:txBody>
+          <a:bodyPr wrap="square" rtlCol="0">
+            <a:spAutoFit/>
+          </a:bodyPr>
+          <a:lstStyle/>
+          <a:p>
+            <a:r>
+              <a:rPr lang="en-SG" sz="1200" b="1" dirty="0"/>
+              <a:t>Hacker outside company in the internet </a:t>
+            </a:r>
+          </a:p>
+        </p:txBody>
+      </p:sp>
+      <p:sp>
+        <p:nvSpPr>
+          <p:cNvPr id="55" name="Arrow: Left-Right 54">
+            <a:extLst>
+              <a:ext uri="{FF2B5EF4-FFF2-40B4-BE49-F238E27FC236}">
+                <a16:creationId xmlns:a16="http://schemas.microsoft.com/office/drawing/2014/main" id="{D612BA70-8E6F-F7C6-FBD9-054558ABCB4A}"/>
+              </a:ext>
+            </a:extLst>
+          </p:cNvPr>
+          <p:cNvSpPr/>
+          <p:nvPr/>
+        </p:nvSpPr>
+        <p:spPr>
+          <a:xfrm>
+            <a:off x="7185437" y="1838743"/>
+            <a:ext cx="303192" cy="111327"/>
+          </a:xfrm>
+          <a:prstGeom prst="leftRightArrow">
+            <a:avLst/>
+          </a:prstGeom>
+          <a:noFill/>
+          <a:ln>
+            <a:solidFill>
+              <a:srgbClr val="FF0000"/>
+            </a:solidFill>
+          </a:ln>
+        </p:spPr>
+        <p:style>
+          <a:lnRef idx="2">
+            <a:schemeClr val="accent1">
+              <a:shade val="15000"/>
+            </a:schemeClr>
+          </a:lnRef>
+          <a:fillRef idx="1">
+            <a:schemeClr val="accent1"/>
+          </a:fillRef>
+          <a:effectRef idx="0">
+            <a:schemeClr val="accent1"/>
+          </a:effectRef>
+          <a:fontRef idx="minor">
+            <a:schemeClr val="lt1"/>
+          </a:fontRef>
+        </p:style>
+        <p:txBody>
+          <a:bodyPr rtlCol="0" anchor="ctr"/>
+          <a:lstStyle/>
+          <a:p>
+            <a:pPr algn="ctr"/>
+            <a:endParaRPr lang="en-SG"/>
+          </a:p>
+        </p:txBody>
+      </p:sp>
+      <p:sp>
+        <p:nvSpPr>
+          <p:cNvPr id="56" name="Arrow: Left-Right 55">
+            <a:extLst>
+              <a:ext uri="{FF2B5EF4-FFF2-40B4-BE49-F238E27FC236}">
+                <a16:creationId xmlns:a16="http://schemas.microsoft.com/office/drawing/2014/main" id="{BABBBE6D-0529-3A6C-EC98-C7448868F7B6}"/>
+              </a:ext>
+            </a:extLst>
+          </p:cNvPr>
+          <p:cNvSpPr/>
+          <p:nvPr/>
+        </p:nvSpPr>
+        <p:spPr>
+          <a:xfrm>
+            <a:off x="5887275" y="3351988"/>
+            <a:ext cx="303192" cy="111327"/>
+          </a:xfrm>
+          <a:prstGeom prst="leftRightArrow">
+            <a:avLst/>
+          </a:prstGeom>
+          <a:noFill/>
+          <a:ln>
+            <a:solidFill>
+              <a:srgbClr val="FF0000"/>
+            </a:solidFill>
+          </a:ln>
+        </p:spPr>
+        <p:style>
+          <a:lnRef idx="2">
+            <a:schemeClr val="accent1">
+              <a:shade val="15000"/>
+            </a:schemeClr>
+          </a:lnRef>
+          <a:fillRef idx="1">
+            <a:schemeClr val="accent1"/>
+          </a:fillRef>
+          <a:effectRef idx="0">
+            <a:schemeClr val="accent1"/>
+          </a:effectRef>
+          <a:fontRef idx="minor">
+            <a:schemeClr val="lt1"/>
+          </a:fontRef>
+        </p:style>
+        <p:txBody>
+          <a:bodyPr rtlCol="0" anchor="ctr"/>
+          <a:lstStyle/>
+          <a:p>
+            <a:pPr algn="ctr"/>
+            <a:endParaRPr lang="en-SG"/>
+          </a:p>
+        </p:txBody>
+      </p:sp>
+      <p:sp>
+        <p:nvSpPr>
+          <p:cNvPr id="57" name="TextBox 56">
+            <a:extLst>
+              <a:ext uri="{FF2B5EF4-FFF2-40B4-BE49-F238E27FC236}">
+                <a16:creationId xmlns:a16="http://schemas.microsoft.com/office/drawing/2014/main" id="{E5F7FF78-8909-49C3-4162-C260A8AB3BBC}"/>
+              </a:ext>
+            </a:extLst>
+          </p:cNvPr>
+          <p:cNvSpPr txBox="1"/>
+          <p:nvPr/>
+        </p:nvSpPr>
+        <p:spPr>
+          <a:xfrm>
+            <a:off x="5832794" y="1359093"/>
+            <a:ext cx="1655835" cy="276999"/>
+          </a:xfrm>
+          <a:prstGeom prst="rect">
+            <a:avLst/>
+          </a:prstGeom>
+          <a:noFill/>
+        </p:spPr>
+        <p:txBody>
+          <a:bodyPr wrap="square" rtlCol="0">
+            <a:spAutoFit/>
+          </a:bodyPr>
+          <a:lstStyle/>
+          <a:p>
+            <a:r>
+              <a:rPr lang="en-SG" sz="1200" b="1" dirty="0"/>
+              <a:t>Trojans control hub</a:t>
+            </a:r>
+          </a:p>
+        </p:txBody>
+      </p:sp>
+      <p:pic>
+        <p:nvPicPr>
+          <p:cNvPr id="60" name="Picture 59" descr="A red horse on wheels&#10;&#10;Description automatically generated">
+            <a:extLst>
+              <a:ext uri="{FF2B5EF4-FFF2-40B4-BE49-F238E27FC236}">
+                <a16:creationId xmlns:a16="http://schemas.microsoft.com/office/drawing/2014/main" id="{67ED39CB-5A43-7B08-0DA8-8FB9EA6654FB}"/>
+              </a:ext>
+            </a:extLst>
+          </p:cNvPr>
+          <p:cNvPicPr>
+            <a:picLocks noChangeAspect="1"/>
+          </p:cNvPicPr>
+          <p:nvPr/>
+        </p:nvPicPr>
+        <p:blipFill>
+          <a:blip r:embed="rId3">
+            <a:extLst>
+              <a:ext uri="{28A0092B-C50C-407E-A947-70E740481C1C}">
+                <a14:useLocalDpi xmlns:a14="http://schemas.microsoft.com/office/drawing/2010/main" val="0"/>
+              </a:ext>
+            </a:extLst>
+          </a:blip>
+          <a:stretch>
+            <a:fillRect/>
+          </a:stretch>
+        </p:blipFill>
+        <p:spPr>
+          <a:xfrm flipH="1">
+            <a:off x="9268226" y="1638490"/>
+            <a:ext cx="323830" cy="323830"/>
+          </a:xfrm>
+          <a:prstGeom prst="rect">
+            <a:avLst/>
+          </a:prstGeom>
+        </p:spPr>
+      </p:pic>
+      <p:sp>
+        <p:nvSpPr>
+          <p:cNvPr id="61" name="TextBox 60">
+            <a:extLst>
+              <a:ext uri="{FF2B5EF4-FFF2-40B4-BE49-F238E27FC236}">
+                <a16:creationId xmlns:a16="http://schemas.microsoft.com/office/drawing/2014/main" id="{7A413438-B753-FA41-38F0-2697DED9C300}"/>
+              </a:ext>
+            </a:extLst>
+          </p:cNvPr>
+          <p:cNvSpPr txBox="1"/>
+          <p:nvPr/>
+        </p:nvSpPr>
+        <p:spPr>
+          <a:xfrm>
+            <a:off x="9643872" y="1678811"/>
+            <a:ext cx="1352642" cy="276999"/>
+          </a:xfrm>
+          <a:prstGeom prst="rect">
+            <a:avLst/>
+          </a:prstGeom>
+          <a:noFill/>
+        </p:spPr>
+        <p:txBody>
+          <a:bodyPr wrap="square" rtlCol="0">
+            <a:spAutoFit/>
+          </a:bodyPr>
+          <a:lstStyle/>
+          <a:p>
+            <a:r>
+              <a:rPr lang="en-SG" sz="1200" b="1" dirty="0"/>
+              <a:t>Backdoor trojan </a:t>
+            </a:r>
+          </a:p>
+        </p:txBody>
+      </p:sp>
+      <p:pic>
+        <p:nvPicPr>
+          <p:cNvPr id="62" name="Picture 61" descr="A red horse on wheels&#10;&#10;Description automatically generated">
+            <a:extLst>
+              <a:ext uri="{FF2B5EF4-FFF2-40B4-BE49-F238E27FC236}">
+                <a16:creationId xmlns:a16="http://schemas.microsoft.com/office/drawing/2014/main" id="{38E26EEF-4412-10E2-BC9A-C1A786696DE5}"/>
+              </a:ext>
+            </a:extLst>
+          </p:cNvPr>
+          <p:cNvPicPr>
+            <a:picLocks noChangeAspect="1"/>
+          </p:cNvPicPr>
+          <p:nvPr/>
+        </p:nvPicPr>
+        <p:blipFill>
+          <a:blip r:embed="rId3">
+            <a:extLst>
+              <a:ext uri="{28A0092B-C50C-407E-A947-70E740481C1C}">
+                <a14:useLocalDpi xmlns:a14="http://schemas.microsoft.com/office/drawing/2010/main" val="0"/>
+              </a:ext>
+            </a:extLst>
+          </a:blip>
+          <a:stretch>
+            <a:fillRect/>
+          </a:stretch>
+        </p:blipFill>
+        <p:spPr>
+          <a:xfrm flipH="1">
+            <a:off x="9316957" y="2083188"/>
+            <a:ext cx="227494" cy="227494"/>
+          </a:xfrm>
+          <a:prstGeom prst="rect">
+            <a:avLst/>
+          </a:prstGeom>
+        </p:spPr>
+      </p:pic>
+      <p:pic>
+        <p:nvPicPr>
+          <p:cNvPr id="63" name="Picture 62">
+            <a:extLst>
+              <a:ext uri="{FF2B5EF4-FFF2-40B4-BE49-F238E27FC236}">
+                <a16:creationId xmlns:a16="http://schemas.microsoft.com/office/drawing/2014/main" id="{A1BF6FCD-5954-9030-CB34-FC609D61EBF6}"/>
+              </a:ext>
+            </a:extLst>
+          </p:cNvPr>
+          <p:cNvPicPr>
+            <a:picLocks noChangeAspect="1"/>
+          </p:cNvPicPr>
+          <p:nvPr/>
+        </p:nvPicPr>
+        <p:blipFill>
+          <a:blip r:embed="rId4"/>
+          <a:stretch>
+            <a:fillRect/>
+          </a:stretch>
+        </p:blipFill>
+        <p:spPr>
+          <a:xfrm>
+            <a:off x="9285742" y="2228483"/>
+            <a:ext cx="320040" cy="268970"/>
+          </a:xfrm>
+          <a:prstGeom prst="rect">
+            <a:avLst/>
+          </a:prstGeom>
+        </p:spPr>
+      </p:pic>
+      <p:sp>
+        <p:nvSpPr>
+          <p:cNvPr id="64" name="TextBox 63">
+            <a:extLst>
+              <a:ext uri="{FF2B5EF4-FFF2-40B4-BE49-F238E27FC236}">
+                <a16:creationId xmlns:a16="http://schemas.microsoft.com/office/drawing/2014/main" id="{8134E562-EE45-195F-D052-3CACAF544FF7}"/>
+              </a:ext>
+            </a:extLst>
+          </p:cNvPr>
+          <p:cNvSpPr txBox="1"/>
+          <p:nvPr/>
+        </p:nvSpPr>
+        <p:spPr>
+          <a:xfrm>
+            <a:off x="9643872" y="2165035"/>
+            <a:ext cx="1352642" cy="276999"/>
+          </a:xfrm>
+          <a:prstGeom prst="rect">
+            <a:avLst/>
+          </a:prstGeom>
+          <a:noFill/>
+        </p:spPr>
+        <p:txBody>
+          <a:bodyPr wrap="square" rtlCol="0">
+            <a:spAutoFit/>
+          </a:bodyPr>
+          <a:lstStyle/>
+          <a:p>
+            <a:r>
+              <a:rPr lang="en-SG" sz="1200" b="1" dirty="0"/>
+              <a:t>Trojan connector</a:t>
+            </a:r>
+          </a:p>
+        </p:txBody>
+      </p:sp>
+      <p:pic>
+        <p:nvPicPr>
+          <p:cNvPr id="65" name="Picture 64" descr="A logo with a letter t&#10;&#10;Description automatically generated with medium confidence">
+            <a:extLst>
+              <a:ext uri="{FF2B5EF4-FFF2-40B4-BE49-F238E27FC236}">
+                <a16:creationId xmlns:a16="http://schemas.microsoft.com/office/drawing/2014/main" id="{93FD5CF7-B676-5698-DA14-FB7F7D95CC5E}"/>
+              </a:ext>
+            </a:extLst>
+          </p:cNvPr>
+          <p:cNvPicPr>
+            <a:picLocks noChangeAspect="1"/>
+          </p:cNvPicPr>
+          <p:nvPr/>
+        </p:nvPicPr>
+        <p:blipFill rotWithShape="1">
+          <a:blip r:embed="rId7">
+            <a:extLst>
+              <a:ext uri="{28A0092B-C50C-407E-A947-70E740481C1C}">
+                <a14:useLocalDpi xmlns:a14="http://schemas.microsoft.com/office/drawing/2010/main" val="0"/>
+              </a:ext>
+            </a:extLst>
+          </a:blip>
+          <a:srcRect l="32534" t="1" r="29884" b="27348"/>
+          <a:stretch/>
+        </p:blipFill>
+        <p:spPr>
+          <a:xfrm>
+            <a:off x="9268226" y="2651259"/>
+            <a:ext cx="489508" cy="394287"/>
+          </a:xfrm>
+          <a:prstGeom prst="rect">
+            <a:avLst/>
+          </a:prstGeom>
+        </p:spPr>
+      </p:pic>
+      <p:sp>
+        <p:nvSpPr>
+          <p:cNvPr id="66" name="Rectangle 65">
+            <a:extLst>
+              <a:ext uri="{FF2B5EF4-FFF2-40B4-BE49-F238E27FC236}">
+                <a16:creationId xmlns:a16="http://schemas.microsoft.com/office/drawing/2014/main" id="{700FB4C1-6C58-960F-C5C7-B7D0E51E3BB0}"/>
+              </a:ext>
+            </a:extLst>
+          </p:cNvPr>
+          <p:cNvSpPr/>
+          <p:nvPr/>
+        </p:nvSpPr>
+        <p:spPr>
+          <a:xfrm>
+            <a:off x="1045853" y="1448035"/>
+            <a:ext cx="1265549" cy="781415"/>
+          </a:xfrm>
+          <a:prstGeom prst="rect">
+            <a:avLst/>
+          </a:prstGeom>
+          <a:ln>
+            <a:prstDash val="sysDash"/>
+          </a:ln>
+        </p:spPr>
+        <p:style>
+          <a:lnRef idx="2">
+            <a:schemeClr val="dk1"/>
+          </a:lnRef>
+          <a:fillRef idx="1">
+            <a:schemeClr val="lt1"/>
+          </a:fillRef>
+          <a:effectRef idx="0">
+            <a:schemeClr val="dk1"/>
+          </a:effectRef>
+          <a:fontRef idx="minor">
+            <a:schemeClr val="dk1"/>
+          </a:fontRef>
+        </p:style>
+        <p:txBody>
+          <a:bodyPr rtlCol="0" anchor="ctr"/>
+          <a:lstStyle/>
+          <a:p>
+            <a:pPr algn="ctr"/>
+            <a:endParaRPr lang="en-SG" dirty="0"/>
+          </a:p>
+        </p:txBody>
+      </p:sp>
+      <p:pic>
+        <p:nvPicPr>
+          <p:cNvPr id="67" name="Picture 66">
+            <a:extLst>
+              <a:ext uri="{FF2B5EF4-FFF2-40B4-BE49-F238E27FC236}">
+                <a16:creationId xmlns:a16="http://schemas.microsoft.com/office/drawing/2014/main" id="{65C9CAA0-9179-BD70-43DE-EA9C5BC75877}"/>
+              </a:ext>
+            </a:extLst>
+          </p:cNvPr>
+          <p:cNvPicPr>
+            <a:picLocks noChangeAspect="1"/>
+          </p:cNvPicPr>
+          <p:nvPr/>
+        </p:nvPicPr>
+        <p:blipFill>
+          <a:blip r:embed="rId2"/>
+          <a:stretch>
+            <a:fillRect/>
+          </a:stretch>
+        </p:blipFill>
+        <p:spPr>
+          <a:xfrm>
+            <a:off x="1152696" y="1628992"/>
+            <a:ext cx="866863" cy="489522"/>
+          </a:xfrm>
+          <a:prstGeom prst="rect">
+            <a:avLst/>
+          </a:prstGeom>
+        </p:spPr>
+      </p:pic>
+      <p:pic>
+        <p:nvPicPr>
+          <p:cNvPr id="68" name="Picture 67" descr="A red horse on wheels&#10;&#10;Description automatically generated">
+            <a:extLst>
+              <a:ext uri="{FF2B5EF4-FFF2-40B4-BE49-F238E27FC236}">
+                <a16:creationId xmlns:a16="http://schemas.microsoft.com/office/drawing/2014/main" id="{98014FCD-6091-E01C-44EB-7891EF841896}"/>
+              </a:ext>
+            </a:extLst>
+          </p:cNvPr>
+          <p:cNvPicPr>
+            <a:picLocks noChangeAspect="1"/>
+          </p:cNvPicPr>
+          <p:nvPr/>
+        </p:nvPicPr>
+        <p:blipFill>
+          <a:blip r:embed="rId3">
+            <a:extLst>
+              <a:ext uri="{28A0092B-C50C-407E-A947-70E740481C1C}">
+                <a14:useLocalDpi xmlns:a14="http://schemas.microsoft.com/office/drawing/2010/main" val="0"/>
+              </a:ext>
+            </a:extLst>
+          </a:blip>
+          <a:stretch>
+            <a:fillRect/>
+          </a:stretch>
+        </p:blipFill>
+        <p:spPr>
+          <a:xfrm flipH="1">
+            <a:off x="1318363" y="1536118"/>
+            <a:ext cx="395317" cy="395317"/>
+          </a:xfrm>
+          <a:prstGeom prst="rect">
+            <a:avLst/>
+          </a:prstGeom>
+        </p:spPr>
+      </p:pic>
+      <p:cxnSp>
+        <p:nvCxnSpPr>
+          <p:cNvPr id="69" name="Straight Arrow Connector 68">
+            <a:extLst>
+              <a:ext uri="{FF2B5EF4-FFF2-40B4-BE49-F238E27FC236}">
+                <a16:creationId xmlns:a16="http://schemas.microsoft.com/office/drawing/2014/main" id="{52441A44-EF6D-99C5-3440-517D4A7BD9EF}"/>
+              </a:ext>
+            </a:extLst>
+          </p:cNvPr>
+          <p:cNvCxnSpPr>
+            <a:cxnSpLocks/>
+          </p:cNvCxnSpPr>
+          <p:nvPr/>
+        </p:nvCxnSpPr>
+        <p:spPr>
+          <a:xfrm flipH="1">
+            <a:off x="1746919" y="1735638"/>
+            <a:ext cx="2077087" cy="0"/>
+          </a:xfrm>
+          <a:prstGeom prst="straightConnector1">
+            <a:avLst/>
+          </a:prstGeom>
+          <a:ln w="28575">
+            <a:solidFill>
+              <a:srgbClr val="FF0000"/>
+            </a:solidFill>
+            <a:headEnd type="triangle"/>
+            <a:tailEnd type="triangle"/>
+          </a:ln>
+        </p:spPr>
+        <p:style>
+          <a:lnRef idx="1">
+            <a:schemeClr val="accent1"/>
+          </a:lnRef>
+          <a:fillRef idx="0">
+            <a:schemeClr val="accent1"/>
+          </a:fillRef>
+          <a:effectRef idx="0">
+            <a:schemeClr val="accent1"/>
+          </a:effectRef>
+          <a:fontRef idx="minor">
+            <a:schemeClr val="tx1"/>
+          </a:fontRef>
+        </p:style>
+      </p:cxnSp>
+      <p:sp>
+        <p:nvSpPr>
+          <p:cNvPr id="71" name="TextBox 70">
+            <a:extLst>
+              <a:ext uri="{FF2B5EF4-FFF2-40B4-BE49-F238E27FC236}">
+                <a16:creationId xmlns:a16="http://schemas.microsoft.com/office/drawing/2014/main" id="{D9955494-B396-B7BC-E358-40E951AFD5DB}"/>
+              </a:ext>
+            </a:extLst>
+          </p:cNvPr>
+          <p:cNvSpPr txBox="1"/>
+          <p:nvPr/>
+        </p:nvSpPr>
+        <p:spPr>
+          <a:xfrm>
+            <a:off x="9778654" y="2672995"/>
+            <a:ext cx="1481740" cy="276999"/>
+          </a:xfrm>
+          <a:prstGeom prst="rect">
+            <a:avLst/>
+          </a:prstGeom>
+          <a:noFill/>
+        </p:spPr>
+        <p:txBody>
+          <a:bodyPr wrap="square" rtlCol="0">
+            <a:spAutoFit/>
+          </a:bodyPr>
+          <a:lstStyle/>
+          <a:p>
+            <a:r>
+              <a:rPr lang="en-SG" sz="1200" b="1" dirty="0"/>
+              <a:t>Trojan control Hub</a:t>
+            </a:r>
+          </a:p>
+        </p:txBody>
+      </p:sp>
+    </p:spTree>
+    <p:extLst>
+      <p:ext uri="{BB962C8B-B14F-4D97-AF65-F5344CB8AC3E}">
+        <p14:creationId xmlns:p14="http://schemas.microsoft.com/office/powerpoint/2010/main" val="3192599985"/>
+      </p:ext>
+    </p:extLst>
+  </p:cSld>
+  <p:clrMapOvr>
+    <a:masterClrMapping/>
+  </p:clrMapOvr>
+</p:sld>
+</file>
+
+<file path=ppt/slides/slide3.xml><?xml version="1.0" encoding="utf-8"?>
 <p:sld xmlns:a="http://schemas.openxmlformats.org/drawingml/2006/main" xmlns:r="http://schemas.openxmlformats.org/officeDocument/2006/relationships" xmlns:p="http://schemas.openxmlformats.org/presentationml/2006/main">
   <p:cSld>
     <p:spTree>

</xml_diff>

<commit_message>
update the backdoor trojan code document.
</commit_message>
<xml_diff>
--- a/doc/designDoc.pptx
+++ b/doc/designDoc.pptx
@@ -200,7 +200,7 @@
           <a:p>
             <a:fld id="{30462BEA-6C65-41CB-B521-7C9DB089D720}" type="datetimeFigureOut">
               <a:rPr lang="en-SG" smtClean="0"/>
-              <a:t>26/10/2023</a:t>
+              <a:t>27/10/2023</a:t>
             </a:fld>
             <a:endParaRPr lang="en-SG"/>
           </a:p>
@@ -785,7 +785,7 @@
           <a:p>
             <a:fld id="{435F7F91-36DA-4AC3-B0AA-56077EB606D8}" type="datetimeFigureOut">
               <a:rPr lang="en-SG" smtClean="0"/>
-              <a:t>26/10/2023</a:t>
+              <a:t>27/10/2023</a:t>
             </a:fld>
             <a:endParaRPr lang="en-SG"/>
           </a:p>
@@ -985,7 +985,7 @@
           <a:p>
             <a:fld id="{435F7F91-36DA-4AC3-B0AA-56077EB606D8}" type="datetimeFigureOut">
               <a:rPr lang="en-SG" smtClean="0"/>
-              <a:t>26/10/2023</a:t>
+              <a:t>27/10/2023</a:t>
             </a:fld>
             <a:endParaRPr lang="en-SG"/>
           </a:p>
@@ -1195,7 +1195,7 @@
           <a:p>
             <a:fld id="{435F7F91-36DA-4AC3-B0AA-56077EB606D8}" type="datetimeFigureOut">
               <a:rPr lang="en-SG" smtClean="0"/>
-              <a:t>26/10/2023</a:t>
+              <a:t>27/10/2023</a:t>
             </a:fld>
             <a:endParaRPr lang="en-SG"/>
           </a:p>
@@ -1395,7 +1395,7 @@
           <a:p>
             <a:fld id="{435F7F91-36DA-4AC3-B0AA-56077EB606D8}" type="datetimeFigureOut">
               <a:rPr lang="en-SG" smtClean="0"/>
-              <a:t>26/10/2023</a:t>
+              <a:t>27/10/2023</a:t>
             </a:fld>
             <a:endParaRPr lang="en-SG"/>
           </a:p>
@@ -1671,7 +1671,7 @@
           <a:p>
             <a:fld id="{435F7F91-36DA-4AC3-B0AA-56077EB606D8}" type="datetimeFigureOut">
               <a:rPr lang="en-SG" smtClean="0"/>
-              <a:t>26/10/2023</a:t>
+              <a:t>27/10/2023</a:t>
             </a:fld>
             <a:endParaRPr lang="en-SG"/>
           </a:p>
@@ -1939,7 +1939,7 @@
           <a:p>
             <a:fld id="{435F7F91-36DA-4AC3-B0AA-56077EB606D8}" type="datetimeFigureOut">
               <a:rPr lang="en-SG" smtClean="0"/>
-              <a:t>26/10/2023</a:t>
+              <a:t>27/10/2023</a:t>
             </a:fld>
             <a:endParaRPr lang="en-SG"/>
           </a:p>
@@ -2354,7 +2354,7 @@
           <a:p>
             <a:fld id="{435F7F91-36DA-4AC3-B0AA-56077EB606D8}" type="datetimeFigureOut">
               <a:rPr lang="en-SG" smtClean="0"/>
-              <a:t>26/10/2023</a:t>
+              <a:t>27/10/2023</a:t>
             </a:fld>
             <a:endParaRPr lang="en-SG"/>
           </a:p>
@@ -2496,7 +2496,7 @@
           <a:p>
             <a:fld id="{435F7F91-36DA-4AC3-B0AA-56077EB606D8}" type="datetimeFigureOut">
               <a:rPr lang="en-SG" smtClean="0"/>
-              <a:t>26/10/2023</a:t>
+              <a:t>27/10/2023</a:t>
             </a:fld>
             <a:endParaRPr lang="en-SG"/>
           </a:p>
@@ -2609,7 +2609,7 @@
           <a:p>
             <a:fld id="{435F7F91-36DA-4AC3-B0AA-56077EB606D8}" type="datetimeFigureOut">
               <a:rPr lang="en-SG" smtClean="0"/>
-              <a:t>26/10/2023</a:t>
+              <a:t>27/10/2023</a:t>
             </a:fld>
             <a:endParaRPr lang="en-SG"/>
           </a:p>
@@ -2922,7 +2922,7 @@
           <a:p>
             <a:fld id="{435F7F91-36DA-4AC3-B0AA-56077EB606D8}" type="datetimeFigureOut">
               <a:rPr lang="en-SG" smtClean="0"/>
-              <a:t>26/10/2023</a:t>
+              <a:t>27/10/2023</a:t>
             </a:fld>
             <a:endParaRPr lang="en-SG"/>
           </a:p>
@@ -3211,7 +3211,7 @@
           <a:p>
             <a:fld id="{435F7F91-36DA-4AC3-B0AA-56077EB606D8}" type="datetimeFigureOut">
               <a:rPr lang="en-SG" smtClean="0"/>
-              <a:t>26/10/2023</a:t>
+              <a:t>27/10/2023</a:t>
             </a:fld>
             <a:endParaRPr lang="en-SG"/>
           </a:p>
@@ -3454,7 +3454,7 @@
           <a:p>
             <a:fld id="{435F7F91-36DA-4AC3-B0AA-56077EB606D8}" type="datetimeFigureOut">
               <a:rPr lang="en-SG" smtClean="0"/>
-              <a:t>26/10/2023</a:t>
+              <a:t>27/10/2023</a:t>
             </a:fld>
             <a:endParaRPr lang="en-SG"/>
           </a:p>
@@ -9384,10 +9384,10 @@
       </p:grpSpPr>
       <p:sp>
         <p:nvSpPr>
-          <p:cNvPr id="155" name="Rectangle 154">
-            <a:extLst>
-              <a:ext uri="{FF2B5EF4-FFF2-40B4-BE49-F238E27FC236}">
-                <a16:creationId xmlns:a16="http://schemas.microsoft.com/office/drawing/2014/main" id="{395E213A-2F70-6517-2A18-9B75B9029F66}"/>
+          <p:cNvPr id="57" name="Rectangle 56">
+            <a:extLst>
+              <a:ext uri="{FF2B5EF4-FFF2-40B4-BE49-F238E27FC236}">
+                <a16:creationId xmlns:a16="http://schemas.microsoft.com/office/drawing/2014/main" id="{C10BB4AF-54F5-D872-3EE8-378C1518D9EB}"/>
               </a:ext>
             </a:extLst>
           </p:cNvPr>
@@ -9396,8 +9396,8 @@
         </p:nvSpPr>
         <p:spPr>
           <a:xfrm>
-            <a:off x="382565" y="1153120"/>
-            <a:ext cx="7144556" cy="4993121"/>
+            <a:off x="9265650" y="1254192"/>
+            <a:ext cx="1569990" cy="1402285"/>
           </a:xfrm>
           <a:prstGeom prst="rect">
             <a:avLst/>
@@ -9434,6 +9434,56 @@
       </p:sp>
       <p:sp>
         <p:nvSpPr>
+          <p:cNvPr id="155" name="Rectangle 154">
+            <a:extLst>
+              <a:ext uri="{FF2B5EF4-FFF2-40B4-BE49-F238E27FC236}">
+                <a16:creationId xmlns:a16="http://schemas.microsoft.com/office/drawing/2014/main" id="{395E213A-2F70-6517-2A18-9B75B9029F66}"/>
+              </a:ext>
+            </a:extLst>
+          </p:cNvPr>
+          <p:cNvSpPr/>
+          <p:nvPr/>
+        </p:nvSpPr>
+        <p:spPr>
+          <a:xfrm>
+            <a:off x="382565" y="1153120"/>
+            <a:ext cx="7144556" cy="4993121"/>
+          </a:xfrm>
+          <a:prstGeom prst="rect">
+            <a:avLst/>
+          </a:prstGeom>
+          <a:ln>
+            <a:solidFill>
+              <a:srgbClr val="0070C0"/>
+            </a:solidFill>
+            <a:prstDash val="sysDash"/>
+          </a:ln>
+        </p:spPr>
+        <p:style>
+          <a:lnRef idx="2">
+            <a:schemeClr val="dk1"/>
+          </a:lnRef>
+          <a:fillRef idx="1">
+            <a:schemeClr val="lt1"/>
+          </a:fillRef>
+          <a:effectRef idx="0">
+            <a:schemeClr val="dk1"/>
+          </a:effectRef>
+          <a:fontRef idx="minor">
+            <a:schemeClr val="dk1"/>
+          </a:fontRef>
+        </p:style>
+        <p:txBody>
+          <a:bodyPr rtlCol="0" anchor="ctr"/>
+          <a:lstStyle/>
+          <a:p>
+            <a:pPr algn="ctr"/>
+            <a:endParaRPr lang="en-SG" dirty="0"/>
+          </a:p>
+        </p:txBody>
+      </p:sp>
+      <p:sp>
+        <p:nvSpPr>
           <p:cNvPr id="4" name="Rectangle 3">
             <a:extLst>
               <a:ext uri="{FF2B5EF4-FFF2-40B4-BE49-F238E27FC236}">
@@ -9479,8 +9529,8 @@
           <a:lstStyle/>
           <a:p>
             <a:r>
-              <a:rPr lang="en-SG" sz="1200" b="1" dirty="0"/>
-              <a:t>Back door Trojan Start   </a:t>
+              <a:rPr lang="en-SG" sz="1100" b="1" dirty="0"/>
+              <a:t>Back door trojan Start   </a:t>
             </a:r>
           </a:p>
         </p:txBody>
@@ -9500,7 +9550,7 @@
         <p:spPr>
           <a:xfrm>
             <a:off x="2183410" y="2719905"/>
-            <a:ext cx="1530085" cy="530415"/>
+            <a:ext cx="1530085" cy="429247"/>
           </a:xfrm>
           <a:prstGeom prst="rect">
             <a:avLst/>
@@ -9532,10 +9582,10 @@
           <a:lstStyle/>
           <a:p>
             <a:r>
-              <a:rPr lang="en-US" sz="1200" b="1" dirty="0"/>
-              <a:t>Init Harmful function &amp; action  executor</a:t>
-            </a:r>
-            <a:endParaRPr lang="en-SG" sz="1200" b="1" dirty="0"/>
+              <a:rPr lang="en-US" sz="1100" b="1" dirty="0"/>
+              <a:t>Init harmful function &amp; action  executor</a:t>
+            </a:r>
+            <a:endParaRPr lang="en-SG" sz="1100" b="1" dirty="0"/>
           </a:p>
         </p:txBody>
       </p:sp>
@@ -9600,7 +9650,7 @@
         </p:nvSpPr>
         <p:spPr>
           <a:xfrm>
-            <a:off x="2343572" y="1953390"/>
+            <a:off x="2724000" y="1844142"/>
             <a:ext cx="1023748" cy="276999"/>
           </a:xfrm>
           <a:prstGeom prst="rect">
@@ -9615,7 +9665,7 @@
           <a:lstStyle/>
           <a:p>
             <a:r>
-              <a:rPr lang="en-SG" sz="1200" b="1" dirty="0">
+              <a:rPr lang="en-SG" sz="1200" dirty="0">
                 <a:solidFill>
                   <a:schemeClr val="accent6">
                     <a:lumMod val="75000"/>
@@ -9674,7 +9724,7 @@
           <a:lstStyle/>
           <a:p>
             <a:r>
-              <a:rPr lang="en-SG" sz="1200" b="1" dirty="0"/>
+              <a:rPr lang="en-SG" sz="1100" b="1" dirty="0"/>
               <a:t>Init Command/file receiver UDP-server [silence mode]</a:t>
             </a:r>
           </a:p>
@@ -9740,7 +9790,7 @@
         <p:spPr>
           <a:xfrm>
             <a:off x="2778293" y="2323346"/>
-            <a:ext cx="3874512" cy="1185310"/>
+            <a:ext cx="3841367" cy="1185310"/>
           </a:xfrm>
           <a:prstGeom prst="bentConnector2">
             <a:avLst/>
@@ -9779,7 +9829,7 @@
         <p:spPr>
           <a:xfrm>
             <a:off x="5942774" y="3508656"/>
-            <a:ext cx="1420062" cy="469754"/>
+            <a:ext cx="1353772" cy="469754"/>
           </a:xfrm>
           <a:prstGeom prst="rect">
             <a:avLst/>
@@ -9811,8 +9861,8 @@
           <a:lstStyle/>
           <a:p>
             <a:r>
-              <a:rPr lang="en-SG" sz="1200" b="1" dirty="0"/>
-              <a:t>Init Trojan reporter (UDP-client)</a:t>
+              <a:rPr lang="en-SG" sz="1100" b="1" dirty="0"/>
+              <a:t>Init trojan reporter (UDP-client)</a:t>
             </a:r>
           </a:p>
         </p:txBody>
@@ -9831,7 +9881,7 @@
         </p:nvSpPr>
         <p:spPr>
           <a:xfrm>
-            <a:off x="3913161" y="2517817"/>
+            <a:off x="3925395" y="2454351"/>
             <a:ext cx="1023748" cy="276999"/>
           </a:xfrm>
           <a:prstGeom prst="rect">
@@ -9846,7 +9896,7 @@
           <a:lstStyle/>
           <a:p>
             <a:r>
-              <a:rPr lang="en-SG" sz="1200" b="1" dirty="0">
+              <a:rPr lang="en-SG" sz="1200" dirty="0">
                 <a:solidFill>
                   <a:schemeClr val="accent6">
                     <a:lumMod val="75000"/>
@@ -9887,7 +9937,7 @@
           <a:lstStyle/>
           <a:p>
             <a:r>
-              <a:rPr lang="en-SG" sz="1200" b="1" dirty="0">
+              <a:rPr lang="en-SG" sz="1200" dirty="0">
                 <a:solidFill>
                   <a:schemeClr val="accent6">
                     <a:lumMod val="75000"/>
@@ -9914,7 +9964,7 @@
         <p:spPr>
           <a:xfrm>
             <a:off x="2270646" y="4738967"/>
-            <a:ext cx="1442849" cy="377254"/>
+            <a:ext cx="1442849" cy="262940"/>
           </a:xfrm>
           <a:prstGeom prst="rect">
             <a:avLst/>
@@ -9946,10 +9996,10 @@
           <a:lstStyle/>
           <a:p>
             <a:r>
-              <a:rPr lang="en-US" sz="1200" b="1" dirty="0"/>
+              <a:rPr lang="en-US" sz="1100" b="1" dirty="0"/>
               <a:t>Task execution loop</a:t>
             </a:r>
-            <a:endParaRPr lang="en-SG" sz="1200" b="1" dirty="0"/>
+            <a:endParaRPr lang="en-SG" sz="1100" b="1" dirty="0"/>
           </a:p>
         </p:txBody>
       </p:sp>
@@ -9969,8 +10019,8 @@
         </p:nvCxnSpPr>
         <p:spPr>
           <a:xfrm>
-            <a:off x="2790187" y="3252649"/>
-            <a:ext cx="0" cy="1468096"/>
+            <a:off x="2790187" y="3149152"/>
+            <a:ext cx="0" cy="1571593"/>
           </a:xfrm>
           <a:prstGeom prst="straightConnector1">
             <a:avLst/>
@@ -10001,10 +10051,10 @@
       </p:cxnSp>
       <p:sp>
         <p:nvSpPr>
-          <p:cNvPr id="107" name="Rectangle 106">
-            <a:extLst>
-              <a:ext uri="{FF2B5EF4-FFF2-40B4-BE49-F238E27FC236}">
-                <a16:creationId xmlns:a16="http://schemas.microsoft.com/office/drawing/2014/main" id="{58C95C9B-2780-A42B-AE43-6F33914CAEE8}"/>
+          <p:cNvPr id="135" name="Rectangle 134">
+            <a:extLst>
+              <a:ext uri="{FF2B5EF4-FFF2-40B4-BE49-F238E27FC236}">
+                <a16:creationId xmlns:a16="http://schemas.microsoft.com/office/drawing/2014/main" id="{E2ECEC74-DE86-E852-65BF-5DD791908F1C}"/>
               </a:ext>
             </a:extLst>
           </p:cNvPr>
@@ -10013,8 +10063,8 @@
         </p:nvSpPr>
         <p:spPr>
           <a:xfrm>
-            <a:off x="9536606" y="1661922"/>
-            <a:ext cx="1688176" cy="357281"/>
+            <a:off x="9497291" y="1442699"/>
+            <a:ext cx="884473" cy="401443"/>
           </a:xfrm>
           <a:prstGeom prst="rect">
             <a:avLst/>
@@ -10044,18 +10094,453 @@
           <a:lstStyle/>
           <a:p>
             <a:r>
-              <a:rPr lang="en-SG" sz="1200" b="1" dirty="0"/>
-              <a:t>Trojan connector start </a:t>
-            </a:r>
-          </a:p>
-        </p:txBody>
-      </p:sp>
-      <p:sp>
-        <p:nvSpPr>
-          <p:cNvPr id="108" name="Rectangle 107">
-            <a:extLst>
-              <a:ext uri="{FF2B5EF4-FFF2-40B4-BE49-F238E27FC236}">
-                <a16:creationId xmlns:a16="http://schemas.microsoft.com/office/drawing/2014/main" id="{1E027EC3-E9D7-4491-C441-AB1AF703FEF5}"/>
+              <a:rPr lang="en-US" sz="1100" b="1" dirty="0"/>
+              <a:t>Trojan connector </a:t>
+            </a:r>
+            <a:endParaRPr lang="en-SG" sz="1100" b="1" dirty="0"/>
+          </a:p>
+        </p:txBody>
+      </p:sp>
+      <p:sp>
+        <p:nvSpPr>
+          <p:cNvPr id="152" name="TextBox 151">
+            <a:extLst>
+              <a:ext uri="{FF2B5EF4-FFF2-40B4-BE49-F238E27FC236}">
+                <a16:creationId xmlns:a16="http://schemas.microsoft.com/office/drawing/2014/main" id="{ADBC44B3-4480-5FCC-1FA6-DE4ECDAE3615}"/>
+              </a:ext>
+            </a:extLst>
+          </p:cNvPr>
+          <p:cNvSpPr txBox="1"/>
+          <p:nvPr/>
+        </p:nvSpPr>
+        <p:spPr>
+          <a:xfrm>
+            <a:off x="346200" y="804306"/>
+            <a:ext cx="2867699" cy="307777"/>
+          </a:xfrm>
+          <a:prstGeom prst="rect">
+            <a:avLst/>
+          </a:prstGeom>
+          <a:noFill/>
+        </p:spPr>
+        <p:txBody>
+          <a:bodyPr wrap="square" rtlCol="0">
+            <a:spAutoFit/>
+          </a:bodyPr>
+          <a:lstStyle/>
+          <a:p>
+            <a:r>
+              <a:rPr lang="en-SG" sz="1400" b="1" dirty="0">
+                <a:solidFill>
+                  <a:schemeClr val="accent6">
+                    <a:lumMod val="50000"/>
+                  </a:schemeClr>
+                </a:solidFill>
+              </a:rPr>
+              <a:t>Victim Machine </a:t>
+            </a:r>
+          </a:p>
+        </p:txBody>
+      </p:sp>
+      <p:sp>
+        <p:nvSpPr>
+          <p:cNvPr id="153" name="TextBox 152">
+            <a:extLst>
+              <a:ext uri="{FF2B5EF4-FFF2-40B4-BE49-F238E27FC236}">
+                <a16:creationId xmlns:a16="http://schemas.microsoft.com/office/drawing/2014/main" id="{923CBE11-6DD5-D23E-D213-157A9104BFEA}"/>
+              </a:ext>
+            </a:extLst>
+          </p:cNvPr>
+          <p:cNvSpPr txBox="1"/>
+          <p:nvPr/>
+        </p:nvSpPr>
+        <p:spPr>
+          <a:xfrm>
+            <a:off x="9183321" y="898039"/>
+            <a:ext cx="2662479" cy="307777"/>
+          </a:xfrm>
+          <a:prstGeom prst="rect">
+            <a:avLst/>
+          </a:prstGeom>
+          <a:noFill/>
+        </p:spPr>
+        <p:txBody>
+          <a:bodyPr wrap="square" rtlCol="0">
+            <a:spAutoFit/>
+          </a:bodyPr>
+          <a:lstStyle/>
+          <a:p>
+            <a:r>
+              <a:rPr lang="en-SG" sz="1400" b="1" dirty="0">
+                <a:solidFill>
+                  <a:srgbClr val="C00000"/>
+                </a:solidFill>
+              </a:rPr>
+              <a:t>Internal Attacker Machine</a:t>
+            </a:r>
+          </a:p>
+        </p:txBody>
+      </p:sp>
+      <p:sp>
+        <p:nvSpPr>
+          <p:cNvPr id="2" name="TextBox 1">
+            <a:extLst>
+              <a:ext uri="{FF2B5EF4-FFF2-40B4-BE49-F238E27FC236}">
+                <a16:creationId xmlns:a16="http://schemas.microsoft.com/office/drawing/2014/main" id="{6346BE8A-4D74-6516-4B79-7E026506F5CC}"/>
+              </a:ext>
+            </a:extLst>
+          </p:cNvPr>
+          <p:cNvSpPr txBox="1"/>
+          <p:nvPr/>
+        </p:nvSpPr>
+        <p:spPr>
+          <a:xfrm>
+            <a:off x="423388" y="310628"/>
+            <a:ext cx="3157606" cy="338554"/>
+          </a:xfrm>
+          <a:prstGeom prst="rect">
+            <a:avLst/>
+          </a:prstGeom>
+          <a:noFill/>
+          <a:ln w="19050">
+            <a:solidFill>
+              <a:schemeClr val="tx1"/>
+            </a:solidFill>
+          </a:ln>
+        </p:spPr>
+        <p:txBody>
+          <a:bodyPr wrap="square" rtlCol="0">
+            <a:spAutoFit/>
+          </a:bodyPr>
+          <a:lstStyle/>
+          <a:p>
+            <a:r>
+              <a:rPr lang="en-SG" sz="1600" b="1" dirty="0"/>
+              <a:t>Backdoor Trojan System Workflow </a:t>
+            </a:r>
+          </a:p>
+        </p:txBody>
+      </p:sp>
+      <p:cxnSp>
+        <p:nvCxnSpPr>
+          <p:cNvPr id="23" name="Connector: Elbow 22">
+            <a:extLst>
+              <a:ext uri="{FF2B5EF4-FFF2-40B4-BE49-F238E27FC236}">
+                <a16:creationId xmlns:a16="http://schemas.microsoft.com/office/drawing/2014/main" id="{D52B3981-3141-5602-02A6-61EFB1F3D8B7}"/>
+              </a:ext>
+            </a:extLst>
+          </p:cNvPr>
+          <p:cNvCxnSpPr>
+            <a:cxnSpLocks/>
+            <a:stCxn id="17" idx="1"/>
+            <a:endCxn id="64" idx="0"/>
+          </p:cNvCxnSpPr>
+          <p:nvPr/>
+        </p:nvCxnSpPr>
+        <p:spPr>
+          <a:xfrm rot="10800000" flipV="1">
+            <a:off x="3604276" y="3211233"/>
+            <a:ext cx="312874" cy="992555"/>
+          </a:xfrm>
+          <a:prstGeom prst="bentConnector2">
+            <a:avLst/>
+          </a:prstGeom>
+          <a:ln>
+            <a:prstDash val="dash"/>
+            <a:tailEnd type="triangle"/>
+          </a:ln>
+        </p:spPr>
+        <p:style>
+          <a:lnRef idx="1">
+            <a:schemeClr val="accent1"/>
+          </a:lnRef>
+          <a:fillRef idx="0">
+            <a:schemeClr val="accent1"/>
+          </a:fillRef>
+          <a:effectRef idx="0">
+            <a:schemeClr val="accent1"/>
+          </a:effectRef>
+          <a:fontRef idx="minor">
+            <a:schemeClr val="tx1"/>
+          </a:fontRef>
+        </p:style>
+      </p:cxnSp>
+      <p:sp>
+        <p:nvSpPr>
+          <p:cNvPr id="34" name="TextBox 33">
+            <a:extLst>
+              <a:ext uri="{FF2B5EF4-FFF2-40B4-BE49-F238E27FC236}">
+                <a16:creationId xmlns:a16="http://schemas.microsoft.com/office/drawing/2014/main" id="{60F12731-A7B3-54C4-7720-36AD1FD2186D}"/>
+              </a:ext>
+            </a:extLst>
+          </p:cNvPr>
+          <p:cNvSpPr txBox="1"/>
+          <p:nvPr/>
+        </p:nvSpPr>
+        <p:spPr>
+          <a:xfrm>
+            <a:off x="3542351" y="3381947"/>
+            <a:ext cx="1530085" cy="646331"/>
+          </a:xfrm>
+          <a:prstGeom prst="rect">
+            <a:avLst/>
+          </a:prstGeom>
+          <a:noFill/>
+        </p:spPr>
+        <p:txBody>
+          <a:bodyPr wrap="square" rtlCol="0">
+            <a:spAutoFit/>
+          </a:bodyPr>
+          <a:lstStyle/>
+          <a:p>
+            <a:r>
+              <a:rPr lang="en-US" sz="1200" dirty="0">
+                <a:solidFill>
+                  <a:srgbClr val="0070C0"/>
+                </a:solidFill>
+              </a:rPr>
+              <a:t>Task execution request from trojan connector </a:t>
+            </a:r>
+            <a:endParaRPr lang="en-SG" sz="1200" dirty="0">
+              <a:solidFill>
+                <a:srgbClr val="0070C0"/>
+              </a:solidFill>
+            </a:endParaRPr>
+          </a:p>
+        </p:txBody>
+      </p:sp>
+      <p:cxnSp>
+        <p:nvCxnSpPr>
+          <p:cNvPr id="35" name="Connector: Elbow 34">
+            <a:extLst>
+              <a:ext uri="{FF2B5EF4-FFF2-40B4-BE49-F238E27FC236}">
+                <a16:creationId xmlns:a16="http://schemas.microsoft.com/office/drawing/2014/main" id="{A6617671-5E5A-D247-4767-BBBB732B09EB}"/>
+              </a:ext>
+            </a:extLst>
+          </p:cNvPr>
+          <p:cNvCxnSpPr>
+            <a:cxnSpLocks/>
+            <a:stCxn id="22" idx="1"/>
+            <a:endCxn id="64" idx="3"/>
+          </p:cNvCxnSpPr>
+          <p:nvPr/>
+        </p:nvCxnSpPr>
+        <p:spPr>
+          <a:xfrm rot="10800000" flipV="1">
+            <a:off x="4105652" y="3743533"/>
+            <a:ext cx="1837123" cy="627244"/>
+          </a:xfrm>
+          <a:prstGeom prst="bentConnector3">
+            <a:avLst>
+              <a:gd name="adj1" fmla="val 50000"/>
+            </a:avLst>
+          </a:prstGeom>
+          <a:ln>
+            <a:prstDash val="dash"/>
+            <a:tailEnd type="triangle"/>
+          </a:ln>
+        </p:spPr>
+        <p:style>
+          <a:lnRef idx="1">
+            <a:schemeClr val="accent1"/>
+          </a:lnRef>
+          <a:fillRef idx="0">
+            <a:schemeClr val="accent1"/>
+          </a:fillRef>
+          <a:effectRef idx="0">
+            <a:schemeClr val="accent1"/>
+          </a:effectRef>
+          <a:fontRef idx="minor">
+            <a:schemeClr val="tx1"/>
+          </a:fontRef>
+        </p:style>
+      </p:cxnSp>
+      <p:sp>
+        <p:nvSpPr>
+          <p:cNvPr id="47" name="TextBox 46">
+            <a:extLst>
+              <a:ext uri="{FF2B5EF4-FFF2-40B4-BE49-F238E27FC236}">
+                <a16:creationId xmlns:a16="http://schemas.microsoft.com/office/drawing/2014/main" id="{841573AC-D44D-9F37-7DB0-500D2903F51C}"/>
+              </a:ext>
+            </a:extLst>
+          </p:cNvPr>
+          <p:cNvSpPr txBox="1"/>
+          <p:nvPr/>
+        </p:nvSpPr>
+        <p:spPr>
+          <a:xfrm>
+            <a:off x="4977320" y="3705112"/>
+            <a:ext cx="1327475" cy="646331"/>
+          </a:xfrm>
+          <a:prstGeom prst="rect">
+            <a:avLst/>
+          </a:prstGeom>
+          <a:noFill/>
+        </p:spPr>
+        <p:txBody>
+          <a:bodyPr wrap="square" rtlCol="0">
+            <a:spAutoFit/>
+          </a:bodyPr>
+          <a:lstStyle/>
+          <a:p>
+            <a:r>
+              <a:rPr lang="en-US" sz="1200" dirty="0">
+                <a:solidFill>
+                  <a:srgbClr val="0070C0"/>
+                </a:solidFill>
+              </a:rPr>
+              <a:t>Task execution request from trojan hub</a:t>
+            </a:r>
+            <a:endParaRPr lang="en-SG" sz="1200" dirty="0">
+              <a:solidFill>
+                <a:srgbClr val="0070C0"/>
+              </a:solidFill>
+            </a:endParaRPr>
+          </a:p>
+        </p:txBody>
+      </p:sp>
+      <p:cxnSp>
+        <p:nvCxnSpPr>
+          <p:cNvPr id="48" name="Connector: Elbow 47">
+            <a:extLst>
+              <a:ext uri="{FF2B5EF4-FFF2-40B4-BE49-F238E27FC236}">
+                <a16:creationId xmlns:a16="http://schemas.microsoft.com/office/drawing/2014/main" id="{B9E05D3A-CC0A-F71F-F277-42FD7DEFCDB2}"/>
+              </a:ext>
+            </a:extLst>
+          </p:cNvPr>
+          <p:cNvCxnSpPr>
+            <a:cxnSpLocks/>
+            <a:stCxn id="30" idx="3"/>
+            <a:endCxn id="17" idx="2"/>
+          </p:cNvCxnSpPr>
+          <p:nvPr/>
+        </p:nvCxnSpPr>
+        <p:spPr>
+          <a:xfrm flipV="1">
+            <a:off x="4517189" y="3446111"/>
+            <a:ext cx="367059" cy="1987990"/>
+          </a:xfrm>
+          <a:prstGeom prst="bentConnector2">
+            <a:avLst/>
+          </a:prstGeom>
+          <a:ln>
+            <a:solidFill>
+              <a:schemeClr val="tx1">
+                <a:lumMod val="95000"/>
+                <a:lumOff val="5000"/>
+              </a:schemeClr>
+            </a:solidFill>
+            <a:prstDash val="dash"/>
+            <a:tailEnd type="triangle"/>
+          </a:ln>
+        </p:spPr>
+        <p:style>
+          <a:lnRef idx="1">
+            <a:schemeClr val="accent1"/>
+          </a:lnRef>
+          <a:fillRef idx="0">
+            <a:schemeClr val="accent1"/>
+          </a:fillRef>
+          <a:effectRef idx="0">
+            <a:schemeClr val="accent1"/>
+          </a:effectRef>
+          <a:fontRef idx="minor">
+            <a:schemeClr val="tx1"/>
+          </a:fontRef>
+        </p:style>
+      </p:cxnSp>
+      <p:cxnSp>
+        <p:nvCxnSpPr>
+          <p:cNvPr id="58" name="Connector: Elbow 57">
+            <a:extLst>
+              <a:ext uri="{FF2B5EF4-FFF2-40B4-BE49-F238E27FC236}">
+                <a16:creationId xmlns:a16="http://schemas.microsoft.com/office/drawing/2014/main" id="{A3D24507-21BB-6CA7-B44B-41C94B4D3C7B}"/>
+              </a:ext>
+            </a:extLst>
+          </p:cNvPr>
+          <p:cNvCxnSpPr>
+            <a:cxnSpLocks/>
+            <a:stCxn id="50" idx="3"/>
+            <a:endCxn id="30" idx="0"/>
+          </p:cNvCxnSpPr>
+          <p:nvPr/>
+        </p:nvCxnSpPr>
+        <p:spPr>
+          <a:xfrm>
+            <a:off x="3713495" y="4870437"/>
+            <a:ext cx="179659" cy="339187"/>
+          </a:xfrm>
+          <a:prstGeom prst="bentConnector2">
+            <a:avLst/>
+          </a:prstGeom>
+          <a:ln>
+            <a:solidFill>
+              <a:schemeClr val="tx1">
+                <a:lumMod val="95000"/>
+                <a:lumOff val="5000"/>
+              </a:schemeClr>
+            </a:solidFill>
+            <a:prstDash val="dash"/>
+            <a:tailEnd type="triangle"/>
+          </a:ln>
+        </p:spPr>
+        <p:style>
+          <a:lnRef idx="1">
+            <a:schemeClr val="accent1"/>
+          </a:lnRef>
+          <a:fillRef idx="0">
+            <a:schemeClr val="accent1"/>
+          </a:fillRef>
+          <a:effectRef idx="0">
+            <a:schemeClr val="accent1"/>
+          </a:effectRef>
+          <a:fontRef idx="minor">
+            <a:schemeClr val="tx1"/>
+          </a:fontRef>
+        </p:style>
+      </p:cxnSp>
+      <p:sp>
+        <p:nvSpPr>
+          <p:cNvPr id="63" name="TextBox 62">
+            <a:extLst>
+              <a:ext uri="{FF2B5EF4-FFF2-40B4-BE49-F238E27FC236}">
+                <a16:creationId xmlns:a16="http://schemas.microsoft.com/office/drawing/2014/main" id="{95FA5AF2-7768-0581-ADE6-ED001CD927D2}"/>
+              </a:ext>
+            </a:extLst>
+          </p:cNvPr>
+          <p:cNvSpPr txBox="1"/>
+          <p:nvPr/>
+        </p:nvSpPr>
+        <p:spPr>
+          <a:xfrm>
+            <a:off x="3734732" y="4664592"/>
+            <a:ext cx="1172621" cy="461665"/>
+          </a:xfrm>
+          <a:prstGeom prst="rect">
+            <a:avLst/>
+          </a:prstGeom>
+          <a:noFill/>
+        </p:spPr>
+        <p:txBody>
+          <a:bodyPr wrap="square" rtlCol="0">
+            <a:spAutoFit/>
+          </a:bodyPr>
+          <a:lstStyle/>
+          <a:p>
+            <a:r>
+              <a:rPr lang="en-US" sz="1200" dirty="0"/>
+              <a:t>Tasks execution result </a:t>
+            </a:r>
+            <a:endParaRPr lang="en-SG" sz="1200" dirty="0"/>
+          </a:p>
+        </p:txBody>
+      </p:sp>
+      <p:sp>
+        <p:nvSpPr>
+          <p:cNvPr id="64" name="Rectangle 63">
+            <a:extLst>
+              <a:ext uri="{FF2B5EF4-FFF2-40B4-BE49-F238E27FC236}">
+                <a16:creationId xmlns:a16="http://schemas.microsoft.com/office/drawing/2014/main" id="{CFC1397C-3BD6-77CB-B1D7-D71667C9DBF9}"/>
               </a:ext>
             </a:extLst>
           </p:cNvPr>
@@ -10064,14 +10549,16 @@
         </p:nvSpPr>
         <p:spPr>
           <a:xfrm>
-            <a:off x="9536607" y="2289437"/>
-            <a:ext cx="940894" cy="357281"/>
+            <a:off x="3102900" y="4203789"/>
+            <a:ext cx="1002751" cy="333975"/>
           </a:xfrm>
           <a:prstGeom prst="rect">
             <a:avLst/>
           </a:prstGeom>
           <a:solidFill>
-            <a:srgbClr val="C00000"/>
+            <a:schemeClr val="accent6">
+              <a:lumMod val="75000"/>
+            </a:schemeClr>
           </a:solidFill>
         </p:spPr>
         <p:style>
@@ -10095,18 +10582,189 @@
           <a:lstStyle/>
           <a:p>
             <a:r>
-              <a:rPr lang="en-SG" sz="1200" b="1" dirty="0"/>
-              <a:t>UDP client start  </a:t>
-            </a:r>
+              <a:rPr lang="en-US" sz="1100" b="1" dirty="0"/>
+              <a:t>Tasks queue manager  </a:t>
+            </a:r>
+            <a:endParaRPr lang="en-SG" sz="1100" b="1" dirty="0"/>
           </a:p>
         </p:txBody>
       </p:sp>
       <p:cxnSp>
         <p:nvCxnSpPr>
-          <p:cNvPr id="109" name="Straight Arrow Connector 108">
-            <a:extLst>
-              <a:ext uri="{FF2B5EF4-FFF2-40B4-BE49-F238E27FC236}">
-                <a16:creationId xmlns:a16="http://schemas.microsoft.com/office/drawing/2014/main" id="{04403C0E-7503-8AA5-535D-5DFAA2A36124}"/>
+          <p:cNvPr id="71" name="Connector: Elbow 70">
+            <a:extLst>
+              <a:ext uri="{FF2B5EF4-FFF2-40B4-BE49-F238E27FC236}">
+                <a16:creationId xmlns:a16="http://schemas.microsoft.com/office/drawing/2014/main" id="{AD3C94A0-385D-7AC8-55B0-40CF92AD8E6E}"/>
+              </a:ext>
+            </a:extLst>
+          </p:cNvPr>
+          <p:cNvCxnSpPr>
+            <a:cxnSpLocks/>
+            <a:stCxn id="64" idx="1"/>
+            <a:endCxn id="50" idx="0"/>
+          </p:cNvCxnSpPr>
+          <p:nvPr/>
+        </p:nvCxnSpPr>
+        <p:spPr>
+          <a:xfrm rot="10800000" flipV="1">
+            <a:off x="2992072" y="4370777"/>
+            <a:ext cx="110829" cy="368190"/>
+          </a:xfrm>
+          <a:prstGeom prst="bentConnector2">
+            <a:avLst/>
+          </a:prstGeom>
+          <a:ln>
+            <a:prstDash val="dash"/>
+            <a:tailEnd type="triangle"/>
+          </a:ln>
+        </p:spPr>
+        <p:style>
+          <a:lnRef idx="1">
+            <a:schemeClr val="accent1"/>
+          </a:lnRef>
+          <a:fillRef idx="0">
+            <a:schemeClr val="accent1"/>
+          </a:fillRef>
+          <a:effectRef idx="0">
+            <a:schemeClr val="accent1"/>
+          </a:effectRef>
+          <a:fontRef idx="minor">
+            <a:schemeClr val="tx1"/>
+          </a:fontRef>
+        </p:style>
+      </p:cxnSp>
+      <p:pic>
+        <p:nvPicPr>
+          <p:cNvPr id="113" name="Picture 112">
+            <a:extLst>
+              <a:ext uri="{FF2B5EF4-FFF2-40B4-BE49-F238E27FC236}">
+                <a16:creationId xmlns:a16="http://schemas.microsoft.com/office/drawing/2014/main" id="{9877DE1B-7469-2547-4F76-41FE489DCA6D}"/>
+              </a:ext>
+            </a:extLst>
+          </p:cNvPr>
+          <p:cNvPicPr>
+            <a:picLocks noChangeAspect="1"/>
+          </p:cNvPicPr>
+          <p:nvPr/>
+        </p:nvPicPr>
+        <p:blipFill>
+          <a:blip r:embed="rId3"/>
+          <a:stretch>
+            <a:fillRect/>
+          </a:stretch>
+        </p:blipFill>
+        <p:spPr>
+          <a:xfrm>
+            <a:off x="2269148" y="3602364"/>
+            <a:ext cx="361275" cy="396956"/>
+          </a:xfrm>
+          <a:prstGeom prst="rect">
+            <a:avLst/>
+          </a:prstGeom>
+        </p:spPr>
+      </p:pic>
+      <p:pic>
+        <p:nvPicPr>
+          <p:cNvPr id="114" name="Picture 113">
+            <a:extLst>
+              <a:ext uri="{FF2B5EF4-FFF2-40B4-BE49-F238E27FC236}">
+                <a16:creationId xmlns:a16="http://schemas.microsoft.com/office/drawing/2014/main" id="{4FD98F82-4ABA-38D0-2FA9-02A4651637B5}"/>
+              </a:ext>
+            </a:extLst>
+          </p:cNvPr>
+          <p:cNvPicPr>
+            <a:picLocks noChangeAspect="1"/>
+          </p:cNvPicPr>
+          <p:nvPr/>
+        </p:nvPicPr>
+        <p:blipFill>
+          <a:blip r:embed="rId3"/>
+          <a:stretch>
+            <a:fillRect/>
+          </a:stretch>
+        </p:blipFill>
+        <p:spPr>
+          <a:xfrm>
+            <a:off x="2421549" y="3754764"/>
+            <a:ext cx="342978" cy="396956"/>
+          </a:xfrm>
+          <a:prstGeom prst="rect">
+            <a:avLst/>
+          </a:prstGeom>
+        </p:spPr>
+      </p:pic>
+      <p:pic>
+        <p:nvPicPr>
+          <p:cNvPr id="115" name="Picture 114">
+            <a:extLst>
+              <a:ext uri="{FF2B5EF4-FFF2-40B4-BE49-F238E27FC236}">
+                <a16:creationId xmlns:a16="http://schemas.microsoft.com/office/drawing/2014/main" id="{FEEBF769-E3DB-2AB0-9B66-3CEDD6ACDE4A}"/>
+              </a:ext>
+            </a:extLst>
+          </p:cNvPr>
+          <p:cNvPicPr>
+            <a:picLocks noChangeAspect="1"/>
+          </p:cNvPicPr>
+          <p:nvPr/>
+        </p:nvPicPr>
+        <p:blipFill>
+          <a:blip r:embed="rId3"/>
+          <a:stretch>
+            <a:fillRect/>
+          </a:stretch>
+        </p:blipFill>
+        <p:spPr>
+          <a:xfrm>
+            <a:off x="2558347" y="3909817"/>
+            <a:ext cx="361275" cy="396956"/>
+          </a:xfrm>
+          <a:prstGeom prst="rect">
+            <a:avLst/>
+          </a:prstGeom>
+        </p:spPr>
+      </p:pic>
+      <p:sp>
+        <p:nvSpPr>
+          <p:cNvPr id="121" name="TextBox 120">
+            <a:extLst>
+              <a:ext uri="{FF2B5EF4-FFF2-40B4-BE49-F238E27FC236}">
+                <a16:creationId xmlns:a16="http://schemas.microsoft.com/office/drawing/2014/main" id="{11316F09-07F8-FDCC-2082-F24E729191C4}"/>
+              </a:ext>
+            </a:extLst>
+          </p:cNvPr>
+          <p:cNvSpPr txBox="1"/>
+          <p:nvPr/>
+        </p:nvSpPr>
+        <p:spPr>
+          <a:xfrm>
+            <a:off x="2720890" y="3350354"/>
+            <a:ext cx="721485" cy="600164"/>
+          </a:xfrm>
+          <a:prstGeom prst="rect">
+            <a:avLst/>
+          </a:prstGeom>
+          <a:noFill/>
+        </p:spPr>
+        <p:txBody>
+          <a:bodyPr wrap="square" rtlCol="0">
+            <a:spAutoFit/>
+          </a:bodyPr>
+          <a:lstStyle/>
+          <a:p>
+            <a:r>
+              <a:rPr lang="en-US" sz="1100" dirty="0"/>
+              <a:t>Harmful function API set </a:t>
+            </a:r>
+            <a:endParaRPr lang="en-SG" sz="1100" dirty="0"/>
+          </a:p>
+        </p:txBody>
+      </p:sp>
+      <p:cxnSp>
+        <p:nvCxnSpPr>
+          <p:cNvPr id="129" name="Straight Connector 128">
+            <a:extLst>
+              <a:ext uri="{FF2B5EF4-FFF2-40B4-BE49-F238E27FC236}">
+                <a16:creationId xmlns:a16="http://schemas.microsoft.com/office/drawing/2014/main" id="{101E0F44-26D4-860F-68FF-B71FBCB11FA2}"/>
               </a:ext>
             </a:extLst>
           </p:cNvPr>
@@ -10117,13 +10775,65 @@
         </p:nvCxnSpPr>
         <p:spPr>
           <a:xfrm>
-            <a:off x="10048480" y="2025796"/>
-            <a:ext cx="1" cy="250456"/>
-          </a:xfrm>
-          <a:prstGeom prst="straightConnector1">
-            <a:avLst/>
-          </a:prstGeom>
-          <a:ln>
+            <a:off x="1700881" y="1206752"/>
+            <a:ext cx="0" cy="4945886"/>
+          </a:xfrm>
+          <a:prstGeom prst="line">
+            <a:avLst/>
+          </a:prstGeom>
+          <a:ln w="19050">
+            <a:solidFill>
+              <a:schemeClr val="bg1">
+                <a:lumMod val="65000"/>
+              </a:schemeClr>
+            </a:solidFill>
+            <a:prstDash val="sysDash"/>
+          </a:ln>
+        </p:spPr>
+        <p:style>
+          <a:lnRef idx="1">
+            <a:schemeClr val="accent1"/>
+          </a:lnRef>
+          <a:fillRef idx="0">
+            <a:schemeClr val="accent1"/>
+          </a:fillRef>
+          <a:effectRef idx="0">
+            <a:schemeClr val="accent1"/>
+          </a:effectRef>
+          <a:fontRef idx="minor">
+            <a:schemeClr val="tx1"/>
+          </a:fontRef>
+        </p:style>
+      </p:cxnSp>
+      <p:cxnSp>
+        <p:nvCxnSpPr>
+          <p:cNvPr id="158" name="Connector: Elbow 157">
+            <a:extLst>
+              <a:ext uri="{FF2B5EF4-FFF2-40B4-BE49-F238E27FC236}">
+                <a16:creationId xmlns:a16="http://schemas.microsoft.com/office/drawing/2014/main" id="{706D025C-F33D-3ACA-1695-27E7886DEFB5}"/>
+              </a:ext>
+            </a:extLst>
+          </p:cNvPr>
+          <p:cNvCxnSpPr>
+            <a:cxnSpLocks/>
+            <a:stCxn id="4" idx="1"/>
+            <a:endCxn id="161" idx="0"/>
+          </p:cNvCxnSpPr>
+          <p:nvPr/>
+        </p:nvCxnSpPr>
+        <p:spPr>
+          <a:xfrm rot="10800000" flipV="1">
+            <a:off x="1002990" y="1617196"/>
+            <a:ext cx="1267657" cy="2262958"/>
+          </a:xfrm>
+          <a:prstGeom prst="bentConnector2">
+            <a:avLst/>
+          </a:prstGeom>
+          <a:ln w="19050">
+            <a:solidFill>
+              <a:srgbClr val="7030A0"/>
+            </a:solidFill>
+            <a:prstDash val="sysDash"/>
             <a:tailEnd type="triangle"/>
           </a:ln>
         </p:spPr>
@@ -10144,45 +10854,114 @@
       </p:cxnSp>
       <p:sp>
         <p:nvSpPr>
-          <p:cNvPr id="124" name="TextBox 123">
-            <a:extLst>
-              <a:ext uri="{FF2B5EF4-FFF2-40B4-BE49-F238E27FC236}">
-                <a16:creationId xmlns:a16="http://schemas.microsoft.com/office/drawing/2014/main" id="{985F0448-3E3B-6091-6064-DE566D776F97}"/>
-              </a:ext>
-            </a:extLst>
-          </p:cNvPr>
-          <p:cNvSpPr txBox="1"/>
-          <p:nvPr/>
-        </p:nvSpPr>
-        <p:spPr>
-          <a:xfrm>
-            <a:off x="8229934" y="2073794"/>
-            <a:ext cx="1197336" cy="646331"/>
-          </a:xfrm>
-          <a:prstGeom prst="rect">
-            <a:avLst/>
-          </a:prstGeom>
-          <a:noFill/>
-        </p:spPr>
-        <p:txBody>
-          <a:bodyPr wrap="square" rtlCol="0">
-            <a:spAutoFit/>
-          </a:bodyPr>
-          <a:lstStyle/>
-          <a:p>
-            <a:r>
-              <a:rPr lang="en-SG" sz="1200" b="1" dirty="0"/>
-              <a:t>Send trojan active code and receiver IP</a:t>
-            </a:r>
+          <p:cNvPr id="161" name="Rectangle 160">
+            <a:extLst>
+              <a:ext uri="{FF2B5EF4-FFF2-40B4-BE49-F238E27FC236}">
+                <a16:creationId xmlns:a16="http://schemas.microsoft.com/office/drawing/2014/main" id="{A0DE2197-DA26-9FB5-B18A-5855F2121B6F}"/>
+              </a:ext>
+            </a:extLst>
+          </p:cNvPr>
+          <p:cNvSpPr/>
+          <p:nvPr/>
+        </p:nvSpPr>
+        <p:spPr>
+          <a:xfrm>
+            <a:off x="568606" y="3880154"/>
+            <a:ext cx="868765" cy="361061"/>
+          </a:xfrm>
+          <a:prstGeom prst="rect">
+            <a:avLst/>
+          </a:prstGeom>
+          <a:solidFill>
+            <a:srgbClr val="7030A0"/>
+          </a:solidFill>
+        </p:spPr>
+        <p:style>
+          <a:lnRef idx="2">
+            <a:schemeClr val="accent1">
+              <a:shade val="50000"/>
+            </a:schemeClr>
+          </a:lnRef>
+          <a:fillRef idx="1">
+            <a:schemeClr val="accent1"/>
+          </a:fillRef>
+          <a:effectRef idx="0">
+            <a:schemeClr val="accent1"/>
+          </a:effectRef>
+          <a:fontRef idx="minor">
+            <a:schemeClr val="lt1"/>
+          </a:fontRef>
+        </p:style>
+        <p:txBody>
+          <a:bodyPr rtlCol="0" anchor="ctr"/>
+          <a:lstStyle/>
+          <a:p>
+            <a:r>
+              <a:rPr lang="en-US" sz="1100" b="1" dirty="0"/>
+              <a:t>Process Watchdog</a:t>
+            </a:r>
+            <a:endParaRPr lang="en-SG" sz="1100" b="1" dirty="0"/>
+          </a:p>
+        </p:txBody>
+      </p:sp>
+      <p:sp>
+        <p:nvSpPr>
+          <p:cNvPr id="164" name="Rectangle 163">
+            <a:extLst>
+              <a:ext uri="{FF2B5EF4-FFF2-40B4-BE49-F238E27FC236}">
+                <a16:creationId xmlns:a16="http://schemas.microsoft.com/office/drawing/2014/main" id="{7139A361-2C2B-DD11-B75C-39A08C86273F}"/>
+              </a:ext>
+            </a:extLst>
+          </p:cNvPr>
+          <p:cNvSpPr/>
+          <p:nvPr/>
+        </p:nvSpPr>
+        <p:spPr>
+          <a:xfrm>
+            <a:off x="567033" y="5153332"/>
+            <a:ext cx="870494" cy="534116"/>
+          </a:xfrm>
+          <a:prstGeom prst="rect">
+            <a:avLst/>
+          </a:prstGeom>
+          <a:solidFill>
+            <a:srgbClr val="7030A0"/>
+          </a:solidFill>
+        </p:spPr>
+        <p:style>
+          <a:lnRef idx="2">
+            <a:schemeClr val="accent1">
+              <a:shade val="50000"/>
+            </a:schemeClr>
+          </a:lnRef>
+          <a:fillRef idx="1">
+            <a:schemeClr val="accent1"/>
+          </a:fillRef>
+          <a:effectRef idx="0">
+            <a:schemeClr val="accent1"/>
+          </a:effectRef>
+          <a:fontRef idx="minor">
+            <a:schemeClr val="lt1"/>
+          </a:fontRef>
+        </p:style>
+        <p:txBody>
+          <a:bodyPr rtlCol="0" anchor="ctr"/>
+          <a:lstStyle/>
+          <a:p>
+            <a:r>
+              <a:rPr lang="en-US" sz="1100" b="1" dirty="0"/>
+              <a:t>Process protection loop</a:t>
+            </a:r>
+            <a:endParaRPr lang="en-SG" sz="1100" b="1" dirty="0"/>
           </a:p>
         </p:txBody>
       </p:sp>
       <p:cxnSp>
         <p:nvCxnSpPr>
-          <p:cNvPr id="125" name="Straight Arrow Connector 124">
-            <a:extLst>
-              <a:ext uri="{FF2B5EF4-FFF2-40B4-BE49-F238E27FC236}">
-                <a16:creationId xmlns:a16="http://schemas.microsoft.com/office/drawing/2014/main" id="{69917F37-1F21-9610-3409-13B291E534E4}"/>
+          <p:cNvPr id="166" name="Straight Arrow Connector 165">
+            <a:extLst>
+              <a:ext uri="{FF2B5EF4-FFF2-40B4-BE49-F238E27FC236}">
+                <a16:creationId xmlns:a16="http://schemas.microsoft.com/office/drawing/2014/main" id="{D021293F-F398-87E6-BD51-116C915C7494}"/>
               </a:ext>
             </a:extLst>
           </p:cNvPr>
@@ -10192,11 +10971,112 @@
           <p:nvPr/>
         </p:nvCxnSpPr>
         <p:spPr>
-          <a:xfrm>
-            <a:off x="10007052" y="2646718"/>
-            <a:ext cx="1" cy="250456"/>
+          <a:xfrm flipH="1">
+            <a:off x="973533" y="4241215"/>
+            <a:ext cx="709" cy="912117"/>
           </a:xfrm>
           <a:prstGeom prst="straightConnector1">
+            <a:avLst/>
+          </a:prstGeom>
+          <a:ln>
+            <a:solidFill>
+              <a:schemeClr val="accent6">
+                <a:lumMod val="50000"/>
+              </a:schemeClr>
+            </a:solidFill>
+            <a:tailEnd type="triangle"/>
+          </a:ln>
+        </p:spPr>
+        <p:style>
+          <a:lnRef idx="1">
+            <a:schemeClr val="accent1"/>
+          </a:lnRef>
+          <a:fillRef idx="0">
+            <a:schemeClr val="accent1"/>
+          </a:fillRef>
+          <a:effectRef idx="0">
+            <a:schemeClr val="accent1"/>
+          </a:effectRef>
+          <a:fontRef idx="minor">
+            <a:schemeClr val="tx1"/>
+          </a:fontRef>
+        </p:style>
+      </p:cxnSp>
+      <p:sp>
+        <p:nvSpPr>
+          <p:cNvPr id="170" name="Rectangle 169">
+            <a:extLst>
+              <a:ext uri="{FF2B5EF4-FFF2-40B4-BE49-F238E27FC236}">
+                <a16:creationId xmlns:a16="http://schemas.microsoft.com/office/drawing/2014/main" id="{B820F933-46F9-EEF8-209D-53BD75A73B19}"/>
+              </a:ext>
+            </a:extLst>
+          </p:cNvPr>
+          <p:cNvSpPr/>
+          <p:nvPr/>
+        </p:nvSpPr>
+        <p:spPr>
+          <a:xfrm>
+            <a:off x="1804992" y="5258777"/>
+            <a:ext cx="868765" cy="323227"/>
+          </a:xfrm>
+          <a:prstGeom prst="rect">
+            <a:avLst/>
+          </a:prstGeom>
+          <a:solidFill>
+            <a:schemeClr val="accent6">
+              <a:lumMod val="75000"/>
+            </a:schemeClr>
+          </a:solidFill>
+        </p:spPr>
+        <p:style>
+          <a:lnRef idx="2">
+            <a:schemeClr val="accent1">
+              <a:shade val="50000"/>
+            </a:schemeClr>
+          </a:lnRef>
+          <a:fillRef idx="1">
+            <a:schemeClr val="accent1"/>
+          </a:fillRef>
+          <a:effectRef idx="0">
+            <a:schemeClr val="accent1"/>
+          </a:effectRef>
+          <a:fontRef idx="minor">
+            <a:schemeClr val="lt1"/>
+          </a:fontRef>
+        </p:style>
+        <p:txBody>
+          <a:bodyPr rtlCol="0" anchor="ctr"/>
+          <a:lstStyle/>
+          <a:p>
+            <a:r>
+              <a:rPr lang="en-US" sz="1100" b="1" dirty="0"/>
+              <a:t>Process Watchdog</a:t>
+            </a:r>
+            <a:endParaRPr lang="en-SG" sz="1100" b="1" dirty="0"/>
+          </a:p>
+        </p:txBody>
+      </p:sp>
+      <p:cxnSp>
+        <p:nvCxnSpPr>
+          <p:cNvPr id="171" name="Connector: Elbow 170">
+            <a:extLst>
+              <a:ext uri="{FF2B5EF4-FFF2-40B4-BE49-F238E27FC236}">
+                <a16:creationId xmlns:a16="http://schemas.microsoft.com/office/drawing/2014/main" id="{13DB6B99-192B-BC37-2874-089E3BF20339}"/>
+              </a:ext>
+            </a:extLst>
+          </p:cNvPr>
+          <p:cNvCxnSpPr>
+            <a:cxnSpLocks/>
+            <a:stCxn id="10" idx="1"/>
+          </p:cNvCxnSpPr>
+          <p:nvPr/>
+        </p:nvCxnSpPr>
+        <p:spPr>
+          <a:xfrm rot="10800000" flipV="1">
+            <a:off x="2067270" y="1982642"/>
+            <a:ext cx="656731" cy="3258162"/>
+          </a:xfrm>
+          <a:prstGeom prst="bentConnector2">
             <a:avLst/>
           </a:prstGeom>
           <a:ln>
@@ -10220,10 +11100,10 @@
       </p:cxnSp>
       <p:sp>
         <p:nvSpPr>
-          <p:cNvPr id="126" name="Rectangle 125">
-            <a:extLst>
-              <a:ext uri="{FF2B5EF4-FFF2-40B4-BE49-F238E27FC236}">
-                <a16:creationId xmlns:a16="http://schemas.microsoft.com/office/drawing/2014/main" id="{26D34FE6-AEE7-C327-5EDC-4A3FF4C96691}"/>
+          <p:cNvPr id="181" name="Rectangle 180">
+            <a:extLst>
+              <a:ext uri="{FF2B5EF4-FFF2-40B4-BE49-F238E27FC236}">
+                <a16:creationId xmlns:a16="http://schemas.microsoft.com/office/drawing/2014/main" id="{8BD0F3B7-705F-7229-398C-F099009DFB90}"/>
               </a:ext>
             </a:extLst>
           </p:cNvPr>
@@ -10232,14 +11112,16 @@
         </p:nvSpPr>
         <p:spPr>
           <a:xfrm>
-            <a:off x="9305374" y="2936138"/>
-            <a:ext cx="1075320" cy="357281"/>
+            <a:off x="1792799" y="5811111"/>
+            <a:ext cx="1788195" cy="267058"/>
           </a:xfrm>
           <a:prstGeom prst="rect">
             <a:avLst/>
           </a:prstGeom>
           <a:solidFill>
-            <a:srgbClr val="C00000"/>
+            <a:schemeClr val="accent6">
+              <a:lumMod val="75000"/>
+            </a:schemeClr>
           </a:solidFill>
         </p:spPr>
         <p:style>
@@ -10263,363 +11145,53 @@
           <a:lstStyle/>
           <a:p>
             <a:r>
-              <a:rPr lang="en-SG" sz="1200" b="1" dirty="0"/>
-              <a:t>Confirm trojan active</a:t>
-            </a:r>
-          </a:p>
-        </p:txBody>
-      </p:sp>
-      <p:sp>
-        <p:nvSpPr>
-          <p:cNvPr id="127" name="TextBox 126">
-            <a:extLst>
-              <a:ext uri="{FF2B5EF4-FFF2-40B4-BE49-F238E27FC236}">
-                <a16:creationId xmlns:a16="http://schemas.microsoft.com/office/drawing/2014/main" id="{BBB2F236-8819-B9A6-7787-6377364B2CB1}"/>
-              </a:ext>
-            </a:extLst>
-          </p:cNvPr>
-          <p:cNvSpPr txBox="1"/>
-          <p:nvPr/>
-        </p:nvSpPr>
-        <p:spPr>
-          <a:xfrm>
-            <a:off x="10038955" y="2002742"/>
-            <a:ext cx="1023748" cy="276999"/>
-          </a:xfrm>
-          <a:prstGeom prst="rect">
-            <a:avLst/>
-          </a:prstGeom>
-          <a:noFill/>
-        </p:spPr>
-        <p:txBody>
-          <a:bodyPr wrap="square" rtlCol="0">
-            <a:spAutoFit/>
-          </a:bodyPr>
-          <a:lstStyle/>
-          <a:p>
-            <a:r>
-              <a:rPr lang="en-SG" sz="1200" b="1" dirty="0">
-                <a:solidFill>
-                  <a:srgbClr val="C00000"/>
-                </a:solidFill>
-              </a:rPr>
-              <a:t>Main thread</a:t>
-            </a:r>
+              <a:rPr lang="en-US" sz="1100" b="1" dirty="0"/>
+              <a:t>Process protection loop</a:t>
+            </a:r>
+            <a:endParaRPr lang="en-SG" sz="1100" b="1" dirty="0"/>
           </a:p>
         </p:txBody>
       </p:sp>
       <p:cxnSp>
         <p:nvCxnSpPr>
-          <p:cNvPr id="128" name="Straight Arrow Connector 127">
-            <a:extLst>
-              <a:ext uri="{FF2B5EF4-FFF2-40B4-BE49-F238E27FC236}">
-                <a16:creationId xmlns:a16="http://schemas.microsoft.com/office/drawing/2014/main" id="{AD329A83-C202-69DC-49A8-AB492A53C1C4}"/>
+          <p:cNvPr id="182" name="Straight Arrow Connector 181">
+            <a:extLst>
+              <a:ext uri="{FF2B5EF4-FFF2-40B4-BE49-F238E27FC236}">
+                <a16:creationId xmlns:a16="http://schemas.microsoft.com/office/drawing/2014/main" id="{D46A0065-04AA-67C5-296B-25F9B7E24DB0}"/>
               </a:ext>
             </a:extLst>
           </p:cNvPr>
           <p:cNvCxnSpPr>
             <a:cxnSpLocks/>
+            <a:stCxn id="164" idx="3"/>
+            <a:endCxn id="170" idx="1"/>
           </p:cNvCxnSpPr>
           <p:nvPr/>
         </p:nvCxnSpPr>
         <p:spPr>
           <a:xfrm>
-            <a:off x="9825868" y="3314126"/>
-            <a:ext cx="0" cy="731139"/>
+            <a:off x="1437527" y="5420390"/>
+            <a:ext cx="367465" cy="1"/>
           </a:xfrm>
           <a:prstGeom prst="straightConnector1">
             <a:avLst/>
           </a:prstGeom>
           <a:ln>
+            <a:solidFill>
+              <a:srgbClr val="7030A0"/>
+            </a:solidFill>
             <a:tailEnd type="triangle"/>
           </a:ln>
         </p:spPr>
         <p:style>
           <a:lnRef idx="1">
-            <a:schemeClr val="dk1"/>
+            <a:schemeClr val="accent1"/>
           </a:lnRef>
           <a:fillRef idx="0">
-            <a:schemeClr val="dk1"/>
+            <a:schemeClr val="accent1"/>
           </a:fillRef>
           <a:effectRef idx="0">
-            <a:schemeClr val="dk1"/>
-          </a:effectRef>
-          <a:fontRef idx="minor">
-            <a:schemeClr val="tx1"/>
-          </a:fontRef>
-        </p:style>
-      </p:cxnSp>
-      <p:sp>
-        <p:nvSpPr>
-          <p:cNvPr id="130" name="Rectangle 129">
-            <a:extLst>
-              <a:ext uri="{FF2B5EF4-FFF2-40B4-BE49-F238E27FC236}">
-                <a16:creationId xmlns:a16="http://schemas.microsoft.com/office/drawing/2014/main" id="{008CD6B0-C6E9-CC38-B304-C9588CB098AF}"/>
-              </a:ext>
-            </a:extLst>
-          </p:cNvPr>
-          <p:cNvSpPr/>
-          <p:nvPr/>
-        </p:nvSpPr>
-        <p:spPr>
-          <a:xfrm>
-            <a:off x="9285535" y="4070947"/>
-            <a:ext cx="1075320" cy="357281"/>
-          </a:xfrm>
-          <a:prstGeom prst="rect">
-            <a:avLst/>
-          </a:prstGeom>
-          <a:solidFill>
-            <a:srgbClr val="C00000"/>
-          </a:solidFill>
-        </p:spPr>
-        <p:style>
-          <a:lnRef idx="2">
-            <a:schemeClr val="accent1">
-              <a:shade val="50000"/>
-            </a:schemeClr>
-          </a:lnRef>
-          <a:fillRef idx="1">
-            <a:schemeClr val="accent1"/>
-          </a:fillRef>
-          <a:effectRef idx="0">
-            <a:schemeClr val="accent1"/>
-          </a:effectRef>
-          <a:fontRef idx="minor">
-            <a:schemeClr val="lt1"/>
-          </a:fontRef>
-        </p:style>
-        <p:txBody>
-          <a:bodyPr rtlCol="0" anchor="ctr"/>
-          <a:lstStyle/>
-          <a:p>
-            <a:r>
-              <a:rPr lang="en-SG" sz="1200" b="1" dirty="0"/>
-              <a:t>User trojan’s function </a:t>
-            </a:r>
-          </a:p>
-        </p:txBody>
-      </p:sp>
-      <p:sp>
-        <p:nvSpPr>
-          <p:cNvPr id="135" name="Rectangle 134">
-            <a:extLst>
-              <a:ext uri="{FF2B5EF4-FFF2-40B4-BE49-F238E27FC236}">
-                <a16:creationId xmlns:a16="http://schemas.microsoft.com/office/drawing/2014/main" id="{E2ECEC74-DE86-E852-65BF-5DD791908F1C}"/>
-              </a:ext>
-            </a:extLst>
-          </p:cNvPr>
-          <p:cNvSpPr/>
-          <p:nvPr/>
-        </p:nvSpPr>
-        <p:spPr>
-          <a:xfrm>
-            <a:off x="10839522" y="3712749"/>
-            <a:ext cx="1190547" cy="495144"/>
-          </a:xfrm>
-          <a:prstGeom prst="rect">
-            <a:avLst/>
-          </a:prstGeom>
-          <a:solidFill>
-            <a:srgbClr val="C00000"/>
-          </a:solidFill>
-        </p:spPr>
-        <p:style>
-          <a:lnRef idx="2">
-            <a:schemeClr val="accent1">
-              <a:shade val="50000"/>
-            </a:schemeClr>
-          </a:lnRef>
-          <a:fillRef idx="1">
-            <a:schemeClr val="accent1"/>
-          </a:fillRef>
-          <a:effectRef idx="0">
-            <a:schemeClr val="accent1"/>
-          </a:effectRef>
-          <a:fontRef idx="minor">
-            <a:schemeClr val="lt1"/>
-          </a:fontRef>
-        </p:style>
-        <p:txBody>
-          <a:bodyPr rtlCol="0" anchor="ctr"/>
-          <a:lstStyle/>
-          <a:p>
-            <a:r>
-              <a:rPr lang="en-SG" sz="1200" b="1" dirty="0"/>
-              <a:t>Start the action receiver </a:t>
-            </a:r>
-          </a:p>
-        </p:txBody>
-      </p:sp>
-      <p:cxnSp>
-        <p:nvCxnSpPr>
-          <p:cNvPr id="136" name="Connector: Elbow 135">
-            <a:extLst>
-              <a:ext uri="{FF2B5EF4-FFF2-40B4-BE49-F238E27FC236}">
-                <a16:creationId xmlns:a16="http://schemas.microsoft.com/office/drawing/2014/main" id="{E993C394-FC9E-D0F9-0317-DC658B33D536}"/>
-              </a:ext>
-            </a:extLst>
-          </p:cNvPr>
-          <p:cNvCxnSpPr>
-            <a:cxnSpLocks/>
-            <a:stCxn id="108" idx="3"/>
-            <a:endCxn id="135" idx="0"/>
-          </p:cNvCxnSpPr>
-          <p:nvPr/>
-        </p:nvCxnSpPr>
-        <p:spPr>
-          <a:xfrm>
-            <a:off x="10477501" y="2468078"/>
-            <a:ext cx="957295" cy="1244671"/>
-          </a:xfrm>
-          <a:prstGeom prst="bentConnector2">
-            <a:avLst/>
-          </a:prstGeom>
-          <a:ln>
-            <a:tailEnd type="triangle"/>
-          </a:ln>
-        </p:spPr>
-        <p:style>
-          <a:lnRef idx="1">
-            <a:schemeClr val="dk1"/>
-          </a:lnRef>
-          <a:fillRef idx="0">
-            <a:schemeClr val="dk1"/>
-          </a:fillRef>
-          <a:effectRef idx="0">
-            <a:schemeClr val="dk1"/>
-          </a:effectRef>
-          <a:fontRef idx="minor">
-            <a:schemeClr val="tx1"/>
-          </a:fontRef>
-        </p:style>
-      </p:cxnSp>
-      <p:sp>
-        <p:nvSpPr>
-          <p:cNvPr id="140" name="TextBox 139">
-            <a:extLst>
-              <a:ext uri="{FF2B5EF4-FFF2-40B4-BE49-F238E27FC236}">
-                <a16:creationId xmlns:a16="http://schemas.microsoft.com/office/drawing/2014/main" id="{F88EDA49-D500-932C-3381-EE090036D4C6}"/>
-              </a:ext>
-            </a:extLst>
-          </p:cNvPr>
-          <p:cNvSpPr txBox="1"/>
-          <p:nvPr/>
-        </p:nvSpPr>
-        <p:spPr>
-          <a:xfrm>
-            <a:off x="10766763" y="2803942"/>
-            <a:ext cx="1867063" cy="646331"/>
-          </a:xfrm>
-          <a:prstGeom prst="rect">
-            <a:avLst/>
-          </a:prstGeom>
-          <a:noFill/>
-        </p:spPr>
-        <p:txBody>
-          <a:bodyPr wrap="square" rtlCol="0">
-            <a:spAutoFit/>
-          </a:bodyPr>
-          <a:lstStyle/>
-          <a:p>
-            <a:r>
-              <a:rPr lang="en-SG" sz="1200" b="1" dirty="0">
-                <a:solidFill>
-                  <a:srgbClr val="C00000"/>
-                </a:solidFill>
-              </a:rPr>
-              <a:t>Sub thread or new process or can be different machine </a:t>
-            </a:r>
-          </a:p>
-        </p:txBody>
-      </p:sp>
-      <p:sp>
-        <p:nvSpPr>
-          <p:cNvPr id="141" name="Rectangle 140">
-            <a:extLst>
-              <a:ext uri="{FF2B5EF4-FFF2-40B4-BE49-F238E27FC236}">
-                <a16:creationId xmlns:a16="http://schemas.microsoft.com/office/drawing/2014/main" id="{68496A39-00C0-1875-6546-0A283F36F79C}"/>
-              </a:ext>
-            </a:extLst>
-          </p:cNvPr>
-          <p:cNvSpPr/>
-          <p:nvPr/>
-        </p:nvSpPr>
-        <p:spPr>
-          <a:xfrm>
-            <a:off x="10839522" y="4854729"/>
-            <a:ext cx="1190547" cy="495144"/>
-          </a:xfrm>
-          <a:prstGeom prst="rect">
-            <a:avLst/>
-          </a:prstGeom>
-          <a:solidFill>
-            <a:srgbClr val="C00000"/>
-          </a:solidFill>
-        </p:spPr>
-        <p:style>
-          <a:lnRef idx="2">
-            <a:schemeClr val="accent1">
-              <a:shade val="50000"/>
-            </a:schemeClr>
-          </a:lnRef>
-          <a:fillRef idx="1">
-            <a:schemeClr val="accent1"/>
-          </a:fillRef>
-          <a:effectRef idx="0">
-            <a:schemeClr val="accent1"/>
-          </a:effectRef>
-          <a:fontRef idx="minor">
-            <a:schemeClr val="lt1"/>
-          </a:fontRef>
-        </p:style>
-        <p:txBody>
-          <a:bodyPr rtlCol="0" anchor="ctr"/>
-          <a:lstStyle/>
-          <a:p>
-            <a:r>
-              <a:rPr lang="en-SG" sz="1200" b="1" dirty="0"/>
-              <a:t>Data receive loop</a:t>
-            </a:r>
-          </a:p>
-        </p:txBody>
-      </p:sp>
-      <p:cxnSp>
-        <p:nvCxnSpPr>
-          <p:cNvPr id="142" name="Straight Arrow Connector 141">
-            <a:extLst>
-              <a:ext uri="{FF2B5EF4-FFF2-40B4-BE49-F238E27FC236}">
-                <a16:creationId xmlns:a16="http://schemas.microsoft.com/office/drawing/2014/main" id="{598D3660-7802-3246-17F9-9FAE92E4E3F2}"/>
-              </a:ext>
-            </a:extLst>
-          </p:cNvPr>
-          <p:cNvCxnSpPr>
-            <a:cxnSpLocks/>
-            <a:endCxn id="141" idx="0"/>
-          </p:cNvCxnSpPr>
-          <p:nvPr/>
-        </p:nvCxnSpPr>
-        <p:spPr>
-          <a:xfrm flipH="1">
-            <a:off x="11434796" y="4207893"/>
-            <a:ext cx="15117" cy="646836"/>
-          </a:xfrm>
-          <a:prstGeom prst="straightConnector1">
-            <a:avLst/>
-          </a:prstGeom>
-          <a:ln>
-            <a:tailEnd type="triangle"/>
-          </a:ln>
-        </p:spPr>
-        <p:style>
-          <a:lnRef idx="1">
-            <a:schemeClr val="dk1"/>
-          </a:lnRef>
-          <a:fillRef idx="0">
-            <a:schemeClr val="dk1"/>
-          </a:fillRef>
-          <a:effectRef idx="0">
-            <a:schemeClr val="dk1"/>
+            <a:schemeClr val="accent1"/>
           </a:effectRef>
           <a:fontRef idx="minor">
             <a:schemeClr val="tx1"/>
@@ -10628,34 +11200,33 @@
       </p:cxnSp>
       <p:cxnSp>
         <p:nvCxnSpPr>
-          <p:cNvPr id="144" name="Connector: Elbow 143">
-            <a:extLst>
-              <a:ext uri="{FF2B5EF4-FFF2-40B4-BE49-F238E27FC236}">
-                <a16:creationId xmlns:a16="http://schemas.microsoft.com/office/drawing/2014/main" id="{E612B86E-1F48-B48B-08C1-01FB6E18288C}"/>
+          <p:cNvPr id="184" name="Straight Arrow Connector 183">
+            <a:extLst>
+              <a:ext uri="{FF2B5EF4-FFF2-40B4-BE49-F238E27FC236}">
+                <a16:creationId xmlns:a16="http://schemas.microsoft.com/office/drawing/2014/main" id="{D5B2A1A0-500E-C90E-508F-A130E4F21318}"/>
               </a:ext>
             </a:extLst>
           </p:cNvPr>
           <p:cNvCxnSpPr>
             <a:cxnSpLocks/>
-            <a:endCxn id="141" idx="1"/>
+            <a:stCxn id="170" idx="2"/>
           </p:cNvCxnSpPr>
           <p:nvPr/>
         </p:nvCxnSpPr>
         <p:spPr>
-          <a:xfrm flipV="1">
-            <a:off x="8397459" y="5102301"/>
-            <a:ext cx="2442063" cy="642756"/>
-          </a:xfrm>
-          <a:prstGeom prst="bentConnector3">
-            <a:avLst>
-              <a:gd name="adj1" fmla="val 50000"/>
-            </a:avLst>
-          </a:prstGeom>
-          <a:ln w="12700">
+          <a:xfrm>
+            <a:off x="2239375" y="5582004"/>
+            <a:ext cx="0" cy="247501"/>
+          </a:xfrm>
+          <a:prstGeom prst="straightConnector1">
+            <a:avLst/>
+          </a:prstGeom>
+          <a:ln>
             <a:solidFill>
-              <a:srgbClr val="C00000"/>
+              <a:schemeClr val="accent6">
+                <a:lumMod val="50000"/>
+              </a:schemeClr>
             </a:solidFill>
-            <a:prstDash val="sysDash"/>
             <a:tailEnd type="triangle"/>
           </a:ln>
         </p:spPr>
@@ -10674,106 +11245,37 @@
           </a:fontRef>
         </p:style>
       </p:cxnSp>
-      <p:sp>
-        <p:nvSpPr>
-          <p:cNvPr id="147" name="TextBox 146">
-            <a:extLst>
-              <a:ext uri="{FF2B5EF4-FFF2-40B4-BE49-F238E27FC236}">
-                <a16:creationId xmlns:a16="http://schemas.microsoft.com/office/drawing/2014/main" id="{A94D6744-8B25-2BC2-C25B-6352652432CC}"/>
-              </a:ext>
-            </a:extLst>
-          </p:cNvPr>
-          <p:cNvSpPr txBox="1"/>
-          <p:nvPr/>
-        </p:nvSpPr>
-        <p:spPr>
-          <a:xfrm>
-            <a:off x="8826694" y="4470523"/>
-            <a:ext cx="1197336" cy="461665"/>
-          </a:xfrm>
-          <a:prstGeom prst="rect">
-            <a:avLst/>
-          </a:prstGeom>
-          <a:noFill/>
-        </p:spPr>
-        <p:txBody>
-          <a:bodyPr wrap="square" rtlCol="0">
-            <a:spAutoFit/>
-          </a:bodyPr>
-          <a:lstStyle/>
-          <a:p>
-            <a:r>
-              <a:rPr lang="en-SG" sz="1200" b="1" dirty="0"/>
-              <a:t>Run </a:t>
-            </a:r>
-            <a:r>
-              <a:rPr lang="en-SG" sz="1200" b="1" dirty="0" err="1"/>
-              <a:t>cmd</a:t>
-            </a:r>
-            <a:r>
-              <a:rPr lang="en-SG" sz="1200" b="1" dirty="0"/>
-              <a:t> or copy file</a:t>
-            </a:r>
-          </a:p>
-        </p:txBody>
-      </p:sp>
-      <p:sp>
-        <p:nvSpPr>
-          <p:cNvPr id="148" name="TextBox 147">
-            <a:extLst>
-              <a:ext uri="{FF2B5EF4-FFF2-40B4-BE49-F238E27FC236}">
-                <a16:creationId xmlns:a16="http://schemas.microsoft.com/office/drawing/2014/main" id="{35FB3AAF-D50F-61EE-F63F-58E8BB8B220E}"/>
-              </a:ext>
-            </a:extLst>
-          </p:cNvPr>
-          <p:cNvSpPr txBox="1"/>
-          <p:nvPr/>
-        </p:nvSpPr>
-        <p:spPr>
-          <a:xfrm>
-            <a:off x="9614780" y="5126257"/>
-            <a:ext cx="1197336" cy="646331"/>
-          </a:xfrm>
-          <a:prstGeom prst="rect">
-            <a:avLst/>
-          </a:prstGeom>
-          <a:noFill/>
-        </p:spPr>
-        <p:txBody>
-          <a:bodyPr wrap="square" rtlCol="0">
-            <a:spAutoFit/>
-          </a:bodyPr>
-          <a:lstStyle/>
-          <a:p>
-            <a:r>
-              <a:rPr lang="en-SG" sz="1200" b="1" dirty="0"/>
-              <a:t>User’s latest typed in  command</a:t>
-            </a:r>
-          </a:p>
-        </p:txBody>
-      </p:sp>
       <p:cxnSp>
         <p:nvCxnSpPr>
-          <p:cNvPr id="150" name="Straight Connector 149">
-            <a:extLst>
-              <a:ext uri="{FF2B5EF4-FFF2-40B4-BE49-F238E27FC236}">
-                <a16:creationId xmlns:a16="http://schemas.microsoft.com/office/drawing/2014/main" id="{67D9BD3D-F91E-65EF-1D09-63D7B49DF163}"/>
-              </a:ext>
-            </a:extLst>
-          </p:cNvPr>
-          <p:cNvCxnSpPr/>
+          <p:cNvPr id="195" name="Connector: Elbow 194">
+            <a:extLst>
+              <a:ext uri="{FF2B5EF4-FFF2-40B4-BE49-F238E27FC236}">
+                <a16:creationId xmlns:a16="http://schemas.microsoft.com/office/drawing/2014/main" id="{130B7444-97F1-EA32-FF42-A356E7651151}"/>
+              </a:ext>
+            </a:extLst>
+          </p:cNvPr>
+          <p:cNvCxnSpPr>
+            <a:cxnSpLocks/>
+            <a:stCxn id="181" idx="1"/>
+            <a:endCxn id="161" idx="3"/>
+          </p:cNvCxnSpPr>
           <p:nvPr/>
         </p:nvCxnSpPr>
         <p:spPr>
-          <a:xfrm>
-            <a:off x="8667750" y="276225"/>
-            <a:ext cx="0" cy="6467475"/>
-          </a:xfrm>
-          <a:prstGeom prst="line">
-            <a:avLst/>
-          </a:prstGeom>
-          <a:ln w="19050">
-            <a:prstDash val="sysDash"/>
+          <a:xfrm rot="10800000">
+            <a:off x="1437371" y="4060686"/>
+            <a:ext cx="355428" cy="1883955"/>
+          </a:xfrm>
+          <a:prstGeom prst="bentConnector3">
+            <a:avLst>
+              <a:gd name="adj1" fmla="val 50000"/>
+            </a:avLst>
+          </a:prstGeom>
+          <a:ln>
+            <a:solidFill>
+              <a:srgbClr val="7030A0"/>
+            </a:solidFill>
+            <a:tailEnd type="triangle"/>
           </a:ln>
         </p:spPr>
         <p:style>
@@ -10793,10 +11295,10 @@
       </p:cxnSp>
       <p:sp>
         <p:nvSpPr>
-          <p:cNvPr id="151" name="TextBox 150">
-            <a:extLst>
-              <a:ext uri="{FF2B5EF4-FFF2-40B4-BE49-F238E27FC236}">
-                <a16:creationId xmlns:a16="http://schemas.microsoft.com/office/drawing/2014/main" id="{62E24ED7-E111-B51F-5E81-37C49FA93744}"/>
+          <p:cNvPr id="197" name="TextBox 196">
+            <a:extLst>
+              <a:ext uri="{FF2B5EF4-FFF2-40B4-BE49-F238E27FC236}">
+                <a16:creationId xmlns:a16="http://schemas.microsoft.com/office/drawing/2014/main" id="{4A94FE0A-A433-6338-1A94-6586967DDF61}"/>
               </a:ext>
             </a:extLst>
           </p:cNvPr>
@@ -10805,8 +11307,8 @@
         </p:nvSpPr>
         <p:spPr>
           <a:xfrm>
-            <a:off x="8228026" y="95250"/>
-            <a:ext cx="1197336" cy="276999"/>
+            <a:off x="992745" y="4297815"/>
+            <a:ext cx="1182578" cy="830997"/>
           </a:xfrm>
           <a:prstGeom prst="rect">
             <a:avLst/>
@@ -10820,18 +11322,22 @@
           <a:lstStyle/>
           <a:p>
             <a:r>
-              <a:rPr lang="en-SG" sz="1200" b="1" dirty="0"/>
-              <a:t>Network</a:t>
-            </a:r>
-          </a:p>
-        </p:txBody>
-      </p:sp>
-      <p:sp>
-        <p:nvSpPr>
-          <p:cNvPr id="152" name="TextBox 151">
-            <a:extLst>
-              <a:ext uri="{FF2B5EF4-FFF2-40B4-BE49-F238E27FC236}">
-                <a16:creationId xmlns:a16="http://schemas.microsoft.com/office/drawing/2014/main" id="{ADBC44B3-4480-5FCC-1FA6-DE4ECDAE3615}"/>
+              <a:rPr lang="en-SG" sz="1200" dirty="0">
+                <a:solidFill>
+                  <a:srgbClr val="7030A0"/>
+                </a:solidFill>
+              </a:rPr>
+              <a:t>Watchdogs mutually protection deadlock</a:t>
+            </a:r>
+          </a:p>
+        </p:txBody>
+      </p:sp>
+      <p:sp>
+        <p:nvSpPr>
+          <p:cNvPr id="198" name="TextBox 197">
+            <a:extLst>
+              <a:ext uri="{FF2B5EF4-FFF2-40B4-BE49-F238E27FC236}">
+                <a16:creationId xmlns:a16="http://schemas.microsoft.com/office/drawing/2014/main" id="{E844C781-FB3A-5527-C9D5-EC00FB133284}"/>
               </a:ext>
             </a:extLst>
           </p:cNvPr>
@@ -10840,8 +11346,8 @@
         </p:nvSpPr>
         <p:spPr>
           <a:xfrm>
-            <a:off x="5982626" y="1151895"/>
-            <a:ext cx="2030104" cy="307777"/>
+            <a:off x="365366" y="1144002"/>
+            <a:ext cx="1439624" cy="276999"/>
           </a:xfrm>
           <a:prstGeom prst="rect">
             <a:avLst/>
@@ -10855,24 +11361,75 @@
           <a:lstStyle/>
           <a:p>
             <a:r>
-              <a:rPr lang="en-SG" sz="1400" b="1" dirty="0">
+              <a:rPr lang="en-US" sz="1200" b="1" dirty="0">
+                <a:solidFill>
+                  <a:srgbClr val="7030A0"/>
+                </a:solidFill>
+              </a:rPr>
+              <a:t>Watchdog process </a:t>
+            </a:r>
+            <a:endParaRPr lang="en-SG" sz="1200" b="1" dirty="0">
+              <a:solidFill>
+                <a:srgbClr val="7030A0"/>
+              </a:solidFill>
+            </a:endParaRPr>
+          </a:p>
+        </p:txBody>
+      </p:sp>
+      <p:sp>
+        <p:nvSpPr>
+          <p:cNvPr id="199" name="TextBox 198">
+            <a:extLst>
+              <a:ext uri="{FF2B5EF4-FFF2-40B4-BE49-F238E27FC236}">
+                <a16:creationId xmlns:a16="http://schemas.microsoft.com/office/drawing/2014/main" id="{0FB7EB53-3280-B645-0196-C1AB9E3F7B52}"/>
+              </a:ext>
+            </a:extLst>
+          </p:cNvPr>
+          <p:cNvSpPr txBox="1"/>
+          <p:nvPr/>
+        </p:nvSpPr>
+        <p:spPr>
+          <a:xfrm>
+            <a:off x="1802786" y="1151681"/>
+            <a:ext cx="1925097" cy="276999"/>
+          </a:xfrm>
+          <a:prstGeom prst="rect">
+            <a:avLst/>
+          </a:prstGeom>
+          <a:noFill/>
+        </p:spPr>
+        <p:txBody>
+          <a:bodyPr wrap="square" rtlCol="0">
+            <a:spAutoFit/>
+          </a:bodyPr>
+          <a:lstStyle/>
+          <a:p>
+            <a:r>
+              <a:rPr lang="en-US" sz="1200" b="1" dirty="0">
                 <a:solidFill>
                   <a:schemeClr val="accent6">
-                    <a:lumMod val="50000"/>
+                    <a:lumMod val="75000"/>
                   </a:schemeClr>
                 </a:solidFill>
               </a:rPr>
-              <a:t>Victim Machine </a:t>
-            </a:r>
-          </a:p>
-        </p:txBody>
-      </p:sp>
-      <p:sp>
-        <p:nvSpPr>
-          <p:cNvPr id="153" name="TextBox 152">
-            <a:extLst>
-              <a:ext uri="{FF2B5EF4-FFF2-40B4-BE49-F238E27FC236}">
-                <a16:creationId xmlns:a16="http://schemas.microsoft.com/office/drawing/2014/main" id="{923CBE11-6DD5-D23E-D213-157A9104BFEA}"/>
+              <a:t>Backdoor trojan process </a:t>
+            </a:r>
+            <a:endParaRPr lang="en-SG" sz="1200" b="1" dirty="0">
+              <a:solidFill>
+                <a:schemeClr val="accent6">
+                  <a:lumMod val="75000"/>
+                </a:schemeClr>
+              </a:solidFill>
+            </a:endParaRPr>
+          </a:p>
+        </p:txBody>
+      </p:sp>
+      <p:sp>
+        <p:nvSpPr>
+          <p:cNvPr id="9" name="TextBox 8">
+            <a:extLst>
+              <a:ext uri="{FF2B5EF4-FFF2-40B4-BE49-F238E27FC236}">
+                <a16:creationId xmlns:a16="http://schemas.microsoft.com/office/drawing/2014/main" id="{EF047F93-6A51-F4BD-772E-97228952F4A7}"/>
               </a:ext>
             </a:extLst>
           </p:cNvPr>
@@ -10881,8 +11438,8 @@
         </p:nvSpPr>
         <p:spPr>
           <a:xfrm>
-            <a:off x="9599460" y="195781"/>
-            <a:ext cx="2297266" cy="400110"/>
+            <a:off x="952019" y="1608059"/>
+            <a:ext cx="859178" cy="1015663"/>
           </a:xfrm>
           <a:prstGeom prst="rect">
             <a:avLst/>
@@ -10896,22 +11453,27 @@
           <a:lstStyle/>
           <a:p>
             <a:r>
-              <a:rPr lang="en-SG" sz="2000" b="1" dirty="0">
+              <a:rPr lang="en-US" sz="1200" dirty="0">
                 <a:solidFill>
-                  <a:srgbClr val="C00000"/>
+                  <a:srgbClr val="7030A0"/>
                 </a:solidFill>
               </a:rPr>
-              <a:t>Attacker Machine </a:t>
-            </a:r>
-          </a:p>
-        </p:txBody>
-      </p:sp>
-      <p:sp>
-        <p:nvSpPr>
-          <p:cNvPr id="2" name="TextBox 1">
-            <a:extLst>
-              <a:ext uri="{FF2B5EF4-FFF2-40B4-BE49-F238E27FC236}">
-                <a16:creationId xmlns:a16="http://schemas.microsoft.com/office/drawing/2014/main" id="{6346BE8A-4D74-6516-4B79-7E026506F5CC}"/>
+              <a:t>Start new individual watchdog protector process </a:t>
+            </a:r>
+            <a:endParaRPr lang="en-SG" sz="1200" dirty="0">
+              <a:solidFill>
+                <a:srgbClr val="7030A0"/>
+              </a:solidFill>
+            </a:endParaRPr>
+          </a:p>
+        </p:txBody>
+      </p:sp>
+      <p:sp>
+        <p:nvSpPr>
+          <p:cNvPr id="13" name="TextBox 12">
+            <a:extLst>
+              <a:ext uri="{FF2B5EF4-FFF2-40B4-BE49-F238E27FC236}">
+                <a16:creationId xmlns:a16="http://schemas.microsoft.com/office/drawing/2014/main" id="{5A40CD42-70D6-BE48-1592-74EB5E5177B1}"/>
               </a:ext>
             </a:extLst>
           </p:cNvPr>
@@ -10920,18 +11482,13 @@
         </p:nvSpPr>
         <p:spPr>
           <a:xfrm>
-            <a:off x="110774" y="164309"/>
-            <a:ext cx="3103127" cy="400110"/>
+            <a:off x="1818630" y="2194812"/>
+            <a:ext cx="1023748" cy="461665"/>
           </a:xfrm>
           <a:prstGeom prst="rect">
             <a:avLst/>
           </a:prstGeom>
           <a:noFill/>
-          <a:ln w="19050">
-            <a:solidFill>
-              <a:schemeClr val="tx1"/>
-            </a:solidFill>
-          </a:ln>
         </p:spPr>
         <p:txBody>
           <a:bodyPr wrap="square" rtlCol="0">
@@ -10940,216 +11497,94 @@
           <a:lstStyle/>
           <a:p>
             <a:r>
-              <a:rPr lang="en-SG" sz="2000" b="1" dirty="0"/>
-              <a:t>Backdoor Trojan Workflow </a:t>
-            </a:r>
+              <a:rPr lang="en-SG" sz="1200" dirty="0">
+                <a:solidFill>
+                  <a:schemeClr val="accent6">
+                    <a:lumMod val="75000"/>
+                  </a:schemeClr>
+                </a:solidFill>
+              </a:rPr>
+              <a:t>Watchdog thread</a:t>
+            </a:r>
+          </a:p>
+        </p:txBody>
+      </p:sp>
+      <p:sp>
+        <p:nvSpPr>
+          <p:cNvPr id="30" name="Rectangle 29">
+            <a:extLst>
+              <a:ext uri="{FF2B5EF4-FFF2-40B4-BE49-F238E27FC236}">
+                <a16:creationId xmlns:a16="http://schemas.microsoft.com/office/drawing/2014/main" id="{E60E2040-1FCF-6AEC-728B-6B577F13F150}"/>
+              </a:ext>
+            </a:extLst>
+          </p:cNvPr>
+          <p:cNvSpPr/>
+          <p:nvPr/>
+        </p:nvSpPr>
+        <p:spPr>
+          <a:xfrm>
+            <a:off x="3269119" y="5209624"/>
+            <a:ext cx="1248070" cy="448954"/>
+          </a:xfrm>
+          <a:prstGeom prst="rect">
+            <a:avLst/>
+          </a:prstGeom>
+          <a:solidFill>
+            <a:schemeClr val="accent6">
+              <a:lumMod val="75000"/>
+            </a:schemeClr>
+          </a:solidFill>
+        </p:spPr>
+        <p:style>
+          <a:lnRef idx="2">
+            <a:schemeClr val="accent1">
+              <a:shade val="50000"/>
+            </a:schemeClr>
+          </a:lnRef>
+          <a:fillRef idx="1">
+            <a:schemeClr val="accent1"/>
+          </a:fillRef>
+          <a:effectRef idx="0">
+            <a:schemeClr val="accent1"/>
+          </a:effectRef>
+          <a:fontRef idx="minor">
+            <a:schemeClr val="lt1"/>
+          </a:fontRef>
+        </p:style>
+        <p:txBody>
+          <a:bodyPr rtlCol="0" anchor="ctr"/>
+          <a:lstStyle/>
+          <a:p>
+            <a:r>
+              <a:rPr lang="en-US" sz="1100" b="1" dirty="0"/>
+              <a:t>Result feedback generator </a:t>
+            </a:r>
+            <a:endParaRPr lang="en-SG" sz="1100" b="1" dirty="0"/>
           </a:p>
         </p:txBody>
       </p:sp>
       <p:cxnSp>
         <p:nvCxnSpPr>
-          <p:cNvPr id="23" name="Connector: Elbow 22">
-            <a:extLst>
-              <a:ext uri="{FF2B5EF4-FFF2-40B4-BE49-F238E27FC236}">
-                <a16:creationId xmlns:a16="http://schemas.microsoft.com/office/drawing/2014/main" id="{D52B3981-3141-5602-02A6-61EFB1F3D8B7}"/>
+          <p:cNvPr id="44" name="Connector: Elbow 43">
+            <a:extLst>
+              <a:ext uri="{FF2B5EF4-FFF2-40B4-BE49-F238E27FC236}">
+                <a16:creationId xmlns:a16="http://schemas.microsoft.com/office/drawing/2014/main" id="{2511F3D6-70B8-38C0-527F-7DCE627132B4}"/>
               </a:ext>
             </a:extLst>
           </p:cNvPr>
           <p:cNvCxnSpPr>
             <a:cxnSpLocks/>
-            <a:stCxn id="17" idx="2"/>
-            <a:endCxn id="64" idx="0"/>
+            <a:endCxn id="22" idx="2"/>
           </p:cNvCxnSpPr>
           <p:nvPr/>
         </p:nvCxnSpPr>
         <p:spPr>
-          <a:xfrm rot="5400000">
-            <a:off x="3867856" y="3187397"/>
-            <a:ext cx="757679" cy="1275107"/>
-          </a:xfrm>
-          <a:prstGeom prst="bentConnector3">
-            <a:avLst>
-              <a:gd name="adj1" fmla="val 50000"/>
-            </a:avLst>
-          </a:prstGeom>
-          <a:ln>
-            <a:prstDash val="dash"/>
-            <a:tailEnd type="triangle"/>
-          </a:ln>
-        </p:spPr>
-        <p:style>
-          <a:lnRef idx="1">
-            <a:schemeClr val="accent1"/>
-          </a:lnRef>
-          <a:fillRef idx="0">
-            <a:schemeClr val="accent1"/>
-          </a:fillRef>
-          <a:effectRef idx="0">
-            <a:schemeClr val="accent1"/>
-          </a:effectRef>
-          <a:fontRef idx="minor">
-            <a:schemeClr val="tx1"/>
-          </a:fontRef>
-        </p:style>
-      </p:cxnSp>
-      <p:sp>
-        <p:nvSpPr>
-          <p:cNvPr id="34" name="TextBox 33">
-            <a:extLst>
-              <a:ext uri="{FF2B5EF4-FFF2-40B4-BE49-F238E27FC236}">
-                <a16:creationId xmlns:a16="http://schemas.microsoft.com/office/drawing/2014/main" id="{60F12731-A7B3-54C4-7720-36AD1FD2186D}"/>
-              </a:ext>
-            </a:extLst>
-          </p:cNvPr>
-          <p:cNvSpPr txBox="1"/>
-          <p:nvPr/>
-        </p:nvSpPr>
-        <p:spPr>
-          <a:xfrm>
-            <a:off x="3292382" y="3418849"/>
-            <a:ext cx="1728370" cy="461665"/>
-          </a:xfrm>
-          <a:prstGeom prst="rect">
-            <a:avLst/>
-          </a:prstGeom>
-          <a:noFill/>
-        </p:spPr>
-        <p:txBody>
-          <a:bodyPr wrap="square" rtlCol="0">
-            <a:spAutoFit/>
-          </a:bodyPr>
-          <a:lstStyle/>
-          <a:p>
-            <a:r>
-              <a:rPr lang="en-US" sz="1200" b="1" dirty="0">
-                <a:solidFill>
-                  <a:srgbClr val="0070C0"/>
-                </a:solidFill>
-              </a:rPr>
-              <a:t>Task execution request from trojan connector </a:t>
-            </a:r>
-            <a:endParaRPr lang="en-SG" sz="1200" b="1" dirty="0">
-              <a:solidFill>
-                <a:srgbClr val="0070C0"/>
-              </a:solidFill>
-            </a:endParaRPr>
-          </a:p>
-        </p:txBody>
-      </p:sp>
-      <p:cxnSp>
-        <p:nvCxnSpPr>
-          <p:cNvPr id="35" name="Connector: Elbow 34">
-            <a:extLst>
-              <a:ext uri="{FF2B5EF4-FFF2-40B4-BE49-F238E27FC236}">
-                <a16:creationId xmlns:a16="http://schemas.microsoft.com/office/drawing/2014/main" id="{A6617671-5E5A-D247-4767-BBBB732B09EB}"/>
-              </a:ext>
-            </a:extLst>
-          </p:cNvPr>
-          <p:cNvCxnSpPr>
-            <a:cxnSpLocks/>
-            <a:stCxn id="22" idx="2"/>
-            <a:endCxn id="64" idx="3"/>
-          </p:cNvCxnSpPr>
-          <p:nvPr/>
-        </p:nvCxnSpPr>
-        <p:spPr>
-          <a:xfrm rot="5400000">
-            <a:off x="5197578" y="2896215"/>
-            <a:ext cx="373033" cy="2537423"/>
+          <a:xfrm flipV="1">
+            <a:off x="4510938" y="3978410"/>
+            <a:ext cx="2108722" cy="1603594"/>
           </a:xfrm>
           <a:prstGeom prst="bentConnector2">
             <a:avLst/>
-          </a:prstGeom>
-          <a:ln>
-            <a:prstDash val="dash"/>
-            <a:tailEnd type="triangle"/>
-          </a:ln>
-        </p:spPr>
-        <p:style>
-          <a:lnRef idx="1">
-            <a:schemeClr val="accent1"/>
-          </a:lnRef>
-          <a:fillRef idx="0">
-            <a:schemeClr val="accent1"/>
-          </a:fillRef>
-          <a:effectRef idx="0">
-            <a:schemeClr val="accent1"/>
-          </a:effectRef>
-          <a:fontRef idx="minor">
-            <a:schemeClr val="tx1"/>
-          </a:fontRef>
-        </p:style>
-      </p:cxnSp>
-      <p:sp>
-        <p:nvSpPr>
-          <p:cNvPr id="47" name="TextBox 46">
-            <a:extLst>
-              <a:ext uri="{FF2B5EF4-FFF2-40B4-BE49-F238E27FC236}">
-                <a16:creationId xmlns:a16="http://schemas.microsoft.com/office/drawing/2014/main" id="{841573AC-D44D-9F37-7DB0-500D2903F51C}"/>
-              </a:ext>
-            </a:extLst>
-          </p:cNvPr>
-          <p:cNvSpPr txBox="1"/>
-          <p:nvPr/>
-        </p:nvSpPr>
-        <p:spPr>
-          <a:xfrm>
-            <a:off x="5754408" y="4097591"/>
-            <a:ext cx="1728370" cy="461665"/>
-          </a:xfrm>
-          <a:prstGeom prst="rect">
-            <a:avLst/>
-          </a:prstGeom>
-          <a:noFill/>
-        </p:spPr>
-        <p:txBody>
-          <a:bodyPr wrap="square" rtlCol="0">
-            <a:spAutoFit/>
-          </a:bodyPr>
-          <a:lstStyle/>
-          <a:p>
-            <a:r>
-              <a:rPr lang="en-US" sz="1200" b="1" dirty="0">
-                <a:solidFill>
-                  <a:srgbClr val="0070C0"/>
-                </a:solidFill>
-              </a:rPr>
-              <a:t>Task execution request from trojan hub</a:t>
-            </a:r>
-            <a:endParaRPr lang="en-SG" sz="1200" b="1" dirty="0">
-              <a:solidFill>
-                <a:srgbClr val="0070C0"/>
-              </a:solidFill>
-            </a:endParaRPr>
-          </a:p>
-        </p:txBody>
-      </p:sp>
-      <p:cxnSp>
-        <p:nvCxnSpPr>
-          <p:cNvPr id="48" name="Connector: Elbow 47">
-            <a:extLst>
-              <a:ext uri="{FF2B5EF4-FFF2-40B4-BE49-F238E27FC236}">
-                <a16:creationId xmlns:a16="http://schemas.microsoft.com/office/drawing/2014/main" id="{B9E05D3A-CC0A-F71F-F277-42FD7DEFCDB2}"/>
-              </a:ext>
-            </a:extLst>
-          </p:cNvPr>
-          <p:cNvCxnSpPr>
-            <a:cxnSpLocks/>
-            <a:stCxn id="50" idx="2"/>
-            <a:endCxn id="22" idx="1"/>
-          </p:cNvCxnSpPr>
-          <p:nvPr/>
-        </p:nvCxnSpPr>
-        <p:spPr>
-          <a:xfrm rot="5400000" flipH="1" flipV="1">
-            <a:off x="3781078" y="2954525"/>
-            <a:ext cx="1372688" cy="2950703"/>
-          </a:xfrm>
-          <a:prstGeom prst="bentConnector4">
-            <a:avLst>
-              <a:gd name="adj1" fmla="val -16653"/>
-              <a:gd name="adj2" fmla="val 91355"/>
-            </a:avLst>
           </a:prstGeom>
           <a:ln>
             <a:solidFill>
@@ -11177,38 +11612,224 @@
           </a:fontRef>
         </p:style>
       </p:cxnSp>
+      <p:sp>
+        <p:nvSpPr>
+          <p:cNvPr id="52" name="TextBox 51">
+            <a:extLst>
+              <a:ext uri="{FF2B5EF4-FFF2-40B4-BE49-F238E27FC236}">
+                <a16:creationId xmlns:a16="http://schemas.microsoft.com/office/drawing/2014/main" id="{157F452D-6B08-E336-1992-E130D1F7A26B}"/>
+              </a:ext>
+            </a:extLst>
+          </p:cNvPr>
+          <p:cNvSpPr txBox="1"/>
+          <p:nvPr/>
+        </p:nvSpPr>
+        <p:spPr>
+          <a:xfrm>
+            <a:off x="4832514" y="4961521"/>
+            <a:ext cx="1172621" cy="646331"/>
+          </a:xfrm>
+          <a:prstGeom prst="rect">
+            <a:avLst/>
+          </a:prstGeom>
+          <a:noFill/>
+        </p:spPr>
+        <p:txBody>
+          <a:bodyPr wrap="square" rtlCol="0">
+            <a:spAutoFit/>
+          </a:bodyPr>
+          <a:lstStyle/>
+          <a:p>
+            <a:r>
+              <a:rPr lang="en-US" sz="1200" dirty="0"/>
+              <a:t>Response package to hacker </a:t>
+            </a:r>
+            <a:endParaRPr lang="en-SG" sz="1200" dirty="0"/>
+          </a:p>
+        </p:txBody>
+      </p:sp>
+      <p:sp>
+        <p:nvSpPr>
+          <p:cNvPr id="53" name="Cloud 52">
+            <a:extLst>
+              <a:ext uri="{FF2B5EF4-FFF2-40B4-BE49-F238E27FC236}">
+                <a16:creationId xmlns:a16="http://schemas.microsoft.com/office/drawing/2014/main" id="{645E0D74-9425-5556-0A93-85A08DB07E8D}"/>
+              </a:ext>
+            </a:extLst>
+          </p:cNvPr>
+          <p:cNvSpPr/>
+          <p:nvPr/>
+        </p:nvSpPr>
+        <p:spPr>
+          <a:xfrm>
+            <a:off x="7783193" y="4232975"/>
+            <a:ext cx="1135843" cy="609577"/>
+          </a:xfrm>
+          <a:prstGeom prst="cloud">
+            <a:avLst/>
+          </a:prstGeom>
+          <a:solidFill>
+            <a:schemeClr val="accent1">
+              <a:lumMod val="60000"/>
+              <a:lumOff val="40000"/>
+            </a:schemeClr>
+          </a:solidFill>
+        </p:spPr>
+        <p:style>
+          <a:lnRef idx="2">
+            <a:schemeClr val="accent1">
+              <a:shade val="15000"/>
+            </a:schemeClr>
+          </a:lnRef>
+          <a:fillRef idx="1">
+            <a:schemeClr val="accent1"/>
+          </a:fillRef>
+          <a:effectRef idx="0">
+            <a:schemeClr val="accent1"/>
+          </a:effectRef>
+          <a:fontRef idx="minor">
+            <a:schemeClr val="lt1"/>
+          </a:fontRef>
+        </p:style>
+        <p:txBody>
+          <a:bodyPr rtlCol="0" anchor="ctr"/>
+          <a:lstStyle/>
+          <a:p>
+            <a:pPr algn="ctr"/>
+            <a:r>
+              <a:rPr lang="en-SG" sz="1200" b="1" dirty="0">
+                <a:solidFill>
+                  <a:schemeClr val="tx1"/>
+                </a:solidFill>
+              </a:rPr>
+              <a:t>Internet</a:t>
+            </a:r>
+            <a:r>
+              <a:rPr lang="en-SG" dirty="0">
+                <a:solidFill>
+                  <a:schemeClr val="tx1"/>
+                </a:solidFill>
+              </a:rPr>
+              <a:t> </a:t>
+            </a:r>
+          </a:p>
+        </p:txBody>
+      </p:sp>
+      <p:pic>
+        <p:nvPicPr>
+          <p:cNvPr id="1028" name="Picture 4" descr="Top Networking Interview Questions (2023) - InterviewBit">
+            <a:extLst>
+              <a:ext uri="{FF2B5EF4-FFF2-40B4-BE49-F238E27FC236}">
+                <a16:creationId xmlns:a16="http://schemas.microsoft.com/office/drawing/2014/main" id="{4018BE31-292C-55C0-1FCD-E6B1830D46FD}"/>
+              </a:ext>
+            </a:extLst>
+          </p:cNvPr>
+          <p:cNvPicPr>
+            <a:picLocks noChangeAspect="1" noChangeArrowheads="1"/>
+          </p:cNvPicPr>
+          <p:nvPr/>
+        </p:nvPicPr>
+        <p:blipFill rotWithShape="1">
+          <a:blip r:embed="rId4">
+            <a:extLst>
+              <a:ext uri="{28A0092B-C50C-407E-A947-70E740481C1C}">
+                <a14:useLocalDpi xmlns:a14="http://schemas.microsoft.com/office/drawing/2010/main" val="0"/>
+              </a:ext>
+            </a:extLst>
+          </a:blip>
+          <a:srcRect t="9019"/>
+          <a:stretch/>
+        </p:blipFill>
+        <p:spPr bwMode="auto">
+          <a:xfrm>
+            <a:off x="7852757" y="2422280"/>
+            <a:ext cx="621253" cy="501285"/>
+          </a:xfrm>
+          <a:prstGeom prst="rect">
+            <a:avLst/>
+          </a:prstGeom>
+          <a:noFill/>
+          <a:ln w="9525">
+            <a:solidFill>
+              <a:schemeClr val="tx1"/>
+            </a:solidFill>
+          </a:ln>
+          <a:extLst>
+            <a:ext uri="{909E8E84-426E-40DD-AFC4-6F175D3DCCD1}">
+              <a14:hiddenFill xmlns:a14="http://schemas.microsoft.com/office/drawing/2010/main">
+                <a:solidFill>
+                  <a:srgbClr val="FFFFFF"/>
+                </a:solidFill>
+              </a14:hiddenFill>
+            </a:ext>
+          </a:extLst>
+        </p:spPr>
+      </p:pic>
+      <p:sp>
+        <p:nvSpPr>
+          <p:cNvPr id="54" name="TextBox 53">
+            <a:extLst>
+              <a:ext uri="{FF2B5EF4-FFF2-40B4-BE49-F238E27FC236}">
+                <a16:creationId xmlns:a16="http://schemas.microsoft.com/office/drawing/2014/main" id="{DA68AB53-1E17-BF89-3EF5-4D98C8BF46B8}"/>
+              </a:ext>
+            </a:extLst>
+          </p:cNvPr>
+          <p:cNvSpPr txBox="1"/>
+          <p:nvPr/>
+        </p:nvSpPr>
+        <p:spPr>
+          <a:xfrm>
+            <a:off x="7839116" y="2174181"/>
+            <a:ext cx="1023282" cy="461665"/>
+          </a:xfrm>
+          <a:prstGeom prst="rect">
+            <a:avLst/>
+          </a:prstGeom>
+          <a:noFill/>
+        </p:spPr>
+        <p:txBody>
+          <a:bodyPr wrap="square" rtlCol="0">
+            <a:spAutoFit/>
+          </a:bodyPr>
+          <a:lstStyle/>
+          <a:p>
+            <a:r>
+              <a:rPr lang="en-US" sz="1200" b="1" dirty="0"/>
+              <a:t>Internal subnet</a:t>
+            </a:r>
+            <a:endParaRPr lang="en-SG" sz="1200" b="1" dirty="0"/>
+          </a:p>
+        </p:txBody>
+      </p:sp>
       <p:cxnSp>
         <p:nvCxnSpPr>
-          <p:cNvPr id="58" name="Connector: Elbow 57">
-            <a:extLst>
-              <a:ext uri="{FF2B5EF4-FFF2-40B4-BE49-F238E27FC236}">
-                <a16:creationId xmlns:a16="http://schemas.microsoft.com/office/drawing/2014/main" id="{A3D24507-21BB-6CA7-B44B-41C94B4D3C7B}"/>
+          <p:cNvPr id="72" name="Connector: Elbow 71">
+            <a:extLst>
+              <a:ext uri="{FF2B5EF4-FFF2-40B4-BE49-F238E27FC236}">
+                <a16:creationId xmlns:a16="http://schemas.microsoft.com/office/drawing/2014/main" id="{8EF26611-0E42-8EBD-0A84-37799966F585}"/>
               </a:ext>
             </a:extLst>
           </p:cNvPr>
           <p:cNvCxnSpPr>
             <a:cxnSpLocks/>
-            <a:stCxn id="50" idx="2"/>
+            <a:stCxn id="135" idx="1"/>
+            <a:endCxn id="1028" idx="3"/>
           </p:cNvCxnSpPr>
           <p:nvPr/>
         </p:nvCxnSpPr>
         <p:spPr>
-          <a:xfrm rot="5400000" flipH="1" flipV="1">
-            <a:off x="3269397" y="3168785"/>
-            <a:ext cx="1670110" cy="2224762"/>
-          </a:xfrm>
-          <a:prstGeom prst="bentConnector4">
+          <a:xfrm rot="10800000" flipV="1">
+            <a:off x="8474011" y="1643421"/>
+            <a:ext cx="1023281" cy="1029502"/>
+          </a:xfrm>
+          <a:prstGeom prst="bentConnector3">
             <a:avLst>
-              <a:gd name="adj1" fmla="val -13688"/>
-              <a:gd name="adj2" fmla="val 99917"/>
+              <a:gd name="adj1" fmla="val 50000"/>
             </a:avLst>
           </a:prstGeom>
           <a:ln>
             <a:solidFill>
-              <a:schemeClr val="tx1">
-                <a:lumMod val="95000"/>
-                <a:lumOff val="5000"/>
-              </a:schemeClr>
+              <a:srgbClr val="FF0000"/>
             </a:solidFill>
             <a:prstDash val="dash"/>
             <a:tailEnd type="triangle"/>
@@ -11231,46 +11852,10 @@
       </p:cxnSp>
       <p:sp>
         <p:nvSpPr>
-          <p:cNvPr id="63" name="TextBox 62">
-            <a:extLst>
-              <a:ext uri="{FF2B5EF4-FFF2-40B4-BE49-F238E27FC236}">
-                <a16:creationId xmlns:a16="http://schemas.microsoft.com/office/drawing/2014/main" id="{95FA5AF2-7768-0581-ADE6-ED001CD927D2}"/>
-              </a:ext>
-            </a:extLst>
-          </p:cNvPr>
-          <p:cNvSpPr txBox="1"/>
-          <p:nvPr/>
-        </p:nvSpPr>
-        <p:spPr>
-          <a:xfrm>
-            <a:off x="3741940" y="5068714"/>
-            <a:ext cx="1728370" cy="276999"/>
-          </a:xfrm>
-          <a:prstGeom prst="rect">
-            <a:avLst/>
-          </a:prstGeom>
-          <a:noFill/>
-        </p:spPr>
-        <p:txBody>
-          <a:bodyPr wrap="square" rtlCol="0">
-            <a:spAutoFit/>
-          </a:bodyPr>
-          <a:lstStyle/>
-          <a:p>
-            <a:r>
-              <a:rPr lang="en-US" sz="1200" b="1" dirty="0"/>
-              <a:t>Task execution result </a:t>
-            </a:r>
-            <a:endParaRPr lang="en-SG" sz="1200" b="1" dirty="0"/>
-          </a:p>
-        </p:txBody>
-      </p:sp>
-      <p:sp>
-        <p:nvSpPr>
-          <p:cNvPr id="64" name="Rectangle 63">
-            <a:extLst>
-              <a:ext uri="{FF2B5EF4-FFF2-40B4-BE49-F238E27FC236}">
-                <a16:creationId xmlns:a16="http://schemas.microsoft.com/office/drawing/2014/main" id="{CFC1397C-3BD6-77CB-B1D7-D71667C9DBF9}"/>
+          <p:cNvPr id="73" name="Rectangle 72">
+            <a:extLst>
+              <a:ext uri="{FF2B5EF4-FFF2-40B4-BE49-F238E27FC236}">
+                <a16:creationId xmlns:a16="http://schemas.microsoft.com/office/drawing/2014/main" id="{EE3C7B4C-8C2D-1C84-3CB1-5995E8ADF68B}"/>
               </a:ext>
             </a:extLst>
           </p:cNvPr>
@@ -11279,16 +11864,14 @@
         </p:nvSpPr>
         <p:spPr>
           <a:xfrm>
-            <a:off x="3102900" y="4203790"/>
-            <a:ext cx="1012482" cy="295306"/>
+            <a:off x="9497291" y="2075845"/>
+            <a:ext cx="1137696" cy="401443"/>
           </a:xfrm>
           <a:prstGeom prst="rect">
             <a:avLst/>
           </a:prstGeom>
           <a:solidFill>
-            <a:schemeClr val="accent6">
-              <a:lumMod val="75000"/>
-            </a:schemeClr>
+            <a:srgbClr val="C00000"/>
           </a:solidFill>
         </p:spPr>
         <p:style>
@@ -11312,38 +11895,41 @@
           <a:lstStyle/>
           <a:p>
             <a:r>
-              <a:rPr lang="en-US" sz="1200" b="1" dirty="0"/>
-              <a:t>Tasks queue </a:t>
-            </a:r>
-            <a:endParaRPr lang="en-SG" sz="1200" b="1" dirty="0"/>
+              <a:rPr lang="en-US" sz="1100" b="1" dirty="0"/>
+              <a:t>Trojan feed back handler</a:t>
+            </a:r>
           </a:p>
         </p:txBody>
       </p:sp>
       <p:cxnSp>
         <p:nvCxnSpPr>
-          <p:cNvPr id="71" name="Connector: Elbow 70">
-            <a:extLst>
-              <a:ext uri="{FF2B5EF4-FFF2-40B4-BE49-F238E27FC236}">
-                <a16:creationId xmlns:a16="http://schemas.microsoft.com/office/drawing/2014/main" id="{AD3C94A0-385D-7AC8-55B0-40CF92AD8E6E}"/>
+          <p:cNvPr id="76" name="Connector: Elbow 75">
+            <a:extLst>
+              <a:ext uri="{FF2B5EF4-FFF2-40B4-BE49-F238E27FC236}">
+                <a16:creationId xmlns:a16="http://schemas.microsoft.com/office/drawing/2014/main" id="{DF24A281-CCC3-34F9-BABA-9779E5D47939}"/>
               </a:ext>
             </a:extLst>
           </p:cNvPr>
           <p:cNvCxnSpPr>
             <a:cxnSpLocks/>
-            <a:stCxn id="64" idx="1"/>
-            <a:endCxn id="50" idx="0"/>
+            <a:stCxn id="1028" idx="1"/>
           </p:cNvCxnSpPr>
           <p:nvPr/>
         </p:nvCxnSpPr>
         <p:spPr>
           <a:xfrm rot="10800000" flipV="1">
-            <a:off x="2992072" y="4351443"/>
-            <a:ext cx="110829" cy="387524"/>
-          </a:xfrm>
-          <a:prstGeom prst="bentConnector2">
-            <a:avLst/>
+            <a:off x="5873583" y="2672922"/>
+            <a:ext cx="1979175" cy="459495"/>
+          </a:xfrm>
+          <a:prstGeom prst="bentConnector3">
+            <a:avLst>
+              <a:gd name="adj1" fmla="val 50000"/>
+            </a:avLst>
           </a:prstGeom>
           <a:ln>
+            <a:solidFill>
+              <a:srgbClr val="FF0000"/>
+            </a:solidFill>
             <a:prstDash val="dash"/>
             <a:tailEnd type="triangle"/>
           </a:ln>
@@ -11363,102 +11949,12 @@
           </a:fontRef>
         </p:style>
       </p:cxnSp>
-      <p:pic>
-        <p:nvPicPr>
-          <p:cNvPr id="113" name="Picture 112">
-            <a:extLst>
-              <a:ext uri="{FF2B5EF4-FFF2-40B4-BE49-F238E27FC236}">
-                <a16:creationId xmlns:a16="http://schemas.microsoft.com/office/drawing/2014/main" id="{9877DE1B-7469-2547-4F76-41FE489DCA6D}"/>
-              </a:ext>
-            </a:extLst>
-          </p:cNvPr>
-          <p:cNvPicPr>
-            <a:picLocks noChangeAspect="1"/>
-          </p:cNvPicPr>
-          <p:nvPr/>
-        </p:nvPicPr>
-        <p:blipFill>
-          <a:blip r:embed="rId3"/>
-          <a:stretch>
-            <a:fillRect/>
-          </a:stretch>
-        </p:blipFill>
-        <p:spPr>
-          <a:xfrm>
-            <a:off x="2269148" y="3602364"/>
-            <a:ext cx="361275" cy="396956"/>
-          </a:xfrm>
-          <a:prstGeom prst="rect">
-            <a:avLst/>
-          </a:prstGeom>
-        </p:spPr>
-      </p:pic>
-      <p:pic>
-        <p:nvPicPr>
-          <p:cNvPr id="114" name="Picture 113">
-            <a:extLst>
-              <a:ext uri="{FF2B5EF4-FFF2-40B4-BE49-F238E27FC236}">
-                <a16:creationId xmlns:a16="http://schemas.microsoft.com/office/drawing/2014/main" id="{4FD98F82-4ABA-38D0-2FA9-02A4651637B5}"/>
-              </a:ext>
-            </a:extLst>
-          </p:cNvPr>
-          <p:cNvPicPr>
-            <a:picLocks noChangeAspect="1"/>
-          </p:cNvPicPr>
-          <p:nvPr/>
-        </p:nvPicPr>
-        <p:blipFill>
-          <a:blip r:embed="rId3"/>
-          <a:stretch>
-            <a:fillRect/>
-          </a:stretch>
-        </p:blipFill>
-        <p:spPr>
-          <a:xfrm>
-            <a:off x="2421549" y="3754764"/>
-            <a:ext cx="342978" cy="396956"/>
-          </a:xfrm>
-          <a:prstGeom prst="rect">
-            <a:avLst/>
-          </a:prstGeom>
-        </p:spPr>
-      </p:pic>
-      <p:pic>
-        <p:nvPicPr>
-          <p:cNvPr id="115" name="Picture 114">
-            <a:extLst>
-              <a:ext uri="{FF2B5EF4-FFF2-40B4-BE49-F238E27FC236}">
-                <a16:creationId xmlns:a16="http://schemas.microsoft.com/office/drawing/2014/main" id="{FEEBF769-E3DB-2AB0-9B66-3CEDD6ACDE4A}"/>
-              </a:ext>
-            </a:extLst>
-          </p:cNvPr>
-          <p:cNvPicPr>
-            <a:picLocks noChangeAspect="1"/>
-          </p:cNvPicPr>
-          <p:nvPr/>
-        </p:nvPicPr>
-        <p:blipFill>
-          <a:blip r:embed="rId3"/>
-          <a:stretch>
-            <a:fillRect/>
-          </a:stretch>
-        </p:blipFill>
-        <p:spPr>
-          <a:xfrm>
-            <a:off x="2558347" y="3909817"/>
-            <a:ext cx="361275" cy="396956"/>
-          </a:xfrm>
-          <a:prstGeom prst="rect">
-            <a:avLst/>
-          </a:prstGeom>
-        </p:spPr>
-      </p:pic>
-      <p:sp>
-        <p:nvSpPr>
-          <p:cNvPr id="121" name="TextBox 120">
-            <a:extLst>
-              <a:ext uri="{FF2B5EF4-FFF2-40B4-BE49-F238E27FC236}">
-                <a16:creationId xmlns:a16="http://schemas.microsoft.com/office/drawing/2014/main" id="{11316F09-07F8-FDCC-2082-F24E729191C4}"/>
+      <p:sp>
+        <p:nvSpPr>
+          <p:cNvPr id="79" name="TextBox 78">
+            <a:extLst>
+              <a:ext uri="{FF2B5EF4-FFF2-40B4-BE49-F238E27FC236}">
+                <a16:creationId xmlns:a16="http://schemas.microsoft.com/office/drawing/2014/main" id="{3017756E-F163-2B88-AEFE-E4BC85AA7597}"/>
               </a:ext>
             </a:extLst>
           </p:cNvPr>
@@ -11467,8 +11963,8 @@
         </p:nvSpPr>
         <p:spPr>
           <a:xfrm>
-            <a:off x="2720890" y="3350354"/>
-            <a:ext cx="721485" cy="600164"/>
+            <a:off x="8069409" y="1410651"/>
+            <a:ext cx="1220008" cy="600164"/>
           </a:xfrm>
           <a:prstGeom prst="rect">
             <a:avLst/>
@@ -11482,19 +11978,27 @@
           <a:lstStyle/>
           <a:p>
             <a:r>
-              <a:rPr lang="en-US" sz="1100" dirty="0"/>
-              <a:t>Harmful function API set </a:t>
-            </a:r>
-            <a:endParaRPr lang="en-SG" sz="1100" dirty="0"/>
+              <a:rPr lang="en-US" sz="1100" dirty="0">
+                <a:solidFill>
+                  <a:srgbClr val="FF0000"/>
+                </a:solidFill>
+              </a:rPr>
+              <a:t>Step1: Trojan harmful task request </a:t>
+            </a:r>
+            <a:endParaRPr lang="en-SG" sz="1100" dirty="0">
+              <a:solidFill>
+                <a:srgbClr val="FF0000"/>
+              </a:solidFill>
+            </a:endParaRPr>
           </a:p>
         </p:txBody>
       </p:sp>
       <p:cxnSp>
         <p:nvCxnSpPr>
-          <p:cNvPr id="129" name="Straight Connector 128">
-            <a:extLst>
-              <a:ext uri="{FF2B5EF4-FFF2-40B4-BE49-F238E27FC236}">
-                <a16:creationId xmlns:a16="http://schemas.microsoft.com/office/drawing/2014/main" id="{101E0F44-26D4-860F-68FF-B71FBCB11FA2}"/>
+          <p:cNvPr id="80" name="Connector: Elbow 79">
+            <a:extLst>
+              <a:ext uri="{FF2B5EF4-FFF2-40B4-BE49-F238E27FC236}">
+                <a16:creationId xmlns:a16="http://schemas.microsoft.com/office/drawing/2014/main" id="{7E62F0AF-C42E-B0DF-8D4E-0A293B097D15}"/>
               </a:ext>
             </a:extLst>
           </p:cNvPr>
@@ -11504,20 +12008,21 @@
           <p:nvPr/>
         </p:nvCxnSpPr>
         <p:spPr>
-          <a:xfrm>
-            <a:off x="1670367" y="1200355"/>
-            <a:ext cx="0" cy="4945886"/>
-          </a:xfrm>
-          <a:prstGeom prst="line">
-            <a:avLst/>
-          </a:prstGeom>
-          <a:ln w="19050">
+          <a:xfrm flipV="1">
+            <a:off x="5933444" y="2791539"/>
+            <a:ext cx="1931484" cy="477427"/>
+          </a:xfrm>
+          <a:prstGeom prst="bentConnector3">
+            <a:avLst>
+              <a:gd name="adj1" fmla="val 58048"/>
+            </a:avLst>
+          </a:prstGeom>
+          <a:ln>
             <a:solidFill>
-              <a:schemeClr val="bg1">
-                <a:lumMod val="65000"/>
-              </a:schemeClr>
+              <a:srgbClr val="FF0000"/>
             </a:solidFill>
-            <a:prstDash val="sysDash"/>
+            <a:prstDash val="dash"/>
+            <a:tailEnd type="triangle"/>
           </a:ln>
         </p:spPr>
         <p:style>
@@ -11537,45 +12042,45 @@
       </p:cxnSp>
       <p:cxnSp>
         <p:nvCxnSpPr>
-          <p:cNvPr id="158" name="Connector: Elbow 157">
-            <a:extLst>
-              <a:ext uri="{FF2B5EF4-FFF2-40B4-BE49-F238E27FC236}">
-                <a16:creationId xmlns:a16="http://schemas.microsoft.com/office/drawing/2014/main" id="{706D025C-F33D-3ACA-1695-27E7886DEFB5}"/>
+          <p:cNvPr id="84" name="Connector: Elbow 83">
+            <a:extLst>
+              <a:ext uri="{FF2B5EF4-FFF2-40B4-BE49-F238E27FC236}">
+                <a16:creationId xmlns:a16="http://schemas.microsoft.com/office/drawing/2014/main" id="{D38192E6-AFDD-69A9-848D-E86D548C3ED9}"/>
               </a:ext>
             </a:extLst>
           </p:cNvPr>
           <p:cNvCxnSpPr>
             <a:cxnSpLocks/>
-            <a:stCxn id="4" idx="1"/>
-            <a:endCxn id="161" idx="0"/>
           </p:cNvCxnSpPr>
           <p:nvPr/>
         </p:nvCxnSpPr>
         <p:spPr>
-          <a:xfrm rot="10800000" flipV="1">
-            <a:off x="1002990" y="1617196"/>
-            <a:ext cx="1267657" cy="2262958"/>
-          </a:xfrm>
-          <a:prstGeom prst="bentConnector2">
-            <a:avLst/>
-          </a:prstGeom>
-          <a:ln w="19050">
+          <a:xfrm flipV="1">
+            <a:off x="8511422" y="2310741"/>
+            <a:ext cx="985869" cy="522287"/>
+          </a:xfrm>
+          <a:prstGeom prst="bentConnector3">
+            <a:avLst>
+              <a:gd name="adj1" fmla="val 62058"/>
+            </a:avLst>
+          </a:prstGeom>
+          <a:ln>
             <a:solidFill>
-              <a:srgbClr val="7030A0"/>
+              <a:srgbClr val="FF0000"/>
             </a:solidFill>
-            <a:prstDash val="sysDash"/>
+            <a:prstDash val="dash"/>
             <a:tailEnd type="triangle"/>
           </a:ln>
         </p:spPr>
         <p:style>
           <a:lnRef idx="1">
-            <a:schemeClr val="dk1"/>
+            <a:schemeClr val="accent1"/>
           </a:lnRef>
           <a:fillRef idx="0">
-            <a:schemeClr val="dk1"/>
+            <a:schemeClr val="accent1"/>
           </a:fillRef>
           <a:effectRef idx="0">
-            <a:schemeClr val="dk1"/>
+            <a:schemeClr val="accent1"/>
           </a:effectRef>
           <a:fontRef idx="minor">
             <a:schemeClr val="tx1"/>
@@ -11584,10 +12089,54 @@
       </p:cxnSp>
       <p:sp>
         <p:nvSpPr>
-          <p:cNvPr id="161" name="Rectangle 160">
-            <a:extLst>
-              <a:ext uri="{FF2B5EF4-FFF2-40B4-BE49-F238E27FC236}">
-                <a16:creationId xmlns:a16="http://schemas.microsoft.com/office/drawing/2014/main" id="{A0DE2197-DA26-9FB5-B18A-5855F2121B6F}"/>
+          <p:cNvPr id="89" name="TextBox 88">
+            <a:extLst>
+              <a:ext uri="{FF2B5EF4-FFF2-40B4-BE49-F238E27FC236}">
+                <a16:creationId xmlns:a16="http://schemas.microsoft.com/office/drawing/2014/main" id="{3410E387-B9B4-CA52-FB37-DD5DD925EE73}"/>
+              </a:ext>
+            </a:extLst>
+          </p:cNvPr>
+          <p:cNvSpPr txBox="1"/>
+          <p:nvPr/>
+        </p:nvSpPr>
+        <p:spPr>
+          <a:xfrm>
+            <a:off x="7043984" y="2863770"/>
+            <a:ext cx="1481710" cy="430887"/>
+          </a:xfrm>
+          <a:prstGeom prst="rect">
+            <a:avLst/>
+          </a:prstGeom>
+          <a:noFill/>
+        </p:spPr>
+        <p:txBody>
+          <a:bodyPr wrap="square" rtlCol="0">
+            <a:spAutoFit/>
+          </a:bodyPr>
+          <a:lstStyle/>
+          <a:p>
+            <a:r>
+              <a:rPr lang="en-US" sz="1100" dirty="0">
+                <a:solidFill>
+                  <a:srgbClr val="FF0000"/>
+                </a:solidFill>
+              </a:rPr>
+              <a:t>Step2: Trojan task execution feedback </a:t>
+            </a:r>
+            <a:endParaRPr lang="en-SG" sz="1100" dirty="0">
+              <a:solidFill>
+                <a:srgbClr val="FF0000"/>
+              </a:solidFill>
+            </a:endParaRPr>
+          </a:p>
+        </p:txBody>
+      </p:sp>
+      <p:sp>
+        <p:nvSpPr>
+          <p:cNvPr id="90" name="Rectangle 89">
+            <a:extLst>
+              <a:ext uri="{FF2B5EF4-FFF2-40B4-BE49-F238E27FC236}">
+                <a16:creationId xmlns:a16="http://schemas.microsoft.com/office/drawing/2014/main" id="{4D8764EF-C941-594B-55D2-9CF1B8BF171F}"/>
               </a:ext>
             </a:extLst>
           </p:cNvPr>
@@ -11596,14 +12145,64 @@
         </p:nvSpPr>
         <p:spPr>
           <a:xfrm>
-            <a:off x="568606" y="3880154"/>
-            <a:ext cx="868765" cy="534116"/>
+            <a:off x="9335671" y="3999320"/>
+            <a:ext cx="1983280" cy="1938553"/>
+          </a:xfrm>
+          <a:prstGeom prst="rect">
+            <a:avLst/>
+          </a:prstGeom>
+          <a:ln>
+            <a:solidFill>
+              <a:srgbClr val="0070C0"/>
+            </a:solidFill>
+            <a:prstDash val="sysDash"/>
+          </a:ln>
+        </p:spPr>
+        <p:style>
+          <a:lnRef idx="2">
+            <a:schemeClr val="dk1"/>
+          </a:lnRef>
+          <a:fillRef idx="1">
+            <a:schemeClr val="lt1"/>
+          </a:fillRef>
+          <a:effectRef idx="0">
+            <a:schemeClr val="dk1"/>
+          </a:effectRef>
+          <a:fontRef idx="minor">
+            <a:schemeClr val="dk1"/>
+          </a:fontRef>
+        </p:style>
+        <p:txBody>
+          <a:bodyPr rtlCol="0" anchor="ctr"/>
+          <a:lstStyle/>
+          <a:p>
+            <a:pPr algn="ctr"/>
+            <a:endParaRPr lang="en-SG" dirty="0"/>
+          </a:p>
+        </p:txBody>
+      </p:sp>
+      <p:sp>
+        <p:nvSpPr>
+          <p:cNvPr id="141" name="Rectangle 140">
+            <a:extLst>
+              <a:ext uri="{FF2B5EF4-FFF2-40B4-BE49-F238E27FC236}">
+                <a16:creationId xmlns:a16="http://schemas.microsoft.com/office/drawing/2014/main" id="{68496A39-00C0-1875-6546-0A283F36F79C}"/>
+              </a:ext>
+            </a:extLst>
+          </p:cNvPr>
+          <p:cNvSpPr/>
+          <p:nvPr/>
+        </p:nvSpPr>
+        <p:spPr>
+          <a:xfrm>
+            <a:off x="9497291" y="4151720"/>
+            <a:ext cx="1537898" cy="339917"/>
           </a:xfrm>
           <a:prstGeom prst="rect">
             <a:avLst/>
           </a:prstGeom>
           <a:solidFill>
-            <a:srgbClr val="7030A0"/>
+            <a:srgbClr val="C00000"/>
           </a:solidFill>
         </p:spPr>
         <p:style>
@@ -11627,85 +12226,32 @@
           <a:lstStyle/>
           <a:p>
             <a:r>
-              <a:rPr lang="en-US" sz="1200" b="1" dirty="0"/>
-              <a:t>Process Watchdog</a:t>
-            </a:r>
-            <a:endParaRPr lang="en-SG" sz="1200" b="1" dirty="0"/>
-          </a:p>
-        </p:txBody>
-      </p:sp>
-      <p:sp>
-        <p:nvSpPr>
-          <p:cNvPr id="164" name="Rectangle 163">
-            <a:extLst>
-              <a:ext uri="{FF2B5EF4-FFF2-40B4-BE49-F238E27FC236}">
-                <a16:creationId xmlns:a16="http://schemas.microsoft.com/office/drawing/2014/main" id="{7139A361-2C2B-DD11-B75C-39A08C86273F}"/>
-              </a:ext>
-            </a:extLst>
-          </p:cNvPr>
-          <p:cNvSpPr/>
-          <p:nvPr/>
-        </p:nvSpPr>
-        <p:spPr>
-          <a:xfrm>
-            <a:off x="536729" y="5153332"/>
-            <a:ext cx="900798" cy="534116"/>
-          </a:xfrm>
-          <a:prstGeom prst="rect">
-            <a:avLst/>
-          </a:prstGeom>
-          <a:solidFill>
-            <a:srgbClr val="7030A0"/>
-          </a:solidFill>
-        </p:spPr>
-        <p:style>
-          <a:lnRef idx="2">
-            <a:schemeClr val="accent1">
-              <a:shade val="50000"/>
-            </a:schemeClr>
-          </a:lnRef>
-          <a:fillRef idx="1">
-            <a:schemeClr val="accent1"/>
-          </a:fillRef>
-          <a:effectRef idx="0">
-            <a:schemeClr val="accent1"/>
-          </a:effectRef>
-          <a:fontRef idx="minor">
-            <a:schemeClr val="lt1"/>
-          </a:fontRef>
-        </p:style>
-        <p:txBody>
-          <a:bodyPr rtlCol="0" anchor="ctr"/>
-          <a:lstStyle/>
-          <a:p>
-            <a:r>
-              <a:rPr lang="en-US" sz="1200" b="1" dirty="0"/>
-              <a:t>Process protection loop</a:t>
-            </a:r>
-            <a:endParaRPr lang="en-SG" sz="1200" b="1" dirty="0"/>
+              <a:rPr lang="en-US" sz="1100" b="1" dirty="0"/>
+              <a:t>Trojan controller hub </a:t>
+            </a:r>
+            <a:endParaRPr lang="en-SG" sz="1100" b="1" dirty="0"/>
           </a:p>
         </p:txBody>
       </p:sp>
       <p:cxnSp>
         <p:nvCxnSpPr>
-          <p:cNvPr id="166" name="Straight Arrow Connector 165">
-            <a:extLst>
-              <a:ext uri="{FF2B5EF4-FFF2-40B4-BE49-F238E27FC236}">
-                <a16:creationId xmlns:a16="http://schemas.microsoft.com/office/drawing/2014/main" id="{D021293F-F398-87E6-BD51-116C915C7494}"/>
+          <p:cNvPr id="91" name="Straight Arrow Connector 90">
+            <a:extLst>
+              <a:ext uri="{FF2B5EF4-FFF2-40B4-BE49-F238E27FC236}">
+                <a16:creationId xmlns:a16="http://schemas.microsoft.com/office/drawing/2014/main" id="{4C0955FF-5509-262A-1BC3-367371888769}"/>
               </a:ext>
             </a:extLst>
           </p:cNvPr>
           <p:cNvCxnSpPr>
             <a:cxnSpLocks/>
-            <a:stCxn id="161" idx="2"/>
-            <a:endCxn id="164" idx="0"/>
+            <a:stCxn id="135" idx="2"/>
           </p:cNvCxnSpPr>
           <p:nvPr/>
         </p:nvCxnSpPr>
         <p:spPr>
-          <a:xfrm flipH="1">
-            <a:off x="987128" y="4414270"/>
-            <a:ext cx="0" cy="739062"/>
+          <a:xfrm>
+            <a:off x="9939528" y="1844142"/>
+            <a:ext cx="0" cy="231703"/>
           </a:xfrm>
           <a:prstGeom prst="straightConnector1">
             <a:avLst/>
@@ -11736,10 +12282,49 @@
       </p:cxnSp>
       <p:sp>
         <p:nvSpPr>
-          <p:cNvPr id="170" name="Rectangle 169">
-            <a:extLst>
-              <a:ext uri="{FF2B5EF4-FFF2-40B4-BE49-F238E27FC236}">
-                <a16:creationId xmlns:a16="http://schemas.microsoft.com/office/drawing/2014/main" id="{B820F933-46F9-EEF8-209D-53BD75A73B19}"/>
+          <p:cNvPr id="95" name="TextBox 94">
+            <a:extLst>
+              <a:ext uri="{FF2B5EF4-FFF2-40B4-BE49-F238E27FC236}">
+                <a16:creationId xmlns:a16="http://schemas.microsoft.com/office/drawing/2014/main" id="{011C6A8D-3D8F-03D4-D9D3-54BD4F4ECAC9}"/>
+              </a:ext>
+            </a:extLst>
+          </p:cNvPr>
+          <p:cNvSpPr txBox="1"/>
+          <p:nvPr/>
+        </p:nvSpPr>
+        <p:spPr>
+          <a:xfrm>
+            <a:off x="9350855" y="3673984"/>
+            <a:ext cx="2280528" cy="307777"/>
+          </a:xfrm>
+          <a:prstGeom prst="rect">
+            <a:avLst/>
+          </a:prstGeom>
+          <a:noFill/>
+        </p:spPr>
+        <p:txBody>
+          <a:bodyPr wrap="square" rtlCol="0">
+            <a:spAutoFit/>
+          </a:bodyPr>
+          <a:lstStyle/>
+          <a:p>
+            <a:r>
+              <a:rPr lang="en-SG" sz="1400" b="1" dirty="0">
+                <a:solidFill>
+                  <a:srgbClr val="C00000"/>
+                </a:solidFill>
+              </a:rPr>
+              <a:t>Outside Attacker Machine</a:t>
+            </a:r>
+          </a:p>
+        </p:txBody>
+      </p:sp>
+      <p:sp>
+        <p:nvSpPr>
+          <p:cNvPr id="96" name="Rectangle 95">
+            <a:extLst>
+              <a:ext uri="{FF2B5EF4-FFF2-40B4-BE49-F238E27FC236}">
+                <a16:creationId xmlns:a16="http://schemas.microsoft.com/office/drawing/2014/main" id="{58F9B662-5C55-76F6-E155-C2B2BE68B79E}"/>
               </a:ext>
             </a:extLst>
           </p:cNvPr>
@@ -11748,16 +12333,14 @@
         </p:nvSpPr>
         <p:spPr>
           <a:xfrm>
-            <a:off x="1804992" y="5258777"/>
-            <a:ext cx="868765" cy="323227"/>
+            <a:off x="10124731" y="5425476"/>
+            <a:ext cx="1137696" cy="401443"/>
           </a:xfrm>
           <a:prstGeom prst="rect">
             <a:avLst/>
           </a:prstGeom>
           <a:solidFill>
-            <a:schemeClr val="accent6">
-              <a:lumMod val="75000"/>
-            </a:schemeClr>
+            <a:srgbClr val="C00000"/>
           </a:solidFill>
         </p:spPr>
         <p:style>
@@ -11781,137 +12364,41 @@
           <a:lstStyle/>
           <a:p>
             <a:r>
-              <a:rPr lang="en-US" sz="1200" b="1" dirty="0"/>
-              <a:t>Process Watchdog</a:t>
-            </a:r>
-            <a:endParaRPr lang="en-SG" sz="1200" b="1" dirty="0"/>
+              <a:rPr lang="en-US" sz="1100" b="1" dirty="0"/>
+              <a:t>Trojan report handler</a:t>
+            </a:r>
           </a:p>
         </p:txBody>
       </p:sp>
       <p:cxnSp>
         <p:nvCxnSpPr>
-          <p:cNvPr id="171" name="Connector: Elbow 170">
-            <a:extLst>
-              <a:ext uri="{FF2B5EF4-FFF2-40B4-BE49-F238E27FC236}">
-                <a16:creationId xmlns:a16="http://schemas.microsoft.com/office/drawing/2014/main" id="{13DB6B99-192B-BC37-2874-089E3BF20339}"/>
+          <p:cNvPr id="97" name="Connector: Elbow 96">
+            <a:extLst>
+              <a:ext uri="{FF2B5EF4-FFF2-40B4-BE49-F238E27FC236}">
+                <a16:creationId xmlns:a16="http://schemas.microsoft.com/office/drawing/2014/main" id="{EC7FC813-B981-B100-4FA3-5E9FB08B28D8}"/>
               </a:ext>
             </a:extLst>
           </p:cNvPr>
           <p:cNvCxnSpPr>
             <a:cxnSpLocks/>
-            <a:stCxn id="4" idx="1"/>
+            <a:stCxn id="22" idx="3"/>
+            <a:endCxn id="53" idx="3"/>
           </p:cNvCxnSpPr>
           <p:nvPr/>
         </p:nvCxnSpPr>
         <p:spPr>
-          <a:xfrm rot="10800000" flipV="1">
-            <a:off x="2067266" y="1617196"/>
-            <a:ext cx="203381" cy="3623608"/>
+          <a:xfrm>
+            <a:off x="7296546" y="3743533"/>
+            <a:ext cx="1054569" cy="524295"/>
           </a:xfrm>
           <a:prstGeom prst="bentConnector2">
-            <a:avLst/>
-          </a:prstGeom>
-          <a:ln>
-            <a:tailEnd type="triangle"/>
-          </a:ln>
-        </p:spPr>
-        <p:style>
-          <a:lnRef idx="1">
-            <a:schemeClr val="dk1"/>
-          </a:lnRef>
-          <a:fillRef idx="0">
-            <a:schemeClr val="dk1"/>
-          </a:fillRef>
-          <a:effectRef idx="0">
-            <a:schemeClr val="dk1"/>
-          </a:effectRef>
-          <a:fontRef idx="minor">
-            <a:schemeClr val="tx1"/>
-          </a:fontRef>
-        </p:style>
-      </p:cxnSp>
-      <p:sp>
-        <p:nvSpPr>
-          <p:cNvPr id="181" name="Rectangle 180">
-            <a:extLst>
-              <a:ext uri="{FF2B5EF4-FFF2-40B4-BE49-F238E27FC236}">
-                <a16:creationId xmlns:a16="http://schemas.microsoft.com/office/drawing/2014/main" id="{8BD0F3B7-705F-7229-398C-F099009DFB90}"/>
-              </a:ext>
-            </a:extLst>
-          </p:cNvPr>
-          <p:cNvSpPr/>
-          <p:nvPr/>
-        </p:nvSpPr>
-        <p:spPr>
-          <a:xfrm>
-            <a:off x="1792799" y="5811111"/>
-            <a:ext cx="1788195" cy="267058"/>
-          </a:xfrm>
-          <a:prstGeom prst="rect">
-            <a:avLst/>
-          </a:prstGeom>
-          <a:solidFill>
-            <a:schemeClr val="accent6">
-              <a:lumMod val="75000"/>
-            </a:schemeClr>
-          </a:solidFill>
-        </p:spPr>
-        <p:style>
-          <a:lnRef idx="2">
-            <a:schemeClr val="accent1">
-              <a:shade val="50000"/>
-            </a:schemeClr>
-          </a:lnRef>
-          <a:fillRef idx="1">
-            <a:schemeClr val="accent1"/>
-          </a:fillRef>
-          <a:effectRef idx="0">
-            <a:schemeClr val="accent1"/>
-          </a:effectRef>
-          <a:fontRef idx="minor">
-            <a:schemeClr val="lt1"/>
-          </a:fontRef>
-        </p:style>
-        <p:txBody>
-          <a:bodyPr rtlCol="0" anchor="ctr"/>
-          <a:lstStyle/>
-          <a:p>
-            <a:r>
-              <a:rPr lang="en-US" sz="1200" b="1" dirty="0"/>
-              <a:t>Process protection loop</a:t>
-            </a:r>
-            <a:endParaRPr lang="en-SG" sz="1200" b="1" dirty="0"/>
-          </a:p>
-        </p:txBody>
-      </p:sp>
-      <p:cxnSp>
-        <p:nvCxnSpPr>
-          <p:cNvPr id="182" name="Straight Arrow Connector 181">
-            <a:extLst>
-              <a:ext uri="{FF2B5EF4-FFF2-40B4-BE49-F238E27FC236}">
-                <a16:creationId xmlns:a16="http://schemas.microsoft.com/office/drawing/2014/main" id="{D46A0065-04AA-67C5-296B-25F9B7E24DB0}"/>
-              </a:ext>
-            </a:extLst>
-          </p:cNvPr>
-          <p:cNvCxnSpPr>
-            <a:cxnSpLocks/>
-            <a:stCxn id="164" idx="3"/>
-            <a:endCxn id="170" idx="1"/>
-          </p:cNvCxnSpPr>
-          <p:nvPr/>
-        </p:nvCxnSpPr>
-        <p:spPr>
-          <a:xfrm>
-            <a:off x="1437527" y="5420390"/>
-            <a:ext cx="367465" cy="1"/>
-          </a:xfrm>
-          <a:prstGeom prst="straightConnector1">
             <a:avLst/>
           </a:prstGeom>
           <a:ln>
             <a:solidFill>
-              <a:srgbClr val="7030A0"/>
+              <a:srgbClr val="FF0000"/>
             </a:solidFill>
+            <a:prstDash val="dash"/>
             <a:tailEnd type="triangle"/>
           </a:ln>
         </p:spPr>
@@ -11932,23 +12419,162 @@
       </p:cxnSp>
       <p:cxnSp>
         <p:nvCxnSpPr>
-          <p:cNvPr id="184" name="Straight Arrow Connector 183">
-            <a:extLst>
-              <a:ext uri="{FF2B5EF4-FFF2-40B4-BE49-F238E27FC236}">
-                <a16:creationId xmlns:a16="http://schemas.microsoft.com/office/drawing/2014/main" id="{D5B2A1A0-500E-C90E-508F-A130E4F21318}"/>
+          <p:cNvPr id="100" name="Connector: Elbow 99">
+            <a:extLst>
+              <a:ext uri="{FF2B5EF4-FFF2-40B4-BE49-F238E27FC236}">
+                <a16:creationId xmlns:a16="http://schemas.microsoft.com/office/drawing/2014/main" id="{73BBAC9B-4EFE-9DBE-68A1-C02D4DBA2EC3}"/>
               </a:ext>
             </a:extLst>
           </p:cNvPr>
           <p:cNvCxnSpPr>
             <a:cxnSpLocks/>
-            <a:stCxn id="170" idx="2"/>
+            <a:stCxn id="53" idx="0"/>
+            <a:endCxn id="141" idx="1"/>
           </p:cNvCxnSpPr>
           <p:nvPr/>
         </p:nvCxnSpPr>
         <p:spPr>
-          <a:xfrm>
-            <a:off x="2239375" y="5582004"/>
-            <a:ext cx="0" cy="247501"/>
+          <a:xfrm flipV="1">
+            <a:off x="8918089" y="4321679"/>
+            <a:ext cx="579202" cy="216085"/>
+          </a:xfrm>
+          <a:prstGeom prst="bentConnector3">
+            <a:avLst>
+              <a:gd name="adj1" fmla="val 50000"/>
+            </a:avLst>
+          </a:prstGeom>
+          <a:ln>
+            <a:solidFill>
+              <a:srgbClr val="FF0000"/>
+            </a:solidFill>
+            <a:prstDash val="dash"/>
+            <a:tailEnd type="triangle"/>
+          </a:ln>
+        </p:spPr>
+        <p:style>
+          <a:lnRef idx="1">
+            <a:schemeClr val="accent1"/>
+          </a:lnRef>
+          <a:fillRef idx="0">
+            <a:schemeClr val="accent1"/>
+          </a:fillRef>
+          <a:effectRef idx="0">
+            <a:schemeClr val="accent1"/>
+          </a:effectRef>
+          <a:fontRef idx="minor">
+            <a:schemeClr val="tx1"/>
+          </a:fontRef>
+        </p:style>
+      </p:cxnSp>
+      <p:sp>
+        <p:nvSpPr>
+          <p:cNvPr id="103" name="TextBox 102">
+            <a:extLst>
+              <a:ext uri="{FF2B5EF4-FFF2-40B4-BE49-F238E27FC236}">
+                <a16:creationId xmlns:a16="http://schemas.microsoft.com/office/drawing/2014/main" id="{275325D0-A1A9-3C6F-9860-890DF3B8FFD7}"/>
+              </a:ext>
+            </a:extLst>
+          </p:cNvPr>
+          <p:cNvSpPr txBox="1"/>
+          <p:nvPr/>
+        </p:nvSpPr>
+        <p:spPr>
+          <a:xfrm>
+            <a:off x="8308085" y="3429000"/>
+            <a:ext cx="1093728" cy="769441"/>
+          </a:xfrm>
+          <a:prstGeom prst="rect">
+            <a:avLst/>
+          </a:prstGeom>
+          <a:noFill/>
+        </p:spPr>
+        <p:txBody>
+          <a:bodyPr wrap="square" rtlCol="0">
+            <a:spAutoFit/>
+          </a:bodyPr>
+          <a:lstStyle/>
+          <a:p>
+            <a:r>
+              <a:rPr lang="en-US" sz="1100" dirty="0">
+                <a:solidFill>
+                  <a:srgbClr val="FF0000"/>
+                </a:solidFill>
+              </a:rPr>
+              <a:t>Step1: Trojan report to hub and fetch the task assign to it</a:t>
+            </a:r>
+            <a:endParaRPr lang="en-SG" sz="1100" dirty="0">
+              <a:solidFill>
+                <a:srgbClr val="FF0000"/>
+              </a:solidFill>
+            </a:endParaRPr>
+          </a:p>
+        </p:txBody>
+      </p:sp>
+      <p:cxnSp>
+        <p:nvCxnSpPr>
+          <p:cNvPr id="104" name="Connector: Elbow 103">
+            <a:extLst>
+              <a:ext uri="{FF2B5EF4-FFF2-40B4-BE49-F238E27FC236}">
+                <a16:creationId xmlns:a16="http://schemas.microsoft.com/office/drawing/2014/main" id="{816118A2-E36B-38E0-6E34-E3A1BF57B98A}"/>
+              </a:ext>
+            </a:extLst>
+          </p:cNvPr>
+          <p:cNvCxnSpPr>
+            <a:cxnSpLocks/>
+          </p:cNvCxnSpPr>
+          <p:nvPr/>
+        </p:nvCxnSpPr>
+        <p:spPr>
+          <a:xfrm rot="10800000">
+            <a:off x="8750807" y="4706740"/>
+            <a:ext cx="766206" cy="261856"/>
+          </a:xfrm>
+          <a:prstGeom prst="bentConnector3">
+            <a:avLst>
+              <a:gd name="adj1" fmla="val 50000"/>
+            </a:avLst>
+          </a:prstGeom>
+          <a:ln>
+            <a:solidFill>
+              <a:srgbClr val="FF0000"/>
+            </a:solidFill>
+            <a:prstDash val="dash"/>
+            <a:tailEnd type="triangle"/>
+          </a:ln>
+        </p:spPr>
+        <p:style>
+          <a:lnRef idx="1">
+            <a:schemeClr val="accent1"/>
+          </a:lnRef>
+          <a:fillRef idx="0">
+            <a:schemeClr val="accent1"/>
+          </a:fillRef>
+          <a:effectRef idx="0">
+            <a:schemeClr val="accent1"/>
+          </a:effectRef>
+          <a:fontRef idx="minor">
+            <a:schemeClr val="tx1"/>
+          </a:fontRef>
+        </p:style>
+      </p:cxnSp>
+      <p:cxnSp>
+        <p:nvCxnSpPr>
+          <p:cNvPr id="105" name="Straight Arrow Connector 104">
+            <a:extLst>
+              <a:ext uri="{FF2B5EF4-FFF2-40B4-BE49-F238E27FC236}">
+                <a16:creationId xmlns:a16="http://schemas.microsoft.com/office/drawing/2014/main" id="{738D5F7D-AFFD-971E-EEFE-2AE8CA890D48}"/>
+              </a:ext>
+            </a:extLst>
+          </p:cNvPr>
+          <p:cNvCxnSpPr>
+            <a:cxnSpLocks/>
+          </p:cNvCxnSpPr>
+          <p:nvPr/>
+        </p:nvCxnSpPr>
+        <p:spPr>
+          <a:xfrm>
+            <a:off x="10835640" y="4512590"/>
+            <a:ext cx="0" cy="907800"/>
           </a:xfrm>
           <a:prstGeom prst="straightConnector1">
             <a:avLst/>
@@ -11977,34 +12603,84 @@
           </a:fontRef>
         </p:style>
       </p:cxnSp>
+      <p:sp>
+        <p:nvSpPr>
+          <p:cNvPr id="111" name="Rectangle 110">
+            <a:extLst>
+              <a:ext uri="{FF2B5EF4-FFF2-40B4-BE49-F238E27FC236}">
+                <a16:creationId xmlns:a16="http://schemas.microsoft.com/office/drawing/2014/main" id="{781DD35C-7AF4-FD56-D670-EB49F0CC9B34}"/>
+              </a:ext>
+            </a:extLst>
+          </p:cNvPr>
+          <p:cNvSpPr/>
+          <p:nvPr/>
+        </p:nvSpPr>
+        <p:spPr>
+          <a:xfrm>
+            <a:off x="9517013" y="4776279"/>
+            <a:ext cx="1137696" cy="401443"/>
+          </a:xfrm>
+          <a:prstGeom prst="rect">
+            <a:avLst/>
+          </a:prstGeom>
+          <a:solidFill>
+            <a:srgbClr val="C00000"/>
+          </a:solidFill>
+        </p:spPr>
+        <p:style>
+          <a:lnRef idx="2">
+            <a:schemeClr val="accent1">
+              <a:shade val="50000"/>
+            </a:schemeClr>
+          </a:lnRef>
+          <a:fillRef idx="1">
+            <a:schemeClr val="accent1"/>
+          </a:fillRef>
+          <a:effectRef idx="0">
+            <a:schemeClr val="accent1"/>
+          </a:effectRef>
+          <a:fontRef idx="minor">
+            <a:schemeClr val="lt1"/>
+          </a:fontRef>
+        </p:style>
+        <p:txBody>
+          <a:bodyPr rtlCol="0" anchor="ctr"/>
+          <a:lstStyle/>
+          <a:p>
+            <a:r>
+              <a:rPr lang="en-US" sz="1100" b="1" dirty="0"/>
+              <a:t>Trojans' tasks manager </a:t>
+            </a:r>
+          </a:p>
+        </p:txBody>
+      </p:sp>
       <p:cxnSp>
         <p:nvCxnSpPr>
-          <p:cNvPr id="195" name="Connector: Elbow 194">
-            <a:extLst>
-              <a:ext uri="{FF2B5EF4-FFF2-40B4-BE49-F238E27FC236}">
-                <a16:creationId xmlns:a16="http://schemas.microsoft.com/office/drawing/2014/main" id="{130B7444-97F1-EA32-FF42-A356E7651151}"/>
+          <p:cNvPr id="119" name="Straight Arrow Connector 118">
+            <a:extLst>
+              <a:ext uri="{FF2B5EF4-FFF2-40B4-BE49-F238E27FC236}">
+                <a16:creationId xmlns:a16="http://schemas.microsoft.com/office/drawing/2014/main" id="{0BF6993E-9F35-E66B-3C76-634CBCED3856}"/>
               </a:ext>
             </a:extLst>
           </p:cNvPr>
           <p:cNvCxnSpPr>
-            <a:stCxn id="181" idx="1"/>
-            <a:endCxn id="161" idx="3"/>
+            <a:cxnSpLocks/>
           </p:cNvCxnSpPr>
           <p:nvPr/>
         </p:nvCxnSpPr>
         <p:spPr>
-          <a:xfrm rot="10800000">
-            <a:off x="1437371" y="4147212"/>
-            <a:ext cx="355428" cy="1797428"/>
-          </a:xfrm>
-          <a:prstGeom prst="bentConnector3">
-            <a:avLst>
-              <a:gd name="adj1" fmla="val 68009"/>
-            </a:avLst>
+          <a:xfrm>
+            <a:off x="9845040" y="4491637"/>
+            <a:ext cx="0" cy="284642"/>
+          </a:xfrm>
+          <a:prstGeom prst="straightConnector1">
+            <a:avLst/>
           </a:prstGeom>
           <a:ln>
             <a:solidFill>
-              <a:srgbClr val="7030A0"/>
+              <a:schemeClr val="accent6">
+                <a:lumMod val="50000"/>
+              </a:schemeClr>
             </a:solidFill>
             <a:tailEnd type="triangle"/>
           </a:ln>
@@ -12024,12 +12700,59 @@
           </a:fontRef>
         </p:style>
       </p:cxnSp>
-      <p:sp>
-        <p:nvSpPr>
-          <p:cNvPr id="197" name="TextBox 196">
-            <a:extLst>
-              <a:ext uri="{FF2B5EF4-FFF2-40B4-BE49-F238E27FC236}">
-                <a16:creationId xmlns:a16="http://schemas.microsoft.com/office/drawing/2014/main" id="{4A94FE0A-A433-6338-1A94-6586967DDF61}"/>
+      <p:cxnSp>
+        <p:nvCxnSpPr>
+          <p:cNvPr id="131" name="Connector: Elbow 130">
+            <a:extLst>
+              <a:ext uri="{FF2B5EF4-FFF2-40B4-BE49-F238E27FC236}">
+                <a16:creationId xmlns:a16="http://schemas.microsoft.com/office/drawing/2014/main" id="{6E30BEC5-0A10-2805-A4EE-5B64ED9ACB0D}"/>
+              </a:ext>
+            </a:extLst>
+          </p:cNvPr>
+          <p:cNvCxnSpPr>
+            <a:cxnSpLocks/>
+          </p:cNvCxnSpPr>
+          <p:nvPr/>
+        </p:nvCxnSpPr>
+        <p:spPr>
+          <a:xfrm rot="10800000">
+            <a:off x="7262853" y="3857326"/>
+            <a:ext cx="941154" cy="410502"/>
+          </a:xfrm>
+          <a:prstGeom prst="bentConnector3">
+            <a:avLst>
+              <a:gd name="adj1" fmla="val 450"/>
+            </a:avLst>
+          </a:prstGeom>
+          <a:ln>
+            <a:solidFill>
+              <a:srgbClr val="FF0000"/>
+            </a:solidFill>
+            <a:prstDash val="dash"/>
+            <a:tailEnd type="triangle"/>
+          </a:ln>
+        </p:spPr>
+        <p:style>
+          <a:lnRef idx="1">
+            <a:schemeClr val="accent1"/>
+          </a:lnRef>
+          <a:fillRef idx="0">
+            <a:schemeClr val="accent1"/>
+          </a:fillRef>
+          <a:effectRef idx="0">
+            <a:schemeClr val="accent1"/>
+          </a:effectRef>
+          <a:fontRef idx="minor">
+            <a:schemeClr val="tx1"/>
+          </a:fontRef>
+        </p:style>
+      </p:cxnSp>
+      <p:sp>
+        <p:nvSpPr>
+          <p:cNvPr id="134" name="TextBox 133">
+            <a:extLst>
+              <a:ext uri="{FF2B5EF4-FFF2-40B4-BE49-F238E27FC236}">
+                <a16:creationId xmlns:a16="http://schemas.microsoft.com/office/drawing/2014/main" id="{57D8840C-CFCB-5DB1-5308-E1570B63BB5B}"/>
               </a:ext>
             </a:extLst>
           </p:cNvPr>
@@ -12038,8 +12761,8 @@
         </p:nvSpPr>
         <p:spPr>
           <a:xfrm>
-            <a:off x="1156811" y="4631935"/>
-            <a:ext cx="901481" cy="461665"/>
+            <a:off x="8656257" y="4706740"/>
+            <a:ext cx="1135843" cy="600164"/>
           </a:xfrm>
           <a:prstGeom prst="rect">
             <a:avLst/>
@@ -12053,22 +12776,122 @@
           <a:lstStyle/>
           <a:p>
             <a:r>
-              <a:rPr lang="en-SG" sz="1200" b="1" dirty="0">
+              <a:rPr lang="en-US" sz="1100" dirty="0">
                 <a:solidFill>
-                  <a:srgbClr val="7030A0"/>
+                  <a:srgbClr val="FF0000"/>
                 </a:solidFill>
               </a:rPr>
-              <a:t>Protection deadlock</a:t>
-            </a:r>
-          </a:p>
-        </p:txBody>
-      </p:sp>
-      <p:sp>
-        <p:nvSpPr>
-          <p:cNvPr id="198" name="TextBox 197">
-            <a:extLst>
-              <a:ext uri="{FF2B5EF4-FFF2-40B4-BE49-F238E27FC236}">
-                <a16:creationId xmlns:a16="http://schemas.microsoft.com/office/drawing/2014/main" id="{E844C781-FB3A-5527-C9D5-EC00FB133284}"/>
+              <a:t>Step2: Trojan harmful task request </a:t>
+            </a:r>
+            <a:endParaRPr lang="en-SG" sz="1100" dirty="0">
+              <a:solidFill>
+                <a:srgbClr val="FF0000"/>
+              </a:solidFill>
+            </a:endParaRPr>
+          </a:p>
+        </p:txBody>
+      </p:sp>
+      <p:cxnSp>
+        <p:nvCxnSpPr>
+          <p:cNvPr id="137" name="Connector: Elbow 136">
+            <a:extLst>
+              <a:ext uri="{FF2B5EF4-FFF2-40B4-BE49-F238E27FC236}">
+                <a16:creationId xmlns:a16="http://schemas.microsoft.com/office/drawing/2014/main" id="{F3DB51D4-E50A-3569-3233-CE166E84308E}"/>
+              </a:ext>
+            </a:extLst>
+          </p:cNvPr>
+          <p:cNvCxnSpPr>
+            <a:cxnSpLocks/>
+            <a:endCxn id="53" idx="2"/>
+          </p:cNvCxnSpPr>
+          <p:nvPr/>
+        </p:nvCxnSpPr>
+        <p:spPr>
+          <a:xfrm>
+            <a:off x="7142230" y="4005680"/>
+            <a:ext cx="644486" cy="532084"/>
+          </a:xfrm>
+          <a:prstGeom prst="bentConnector3">
+            <a:avLst>
+              <a:gd name="adj1" fmla="val 1761"/>
+            </a:avLst>
+          </a:prstGeom>
+          <a:ln>
+            <a:solidFill>
+              <a:srgbClr val="FF0000"/>
+            </a:solidFill>
+            <a:prstDash val="dash"/>
+            <a:tailEnd type="triangle"/>
+          </a:ln>
+        </p:spPr>
+        <p:style>
+          <a:lnRef idx="1">
+            <a:schemeClr val="accent1"/>
+          </a:lnRef>
+          <a:fillRef idx="0">
+            <a:schemeClr val="accent1"/>
+          </a:fillRef>
+          <a:effectRef idx="0">
+            <a:schemeClr val="accent1"/>
+          </a:effectRef>
+          <a:fontRef idx="minor">
+            <a:schemeClr val="tx1"/>
+          </a:fontRef>
+        </p:style>
+      </p:cxnSp>
+      <p:cxnSp>
+        <p:nvCxnSpPr>
+          <p:cNvPr id="156" name="Connector: Elbow 155">
+            <a:extLst>
+              <a:ext uri="{FF2B5EF4-FFF2-40B4-BE49-F238E27FC236}">
+                <a16:creationId xmlns:a16="http://schemas.microsoft.com/office/drawing/2014/main" id="{9926C725-8EA0-3352-E003-B3B81B3B8ADD}"/>
+              </a:ext>
+            </a:extLst>
+          </p:cNvPr>
+          <p:cNvCxnSpPr>
+            <a:cxnSpLocks/>
+            <a:stCxn id="53" idx="1"/>
+            <a:endCxn id="96" idx="1"/>
+          </p:cNvCxnSpPr>
+          <p:nvPr/>
+        </p:nvCxnSpPr>
+        <p:spPr>
+          <a:xfrm rot="16200000" flipH="1">
+            <a:off x="8845776" y="4347242"/>
+            <a:ext cx="784295" cy="1773616"/>
+          </a:xfrm>
+          <a:prstGeom prst="bentConnector2">
+            <a:avLst/>
+          </a:prstGeom>
+          <a:ln>
+            <a:solidFill>
+              <a:srgbClr val="FF0000"/>
+            </a:solidFill>
+            <a:prstDash val="dash"/>
+            <a:tailEnd type="triangle"/>
+          </a:ln>
+        </p:spPr>
+        <p:style>
+          <a:lnRef idx="1">
+            <a:schemeClr val="accent1"/>
+          </a:lnRef>
+          <a:fillRef idx="0">
+            <a:schemeClr val="accent1"/>
+          </a:fillRef>
+          <a:effectRef idx="0">
+            <a:schemeClr val="accent1"/>
+          </a:effectRef>
+          <a:fontRef idx="minor">
+            <a:schemeClr val="tx1"/>
+          </a:fontRef>
+        </p:style>
+      </p:cxnSp>
+      <p:sp>
+        <p:nvSpPr>
+          <p:cNvPr id="163" name="TextBox 162">
+            <a:extLst>
+              <a:ext uri="{FF2B5EF4-FFF2-40B4-BE49-F238E27FC236}">
+                <a16:creationId xmlns:a16="http://schemas.microsoft.com/office/drawing/2014/main" id="{DD8CFBF3-11DF-FBEC-1AAC-A9C02F7D614D}"/>
               </a:ext>
             </a:extLst>
           </p:cNvPr>
@@ -12077,8 +12900,8 @@
         </p:nvSpPr>
         <p:spPr>
           <a:xfrm>
-            <a:off x="365366" y="1144002"/>
-            <a:ext cx="1439624" cy="276999"/>
+            <a:off x="7001991" y="4616498"/>
+            <a:ext cx="1168193" cy="600164"/>
           </a:xfrm>
           <a:prstGeom prst="rect">
             <a:avLst/>
@@ -12092,64 +12915,16 @@
           <a:lstStyle/>
           <a:p>
             <a:r>
-              <a:rPr lang="en-US" sz="1200" b="1" dirty="0">
+              <a:rPr lang="en-US" sz="1100" dirty="0">
                 <a:solidFill>
-                  <a:srgbClr val="7030A0"/>
+                  <a:srgbClr val="FF0000"/>
                 </a:solidFill>
               </a:rPr>
-              <a:t>Watchdog process </a:t>
-            </a:r>
-            <a:endParaRPr lang="en-SG" sz="1200" b="1" dirty="0">
+              <a:t>Step3: Trojan task execution feedback </a:t>
+            </a:r>
+            <a:endParaRPr lang="en-SG" sz="1100" dirty="0">
               <a:solidFill>
-                <a:srgbClr val="7030A0"/>
-              </a:solidFill>
-            </a:endParaRPr>
-          </a:p>
-        </p:txBody>
-      </p:sp>
-      <p:sp>
-        <p:nvSpPr>
-          <p:cNvPr id="199" name="TextBox 198">
-            <a:extLst>
-              <a:ext uri="{FF2B5EF4-FFF2-40B4-BE49-F238E27FC236}">
-                <a16:creationId xmlns:a16="http://schemas.microsoft.com/office/drawing/2014/main" id="{0FB7EB53-3280-B645-0196-C1AB9E3F7B52}"/>
-              </a:ext>
-            </a:extLst>
-          </p:cNvPr>
-          <p:cNvSpPr txBox="1"/>
-          <p:nvPr/>
-        </p:nvSpPr>
-        <p:spPr>
-          <a:xfrm>
-            <a:off x="1802786" y="1151681"/>
-            <a:ext cx="1925097" cy="276999"/>
-          </a:xfrm>
-          <a:prstGeom prst="rect">
-            <a:avLst/>
-          </a:prstGeom>
-          <a:noFill/>
-        </p:spPr>
-        <p:txBody>
-          <a:bodyPr wrap="square" rtlCol="0">
-            <a:spAutoFit/>
-          </a:bodyPr>
-          <a:lstStyle/>
-          <a:p>
-            <a:r>
-              <a:rPr lang="en-US" sz="1200" b="1" dirty="0">
-                <a:solidFill>
-                  <a:schemeClr val="accent6">
-                    <a:lumMod val="75000"/>
-                  </a:schemeClr>
-                </a:solidFill>
-              </a:rPr>
-              <a:t>Backdoor trojan process </a:t>
-            </a:r>
-            <a:endParaRPr lang="en-SG" sz="1200" b="1" dirty="0">
-              <a:solidFill>
-                <a:schemeClr val="accent6">
-                  <a:lumMod val="75000"/>
-                </a:schemeClr>
+                <a:srgbClr val="FF0000"/>
               </a:solidFill>
             </a:endParaRPr>
           </a:p>

</xml_diff>

<commit_message>
update the trojan controller code document.
</commit_message>
<xml_diff>
--- a/doc/designDoc.pptx
+++ b/doc/designDoc.pptx
@@ -5,13 +5,14 @@
     <p:sldMasterId id="2147483648" r:id="rId1"/>
   </p:sldMasterIdLst>
   <p:notesMasterIdLst>
-    <p:notesMasterId r:id="rId6"/>
+    <p:notesMasterId r:id="rId7"/>
   </p:notesMasterIdLst>
   <p:sldIdLst>
     <p:sldId id="256" r:id="rId2"/>
     <p:sldId id="291" r:id="rId3"/>
-    <p:sldId id="290" r:id="rId4"/>
-    <p:sldId id="292" r:id="rId5"/>
+    <p:sldId id="293" r:id="rId4"/>
+    <p:sldId id="290" r:id="rId5"/>
+    <p:sldId id="292" r:id="rId6"/>
   </p:sldIdLst>
   <p:sldSz cx="12192000" cy="6858000"/>
   <p:notesSz cx="6858000" cy="9144000"/>
@@ -533,7 +534,7 @@
           <a:p>
             <a:fld id="{5FBC0B8D-E944-47E8-BC23-785C2866B408}" type="slidenum">
               <a:rPr lang="en-SG" smtClean="0"/>
-              <a:t>3</a:t>
+              <a:t>4</a:t>
             </a:fld>
             <a:endParaRPr lang="en-SG"/>
           </a:p>
@@ -617,7 +618,7 @@
           <a:p>
             <a:fld id="{5FBC0B8D-E944-47E8-BC23-785C2866B408}" type="slidenum">
               <a:rPr lang="en-SG" smtClean="0"/>
-              <a:t>4</a:t>
+              <a:t>5</a:t>
             </a:fld>
             <a:endParaRPr lang="en-SG"/>
           </a:p>
@@ -4426,7 +4427,7 @@
         <p:spPr>
           <a:xfrm>
             <a:off x="1060704" y="2679191"/>
-            <a:ext cx="5394960" cy="1248997"/>
+            <a:ext cx="5610988" cy="1314422"/>
           </a:xfrm>
           <a:prstGeom prst="rect">
             <a:avLst/>
@@ -4661,46 +4662,10 @@
       </p:pic>
       <p:pic>
         <p:nvPicPr>
-          <p:cNvPr id="12" name="Picture 11" descr="A red horse on wheels&#10;&#10;Description automatically generated">
-            <a:extLst>
-              <a:ext uri="{FF2B5EF4-FFF2-40B4-BE49-F238E27FC236}">
-                <a16:creationId xmlns:a16="http://schemas.microsoft.com/office/drawing/2014/main" id="{182E1790-8672-3AF2-FE36-26856E8DEFD2}"/>
-              </a:ext>
-            </a:extLst>
-          </p:cNvPr>
-          <p:cNvPicPr>
-            <a:picLocks noChangeAspect="1"/>
-          </p:cNvPicPr>
-          <p:nvPr/>
-        </p:nvPicPr>
-        <p:blipFill>
-          <a:blip r:embed="rId3">
-            <a:extLst>
-              <a:ext uri="{28A0092B-C50C-407E-A947-70E740481C1C}">
-                <a14:useLocalDpi xmlns:a14="http://schemas.microsoft.com/office/drawing/2010/main" val="0"/>
-              </a:ext>
-            </a:extLst>
-          </a:blip>
-          <a:stretch>
-            <a:fillRect/>
-          </a:stretch>
-        </p:blipFill>
-        <p:spPr>
-          <a:xfrm flipH="1">
-            <a:off x="5370877" y="2949994"/>
-            <a:ext cx="433728" cy="433728"/>
-          </a:xfrm>
-          <a:prstGeom prst="rect">
-            <a:avLst/>
-          </a:prstGeom>
-        </p:spPr>
-      </p:pic>
-      <p:pic>
-        <p:nvPicPr>
-          <p:cNvPr id="14" name="Picture 13">
-            <a:extLst>
-              <a:ext uri="{FF2B5EF4-FFF2-40B4-BE49-F238E27FC236}">
-                <a16:creationId xmlns:a16="http://schemas.microsoft.com/office/drawing/2014/main" id="{E895F98F-4F0A-A5A3-0B49-274BD40C72F4}"/>
+          <p:cNvPr id="15" name="Picture 14">
+            <a:extLst>
+              <a:ext uri="{FF2B5EF4-FFF2-40B4-BE49-F238E27FC236}">
+                <a16:creationId xmlns:a16="http://schemas.microsoft.com/office/drawing/2014/main" id="{9FE97EF0-155B-D202-1AF1-E67769CCAA80}"/>
               </a:ext>
             </a:extLst>
           </p:cNvPr>
@@ -4717,37 +4682,7 @@
         </p:blipFill>
         <p:spPr>
           <a:xfrm>
-            <a:off x="5254766" y="3172597"/>
-            <a:ext cx="610172" cy="512804"/>
-          </a:xfrm>
-          <a:prstGeom prst="rect">
-            <a:avLst/>
-          </a:prstGeom>
-        </p:spPr>
-      </p:pic>
-      <p:pic>
-        <p:nvPicPr>
-          <p:cNvPr id="15" name="Picture 14">
-            <a:extLst>
-              <a:ext uri="{FF2B5EF4-FFF2-40B4-BE49-F238E27FC236}">
-                <a16:creationId xmlns:a16="http://schemas.microsoft.com/office/drawing/2014/main" id="{9FE97EF0-155B-D202-1AF1-E67769CCAA80}"/>
-              </a:ext>
-            </a:extLst>
-          </p:cNvPr>
-          <p:cNvPicPr>
-            <a:picLocks noChangeAspect="1"/>
-          </p:cNvPicPr>
-          <p:nvPr/>
-        </p:nvPicPr>
-        <p:blipFill>
-          <a:blip r:embed="rId5"/>
-          <a:stretch>
-            <a:fillRect/>
-          </a:stretch>
-        </p:blipFill>
-        <p:spPr>
-          <a:xfrm>
-            <a:off x="6240563" y="3142686"/>
+            <a:off x="6475599" y="2785211"/>
             <a:ext cx="489507" cy="542715"/>
           </a:xfrm>
           <a:prstGeom prst="rect">
@@ -4770,20 +4705,21 @@
             </a:extLst>
           </p:cNvPr>
           <p:cNvCxnSpPr>
-            <a:stCxn id="14" idx="1"/>
+            <a:cxnSpLocks/>
+            <a:stCxn id="19" idx="1"/>
             <a:endCxn id="11" idx="0"/>
           </p:cNvCxnSpPr>
           <p:nvPr/>
         </p:nvCxnSpPr>
         <p:spPr>
           <a:xfrm rot="10800000">
-            <a:off x="4065540" y="3037035"/>
-            <a:ext cx="1189227" cy="391964"/>
+            <a:off x="4065539" y="3037036"/>
+            <a:ext cx="1700470" cy="4453"/>
           </a:xfrm>
           <a:prstGeom prst="bentConnector4">
             <a:avLst>
-              <a:gd name="adj1" fmla="val 39845"/>
-              <a:gd name="adj2" fmla="val 158322"/>
+              <a:gd name="adj1" fmla="val 42898"/>
+              <a:gd name="adj2" fmla="val 3796205"/>
             </a:avLst>
           </a:prstGeom>
           <a:ln w="28575">
@@ -4928,8 +4864,8 @@
         </p:nvSpPr>
         <p:spPr>
           <a:xfrm>
-            <a:off x="6707554" y="3299173"/>
-            <a:ext cx="1689699" cy="461665"/>
+            <a:off x="6917249" y="2699435"/>
+            <a:ext cx="1689699" cy="646331"/>
           </a:xfrm>
           <a:prstGeom prst="rect">
             <a:avLst/>
@@ -4944,7 +4880,7 @@
           <a:p>
             <a:r>
               <a:rPr lang="en-SG" sz="1200" b="1" dirty="0"/>
-              <a:t>Hacker inside company internal subnet</a:t>
+              <a:t>Hacker-1 inside company internal subnet</a:t>
             </a:r>
           </a:p>
         </p:txBody>
@@ -4963,7 +4899,7 @@
         </p:nvSpPr>
         <p:spPr>
           <a:xfrm>
-            <a:off x="4738325" y="2321813"/>
+            <a:off x="4545076" y="2256759"/>
             <a:ext cx="1402228" cy="646331"/>
           </a:xfrm>
           <a:prstGeom prst="rect">
@@ -5002,7 +4938,7 @@
         </p:nvSpPr>
         <p:spPr>
           <a:xfrm>
-            <a:off x="4849711" y="3689291"/>
+            <a:off x="4898691" y="3708329"/>
             <a:ext cx="1352643" cy="276999"/>
           </a:xfrm>
           <a:prstGeom prst="rect">
@@ -5330,7 +5266,7 @@
           <p:nvPr/>
         </p:nvPicPr>
         <p:blipFill>
-          <a:blip r:embed="rId6">
+          <a:blip r:embed="rId5">
             <a:extLst>
               <a:ext uri="{28A0092B-C50C-407E-A947-70E740481C1C}">
                 <a14:useLocalDpi xmlns:a14="http://schemas.microsoft.com/office/drawing/2010/main" val="0"/>
@@ -5366,7 +5302,7 @@
           <p:nvPr/>
         </p:nvPicPr>
         <p:blipFill>
-          <a:blip r:embed="rId5"/>
+          <a:blip r:embed="rId4"/>
           <a:stretch>
             <a:fillRect/>
           </a:stretch>
@@ -5400,8 +5336,8 @@
         </p:nvSpPr>
         <p:spPr>
           <a:xfrm>
-            <a:off x="7135141" y="2144474"/>
-            <a:ext cx="1601564" cy="646331"/>
+            <a:off x="7342719" y="2065402"/>
+            <a:ext cx="1547083" cy="461665"/>
           </a:xfrm>
           <a:prstGeom prst="rect">
             <a:avLst/>
@@ -5416,7 +5352,7 @@
           <a:p>
             <a:r>
               <a:rPr lang="en-SG" sz="1200" b="1" dirty="0"/>
-              <a:t>Hacker outside company in the internet </a:t>
+              <a:t>Hacker in the internet </a:t>
             </a:r>
           </a:p>
         </p:txBody>
@@ -5487,7 +5423,7 @@
         </p:nvSpPr>
         <p:spPr>
           <a:xfrm>
-            <a:off x="5887275" y="3351988"/>
+            <a:off x="6134157" y="2989202"/>
             <a:ext cx="303192" cy="111327"/>
           </a:xfrm>
           <a:prstGeom prst="leftRightArrow">
@@ -5690,7 +5626,7 @@
           <p:nvPr/>
         </p:nvPicPr>
         <p:blipFill>
-          <a:blip r:embed="rId4"/>
+          <a:blip r:embed="rId6"/>
           <a:stretch>
             <a:fillRect/>
           </a:stretch>
@@ -5755,7 +5691,7 @@
           <p:nvPr/>
         </p:nvPicPr>
         <p:blipFill rotWithShape="1">
-          <a:blip r:embed="rId6">
+          <a:blip r:embed="rId5">
             <a:extLst>
               <a:ext uri="{28A0092B-C50C-407E-A947-70E740481C1C}">
                 <a14:useLocalDpi xmlns:a14="http://schemas.microsoft.com/office/drawing/2010/main" val="0"/>
@@ -6287,6 +6223,309 @@
           </a:p>
         </p:txBody>
       </p:sp>
+      <p:pic>
+        <p:nvPicPr>
+          <p:cNvPr id="16" name="Picture 15" descr="A red horse on wheels&#10;&#10;Description automatically generated">
+            <a:extLst>
+              <a:ext uri="{FF2B5EF4-FFF2-40B4-BE49-F238E27FC236}">
+                <a16:creationId xmlns:a16="http://schemas.microsoft.com/office/drawing/2014/main" id="{A4291B37-B70A-E348-3658-436063C4AA39}"/>
+              </a:ext>
+            </a:extLst>
+          </p:cNvPr>
+          <p:cNvPicPr>
+            <a:picLocks noChangeAspect="1"/>
+          </p:cNvPicPr>
+          <p:nvPr/>
+        </p:nvPicPr>
+        <p:blipFill>
+          <a:blip r:embed="rId3">
+            <a:extLst>
+              <a:ext uri="{28A0092B-C50C-407E-A947-70E740481C1C}">
+                <a14:useLocalDpi xmlns:a14="http://schemas.microsoft.com/office/drawing/2010/main" val="0"/>
+              </a:ext>
+            </a:extLst>
+          </a:blip>
+          <a:stretch>
+            <a:fillRect/>
+          </a:stretch>
+        </p:blipFill>
+        <p:spPr>
+          <a:xfrm flipH="1">
+            <a:off x="5797224" y="2761708"/>
+            <a:ext cx="227494" cy="227494"/>
+          </a:xfrm>
+          <a:prstGeom prst="rect">
+            <a:avLst/>
+          </a:prstGeom>
+        </p:spPr>
+      </p:pic>
+      <p:pic>
+        <p:nvPicPr>
+          <p:cNvPr id="19" name="Picture 18">
+            <a:extLst>
+              <a:ext uri="{FF2B5EF4-FFF2-40B4-BE49-F238E27FC236}">
+                <a16:creationId xmlns:a16="http://schemas.microsoft.com/office/drawing/2014/main" id="{AAA963DE-554E-A279-5285-6D806BF2347A}"/>
+              </a:ext>
+            </a:extLst>
+          </p:cNvPr>
+          <p:cNvPicPr>
+            <a:picLocks noChangeAspect="1"/>
+          </p:cNvPicPr>
+          <p:nvPr/>
+        </p:nvPicPr>
+        <p:blipFill>
+          <a:blip r:embed="rId6"/>
+          <a:stretch>
+            <a:fillRect/>
+          </a:stretch>
+        </p:blipFill>
+        <p:spPr>
+          <a:xfrm>
+            <a:off x="5766009" y="2907003"/>
+            <a:ext cx="320040" cy="268970"/>
+          </a:xfrm>
+          <a:prstGeom prst="rect">
+            <a:avLst/>
+          </a:prstGeom>
+        </p:spPr>
+      </p:pic>
+      <p:pic>
+        <p:nvPicPr>
+          <p:cNvPr id="30" name="Picture 29" descr="A red horse on wheels&#10;&#10;Description automatically generated">
+            <a:extLst>
+              <a:ext uri="{FF2B5EF4-FFF2-40B4-BE49-F238E27FC236}">
+                <a16:creationId xmlns:a16="http://schemas.microsoft.com/office/drawing/2014/main" id="{D9115F43-EEB9-604E-EAC5-809E3033222C}"/>
+              </a:ext>
+            </a:extLst>
+          </p:cNvPr>
+          <p:cNvPicPr>
+            <a:picLocks noChangeAspect="1"/>
+          </p:cNvPicPr>
+          <p:nvPr/>
+        </p:nvPicPr>
+        <p:blipFill>
+          <a:blip r:embed="rId3">
+            <a:extLst>
+              <a:ext uri="{28A0092B-C50C-407E-A947-70E740481C1C}">
+                <a14:useLocalDpi xmlns:a14="http://schemas.microsoft.com/office/drawing/2010/main" val="0"/>
+              </a:ext>
+            </a:extLst>
+          </a:blip>
+          <a:stretch>
+            <a:fillRect/>
+          </a:stretch>
+        </p:blipFill>
+        <p:spPr>
+          <a:xfrm flipH="1">
+            <a:off x="5557369" y="3344675"/>
+            <a:ext cx="227494" cy="227494"/>
+          </a:xfrm>
+          <a:prstGeom prst="rect">
+            <a:avLst/>
+          </a:prstGeom>
+        </p:spPr>
+      </p:pic>
+      <p:pic>
+        <p:nvPicPr>
+          <p:cNvPr id="33" name="Picture 32">
+            <a:extLst>
+              <a:ext uri="{FF2B5EF4-FFF2-40B4-BE49-F238E27FC236}">
+                <a16:creationId xmlns:a16="http://schemas.microsoft.com/office/drawing/2014/main" id="{AE4C7EE2-B55B-3AEC-A6B7-F5CBD1CF9E86}"/>
+              </a:ext>
+            </a:extLst>
+          </p:cNvPr>
+          <p:cNvPicPr>
+            <a:picLocks noChangeAspect="1"/>
+          </p:cNvPicPr>
+          <p:nvPr/>
+        </p:nvPicPr>
+        <p:blipFill>
+          <a:blip r:embed="rId6"/>
+          <a:stretch>
+            <a:fillRect/>
+          </a:stretch>
+        </p:blipFill>
+        <p:spPr>
+          <a:xfrm>
+            <a:off x="5526154" y="3489970"/>
+            <a:ext cx="320040" cy="268970"/>
+          </a:xfrm>
+          <a:prstGeom prst="rect">
+            <a:avLst/>
+          </a:prstGeom>
+        </p:spPr>
+      </p:pic>
+      <p:pic>
+        <p:nvPicPr>
+          <p:cNvPr id="34" name="Picture 33">
+            <a:extLst>
+              <a:ext uri="{FF2B5EF4-FFF2-40B4-BE49-F238E27FC236}">
+                <a16:creationId xmlns:a16="http://schemas.microsoft.com/office/drawing/2014/main" id="{EC60290D-3100-62A5-5EDE-09AD068511E0}"/>
+              </a:ext>
+            </a:extLst>
+          </p:cNvPr>
+          <p:cNvPicPr>
+            <a:picLocks noChangeAspect="1"/>
+          </p:cNvPicPr>
+          <p:nvPr/>
+        </p:nvPicPr>
+        <p:blipFill>
+          <a:blip r:embed="rId4"/>
+          <a:stretch>
+            <a:fillRect/>
+          </a:stretch>
+        </p:blipFill>
+        <p:spPr>
+          <a:xfrm>
+            <a:off x="6291441" y="3407652"/>
+            <a:ext cx="489507" cy="542715"/>
+          </a:xfrm>
+          <a:prstGeom prst="rect">
+            <a:avLst/>
+          </a:prstGeom>
+          <a:ln w="9525">
+            <a:solidFill>
+              <a:schemeClr val="tx1"/>
+            </a:solidFill>
+          </a:ln>
+        </p:spPr>
+      </p:pic>
+      <p:sp>
+        <p:nvSpPr>
+          <p:cNvPr id="35" name="Arrow: Left-Right 34">
+            <a:extLst>
+              <a:ext uri="{FF2B5EF4-FFF2-40B4-BE49-F238E27FC236}">
+                <a16:creationId xmlns:a16="http://schemas.microsoft.com/office/drawing/2014/main" id="{718025A1-5C04-5A25-FACD-C000CEFE060F}"/>
+              </a:ext>
+            </a:extLst>
+          </p:cNvPr>
+          <p:cNvSpPr/>
+          <p:nvPr/>
+        </p:nvSpPr>
+        <p:spPr>
+          <a:xfrm>
+            <a:off x="5887899" y="3536818"/>
+            <a:ext cx="303192" cy="111327"/>
+          </a:xfrm>
+          <a:prstGeom prst="leftRightArrow">
+            <a:avLst/>
+          </a:prstGeom>
+          <a:noFill/>
+          <a:ln>
+            <a:solidFill>
+              <a:srgbClr val="FF0000"/>
+            </a:solidFill>
+          </a:ln>
+        </p:spPr>
+        <p:style>
+          <a:lnRef idx="2">
+            <a:schemeClr val="accent1">
+              <a:shade val="15000"/>
+            </a:schemeClr>
+          </a:lnRef>
+          <a:fillRef idx="1">
+            <a:schemeClr val="accent1"/>
+          </a:fillRef>
+          <a:effectRef idx="0">
+            <a:schemeClr val="accent1"/>
+          </a:effectRef>
+          <a:fontRef idx="minor">
+            <a:schemeClr val="lt1"/>
+          </a:fontRef>
+        </p:style>
+        <p:txBody>
+          <a:bodyPr rtlCol="0" anchor="ctr"/>
+          <a:lstStyle/>
+          <a:p>
+            <a:pPr algn="ctr"/>
+            <a:endParaRPr lang="en-SG"/>
+          </a:p>
+        </p:txBody>
+      </p:sp>
+      <p:sp>
+        <p:nvSpPr>
+          <p:cNvPr id="36" name="TextBox 35">
+            <a:extLst>
+              <a:ext uri="{FF2B5EF4-FFF2-40B4-BE49-F238E27FC236}">
+                <a16:creationId xmlns:a16="http://schemas.microsoft.com/office/drawing/2014/main" id="{BF5974C6-F8F1-6A06-5C20-F2C2AA49BBDF}"/>
+              </a:ext>
+            </a:extLst>
+          </p:cNvPr>
+          <p:cNvSpPr txBox="1"/>
+          <p:nvPr/>
+        </p:nvSpPr>
+        <p:spPr>
+          <a:xfrm>
+            <a:off x="6755150" y="3362235"/>
+            <a:ext cx="1689699" cy="646331"/>
+          </a:xfrm>
+          <a:prstGeom prst="rect">
+            <a:avLst/>
+          </a:prstGeom>
+          <a:noFill/>
+        </p:spPr>
+        <p:txBody>
+          <a:bodyPr wrap="square" rtlCol="0">
+            <a:spAutoFit/>
+          </a:bodyPr>
+          <a:lstStyle/>
+          <a:p>
+            <a:r>
+              <a:rPr lang="en-SG" sz="1200" b="1" dirty="0"/>
+              <a:t>Hacker-2 inside company internal subnet</a:t>
+            </a:r>
+          </a:p>
+        </p:txBody>
+      </p:sp>
+      <p:cxnSp>
+        <p:nvCxnSpPr>
+          <p:cNvPr id="37" name="Connector: Elbow 36">
+            <a:extLst>
+              <a:ext uri="{FF2B5EF4-FFF2-40B4-BE49-F238E27FC236}">
+                <a16:creationId xmlns:a16="http://schemas.microsoft.com/office/drawing/2014/main" id="{B376BF6D-2DC8-816D-CC7D-51F85E710F11}"/>
+              </a:ext>
+            </a:extLst>
+          </p:cNvPr>
+          <p:cNvCxnSpPr>
+            <a:cxnSpLocks/>
+            <a:stCxn id="33" idx="1"/>
+            <a:endCxn id="11" idx="1"/>
+          </p:cNvCxnSpPr>
+          <p:nvPr/>
+        </p:nvCxnSpPr>
+        <p:spPr>
+          <a:xfrm rot="10800000">
+            <a:off x="4307074" y="3278569"/>
+            <a:ext cx="1219081" cy="345886"/>
+          </a:xfrm>
+          <a:prstGeom prst="bentConnector3">
+            <a:avLst>
+              <a:gd name="adj1" fmla="val 50000"/>
+            </a:avLst>
+          </a:prstGeom>
+          <a:ln w="28575">
+            <a:solidFill>
+              <a:srgbClr val="FF0000"/>
+            </a:solidFill>
+            <a:prstDash val="sysDash"/>
+            <a:tailEnd type="triangle"/>
+          </a:ln>
+        </p:spPr>
+        <p:style>
+          <a:lnRef idx="1">
+            <a:schemeClr val="accent1"/>
+          </a:lnRef>
+          <a:fillRef idx="0">
+            <a:schemeClr val="accent1"/>
+          </a:fillRef>
+          <a:effectRef idx="0">
+            <a:schemeClr val="accent1"/>
+          </a:effectRef>
+          <a:fontRef idx="minor">
+            <a:schemeClr val="tx1"/>
+          </a:fontRef>
+        </p:style>
+      </p:cxnSp>
     </p:spTree>
     <p:extLst>
       <p:ext uri="{BB962C8B-B14F-4D97-AF65-F5344CB8AC3E}">
@@ -6317,6 +6556,1719 @@
           <a:chExt cx="0" cy="0"/>
         </a:xfrm>
       </p:grpSpPr>
+      <p:cxnSp>
+        <p:nvCxnSpPr>
+          <p:cNvPr id="4" name="Straight Arrow Connector 3">
+            <a:extLst>
+              <a:ext uri="{FF2B5EF4-FFF2-40B4-BE49-F238E27FC236}">
+                <a16:creationId xmlns:a16="http://schemas.microsoft.com/office/drawing/2014/main" id="{A7257861-546E-512E-ADB3-9D1F3AFF89F0}"/>
+              </a:ext>
+            </a:extLst>
+          </p:cNvPr>
+          <p:cNvCxnSpPr>
+            <a:cxnSpLocks/>
+          </p:cNvCxnSpPr>
+          <p:nvPr/>
+        </p:nvCxnSpPr>
+        <p:spPr>
+          <a:xfrm>
+            <a:off x="2048453" y="898804"/>
+            <a:ext cx="0" cy="4729110"/>
+          </a:xfrm>
+          <a:prstGeom prst="straightConnector1">
+            <a:avLst/>
+          </a:prstGeom>
+          <a:ln w="28575">
+            <a:solidFill>
+              <a:schemeClr val="tx1"/>
+            </a:solidFill>
+            <a:tailEnd type="triangle"/>
+          </a:ln>
+        </p:spPr>
+        <p:style>
+          <a:lnRef idx="1">
+            <a:schemeClr val="accent1"/>
+          </a:lnRef>
+          <a:fillRef idx="0">
+            <a:schemeClr val="accent1"/>
+          </a:fillRef>
+          <a:effectRef idx="0">
+            <a:schemeClr val="accent1"/>
+          </a:effectRef>
+          <a:fontRef idx="minor">
+            <a:schemeClr val="tx1"/>
+          </a:fontRef>
+        </p:style>
+      </p:cxnSp>
+      <p:sp>
+        <p:nvSpPr>
+          <p:cNvPr id="6" name="TextBox 5">
+            <a:extLst>
+              <a:ext uri="{FF2B5EF4-FFF2-40B4-BE49-F238E27FC236}">
+                <a16:creationId xmlns:a16="http://schemas.microsoft.com/office/drawing/2014/main" id="{63419ED0-9D2F-5B30-D501-BADD6536F240}"/>
+              </a:ext>
+            </a:extLst>
+          </p:cNvPr>
+          <p:cNvSpPr txBox="1"/>
+          <p:nvPr/>
+        </p:nvSpPr>
+        <p:spPr>
+          <a:xfrm>
+            <a:off x="1463040" y="535189"/>
+            <a:ext cx="1168464" cy="363615"/>
+          </a:xfrm>
+          <a:prstGeom prst="rect">
+            <a:avLst/>
+          </a:prstGeom>
+          <a:solidFill>
+            <a:schemeClr val="bg1"/>
+          </a:solidFill>
+          <a:ln w="19050">
+            <a:solidFill>
+              <a:schemeClr val="tx1"/>
+            </a:solidFill>
+          </a:ln>
+        </p:spPr>
+        <p:txBody>
+          <a:bodyPr wrap="square" lIns="36000" tIns="36000" rIns="36000" bIns="36000" rtlCol="0">
+            <a:noAutofit/>
+          </a:bodyPr>
+          <a:lstStyle/>
+          <a:p>
+            <a:r>
+              <a:rPr lang="en-SG" sz="1100" b="1" dirty="0"/>
+              <a:t>Back door trojan [Victim host] </a:t>
+            </a:r>
+          </a:p>
+        </p:txBody>
+      </p:sp>
+      <p:sp>
+        <p:nvSpPr>
+          <p:cNvPr id="7" name="TextBox 6">
+            <a:extLst>
+              <a:ext uri="{FF2B5EF4-FFF2-40B4-BE49-F238E27FC236}">
+                <a16:creationId xmlns:a16="http://schemas.microsoft.com/office/drawing/2014/main" id="{AC77A312-BF7E-4272-ADE0-3198631282F6}"/>
+              </a:ext>
+            </a:extLst>
+          </p:cNvPr>
+          <p:cNvSpPr txBox="1"/>
+          <p:nvPr/>
+        </p:nvSpPr>
+        <p:spPr>
+          <a:xfrm>
+            <a:off x="5795647" y="494466"/>
+            <a:ext cx="1233849" cy="404337"/>
+          </a:xfrm>
+          <a:prstGeom prst="rect">
+            <a:avLst/>
+          </a:prstGeom>
+          <a:solidFill>
+            <a:schemeClr val="bg1"/>
+          </a:solidFill>
+          <a:ln w="19050">
+            <a:solidFill>
+              <a:srgbClr val="0070C0"/>
+            </a:solidFill>
+          </a:ln>
+        </p:spPr>
+        <p:txBody>
+          <a:bodyPr wrap="square" lIns="36000" tIns="36000" rIns="36000" bIns="36000" rtlCol="0">
+            <a:noAutofit/>
+          </a:bodyPr>
+          <a:lstStyle/>
+          <a:p>
+            <a:r>
+              <a:rPr lang="en-SG" sz="1100" b="1" dirty="0">
+                <a:solidFill>
+                  <a:schemeClr val="accent1">
+                    <a:lumMod val="75000"/>
+                  </a:schemeClr>
+                </a:solidFill>
+              </a:rPr>
+              <a:t>Hacker-1’s Trojan connector </a:t>
+            </a:r>
+          </a:p>
+        </p:txBody>
+      </p:sp>
+      <p:sp>
+        <p:nvSpPr>
+          <p:cNvPr id="8" name="TextBox 7">
+            <a:extLst>
+              <a:ext uri="{FF2B5EF4-FFF2-40B4-BE49-F238E27FC236}">
+                <a16:creationId xmlns:a16="http://schemas.microsoft.com/office/drawing/2014/main" id="{17FFF642-3C5B-3B26-43AB-CD98719FA817}"/>
+              </a:ext>
+            </a:extLst>
+          </p:cNvPr>
+          <p:cNvSpPr txBox="1"/>
+          <p:nvPr/>
+        </p:nvSpPr>
+        <p:spPr>
+          <a:xfrm>
+            <a:off x="9424933" y="494466"/>
+            <a:ext cx="1155859" cy="404337"/>
+          </a:xfrm>
+          <a:prstGeom prst="rect">
+            <a:avLst/>
+          </a:prstGeom>
+          <a:solidFill>
+            <a:schemeClr val="bg1"/>
+          </a:solidFill>
+          <a:ln w="19050">
+            <a:solidFill>
+              <a:srgbClr val="FF0000"/>
+            </a:solidFill>
+          </a:ln>
+        </p:spPr>
+        <p:txBody>
+          <a:bodyPr wrap="square" lIns="36000" tIns="36000" rIns="36000" bIns="36000" rtlCol="0">
+            <a:noAutofit/>
+          </a:bodyPr>
+          <a:lstStyle/>
+          <a:p>
+            <a:r>
+              <a:rPr lang="en-SG" sz="1100" b="1" dirty="0">
+                <a:solidFill>
+                  <a:srgbClr val="FF0000"/>
+                </a:solidFill>
+              </a:rPr>
+              <a:t>Hacker-N Trojan connector </a:t>
+            </a:r>
+          </a:p>
+        </p:txBody>
+      </p:sp>
+      <p:sp>
+        <p:nvSpPr>
+          <p:cNvPr id="9" name="TextBox 8">
+            <a:extLst>
+              <a:ext uri="{FF2B5EF4-FFF2-40B4-BE49-F238E27FC236}">
+                <a16:creationId xmlns:a16="http://schemas.microsoft.com/office/drawing/2014/main" id="{86BC5DC8-3C95-279F-6DF6-DCF87DAF2B7E}"/>
+              </a:ext>
+            </a:extLst>
+          </p:cNvPr>
+          <p:cNvSpPr txBox="1"/>
+          <p:nvPr/>
+        </p:nvSpPr>
+        <p:spPr>
+          <a:xfrm>
+            <a:off x="3661271" y="494466"/>
+            <a:ext cx="1296282" cy="404337"/>
+          </a:xfrm>
+          <a:prstGeom prst="rect">
+            <a:avLst/>
+          </a:prstGeom>
+          <a:solidFill>
+            <a:schemeClr val="bg1"/>
+          </a:solidFill>
+          <a:ln w="19050">
+            <a:solidFill>
+              <a:schemeClr val="accent6">
+                <a:lumMod val="75000"/>
+              </a:schemeClr>
+            </a:solidFill>
+          </a:ln>
+        </p:spPr>
+        <p:txBody>
+          <a:bodyPr wrap="square" lIns="36000" tIns="36000" rIns="36000" bIns="36000" rtlCol="0">
+            <a:noAutofit/>
+          </a:bodyPr>
+          <a:lstStyle/>
+          <a:p>
+            <a:r>
+              <a:rPr lang="en-SG" sz="1100" b="1" dirty="0">
+                <a:solidFill>
+                  <a:schemeClr val="accent6">
+                    <a:lumMod val="75000"/>
+                  </a:schemeClr>
+                </a:solidFill>
+              </a:rPr>
+              <a:t>Host Service Probe program [defender]</a:t>
+            </a:r>
+          </a:p>
+        </p:txBody>
+      </p:sp>
+      <p:cxnSp>
+        <p:nvCxnSpPr>
+          <p:cNvPr id="10" name="Straight Arrow Connector 9">
+            <a:extLst>
+              <a:ext uri="{FF2B5EF4-FFF2-40B4-BE49-F238E27FC236}">
+                <a16:creationId xmlns:a16="http://schemas.microsoft.com/office/drawing/2014/main" id="{84BCC9DA-7F4A-0826-B36D-AB2EF74F4D3B}"/>
+              </a:ext>
+            </a:extLst>
+          </p:cNvPr>
+          <p:cNvCxnSpPr>
+            <a:cxnSpLocks/>
+          </p:cNvCxnSpPr>
+          <p:nvPr/>
+        </p:nvCxnSpPr>
+        <p:spPr>
+          <a:xfrm>
+            <a:off x="4303524" y="898803"/>
+            <a:ext cx="0" cy="4729110"/>
+          </a:xfrm>
+          <a:prstGeom prst="straightConnector1">
+            <a:avLst/>
+          </a:prstGeom>
+          <a:ln w="28575">
+            <a:solidFill>
+              <a:schemeClr val="accent6">
+                <a:lumMod val="75000"/>
+              </a:schemeClr>
+            </a:solidFill>
+            <a:tailEnd type="triangle"/>
+          </a:ln>
+        </p:spPr>
+        <p:style>
+          <a:lnRef idx="1">
+            <a:schemeClr val="accent1"/>
+          </a:lnRef>
+          <a:fillRef idx="0">
+            <a:schemeClr val="accent1"/>
+          </a:fillRef>
+          <a:effectRef idx="0">
+            <a:schemeClr val="accent1"/>
+          </a:effectRef>
+          <a:fontRef idx="minor">
+            <a:schemeClr val="tx1"/>
+          </a:fontRef>
+        </p:style>
+      </p:cxnSp>
+      <p:cxnSp>
+        <p:nvCxnSpPr>
+          <p:cNvPr id="11" name="Straight Arrow Connector 10">
+            <a:extLst>
+              <a:ext uri="{FF2B5EF4-FFF2-40B4-BE49-F238E27FC236}">
+                <a16:creationId xmlns:a16="http://schemas.microsoft.com/office/drawing/2014/main" id="{51A8D67A-64F6-84DB-4091-7599A6B5A546}"/>
+              </a:ext>
+            </a:extLst>
+          </p:cNvPr>
+          <p:cNvCxnSpPr>
+            <a:cxnSpLocks/>
+          </p:cNvCxnSpPr>
+          <p:nvPr/>
+        </p:nvCxnSpPr>
+        <p:spPr>
+          <a:xfrm>
+            <a:off x="6343085" y="898803"/>
+            <a:ext cx="0" cy="4729110"/>
+          </a:xfrm>
+          <a:prstGeom prst="straightConnector1">
+            <a:avLst/>
+          </a:prstGeom>
+          <a:ln w="28575">
+            <a:solidFill>
+              <a:srgbClr val="0070C0"/>
+            </a:solidFill>
+            <a:tailEnd type="triangle"/>
+          </a:ln>
+        </p:spPr>
+        <p:style>
+          <a:lnRef idx="1">
+            <a:schemeClr val="accent1"/>
+          </a:lnRef>
+          <a:fillRef idx="0">
+            <a:schemeClr val="accent1"/>
+          </a:fillRef>
+          <a:effectRef idx="0">
+            <a:schemeClr val="accent1"/>
+          </a:effectRef>
+          <a:fontRef idx="minor">
+            <a:schemeClr val="tx1"/>
+          </a:fontRef>
+        </p:style>
+      </p:cxnSp>
+      <p:cxnSp>
+        <p:nvCxnSpPr>
+          <p:cNvPr id="12" name="Straight Arrow Connector 11">
+            <a:extLst>
+              <a:ext uri="{FF2B5EF4-FFF2-40B4-BE49-F238E27FC236}">
+                <a16:creationId xmlns:a16="http://schemas.microsoft.com/office/drawing/2014/main" id="{5C0D2AE7-6A90-7E78-15E1-EA52B90E27FD}"/>
+              </a:ext>
+            </a:extLst>
+          </p:cNvPr>
+          <p:cNvCxnSpPr>
+            <a:cxnSpLocks/>
+          </p:cNvCxnSpPr>
+          <p:nvPr/>
+        </p:nvCxnSpPr>
+        <p:spPr>
+          <a:xfrm>
+            <a:off x="10006367" y="885629"/>
+            <a:ext cx="0" cy="4729110"/>
+          </a:xfrm>
+          <a:prstGeom prst="straightConnector1">
+            <a:avLst/>
+          </a:prstGeom>
+          <a:ln w="28575">
+            <a:solidFill>
+              <a:srgbClr val="FF0000"/>
+            </a:solidFill>
+            <a:tailEnd type="triangle"/>
+          </a:ln>
+        </p:spPr>
+        <p:style>
+          <a:lnRef idx="1">
+            <a:schemeClr val="accent1"/>
+          </a:lnRef>
+          <a:fillRef idx="0">
+            <a:schemeClr val="accent1"/>
+          </a:fillRef>
+          <a:effectRef idx="0">
+            <a:schemeClr val="accent1"/>
+          </a:effectRef>
+          <a:fontRef idx="minor">
+            <a:schemeClr val="tx1"/>
+          </a:fontRef>
+        </p:style>
+      </p:cxnSp>
+      <p:cxnSp>
+        <p:nvCxnSpPr>
+          <p:cNvPr id="13" name="Straight Arrow Connector 12">
+            <a:extLst>
+              <a:ext uri="{FF2B5EF4-FFF2-40B4-BE49-F238E27FC236}">
+                <a16:creationId xmlns:a16="http://schemas.microsoft.com/office/drawing/2014/main" id="{559CECF3-791F-B895-A525-AB3BA2B9E603}"/>
+              </a:ext>
+            </a:extLst>
+          </p:cNvPr>
+          <p:cNvCxnSpPr>
+            <a:cxnSpLocks/>
+          </p:cNvCxnSpPr>
+          <p:nvPr/>
+        </p:nvCxnSpPr>
+        <p:spPr>
+          <a:xfrm flipH="1">
+            <a:off x="2034090" y="1368905"/>
+            <a:ext cx="2255071" cy="0"/>
+          </a:xfrm>
+          <a:prstGeom prst="straightConnector1">
+            <a:avLst/>
+          </a:prstGeom>
+          <a:ln>
+            <a:solidFill>
+              <a:schemeClr val="accent6">
+                <a:lumMod val="75000"/>
+              </a:schemeClr>
+            </a:solidFill>
+            <a:prstDash val="dash"/>
+            <a:tailEnd type="triangle"/>
+          </a:ln>
+        </p:spPr>
+        <p:style>
+          <a:lnRef idx="1">
+            <a:schemeClr val="accent1"/>
+          </a:lnRef>
+          <a:fillRef idx="0">
+            <a:schemeClr val="accent1"/>
+          </a:fillRef>
+          <a:effectRef idx="0">
+            <a:schemeClr val="accent1"/>
+          </a:effectRef>
+          <a:fontRef idx="minor">
+            <a:schemeClr val="tx1"/>
+          </a:fontRef>
+        </p:style>
+      </p:cxnSp>
+      <p:sp>
+        <p:nvSpPr>
+          <p:cNvPr id="16" name="TextBox 15">
+            <a:extLst>
+              <a:ext uri="{FF2B5EF4-FFF2-40B4-BE49-F238E27FC236}">
+                <a16:creationId xmlns:a16="http://schemas.microsoft.com/office/drawing/2014/main" id="{59053D5B-BEE3-CB4E-0D13-D02E3A58BEEB}"/>
+              </a:ext>
+            </a:extLst>
+          </p:cNvPr>
+          <p:cNvSpPr txBox="1"/>
+          <p:nvPr/>
+        </p:nvSpPr>
+        <p:spPr>
+          <a:xfrm>
+            <a:off x="2307261" y="929171"/>
+            <a:ext cx="1737456" cy="400110"/>
+          </a:xfrm>
+          <a:prstGeom prst="rect">
+            <a:avLst/>
+          </a:prstGeom>
+          <a:noFill/>
+        </p:spPr>
+        <p:txBody>
+          <a:bodyPr wrap="square" rtlCol="0">
+            <a:spAutoFit/>
+          </a:bodyPr>
+          <a:lstStyle/>
+          <a:p>
+            <a:r>
+              <a:rPr lang="en-SG" sz="1000" b="1" dirty="0">
+                <a:solidFill>
+                  <a:schemeClr val="accent6">
+                    <a:lumMod val="75000"/>
+                  </a:schemeClr>
+                </a:solidFill>
+              </a:rPr>
+              <a:t>1. Handshake request without correct active code</a:t>
+            </a:r>
+          </a:p>
+        </p:txBody>
+      </p:sp>
+      <p:cxnSp>
+        <p:nvCxnSpPr>
+          <p:cNvPr id="17" name="Straight Arrow Connector 16">
+            <a:extLst>
+              <a:ext uri="{FF2B5EF4-FFF2-40B4-BE49-F238E27FC236}">
+                <a16:creationId xmlns:a16="http://schemas.microsoft.com/office/drawing/2014/main" id="{A0F1D4AA-854F-0909-1333-51C8670D249A}"/>
+              </a:ext>
+            </a:extLst>
+          </p:cNvPr>
+          <p:cNvCxnSpPr>
+            <a:cxnSpLocks/>
+          </p:cNvCxnSpPr>
+          <p:nvPr/>
+        </p:nvCxnSpPr>
+        <p:spPr>
+          <a:xfrm flipH="1">
+            <a:off x="2060226" y="1676778"/>
+            <a:ext cx="4294632" cy="0"/>
+          </a:xfrm>
+          <a:prstGeom prst="straightConnector1">
+            <a:avLst/>
+          </a:prstGeom>
+          <a:ln>
+            <a:solidFill>
+              <a:srgbClr val="0070C0"/>
+            </a:solidFill>
+            <a:prstDash val="dash"/>
+            <a:tailEnd type="triangle"/>
+          </a:ln>
+        </p:spPr>
+        <p:style>
+          <a:lnRef idx="1">
+            <a:schemeClr val="accent1"/>
+          </a:lnRef>
+          <a:fillRef idx="0">
+            <a:schemeClr val="accent1"/>
+          </a:fillRef>
+          <a:effectRef idx="0">
+            <a:schemeClr val="accent1"/>
+          </a:effectRef>
+          <a:fontRef idx="minor">
+            <a:schemeClr val="tx1"/>
+          </a:fontRef>
+        </p:style>
+      </p:cxnSp>
+      <p:sp>
+        <p:nvSpPr>
+          <p:cNvPr id="19" name="TextBox 18">
+            <a:extLst>
+              <a:ext uri="{FF2B5EF4-FFF2-40B4-BE49-F238E27FC236}">
+                <a16:creationId xmlns:a16="http://schemas.microsoft.com/office/drawing/2014/main" id="{4A842FA7-94AE-234F-25C4-C789D1965F09}"/>
+              </a:ext>
+            </a:extLst>
+          </p:cNvPr>
+          <p:cNvSpPr txBox="1"/>
+          <p:nvPr/>
+        </p:nvSpPr>
+        <p:spPr>
+          <a:xfrm>
+            <a:off x="4957552" y="1276668"/>
+            <a:ext cx="1737456" cy="400110"/>
+          </a:xfrm>
+          <a:prstGeom prst="rect">
+            <a:avLst/>
+          </a:prstGeom>
+          <a:noFill/>
+        </p:spPr>
+        <p:txBody>
+          <a:bodyPr wrap="square" rtlCol="0">
+            <a:spAutoFit/>
+          </a:bodyPr>
+          <a:lstStyle/>
+          <a:p>
+            <a:r>
+              <a:rPr lang="en-SG" sz="1000" b="1" dirty="0">
+                <a:solidFill>
+                  <a:schemeClr val="accent1">
+                    <a:lumMod val="75000"/>
+                  </a:schemeClr>
+                </a:solidFill>
+              </a:rPr>
+              <a:t>2.1 Handshake request with correct active code</a:t>
+            </a:r>
+          </a:p>
+        </p:txBody>
+      </p:sp>
+      <p:cxnSp>
+        <p:nvCxnSpPr>
+          <p:cNvPr id="20" name="Straight Arrow Connector 19">
+            <a:extLst>
+              <a:ext uri="{FF2B5EF4-FFF2-40B4-BE49-F238E27FC236}">
+                <a16:creationId xmlns:a16="http://schemas.microsoft.com/office/drawing/2014/main" id="{716E031E-87A2-BD9E-46F2-8BB961EF5594}"/>
+              </a:ext>
+            </a:extLst>
+          </p:cNvPr>
+          <p:cNvCxnSpPr>
+            <a:cxnSpLocks/>
+          </p:cNvCxnSpPr>
+          <p:nvPr/>
+        </p:nvCxnSpPr>
+        <p:spPr>
+          <a:xfrm>
+            <a:off x="2060226" y="1883607"/>
+            <a:ext cx="4294632" cy="0"/>
+          </a:xfrm>
+          <a:prstGeom prst="straightConnector1">
+            <a:avLst/>
+          </a:prstGeom>
+          <a:ln>
+            <a:solidFill>
+              <a:srgbClr val="0070C0"/>
+            </a:solidFill>
+            <a:prstDash val="dash"/>
+            <a:tailEnd type="triangle"/>
+          </a:ln>
+        </p:spPr>
+        <p:style>
+          <a:lnRef idx="1">
+            <a:schemeClr val="accent1"/>
+          </a:lnRef>
+          <a:fillRef idx="0">
+            <a:schemeClr val="accent1"/>
+          </a:fillRef>
+          <a:effectRef idx="0">
+            <a:schemeClr val="accent1"/>
+          </a:effectRef>
+          <a:fontRef idx="minor">
+            <a:schemeClr val="tx1"/>
+          </a:fontRef>
+        </p:style>
+      </p:cxnSp>
+      <p:sp>
+        <p:nvSpPr>
+          <p:cNvPr id="23" name="TextBox 22">
+            <a:extLst>
+              <a:ext uri="{FF2B5EF4-FFF2-40B4-BE49-F238E27FC236}">
+                <a16:creationId xmlns:a16="http://schemas.microsoft.com/office/drawing/2014/main" id="{D7ACC407-C97E-5485-950C-F6651EC89A7C}"/>
+              </a:ext>
+            </a:extLst>
+          </p:cNvPr>
+          <p:cNvSpPr txBox="1"/>
+          <p:nvPr/>
+        </p:nvSpPr>
+        <p:spPr>
+          <a:xfrm>
+            <a:off x="2293274" y="1883607"/>
+            <a:ext cx="1737456" cy="246221"/>
+          </a:xfrm>
+          <a:prstGeom prst="rect">
+            <a:avLst/>
+          </a:prstGeom>
+          <a:noFill/>
+        </p:spPr>
+        <p:txBody>
+          <a:bodyPr wrap="square" rtlCol="0">
+            <a:spAutoFit/>
+          </a:bodyPr>
+          <a:lstStyle/>
+          <a:p>
+            <a:r>
+              <a:rPr lang="en-SG" sz="1000" b="1" dirty="0">
+                <a:solidFill>
+                  <a:schemeClr val="accent1">
+                    <a:lumMod val="75000"/>
+                  </a:schemeClr>
+                </a:solidFill>
+              </a:rPr>
+              <a:t>2.2 Trojan ready response </a:t>
+            </a:r>
+          </a:p>
+        </p:txBody>
+      </p:sp>
+      <p:sp>
+        <p:nvSpPr>
+          <p:cNvPr id="24" name="TextBox 23">
+            <a:extLst>
+              <a:ext uri="{FF2B5EF4-FFF2-40B4-BE49-F238E27FC236}">
+                <a16:creationId xmlns:a16="http://schemas.microsoft.com/office/drawing/2014/main" id="{E46E04A0-E4BB-FD55-4BE9-5339F14E10F5}"/>
+              </a:ext>
+            </a:extLst>
+          </p:cNvPr>
+          <p:cNvSpPr txBox="1"/>
+          <p:nvPr/>
+        </p:nvSpPr>
+        <p:spPr>
+          <a:xfrm>
+            <a:off x="1389666" y="2200987"/>
+            <a:ext cx="1494202" cy="246222"/>
+          </a:xfrm>
+          <a:prstGeom prst="rect">
+            <a:avLst/>
+          </a:prstGeom>
+          <a:solidFill>
+            <a:schemeClr val="bg1"/>
+          </a:solidFill>
+          <a:ln w="9525">
+            <a:solidFill>
+              <a:schemeClr val="tx1"/>
+            </a:solidFill>
+          </a:ln>
+        </p:spPr>
+        <p:txBody>
+          <a:bodyPr wrap="square" lIns="36000" tIns="36000" rIns="36000" bIns="36000" rtlCol="0">
+            <a:noAutofit/>
+          </a:bodyPr>
+          <a:lstStyle/>
+          <a:p>
+            <a:r>
+              <a:rPr lang="en-SG" sz="1100" dirty="0"/>
+              <a:t>Trojan function activated </a:t>
+            </a:r>
+          </a:p>
+        </p:txBody>
+      </p:sp>
+      <p:cxnSp>
+        <p:nvCxnSpPr>
+          <p:cNvPr id="25" name="Straight Arrow Connector 24">
+            <a:extLst>
+              <a:ext uri="{FF2B5EF4-FFF2-40B4-BE49-F238E27FC236}">
+                <a16:creationId xmlns:a16="http://schemas.microsoft.com/office/drawing/2014/main" id="{F19668AA-B162-FC8A-4E39-0BB95AD62FE7}"/>
+              </a:ext>
+            </a:extLst>
+          </p:cNvPr>
+          <p:cNvCxnSpPr>
+            <a:cxnSpLocks/>
+          </p:cNvCxnSpPr>
+          <p:nvPr/>
+        </p:nvCxnSpPr>
+        <p:spPr>
+          <a:xfrm flipH="1">
+            <a:off x="2037637" y="2614134"/>
+            <a:ext cx="4294632" cy="0"/>
+          </a:xfrm>
+          <a:prstGeom prst="straightConnector1">
+            <a:avLst/>
+          </a:prstGeom>
+          <a:ln>
+            <a:solidFill>
+              <a:srgbClr val="0070C0"/>
+            </a:solidFill>
+            <a:prstDash val="dash"/>
+            <a:tailEnd type="triangle"/>
+          </a:ln>
+        </p:spPr>
+        <p:style>
+          <a:lnRef idx="1">
+            <a:schemeClr val="accent1"/>
+          </a:lnRef>
+          <a:fillRef idx="0">
+            <a:schemeClr val="accent1"/>
+          </a:fillRef>
+          <a:effectRef idx="0">
+            <a:schemeClr val="accent1"/>
+          </a:effectRef>
+          <a:fontRef idx="minor">
+            <a:schemeClr val="tx1"/>
+          </a:fontRef>
+        </p:style>
+      </p:cxnSp>
+      <p:sp>
+        <p:nvSpPr>
+          <p:cNvPr id="26" name="TextBox 25">
+            <a:extLst>
+              <a:ext uri="{FF2B5EF4-FFF2-40B4-BE49-F238E27FC236}">
+                <a16:creationId xmlns:a16="http://schemas.microsoft.com/office/drawing/2014/main" id="{0033A9B5-10F4-3F6F-F048-5D4733466784}"/>
+              </a:ext>
+            </a:extLst>
+          </p:cNvPr>
+          <p:cNvSpPr txBox="1"/>
+          <p:nvPr/>
+        </p:nvSpPr>
+        <p:spPr>
+          <a:xfrm>
+            <a:off x="4800194" y="2331642"/>
+            <a:ext cx="1714665" cy="246221"/>
+          </a:xfrm>
+          <a:prstGeom prst="rect">
+            <a:avLst/>
+          </a:prstGeom>
+          <a:noFill/>
+        </p:spPr>
+        <p:txBody>
+          <a:bodyPr wrap="square" rtlCol="0">
+            <a:spAutoFit/>
+          </a:bodyPr>
+          <a:lstStyle/>
+          <a:p>
+            <a:r>
+              <a:rPr lang="en-SG" sz="1000" b="1" dirty="0">
+                <a:solidFill>
+                  <a:schemeClr val="accent1">
+                    <a:lumMod val="75000"/>
+                  </a:schemeClr>
+                </a:solidFill>
+              </a:rPr>
+              <a:t>2.3 Run command request</a:t>
+            </a:r>
+          </a:p>
+        </p:txBody>
+      </p:sp>
+      <p:sp>
+        <p:nvSpPr>
+          <p:cNvPr id="27" name="TextBox 26">
+            <a:extLst>
+              <a:ext uri="{FF2B5EF4-FFF2-40B4-BE49-F238E27FC236}">
+                <a16:creationId xmlns:a16="http://schemas.microsoft.com/office/drawing/2014/main" id="{2899226A-9CE8-F602-A12C-D043E1CEBDC5}"/>
+              </a:ext>
+            </a:extLst>
+          </p:cNvPr>
+          <p:cNvSpPr txBox="1"/>
+          <p:nvPr/>
+        </p:nvSpPr>
+        <p:spPr>
+          <a:xfrm>
+            <a:off x="1389666" y="2701990"/>
+            <a:ext cx="1494202" cy="246222"/>
+          </a:xfrm>
+          <a:prstGeom prst="rect">
+            <a:avLst/>
+          </a:prstGeom>
+          <a:solidFill>
+            <a:schemeClr val="bg1"/>
+          </a:solidFill>
+          <a:ln w="9525">
+            <a:solidFill>
+              <a:schemeClr val="tx1"/>
+            </a:solidFill>
+          </a:ln>
+        </p:spPr>
+        <p:txBody>
+          <a:bodyPr wrap="square" lIns="36000" tIns="36000" rIns="36000" bIns="36000" rtlCol="0">
+            <a:noAutofit/>
+          </a:bodyPr>
+          <a:lstStyle/>
+          <a:p>
+            <a:r>
+              <a:rPr lang="en-SG" sz="1100" dirty="0"/>
+              <a:t>Command execution API</a:t>
+            </a:r>
+          </a:p>
+        </p:txBody>
+      </p:sp>
+      <p:cxnSp>
+        <p:nvCxnSpPr>
+          <p:cNvPr id="28" name="Straight Arrow Connector 27">
+            <a:extLst>
+              <a:ext uri="{FF2B5EF4-FFF2-40B4-BE49-F238E27FC236}">
+                <a16:creationId xmlns:a16="http://schemas.microsoft.com/office/drawing/2014/main" id="{3879335C-C2B1-F23F-D25A-5A2AF5EEA3AC}"/>
+              </a:ext>
+            </a:extLst>
+          </p:cNvPr>
+          <p:cNvCxnSpPr>
+            <a:cxnSpLocks/>
+          </p:cNvCxnSpPr>
+          <p:nvPr/>
+        </p:nvCxnSpPr>
+        <p:spPr>
+          <a:xfrm>
+            <a:off x="2048453" y="3081528"/>
+            <a:ext cx="4273001" cy="0"/>
+          </a:xfrm>
+          <a:prstGeom prst="straightConnector1">
+            <a:avLst/>
+          </a:prstGeom>
+          <a:ln>
+            <a:solidFill>
+              <a:srgbClr val="0070C0"/>
+            </a:solidFill>
+            <a:prstDash val="dash"/>
+            <a:tailEnd type="triangle"/>
+          </a:ln>
+        </p:spPr>
+        <p:style>
+          <a:lnRef idx="1">
+            <a:schemeClr val="accent1"/>
+          </a:lnRef>
+          <a:fillRef idx="0">
+            <a:schemeClr val="accent1"/>
+          </a:fillRef>
+          <a:effectRef idx="0">
+            <a:schemeClr val="accent1"/>
+          </a:effectRef>
+          <a:fontRef idx="minor">
+            <a:schemeClr val="tx1"/>
+          </a:fontRef>
+        </p:style>
+      </p:cxnSp>
+      <p:sp>
+        <p:nvSpPr>
+          <p:cNvPr id="31" name="TextBox 30">
+            <a:extLst>
+              <a:ext uri="{FF2B5EF4-FFF2-40B4-BE49-F238E27FC236}">
+                <a16:creationId xmlns:a16="http://schemas.microsoft.com/office/drawing/2014/main" id="{69F0E07B-621B-75A6-3D15-8BB4B2A64A59}"/>
+              </a:ext>
+            </a:extLst>
+          </p:cNvPr>
+          <p:cNvSpPr txBox="1"/>
+          <p:nvPr/>
+        </p:nvSpPr>
+        <p:spPr>
+          <a:xfrm>
+            <a:off x="2274779" y="3074981"/>
+            <a:ext cx="1856969" cy="246221"/>
+          </a:xfrm>
+          <a:prstGeom prst="rect">
+            <a:avLst/>
+          </a:prstGeom>
+          <a:noFill/>
+        </p:spPr>
+        <p:txBody>
+          <a:bodyPr wrap="square" rtlCol="0">
+            <a:spAutoFit/>
+          </a:bodyPr>
+          <a:lstStyle/>
+          <a:p>
+            <a:r>
+              <a:rPr lang="en-SG" sz="1000" b="1" dirty="0">
+                <a:solidFill>
+                  <a:schemeClr val="accent1">
+                    <a:lumMod val="75000"/>
+                  </a:schemeClr>
+                </a:solidFill>
+              </a:rPr>
+              <a:t>2.4 Command execution result</a:t>
+            </a:r>
+          </a:p>
+        </p:txBody>
+      </p:sp>
+      <p:sp>
+        <p:nvSpPr>
+          <p:cNvPr id="34" name="TextBox 33">
+            <a:extLst>
+              <a:ext uri="{FF2B5EF4-FFF2-40B4-BE49-F238E27FC236}">
+                <a16:creationId xmlns:a16="http://schemas.microsoft.com/office/drawing/2014/main" id="{C287D9F2-0C0B-BCAA-F26C-B08CB3132EFD}"/>
+              </a:ext>
+            </a:extLst>
+          </p:cNvPr>
+          <p:cNvSpPr txBox="1"/>
+          <p:nvPr/>
+        </p:nvSpPr>
+        <p:spPr>
+          <a:xfrm>
+            <a:off x="7657184" y="481292"/>
+            <a:ext cx="1064389" cy="400110"/>
+          </a:xfrm>
+          <a:prstGeom prst="rect">
+            <a:avLst/>
+          </a:prstGeom>
+          <a:solidFill>
+            <a:schemeClr val="bg1"/>
+          </a:solidFill>
+          <a:ln w="19050">
+            <a:solidFill>
+              <a:srgbClr val="7030A0"/>
+            </a:solidFill>
+          </a:ln>
+        </p:spPr>
+        <p:txBody>
+          <a:bodyPr wrap="square" lIns="36000" tIns="36000" rIns="36000" bIns="36000" rtlCol="0">
+            <a:noAutofit/>
+          </a:bodyPr>
+          <a:lstStyle/>
+          <a:p>
+            <a:r>
+              <a:rPr lang="en-SG" sz="1100" b="1" dirty="0">
+                <a:solidFill>
+                  <a:srgbClr val="7030A0"/>
+                </a:solidFill>
+              </a:rPr>
+              <a:t>Hacker-2 Trojan connector </a:t>
+            </a:r>
+          </a:p>
+        </p:txBody>
+      </p:sp>
+      <p:cxnSp>
+        <p:nvCxnSpPr>
+          <p:cNvPr id="35" name="Straight Arrow Connector 34">
+            <a:extLst>
+              <a:ext uri="{FF2B5EF4-FFF2-40B4-BE49-F238E27FC236}">
+                <a16:creationId xmlns:a16="http://schemas.microsoft.com/office/drawing/2014/main" id="{1FB07787-8CF5-1941-2DC2-0F636A91BD6A}"/>
+              </a:ext>
+            </a:extLst>
+          </p:cNvPr>
+          <p:cNvCxnSpPr>
+            <a:cxnSpLocks/>
+          </p:cNvCxnSpPr>
+          <p:nvPr/>
+        </p:nvCxnSpPr>
+        <p:spPr>
+          <a:xfrm>
+            <a:off x="8172974" y="898803"/>
+            <a:ext cx="0" cy="4729110"/>
+          </a:xfrm>
+          <a:prstGeom prst="straightConnector1">
+            <a:avLst/>
+          </a:prstGeom>
+          <a:ln w="28575">
+            <a:solidFill>
+              <a:srgbClr val="7030A0"/>
+            </a:solidFill>
+            <a:tailEnd type="triangle"/>
+          </a:ln>
+        </p:spPr>
+        <p:style>
+          <a:lnRef idx="1">
+            <a:schemeClr val="accent1"/>
+          </a:lnRef>
+          <a:fillRef idx="0">
+            <a:schemeClr val="accent1"/>
+          </a:fillRef>
+          <a:effectRef idx="0">
+            <a:schemeClr val="accent1"/>
+          </a:effectRef>
+          <a:fontRef idx="minor">
+            <a:schemeClr val="tx1"/>
+          </a:fontRef>
+        </p:style>
+      </p:cxnSp>
+      <p:cxnSp>
+        <p:nvCxnSpPr>
+          <p:cNvPr id="36" name="Straight Arrow Connector 35">
+            <a:extLst>
+              <a:ext uri="{FF2B5EF4-FFF2-40B4-BE49-F238E27FC236}">
+                <a16:creationId xmlns:a16="http://schemas.microsoft.com/office/drawing/2014/main" id="{F691DF04-4043-C7A6-507B-96D6592494BE}"/>
+              </a:ext>
+            </a:extLst>
+          </p:cNvPr>
+          <p:cNvCxnSpPr>
+            <a:cxnSpLocks/>
+          </p:cNvCxnSpPr>
+          <p:nvPr/>
+        </p:nvCxnSpPr>
+        <p:spPr>
+          <a:xfrm flipH="1">
+            <a:off x="2022784" y="3429000"/>
+            <a:ext cx="6146152" cy="0"/>
+          </a:xfrm>
+          <a:prstGeom prst="straightConnector1">
+            <a:avLst/>
+          </a:prstGeom>
+          <a:ln>
+            <a:solidFill>
+              <a:srgbClr val="7030A0"/>
+            </a:solidFill>
+            <a:prstDash val="dash"/>
+            <a:tailEnd type="triangle"/>
+          </a:ln>
+        </p:spPr>
+        <p:style>
+          <a:lnRef idx="1">
+            <a:schemeClr val="accent1"/>
+          </a:lnRef>
+          <a:fillRef idx="0">
+            <a:schemeClr val="accent1"/>
+          </a:fillRef>
+          <a:effectRef idx="0">
+            <a:schemeClr val="accent1"/>
+          </a:effectRef>
+          <a:fontRef idx="minor">
+            <a:schemeClr val="tx1"/>
+          </a:fontRef>
+        </p:style>
+      </p:cxnSp>
+      <p:sp>
+        <p:nvSpPr>
+          <p:cNvPr id="38" name="TextBox 37">
+            <a:extLst>
+              <a:ext uri="{FF2B5EF4-FFF2-40B4-BE49-F238E27FC236}">
+                <a16:creationId xmlns:a16="http://schemas.microsoft.com/office/drawing/2014/main" id="{7723738D-9C7F-4180-B486-FEE63137B9EA}"/>
+              </a:ext>
+            </a:extLst>
+          </p:cNvPr>
+          <p:cNvSpPr txBox="1"/>
+          <p:nvPr/>
+        </p:nvSpPr>
+        <p:spPr>
+          <a:xfrm>
+            <a:off x="6678530" y="3228945"/>
+            <a:ext cx="1554783" cy="400110"/>
+          </a:xfrm>
+          <a:prstGeom prst="rect">
+            <a:avLst/>
+          </a:prstGeom>
+          <a:noFill/>
+        </p:spPr>
+        <p:txBody>
+          <a:bodyPr wrap="square" rtlCol="0">
+            <a:spAutoFit/>
+          </a:bodyPr>
+          <a:lstStyle/>
+          <a:p>
+            <a:r>
+              <a:rPr lang="en-SG" sz="1000" b="1" dirty="0">
+                <a:solidFill>
+                  <a:srgbClr val="7030A0"/>
+                </a:solidFill>
+              </a:rPr>
+              <a:t>3.1 Copy file from victim, path /home/xxx/</a:t>
+            </a:r>
+          </a:p>
+        </p:txBody>
+      </p:sp>
+      <p:sp>
+        <p:nvSpPr>
+          <p:cNvPr id="39" name="TextBox 38">
+            <a:extLst>
+              <a:ext uri="{FF2B5EF4-FFF2-40B4-BE49-F238E27FC236}">
+                <a16:creationId xmlns:a16="http://schemas.microsoft.com/office/drawing/2014/main" id="{137B31D7-0113-D71D-FB94-E08C2E8A6F93}"/>
+              </a:ext>
+            </a:extLst>
+          </p:cNvPr>
+          <p:cNvSpPr txBox="1"/>
+          <p:nvPr/>
+        </p:nvSpPr>
+        <p:spPr>
+          <a:xfrm>
+            <a:off x="1389666" y="3558951"/>
+            <a:ext cx="1129041" cy="246222"/>
+          </a:xfrm>
+          <a:prstGeom prst="rect">
+            <a:avLst/>
+          </a:prstGeom>
+          <a:solidFill>
+            <a:schemeClr val="bg1"/>
+          </a:solidFill>
+          <a:ln w="9525">
+            <a:solidFill>
+              <a:schemeClr val="tx1"/>
+            </a:solidFill>
+          </a:ln>
+        </p:spPr>
+        <p:txBody>
+          <a:bodyPr wrap="square" lIns="36000" tIns="36000" rIns="36000" bIns="36000" rtlCol="0">
+            <a:noAutofit/>
+          </a:bodyPr>
+          <a:lstStyle/>
+          <a:p>
+            <a:r>
+              <a:rPr lang="en-SG" sz="1100" dirty="0"/>
+              <a:t>File reading API</a:t>
+            </a:r>
+          </a:p>
+        </p:txBody>
+      </p:sp>
+      <p:cxnSp>
+        <p:nvCxnSpPr>
+          <p:cNvPr id="40" name="Straight Arrow Connector 39">
+            <a:extLst>
+              <a:ext uri="{FF2B5EF4-FFF2-40B4-BE49-F238E27FC236}">
+                <a16:creationId xmlns:a16="http://schemas.microsoft.com/office/drawing/2014/main" id="{2A975FE5-0246-D5E4-9334-2C6905C8656B}"/>
+              </a:ext>
+            </a:extLst>
+          </p:cNvPr>
+          <p:cNvCxnSpPr>
+            <a:cxnSpLocks/>
+          </p:cNvCxnSpPr>
+          <p:nvPr/>
+        </p:nvCxnSpPr>
+        <p:spPr>
+          <a:xfrm flipV="1">
+            <a:off x="2070085" y="4261207"/>
+            <a:ext cx="6098851" cy="18288"/>
+          </a:xfrm>
+          <a:prstGeom prst="straightConnector1">
+            <a:avLst/>
+          </a:prstGeom>
+          <a:ln>
+            <a:solidFill>
+              <a:srgbClr val="7030A0"/>
+            </a:solidFill>
+            <a:prstDash val="dash"/>
+            <a:tailEnd type="triangle"/>
+          </a:ln>
+        </p:spPr>
+        <p:style>
+          <a:lnRef idx="1">
+            <a:schemeClr val="accent1"/>
+          </a:lnRef>
+          <a:fillRef idx="0">
+            <a:schemeClr val="accent1"/>
+          </a:fillRef>
+          <a:effectRef idx="0">
+            <a:schemeClr val="accent1"/>
+          </a:effectRef>
+          <a:fontRef idx="minor">
+            <a:schemeClr val="tx1"/>
+          </a:fontRef>
+        </p:style>
+      </p:cxnSp>
+      <p:sp>
+        <p:nvSpPr>
+          <p:cNvPr id="44" name="TextBox 43">
+            <a:extLst>
+              <a:ext uri="{FF2B5EF4-FFF2-40B4-BE49-F238E27FC236}">
+                <a16:creationId xmlns:a16="http://schemas.microsoft.com/office/drawing/2014/main" id="{1C679D1B-B31E-3D0B-9590-19734BD0C4B4}"/>
+              </a:ext>
+            </a:extLst>
+          </p:cNvPr>
+          <p:cNvSpPr txBox="1"/>
+          <p:nvPr/>
+        </p:nvSpPr>
+        <p:spPr>
+          <a:xfrm>
+            <a:off x="2178695" y="4261207"/>
+            <a:ext cx="1554783" cy="246221"/>
+          </a:xfrm>
+          <a:prstGeom prst="rect">
+            <a:avLst/>
+          </a:prstGeom>
+          <a:noFill/>
+        </p:spPr>
+        <p:txBody>
+          <a:bodyPr wrap="square" rtlCol="0">
+            <a:spAutoFit/>
+          </a:bodyPr>
+          <a:lstStyle/>
+          <a:p>
+            <a:r>
+              <a:rPr lang="en-SG" sz="1000" b="1" dirty="0">
+                <a:solidFill>
+                  <a:srgbClr val="7030A0"/>
+                </a:solidFill>
+              </a:rPr>
+              <a:t>3.2 File data stream</a:t>
+            </a:r>
+          </a:p>
+        </p:txBody>
+      </p:sp>
+      <p:sp>
+        <p:nvSpPr>
+          <p:cNvPr id="45" name="TextBox 44">
+            <a:extLst>
+              <a:ext uri="{FF2B5EF4-FFF2-40B4-BE49-F238E27FC236}">
+                <a16:creationId xmlns:a16="http://schemas.microsoft.com/office/drawing/2014/main" id="{0D7179BB-9F22-24C1-0E77-29645ED3A576}"/>
+              </a:ext>
+            </a:extLst>
+          </p:cNvPr>
+          <p:cNvSpPr txBox="1"/>
+          <p:nvPr/>
+        </p:nvSpPr>
+        <p:spPr>
+          <a:xfrm>
+            <a:off x="7516503" y="4382262"/>
+            <a:ext cx="1197729" cy="246222"/>
+          </a:xfrm>
+          <a:prstGeom prst="rect">
+            <a:avLst/>
+          </a:prstGeom>
+          <a:solidFill>
+            <a:schemeClr val="bg1"/>
+          </a:solidFill>
+          <a:ln w="9525">
+            <a:solidFill>
+              <a:schemeClr val="tx1"/>
+            </a:solidFill>
+          </a:ln>
+        </p:spPr>
+        <p:txBody>
+          <a:bodyPr wrap="square" lIns="36000" tIns="36000" rIns="36000" bIns="36000" rtlCol="0">
+            <a:noAutofit/>
+          </a:bodyPr>
+          <a:lstStyle/>
+          <a:p>
+            <a:r>
+              <a:rPr lang="en-SG" sz="1100" dirty="0"/>
+              <a:t>File creation API</a:t>
+            </a:r>
+          </a:p>
+        </p:txBody>
+      </p:sp>
+      <p:cxnSp>
+        <p:nvCxnSpPr>
+          <p:cNvPr id="47" name="Straight Arrow Connector 46">
+            <a:extLst>
+              <a:ext uri="{FF2B5EF4-FFF2-40B4-BE49-F238E27FC236}">
+                <a16:creationId xmlns:a16="http://schemas.microsoft.com/office/drawing/2014/main" id="{46F12252-FB09-60D0-6CFF-625842453831}"/>
+              </a:ext>
+            </a:extLst>
+          </p:cNvPr>
+          <p:cNvCxnSpPr>
+            <a:cxnSpLocks/>
+          </p:cNvCxnSpPr>
+          <p:nvPr/>
+        </p:nvCxnSpPr>
+        <p:spPr>
+          <a:xfrm flipH="1">
+            <a:off x="2036681" y="3882215"/>
+            <a:ext cx="7969686" cy="31520"/>
+          </a:xfrm>
+          <a:prstGeom prst="straightConnector1">
+            <a:avLst/>
+          </a:prstGeom>
+          <a:ln>
+            <a:solidFill>
+              <a:srgbClr val="FF0000"/>
+            </a:solidFill>
+            <a:prstDash val="dash"/>
+            <a:tailEnd type="triangle"/>
+          </a:ln>
+        </p:spPr>
+        <p:style>
+          <a:lnRef idx="1">
+            <a:schemeClr val="accent1"/>
+          </a:lnRef>
+          <a:fillRef idx="0">
+            <a:schemeClr val="accent1"/>
+          </a:fillRef>
+          <a:effectRef idx="0">
+            <a:schemeClr val="accent1"/>
+          </a:effectRef>
+          <a:fontRef idx="minor">
+            <a:schemeClr val="tx1"/>
+          </a:fontRef>
+        </p:style>
+      </p:cxnSp>
+      <p:sp>
+        <p:nvSpPr>
+          <p:cNvPr id="51" name="TextBox 50">
+            <a:extLst>
+              <a:ext uri="{FF2B5EF4-FFF2-40B4-BE49-F238E27FC236}">
+                <a16:creationId xmlns:a16="http://schemas.microsoft.com/office/drawing/2014/main" id="{C90FE17C-94A4-23FD-509A-EF1405338570}"/>
+              </a:ext>
+            </a:extLst>
+          </p:cNvPr>
+          <p:cNvSpPr txBox="1"/>
+          <p:nvPr/>
+        </p:nvSpPr>
+        <p:spPr>
+          <a:xfrm>
+            <a:off x="8293652" y="3629055"/>
+            <a:ext cx="1697440" cy="246221"/>
+          </a:xfrm>
+          <a:prstGeom prst="rect">
+            <a:avLst/>
+          </a:prstGeom>
+          <a:noFill/>
+        </p:spPr>
+        <p:txBody>
+          <a:bodyPr wrap="square" rtlCol="0">
+            <a:spAutoFit/>
+          </a:bodyPr>
+          <a:lstStyle/>
+          <a:p>
+            <a:r>
+              <a:rPr lang="en-SG" sz="1000" b="1" dirty="0">
+                <a:solidFill>
+                  <a:srgbClr val="FF0000"/>
+                </a:solidFill>
+              </a:rPr>
+              <a:t>4.1 Inject a malware request</a:t>
+            </a:r>
+          </a:p>
+        </p:txBody>
+      </p:sp>
+      <p:cxnSp>
+        <p:nvCxnSpPr>
+          <p:cNvPr id="52" name="Straight Arrow Connector 51">
+            <a:extLst>
+              <a:ext uri="{FF2B5EF4-FFF2-40B4-BE49-F238E27FC236}">
+                <a16:creationId xmlns:a16="http://schemas.microsoft.com/office/drawing/2014/main" id="{A6A6E8C3-35FD-59D1-94AF-78D90D1E9DD8}"/>
+              </a:ext>
+            </a:extLst>
+          </p:cNvPr>
+          <p:cNvCxnSpPr>
+            <a:cxnSpLocks/>
+          </p:cNvCxnSpPr>
+          <p:nvPr/>
+        </p:nvCxnSpPr>
+        <p:spPr>
+          <a:xfrm>
+            <a:off x="2036681" y="4082269"/>
+            <a:ext cx="7954410" cy="12874"/>
+          </a:xfrm>
+          <a:prstGeom prst="straightConnector1">
+            <a:avLst/>
+          </a:prstGeom>
+          <a:ln>
+            <a:solidFill>
+              <a:srgbClr val="FF0000"/>
+            </a:solidFill>
+            <a:prstDash val="dash"/>
+            <a:tailEnd type="triangle"/>
+          </a:ln>
+        </p:spPr>
+        <p:style>
+          <a:lnRef idx="1">
+            <a:schemeClr val="accent1"/>
+          </a:lnRef>
+          <a:fillRef idx="0">
+            <a:schemeClr val="accent1"/>
+          </a:fillRef>
+          <a:effectRef idx="0">
+            <a:schemeClr val="accent1"/>
+          </a:effectRef>
+          <a:fontRef idx="minor">
+            <a:schemeClr val="tx1"/>
+          </a:fontRef>
+        </p:style>
+      </p:cxnSp>
+      <p:sp>
+        <p:nvSpPr>
+          <p:cNvPr id="55" name="TextBox 54">
+            <a:extLst>
+              <a:ext uri="{FF2B5EF4-FFF2-40B4-BE49-F238E27FC236}">
+                <a16:creationId xmlns:a16="http://schemas.microsoft.com/office/drawing/2014/main" id="{A0FF18D3-0D79-E88C-6D5A-9D7C9FA2934E}"/>
+              </a:ext>
+            </a:extLst>
+          </p:cNvPr>
+          <p:cNvSpPr txBox="1"/>
+          <p:nvPr/>
+        </p:nvSpPr>
+        <p:spPr>
+          <a:xfrm>
+            <a:off x="2205530" y="4048593"/>
+            <a:ext cx="1762549" cy="246221"/>
+          </a:xfrm>
+          <a:prstGeom prst="rect">
+            <a:avLst/>
+          </a:prstGeom>
+          <a:noFill/>
+        </p:spPr>
+        <p:txBody>
+          <a:bodyPr wrap="square" rtlCol="0">
+            <a:spAutoFit/>
+          </a:bodyPr>
+          <a:lstStyle/>
+          <a:p>
+            <a:r>
+              <a:rPr lang="en-SG" sz="1000" b="1" dirty="0">
+                <a:solidFill>
+                  <a:srgbClr val="FF0000"/>
+                </a:solidFill>
+              </a:rPr>
+              <a:t>4.2 Trojan busy, task queued </a:t>
+            </a:r>
+          </a:p>
+        </p:txBody>
+      </p:sp>
+      <p:cxnSp>
+        <p:nvCxnSpPr>
+          <p:cNvPr id="56" name="Straight Arrow Connector 55">
+            <a:extLst>
+              <a:ext uri="{FF2B5EF4-FFF2-40B4-BE49-F238E27FC236}">
+                <a16:creationId xmlns:a16="http://schemas.microsoft.com/office/drawing/2014/main" id="{934C30F8-2DCE-50C7-DCB3-AD79F0DA6528}"/>
+              </a:ext>
+            </a:extLst>
+          </p:cNvPr>
+          <p:cNvCxnSpPr>
+            <a:cxnSpLocks/>
+          </p:cNvCxnSpPr>
+          <p:nvPr/>
+        </p:nvCxnSpPr>
+        <p:spPr>
+          <a:xfrm>
+            <a:off x="2070085" y="4766335"/>
+            <a:ext cx="7954410" cy="12874"/>
+          </a:xfrm>
+          <a:prstGeom prst="straightConnector1">
+            <a:avLst/>
+          </a:prstGeom>
+          <a:ln>
+            <a:solidFill>
+              <a:srgbClr val="FF0000"/>
+            </a:solidFill>
+            <a:prstDash val="dash"/>
+            <a:tailEnd type="triangle"/>
+          </a:ln>
+        </p:spPr>
+        <p:style>
+          <a:lnRef idx="1">
+            <a:schemeClr val="accent1"/>
+          </a:lnRef>
+          <a:fillRef idx="0">
+            <a:schemeClr val="accent1"/>
+          </a:fillRef>
+          <a:effectRef idx="0">
+            <a:schemeClr val="accent1"/>
+          </a:effectRef>
+          <a:fontRef idx="minor">
+            <a:schemeClr val="tx1"/>
+          </a:fontRef>
+        </p:style>
+      </p:cxnSp>
+      <p:sp>
+        <p:nvSpPr>
+          <p:cNvPr id="57" name="TextBox 56">
+            <a:extLst>
+              <a:ext uri="{FF2B5EF4-FFF2-40B4-BE49-F238E27FC236}">
+                <a16:creationId xmlns:a16="http://schemas.microsoft.com/office/drawing/2014/main" id="{BC791341-4014-DE2E-0A68-09585F0F44D0}"/>
+              </a:ext>
+            </a:extLst>
+          </p:cNvPr>
+          <p:cNvSpPr txBox="1"/>
+          <p:nvPr/>
+        </p:nvSpPr>
+        <p:spPr>
+          <a:xfrm>
+            <a:off x="2274780" y="4566280"/>
+            <a:ext cx="1554783" cy="400110"/>
+          </a:xfrm>
+          <a:prstGeom prst="rect">
+            <a:avLst/>
+          </a:prstGeom>
+          <a:noFill/>
+        </p:spPr>
+        <p:txBody>
+          <a:bodyPr wrap="square" rtlCol="0">
+            <a:spAutoFit/>
+          </a:bodyPr>
+          <a:lstStyle/>
+          <a:p>
+            <a:r>
+              <a:rPr lang="en-SG" sz="1000" b="1" dirty="0">
+                <a:solidFill>
+                  <a:srgbClr val="FF0000"/>
+                </a:solidFill>
+              </a:rPr>
+              <a:t>4.3 Trojan free, ready to receive malware</a:t>
+            </a:r>
+          </a:p>
+        </p:txBody>
+      </p:sp>
+      <p:sp>
+        <p:nvSpPr>
+          <p:cNvPr id="58" name="TextBox 57">
+            <a:extLst>
+              <a:ext uri="{FF2B5EF4-FFF2-40B4-BE49-F238E27FC236}">
+                <a16:creationId xmlns:a16="http://schemas.microsoft.com/office/drawing/2014/main" id="{7C90CF4D-B832-D30C-BA62-7629B5E1A53D}"/>
+              </a:ext>
+            </a:extLst>
+          </p:cNvPr>
+          <p:cNvSpPr txBox="1"/>
+          <p:nvPr/>
+        </p:nvSpPr>
+        <p:spPr>
+          <a:xfrm>
+            <a:off x="9579026" y="4362116"/>
+            <a:ext cx="1129041" cy="246222"/>
+          </a:xfrm>
+          <a:prstGeom prst="rect">
+            <a:avLst/>
+          </a:prstGeom>
+          <a:solidFill>
+            <a:schemeClr val="bg1"/>
+          </a:solidFill>
+          <a:ln w="9525">
+            <a:solidFill>
+              <a:schemeClr val="tx1"/>
+            </a:solidFill>
+          </a:ln>
+        </p:spPr>
+        <p:txBody>
+          <a:bodyPr wrap="square" lIns="36000" tIns="36000" rIns="36000" bIns="36000" rtlCol="0">
+            <a:noAutofit/>
+          </a:bodyPr>
+          <a:lstStyle/>
+          <a:p>
+            <a:r>
+              <a:rPr lang="en-SG" sz="1100" dirty="0"/>
+              <a:t>File reading API</a:t>
+            </a:r>
+          </a:p>
+        </p:txBody>
+      </p:sp>
+      <p:cxnSp>
+        <p:nvCxnSpPr>
+          <p:cNvPr id="59" name="Straight Arrow Connector 58">
+            <a:extLst>
+              <a:ext uri="{FF2B5EF4-FFF2-40B4-BE49-F238E27FC236}">
+                <a16:creationId xmlns:a16="http://schemas.microsoft.com/office/drawing/2014/main" id="{91BCC4E9-53BD-0A9D-EB30-97AC30A7F4D0}"/>
+              </a:ext>
+            </a:extLst>
+          </p:cNvPr>
+          <p:cNvCxnSpPr>
+            <a:cxnSpLocks/>
+          </p:cNvCxnSpPr>
+          <p:nvPr/>
+        </p:nvCxnSpPr>
+        <p:spPr>
+          <a:xfrm flipH="1">
+            <a:off x="2034090" y="5056719"/>
+            <a:ext cx="7954150" cy="0"/>
+          </a:xfrm>
+          <a:prstGeom prst="straightConnector1">
+            <a:avLst/>
+          </a:prstGeom>
+          <a:ln>
+            <a:solidFill>
+              <a:srgbClr val="FF0000"/>
+            </a:solidFill>
+            <a:prstDash val="dash"/>
+            <a:tailEnd type="triangle"/>
+          </a:ln>
+        </p:spPr>
+        <p:style>
+          <a:lnRef idx="1">
+            <a:schemeClr val="accent1"/>
+          </a:lnRef>
+          <a:fillRef idx="0">
+            <a:schemeClr val="accent1"/>
+          </a:fillRef>
+          <a:effectRef idx="0">
+            <a:schemeClr val="accent1"/>
+          </a:effectRef>
+          <a:fontRef idx="minor">
+            <a:schemeClr val="tx1"/>
+          </a:fontRef>
+        </p:style>
+      </p:cxnSp>
+      <p:sp>
+        <p:nvSpPr>
+          <p:cNvPr id="64" name="TextBox 63">
+            <a:extLst>
+              <a:ext uri="{FF2B5EF4-FFF2-40B4-BE49-F238E27FC236}">
+                <a16:creationId xmlns:a16="http://schemas.microsoft.com/office/drawing/2014/main" id="{D22EA09E-8681-4F6E-071F-E72D4CAB3256}"/>
+              </a:ext>
+            </a:extLst>
+          </p:cNvPr>
+          <p:cNvSpPr txBox="1"/>
+          <p:nvPr/>
+        </p:nvSpPr>
+        <p:spPr>
+          <a:xfrm>
+            <a:off x="1379396" y="5137933"/>
+            <a:ext cx="1197729" cy="246222"/>
+          </a:xfrm>
+          <a:prstGeom prst="rect">
+            <a:avLst/>
+          </a:prstGeom>
+          <a:solidFill>
+            <a:schemeClr val="bg1"/>
+          </a:solidFill>
+          <a:ln w="9525">
+            <a:solidFill>
+              <a:schemeClr val="tx1"/>
+            </a:solidFill>
+          </a:ln>
+        </p:spPr>
+        <p:txBody>
+          <a:bodyPr wrap="square" lIns="36000" tIns="36000" rIns="36000" bIns="36000" rtlCol="0">
+            <a:noAutofit/>
+          </a:bodyPr>
+          <a:lstStyle/>
+          <a:p>
+            <a:r>
+              <a:rPr lang="en-SG" sz="1100" dirty="0"/>
+              <a:t>File creation API</a:t>
+            </a:r>
+          </a:p>
+        </p:txBody>
+      </p:sp>
+      <p:sp>
+        <p:nvSpPr>
+          <p:cNvPr id="65" name="TextBox 64">
+            <a:extLst>
+              <a:ext uri="{FF2B5EF4-FFF2-40B4-BE49-F238E27FC236}">
+                <a16:creationId xmlns:a16="http://schemas.microsoft.com/office/drawing/2014/main" id="{295146BE-92D7-03FF-4058-CF82B9E37E85}"/>
+              </a:ext>
+            </a:extLst>
+          </p:cNvPr>
+          <p:cNvSpPr txBox="1"/>
+          <p:nvPr/>
+        </p:nvSpPr>
+        <p:spPr>
+          <a:xfrm>
+            <a:off x="8391246" y="5057901"/>
+            <a:ext cx="1554783" cy="400110"/>
+          </a:xfrm>
+          <a:prstGeom prst="rect">
+            <a:avLst/>
+          </a:prstGeom>
+          <a:noFill/>
+        </p:spPr>
+        <p:txBody>
+          <a:bodyPr wrap="square" rtlCol="0">
+            <a:spAutoFit/>
+          </a:bodyPr>
+          <a:lstStyle/>
+          <a:p>
+            <a:r>
+              <a:rPr lang="en-SG" sz="1000" b="1" dirty="0">
+                <a:solidFill>
+                  <a:srgbClr val="FF0000"/>
+                </a:solidFill>
+              </a:rPr>
+              <a:t>4.4 Malware File data stream</a:t>
+            </a:r>
+          </a:p>
+        </p:txBody>
+      </p:sp>
+      <p:sp>
+        <p:nvSpPr>
+          <p:cNvPr id="66" name="TextBox 65">
+            <a:extLst>
+              <a:ext uri="{FF2B5EF4-FFF2-40B4-BE49-F238E27FC236}">
+                <a16:creationId xmlns:a16="http://schemas.microsoft.com/office/drawing/2014/main" id="{A4EFD5F2-0CC3-29E5-E9A2-22EC67E93BA3}"/>
+              </a:ext>
+            </a:extLst>
+          </p:cNvPr>
+          <p:cNvSpPr txBox="1"/>
+          <p:nvPr/>
+        </p:nvSpPr>
+        <p:spPr>
+          <a:xfrm>
+            <a:off x="3585848" y="5597547"/>
+            <a:ext cx="2263063" cy="400110"/>
+          </a:xfrm>
+          <a:prstGeom prst="rect">
+            <a:avLst/>
+          </a:prstGeom>
+          <a:noFill/>
+        </p:spPr>
+        <p:txBody>
+          <a:bodyPr wrap="square" rtlCol="0">
+            <a:spAutoFit/>
+          </a:bodyPr>
+          <a:lstStyle/>
+          <a:p>
+            <a:r>
+              <a:rPr lang="en-SG" sz="1000" b="1" dirty="0">
+                <a:solidFill>
+                  <a:schemeClr val="accent6">
+                    <a:lumMod val="75000"/>
+                  </a:schemeClr>
+                </a:solidFill>
+              </a:rPr>
+              <a:t>Not detect trojan service as there is no response (handshake fail)</a:t>
+            </a:r>
+          </a:p>
+        </p:txBody>
+      </p:sp>
+    </p:spTree>
+    <p:extLst>
+      <p:ext uri="{BB962C8B-B14F-4D97-AF65-F5344CB8AC3E}">
+        <p14:creationId xmlns:p14="http://schemas.microsoft.com/office/powerpoint/2010/main" val="1494674917"/>
+      </p:ext>
+    </p:extLst>
+  </p:cSld>
+  <p:clrMapOvr>
+    <a:masterClrMapping/>
+  </p:clrMapOvr>
+</p:sld>
+</file>
+
+<file path=ppt/slides/slide4.xml><?xml version="1.0" encoding="utf-8"?>
+<p:sld xmlns:a="http://schemas.openxmlformats.org/drawingml/2006/main" xmlns:r="http://schemas.openxmlformats.org/officeDocument/2006/relationships" xmlns:p="http://schemas.openxmlformats.org/presentationml/2006/main">
+  <p:cSld>
+    <p:spTree>
+      <p:nvGrpSpPr>
+        <p:cNvPr id="1" name=""/>
+        <p:cNvGrpSpPr/>
+        <p:nvPr/>
+      </p:nvGrpSpPr>
+      <p:grpSpPr>
+        <a:xfrm>
+          <a:off x="0" y="0"/>
+          <a:ext cx="0" cy="0"/>
+          <a:chOff x="0" y="0"/>
+          <a:chExt cx="0" cy="0"/>
+        </a:xfrm>
+      </p:grpSpPr>
       <p:sp>
         <p:nvSpPr>
           <p:cNvPr id="4" name="Rectangle 3">
@@ -9365,7 +11317,7 @@
 </p:sld>
 </file>
 
-<file path=ppt/slides/slide4.xml><?xml version="1.0" encoding="utf-8"?>
+<file path=ppt/slides/slide5.xml><?xml version="1.0" encoding="utf-8"?>
 <p:sld xmlns:a="http://schemas.openxmlformats.org/drawingml/2006/main" xmlns:r="http://schemas.openxmlformats.org/officeDocument/2006/relationships" xmlns:p="http://schemas.openxmlformats.org/presentationml/2006/main">
   <p:cSld>
     <p:spTree>

</xml_diff>

<commit_message>
update the trojan readme file.
</commit_message>
<xml_diff>
--- a/doc/designDoc.pptx
+++ b/doc/designDoc.pptx
@@ -5,14 +5,15 @@
     <p:sldMasterId id="2147483648" r:id="rId1"/>
   </p:sldMasterIdLst>
   <p:notesMasterIdLst>
-    <p:notesMasterId r:id="rId7"/>
+    <p:notesMasterId r:id="rId8"/>
   </p:notesMasterIdLst>
   <p:sldIdLst>
     <p:sldId id="256" r:id="rId2"/>
     <p:sldId id="291" r:id="rId3"/>
     <p:sldId id="293" r:id="rId4"/>
-    <p:sldId id="290" r:id="rId5"/>
-    <p:sldId id="292" r:id="rId6"/>
+    <p:sldId id="294" r:id="rId5"/>
+    <p:sldId id="290" r:id="rId6"/>
+    <p:sldId id="292" r:id="rId7"/>
   </p:sldIdLst>
   <p:sldSz cx="12192000" cy="6858000"/>
   <p:notesSz cx="6858000" cy="9144000"/>
@@ -534,7 +535,7 @@
           <a:p>
             <a:fld id="{5FBC0B8D-E944-47E8-BC23-785C2866B408}" type="slidenum">
               <a:rPr lang="en-SG" smtClean="0"/>
-              <a:t>4</a:t>
+              <a:t>5</a:t>
             </a:fld>
             <a:endParaRPr lang="en-SG"/>
           </a:p>
@@ -618,7 +619,7 @@
           <a:p>
             <a:fld id="{5FBC0B8D-E944-47E8-BC23-785C2866B408}" type="slidenum">
               <a:rPr lang="en-SG" smtClean="0"/>
-              <a:t>5</a:t>
+              <a:t>6</a:t>
             </a:fld>
             <a:endParaRPr lang="en-SG"/>
           </a:p>
@@ -8239,6 +8240,576 @@
           </a:p>
         </p:txBody>
       </p:sp>
+      <p:pic>
+        <p:nvPicPr>
+          <p:cNvPr id="2" name="Picture 1" descr="A red horse on wheels&#10;&#10;Description automatically generated">
+            <a:extLst>
+              <a:ext uri="{FF2B5EF4-FFF2-40B4-BE49-F238E27FC236}">
+                <a16:creationId xmlns:a16="http://schemas.microsoft.com/office/drawing/2014/main" id="{1D320202-1B5E-35A6-F8DA-631F52A54E32}"/>
+              </a:ext>
+            </a:extLst>
+          </p:cNvPr>
+          <p:cNvPicPr>
+            <a:picLocks noChangeAspect="1"/>
+          </p:cNvPicPr>
+          <p:nvPr/>
+        </p:nvPicPr>
+        <p:blipFill>
+          <a:blip r:embed="rId2">
+            <a:extLst>
+              <a:ext uri="{28A0092B-C50C-407E-A947-70E740481C1C}">
+                <a14:useLocalDpi xmlns:a14="http://schemas.microsoft.com/office/drawing/2010/main" val="0"/>
+              </a:ext>
+            </a:extLst>
+          </a:blip>
+          <a:stretch>
+            <a:fillRect/>
+          </a:stretch>
+        </p:blipFill>
+        <p:spPr>
+          <a:xfrm flipH="1">
+            <a:off x="2497439" y="526343"/>
+            <a:ext cx="323830" cy="323830"/>
+          </a:xfrm>
+          <a:prstGeom prst="rect">
+            <a:avLst/>
+          </a:prstGeom>
+        </p:spPr>
+      </p:pic>
+      <p:pic>
+        <p:nvPicPr>
+          <p:cNvPr id="3" name="Picture 2" descr="A red horse on wheels&#10;&#10;Description automatically generated">
+            <a:extLst>
+              <a:ext uri="{FF2B5EF4-FFF2-40B4-BE49-F238E27FC236}">
+                <a16:creationId xmlns:a16="http://schemas.microsoft.com/office/drawing/2014/main" id="{924009DC-3363-032F-CB93-1DC2F449BCAA}"/>
+              </a:ext>
+            </a:extLst>
+          </p:cNvPr>
+          <p:cNvPicPr>
+            <a:picLocks noChangeAspect="1"/>
+          </p:cNvPicPr>
+          <p:nvPr/>
+        </p:nvPicPr>
+        <p:blipFill>
+          <a:blip r:embed="rId2">
+            <a:extLst>
+              <a:ext uri="{28A0092B-C50C-407E-A947-70E740481C1C}">
+                <a14:useLocalDpi xmlns:a14="http://schemas.microsoft.com/office/drawing/2010/main" val="0"/>
+              </a:ext>
+            </a:extLst>
+          </a:blip>
+          <a:stretch>
+            <a:fillRect/>
+          </a:stretch>
+        </p:blipFill>
+        <p:spPr>
+          <a:xfrm flipH="1">
+            <a:off x="6900691" y="484538"/>
+            <a:ext cx="227494" cy="227494"/>
+          </a:xfrm>
+          <a:prstGeom prst="rect">
+            <a:avLst/>
+          </a:prstGeom>
+        </p:spPr>
+      </p:pic>
+      <p:pic>
+        <p:nvPicPr>
+          <p:cNvPr id="5" name="Picture 4">
+            <a:extLst>
+              <a:ext uri="{FF2B5EF4-FFF2-40B4-BE49-F238E27FC236}">
+                <a16:creationId xmlns:a16="http://schemas.microsoft.com/office/drawing/2014/main" id="{EED5B806-B03E-F0F6-C2E2-7F5A585BE23B}"/>
+              </a:ext>
+            </a:extLst>
+          </p:cNvPr>
+          <p:cNvPicPr>
+            <a:picLocks noChangeAspect="1"/>
+          </p:cNvPicPr>
+          <p:nvPr/>
+        </p:nvPicPr>
+        <p:blipFill>
+          <a:blip r:embed="rId3"/>
+          <a:stretch>
+            <a:fillRect/>
+          </a:stretch>
+        </p:blipFill>
+        <p:spPr>
+          <a:xfrm>
+            <a:off x="6869476" y="629833"/>
+            <a:ext cx="320040" cy="268970"/>
+          </a:xfrm>
+          <a:prstGeom prst="rect">
+            <a:avLst/>
+          </a:prstGeom>
+        </p:spPr>
+      </p:pic>
+      <p:pic>
+        <p:nvPicPr>
+          <p:cNvPr id="14" name="Picture 13" descr="A red horse on wheels&#10;&#10;Description automatically generated">
+            <a:extLst>
+              <a:ext uri="{FF2B5EF4-FFF2-40B4-BE49-F238E27FC236}">
+                <a16:creationId xmlns:a16="http://schemas.microsoft.com/office/drawing/2014/main" id="{AB8BA4A0-1D1A-38D2-7449-B75BD0085F9C}"/>
+              </a:ext>
+            </a:extLst>
+          </p:cNvPr>
+          <p:cNvPicPr>
+            <a:picLocks noChangeAspect="1"/>
+          </p:cNvPicPr>
+          <p:nvPr/>
+        </p:nvPicPr>
+        <p:blipFill>
+          <a:blip r:embed="rId2">
+            <a:extLst>
+              <a:ext uri="{28A0092B-C50C-407E-A947-70E740481C1C}">
+                <a14:useLocalDpi xmlns:a14="http://schemas.microsoft.com/office/drawing/2010/main" val="0"/>
+              </a:ext>
+            </a:extLst>
+          </a:blip>
+          <a:stretch>
+            <a:fillRect/>
+          </a:stretch>
+        </p:blipFill>
+        <p:spPr>
+          <a:xfrm flipH="1">
+            <a:off x="8624408" y="475613"/>
+            <a:ext cx="227494" cy="227494"/>
+          </a:xfrm>
+          <a:prstGeom prst="rect">
+            <a:avLst/>
+          </a:prstGeom>
+        </p:spPr>
+      </p:pic>
+      <p:pic>
+        <p:nvPicPr>
+          <p:cNvPr id="15" name="Picture 14">
+            <a:extLst>
+              <a:ext uri="{FF2B5EF4-FFF2-40B4-BE49-F238E27FC236}">
+                <a16:creationId xmlns:a16="http://schemas.microsoft.com/office/drawing/2014/main" id="{948E6E26-4C81-D4BE-DDCD-14DD33CA8FDA}"/>
+              </a:ext>
+            </a:extLst>
+          </p:cNvPr>
+          <p:cNvPicPr>
+            <a:picLocks noChangeAspect="1"/>
+          </p:cNvPicPr>
+          <p:nvPr/>
+        </p:nvPicPr>
+        <p:blipFill>
+          <a:blip r:embed="rId3"/>
+          <a:stretch>
+            <a:fillRect/>
+          </a:stretch>
+        </p:blipFill>
+        <p:spPr>
+          <a:xfrm>
+            <a:off x="8593193" y="620908"/>
+            <a:ext cx="320040" cy="268970"/>
+          </a:xfrm>
+          <a:prstGeom prst="rect">
+            <a:avLst/>
+          </a:prstGeom>
+        </p:spPr>
+      </p:pic>
+      <p:pic>
+        <p:nvPicPr>
+          <p:cNvPr id="18" name="Picture 17" descr="A red horse on wheels&#10;&#10;Description automatically generated">
+            <a:extLst>
+              <a:ext uri="{FF2B5EF4-FFF2-40B4-BE49-F238E27FC236}">
+                <a16:creationId xmlns:a16="http://schemas.microsoft.com/office/drawing/2014/main" id="{9375D1BA-DF7F-C2AF-9720-90CB21AC3BD5}"/>
+              </a:ext>
+            </a:extLst>
+          </p:cNvPr>
+          <p:cNvPicPr>
+            <a:picLocks noChangeAspect="1"/>
+          </p:cNvPicPr>
+          <p:nvPr/>
+        </p:nvPicPr>
+        <p:blipFill>
+          <a:blip r:embed="rId2">
+            <a:extLst>
+              <a:ext uri="{28A0092B-C50C-407E-A947-70E740481C1C}">
+                <a14:useLocalDpi xmlns:a14="http://schemas.microsoft.com/office/drawing/2010/main" val="0"/>
+              </a:ext>
+            </a:extLst>
+          </a:blip>
+          <a:stretch>
+            <a:fillRect/>
+          </a:stretch>
+        </p:blipFill>
+        <p:spPr>
+          <a:xfrm flipH="1">
+            <a:off x="10496151" y="493682"/>
+            <a:ext cx="227494" cy="227494"/>
+          </a:xfrm>
+          <a:prstGeom prst="rect">
+            <a:avLst/>
+          </a:prstGeom>
+        </p:spPr>
+      </p:pic>
+      <p:pic>
+        <p:nvPicPr>
+          <p:cNvPr id="21" name="Picture 20">
+            <a:extLst>
+              <a:ext uri="{FF2B5EF4-FFF2-40B4-BE49-F238E27FC236}">
+                <a16:creationId xmlns:a16="http://schemas.microsoft.com/office/drawing/2014/main" id="{FD361B33-7063-2797-73E9-4AEC43DF95C9}"/>
+              </a:ext>
+            </a:extLst>
+          </p:cNvPr>
+          <p:cNvPicPr>
+            <a:picLocks noChangeAspect="1"/>
+          </p:cNvPicPr>
+          <p:nvPr/>
+        </p:nvPicPr>
+        <p:blipFill>
+          <a:blip r:embed="rId3"/>
+          <a:stretch>
+            <a:fillRect/>
+          </a:stretch>
+        </p:blipFill>
+        <p:spPr>
+          <a:xfrm>
+            <a:off x="10464936" y="638977"/>
+            <a:ext cx="320040" cy="268970"/>
+          </a:xfrm>
+          <a:prstGeom prst="rect">
+            <a:avLst/>
+          </a:prstGeom>
+        </p:spPr>
+      </p:pic>
+      <p:pic>
+        <p:nvPicPr>
+          <p:cNvPr id="22" name="Picture 21">
+            <a:extLst>
+              <a:ext uri="{FF2B5EF4-FFF2-40B4-BE49-F238E27FC236}">
+                <a16:creationId xmlns:a16="http://schemas.microsoft.com/office/drawing/2014/main" id="{587406A3-3972-D14E-6FAC-A0AC0E13BD74}"/>
+              </a:ext>
+            </a:extLst>
+          </p:cNvPr>
+          <p:cNvPicPr>
+            <a:picLocks noChangeAspect="1"/>
+          </p:cNvPicPr>
+          <p:nvPr/>
+        </p:nvPicPr>
+        <p:blipFill>
+          <a:blip r:embed="rId4"/>
+          <a:stretch>
+            <a:fillRect/>
+          </a:stretch>
+        </p:blipFill>
+        <p:spPr>
+          <a:xfrm>
+            <a:off x="6570247" y="2172514"/>
+            <a:ext cx="299230" cy="331756"/>
+          </a:xfrm>
+          <a:prstGeom prst="rect">
+            <a:avLst/>
+          </a:prstGeom>
+          <a:ln w="9525">
+            <a:solidFill>
+              <a:schemeClr val="tx1"/>
+            </a:solidFill>
+          </a:ln>
+        </p:spPr>
+      </p:pic>
+      <p:cxnSp>
+        <p:nvCxnSpPr>
+          <p:cNvPr id="30" name="Straight Arrow Connector 29">
+            <a:extLst>
+              <a:ext uri="{FF2B5EF4-FFF2-40B4-BE49-F238E27FC236}">
+                <a16:creationId xmlns:a16="http://schemas.microsoft.com/office/drawing/2014/main" id="{AA08971F-5DF6-5055-6851-0444B509D6FE}"/>
+              </a:ext>
+            </a:extLst>
+          </p:cNvPr>
+          <p:cNvCxnSpPr>
+            <a:cxnSpLocks/>
+            <a:stCxn id="22" idx="1"/>
+          </p:cNvCxnSpPr>
+          <p:nvPr/>
+        </p:nvCxnSpPr>
+        <p:spPr>
+          <a:xfrm flipH="1">
+            <a:off x="6353902" y="2338392"/>
+            <a:ext cx="216345" cy="239470"/>
+          </a:xfrm>
+          <a:prstGeom prst="straightConnector1">
+            <a:avLst/>
+          </a:prstGeom>
+          <a:ln>
+            <a:tailEnd type="triangle"/>
+          </a:ln>
+        </p:spPr>
+        <p:style>
+          <a:lnRef idx="1">
+            <a:schemeClr val="dk1"/>
+          </a:lnRef>
+          <a:fillRef idx="0">
+            <a:schemeClr val="dk1"/>
+          </a:fillRef>
+          <a:effectRef idx="0">
+            <a:schemeClr val="dk1"/>
+          </a:effectRef>
+          <a:fontRef idx="minor">
+            <a:schemeClr val="tx1"/>
+          </a:fontRef>
+        </p:style>
+      </p:cxnSp>
+      <p:sp>
+        <p:nvSpPr>
+          <p:cNvPr id="37" name="TextBox 36">
+            <a:extLst>
+              <a:ext uri="{FF2B5EF4-FFF2-40B4-BE49-F238E27FC236}">
+                <a16:creationId xmlns:a16="http://schemas.microsoft.com/office/drawing/2014/main" id="{15C6874D-2B33-951B-B0E1-645B44B5ED88}"/>
+              </a:ext>
+            </a:extLst>
+          </p:cNvPr>
+          <p:cNvSpPr txBox="1"/>
+          <p:nvPr/>
+        </p:nvSpPr>
+        <p:spPr>
+          <a:xfrm>
+            <a:off x="6502281" y="1681842"/>
+            <a:ext cx="1054429" cy="430887"/>
+          </a:xfrm>
+          <a:prstGeom prst="rect">
+            <a:avLst/>
+          </a:prstGeom>
+          <a:noFill/>
+        </p:spPr>
+        <p:txBody>
+          <a:bodyPr wrap="square" rtlCol="0">
+            <a:spAutoFit/>
+          </a:bodyPr>
+          <a:lstStyle/>
+          <a:p>
+            <a:r>
+              <a:rPr lang="en-SG" sz="1100" b="1" dirty="0"/>
+              <a:t>Hacker-1 control action</a:t>
+            </a:r>
+          </a:p>
+        </p:txBody>
+      </p:sp>
+      <p:pic>
+        <p:nvPicPr>
+          <p:cNvPr id="41" name="Picture 40">
+            <a:extLst>
+              <a:ext uri="{FF2B5EF4-FFF2-40B4-BE49-F238E27FC236}">
+                <a16:creationId xmlns:a16="http://schemas.microsoft.com/office/drawing/2014/main" id="{B1650CDD-55A3-72DE-7913-A6B056FF4286}"/>
+              </a:ext>
+            </a:extLst>
+          </p:cNvPr>
+          <p:cNvPicPr>
+            <a:picLocks noChangeAspect="1"/>
+          </p:cNvPicPr>
+          <p:nvPr/>
+        </p:nvPicPr>
+        <p:blipFill>
+          <a:blip r:embed="rId4"/>
+          <a:stretch>
+            <a:fillRect/>
+          </a:stretch>
+        </p:blipFill>
+        <p:spPr>
+          <a:xfrm>
+            <a:off x="8422343" y="3011475"/>
+            <a:ext cx="299230" cy="331756"/>
+          </a:xfrm>
+          <a:prstGeom prst="rect">
+            <a:avLst/>
+          </a:prstGeom>
+          <a:ln w="9525">
+            <a:solidFill>
+              <a:schemeClr val="tx1"/>
+            </a:solidFill>
+          </a:ln>
+        </p:spPr>
+      </p:pic>
+      <p:cxnSp>
+        <p:nvCxnSpPr>
+          <p:cNvPr id="42" name="Straight Arrow Connector 41">
+            <a:extLst>
+              <a:ext uri="{FF2B5EF4-FFF2-40B4-BE49-F238E27FC236}">
+                <a16:creationId xmlns:a16="http://schemas.microsoft.com/office/drawing/2014/main" id="{BE6C2C15-AB01-86F8-99F9-BC6125AE8E74}"/>
+              </a:ext>
+            </a:extLst>
+          </p:cNvPr>
+          <p:cNvCxnSpPr>
+            <a:cxnSpLocks/>
+            <a:stCxn id="41" idx="1"/>
+          </p:cNvCxnSpPr>
+          <p:nvPr/>
+        </p:nvCxnSpPr>
+        <p:spPr>
+          <a:xfrm flipH="1">
+            <a:off x="8205998" y="3177353"/>
+            <a:ext cx="216345" cy="239470"/>
+          </a:xfrm>
+          <a:prstGeom prst="straightConnector1">
+            <a:avLst/>
+          </a:prstGeom>
+          <a:ln>
+            <a:tailEnd type="triangle"/>
+          </a:ln>
+        </p:spPr>
+        <p:style>
+          <a:lnRef idx="1">
+            <a:schemeClr val="dk1"/>
+          </a:lnRef>
+          <a:fillRef idx="0">
+            <a:schemeClr val="dk1"/>
+          </a:fillRef>
+          <a:effectRef idx="0">
+            <a:schemeClr val="dk1"/>
+          </a:effectRef>
+          <a:fontRef idx="minor">
+            <a:schemeClr val="tx1"/>
+          </a:fontRef>
+        </p:style>
+      </p:cxnSp>
+      <p:sp>
+        <p:nvSpPr>
+          <p:cNvPr id="43" name="TextBox 42">
+            <a:extLst>
+              <a:ext uri="{FF2B5EF4-FFF2-40B4-BE49-F238E27FC236}">
+                <a16:creationId xmlns:a16="http://schemas.microsoft.com/office/drawing/2014/main" id="{6D935CEB-752F-5BFB-9627-328C89DC69BA}"/>
+              </a:ext>
+            </a:extLst>
+          </p:cNvPr>
+          <p:cNvSpPr txBox="1"/>
+          <p:nvPr/>
+        </p:nvSpPr>
+        <p:spPr>
+          <a:xfrm>
+            <a:off x="8287913" y="2518521"/>
+            <a:ext cx="1054429" cy="430887"/>
+          </a:xfrm>
+          <a:prstGeom prst="rect">
+            <a:avLst/>
+          </a:prstGeom>
+          <a:noFill/>
+        </p:spPr>
+        <p:txBody>
+          <a:bodyPr wrap="square" rtlCol="0">
+            <a:spAutoFit/>
+          </a:bodyPr>
+          <a:lstStyle/>
+          <a:p>
+            <a:r>
+              <a:rPr lang="en-SG" sz="1100" b="1" dirty="0"/>
+              <a:t>Hacker-2 control action</a:t>
+            </a:r>
+          </a:p>
+        </p:txBody>
+      </p:sp>
+      <p:pic>
+        <p:nvPicPr>
+          <p:cNvPr id="46" name="Picture 45">
+            <a:extLst>
+              <a:ext uri="{FF2B5EF4-FFF2-40B4-BE49-F238E27FC236}">
+                <a16:creationId xmlns:a16="http://schemas.microsoft.com/office/drawing/2014/main" id="{3085CB0D-3834-44E6-7887-B8D11B0742D2}"/>
+              </a:ext>
+            </a:extLst>
+          </p:cNvPr>
+          <p:cNvPicPr>
+            <a:picLocks noChangeAspect="1"/>
+          </p:cNvPicPr>
+          <p:nvPr/>
+        </p:nvPicPr>
+        <p:blipFill>
+          <a:blip r:embed="rId4"/>
+          <a:stretch>
+            <a:fillRect/>
+          </a:stretch>
+        </p:blipFill>
+        <p:spPr>
+          <a:xfrm>
+            <a:off x="10284093" y="3480695"/>
+            <a:ext cx="299230" cy="331756"/>
+          </a:xfrm>
+          <a:prstGeom prst="rect">
+            <a:avLst/>
+          </a:prstGeom>
+          <a:ln w="9525">
+            <a:solidFill>
+              <a:schemeClr val="tx1"/>
+            </a:solidFill>
+          </a:ln>
+        </p:spPr>
+      </p:pic>
+      <p:cxnSp>
+        <p:nvCxnSpPr>
+          <p:cNvPr id="48" name="Straight Arrow Connector 47">
+            <a:extLst>
+              <a:ext uri="{FF2B5EF4-FFF2-40B4-BE49-F238E27FC236}">
+                <a16:creationId xmlns:a16="http://schemas.microsoft.com/office/drawing/2014/main" id="{55766805-2F53-CFEF-4430-BE445EE7ED84}"/>
+              </a:ext>
+            </a:extLst>
+          </p:cNvPr>
+          <p:cNvCxnSpPr>
+            <a:cxnSpLocks/>
+            <a:stCxn id="46" idx="1"/>
+          </p:cNvCxnSpPr>
+          <p:nvPr/>
+        </p:nvCxnSpPr>
+        <p:spPr>
+          <a:xfrm flipH="1">
+            <a:off x="10067748" y="3646573"/>
+            <a:ext cx="216345" cy="239470"/>
+          </a:xfrm>
+          <a:prstGeom prst="straightConnector1">
+            <a:avLst/>
+          </a:prstGeom>
+          <a:ln>
+            <a:tailEnd type="triangle"/>
+          </a:ln>
+        </p:spPr>
+        <p:style>
+          <a:lnRef idx="1">
+            <a:schemeClr val="dk1"/>
+          </a:lnRef>
+          <a:fillRef idx="0">
+            <a:schemeClr val="dk1"/>
+          </a:fillRef>
+          <a:effectRef idx="0">
+            <a:schemeClr val="dk1"/>
+          </a:effectRef>
+          <a:fontRef idx="minor">
+            <a:schemeClr val="tx1"/>
+          </a:fontRef>
+        </p:style>
+      </p:cxnSp>
+      <p:sp>
+        <p:nvSpPr>
+          <p:cNvPr id="49" name="TextBox 48">
+            <a:extLst>
+              <a:ext uri="{FF2B5EF4-FFF2-40B4-BE49-F238E27FC236}">
+                <a16:creationId xmlns:a16="http://schemas.microsoft.com/office/drawing/2014/main" id="{9F843048-3EF9-8653-0E25-36DA48EC017C}"/>
+              </a:ext>
+            </a:extLst>
+          </p:cNvPr>
+          <p:cNvSpPr txBox="1"/>
+          <p:nvPr/>
+        </p:nvSpPr>
+        <p:spPr>
+          <a:xfrm>
+            <a:off x="10149663" y="2987741"/>
+            <a:ext cx="1054429" cy="430887"/>
+          </a:xfrm>
+          <a:prstGeom prst="rect">
+            <a:avLst/>
+          </a:prstGeom>
+          <a:noFill/>
+        </p:spPr>
+        <p:txBody>
+          <a:bodyPr wrap="square" rtlCol="0">
+            <a:spAutoFit/>
+          </a:bodyPr>
+          <a:lstStyle/>
+          <a:p>
+            <a:r>
+              <a:rPr lang="en-SG" sz="1100" b="1" dirty="0"/>
+              <a:t>Hacker-N control action</a:t>
+            </a:r>
+          </a:p>
+        </p:txBody>
+      </p:sp>
     </p:spTree>
     <p:extLst>
       <p:ext uri="{BB962C8B-B14F-4D97-AF65-F5344CB8AC3E}">
@@ -8269,6 +8840,2556 @@
           <a:chExt cx="0" cy="0"/>
         </a:xfrm>
       </p:grpSpPr>
+      <p:cxnSp>
+        <p:nvCxnSpPr>
+          <p:cNvPr id="4" name="Straight Arrow Connector 3">
+            <a:extLst>
+              <a:ext uri="{FF2B5EF4-FFF2-40B4-BE49-F238E27FC236}">
+                <a16:creationId xmlns:a16="http://schemas.microsoft.com/office/drawing/2014/main" id="{A7257861-546E-512E-ADB3-9D1F3AFF89F0}"/>
+              </a:ext>
+            </a:extLst>
+          </p:cNvPr>
+          <p:cNvCxnSpPr>
+            <a:cxnSpLocks/>
+          </p:cNvCxnSpPr>
+          <p:nvPr/>
+        </p:nvCxnSpPr>
+        <p:spPr>
+          <a:xfrm>
+            <a:off x="9846154" y="884288"/>
+            <a:ext cx="0" cy="4729110"/>
+          </a:xfrm>
+          <a:prstGeom prst="straightConnector1">
+            <a:avLst/>
+          </a:prstGeom>
+          <a:ln w="28575">
+            <a:solidFill>
+              <a:schemeClr val="tx1"/>
+            </a:solidFill>
+            <a:tailEnd type="triangle"/>
+          </a:ln>
+        </p:spPr>
+        <p:style>
+          <a:lnRef idx="1">
+            <a:schemeClr val="accent1"/>
+          </a:lnRef>
+          <a:fillRef idx="0">
+            <a:schemeClr val="accent1"/>
+          </a:fillRef>
+          <a:effectRef idx="0">
+            <a:schemeClr val="accent1"/>
+          </a:effectRef>
+          <a:fontRef idx="minor">
+            <a:schemeClr val="tx1"/>
+          </a:fontRef>
+        </p:style>
+      </p:cxnSp>
+      <p:sp>
+        <p:nvSpPr>
+          <p:cNvPr id="6" name="TextBox 5">
+            <a:extLst>
+              <a:ext uri="{FF2B5EF4-FFF2-40B4-BE49-F238E27FC236}">
+                <a16:creationId xmlns:a16="http://schemas.microsoft.com/office/drawing/2014/main" id="{63419ED0-9D2F-5B30-D501-BADD6536F240}"/>
+              </a:ext>
+            </a:extLst>
+          </p:cNvPr>
+          <p:cNvSpPr txBox="1"/>
+          <p:nvPr/>
+        </p:nvSpPr>
+        <p:spPr>
+          <a:xfrm>
+            <a:off x="9261922" y="511459"/>
+            <a:ext cx="1168464" cy="363615"/>
+          </a:xfrm>
+          <a:prstGeom prst="rect">
+            <a:avLst/>
+          </a:prstGeom>
+          <a:solidFill>
+            <a:schemeClr val="bg1"/>
+          </a:solidFill>
+          <a:ln w="19050">
+            <a:solidFill>
+              <a:schemeClr val="tx1"/>
+            </a:solidFill>
+          </a:ln>
+        </p:spPr>
+        <p:txBody>
+          <a:bodyPr wrap="square" lIns="36000" tIns="36000" rIns="36000" bIns="36000" rtlCol="0">
+            <a:noAutofit/>
+          </a:bodyPr>
+          <a:lstStyle/>
+          <a:p>
+            <a:r>
+              <a:rPr lang="en-SG" sz="1100" b="1" dirty="0"/>
+              <a:t>Trojan Controller hub </a:t>
+            </a:r>
+          </a:p>
+        </p:txBody>
+      </p:sp>
+      <p:pic>
+        <p:nvPicPr>
+          <p:cNvPr id="29" name="Picture 28" descr="A logo with a letter t&#10;&#10;Description automatically generated with medium confidence">
+            <a:extLst>
+              <a:ext uri="{FF2B5EF4-FFF2-40B4-BE49-F238E27FC236}">
+                <a16:creationId xmlns:a16="http://schemas.microsoft.com/office/drawing/2014/main" id="{305B99C7-A593-8B90-8053-0CAC4C482D68}"/>
+              </a:ext>
+            </a:extLst>
+          </p:cNvPr>
+          <p:cNvPicPr>
+            <a:picLocks noChangeAspect="1"/>
+          </p:cNvPicPr>
+          <p:nvPr/>
+        </p:nvPicPr>
+        <p:blipFill rotWithShape="1">
+          <a:blip r:embed="rId2">
+            <a:extLst>
+              <a:ext uri="{28A0092B-C50C-407E-A947-70E740481C1C}">
+                <a14:useLocalDpi xmlns:a14="http://schemas.microsoft.com/office/drawing/2010/main" val="0"/>
+              </a:ext>
+            </a:extLst>
+          </a:blip>
+          <a:srcRect l="32534" t="1" r="29884" b="27348"/>
+          <a:stretch/>
+        </p:blipFill>
+        <p:spPr>
+          <a:xfrm>
+            <a:off x="10485165" y="496122"/>
+            <a:ext cx="489508" cy="394287"/>
+          </a:xfrm>
+          <a:prstGeom prst="rect">
+            <a:avLst/>
+          </a:prstGeom>
+        </p:spPr>
+      </p:pic>
+      <p:sp>
+        <p:nvSpPr>
+          <p:cNvPr id="30" name="TextBox 29">
+            <a:extLst>
+              <a:ext uri="{FF2B5EF4-FFF2-40B4-BE49-F238E27FC236}">
+                <a16:creationId xmlns:a16="http://schemas.microsoft.com/office/drawing/2014/main" id="{EFD1708C-BDDD-2045-CEA0-545AE8A046C4}"/>
+              </a:ext>
+            </a:extLst>
+          </p:cNvPr>
+          <p:cNvSpPr txBox="1"/>
+          <p:nvPr/>
+        </p:nvSpPr>
+        <p:spPr>
+          <a:xfrm>
+            <a:off x="1368422" y="511459"/>
+            <a:ext cx="1296282" cy="404337"/>
+          </a:xfrm>
+          <a:prstGeom prst="rect">
+            <a:avLst/>
+          </a:prstGeom>
+          <a:solidFill>
+            <a:schemeClr val="bg1"/>
+          </a:solidFill>
+          <a:ln w="19050">
+            <a:solidFill>
+              <a:schemeClr val="accent6">
+                <a:lumMod val="75000"/>
+              </a:schemeClr>
+            </a:solidFill>
+          </a:ln>
+        </p:spPr>
+        <p:txBody>
+          <a:bodyPr wrap="square" lIns="36000" tIns="36000" rIns="36000" bIns="36000" rtlCol="0">
+            <a:noAutofit/>
+          </a:bodyPr>
+          <a:lstStyle/>
+          <a:p>
+            <a:r>
+              <a:rPr lang="en-SG" sz="1100" b="1" dirty="0">
+                <a:solidFill>
+                  <a:schemeClr val="accent6">
+                    <a:lumMod val="75000"/>
+                  </a:schemeClr>
+                </a:solidFill>
+              </a:rPr>
+              <a:t>Backdoor trojan-0 </a:t>
+            </a:r>
+          </a:p>
+          <a:p>
+            <a:r>
+              <a:rPr lang="en-SG" sz="1100" b="1" dirty="0">
+                <a:solidFill>
+                  <a:schemeClr val="accent6">
+                    <a:lumMod val="75000"/>
+                  </a:schemeClr>
+                </a:solidFill>
+              </a:rPr>
+              <a:t>[Victim_00]</a:t>
+            </a:r>
+          </a:p>
+        </p:txBody>
+      </p:sp>
+      <p:cxnSp>
+        <p:nvCxnSpPr>
+          <p:cNvPr id="32" name="Straight Arrow Connector 31">
+            <a:extLst>
+              <a:ext uri="{FF2B5EF4-FFF2-40B4-BE49-F238E27FC236}">
+                <a16:creationId xmlns:a16="http://schemas.microsoft.com/office/drawing/2014/main" id="{883F1654-2BEF-87B5-49CB-6D0E55466570}"/>
+              </a:ext>
+            </a:extLst>
+          </p:cNvPr>
+          <p:cNvCxnSpPr>
+            <a:cxnSpLocks/>
+          </p:cNvCxnSpPr>
+          <p:nvPr/>
+        </p:nvCxnSpPr>
+        <p:spPr>
+          <a:xfrm>
+            <a:off x="2010675" y="915796"/>
+            <a:ext cx="0" cy="4729110"/>
+          </a:xfrm>
+          <a:prstGeom prst="straightConnector1">
+            <a:avLst/>
+          </a:prstGeom>
+          <a:ln w="28575">
+            <a:solidFill>
+              <a:schemeClr val="accent6">
+                <a:lumMod val="75000"/>
+              </a:schemeClr>
+            </a:solidFill>
+            <a:tailEnd type="triangle"/>
+          </a:ln>
+        </p:spPr>
+        <p:style>
+          <a:lnRef idx="1">
+            <a:schemeClr val="accent1"/>
+          </a:lnRef>
+          <a:fillRef idx="0">
+            <a:schemeClr val="accent1"/>
+          </a:fillRef>
+          <a:effectRef idx="0">
+            <a:schemeClr val="accent1"/>
+          </a:effectRef>
+          <a:fontRef idx="minor">
+            <a:schemeClr val="tx1"/>
+          </a:fontRef>
+        </p:style>
+      </p:cxnSp>
+      <p:cxnSp>
+        <p:nvCxnSpPr>
+          <p:cNvPr id="33" name="Straight Arrow Connector 32">
+            <a:extLst>
+              <a:ext uri="{FF2B5EF4-FFF2-40B4-BE49-F238E27FC236}">
+                <a16:creationId xmlns:a16="http://schemas.microsoft.com/office/drawing/2014/main" id="{94446993-35F0-08DD-AC03-7C1141C2B5CB}"/>
+              </a:ext>
+            </a:extLst>
+          </p:cNvPr>
+          <p:cNvCxnSpPr>
+            <a:cxnSpLocks/>
+          </p:cNvCxnSpPr>
+          <p:nvPr/>
+        </p:nvCxnSpPr>
+        <p:spPr>
+          <a:xfrm>
+            <a:off x="2010675" y="1234440"/>
+            <a:ext cx="7835479" cy="0"/>
+          </a:xfrm>
+          <a:prstGeom prst="straightConnector1">
+            <a:avLst/>
+          </a:prstGeom>
+          <a:ln>
+            <a:solidFill>
+              <a:schemeClr val="accent6">
+                <a:lumMod val="75000"/>
+              </a:schemeClr>
+            </a:solidFill>
+            <a:prstDash val="dash"/>
+            <a:tailEnd type="triangle"/>
+          </a:ln>
+        </p:spPr>
+        <p:style>
+          <a:lnRef idx="1">
+            <a:schemeClr val="accent1"/>
+          </a:lnRef>
+          <a:fillRef idx="0">
+            <a:schemeClr val="accent1"/>
+          </a:fillRef>
+          <a:effectRef idx="0">
+            <a:schemeClr val="accent1"/>
+          </a:effectRef>
+          <a:fontRef idx="minor">
+            <a:schemeClr val="tx1"/>
+          </a:fontRef>
+        </p:style>
+      </p:cxnSp>
+      <p:sp>
+        <p:nvSpPr>
+          <p:cNvPr id="43" name="TextBox 42">
+            <a:extLst>
+              <a:ext uri="{FF2B5EF4-FFF2-40B4-BE49-F238E27FC236}">
+                <a16:creationId xmlns:a16="http://schemas.microsoft.com/office/drawing/2014/main" id="{3A7AFAF1-E318-4745-4CD0-D5B27397862A}"/>
+              </a:ext>
+            </a:extLst>
+          </p:cNvPr>
+          <p:cNvSpPr txBox="1"/>
+          <p:nvPr/>
+        </p:nvSpPr>
+        <p:spPr>
+          <a:xfrm>
+            <a:off x="1999111" y="997075"/>
+            <a:ext cx="1737456" cy="246221"/>
+          </a:xfrm>
+          <a:prstGeom prst="rect">
+            <a:avLst/>
+          </a:prstGeom>
+          <a:noFill/>
+        </p:spPr>
+        <p:txBody>
+          <a:bodyPr wrap="square" rtlCol="0">
+            <a:spAutoFit/>
+          </a:bodyPr>
+          <a:lstStyle/>
+          <a:p>
+            <a:r>
+              <a:rPr lang="en-SG" sz="1000" b="1" dirty="0">
+                <a:solidFill>
+                  <a:schemeClr val="accent6">
+                    <a:lumMod val="75000"/>
+                  </a:schemeClr>
+                </a:solidFill>
+              </a:rPr>
+              <a:t>1 Trojan register request</a:t>
+            </a:r>
+          </a:p>
+        </p:txBody>
+      </p:sp>
+      <p:cxnSp>
+        <p:nvCxnSpPr>
+          <p:cNvPr id="46" name="Straight Arrow Connector 45">
+            <a:extLst>
+              <a:ext uri="{FF2B5EF4-FFF2-40B4-BE49-F238E27FC236}">
+                <a16:creationId xmlns:a16="http://schemas.microsoft.com/office/drawing/2014/main" id="{3EEF8A7B-B3AE-C751-4A40-BE1AED343FF9}"/>
+              </a:ext>
+            </a:extLst>
+          </p:cNvPr>
+          <p:cNvCxnSpPr>
+            <a:cxnSpLocks/>
+          </p:cNvCxnSpPr>
+          <p:nvPr/>
+        </p:nvCxnSpPr>
+        <p:spPr>
+          <a:xfrm flipH="1">
+            <a:off x="2010675" y="1408176"/>
+            <a:ext cx="7835479" cy="0"/>
+          </a:xfrm>
+          <a:prstGeom prst="straightConnector1">
+            <a:avLst/>
+          </a:prstGeom>
+          <a:ln>
+            <a:solidFill>
+              <a:schemeClr val="accent6">
+                <a:lumMod val="75000"/>
+              </a:schemeClr>
+            </a:solidFill>
+            <a:prstDash val="dash"/>
+            <a:tailEnd type="triangle"/>
+          </a:ln>
+        </p:spPr>
+        <p:style>
+          <a:lnRef idx="1">
+            <a:schemeClr val="accent1"/>
+          </a:lnRef>
+          <a:fillRef idx="0">
+            <a:schemeClr val="accent1"/>
+          </a:fillRef>
+          <a:effectRef idx="0">
+            <a:schemeClr val="accent1"/>
+          </a:effectRef>
+          <a:fontRef idx="minor">
+            <a:schemeClr val="tx1"/>
+          </a:fontRef>
+        </p:style>
+      </p:cxnSp>
+      <p:sp>
+        <p:nvSpPr>
+          <p:cNvPr id="53" name="TextBox 52">
+            <a:extLst>
+              <a:ext uri="{FF2B5EF4-FFF2-40B4-BE49-F238E27FC236}">
+                <a16:creationId xmlns:a16="http://schemas.microsoft.com/office/drawing/2014/main" id="{46B20301-BFF7-266C-96AA-1CDAF65F89BB}"/>
+              </a:ext>
+            </a:extLst>
+          </p:cNvPr>
+          <p:cNvSpPr txBox="1"/>
+          <p:nvPr/>
+        </p:nvSpPr>
+        <p:spPr>
+          <a:xfrm>
+            <a:off x="7788679" y="1392683"/>
+            <a:ext cx="2057476" cy="246221"/>
+          </a:xfrm>
+          <a:prstGeom prst="rect">
+            <a:avLst/>
+          </a:prstGeom>
+          <a:noFill/>
+        </p:spPr>
+        <p:txBody>
+          <a:bodyPr wrap="square" rtlCol="0">
+            <a:spAutoFit/>
+          </a:bodyPr>
+          <a:lstStyle/>
+          <a:p>
+            <a:r>
+              <a:rPr lang="en-SG" sz="1000" b="1" dirty="0">
+                <a:solidFill>
+                  <a:schemeClr val="accent6">
+                    <a:lumMod val="75000"/>
+                  </a:schemeClr>
+                </a:solidFill>
+              </a:rPr>
+              <a:t>1.1 Trojan register accept response </a:t>
+            </a:r>
+          </a:p>
+        </p:txBody>
+      </p:sp>
+      <p:sp>
+        <p:nvSpPr>
+          <p:cNvPr id="54" name="TextBox 53">
+            <a:extLst>
+              <a:ext uri="{FF2B5EF4-FFF2-40B4-BE49-F238E27FC236}">
+                <a16:creationId xmlns:a16="http://schemas.microsoft.com/office/drawing/2014/main" id="{C2F80854-9505-2195-A45A-BAD4C0FA3C2E}"/>
+              </a:ext>
+            </a:extLst>
+          </p:cNvPr>
+          <p:cNvSpPr txBox="1"/>
+          <p:nvPr/>
+        </p:nvSpPr>
+        <p:spPr>
+          <a:xfrm>
+            <a:off x="3907406" y="496122"/>
+            <a:ext cx="1296282" cy="404337"/>
+          </a:xfrm>
+          <a:prstGeom prst="rect">
+            <a:avLst/>
+          </a:prstGeom>
+          <a:solidFill>
+            <a:schemeClr val="bg1"/>
+          </a:solidFill>
+          <a:ln w="19050">
+            <a:solidFill>
+              <a:srgbClr val="7030A0"/>
+            </a:solidFill>
+          </a:ln>
+        </p:spPr>
+        <p:txBody>
+          <a:bodyPr wrap="square" lIns="36000" tIns="36000" rIns="36000" bIns="36000" rtlCol="0">
+            <a:noAutofit/>
+          </a:bodyPr>
+          <a:lstStyle/>
+          <a:p>
+            <a:r>
+              <a:rPr lang="en-SG" sz="1100" b="1" dirty="0">
+                <a:solidFill>
+                  <a:srgbClr val="7030A0"/>
+                </a:solidFill>
+              </a:rPr>
+              <a:t>Backdoor trojan-1 </a:t>
+            </a:r>
+          </a:p>
+          <a:p>
+            <a:r>
+              <a:rPr lang="en-SG" sz="1100" b="1" dirty="0">
+                <a:solidFill>
+                  <a:srgbClr val="7030A0"/>
+                </a:solidFill>
+              </a:rPr>
+              <a:t>[Victim_01]</a:t>
+            </a:r>
+          </a:p>
+        </p:txBody>
+      </p:sp>
+      <p:cxnSp>
+        <p:nvCxnSpPr>
+          <p:cNvPr id="60" name="Straight Arrow Connector 59">
+            <a:extLst>
+              <a:ext uri="{FF2B5EF4-FFF2-40B4-BE49-F238E27FC236}">
+                <a16:creationId xmlns:a16="http://schemas.microsoft.com/office/drawing/2014/main" id="{E8D7EBFC-B466-1582-8AD5-124074E4F03A}"/>
+              </a:ext>
+            </a:extLst>
+          </p:cNvPr>
+          <p:cNvCxnSpPr>
+            <a:cxnSpLocks/>
+          </p:cNvCxnSpPr>
+          <p:nvPr/>
+        </p:nvCxnSpPr>
+        <p:spPr>
+          <a:xfrm>
+            <a:off x="4549659" y="900459"/>
+            <a:ext cx="0" cy="4729110"/>
+          </a:xfrm>
+          <a:prstGeom prst="straightConnector1">
+            <a:avLst/>
+          </a:prstGeom>
+          <a:ln w="28575">
+            <a:solidFill>
+              <a:srgbClr val="7030A0"/>
+            </a:solidFill>
+            <a:tailEnd type="triangle"/>
+          </a:ln>
+        </p:spPr>
+        <p:style>
+          <a:lnRef idx="1">
+            <a:schemeClr val="accent1"/>
+          </a:lnRef>
+          <a:fillRef idx="0">
+            <a:schemeClr val="accent1"/>
+          </a:fillRef>
+          <a:effectRef idx="0">
+            <a:schemeClr val="accent1"/>
+          </a:effectRef>
+          <a:fontRef idx="minor">
+            <a:schemeClr val="tx1"/>
+          </a:fontRef>
+        </p:style>
+      </p:cxnSp>
+      <p:sp>
+        <p:nvSpPr>
+          <p:cNvPr id="68" name="TextBox 67">
+            <a:extLst>
+              <a:ext uri="{FF2B5EF4-FFF2-40B4-BE49-F238E27FC236}">
+                <a16:creationId xmlns:a16="http://schemas.microsoft.com/office/drawing/2014/main" id="{59E0D609-DA8E-8D8E-00B1-435F806225F8}"/>
+              </a:ext>
+            </a:extLst>
+          </p:cNvPr>
+          <p:cNvSpPr txBox="1"/>
+          <p:nvPr/>
+        </p:nvSpPr>
+        <p:spPr>
+          <a:xfrm>
+            <a:off x="6510562" y="470737"/>
+            <a:ext cx="1296282" cy="404337"/>
+          </a:xfrm>
+          <a:prstGeom prst="rect">
+            <a:avLst/>
+          </a:prstGeom>
+          <a:solidFill>
+            <a:schemeClr val="bg1"/>
+          </a:solidFill>
+          <a:ln w="19050">
+            <a:solidFill>
+              <a:srgbClr val="FF0000"/>
+            </a:solidFill>
+          </a:ln>
+        </p:spPr>
+        <p:txBody>
+          <a:bodyPr wrap="square" lIns="36000" tIns="36000" rIns="36000" bIns="36000" rtlCol="0">
+            <a:noAutofit/>
+          </a:bodyPr>
+          <a:lstStyle/>
+          <a:p>
+            <a:r>
+              <a:rPr lang="en-SG" sz="1100" b="1" dirty="0">
+                <a:solidFill>
+                  <a:srgbClr val="FF0000"/>
+                </a:solidFill>
+              </a:rPr>
+              <a:t>Backdoor trojan-N </a:t>
+            </a:r>
+          </a:p>
+          <a:p>
+            <a:r>
+              <a:rPr lang="en-SG" sz="1100" b="1" dirty="0">
+                <a:solidFill>
+                  <a:srgbClr val="FF0000"/>
+                </a:solidFill>
+              </a:rPr>
+              <a:t>[</a:t>
+            </a:r>
+            <a:r>
+              <a:rPr lang="en-SG" sz="1100" b="1" dirty="0" err="1">
+                <a:solidFill>
+                  <a:srgbClr val="FF0000"/>
+                </a:solidFill>
+              </a:rPr>
+              <a:t>Victim_N</a:t>
+            </a:r>
+            <a:r>
+              <a:rPr lang="en-SG" sz="1100" b="1" dirty="0">
+                <a:solidFill>
+                  <a:srgbClr val="FF0000"/>
+                </a:solidFill>
+              </a:rPr>
+              <a:t>]</a:t>
+            </a:r>
+          </a:p>
+        </p:txBody>
+      </p:sp>
+      <p:cxnSp>
+        <p:nvCxnSpPr>
+          <p:cNvPr id="69" name="Straight Arrow Connector 68">
+            <a:extLst>
+              <a:ext uri="{FF2B5EF4-FFF2-40B4-BE49-F238E27FC236}">
+                <a16:creationId xmlns:a16="http://schemas.microsoft.com/office/drawing/2014/main" id="{EE714062-A4CF-7269-43F8-1307B2091814}"/>
+              </a:ext>
+            </a:extLst>
+          </p:cNvPr>
+          <p:cNvCxnSpPr>
+            <a:cxnSpLocks/>
+          </p:cNvCxnSpPr>
+          <p:nvPr/>
+        </p:nvCxnSpPr>
+        <p:spPr>
+          <a:xfrm>
+            <a:off x="7152815" y="875074"/>
+            <a:ext cx="0" cy="4729110"/>
+          </a:xfrm>
+          <a:prstGeom prst="straightConnector1">
+            <a:avLst/>
+          </a:prstGeom>
+          <a:ln w="28575">
+            <a:solidFill>
+              <a:srgbClr val="FF0000"/>
+            </a:solidFill>
+            <a:tailEnd type="triangle"/>
+          </a:ln>
+        </p:spPr>
+        <p:style>
+          <a:lnRef idx="1">
+            <a:schemeClr val="accent1"/>
+          </a:lnRef>
+          <a:fillRef idx="0">
+            <a:schemeClr val="accent1"/>
+          </a:fillRef>
+          <a:effectRef idx="0">
+            <a:schemeClr val="accent1"/>
+          </a:effectRef>
+          <a:fontRef idx="minor">
+            <a:schemeClr val="tx1"/>
+          </a:fontRef>
+        </p:style>
+      </p:cxnSp>
+      <p:cxnSp>
+        <p:nvCxnSpPr>
+          <p:cNvPr id="72" name="Straight Arrow Connector 71">
+            <a:extLst>
+              <a:ext uri="{FF2B5EF4-FFF2-40B4-BE49-F238E27FC236}">
+                <a16:creationId xmlns:a16="http://schemas.microsoft.com/office/drawing/2014/main" id="{AE628F8F-3475-EA62-E8D0-3D506FB9AFDA}"/>
+              </a:ext>
+            </a:extLst>
+          </p:cNvPr>
+          <p:cNvCxnSpPr>
+            <a:cxnSpLocks/>
+          </p:cNvCxnSpPr>
+          <p:nvPr/>
+        </p:nvCxnSpPr>
+        <p:spPr>
+          <a:xfrm>
+            <a:off x="4549659" y="1834331"/>
+            <a:ext cx="5296495" cy="0"/>
+          </a:xfrm>
+          <a:prstGeom prst="straightConnector1">
+            <a:avLst/>
+          </a:prstGeom>
+          <a:ln>
+            <a:solidFill>
+              <a:srgbClr val="7030A0"/>
+            </a:solidFill>
+            <a:prstDash val="dash"/>
+            <a:tailEnd type="triangle"/>
+          </a:ln>
+        </p:spPr>
+        <p:style>
+          <a:lnRef idx="1">
+            <a:schemeClr val="accent1"/>
+          </a:lnRef>
+          <a:fillRef idx="0">
+            <a:schemeClr val="accent1"/>
+          </a:fillRef>
+          <a:effectRef idx="0">
+            <a:schemeClr val="accent1"/>
+          </a:effectRef>
+          <a:fontRef idx="minor">
+            <a:schemeClr val="tx1"/>
+          </a:fontRef>
+        </p:style>
+      </p:cxnSp>
+      <p:cxnSp>
+        <p:nvCxnSpPr>
+          <p:cNvPr id="74" name="Straight Arrow Connector 73">
+            <a:extLst>
+              <a:ext uri="{FF2B5EF4-FFF2-40B4-BE49-F238E27FC236}">
+                <a16:creationId xmlns:a16="http://schemas.microsoft.com/office/drawing/2014/main" id="{7907E9A1-EF1B-0621-C87D-319634D96599}"/>
+              </a:ext>
+            </a:extLst>
+          </p:cNvPr>
+          <p:cNvCxnSpPr>
+            <a:cxnSpLocks/>
+          </p:cNvCxnSpPr>
+          <p:nvPr/>
+        </p:nvCxnSpPr>
+        <p:spPr>
+          <a:xfrm flipH="1">
+            <a:off x="4538095" y="2029250"/>
+            <a:ext cx="5229439" cy="0"/>
+          </a:xfrm>
+          <a:prstGeom prst="straightConnector1">
+            <a:avLst/>
+          </a:prstGeom>
+          <a:ln>
+            <a:solidFill>
+              <a:srgbClr val="7030A0"/>
+            </a:solidFill>
+            <a:prstDash val="dash"/>
+            <a:tailEnd type="triangle"/>
+          </a:ln>
+        </p:spPr>
+        <p:style>
+          <a:lnRef idx="1">
+            <a:schemeClr val="accent1"/>
+          </a:lnRef>
+          <a:fillRef idx="0">
+            <a:schemeClr val="accent1"/>
+          </a:fillRef>
+          <a:effectRef idx="0">
+            <a:schemeClr val="accent1"/>
+          </a:effectRef>
+          <a:fontRef idx="minor">
+            <a:schemeClr val="tx1"/>
+          </a:fontRef>
+        </p:style>
+      </p:cxnSp>
+      <p:sp>
+        <p:nvSpPr>
+          <p:cNvPr id="76" name="TextBox 75">
+            <a:extLst>
+              <a:ext uri="{FF2B5EF4-FFF2-40B4-BE49-F238E27FC236}">
+                <a16:creationId xmlns:a16="http://schemas.microsoft.com/office/drawing/2014/main" id="{311CAD3B-49BB-4D89-8753-BD17C63ACD00}"/>
+              </a:ext>
+            </a:extLst>
+          </p:cNvPr>
+          <p:cNvSpPr txBox="1"/>
+          <p:nvPr/>
+        </p:nvSpPr>
+        <p:spPr>
+          <a:xfrm>
+            <a:off x="4613831" y="1577186"/>
+            <a:ext cx="1737456" cy="246221"/>
+          </a:xfrm>
+          <a:prstGeom prst="rect">
+            <a:avLst/>
+          </a:prstGeom>
+          <a:noFill/>
+        </p:spPr>
+        <p:txBody>
+          <a:bodyPr wrap="square" rtlCol="0">
+            <a:spAutoFit/>
+          </a:bodyPr>
+          <a:lstStyle/>
+          <a:p>
+            <a:r>
+              <a:rPr lang="en-SG" sz="1000" b="1" dirty="0">
+                <a:solidFill>
+                  <a:srgbClr val="7030A0"/>
+                </a:solidFill>
+              </a:rPr>
+              <a:t>2 Trojan register request</a:t>
+            </a:r>
+          </a:p>
+        </p:txBody>
+      </p:sp>
+      <p:sp>
+        <p:nvSpPr>
+          <p:cNvPr id="78" name="TextBox 77">
+            <a:extLst>
+              <a:ext uri="{FF2B5EF4-FFF2-40B4-BE49-F238E27FC236}">
+                <a16:creationId xmlns:a16="http://schemas.microsoft.com/office/drawing/2014/main" id="{D577E2D8-C09F-56BB-B14D-28EAD8A5BDE6}"/>
+              </a:ext>
+            </a:extLst>
+          </p:cNvPr>
+          <p:cNvSpPr txBox="1"/>
+          <p:nvPr/>
+        </p:nvSpPr>
+        <p:spPr>
+          <a:xfrm>
+            <a:off x="7806844" y="2029250"/>
+            <a:ext cx="2057476" cy="246221"/>
+          </a:xfrm>
+          <a:prstGeom prst="rect">
+            <a:avLst/>
+          </a:prstGeom>
+          <a:noFill/>
+        </p:spPr>
+        <p:txBody>
+          <a:bodyPr wrap="square" rtlCol="0">
+            <a:spAutoFit/>
+          </a:bodyPr>
+          <a:lstStyle/>
+          <a:p>
+            <a:r>
+              <a:rPr lang="en-SG" sz="1000" b="1" dirty="0">
+                <a:solidFill>
+                  <a:srgbClr val="7030A0"/>
+                </a:solidFill>
+              </a:rPr>
+              <a:t>2.1 Trojan register accept response </a:t>
+            </a:r>
+          </a:p>
+        </p:txBody>
+      </p:sp>
+      <p:cxnSp>
+        <p:nvCxnSpPr>
+          <p:cNvPr id="79" name="Straight Arrow Connector 78">
+            <a:extLst>
+              <a:ext uri="{FF2B5EF4-FFF2-40B4-BE49-F238E27FC236}">
+                <a16:creationId xmlns:a16="http://schemas.microsoft.com/office/drawing/2014/main" id="{43747CFE-FF0F-6B74-A15B-20D9D264329F}"/>
+              </a:ext>
+            </a:extLst>
+          </p:cNvPr>
+          <p:cNvCxnSpPr>
+            <a:cxnSpLocks/>
+          </p:cNvCxnSpPr>
+          <p:nvPr/>
+        </p:nvCxnSpPr>
+        <p:spPr>
+          <a:xfrm>
+            <a:off x="2028841" y="2476069"/>
+            <a:ext cx="7835479" cy="0"/>
+          </a:xfrm>
+          <a:prstGeom prst="straightConnector1">
+            <a:avLst/>
+          </a:prstGeom>
+          <a:ln>
+            <a:solidFill>
+              <a:schemeClr val="accent6">
+                <a:lumMod val="75000"/>
+              </a:schemeClr>
+            </a:solidFill>
+            <a:prstDash val="dash"/>
+            <a:tailEnd type="triangle"/>
+          </a:ln>
+        </p:spPr>
+        <p:style>
+          <a:lnRef idx="1">
+            <a:schemeClr val="accent1"/>
+          </a:lnRef>
+          <a:fillRef idx="0">
+            <a:schemeClr val="accent1"/>
+          </a:fillRef>
+          <a:effectRef idx="0">
+            <a:schemeClr val="accent1"/>
+          </a:effectRef>
+          <a:fontRef idx="minor">
+            <a:schemeClr val="tx1"/>
+          </a:fontRef>
+        </p:style>
+      </p:cxnSp>
+      <p:sp>
+        <p:nvSpPr>
+          <p:cNvPr id="80" name="TextBox 79">
+            <a:extLst>
+              <a:ext uri="{FF2B5EF4-FFF2-40B4-BE49-F238E27FC236}">
+                <a16:creationId xmlns:a16="http://schemas.microsoft.com/office/drawing/2014/main" id="{357CA0C4-0FFE-5823-1881-66C7DE6109CF}"/>
+              </a:ext>
+            </a:extLst>
+          </p:cNvPr>
+          <p:cNvSpPr txBox="1"/>
+          <p:nvPr/>
+        </p:nvSpPr>
+        <p:spPr>
+          <a:xfrm>
+            <a:off x="2022240" y="2246710"/>
+            <a:ext cx="1737456" cy="246221"/>
+          </a:xfrm>
+          <a:prstGeom prst="rect">
+            <a:avLst/>
+          </a:prstGeom>
+          <a:noFill/>
+        </p:spPr>
+        <p:txBody>
+          <a:bodyPr wrap="square" rtlCol="0">
+            <a:spAutoFit/>
+          </a:bodyPr>
+          <a:lstStyle/>
+          <a:p>
+            <a:r>
+              <a:rPr lang="en-SG" sz="1000" b="1" dirty="0">
+                <a:solidFill>
+                  <a:schemeClr val="accent6">
+                    <a:lumMod val="75000"/>
+                  </a:schemeClr>
+                </a:solidFill>
+              </a:rPr>
+              <a:t>1.2 Trojan task fetch request</a:t>
+            </a:r>
+          </a:p>
+        </p:txBody>
+      </p:sp>
+      <p:cxnSp>
+        <p:nvCxnSpPr>
+          <p:cNvPr id="82" name="Straight Arrow Connector 81">
+            <a:extLst>
+              <a:ext uri="{FF2B5EF4-FFF2-40B4-BE49-F238E27FC236}">
+                <a16:creationId xmlns:a16="http://schemas.microsoft.com/office/drawing/2014/main" id="{8A4190A9-0004-A6F0-21CC-DF26EF9F71D9}"/>
+              </a:ext>
+            </a:extLst>
+          </p:cNvPr>
+          <p:cNvCxnSpPr>
+            <a:cxnSpLocks/>
+          </p:cNvCxnSpPr>
+          <p:nvPr/>
+        </p:nvCxnSpPr>
+        <p:spPr>
+          <a:xfrm flipH="1">
+            <a:off x="2028841" y="2648712"/>
+            <a:ext cx="7835479" cy="0"/>
+          </a:xfrm>
+          <a:prstGeom prst="straightConnector1">
+            <a:avLst/>
+          </a:prstGeom>
+          <a:ln>
+            <a:solidFill>
+              <a:schemeClr val="accent6">
+                <a:lumMod val="75000"/>
+              </a:schemeClr>
+            </a:solidFill>
+            <a:prstDash val="dash"/>
+            <a:tailEnd type="triangle"/>
+          </a:ln>
+        </p:spPr>
+        <p:style>
+          <a:lnRef idx="1">
+            <a:schemeClr val="accent1"/>
+          </a:lnRef>
+          <a:fillRef idx="0">
+            <a:schemeClr val="accent1"/>
+          </a:fillRef>
+          <a:effectRef idx="0">
+            <a:schemeClr val="accent1"/>
+          </a:effectRef>
+          <a:fontRef idx="minor">
+            <a:schemeClr val="tx1"/>
+          </a:fontRef>
+        </p:style>
+      </p:cxnSp>
+      <p:sp>
+        <p:nvSpPr>
+          <p:cNvPr id="83" name="TextBox 82">
+            <a:extLst>
+              <a:ext uri="{FF2B5EF4-FFF2-40B4-BE49-F238E27FC236}">
+                <a16:creationId xmlns:a16="http://schemas.microsoft.com/office/drawing/2014/main" id="{2AE0D24D-C692-17FD-2363-207D817381C2}"/>
+              </a:ext>
+            </a:extLst>
+          </p:cNvPr>
+          <p:cNvSpPr txBox="1"/>
+          <p:nvPr/>
+        </p:nvSpPr>
+        <p:spPr>
+          <a:xfrm>
+            <a:off x="8111319" y="2650323"/>
+            <a:ext cx="2072484" cy="246221"/>
+          </a:xfrm>
+          <a:prstGeom prst="rect">
+            <a:avLst/>
+          </a:prstGeom>
+          <a:noFill/>
+        </p:spPr>
+        <p:txBody>
+          <a:bodyPr wrap="square" rtlCol="0">
+            <a:spAutoFit/>
+          </a:bodyPr>
+          <a:lstStyle/>
+          <a:p>
+            <a:r>
+              <a:rPr lang="en-SG" sz="1000" b="1" dirty="0">
+                <a:solidFill>
+                  <a:schemeClr val="accent6">
+                    <a:lumMod val="75000"/>
+                  </a:schemeClr>
+                </a:solidFill>
+              </a:rPr>
+              <a:t>1.3 Trojan no task response</a:t>
+            </a:r>
+          </a:p>
+        </p:txBody>
+      </p:sp>
+      <p:pic>
+        <p:nvPicPr>
+          <p:cNvPr id="84" name="Picture 83">
+            <a:extLst>
+              <a:ext uri="{FF2B5EF4-FFF2-40B4-BE49-F238E27FC236}">
+                <a16:creationId xmlns:a16="http://schemas.microsoft.com/office/drawing/2014/main" id="{A09231C0-EF20-E2B6-7A77-999FD73D8406}"/>
+              </a:ext>
+            </a:extLst>
+          </p:cNvPr>
+          <p:cNvPicPr>
+            <a:picLocks noChangeAspect="1"/>
+          </p:cNvPicPr>
+          <p:nvPr/>
+        </p:nvPicPr>
+        <p:blipFill>
+          <a:blip r:embed="rId3"/>
+          <a:stretch>
+            <a:fillRect/>
+          </a:stretch>
+        </p:blipFill>
+        <p:spPr>
+          <a:xfrm>
+            <a:off x="10262423" y="2648712"/>
+            <a:ext cx="299230" cy="331756"/>
+          </a:xfrm>
+          <a:prstGeom prst="rect">
+            <a:avLst/>
+          </a:prstGeom>
+          <a:ln w="9525">
+            <a:solidFill>
+              <a:schemeClr val="tx1"/>
+            </a:solidFill>
+          </a:ln>
+        </p:spPr>
+      </p:pic>
+      <p:cxnSp>
+        <p:nvCxnSpPr>
+          <p:cNvPr id="85" name="Straight Arrow Connector 84">
+            <a:extLst>
+              <a:ext uri="{FF2B5EF4-FFF2-40B4-BE49-F238E27FC236}">
+                <a16:creationId xmlns:a16="http://schemas.microsoft.com/office/drawing/2014/main" id="{D3AC4A33-B53C-8A11-114C-F9B059271963}"/>
+              </a:ext>
+            </a:extLst>
+          </p:cNvPr>
+          <p:cNvCxnSpPr>
+            <a:cxnSpLocks/>
+          </p:cNvCxnSpPr>
+          <p:nvPr/>
+        </p:nvCxnSpPr>
+        <p:spPr>
+          <a:xfrm flipH="1">
+            <a:off x="9864320" y="2814590"/>
+            <a:ext cx="365864" cy="0"/>
+          </a:xfrm>
+          <a:prstGeom prst="straightConnector1">
+            <a:avLst/>
+          </a:prstGeom>
+          <a:ln>
+            <a:tailEnd type="triangle"/>
+          </a:ln>
+        </p:spPr>
+        <p:style>
+          <a:lnRef idx="1">
+            <a:schemeClr val="dk1"/>
+          </a:lnRef>
+          <a:fillRef idx="0">
+            <a:schemeClr val="dk1"/>
+          </a:fillRef>
+          <a:effectRef idx="0">
+            <a:schemeClr val="dk1"/>
+          </a:effectRef>
+          <a:fontRef idx="minor">
+            <a:schemeClr val="tx1"/>
+          </a:fontRef>
+        </p:style>
+      </p:cxnSp>
+      <p:sp>
+        <p:nvSpPr>
+          <p:cNvPr id="86" name="TextBox 85">
+            <a:extLst>
+              <a:ext uri="{FF2B5EF4-FFF2-40B4-BE49-F238E27FC236}">
+                <a16:creationId xmlns:a16="http://schemas.microsoft.com/office/drawing/2014/main" id="{CDE04BEF-FB17-57EE-D5C4-7795D9B6A7E0}"/>
+              </a:ext>
+            </a:extLst>
+          </p:cNvPr>
+          <p:cNvSpPr txBox="1"/>
+          <p:nvPr/>
+        </p:nvSpPr>
+        <p:spPr>
+          <a:xfrm>
+            <a:off x="10542530" y="2548006"/>
+            <a:ext cx="1546570" cy="430887"/>
+          </a:xfrm>
+          <a:prstGeom prst="rect">
+            <a:avLst/>
+          </a:prstGeom>
+          <a:noFill/>
+        </p:spPr>
+        <p:txBody>
+          <a:bodyPr wrap="square" rtlCol="0">
+            <a:spAutoFit/>
+          </a:bodyPr>
+          <a:lstStyle/>
+          <a:p>
+            <a:r>
+              <a:rPr lang="en-SG" sz="1100" b="1" dirty="0"/>
+              <a:t>1.4 Hacker assign run </a:t>
+            </a:r>
+            <a:r>
+              <a:rPr lang="en-SG" sz="1100" b="1" dirty="0" err="1"/>
+              <a:t>cmd</a:t>
+            </a:r>
+            <a:r>
+              <a:rPr lang="en-SG" sz="1100" b="1" dirty="0"/>
+              <a:t> task to trojan id=0</a:t>
+            </a:r>
+          </a:p>
+        </p:txBody>
+      </p:sp>
+      <p:cxnSp>
+        <p:nvCxnSpPr>
+          <p:cNvPr id="89" name="Straight Arrow Connector 88">
+            <a:extLst>
+              <a:ext uri="{FF2B5EF4-FFF2-40B4-BE49-F238E27FC236}">
+                <a16:creationId xmlns:a16="http://schemas.microsoft.com/office/drawing/2014/main" id="{ED0CF45C-159C-D645-7FFF-7F5F199BDEA2}"/>
+              </a:ext>
+            </a:extLst>
+          </p:cNvPr>
+          <p:cNvCxnSpPr>
+            <a:cxnSpLocks/>
+          </p:cNvCxnSpPr>
+          <p:nvPr/>
+        </p:nvCxnSpPr>
+        <p:spPr>
+          <a:xfrm>
+            <a:off x="2010674" y="3051746"/>
+            <a:ext cx="7835479" cy="0"/>
+          </a:xfrm>
+          <a:prstGeom prst="straightConnector1">
+            <a:avLst/>
+          </a:prstGeom>
+          <a:ln>
+            <a:solidFill>
+              <a:schemeClr val="accent6">
+                <a:lumMod val="75000"/>
+              </a:schemeClr>
+            </a:solidFill>
+            <a:prstDash val="dash"/>
+            <a:tailEnd type="triangle"/>
+          </a:ln>
+        </p:spPr>
+        <p:style>
+          <a:lnRef idx="1">
+            <a:schemeClr val="accent1"/>
+          </a:lnRef>
+          <a:fillRef idx="0">
+            <a:schemeClr val="accent1"/>
+          </a:fillRef>
+          <a:effectRef idx="0">
+            <a:schemeClr val="accent1"/>
+          </a:effectRef>
+          <a:fontRef idx="minor">
+            <a:schemeClr val="tx1"/>
+          </a:fontRef>
+        </p:style>
+      </p:cxnSp>
+      <p:sp>
+        <p:nvSpPr>
+          <p:cNvPr id="90" name="TextBox 89">
+            <a:extLst>
+              <a:ext uri="{FF2B5EF4-FFF2-40B4-BE49-F238E27FC236}">
+                <a16:creationId xmlns:a16="http://schemas.microsoft.com/office/drawing/2014/main" id="{BE48AAD5-26C8-8034-C293-2654DAD62813}"/>
+              </a:ext>
+            </a:extLst>
+          </p:cNvPr>
+          <p:cNvSpPr txBox="1"/>
+          <p:nvPr/>
+        </p:nvSpPr>
+        <p:spPr>
+          <a:xfrm>
+            <a:off x="2037803" y="2831197"/>
+            <a:ext cx="1737456" cy="246221"/>
+          </a:xfrm>
+          <a:prstGeom prst="rect">
+            <a:avLst/>
+          </a:prstGeom>
+          <a:noFill/>
+        </p:spPr>
+        <p:txBody>
+          <a:bodyPr wrap="square" rtlCol="0">
+            <a:spAutoFit/>
+          </a:bodyPr>
+          <a:lstStyle/>
+          <a:p>
+            <a:r>
+              <a:rPr lang="en-SG" sz="1000" b="1" dirty="0">
+                <a:solidFill>
+                  <a:schemeClr val="accent6">
+                    <a:lumMod val="75000"/>
+                  </a:schemeClr>
+                </a:solidFill>
+              </a:rPr>
+              <a:t>1.5 Trojan task fetch request</a:t>
+            </a:r>
+          </a:p>
+        </p:txBody>
+      </p:sp>
+      <p:cxnSp>
+        <p:nvCxnSpPr>
+          <p:cNvPr id="91" name="Straight Arrow Connector 90">
+            <a:extLst>
+              <a:ext uri="{FF2B5EF4-FFF2-40B4-BE49-F238E27FC236}">
+                <a16:creationId xmlns:a16="http://schemas.microsoft.com/office/drawing/2014/main" id="{0C5C2048-F41B-2481-AAD4-91B1BFAE7E2A}"/>
+              </a:ext>
+            </a:extLst>
+          </p:cNvPr>
+          <p:cNvCxnSpPr>
+            <a:cxnSpLocks/>
+          </p:cNvCxnSpPr>
+          <p:nvPr/>
+        </p:nvCxnSpPr>
+        <p:spPr>
+          <a:xfrm flipH="1">
+            <a:off x="2010673" y="3280351"/>
+            <a:ext cx="7835479" cy="0"/>
+          </a:xfrm>
+          <a:prstGeom prst="straightConnector1">
+            <a:avLst/>
+          </a:prstGeom>
+          <a:ln>
+            <a:solidFill>
+              <a:schemeClr val="accent6">
+                <a:lumMod val="75000"/>
+              </a:schemeClr>
+            </a:solidFill>
+            <a:prstDash val="dash"/>
+            <a:tailEnd type="triangle"/>
+          </a:ln>
+        </p:spPr>
+        <p:style>
+          <a:lnRef idx="1">
+            <a:schemeClr val="accent1"/>
+          </a:lnRef>
+          <a:fillRef idx="0">
+            <a:schemeClr val="accent1"/>
+          </a:fillRef>
+          <a:effectRef idx="0">
+            <a:schemeClr val="accent1"/>
+          </a:effectRef>
+          <a:fontRef idx="minor">
+            <a:schemeClr val="tx1"/>
+          </a:fontRef>
+        </p:style>
+      </p:cxnSp>
+      <p:sp>
+        <p:nvSpPr>
+          <p:cNvPr id="92" name="TextBox 91">
+            <a:extLst>
+              <a:ext uri="{FF2B5EF4-FFF2-40B4-BE49-F238E27FC236}">
+                <a16:creationId xmlns:a16="http://schemas.microsoft.com/office/drawing/2014/main" id="{9F0D6E44-A21E-D26C-905E-4567E7EED136}"/>
+              </a:ext>
+            </a:extLst>
+          </p:cNvPr>
+          <p:cNvSpPr txBox="1"/>
+          <p:nvPr/>
+        </p:nvSpPr>
+        <p:spPr>
+          <a:xfrm>
+            <a:off x="8225680" y="3297741"/>
+            <a:ext cx="2072484" cy="246221"/>
+          </a:xfrm>
+          <a:prstGeom prst="rect">
+            <a:avLst/>
+          </a:prstGeom>
+          <a:noFill/>
+        </p:spPr>
+        <p:txBody>
+          <a:bodyPr wrap="square" rtlCol="0">
+            <a:spAutoFit/>
+          </a:bodyPr>
+          <a:lstStyle/>
+          <a:p>
+            <a:r>
+              <a:rPr lang="en-SG" sz="1000" b="1" dirty="0">
+                <a:solidFill>
+                  <a:schemeClr val="accent6">
+                    <a:lumMod val="75000"/>
+                  </a:schemeClr>
+                </a:solidFill>
+              </a:rPr>
+              <a:t>1.6 Trojan run </a:t>
+            </a:r>
+            <a:r>
+              <a:rPr lang="en-SG" sz="1000" b="1" dirty="0" err="1">
+                <a:solidFill>
+                  <a:schemeClr val="accent6">
+                    <a:lumMod val="75000"/>
+                  </a:schemeClr>
+                </a:solidFill>
+              </a:rPr>
+              <a:t>cmd</a:t>
+            </a:r>
+            <a:r>
+              <a:rPr lang="en-SG" sz="1000" b="1" dirty="0">
+                <a:solidFill>
+                  <a:schemeClr val="accent6">
+                    <a:lumMod val="75000"/>
+                  </a:schemeClr>
+                </a:solidFill>
+              </a:rPr>
+              <a:t> request</a:t>
+            </a:r>
+          </a:p>
+        </p:txBody>
+      </p:sp>
+      <p:sp>
+        <p:nvSpPr>
+          <p:cNvPr id="94" name="TextBox 93">
+            <a:extLst>
+              <a:ext uri="{FF2B5EF4-FFF2-40B4-BE49-F238E27FC236}">
+                <a16:creationId xmlns:a16="http://schemas.microsoft.com/office/drawing/2014/main" id="{BB6F94BC-0A3E-8A29-C37F-BFF9C24C21AA}"/>
+              </a:ext>
+            </a:extLst>
+          </p:cNvPr>
+          <p:cNvSpPr txBox="1"/>
+          <p:nvPr/>
+        </p:nvSpPr>
+        <p:spPr>
+          <a:xfrm>
+            <a:off x="1440024" y="3436133"/>
+            <a:ext cx="1494202" cy="246222"/>
+          </a:xfrm>
+          <a:prstGeom prst="rect">
+            <a:avLst/>
+          </a:prstGeom>
+          <a:solidFill>
+            <a:schemeClr val="bg1"/>
+          </a:solidFill>
+          <a:ln w="9525">
+            <a:solidFill>
+              <a:schemeClr val="tx1"/>
+            </a:solidFill>
+          </a:ln>
+        </p:spPr>
+        <p:txBody>
+          <a:bodyPr wrap="square" lIns="36000" tIns="36000" rIns="36000" bIns="36000" rtlCol="0">
+            <a:noAutofit/>
+          </a:bodyPr>
+          <a:lstStyle/>
+          <a:p>
+            <a:r>
+              <a:rPr lang="en-SG" sz="1100" dirty="0"/>
+              <a:t>Command execution API</a:t>
+            </a:r>
+          </a:p>
+        </p:txBody>
+      </p:sp>
+      <p:cxnSp>
+        <p:nvCxnSpPr>
+          <p:cNvPr id="95" name="Straight Arrow Connector 94">
+            <a:extLst>
+              <a:ext uri="{FF2B5EF4-FFF2-40B4-BE49-F238E27FC236}">
+                <a16:creationId xmlns:a16="http://schemas.microsoft.com/office/drawing/2014/main" id="{8812AEA3-9AE7-3DB8-2578-4D09B56B5F5B}"/>
+              </a:ext>
+            </a:extLst>
+          </p:cNvPr>
+          <p:cNvCxnSpPr>
+            <a:cxnSpLocks/>
+          </p:cNvCxnSpPr>
+          <p:nvPr/>
+        </p:nvCxnSpPr>
+        <p:spPr>
+          <a:xfrm>
+            <a:off x="2010672" y="3899090"/>
+            <a:ext cx="7835479" cy="0"/>
+          </a:xfrm>
+          <a:prstGeom prst="straightConnector1">
+            <a:avLst/>
+          </a:prstGeom>
+          <a:ln>
+            <a:solidFill>
+              <a:schemeClr val="accent6">
+                <a:lumMod val="75000"/>
+              </a:schemeClr>
+            </a:solidFill>
+            <a:prstDash val="dash"/>
+            <a:tailEnd type="triangle"/>
+          </a:ln>
+        </p:spPr>
+        <p:style>
+          <a:lnRef idx="1">
+            <a:schemeClr val="accent1"/>
+          </a:lnRef>
+          <a:fillRef idx="0">
+            <a:schemeClr val="accent1"/>
+          </a:fillRef>
+          <a:effectRef idx="0">
+            <a:schemeClr val="accent1"/>
+          </a:effectRef>
+          <a:fontRef idx="minor">
+            <a:schemeClr val="tx1"/>
+          </a:fontRef>
+        </p:style>
+      </p:cxnSp>
+      <p:sp>
+        <p:nvSpPr>
+          <p:cNvPr id="96" name="TextBox 95">
+            <a:extLst>
+              <a:ext uri="{FF2B5EF4-FFF2-40B4-BE49-F238E27FC236}">
+                <a16:creationId xmlns:a16="http://schemas.microsoft.com/office/drawing/2014/main" id="{C27E4F9B-CCF8-CDC0-3DD5-4B006A390C6B}"/>
+              </a:ext>
+            </a:extLst>
+          </p:cNvPr>
+          <p:cNvSpPr txBox="1"/>
+          <p:nvPr/>
+        </p:nvSpPr>
+        <p:spPr>
+          <a:xfrm>
+            <a:off x="2028841" y="3892629"/>
+            <a:ext cx="1737456" cy="246221"/>
+          </a:xfrm>
+          <a:prstGeom prst="rect">
+            <a:avLst/>
+          </a:prstGeom>
+          <a:noFill/>
+        </p:spPr>
+        <p:txBody>
+          <a:bodyPr wrap="square" rtlCol="0">
+            <a:spAutoFit/>
+          </a:bodyPr>
+          <a:lstStyle/>
+          <a:p>
+            <a:r>
+              <a:rPr lang="en-SG" sz="1000" b="1" dirty="0">
+                <a:solidFill>
+                  <a:schemeClr val="accent6">
+                    <a:lumMod val="75000"/>
+                  </a:schemeClr>
+                </a:solidFill>
+              </a:rPr>
+              <a:t>1.7 </a:t>
+            </a:r>
+            <a:r>
+              <a:rPr lang="en-SG" sz="1000" b="1" dirty="0" err="1">
+                <a:solidFill>
+                  <a:schemeClr val="accent6">
+                    <a:lumMod val="75000"/>
+                  </a:schemeClr>
+                </a:solidFill>
+              </a:rPr>
+              <a:t>cmd</a:t>
+            </a:r>
+            <a:r>
+              <a:rPr lang="en-SG" sz="1000" b="1" dirty="0">
+                <a:solidFill>
+                  <a:schemeClr val="accent6">
+                    <a:lumMod val="75000"/>
+                  </a:schemeClr>
+                </a:solidFill>
+              </a:rPr>
+              <a:t> execution result </a:t>
+            </a:r>
+          </a:p>
+        </p:txBody>
+      </p:sp>
+      <p:pic>
+        <p:nvPicPr>
+          <p:cNvPr id="97" name="Picture 96">
+            <a:extLst>
+              <a:ext uri="{FF2B5EF4-FFF2-40B4-BE49-F238E27FC236}">
+                <a16:creationId xmlns:a16="http://schemas.microsoft.com/office/drawing/2014/main" id="{4F3E364C-E9C3-AFC9-0D88-AD4C3C920E55}"/>
+              </a:ext>
+            </a:extLst>
+          </p:cNvPr>
+          <p:cNvPicPr>
+            <a:picLocks noChangeAspect="1"/>
+          </p:cNvPicPr>
+          <p:nvPr/>
+        </p:nvPicPr>
+        <p:blipFill>
+          <a:blip r:embed="rId3"/>
+          <a:stretch>
+            <a:fillRect/>
+          </a:stretch>
+        </p:blipFill>
+        <p:spPr>
+          <a:xfrm>
+            <a:off x="10262423" y="3496737"/>
+            <a:ext cx="299230" cy="331756"/>
+          </a:xfrm>
+          <a:prstGeom prst="rect">
+            <a:avLst/>
+          </a:prstGeom>
+          <a:ln w="9525">
+            <a:solidFill>
+              <a:schemeClr val="tx1"/>
+            </a:solidFill>
+          </a:ln>
+        </p:spPr>
+      </p:pic>
+      <p:cxnSp>
+        <p:nvCxnSpPr>
+          <p:cNvPr id="98" name="Straight Arrow Connector 97">
+            <a:extLst>
+              <a:ext uri="{FF2B5EF4-FFF2-40B4-BE49-F238E27FC236}">
+                <a16:creationId xmlns:a16="http://schemas.microsoft.com/office/drawing/2014/main" id="{526A0CC8-B937-6333-2261-2D49DFE48378}"/>
+              </a:ext>
+            </a:extLst>
+          </p:cNvPr>
+          <p:cNvCxnSpPr>
+            <a:cxnSpLocks/>
+          </p:cNvCxnSpPr>
+          <p:nvPr/>
+        </p:nvCxnSpPr>
+        <p:spPr>
+          <a:xfrm flipH="1">
+            <a:off x="9864320" y="3662615"/>
+            <a:ext cx="365864" cy="0"/>
+          </a:xfrm>
+          <a:prstGeom prst="straightConnector1">
+            <a:avLst/>
+          </a:prstGeom>
+          <a:ln>
+            <a:tailEnd type="triangle"/>
+          </a:ln>
+        </p:spPr>
+        <p:style>
+          <a:lnRef idx="1">
+            <a:schemeClr val="dk1"/>
+          </a:lnRef>
+          <a:fillRef idx="0">
+            <a:schemeClr val="dk1"/>
+          </a:fillRef>
+          <a:effectRef idx="0">
+            <a:schemeClr val="dk1"/>
+          </a:effectRef>
+          <a:fontRef idx="minor">
+            <a:schemeClr val="tx1"/>
+          </a:fontRef>
+        </p:style>
+      </p:cxnSp>
+      <p:sp>
+        <p:nvSpPr>
+          <p:cNvPr id="99" name="TextBox 98">
+            <a:extLst>
+              <a:ext uri="{FF2B5EF4-FFF2-40B4-BE49-F238E27FC236}">
+                <a16:creationId xmlns:a16="http://schemas.microsoft.com/office/drawing/2014/main" id="{E88A82D8-CDBA-B41A-0A94-B0B861A55FEC}"/>
+              </a:ext>
+            </a:extLst>
+          </p:cNvPr>
+          <p:cNvSpPr txBox="1"/>
+          <p:nvPr/>
+        </p:nvSpPr>
+        <p:spPr>
+          <a:xfrm>
+            <a:off x="10542530" y="3396031"/>
+            <a:ext cx="1546570" cy="430887"/>
+          </a:xfrm>
+          <a:prstGeom prst="rect">
+            <a:avLst/>
+          </a:prstGeom>
+          <a:noFill/>
+        </p:spPr>
+        <p:txBody>
+          <a:bodyPr wrap="square" rtlCol="0">
+            <a:spAutoFit/>
+          </a:bodyPr>
+          <a:lstStyle/>
+          <a:p>
+            <a:r>
+              <a:rPr lang="en-SG" sz="1100" b="1" dirty="0"/>
+              <a:t>2.2 Hacker assign steal file from trojan id=1</a:t>
+            </a:r>
+          </a:p>
+        </p:txBody>
+      </p:sp>
+      <p:cxnSp>
+        <p:nvCxnSpPr>
+          <p:cNvPr id="100" name="Straight Arrow Connector 99">
+            <a:extLst>
+              <a:ext uri="{FF2B5EF4-FFF2-40B4-BE49-F238E27FC236}">
+                <a16:creationId xmlns:a16="http://schemas.microsoft.com/office/drawing/2014/main" id="{D5843331-F488-92C4-D689-5D46F07F1B31}"/>
+              </a:ext>
+            </a:extLst>
+          </p:cNvPr>
+          <p:cNvCxnSpPr>
+            <a:cxnSpLocks/>
+          </p:cNvCxnSpPr>
+          <p:nvPr/>
+        </p:nvCxnSpPr>
+        <p:spPr>
+          <a:xfrm>
+            <a:off x="4549659" y="4227011"/>
+            <a:ext cx="5296495" cy="0"/>
+          </a:xfrm>
+          <a:prstGeom prst="straightConnector1">
+            <a:avLst/>
+          </a:prstGeom>
+          <a:ln>
+            <a:solidFill>
+              <a:srgbClr val="7030A0"/>
+            </a:solidFill>
+            <a:prstDash val="dash"/>
+            <a:tailEnd type="triangle"/>
+          </a:ln>
+        </p:spPr>
+        <p:style>
+          <a:lnRef idx="1">
+            <a:schemeClr val="accent1"/>
+          </a:lnRef>
+          <a:fillRef idx="0">
+            <a:schemeClr val="accent1"/>
+          </a:fillRef>
+          <a:effectRef idx="0">
+            <a:schemeClr val="accent1"/>
+          </a:effectRef>
+          <a:fontRef idx="minor">
+            <a:schemeClr val="tx1"/>
+          </a:fontRef>
+        </p:style>
+      </p:cxnSp>
+      <p:sp>
+        <p:nvSpPr>
+          <p:cNvPr id="101" name="TextBox 100">
+            <a:extLst>
+              <a:ext uri="{FF2B5EF4-FFF2-40B4-BE49-F238E27FC236}">
+                <a16:creationId xmlns:a16="http://schemas.microsoft.com/office/drawing/2014/main" id="{37527347-D026-AED2-EFDC-F56000CBE11E}"/>
+              </a:ext>
+            </a:extLst>
+          </p:cNvPr>
+          <p:cNvSpPr txBox="1"/>
+          <p:nvPr/>
+        </p:nvSpPr>
+        <p:spPr>
+          <a:xfrm>
+            <a:off x="4519564" y="3963401"/>
+            <a:ext cx="1737456" cy="246221"/>
+          </a:xfrm>
+          <a:prstGeom prst="rect">
+            <a:avLst/>
+          </a:prstGeom>
+          <a:noFill/>
+        </p:spPr>
+        <p:txBody>
+          <a:bodyPr wrap="square" rtlCol="0">
+            <a:spAutoFit/>
+          </a:bodyPr>
+          <a:lstStyle/>
+          <a:p>
+            <a:r>
+              <a:rPr lang="en-SG" sz="1000" b="1" dirty="0">
+                <a:solidFill>
+                  <a:srgbClr val="7030A0"/>
+                </a:solidFill>
+              </a:rPr>
+              <a:t>2.2 Trojan task fetch request</a:t>
+            </a:r>
+          </a:p>
+        </p:txBody>
+      </p:sp>
+      <p:cxnSp>
+        <p:nvCxnSpPr>
+          <p:cNvPr id="102" name="Straight Arrow Connector 101">
+            <a:extLst>
+              <a:ext uri="{FF2B5EF4-FFF2-40B4-BE49-F238E27FC236}">
+                <a16:creationId xmlns:a16="http://schemas.microsoft.com/office/drawing/2014/main" id="{5E1F0D39-FC71-6F10-C98F-A68040FD8146}"/>
+              </a:ext>
+            </a:extLst>
+          </p:cNvPr>
+          <p:cNvCxnSpPr>
+            <a:cxnSpLocks/>
+          </p:cNvCxnSpPr>
+          <p:nvPr/>
+        </p:nvCxnSpPr>
+        <p:spPr>
+          <a:xfrm flipH="1">
+            <a:off x="4549659" y="4434232"/>
+            <a:ext cx="5278330" cy="27410"/>
+          </a:xfrm>
+          <a:prstGeom prst="straightConnector1">
+            <a:avLst/>
+          </a:prstGeom>
+          <a:ln>
+            <a:solidFill>
+              <a:srgbClr val="7030A0"/>
+            </a:solidFill>
+            <a:prstDash val="dash"/>
+            <a:tailEnd type="triangle"/>
+          </a:ln>
+        </p:spPr>
+        <p:style>
+          <a:lnRef idx="1">
+            <a:schemeClr val="accent1"/>
+          </a:lnRef>
+          <a:fillRef idx="0">
+            <a:schemeClr val="accent1"/>
+          </a:fillRef>
+          <a:effectRef idx="0">
+            <a:schemeClr val="accent1"/>
+          </a:effectRef>
+          <a:fontRef idx="minor">
+            <a:schemeClr val="tx1"/>
+          </a:fontRef>
+        </p:style>
+      </p:cxnSp>
+      <p:sp>
+        <p:nvSpPr>
+          <p:cNvPr id="106" name="TextBox 105">
+            <a:extLst>
+              <a:ext uri="{FF2B5EF4-FFF2-40B4-BE49-F238E27FC236}">
+                <a16:creationId xmlns:a16="http://schemas.microsoft.com/office/drawing/2014/main" id="{180EDF23-D308-5B84-8181-06426959A10B}"/>
+              </a:ext>
+            </a:extLst>
+          </p:cNvPr>
+          <p:cNvSpPr txBox="1"/>
+          <p:nvPr/>
+        </p:nvSpPr>
+        <p:spPr>
+          <a:xfrm>
+            <a:off x="7725284" y="4397776"/>
+            <a:ext cx="2220595" cy="246221"/>
+          </a:xfrm>
+          <a:prstGeom prst="rect">
+            <a:avLst/>
+          </a:prstGeom>
+          <a:noFill/>
+        </p:spPr>
+        <p:txBody>
+          <a:bodyPr wrap="square" rtlCol="0">
+            <a:spAutoFit/>
+          </a:bodyPr>
+          <a:lstStyle/>
+          <a:p>
+            <a:r>
+              <a:rPr lang="en-SG" sz="1000" b="1" dirty="0">
+                <a:solidFill>
+                  <a:srgbClr val="7030A0"/>
+                </a:solidFill>
+              </a:rPr>
+              <a:t>2.2 Trojan transfer file to hub request </a:t>
+            </a:r>
+          </a:p>
+        </p:txBody>
+      </p:sp>
+      <p:sp>
+        <p:nvSpPr>
+          <p:cNvPr id="107" name="TextBox 106">
+            <a:extLst>
+              <a:ext uri="{FF2B5EF4-FFF2-40B4-BE49-F238E27FC236}">
+                <a16:creationId xmlns:a16="http://schemas.microsoft.com/office/drawing/2014/main" id="{ED2CE1CB-BEBC-C12E-FF66-DF5B2BC18A87}"/>
+              </a:ext>
+            </a:extLst>
+          </p:cNvPr>
+          <p:cNvSpPr txBox="1"/>
+          <p:nvPr/>
+        </p:nvSpPr>
+        <p:spPr>
+          <a:xfrm>
+            <a:off x="4045823" y="4564345"/>
+            <a:ext cx="1129041" cy="246222"/>
+          </a:xfrm>
+          <a:prstGeom prst="rect">
+            <a:avLst/>
+          </a:prstGeom>
+          <a:solidFill>
+            <a:schemeClr val="bg1"/>
+          </a:solidFill>
+          <a:ln w="9525">
+            <a:solidFill>
+              <a:schemeClr val="tx1"/>
+            </a:solidFill>
+          </a:ln>
+        </p:spPr>
+        <p:txBody>
+          <a:bodyPr wrap="square" lIns="36000" tIns="36000" rIns="36000" bIns="36000" rtlCol="0">
+            <a:noAutofit/>
+          </a:bodyPr>
+          <a:lstStyle/>
+          <a:p>
+            <a:r>
+              <a:rPr lang="en-SG" sz="1100" dirty="0"/>
+              <a:t>File reading API</a:t>
+            </a:r>
+          </a:p>
+        </p:txBody>
+      </p:sp>
+      <p:cxnSp>
+        <p:nvCxnSpPr>
+          <p:cNvPr id="108" name="Straight Arrow Connector 107">
+            <a:extLst>
+              <a:ext uri="{FF2B5EF4-FFF2-40B4-BE49-F238E27FC236}">
+                <a16:creationId xmlns:a16="http://schemas.microsoft.com/office/drawing/2014/main" id="{80F65B64-2E37-5CA6-AC74-D331299AFE63}"/>
+              </a:ext>
+            </a:extLst>
+          </p:cNvPr>
+          <p:cNvCxnSpPr>
+            <a:cxnSpLocks/>
+          </p:cNvCxnSpPr>
+          <p:nvPr/>
+        </p:nvCxnSpPr>
+        <p:spPr>
+          <a:xfrm flipV="1">
+            <a:off x="4549659" y="4870225"/>
+            <a:ext cx="5278330" cy="13860"/>
+          </a:xfrm>
+          <a:prstGeom prst="straightConnector1">
+            <a:avLst/>
+          </a:prstGeom>
+          <a:ln>
+            <a:solidFill>
+              <a:srgbClr val="7030A0"/>
+            </a:solidFill>
+            <a:prstDash val="dash"/>
+            <a:tailEnd type="triangle"/>
+          </a:ln>
+        </p:spPr>
+        <p:style>
+          <a:lnRef idx="1">
+            <a:schemeClr val="accent1"/>
+          </a:lnRef>
+          <a:fillRef idx="0">
+            <a:schemeClr val="accent1"/>
+          </a:fillRef>
+          <a:effectRef idx="0">
+            <a:schemeClr val="accent1"/>
+          </a:effectRef>
+          <a:fontRef idx="minor">
+            <a:schemeClr val="tx1"/>
+          </a:fontRef>
+        </p:style>
+      </p:cxnSp>
+      <p:sp>
+        <p:nvSpPr>
+          <p:cNvPr id="112" name="TextBox 111">
+            <a:extLst>
+              <a:ext uri="{FF2B5EF4-FFF2-40B4-BE49-F238E27FC236}">
+                <a16:creationId xmlns:a16="http://schemas.microsoft.com/office/drawing/2014/main" id="{16D23ADF-1EBA-4466-587B-4F9A15BD398C}"/>
+              </a:ext>
+            </a:extLst>
+          </p:cNvPr>
+          <p:cNvSpPr txBox="1"/>
+          <p:nvPr/>
+        </p:nvSpPr>
+        <p:spPr>
+          <a:xfrm>
+            <a:off x="4499514" y="4927959"/>
+            <a:ext cx="1554783" cy="246221"/>
+          </a:xfrm>
+          <a:prstGeom prst="rect">
+            <a:avLst/>
+          </a:prstGeom>
+          <a:noFill/>
+        </p:spPr>
+        <p:txBody>
+          <a:bodyPr wrap="square" rtlCol="0">
+            <a:spAutoFit/>
+          </a:bodyPr>
+          <a:lstStyle/>
+          <a:p>
+            <a:r>
+              <a:rPr lang="en-SG" sz="1000" b="1" dirty="0">
+                <a:solidFill>
+                  <a:srgbClr val="7030A0"/>
+                </a:solidFill>
+              </a:rPr>
+              <a:t>3.2 File data stream</a:t>
+            </a:r>
+          </a:p>
+        </p:txBody>
+      </p:sp>
+      <p:sp>
+        <p:nvSpPr>
+          <p:cNvPr id="113" name="TextBox 112">
+            <a:extLst>
+              <a:ext uri="{FF2B5EF4-FFF2-40B4-BE49-F238E27FC236}">
+                <a16:creationId xmlns:a16="http://schemas.microsoft.com/office/drawing/2014/main" id="{33FC532E-FF10-6AC1-DDA2-F6B36D225AC8}"/>
+              </a:ext>
+            </a:extLst>
+          </p:cNvPr>
+          <p:cNvSpPr txBox="1"/>
+          <p:nvPr/>
+        </p:nvSpPr>
+        <p:spPr>
+          <a:xfrm>
+            <a:off x="9344801" y="5055598"/>
+            <a:ext cx="1197729" cy="246222"/>
+          </a:xfrm>
+          <a:prstGeom prst="rect">
+            <a:avLst/>
+          </a:prstGeom>
+          <a:solidFill>
+            <a:schemeClr val="bg1"/>
+          </a:solidFill>
+          <a:ln w="9525">
+            <a:solidFill>
+              <a:schemeClr val="tx1"/>
+            </a:solidFill>
+          </a:ln>
+        </p:spPr>
+        <p:txBody>
+          <a:bodyPr wrap="square" lIns="36000" tIns="36000" rIns="36000" bIns="36000" rtlCol="0">
+            <a:noAutofit/>
+          </a:bodyPr>
+          <a:lstStyle/>
+          <a:p>
+            <a:r>
+              <a:rPr lang="en-SG" sz="1100" dirty="0"/>
+              <a:t>File creation API</a:t>
+            </a:r>
+          </a:p>
+        </p:txBody>
+      </p:sp>
+      <p:cxnSp>
+        <p:nvCxnSpPr>
+          <p:cNvPr id="114" name="Straight Arrow Connector 113">
+            <a:extLst>
+              <a:ext uri="{FF2B5EF4-FFF2-40B4-BE49-F238E27FC236}">
+                <a16:creationId xmlns:a16="http://schemas.microsoft.com/office/drawing/2014/main" id="{6897DD47-C595-B5EB-FA6C-8DCD2C608F64}"/>
+              </a:ext>
+            </a:extLst>
+          </p:cNvPr>
+          <p:cNvCxnSpPr>
+            <a:cxnSpLocks/>
+          </p:cNvCxnSpPr>
+          <p:nvPr/>
+        </p:nvCxnSpPr>
+        <p:spPr>
+          <a:xfrm>
+            <a:off x="7189269" y="1634439"/>
+            <a:ext cx="2596553" cy="19120"/>
+          </a:xfrm>
+          <a:prstGeom prst="straightConnector1">
+            <a:avLst/>
+          </a:prstGeom>
+          <a:ln>
+            <a:solidFill>
+              <a:srgbClr val="FF0000"/>
+            </a:solidFill>
+            <a:prstDash val="dash"/>
+            <a:tailEnd type="triangle"/>
+          </a:ln>
+        </p:spPr>
+        <p:style>
+          <a:lnRef idx="1">
+            <a:schemeClr val="accent1"/>
+          </a:lnRef>
+          <a:fillRef idx="0">
+            <a:schemeClr val="accent1"/>
+          </a:fillRef>
+          <a:effectRef idx="0">
+            <a:schemeClr val="accent1"/>
+          </a:effectRef>
+          <a:fontRef idx="minor">
+            <a:schemeClr val="tx1"/>
+          </a:fontRef>
+        </p:style>
+      </p:cxnSp>
+      <p:sp>
+        <p:nvSpPr>
+          <p:cNvPr id="118" name="TextBox 117">
+            <a:extLst>
+              <a:ext uri="{FF2B5EF4-FFF2-40B4-BE49-F238E27FC236}">
+                <a16:creationId xmlns:a16="http://schemas.microsoft.com/office/drawing/2014/main" id="{1A7BAA41-C43F-A0DC-4984-EEEDFAEA455B}"/>
+              </a:ext>
+            </a:extLst>
+          </p:cNvPr>
+          <p:cNvSpPr txBox="1"/>
+          <p:nvPr/>
+        </p:nvSpPr>
+        <p:spPr>
+          <a:xfrm>
+            <a:off x="7150195" y="1606958"/>
+            <a:ext cx="1737456" cy="246221"/>
+          </a:xfrm>
+          <a:prstGeom prst="rect">
+            <a:avLst/>
+          </a:prstGeom>
+          <a:noFill/>
+        </p:spPr>
+        <p:txBody>
+          <a:bodyPr wrap="square" rtlCol="0">
+            <a:spAutoFit/>
+          </a:bodyPr>
+          <a:lstStyle/>
+          <a:p>
+            <a:r>
+              <a:rPr lang="en-SG" sz="1000" b="1" dirty="0">
+                <a:solidFill>
+                  <a:srgbClr val="FF0000"/>
+                </a:solidFill>
+              </a:rPr>
+              <a:t>3.1 Trojan register request</a:t>
+            </a:r>
+          </a:p>
+        </p:txBody>
+      </p:sp>
+      <p:cxnSp>
+        <p:nvCxnSpPr>
+          <p:cNvPr id="119" name="Straight Arrow Connector 118">
+            <a:extLst>
+              <a:ext uri="{FF2B5EF4-FFF2-40B4-BE49-F238E27FC236}">
+                <a16:creationId xmlns:a16="http://schemas.microsoft.com/office/drawing/2014/main" id="{CB4A5419-7054-D05B-6B4A-1B8F0911DD4A}"/>
+              </a:ext>
+            </a:extLst>
+          </p:cNvPr>
+          <p:cNvCxnSpPr>
+            <a:cxnSpLocks/>
+          </p:cNvCxnSpPr>
+          <p:nvPr/>
+        </p:nvCxnSpPr>
+        <p:spPr>
+          <a:xfrm flipH="1">
+            <a:off x="7188824" y="2281901"/>
+            <a:ext cx="2633008" cy="0"/>
+          </a:xfrm>
+          <a:prstGeom prst="straightConnector1">
+            <a:avLst/>
+          </a:prstGeom>
+          <a:ln>
+            <a:solidFill>
+              <a:srgbClr val="FF0000"/>
+            </a:solidFill>
+            <a:prstDash val="dash"/>
+            <a:tailEnd type="triangle"/>
+          </a:ln>
+        </p:spPr>
+        <p:style>
+          <a:lnRef idx="1">
+            <a:schemeClr val="accent1"/>
+          </a:lnRef>
+          <a:fillRef idx="0">
+            <a:schemeClr val="accent1"/>
+          </a:fillRef>
+          <a:effectRef idx="0">
+            <a:schemeClr val="accent1"/>
+          </a:effectRef>
+          <a:fontRef idx="minor">
+            <a:schemeClr val="tx1"/>
+          </a:fontRef>
+        </p:style>
+      </p:cxnSp>
+      <p:sp>
+        <p:nvSpPr>
+          <p:cNvPr id="123" name="TextBox 122">
+            <a:extLst>
+              <a:ext uri="{FF2B5EF4-FFF2-40B4-BE49-F238E27FC236}">
+                <a16:creationId xmlns:a16="http://schemas.microsoft.com/office/drawing/2014/main" id="{85AEE302-4D2E-A13D-6BBC-9E681983AB7C}"/>
+              </a:ext>
+            </a:extLst>
+          </p:cNvPr>
+          <p:cNvSpPr txBox="1"/>
+          <p:nvPr/>
+        </p:nvSpPr>
+        <p:spPr>
+          <a:xfrm>
+            <a:off x="7813445" y="2259848"/>
+            <a:ext cx="2057476" cy="246221"/>
+          </a:xfrm>
+          <a:prstGeom prst="rect">
+            <a:avLst/>
+          </a:prstGeom>
+          <a:noFill/>
+        </p:spPr>
+        <p:txBody>
+          <a:bodyPr wrap="square" rtlCol="0">
+            <a:spAutoFit/>
+          </a:bodyPr>
+          <a:lstStyle/>
+          <a:p>
+            <a:r>
+              <a:rPr lang="en-SG" sz="1000" b="1" dirty="0">
+                <a:solidFill>
+                  <a:srgbClr val="FF0000"/>
+                </a:solidFill>
+              </a:rPr>
+              <a:t>3.2 Trojan register reject response</a:t>
+            </a:r>
+          </a:p>
+        </p:txBody>
+      </p:sp>
+      <p:sp>
+        <p:nvSpPr>
+          <p:cNvPr id="125" name="Left Brace 124">
+            <a:extLst>
+              <a:ext uri="{FF2B5EF4-FFF2-40B4-BE49-F238E27FC236}">
+                <a16:creationId xmlns:a16="http://schemas.microsoft.com/office/drawing/2014/main" id="{283950F3-97C4-1C9D-D9E5-62100DCF5825}"/>
+              </a:ext>
+            </a:extLst>
+          </p:cNvPr>
+          <p:cNvSpPr/>
+          <p:nvPr/>
+        </p:nvSpPr>
+        <p:spPr>
+          <a:xfrm>
+            <a:off x="6821123" y="2281902"/>
+            <a:ext cx="283209" cy="2712926"/>
+          </a:xfrm>
+          <a:prstGeom prst="leftBrace">
+            <a:avLst/>
+          </a:prstGeom>
+          <a:ln>
+            <a:solidFill>
+              <a:srgbClr val="FF0000"/>
+            </a:solidFill>
+          </a:ln>
+        </p:spPr>
+        <p:style>
+          <a:lnRef idx="1">
+            <a:schemeClr val="accent1"/>
+          </a:lnRef>
+          <a:fillRef idx="0">
+            <a:schemeClr val="accent1"/>
+          </a:fillRef>
+          <a:effectRef idx="0">
+            <a:schemeClr val="accent1"/>
+          </a:effectRef>
+          <a:fontRef idx="minor">
+            <a:schemeClr val="tx1"/>
+          </a:fontRef>
+        </p:style>
+        <p:txBody>
+          <a:bodyPr rtlCol="0" anchor="ctr"/>
+          <a:lstStyle/>
+          <a:p>
+            <a:pPr algn="ctr"/>
+            <a:endParaRPr lang="en-SG" dirty="0"/>
+          </a:p>
+        </p:txBody>
+      </p:sp>
+      <p:sp>
+        <p:nvSpPr>
+          <p:cNvPr id="126" name="TextBox 125">
+            <a:extLst>
+              <a:ext uri="{FF2B5EF4-FFF2-40B4-BE49-F238E27FC236}">
+                <a16:creationId xmlns:a16="http://schemas.microsoft.com/office/drawing/2014/main" id="{7F09AF55-5303-BE83-9EFA-8ECB661CA049}"/>
+              </a:ext>
+            </a:extLst>
+          </p:cNvPr>
+          <p:cNvSpPr txBox="1"/>
+          <p:nvPr/>
+        </p:nvSpPr>
+        <p:spPr>
+          <a:xfrm>
+            <a:off x="5488322" y="3455141"/>
+            <a:ext cx="1537396" cy="400110"/>
+          </a:xfrm>
+          <a:prstGeom prst="rect">
+            <a:avLst/>
+          </a:prstGeom>
+          <a:noFill/>
+        </p:spPr>
+        <p:txBody>
+          <a:bodyPr wrap="square" rtlCol="0">
+            <a:spAutoFit/>
+          </a:bodyPr>
+          <a:lstStyle/>
+          <a:p>
+            <a:r>
+              <a:rPr lang="en-SG" sz="1000" b="1" dirty="0">
+                <a:solidFill>
+                  <a:srgbClr val="FF0000"/>
+                </a:solidFill>
+              </a:rPr>
+              <a:t>3.3 sleep register cooldown time interval</a:t>
+            </a:r>
+          </a:p>
+        </p:txBody>
+      </p:sp>
+      <p:cxnSp>
+        <p:nvCxnSpPr>
+          <p:cNvPr id="127" name="Straight Arrow Connector 126">
+            <a:extLst>
+              <a:ext uri="{FF2B5EF4-FFF2-40B4-BE49-F238E27FC236}">
+                <a16:creationId xmlns:a16="http://schemas.microsoft.com/office/drawing/2014/main" id="{808C0528-E068-74CF-268E-74B88504B79A}"/>
+              </a:ext>
+            </a:extLst>
+          </p:cNvPr>
+          <p:cNvCxnSpPr>
+            <a:cxnSpLocks/>
+          </p:cNvCxnSpPr>
+          <p:nvPr/>
+        </p:nvCxnSpPr>
+        <p:spPr>
+          <a:xfrm>
+            <a:off x="7170981" y="4943052"/>
+            <a:ext cx="2693339" cy="691"/>
+          </a:xfrm>
+          <a:prstGeom prst="straightConnector1">
+            <a:avLst/>
+          </a:prstGeom>
+          <a:ln>
+            <a:solidFill>
+              <a:srgbClr val="FF0000"/>
+            </a:solidFill>
+            <a:prstDash val="dash"/>
+            <a:tailEnd type="triangle"/>
+          </a:ln>
+        </p:spPr>
+        <p:style>
+          <a:lnRef idx="1">
+            <a:schemeClr val="accent1"/>
+          </a:lnRef>
+          <a:fillRef idx="0">
+            <a:schemeClr val="accent1"/>
+          </a:fillRef>
+          <a:effectRef idx="0">
+            <a:schemeClr val="accent1"/>
+          </a:effectRef>
+          <a:fontRef idx="minor">
+            <a:schemeClr val="tx1"/>
+          </a:fontRef>
+        </p:style>
+      </p:cxnSp>
+      <p:sp>
+        <p:nvSpPr>
+          <p:cNvPr id="128" name="TextBox 127">
+            <a:extLst>
+              <a:ext uri="{FF2B5EF4-FFF2-40B4-BE49-F238E27FC236}">
+                <a16:creationId xmlns:a16="http://schemas.microsoft.com/office/drawing/2014/main" id="{5ED86ACA-B93F-B0B9-5D2A-7D6D6954E923}"/>
+              </a:ext>
+            </a:extLst>
+          </p:cNvPr>
+          <p:cNvSpPr txBox="1"/>
+          <p:nvPr/>
+        </p:nvSpPr>
+        <p:spPr>
+          <a:xfrm>
+            <a:off x="7120586" y="4987202"/>
+            <a:ext cx="1737456" cy="246221"/>
+          </a:xfrm>
+          <a:prstGeom prst="rect">
+            <a:avLst/>
+          </a:prstGeom>
+          <a:noFill/>
+        </p:spPr>
+        <p:txBody>
+          <a:bodyPr wrap="square" rtlCol="0">
+            <a:spAutoFit/>
+          </a:bodyPr>
+          <a:lstStyle/>
+          <a:p>
+            <a:r>
+              <a:rPr lang="en-SG" sz="1000" b="1" dirty="0">
+                <a:solidFill>
+                  <a:srgbClr val="FF0000"/>
+                </a:solidFill>
+              </a:rPr>
+              <a:t>3.4 Trojan register request</a:t>
+            </a:r>
+          </a:p>
+        </p:txBody>
+      </p:sp>
+      <p:cxnSp>
+        <p:nvCxnSpPr>
+          <p:cNvPr id="130" name="Straight Arrow Connector 129">
+            <a:extLst>
+              <a:ext uri="{FF2B5EF4-FFF2-40B4-BE49-F238E27FC236}">
+                <a16:creationId xmlns:a16="http://schemas.microsoft.com/office/drawing/2014/main" id="{42362893-FAB5-74E2-08A4-5191E7566E16}"/>
+              </a:ext>
+            </a:extLst>
+          </p:cNvPr>
+          <p:cNvCxnSpPr>
+            <a:cxnSpLocks/>
+          </p:cNvCxnSpPr>
+          <p:nvPr/>
+        </p:nvCxnSpPr>
+        <p:spPr>
+          <a:xfrm flipH="1">
+            <a:off x="7165151" y="5388369"/>
+            <a:ext cx="2633008" cy="0"/>
+          </a:xfrm>
+          <a:prstGeom prst="straightConnector1">
+            <a:avLst/>
+          </a:prstGeom>
+          <a:ln>
+            <a:solidFill>
+              <a:srgbClr val="FF0000"/>
+            </a:solidFill>
+            <a:prstDash val="dash"/>
+            <a:tailEnd type="triangle"/>
+          </a:ln>
+        </p:spPr>
+        <p:style>
+          <a:lnRef idx="1">
+            <a:schemeClr val="accent1"/>
+          </a:lnRef>
+          <a:fillRef idx="0">
+            <a:schemeClr val="accent1"/>
+          </a:fillRef>
+          <a:effectRef idx="0">
+            <a:schemeClr val="accent1"/>
+          </a:effectRef>
+          <a:fontRef idx="minor">
+            <a:schemeClr val="tx1"/>
+          </a:fontRef>
+        </p:style>
+      </p:cxnSp>
+      <p:sp>
+        <p:nvSpPr>
+          <p:cNvPr id="131" name="TextBox 130">
+            <a:extLst>
+              <a:ext uri="{FF2B5EF4-FFF2-40B4-BE49-F238E27FC236}">
+                <a16:creationId xmlns:a16="http://schemas.microsoft.com/office/drawing/2014/main" id="{043E3332-96E3-B69F-E244-7064707EEEB2}"/>
+              </a:ext>
+            </a:extLst>
+          </p:cNvPr>
+          <p:cNvSpPr txBox="1"/>
+          <p:nvPr/>
+        </p:nvSpPr>
+        <p:spPr>
+          <a:xfrm>
+            <a:off x="7789772" y="5366316"/>
+            <a:ext cx="2057476" cy="246221"/>
+          </a:xfrm>
+          <a:prstGeom prst="rect">
+            <a:avLst/>
+          </a:prstGeom>
+          <a:noFill/>
+        </p:spPr>
+        <p:txBody>
+          <a:bodyPr wrap="square" rtlCol="0">
+            <a:spAutoFit/>
+          </a:bodyPr>
+          <a:lstStyle/>
+          <a:p>
+            <a:r>
+              <a:rPr lang="en-SG" sz="1000" b="1" dirty="0">
+                <a:solidFill>
+                  <a:srgbClr val="FF0000"/>
+                </a:solidFill>
+              </a:rPr>
+              <a:t>3.5 Trojan register accept response</a:t>
+            </a:r>
+          </a:p>
+        </p:txBody>
+      </p:sp>
+      <p:pic>
+        <p:nvPicPr>
+          <p:cNvPr id="132" name="Picture 131">
+            <a:extLst>
+              <a:ext uri="{FF2B5EF4-FFF2-40B4-BE49-F238E27FC236}">
+                <a16:creationId xmlns:a16="http://schemas.microsoft.com/office/drawing/2014/main" id="{EA59C736-79DD-A2E8-891D-7D45A1769C45}"/>
+              </a:ext>
+            </a:extLst>
+          </p:cNvPr>
+          <p:cNvPicPr>
+            <a:picLocks noChangeAspect="1"/>
+          </p:cNvPicPr>
+          <p:nvPr/>
+        </p:nvPicPr>
+        <p:blipFill>
+          <a:blip r:embed="rId3"/>
+          <a:stretch>
+            <a:fillRect/>
+          </a:stretch>
+        </p:blipFill>
+        <p:spPr>
+          <a:xfrm>
+            <a:off x="10262423" y="5377755"/>
+            <a:ext cx="299230" cy="331756"/>
+          </a:xfrm>
+          <a:prstGeom prst="rect">
+            <a:avLst/>
+          </a:prstGeom>
+          <a:ln w="9525">
+            <a:solidFill>
+              <a:schemeClr val="tx1"/>
+            </a:solidFill>
+          </a:ln>
+        </p:spPr>
+      </p:pic>
+      <p:cxnSp>
+        <p:nvCxnSpPr>
+          <p:cNvPr id="133" name="Straight Arrow Connector 132">
+            <a:extLst>
+              <a:ext uri="{FF2B5EF4-FFF2-40B4-BE49-F238E27FC236}">
+                <a16:creationId xmlns:a16="http://schemas.microsoft.com/office/drawing/2014/main" id="{E08E8136-CDFE-24FF-C1A2-2421C558F851}"/>
+              </a:ext>
+            </a:extLst>
+          </p:cNvPr>
+          <p:cNvCxnSpPr>
+            <a:cxnSpLocks/>
+          </p:cNvCxnSpPr>
+          <p:nvPr/>
+        </p:nvCxnSpPr>
+        <p:spPr>
+          <a:xfrm flipH="1">
+            <a:off x="9864320" y="5488769"/>
+            <a:ext cx="365864" cy="0"/>
+          </a:xfrm>
+          <a:prstGeom prst="straightConnector1">
+            <a:avLst/>
+          </a:prstGeom>
+          <a:ln>
+            <a:tailEnd type="triangle"/>
+          </a:ln>
+        </p:spPr>
+        <p:style>
+          <a:lnRef idx="1">
+            <a:schemeClr val="dk1"/>
+          </a:lnRef>
+          <a:fillRef idx="0">
+            <a:schemeClr val="dk1"/>
+          </a:fillRef>
+          <a:effectRef idx="0">
+            <a:schemeClr val="dk1"/>
+          </a:effectRef>
+          <a:fontRef idx="minor">
+            <a:schemeClr val="tx1"/>
+          </a:fontRef>
+        </p:style>
+      </p:cxnSp>
+      <p:sp>
+        <p:nvSpPr>
+          <p:cNvPr id="134" name="TextBox 133">
+            <a:extLst>
+              <a:ext uri="{FF2B5EF4-FFF2-40B4-BE49-F238E27FC236}">
+                <a16:creationId xmlns:a16="http://schemas.microsoft.com/office/drawing/2014/main" id="{AD85AB3D-13FA-3177-86EF-F49E76807E25}"/>
+              </a:ext>
+            </a:extLst>
+          </p:cNvPr>
+          <p:cNvSpPr txBox="1"/>
+          <p:nvPr/>
+        </p:nvSpPr>
+        <p:spPr>
+          <a:xfrm>
+            <a:off x="10542530" y="5277049"/>
+            <a:ext cx="1546570" cy="430887"/>
+          </a:xfrm>
+          <a:prstGeom prst="rect">
+            <a:avLst/>
+          </a:prstGeom>
+          <a:noFill/>
+        </p:spPr>
+        <p:txBody>
+          <a:bodyPr wrap="square" rtlCol="0">
+            <a:spAutoFit/>
+          </a:bodyPr>
+          <a:lstStyle/>
+          <a:p>
+            <a:r>
+              <a:rPr lang="en-SG" sz="1100" b="1" dirty="0"/>
+              <a:t>3.7 Hacker assign inject malware to trojan id=N</a:t>
+            </a:r>
+          </a:p>
+        </p:txBody>
+      </p:sp>
+      <p:pic>
+        <p:nvPicPr>
+          <p:cNvPr id="135" name="Picture 134" descr="A red horse on wheels&#10;&#10;Description automatically generated">
+            <a:extLst>
+              <a:ext uri="{FF2B5EF4-FFF2-40B4-BE49-F238E27FC236}">
+                <a16:creationId xmlns:a16="http://schemas.microsoft.com/office/drawing/2014/main" id="{F01200E4-EC65-1AFE-C0A4-FF44F52CB9AE}"/>
+              </a:ext>
+            </a:extLst>
+          </p:cNvPr>
+          <p:cNvPicPr>
+            <a:picLocks noChangeAspect="1"/>
+          </p:cNvPicPr>
+          <p:nvPr/>
+        </p:nvPicPr>
+        <p:blipFill>
+          <a:blip r:embed="rId4">
+            <a:extLst>
+              <a:ext uri="{28A0092B-C50C-407E-A947-70E740481C1C}">
+                <a14:useLocalDpi xmlns:a14="http://schemas.microsoft.com/office/drawing/2010/main" val="0"/>
+              </a:ext>
+            </a:extLst>
+          </a:blip>
+          <a:stretch>
+            <a:fillRect/>
+          </a:stretch>
+        </p:blipFill>
+        <p:spPr>
+          <a:xfrm flipH="1">
+            <a:off x="2497439" y="526343"/>
+            <a:ext cx="323830" cy="323830"/>
+          </a:xfrm>
+          <a:prstGeom prst="rect">
+            <a:avLst/>
+          </a:prstGeom>
+        </p:spPr>
+      </p:pic>
+      <p:pic>
+        <p:nvPicPr>
+          <p:cNvPr id="136" name="Picture 135" descr="A red horse on wheels&#10;&#10;Description automatically generated">
+            <a:extLst>
+              <a:ext uri="{FF2B5EF4-FFF2-40B4-BE49-F238E27FC236}">
+                <a16:creationId xmlns:a16="http://schemas.microsoft.com/office/drawing/2014/main" id="{E0874974-4AAF-39E2-333A-EC9B56964D07}"/>
+              </a:ext>
+            </a:extLst>
+          </p:cNvPr>
+          <p:cNvPicPr>
+            <a:picLocks noChangeAspect="1"/>
+          </p:cNvPicPr>
+          <p:nvPr/>
+        </p:nvPicPr>
+        <p:blipFill>
+          <a:blip r:embed="rId4">
+            <a:extLst>
+              <a:ext uri="{28A0092B-C50C-407E-A947-70E740481C1C}">
+                <a14:useLocalDpi xmlns:a14="http://schemas.microsoft.com/office/drawing/2010/main" val="0"/>
+              </a:ext>
+            </a:extLst>
+          </a:blip>
+          <a:stretch>
+            <a:fillRect/>
+          </a:stretch>
+        </p:blipFill>
+        <p:spPr>
+          <a:xfrm flipH="1">
+            <a:off x="5055484" y="505892"/>
+            <a:ext cx="323830" cy="323830"/>
+          </a:xfrm>
+          <a:prstGeom prst="rect">
+            <a:avLst/>
+          </a:prstGeom>
+        </p:spPr>
+      </p:pic>
+      <p:pic>
+        <p:nvPicPr>
+          <p:cNvPr id="137" name="Picture 136" descr="A red horse on wheels&#10;&#10;Description automatically generated">
+            <a:extLst>
+              <a:ext uri="{FF2B5EF4-FFF2-40B4-BE49-F238E27FC236}">
+                <a16:creationId xmlns:a16="http://schemas.microsoft.com/office/drawing/2014/main" id="{435509F9-85AB-523D-BA8C-DFC29C4E6F9C}"/>
+              </a:ext>
+            </a:extLst>
+          </p:cNvPr>
+          <p:cNvPicPr>
+            <a:picLocks noChangeAspect="1"/>
+          </p:cNvPicPr>
+          <p:nvPr/>
+        </p:nvPicPr>
+        <p:blipFill>
+          <a:blip r:embed="rId4">
+            <a:extLst>
+              <a:ext uri="{28A0092B-C50C-407E-A947-70E740481C1C}">
+                <a14:useLocalDpi xmlns:a14="http://schemas.microsoft.com/office/drawing/2010/main" val="0"/>
+              </a:ext>
+            </a:extLst>
+          </a:blip>
+          <a:stretch>
+            <a:fillRect/>
+          </a:stretch>
+        </p:blipFill>
+        <p:spPr>
+          <a:xfrm flipH="1">
+            <a:off x="7672221" y="475944"/>
+            <a:ext cx="323830" cy="323830"/>
+          </a:xfrm>
+          <a:prstGeom prst="rect">
+            <a:avLst/>
+          </a:prstGeom>
+        </p:spPr>
+      </p:pic>
+    </p:spTree>
+    <p:extLst>
+      <p:ext uri="{BB962C8B-B14F-4D97-AF65-F5344CB8AC3E}">
+        <p14:creationId xmlns:p14="http://schemas.microsoft.com/office/powerpoint/2010/main" val="1660989895"/>
+      </p:ext>
+    </p:extLst>
+  </p:cSld>
+  <p:clrMapOvr>
+    <a:masterClrMapping/>
+  </p:clrMapOvr>
+</p:sld>
+</file>
+
+<file path=ppt/slides/slide5.xml><?xml version="1.0" encoding="utf-8"?>
+<p:sld xmlns:a="http://schemas.openxmlformats.org/drawingml/2006/main" xmlns:r="http://schemas.openxmlformats.org/officeDocument/2006/relationships" xmlns:p="http://schemas.openxmlformats.org/presentationml/2006/main">
+  <p:cSld>
+    <p:spTree>
+      <p:nvGrpSpPr>
+        <p:cNvPr id="1" name=""/>
+        <p:cNvGrpSpPr/>
+        <p:nvPr/>
+      </p:nvGrpSpPr>
+      <p:grpSpPr>
+        <a:xfrm>
+          <a:off x="0" y="0"/>
+          <a:ext cx="0" cy="0"/>
+          <a:chOff x="0" y="0"/>
+          <a:chExt cx="0" cy="0"/>
+        </a:xfrm>
+      </p:grpSpPr>
       <p:sp>
         <p:nvSpPr>
           <p:cNvPr id="4" name="Rectangle 3">
@@ -11317,7 +14438,7 @@
 </p:sld>
 </file>
 
-<file path=ppt/slides/slide5.xml><?xml version="1.0" encoding="utf-8"?>
+<file path=ppt/slides/slide6.xml><?xml version="1.0" encoding="utf-8"?>
 <p:sld xmlns:a="http://schemas.openxmlformats.org/drawingml/2006/main" xmlns:r="http://schemas.openxmlformats.org/officeDocument/2006/relationships" xmlns:p="http://schemas.openxmlformats.org/presentationml/2006/main">
   <p:cSld>
     <p:spTree>

</xml_diff>

<commit_message>
Update the program design section.
</commit_message>
<xml_diff>
--- a/doc/designDoc.pptx
+++ b/doc/designDoc.pptx
@@ -5,7 +5,7 @@
     <p:sldMasterId id="2147483648" r:id="rId1"/>
   </p:sldMasterIdLst>
   <p:notesMasterIdLst>
-    <p:notesMasterId r:id="rId8"/>
+    <p:notesMasterId r:id="rId9"/>
   </p:notesMasterIdLst>
   <p:sldIdLst>
     <p:sldId id="256" r:id="rId2"/>
@@ -14,6 +14,7 @@
     <p:sldId id="294" r:id="rId5"/>
     <p:sldId id="290" r:id="rId6"/>
     <p:sldId id="292" r:id="rId7"/>
+    <p:sldId id="296" r:id="rId8"/>
   </p:sldIdLst>
   <p:sldSz cx="12192000" cy="6858000"/>
   <p:notesSz cx="6858000" cy="9144000"/>
@@ -202,7 +203,7 @@
           <a:p>
             <a:fld id="{30462BEA-6C65-41CB-B521-7C9DB089D720}" type="datetimeFigureOut">
               <a:rPr lang="en-SG" smtClean="0"/>
-              <a:t>27/10/2023</a:t>
+              <a:t>29/10/2023</a:t>
             </a:fld>
             <a:endParaRPr lang="en-SG"/>
           </a:p>
@@ -787,7 +788,7 @@
           <a:p>
             <a:fld id="{435F7F91-36DA-4AC3-B0AA-56077EB606D8}" type="datetimeFigureOut">
               <a:rPr lang="en-SG" smtClean="0"/>
-              <a:t>27/10/2023</a:t>
+              <a:t>29/10/2023</a:t>
             </a:fld>
             <a:endParaRPr lang="en-SG"/>
           </a:p>
@@ -987,7 +988,7 @@
           <a:p>
             <a:fld id="{435F7F91-36DA-4AC3-B0AA-56077EB606D8}" type="datetimeFigureOut">
               <a:rPr lang="en-SG" smtClean="0"/>
-              <a:t>27/10/2023</a:t>
+              <a:t>29/10/2023</a:t>
             </a:fld>
             <a:endParaRPr lang="en-SG"/>
           </a:p>
@@ -1197,7 +1198,7 @@
           <a:p>
             <a:fld id="{435F7F91-36DA-4AC3-B0AA-56077EB606D8}" type="datetimeFigureOut">
               <a:rPr lang="en-SG" smtClean="0"/>
-              <a:t>27/10/2023</a:t>
+              <a:t>29/10/2023</a:t>
             </a:fld>
             <a:endParaRPr lang="en-SG"/>
           </a:p>
@@ -1397,7 +1398,7 @@
           <a:p>
             <a:fld id="{435F7F91-36DA-4AC3-B0AA-56077EB606D8}" type="datetimeFigureOut">
               <a:rPr lang="en-SG" smtClean="0"/>
-              <a:t>27/10/2023</a:t>
+              <a:t>29/10/2023</a:t>
             </a:fld>
             <a:endParaRPr lang="en-SG"/>
           </a:p>
@@ -1673,7 +1674,7 @@
           <a:p>
             <a:fld id="{435F7F91-36DA-4AC3-B0AA-56077EB606D8}" type="datetimeFigureOut">
               <a:rPr lang="en-SG" smtClean="0"/>
-              <a:t>27/10/2023</a:t>
+              <a:t>29/10/2023</a:t>
             </a:fld>
             <a:endParaRPr lang="en-SG"/>
           </a:p>
@@ -1941,7 +1942,7 @@
           <a:p>
             <a:fld id="{435F7F91-36DA-4AC3-B0AA-56077EB606D8}" type="datetimeFigureOut">
               <a:rPr lang="en-SG" smtClean="0"/>
-              <a:t>27/10/2023</a:t>
+              <a:t>29/10/2023</a:t>
             </a:fld>
             <a:endParaRPr lang="en-SG"/>
           </a:p>
@@ -2356,7 +2357,7 @@
           <a:p>
             <a:fld id="{435F7F91-36DA-4AC3-B0AA-56077EB606D8}" type="datetimeFigureOut">
               <a:rPr lang="en-SG" smtClean="0"/>
-              <a:t>27/10/2023</a:t>
+              <a:t>29/10/2023</a:t>
             </a:fld>
             <a:endParaRPr lang="en-SG"/>
           </a:p>
@@ -2498,7 +2499,7 @@
           <a:p>
             <a:fld id="{435F7F91-36DA-4AC3-B0AA-56077EB606D8}" type="datetimeFigureOut">
               <a:rPr lang="en-SG" smtClean="0"/>
-              <a:t>27/10/2023</a:t>
+              <a:t>29/10/2023</a:t>
             </a:fld>
             <a:endParaRPr lang="en-SG"/>
           </a:p>
@@ -2611,7 +2612,7 @@
           <a:p>
             <a:fld id="{435F7F91-36DA-4AC3-B0AA-56077EB606D8}" type="datetimeFigureOut">
               <a:rPr lang="en-SG" smtClean="0"/>
-              <a:t>27/10/2023</a:t>
+              <a:t>29/10/2023</a:t>
             </a:fld>
             <a:endParaRPr lang="en-SG"/>
           </a:p>
@@ -2924,7 +2925,7 @@
           <a:p>
             <a:fld id="{435F7F91-36DA-4AC3-B0AA-56077EB606D8}" type="datetimeFigureOut">
               <a:rPr lang="en-SG" smtClean="0"/>
-              <a:t>27/10/2023</a:t>
+              <a:t>29/10/2023</a:t>
             </a:fld>
             <a:endParaRPr lang="en-SG"/>
           </a:p>
@@ -3213,7 +3214,7 @@
           <a:p>
             <a:fld id="{435F7F91-36DA-4AC3-B0AA-56077EB606D8}" type="datetimeFigureOut">
               <a:rPr lang="en-SG" smtClean="0"/>
-              <a:t>27/10/2023</a:t>
+              <a:t>29/10/2023</a:t>
             </a:fld>
             <a:endParaRPr lang="en-SG"/>
           </a:p>
@@ -3456,7 +3457,7 @@
           <a:p>
             <a:fld id="{435F7F91-36DA-4AC3-B0AA-56077EB606D8}" type="datetimeFigureOut">
               <a:rPr lang="en-SG" smtClean="0"/>
-              <a:t>27/10/2023</a:t>
+              <a:t>29/10/2023</a:t>
             </a:fld>
             <a:endParaRPr lang="en-SG"/>
           </a:p>
@@ -6804,7 +6805,7 @@
         <p:spPr>
           <a:xfrm>
             <a:off x="4303524" y="898803"/>
-            <a:ext cx="0" cy="4729110"/>
+            <a:ext cx="0" cy="4362241"/>
           </a:xfrm>
           <a:prstGeom prst="straightConnector1">
             <a:avLst/>
@@ -6982,7 +6983,7 @@
         </p:nvSpPr>
         <p:spPr>
           <a:xfrm>
-            <a:off x="2307261" y="929171"/>
+            <a:off x="2292349" y="1158304"/>
             <a:ext cx="1737456" cy="400110"/>
           </a:xfrm>
           <a:prstGeom prst="rect">
@@ -7068,7 +7069,7 @@
         </p:nvSpPr>
         <p:spPr>
           <a:xfrm>
-            <a:off x="4957552" y="1276668"/>
+            <a:off x="4610276" y="1467814"/>
             <a:ext cx="1737456" cy="400110"/>
           </a:xfrm>
           <a:prstGeom prst="rect">
@@ -7111,7 +7112,7 @@
         </p:nvCxnSpPr>
         <p:spPr>
           <a:xfrm>
-            <a:off x="2060226" y="1883607"/>
+            <a:off x="2048453" y="2062728"/>
             <a:ext cx="4294632" cy="0"/>
           </a:xfrm>
           <a:prstGeom prst="straightConnector1">
@@ -7154,7 +7155,7 @@
         </p:nvSpPr>
         <p:spPr>
           <a:xfrm>
-            <a:off x="2293274" y="1883607"/>
+            <a:off x="2274779" y="2086110"/>
             <a:ext cx="1737456" cy="246221"/>
           </a:xfrm>
           <a:prstGeom prst="rect">
@@ -7195,7 +7196,7 @@
         </p:nvSpPr>
         <p:spPr>
           <a:xfrm>
-            <a:off x="1389666" y="2200987"/>
+            <a:off x="1460285" y="1752033"/>
             <a:ext cx="1494202" cy="246222"/>
           </a:xfrm>
           <a:prstGeom prst="rect">
@@ -7323,7 +7324,7 @@
         </p:nvSpPr>
         <p:spPr>
           <a:xfrm>
-            <a:off x="1389666" y="2701990"/>
+            <a:off x="1458429" y="2683930"/>
             <a:ext cx="1494202" cy="246222"/>
           </a:xfrm>
           <a:prstGeom prst="rect">
@@ -7367,7 +7368,7 @@
         </p:nvCxnSpPr>
         <p:spPr>
           <a:xfrm>
-            <a:off x="2048453" y="3081528"/>
+            <a:off x="2048452" y="3011475"/>
             <a:ext cx="4273001" cy="0"/>
           </a:xfrm>
           <a:prstGeom prst="straightConnector1">
@@ -7410,7 +7411,7 @@
         </p:nvSpPr>
         <p:spPr>
           <a:xfrm>
-            <a:off x="2274779" y="3074981"/>
+            <a:off x="2274779" y="3021167"/>
             <a:ext cx="1856969" cy="246221"/>
           </a:xfrm>
           <a:prstGeom prst="rect">
@@ -7543,7 +7544,7 @@
         </p:nvCxnSpPr>
         <p:spPr>
           <a:xfrm flipH="1">
-            <a:off x="2022784" y="3429000"/>
+            <a:off x="2022784" y="3361519"/>
             <a:ext cx="6146152" cy="0"/>
           </a:xfrm>
           <a:prstGeom prst="straightConnector1">
@@ -7586,7 +7587,7 @@
         </p:nvSpPr>
         <p:spPr>
           <a:xfrm>
-            <a:off x="6678530" y="3228945"/>
+            <a:off x="6558595" y="3161464"/>
             <a:ext cx="1554783" cy="400110"/>
           </a:xfrm>
           <a:prstGeom prst="rect">
@@ -7625,7 +7626,7 @@
         </p:nvSpPr>
         <p:spPr>
           <a:xfrm>
-            <a:off x="1389666" y="3558951"/>
+            <a:off x="1458263" y="3467586"/>
             <a:ext cx="1129041" cy="246222"/>
           </a:xfrm>
           <a:prstGeom prst="rect">
@@ -7712,7 +7713,7 @@
         </p:nvSpPr>
         <p:spPr>
           <a:xfrm>
-            <a:off x="2178695" y="4261207"/>
+            <a:off x="2022783" y="4067738"/>
             <a:ext cx="1554783" cy="246221"/>
           </a:xfrm>
           <a:prstGeom prst="rect">
@@ -7795,7 +7796,7 @@
         </p:nvCxnSpPr>
         <p:spPr>
           <a:xfrm flipH="1">
-            <a:off x="2036681" y="3882215"/>
+            <a:off x="2026322" y="3808215"/>
             <a:ext cx="7969686" cy="31520"/>
           </a:xfrm>
           <a:prstGeom prst="straightConnector1">
@@ -7838,7 +7839,7 @@
         </p:nvSpPr>
         <p:spPr>
           <a:xfrm>
-            <a:off x="8293652" y="3629055"/>
+            <a:off x="8287913" y="3573083"/>
             <a:ext cx="1697440" cy="246221"/>
           </a:xfrm>
           <a:prstGeom prst="rect">
@@ -7922,7 +7923,7 @@
         </p:nvSpPr>
         <p:spPr>
           <a:xfrm>
-            <a:off x="2205530" y="4048593"/>
+            <a:off x="2019444" y="3867683"/>
             <a:ext cx="1762549" cy="246221"/>
           </a:xfrm>
           <a:prstGeom prst="rect">
@@ -8006,8 +8007,8 @@
         </p:nvSpPr>
         <p:spPr>
           <a:xfrm>
-            <a:off x="2274780" y="4566280"/>
-            <a:ext cx="1554783" cy="400110"/>
+            <a:off x="1992796" y="4514204"/>
+            <a:ext cx="2735468" cy="246221"/>
           </a:xfrm>
           <a:prstGeom prst="rect">
             <a:avLst/>
@@ -8089,7 +8090,7 @@
         </p:nvCxnSpPr>
         <p:spPr>
           <a:xfrm flipH="1">
-            <a:off x="2034090" y="5056719"/>
+            <a:off x="2027617" y="5019473"/>
             <a:ext cx="7954150" cy="0"/>
           </a:xfrm>
           <a:prstGeom prst="straightConnector1">
@@ -8132,7 +8133,7 @@
         </p:nvSpPr>
         <p:spPr>
           <a:xfrm>
-            <a:off x="1379396" y="5137933"/>
+            <a:off x="1453797" y="5146646"/>
             <a:ext cx="1197729" cy="246222"/>
           </a:xfrm>
           <a:prstGeom prst="rect">
@@ -8174,7 +8175,7 @@
         </p:nvSpPr>
         <p:spPr>
           <a:xfrm>
-            <a:off x="8391246" y="5057901"/>
+            <a:off x="8534738" y="4807673"/>
             <a:ext cx="1554783" cy="400110"/>
           </a:xfrm>
           <a:prstGeom prst="rect">
@@ -8213,7 +8214,7 @@
         </p:nvSpPr>
         <p:spPr>
           <a:xfrm>
-            <a:off x="3585848" y="5597547"/>
+            <a:off x="3365774" y="5250346"/>
             <a:ext cx="2263063" cy="400110"/>
           </a:xfrm>
           <a:prstGeom prst="rect">
@@ -8566,7 +8567,7 @@
         <p:spPr>
           <a:xfrm>
             <a:off x="6502281" y="1681842"/>
-            <a:ext cx="1054429" cy="430887"/>
+            <a:ext cx="1383695" cy="430887"/>
           </a:xfrm>
           <a:prstGeom prst="rect">
             <a:avLst/>
@@ -8581,8 +8582,13 @@
           <a:p>
             <a:r>
               <a:rPr lang="en-SG" sz="1100" b="1" dirty="0"/>
-              <a:t>Hacker-1 control action</a:t>
-            </a:r>
+              <a:t>Hacker-1 control action: rum </a:t>
+            </a:r>
+            <a:r>
+              <a:rPr lang="en-SG" sz="1100" b="1" dirty="0" err="1"/>
+              <a:t>cmd</a:t>
+            </a:r>
+            <a:endParaRPr lang="en-SG" sz="1100" b="1" dirty="0"/>
           </a:p>
         </p:txBody>
       </p:sp>
@@ -8678,7 +8684,7 @@
         <p:spPr>
           <a:xfrm>
             <a:off x="8287913" y="2518521"/>
-            <a:ext cx="1054429" cy="430887"/>
+            <a:ext cx="1259886" cy="430887"/>
           </a:xfrm>
           <a:prstGeom prst="rect">
             <a:avLst/>
@@ -8693,7 +8699,7 @@
           <a:p>
             <a:r>
               <a:rPr lang="en-SG" sz="1100" b="1" dirty="0"/>
-              <a:t>Hacker-2 control action</a:t>
+              <a:t>Hacker-2 control action: Steal file</a:t>
             </a:r>
           </a:p>
         </p:txBody>
@@ -8790,7 +8796,7 @@
         <p:spPr>
           <a:xfrm>
             <a:off x="10149663" y="2987741"/>
-            <a:ext cx="1054429" cy="430887"/>
+            <a:ext cx="1518079" cy="430887"/>
           </a:xfrm>
           <a:prstGeom prst="rect">
             <a:avLst/>
@@ -8805,7 +8811,7 @@
           <a:p>
             <a:r>
               <a:rPr lang="en-SG" sz="1100" b="1" dirty="0"/>
-              <a:t>Hacker-N control action</a:t>
+              <a:t>Hacker-N control action: inject malware</a:t>
             </a:r>
           </a:p>
         </p:txBody>
@@ -16381,7 +16387,7 @@
         <p:spPr>
           <a:xfrm>
             <a:off x="992745" y="4297815"/>
-            <a:ext cx="1182578" cy="830997"/>
+            <a:ext cx="1048590" cy="830997"/>
           </a:xfrm>
           <a:prstGeom prst="rect">
             <a:avLst/>
@@ -16400,7 +16406,7 @@
                   <a:srgbClr val="7030A0"/>
                 </a:solidFill>
               </a:rPr>
-              <a:t>Watchdogs mutually protection deadlock</a:t>
+              <a:t>Watchdogs mutually protection dead loop</a:t>
             </a:r>
           </a:p>
         </p:txBody>
@@ -18007,6 +18013,1839 @@
     <p:extLst>
       <p:ext uri="{BB962C8B-B14F-4D97-AF65-F5344CB8AC3E}">
         <p14:creationId xmlns:p14="http://schemas.microsoft.com/office/powerpoint/2010/main" val="1534687685"/>
+      </p:ext>
+    </p:extLst>
+  </p:cSld>
+  <p:clrMapOvr>
+    <a:masterClrMapping/>
+  </p:clrMapOvr>
+</p:sld>
+</file>
+
+<file path=ppt/slides/slide7.xml><?xml version="1.0" encoding="utf-8"?>
+<p:sld xmlns:a="http://schemas.openxmlformats.org/drawingml/2006/main" xmlns:r="http://schemas.openxmlformats.org/officeDocument/2006/relationships" xmlns:p="http://schemas.openxmlformats.org/presentationml/2006/main">
+  <p:cSld>
+    <p:spTree>
+      <p:nvGrpSpPr>
+        <p:cNvPr id="1" name=""/>
+        <p:cNvGrpSpPr/>
+        <p:nvPr/>
+      </p:nvGrpSpPr>
+      <p:grpSpPr>
+        <a:xfrm>
+          <a:off x="0" y="0"/>
+          <a:ext cx="0" cy="0"/>
+          <a:chOff x="0" y="0"/>
+          <a:chExt cx="0" cy="0"/>
+        </a:xfrm>
+      </p:grpSpPr>
+      <p:sp>
+        <p:nvSpPr>
+          <p:cNvPr id="4" name="Rectangle 3">
+            <a:extLst>
+              <a:ext uri="{FF2B5EF4-FFF2-40B4-BE49-F238E27FC236}">
+                <a16:creationId xmlns:a16="http://schemas.microsoft.com/office/drawing/2014/main" id="{E3E35ECD-D496-50E4-63FB-4C38E6174598}"/>
+              </a:ext>
+            </a:extLst>
+          </p:cNvPr>
+          <p:cNvSpPr/>
+          <p:nvPr/>
+        </p:nvSpPr>
+        <p:spPr>
+          <a:xfrm>
+            <a:off x="1398887" y="1407464"/>
+            <a:ext cx="1446916" cy="376534"/>
+          </a:xfrm>
+          <a:prstGeom prst="rect">
+            <a:avLst/>
+          </a:prstGeom>
+          <a:solidFill>
+            <a:schemeClr val="accent6">
+              <a:lumMod val="75000"/>
+            </a:schemeClr>
+          </a:solidFill>
+        </p:spPr>
+        <p:style>
+          <a:lnRef idx="2">
+            <a:schemeClr val="accent1">
+              <a:shade val="50000"/>
+            </a:schemeClr>
+          </a:lnRef>
+          <a:fillRef idx="1">
+            <a:schemeClr val="accent1"/>
+          </a:fillRef>
+          <a:effectRef idx="0">
+            <a:schemeClr val="accent1"/>
+          </a:effectRef>
+          <a:fontRef idx="minor">
+            <a:schemeClr val="lt1"/>
+          </a:fontRef>
+        </p:style>
+        <p:txBody>
+          <a:bodyPr rtlCol="0" anchor="ctr"/>
+          <a:lstStyle/>
+          <a:p>
+            <a:r>
+              <a:rPr lang="en-SG" sz="1200" b="1" dirty="0"/>
+              <a:t>Trojan start in new background session </a:t>
+            </a:r>
+          </a:p>
+        </p:txBody>
+      </p:sp>
+      <p:sp>
+        <p:nvSpPr>
+          <p:cNvPr id="5" name="Rectangle 4">
+            <a:extLst>
+              <a:ext uri="{FF2B5EF4-FFF2-40B4-BE49-F238E27FC236}">
+                <a16:creationId xmlns:a16="http://schemas.microsoft.com/office/drawing/2014/main" id="{27087989-F382-9F38-22B8-092F91C25030}"/>
+              </a:ext>
+            </a:extLst>
+          </p:cNvPr>
+          <p:cNvSpPr/>
+          <p:nvPr/>
+        </p:nvSpPr>
+        <p:spPr>
+          <a:xfrm>
+            <a:off x="2085681" y="2143345"/>
+            <a:ext cx="1209946" cy="397285"/>
+          </a:xfrm>
+          <a:prstGeom prst="rect">
+            <a:avLst/>
+          </a:prstGeom>
+          <a:solidFill>
+            <a:schemeClr val="accent6">
+              <a:lumMod val="75000"/>
+            </a:schemeClr>
+          </a:solidFill>
+        </p:spPr>
+        <p:style>
+          <a:lnRef idx="2">
+            <a:schemeClr val="accent1">
+              <a:shade val="50000"/>
+            </a:schemeClr>
+          </a:lnRef>
+          <a:fillRef idx="1">
+            <a:schemeClr val="accent1"/>
+          </a:fillRef>
+          <a:effectRef idx="0">
+            <a:schemeClr val="accent1"/>
+          </a:effectRef>
+          <a:fontRef idx="minor">
+            <a:schemeClr val="lt1"/>
+          </a:fontRef>
+        </p:style>
+        <p:txBody>
+          <a:bodyPr rtlCol="0" anchor="ctr"/>
+          <a:lstStyle/>
+          <a:p>
+            <a:r>
+              <a:rPr lang="en-US" sz="1200" b="1" dirty="0"/>
+              <a:t>Init the process protector </a:t>
+            </a:r>
+            <a:endParaRPr lang="en-SG" sz="1200" b="1" dirty="0"/>
+          </a:p>
+        </p:txBody>
+      </p:sp>
+      <p:cxnSp>
+        <p:nvCxnSpPr>
+          <p:cNvPr id="6" name="Straight Connector 5">
+            <a:extLst>
+              <a:ext uri="{FF2B5EF4-FFF2-40B4-BE49-F238E27FC236}">
+                <a16:creationId xmlns:a16="http://schemas.microsoft.com/office/drawing/2014/main" id="{D3F58877-8E0C-1971-FEDD-4DDF15443474}"/>
+              </a:ext>
+            </a:extLst>
+          </p:cNvPr>
+          <p:cNvCxnSpPr/>
+          <p:nvPr/>
+        </p:nvCxnSpPr>
+        <p:spPr>
+          <a:xfrm>
+            <a:off x="4479596" y="87107"/>
+            <a:ext cx="0" cy="6467475"/>
+          </a:xfrm>
+          <a:prstGeom prst="line">
+            <a:avLst/>
+          </a:prstGeom>
+          <a:ln w="19050">
+            <a:prstDash val="sysDash"/>
+          </a:ln>
+        </p:spPr>
+        <p:style>
+          <a:lnRef idx="1">
+            <a:schemeClr val="accent1"/>
+          </a:lnRef>
+          <a:fillRef idx="0">
+            <a:schemeClr val="accent1"/>
+          </a:fillRef>
+          <a:effectRef idx="0">
+            <a:schemeClr val="accent1"/>
+          </a:effectRef>
+          <a:fontRef idx="minor">
+            <a:schemeClr val="tx1"/>
+          </a:fontRef>
+        </p:style>
+      </p:cxnSp>
+      <p:sp>
+        <p:nvSpPr>
+          <p:cNvPr id="7" name="TextBox 6">
+            <a:extLst>
+              <a:ext uri="{FF2B5EF4-FFF2-40B4-BE49-F238E27FC236}">
+                <a16:creationId xmlns:a16="http://schemas.microsoft.com/office/drawing/2014/main" id="{8A5599A1-CB7C-DC04-7B8C-238539A1B2F1}"/>
+              </a:ext>
+            </a:extLst>
+          </p:cNvPr>
+          <p:cNvSpPr txBox="1"/>
+          <p:nvPr/>
+        </p:nvSpPr>
+        <p:spPr>
+          <a:xfrm>
+            <a:off x="1195843" y="614954"/>
+            <a:ext cx="2192150" cy="276999"/>
+          </a:xfrm>
+          <a:prstGeom prst="rect">
+            <a:avLst/>
+          </a:prstGeom>
+          <a:noFill/>
+        </p:spPr>
+        <p:txBody>
+          <a:bodyPr wrap="square" rtlCol="0">
+            <a:spAutoFit/>
+          </a:bodyPr>
+          <a:lstStyle/>
+          <a:p>
+            <a:r>
+              <a:rPr lang="en-US" sz="1200" b="1" dirty="0"/>
+              <a:t>Trojan background process</a:t>
+            </a:r>
+            <a:endParaRPr lang="en-SG" sz="1200" b="1" dirty="0"/>
+          </a:p>
+        </p:txBody>
+      </p:sp>
+      <p:sp>
+        <p:nvSpPr>
+          <p:cNvPr id="8" name="TextBox 7">
+            <a:extLst>
+              <a:ext uri="{FF2B5EF4-FFF2-40B4-BE49-F238E27FC236}">
+                <a16:creationId xmlns:a16="http://schemas.microsoft.com/office/drawing/2014/main" id="{537E7575-0DD4-240C-7A8E-A62C501E5DE1}"/>
+              </a:ext>
+            </a:extLst>
+          </p:cNvPr>
+          <p:cNvSpPr txBox="1"/>
+          <p:nvPr/>
+        </p:nvSpPr>
+        <p:spPr>
+          <a:xfrm>
+            <a:off x="5197218" y="590087"/>
+            <a:ext cx="3009296" cy="276999"/>
+          </a:xfrm>
+          <a:prstGeom prst="rect">
+            <a:avLst/>
+          </a:prstGeom>
+          <a:noFill/>
+        </p:spPr>
+        <p:txBody>
+          <a:bodyPr wrap="square" rtlCol="0">
+            <a:spAutoFit/>
+          </a:bodyPr>
+          <a:lstStyle/>
+          <a:p>
+            <a:r>
+              <a:rPr lang="en-US" sz="1200" b="1" dirty="0"/>
+              <a:t>Watchdog protector background process</a:t>
+            </a:r>
+            <a:endParaRPr lang="en-SG" sz="1200" b="1" dirty="0"/>
+          </a:p>
+        </p:txBody>
+      </p:sp>
+      <p:pic>
+        <p:nvPicPr>
+          <p:cNvPr id="1026" name="Picture 2" descr="Document, file, record, recording icon - Download on Iconfinder">
+            <a:extLst>
+              <a:ext uri="{FF2B5EF4-FFF2-40B4-BE49-F238E27FC236}">
+                <a16:creationId xmlns:a16="http://schemas.microsoft.com/office/drawing/2014/main" id="{D57B9730-446A-070F-339A-8C1D8EB742F1}"/>
+              </a:ext>
+            </a:extLst>
+          </p:cNvPr>
+          <p:cNvPicPr>
+            <a:picLocks noChangeAspect="1" noChangeArrowheads="1"/>
+          </p:cNvPicPr>
+          <p:nvPr/>
+        </p:nvPicPr>
+        <p:blipFill>
+          <a:blip r:embed="rId2">
+            <a:extLst>
+              <a:ext uri="{28A0092B-C50C-407E-A947-70E740481C1C}">
+                <a14:useLocalDpi xmlns:a14="http://schemas.microsoft.com/office/drawing/2010/main" val="0"/>
+              </a:ext>
+            </a:extLst>
+          </a:blip>
+          <a:srcRect/>
+          <a:stretch>
+            <a:fillRect/>
+          </a:stretch>
+        </p:blipFill>
+        <p:spPr bwMode="auto">
+          <a:xfrm>
+            <a:off x="4248763" y="2617334"/>
+            <a:ext cx="564759" cy="564759"/>
+          </a:xfrm>
+          <a:prstGeom prst="rect">
+            <a:avLst/>
+          </a:prstGeom>
+          <a:noFill/>
+          <a:extLst>
+            <a:ext uri="{909E8E84-426E-40DD-AFC4-6F175D3DCCD1}">
+              <a14:hiddenFill xmlns:a14="http://schemas.microsoft.com/office/drawing/2010/main">
+                <a:solidFill>
+                  <a:srgbClr val="FFFFFF"/>
+                </a:solidFill>
+              </a14:hiddenFill>
+            </a:ext>
+          </a:extLst>
+        </p:spPr>
+      </p:pic>
+      <p:cxnSp>
+        <p:nvCxnSpPr>
+          <p:cNvPr id="10" name="Straight Arrow Connector 9">
+            <a:extLst>
+              <a:ext uri="{FF2B5EF4-FFF2-40B4-BE49-F238E27FC236}">
+                <a16:creationId xmlns:a16="http://schemas.microsoft.com/office/drawing/2014/main" id="{F5355C93-5068-6DB0-19DC-7227270824DC}"/>
+              </a:ext>
+            </a:extLst>
+          </p:cNvPr>
+          <p:cNvCxnSpPr>
+            <a:cxnSpLocks/>
+            <a:stCxn id="17" idx="3"/>
+            <a:endCxn id="1026" idx="1"/>
+          </p:cNvCxnSpPr>
+          <p:nvPr/>
+        </p:nvCxnSpPr>
+        <p:spPr>
+          <a:xfrm flipV="1">
+            <a:off x="3288997" y="2899714"/>
+            <a:ext cx="959766" cy="198906"/>
+          </a:xfrm>
+          <a:prstGeom prst="straightConnector1">
+            <a:avLst/>
+          </a:prstGeom>
+          <a:ln>
+            <a:headEnd type="triangle"/>
+            <a:tailEnd type="triangle"/>
+          </a:ln>
+        </p:spPr>
+        <p:style>
+          <a:lnRef idx="1">
+            <a:schemeClr val="accent1"/>
+          </a:lnRef>
+          <a:fillRef idx="0">
+            <a:schemeClr val="accent1"/>
+          </a:fillRef>
+          <a:effectRef idx="0">
+            <a:schemeClr val="accent1"/>
+          </a:effectRef>
+          <a:fontRef idx="minor">
+            <a:schemeClr val="tx1"/>
+          </a:fontRef>
+        </p:style>
+      </p:cxnSp>
+      <p:sp>
+        <p:nvSpPr>
+          <p:cNvPr id="11" name="TextBox 10">
+            <a:extLst>
+              <a:ext uri="{FF2B5EF4-FFF2-40B4-BE49-F238E27FC236}">
+                <a16:creationId xmlns:a16="http://schemas.microsoft.com/office/drawing/2014/main" id="{C4334108-55FB-C250-33D6-4DA42ECCBF6C}"/>
+              </a:ext>
+            </a:extLst>
+          </p:cNvPr>
+          <p:cNvSpPr txBox="1"/>
+          <p:nvPr/>
+        </p:nvSpPr>
+        <p:spPr>
+          <a:xfrm>
+            <a:off x="3341478" y="2294168"/>
+            <a:ext cx="1111526" cy="646331"/>
+          </a:xfrm>
+          <a:prstGeom prst="rect">
+            <a:avLst/>
+          </a:prstGeom>
+          <a:noFill/>
+        </p:spPr>
+        <p:txBody>
+          <a:bodyPr wrap="square" rtlCol="0">
+            <a:spAutoFit/>
+          </a:bodyPr>
+          <a:lstStyle/>
+          <a:p>
+            <a:r>
+              <a:rPr lang="en-US" sz="1200" b="1" dirty="0"/>
+              <a:t>Load/create the process ID record file</a:t>
+            </a:r>
+            <a:endParaRPr lang="en-SG" sz="1200" b="1" dirty="0"/>
+          </a:p>
+        </p:txBody>
+      </p:sp>
+      <p:cxnSp>
+        <p:nvCxnSpPr>
+          <p:cNvPr id="13" name="Straight Arrow Connector 12">
+            <a:extLst>
+              <a:ext uri="{FF2B5EF4-FFF2-40B4-BE49-F238E27FC236}">
+                <a16:creationId xmlns:a16="http://schemas.microsoft.com/office/drawing/2014/main" id="{2FFF635E-709D-105B-C70C-5BE662970A5F}"/>
+              </a:ext>
+            </a:extLst>
+          </p:cNvPr>
+          <p:cNvCxnSpPr>
+            <a:cxnSpLocks/>
+          </p:cNvCxnSpPr>
+          <p:nvPr/>
+        </p:nvCxnSpPr>
+        <p:spPr>
+          <a:xfrm>
+            <a:off x="2467913" y="1802506"/>
+            <a:ext cx="0" cy="327158"/>
+          </a:xfrm>
+          <a:prstGeom prst="straightConnector1">
+            <a:avLst/>
+          </a:prstGeom>
+          <a:ln>
+            <a:tailEnd type="triangle"/>
+          </a:ln>
+        </p:spPr>
+        <p:style>
+          <a:lnRef idx="1">
+            <a:schemeClr val="dk1"/>
+          </a:lnRef>
+          <a:fillRef idx="0">
+            <a:schemeClr val="dk1"/>
+          </a:fillRef>
+          <a:effectRef idx="0">
+            <a:schemeClr val="dk1"/>
+          </a:effectRef>
+          <a:fontRef idx="minor">
+            <a:schemeClr val="tx1"/>
+          </a:fontRef>
+        </p:style>
+      </p:cxnSp>
+      <p:cxnSp>
+        <p:nvCxnSpPr>
+          <p:cNvPr id="15" name="Straight Arrow Connector 14">
+            <a:extLst>
+              <a:ext uri="{FF2B5EF4-FFF2-40B4-BE49-F238E27FC236}">
+                <a16:creationId xmlns:a16="http://schemas.microsoft.com/office/drawing/2014/main" id="{24F2294A-3CB4-97D1-2E5D-6DC17DFC82AC}"/>
+              </a:ext>
+            </a:extLst>
+          </p:cNvPr>
+          <p:cNvCxnSpPr>
+            <a:cxnSpLocks/>
+          </p:cNvCxnSpPr>
+          <p:nvPr/>
+        </p:nvCxnSpPr>
+        <p:spPr>
+          <a:xfrm>
+            <a:off x="2597554" y="2572819"/>
+            <a:ext cx="0" cy="327158"/>
+          </a:xfrm>
+          <a:prstGeom prst="straightConnector1">
+            <a:avLst/>
+          </a:prstGeom>
+          <a:ln>
+            <a:tailEnd type="triangle"/>
+          </a:ln>
+        </p:spPr>
+        <p:style>
+          <a:lnRef idx="1">
+            <a:schemeClr val="dk1"/>
+          </a:lnRef>
+          <a:fillRef idx="0">
+            <a:schemeClr val="dk1"/>
+          </a:fillRef>
+          <a:effectRef idx="0">
+            <a:schemeClr val="dk1"/>
+          </a:effectRef>
+          <a:fontRef idx="minor">
+            <a:schemeClr val="tx1"/>
+          </a:fontRef>
+        </p:style>
+      </p:cxnSp>
+      <p:sp>
+        <p:nvSpPr>
+          <p:cNvPr id="17" name="Rectangle 16">
+            <a:extLst>
+              <a:ext uri="{FF2B5EF4-FFF2-40B4-BE49-F238E27FC236}">
+                <a16:creationId xmlns:a16="http://schemas.microsoft.com/office/drawing/2014/main" id="{F9A3E3FA-6DCC-3A70-9A14-8B3AC16AD5C2}"/>
+              </a:ext>
+            </a:extLst>
+          </p:cNvPr>
+          <p:cNvSpPr/>
+          <p:nvPr/>
+        </p:nvSpPr>
+        <p:spPr>
+          <a:xfrm>
+            <a:off x="2079051" y="2899977"/>
+            <a:ext cx="1209946" cy="397285"/>
+          </a:xfrm>
+          <a:prstGeom prst="rect">
+            <a:avLst/>
+          </a:prstGeom>
+          <a:solidFill>
+            <a:schemeClr val="accent6">
+              <a:lumMod val="75000"/>
+            </a:schemeClr>
+          </a:solidFill>
+        </p:spPr>
+        <p:style>
+          <a:lnRef idx="2">
+            <a:schemeClr val="accent1">
+              <a:shade val="50000"/>
+            </a:schemeClr>
+          </a:lnRef>
+          <a:fillRef idx="1">
+            <a:schemeClr val="accent1"/>
+          </a:fillRef>
+          <a:effectRef idx="0">
+            <a:schemeClr val="accent1"/>
+          </a:effectRef>
+          <a:fontRef idx="minor">
+            <a:schemeClr val="lt1"/>
+          </a:fontRef>
+        </p:style>
+        <p:txBody>
+          <a:bodyPr rtlCol="0" anchor="ctr"/>
+          <a:lstStyle/>
+          <a:p>
+            <a:r>
+              <a:rPr lang="en-US" sz="1200" b="1" dirty="0"/>
+              <a:t>Get protect target info loop</a:t>
+            </a:r>
+            <a:endParaRPr lang="en-SG" sz="1200" b="1" dirty="0"/>
+          </a:p>
+        </p:txBody>
+      </p:sp>
+      <p:sp>
+        <p:nvSpPr>
+          <p:cNvPr id="19" name="Flowchart: Decision 18">
+            <a:extLst>
+              <a:ext uri="{FF2B5EF4-FFF2-40B4-BE49-F238E27FC236}">
+                <a16:creationId xmlns:a16="http://schemas.microsoft.com/office/drawing/2014/main" id="{4B7C5279-AAAD-9710-3ED0-819FC45E15DC}"/>
+              </a:ext>
+            </a:extLst>
+          </p:cNvPr>
+          <p:cNvSpPr/>
+          <p:nvPr/>
+        </p:nvSpPr>
+        <p:spPr>
+          <a:xfrm>
+            <a:off x="1943654" y="3696356"/>
+            <a:ext cx="1297999" cy="600075"/>
+          </a:xfrm>
+          <a:prstGeom prst="flowChartDecision">
+            <a:avLst/>
+          </a:prstGeom>
+        </p:spPr>
+        <p:style>
+          <a:lnRef idx="2">
+            <a:schemeClr val="accent1">
+              <a:shade val="15000"/>
+            </a:schemeClr>
+          </a:lnRef>
+          <a:fillRef idx="1">
+            <a:schemeClr val="accent1"/>
+          </a:fillRef>
+          <a:effectRef idx="0">
+            <a:schemeClr val="accent1"/>
+          </a:effectRef>
+          <a:fontRef idx="minor">
+            <a:schemeClr val="lt1"/>
+          </a:fontRef>
+        </p:style>
+        <p:txBody>
+          <a:bodyPr rtlCol="0" anchor="ctr"/>
+          <a:lstStyle/>
+          <a:p>
+            <a:pPr algn="ctr"/>
+            <a:r>
+              <a:rPr lang="en-SG" sz="1000" b="1" dirty="0"/>
+              <a:t>Target process exist ? </a:t>
+            </a:r>
+            <a:r>
+              <a:rPr lang="en-SG" sz="800" b="1" dirty="0"/>
+              <a:t> </a:t>
+            </a:r>
+          </a:p>
+        </p:txBody>
+      </p:sp>
+      <p:cxnSp>
+        <p:nvCxnSpPr>
+          <p:cNvPr id="20" name="Straight Arrow Connector 19">
+            <a:extLst>
+              <a:ext uri="{FF2B5EF4-FFF2-40B4-BE49-F238E27FC236}">
+                <a16:creationId xmlns:a16="http://schemas.microsoft.com/office/drawing/2014/main" id="{F030B8C9-9694-127C-DB53-7DCC8C262478}"/>
+              </a:ext>
+            </a:extLst>
+          </p:cNvPr>
+          <p:cNvCxnSpPr>
+            <a:cxnSpLocks/>
+          </p:cNvCxnSpPr>
+          <p:nvPr/>
+        </p:nvCxnSpPr>
+        <p:spPr>
+          <a:xfrm>
+            <a:off x="2592654" y="3352025"/>
+            <a:ext cx="0" cy="327158"/>
+          </a:xfrm>
+          <a:prstGeom prst="straightConnector1">
+            <a:avLst/>
+          </a:prstGeom>
+          <a:ln>
+            <a:tailEnd type="triangle"/>
+          </a:ln>
+        </p:spPr>
+        <p:style>
+          <a:lnRef idx="1">
+            <a:schemeClr val="dk1"/>
+          </a:lnRef>
+          <a:fillRef idx="0">
+            <a:schemeClr val="dk1"/>
+          </a:fillRef>
+          <a:effectRef idx="0">
+            <a:schemeClr val="dk1"/>
+          </a:effectRef>
+          <a:fontRef idx="minor">
+            <a:schemeClr val="tx1"/>
+          </a:fontRef>
+        </p:style>
+      </p:cxnSp>
+      <p:cxnSp>
+        <p:nvCxnSpPr>
+          <p:cNvPr id="22" name="Connector: Elbow 21">
+            <a:extLst>
+              <a:ext uri="{FF2B5EF4-FFF2-40B4-BE49-F238E27FC236}">
+                <a16:creationId xmlns:a16="http://schemas.microsoft.com/office/drawing/2014/main" id="{F3239098-CCA1-2FF1-D4D6-2B5FFCEFE9F5}"/>
+              </a:ext>
+            </a:extLst>
+          </p:cNvPr>
+          <p:cNvCxnSpPr>
+            <a:cxnSpLocks/>
+            <a:stCxn id="19" idx="1"/>
+            <a:endCxn id="17" idx="1"/>
+          </p:cNvCxnSpPr>
+          <p:nvPr/>
+        </p:nvCxnSpPr>
+        <p:spPr>
+          <a:xfrm rot="10800000" flipH="1">
+            <a:off x="1943653" y="3098620"/>
+            <a:ext cx="135397" cy="897774"/>
+          </a:xfrm>
+          <a:prstGeom prst="bentConnector3">
+            <a:avLst>
+              <a:gd name="adj1" fmla="val -168837"/>
+            </a:avLst>
+          </a:prstGeom>
+          <a:ln>
+            <a:tailEnd type="triangle"/>
+          </a:ln>
+        </p:spPr>
+        <p:style>
+          <a:lnRef idx="1">
+            <a:schemeClr val="accent1"/>
+          </a:lnRef>
+          <a:fillRef idx="0">
+            <a:schemeClr val="accent1"/>
+          </a:fillRef>
+          <a:effectRef idx="0">
+            <a:schemeClr val="accent1"/>
+          </a:effectRef>
+          <a:fontRef idx="minor">
+            <a:schemeClr val="tx1"/>
+          </a:fontRef>
+        </p:style>
+      </p:cxnSp>
+      <p:sp>
+        <p:nvSpPr>
+          <p:cNvPr id="25" name="TextBox 24">
+            <a:extLst>
+              <a:ext uri="{FF2B5EF4-FFF2-40B4-BE49-F238E27FC236}">
+                <a16:creationId xmlns:a16="http://schemas.microsoft.com/office/drawing/2014/main" id="{58885F09-744B-0854-93BF-6D06993AA7DB}"/>
+              </a:ext>
+            </a:extLst>
+          </p:cNvPr>
+          <p:cNvSpPr txBox="1"/>
+          <p:nvPr/>
+        </p:nvSpPr>
+        <p:spPr>
+          <a:xfrm>
+            <a:off x="1706082" y="3419357"/>
+            <a:ext cx="832526" cy="276999"/>
+          </a:xfrm>
+          <a:prstGeom prst="rect">
+            <a:avLst/>
+          </a:prstGeom>
+          <a:noFill/>
+        </p:spPr>
+        <p:txBody>
+          <a:bodyPr wrap="square" rtlCol="0">
+            <a:spAutoFit/>
+          </a:bodyPr>
+          <a:lstStyle/>
+          <a:p>
+            <a:r>
+              <a:rPr lang="en-SG" sz="1200" b="1" dirty="0"/>
+              <a:t>Yes</a:t>
+            </a:r>
+          </a:p>
+        </p:txBody>
+      </p:sp>
+      <p:sp>
+        <p:nvSpPr>
+          <p:cNvPr id="26" name="Rectangle 25">
+            <a:extLst>
+              <a:ext uri="{FF2B5EF4-FFF2-40B4-BE49-F238E27FC236}">
+                <a16:creationId xmlns:a16="http://schemas.microsoft.com/office/drawing/2014/main" id="{E1EDD87A-3B2B-7549-88E4-919214B62F28}"/>
+              </a:ext>
+            </a:extLst>
+          </p:cNvPr>
+          <p:cNvSpPr/>
+          <p:nvPr/>
+        </p:nvSpPr>
+        <p:spPr>
+          <a:xfrm>
+            <a:off x="5878147" y="1425972"/>
+            <a:ext cx="1619553" cy="461665"/>
+          </a:xfrm>
+          <a:prstGeom prst="rect">
+            <a:avLst/>
+          </a:prstGeom>
+          <a:solidFill>
+            <a:schemeClr val="accent6">
+              <a:lumMod val="75000"/>
+            </a:schemeClr>
+          </a:solidFill>
+        </p:spPr>
+        <p:style>
+          <a:lnRef idx="2">
+            <a:schemeClr val="accent1">
+              <a:shade val="50000"/>
+            </a:schemeClr>
+          </a:lnRef>
+          <a:fillRef idx="1">
+            <a:schemeClr val="accent1"/>
+          </a:fillRef>
+          <a:effectRef idx="0">
+            <a:schemeClr val="accent1"/>
+          </a:effectRef>
+          <a:fontRef idx="minor">
+            <a:schemeClr val="lt1"/>
+          </a:fontRef>
+        </p:style>
+        <p:txBody>
+          <a:bodyPr rtlCol="0" anchor="ctr"/>
+          <a:lstStyle/>
+          <a:p>
+            <a:r>
+              <a:rPr lang="en-SG" sz="1200" b="1" dirty="0"/>
+              <a:t>Protecter start in new background session    </a:t>
+            </a:r>
+          </a:p>
+        </p:txBody>
+      </p:sp>
+      <p:sp>
+        <p:nvSpPr>
+          <p:cNvPr id="27" name="Rectangle 26">
+            <a:extLst>
+              <a:ext uri="{FF2B5EF4-FFF2-40B4-BE49-F238E27FC236}">
+                <a16:creationId xmlns:a16="http://schemas.microsoft.com/office/drawing/2014/main" id="{CC654722-8B04-C0DD-A34F-69842F3B6DFB}"/>
+              </a:ext>
+            </a:extLst>
+          </p:cNvPr>
+          <p:cNvSpPr/>
+          <p:nvPr/>
+        </p:nvSpPr>
+        <p:spPr>
+          <a:xfrm>
+            <a:off x="5869464" y="2211789"/>
+            <a:ext cx="1209946" cy="397285"/>
+          </a:xfrm>
+          <a:prstGeom prst="rect">
+            <a:avLst/>
+          </a:prstGeom>
+          <a:solidFill>
+            <a:schemeClr val="accent6">
+              <a:lumMod val="75000"/>
+            </a:schemeClr>
+          </a:solidFill>
+        </p:spPr>
+        <p:style>
+          <a:lnRef idx="2">
+            <a:schemeClr val="accent1">
+              <a:shade val="50000"/>
+            </a:schemeClr>
+          </a:lnRef>
+          <a:fillRef idx="1">
+            <a:schemeClr val="accent1"/>
+          </a:fillRef>
+          <a:effectRef idx="0">
+            <a:schemeClr val="accent1"/>
+          </a:effectRef>
+          <a:fontRef idx="minor">
+            <a:schemeClr val="lt1"/>
+          </a:fontRef>
+        </p:style>
+        <p:txBody>
+          <a:bodyPr rtlCol="0" anchor="ctr"/>
+          <a:lstStyle/>
+          <a:p>
+            <a:r>
+              <a:rPr lang="en-US" sz="1200" b="1" dirty="0"/>
+              <a:t>Init the process protector </a:t>
+            </a:r>
+            <a:endParaRPr lang="en-SG" sz="1200" b="1" dirty="0"/>
+          </a:p>
+        </p:txBody>
+      </p:sp>
+      <p:cxnSp>
+        <p:nvCxnSpPr>
+          <p:cNvPr id="28" name="Straight Arrow Connector 27">
+            <a:extLst>
+              <a:ext uri="{FF2B5EF4-FFF2-40B4-BE49-F238E27FC236}">
+                <a16:creationId xmlns:a16="http://schemas.microsoft.com/office/drawing/2014/main" id="{5BA4A3A1-8F1C-0A6B-091C-6FEDB2CEBA93}"/>
+              </a:ext>
+            </a:extLst>
+          </p:cNvPr>
+          <p:cNvCxnSpPr>
+            <a:cxnSpLocks/>
+          </p:cNvCxnSpPr>
+          <p:nvPr/>
+        </p:nvCxnSpPr>
+        <p:spPr>
+          <a:xfrm>
+            <a:off x="1568261" y="1816187"/>
+            <a:ext cx="0" cy="2627994"/>
+          </a:xfrm>
+          <a:prstGeom prst="straightConnector1">
+            <a:avLst/>
+          </a:prstGeom>
+          <a:ln>
+            <a:tailEnd type="triangle"/>
+          </a:ln>
+        </p:spPr>
+        <p:style>
+          <a:lnRef idx="1">
+            <a:schemeClr val="dk1"/>
+          </a:lnRef>
+          <a:fillRef idx="0">
+            <a:schemeClr val="dk1"/>
+          </a:fillRef>
+          <a:effectRef idx="0">
+            <a:schemeClr val="dk1"/>
+          </a:effectRef>
+          <a:fontRef idx="minor">
+            <a:schemeClr val="tx1"/>
+          </a:fontRef>
+        </p:style>
+      </p:cxnSp>
+      <p:sp>
+        <p:nvSpPr>
+          <p:cNvPr id="30" name="Rectangle 29">
+            <a:extLst>
+              <a:ext uri="{FF2B5EF4-FFF2-40B4-BE49-F238E27FC236}">
+                <a16:creationId xmlns:a16="http://schemas.microsoft.com/office/drawing/2014/main" id="{F3364A23-188E-7C7A-91E8-E2193F0F9663}"/>
+              </a:ext>
+            </a:extLst>
+          </p:cNvPr>
+          <p:cNvSpPr/>
+          <p:nvPr/>
+        </p:nvSpPr>
+        <p:spPr>
+          <a:xfrm>
+            <a:off x="1289995" y="4476370"/>
+            <a:ext cx="1155956" cy="410084"/>
+          </a:xfrm>
+          <a:prstGeom prst="rect">
+            <a:avLst/>
+          </a:prstGeom>
+          <a:solidFill>
+            <a:schemeClr val="accent6">
+              <a:lumMod val="75000"/>
+            </a:schemeClr>
+          </a:solidFill>
+        </p:spPr>
+        <p:style>
+          <a:lnRef idx="2">
+            <a:schemeClr val="accent1">
+              <a:shade val="50000"/>
+            </a:schemeClr>
+          </a:lnRef>
+          <a:fillRef idx="1">
+            <a:schemeClr val="accent1"/>
+          </a:fillRef>
+          <a:effectRef idx="0">
+            <a:schemeClr val="accent1"/>
+          </a:effectRef>
+          <a:fontRef idx="minor">
+            <a:schemeClr val="lt1"/>
+          </a:fontRef>
+        </p:style>
+        <p:txBody>
+          <a:bodyPr rtlCol="0" anchor="ctr"/>
+          <a:lstStyle/>
+          <a:p>
+            <a:r>
+              <a:rPr lang="en-US" sz="1200" b="1" dirty="0"/>
+              <a:t>Trojan main functions </a:t>
+            </a:r>
+            <a:endParaRPr lang="en-SG" sz="1200" b="1" dirty="0"/>
+          </a:p>
+        </p:txBody>
+      </p:sp>
+      <p:sp>
+        <p:nvSpPr>
+          <p:cNvPr id="31" name="TextBox 30">
+            <a:extLst>
+              <a:ext uri="{FF2B5EF4-FFF2-40B4-BE49-F238E27FC236}">
+                <a16:creationId xmlns:a16="http://schemas.microsoft.com/office/drawing/2014/main" id="{59A47A9D-347A-935B-E32B-BA431A459DF5}"/>
+              </a:ext>
+            </a:extLst>
+          </p:cNvPr>
+          <p:cNvSpPr txBox="1"/>
+          <p:nvPr/>
+        </p:nvSpPr>
+        <p:spPr>
+          <a:xfrm>
+            <a:off x="1139143" y="1850251"/>
+            <a:ext cx="1023748" cy="276999"/>
+          </a:xfrm>
+          <a:prstGeom prst="rect">
+            <a:avLst/>
+          </a:prstGeom>
+          <a:noFill/>
+        </p:spPr>
+        <p:txBody>
+          <a:bodyPr wrap="square" rtlCol="0">
+            <a:spAutoFit/>
+          </a:bodyPr>
+          <a:lstStyle/>
+          <a:p>
+            <a:r>
+              <a:rPr lang="en-SG" sz="1200" b="1" dirty="0">
+                <a:solidFill>
+                  <a:schemeClr val="accent6">
+                    <a:lumMod val="75000"/>
+                  </a:schemeClr>
+                </a:solidFill>
+              </a:rPr>
+              <a:t>Main thread</a:t>
+            </a:r>
+          </a:p>
+        </p:txBody>
+      </p:sp>
+      <p:sp>
+        <p:nvSpPr>
+          <p:cNvPr id="32" name="TextBox 31">
+            <a:extLst>
+              <a:ext uri="{FF2B5EF4-FFF2-40B4-BE49-F238E27FC236}">
+                <a16:creationId xmlns:a16="http://schemas.microsoft.com/office/drawing/2014/main" id="{84339462-56F7-E00E-7FA4-0BFF19914700}"/>
+              </a:ext>
+            </a:extLst>
+          </p:cNvPr>
+          <p:cNvSpPr txBox="1"/>
+          <p:nvPr/>
+        </p:nvSpPr>
+        <p:spPr>
+          <a:xfrm>
+            <a:off x="2412429" y="1835808"/>
+            <a:ext cx="1723302" cy="276999"/>
+          </a:xfrm>
+          <a:prstGeom prst="rect">
+            <a:avLst/>
+          </a:prstGeom>
+          <a:noFill/>
+        </p:spPr>
+        <p:txBody>
+          <a:bodyPr wrap="square" rtlCol="0">
+            <a:spAutoFit/>
+          </a:bodyPr>
+          <a:lstStyle/>
+          <a:p>
+            <a:r>
+              <a:rPr lang="en-SG" sz="1200" b="1">
+                <a:solidFill>
+                  <a:schemeClr val="accent6">
+                    <a:lumMod val="75000"/>
+                  </a:schemeClr>
+                </a:solidFill>
+              </a:rPr>
+              <a:t>Watchdog sub-thread</a:t>
+            </a:r>
+            <a:endParaRPr lang="en-SG" sz="1200" b="1" dirty="0">
+              <a:solidFill>
+                <a:schemeClr val="accent6">
+                  <a:lumMod val="75000"/>
+                </a:schemeClr>
+              </a:solidFill>
+            </a:endParaRPr>
+          </a:p>
+        </p:txBody>
+      </p:sp>
+      <p:cxnSp>
+        <p:nvCxnSpPr>
+          <p:cNvPr id="35" name="Connector: Elbow 34">
+            <a:extLst>
+              <a:ext uri="{FF2B5EF4-FFF2-40B4-BE49-F238E27FC236}">
+                <a16:creationId xmlns:a16="http://schemas.microsoft.com/office/drawing/2014/main" id="{BEB097E2-6ED1-EEC9-E4F4-02EED5067A24}"/>
+              </a:ext>
+            </a:extLst>
+          </p:cNvPr>
+          <p:cNvCxnSpPr>
+            <a:cxnSpLocks/>
+            <a:stCxn id="19" idx="2"/>
+            <a:endCxn id="26" idx="0"/>
+          </p:cNvCxnSpPr>
+          <p:nvPr/>
+        </p:nvCxnSpPr>
+        <p:spPr>
+          <a:xfrm rot="5400000" flipH="1" flipV="1">
+            <a:off x="3205059" y="813567"/>
+            <a:ext cx="2870459" cy="4095270"/>
+          </a:xfrm>
+          <a:prstGeom prst="bentConnector5">
+            <a:avLst>
+              <a:gd name="adj1" fmla="val -7964"/>
+              <a:gd name="adj2" fmla="val 55720"/>
+              <a:gd name="adj3" fmla="val 107964"/>
+            </a:avLst>
+          </a:prstGeom>
+          <a:ln>
+            <a:tailEnd type="triangle"/>
+          </a:ln>
+        </p:spPr>
+        <p:style>
+          <a:lnRef idx="1">
+            <a:schemeClr val="accent1"/>
+          </a:lnRef>
+          <a:fillRef idx="0">
+            <a:schemeClr val="accent1"/>
+          </a:fillRef>
+          <a:effectRef idx="0">
+            <a:schemeClr val="accent1"/>
+          </a:effectRef>
+          <a:fontRef idx="minor">
+            <a:schemeClr val="tx1"/>
+          </a:fontRef>
+        </p:style>
+      </p:cxnSp>
+      <p:cxnSp>
+        <p:nvCxnSpPr>
+          <p:cNvPr id="41" name="Connector: Elbow 40">
+            <a:extLst>
+              <a:ext uri="{FF2B5EF4-FFF2-40B4-BE49-F238E27FC236}">
+                <a16:creationId xmlns:a16="http://schemas.microsoft.com/office/drawing/2014/main" id="{059D0D2A-6C8C-E1B7-F44D-868F1658ECFA}"/>
+              </a:ext>
+            </a:extLst>
+          </p:cNvPr>
+          <p:cNvCxnSpPr>
+            <a:cxnSpLocks/>
+            <a:stCxn id="19" idx="3"/>
+          </p:cNvCxnSpPr>
+          <p:nvPr/>
+        </p:nvCxnSpPr>
+        <p:spPr>
+          <a:xfrm flipV="1">
+            <a:off x="3241653" y="3056410"/>
+            <a:ext cx="1091241" cy="939984"/>
+          </a:xfrm>
+          <a:prstGeom prst="bentConnector3">
+            <a:avLst/>
+          </a:prstGeom>
+          <a:ln>
+            <a:tailEnd type="triangle"/>
+          </a:ln>
+        </p:spPr>
+        <p:style>
+          <a:lnRef idx="1">
+            <a:schemeClr val="accent1"/>
+          </a:lnRef>
+          <a:fillRef idx="0">
+            <a:schemeClr val="accent1"/>
+          </a:fillRef>
+          <a:effectRef idx="0">
+            <a:schemeClr val="accent1"/>
+          </a:effectRef>
+          <a:fontRef idx="minor">
+            <a:schemeClr val="tx1"/>
+          </a:fontRef>
+        </p:style>
+      </p:cxnSp>
+      <p:sp>
+        <p:nvSpPr>
+          <p:cNvPr id="42" name="TextBox 41">
+            <a:extLst>
+              <a:ext uri="{FF2B5EF4-FFF2-40B4-BE49-F238E27FC236}">
+                <a16:creationId xmlns:a16="http://schemas.microsoft.com/office/drawing/2014/main" id="{2FEC2979-E69D-6343-85D1-ACA0AA20F1DA}"/>
+              </a:ext>
+            </a:extLst>
+          </p:cNvPr>
+          <p:cNvSpPr txBox="1"/>
+          <p:nvPr/>
+        </p:nvSpPr>
+        <p:spPr>
+          <a:xfrm>
+            <a:off x="3292765" y="3567113"/>
+            <a:ext cx="1195774" cy="646331"/>
+          </a:xfrm>
+          <a:prstGeom prst="rect">
+            <a:avLst/>
+          </a:prstGeom>
+          <a:noFill/>
+        </p:spPr>
+        <p:txBody>
+          <a:bodyPr wrap="square" rtlCol="0">
+            <a:spAutoFit/>
+          </a:bodyPr>
+          <a:lstStyle/>
+          <a:p>
+            <a:r>
+              <a:rPr lang="en-US" sz="1200" b="1" dirty="0"/>
+              <a:t>Update new protector’s </a:t>
+            </a:r>
+            <a:r>
+              <a:rPr lang="en-US" sz="1200" b="1" dirty="0" err="1"/>
+              <a:t>Pid</a:t>
+            </a:r>
+            <a:r>
+              <a:rPr lang="en-US" sz="1200" b="1" dirty="0"/>
+              <a:t> in record file</a:t>
+            </a:r>
+            <a:endParaRPr lang="en-SG" sz="1200" b="1" dirty="0"/>
+          </a:p>
+        </p:txBody>
+      </p:sp>
+      <p:sp>
+        <p:nvSpPr>
+          <p:cNvPr id="43" name="TextBox 42">
+            <a:extLst>
+              <a:ext uri="{FF2B5EF4-FFF2-40B4-BE49-F238E27FC236}">
+                <a16:creationId xmlns:a16="http://schemas.microsoft.com/office/drawing/2014/main" id="{9124E382-C683-623F-26C9-D421BA14B2FE}"/>
+              </a:ext>
+            </a:extLst>
+          </p:cNvPr>
+          <p:cNvSpPr txBox="1"/>
+          <p:nvPr/>
+        </p:nvSpPr>
+        <p:spPr>
+          <a:xfrm>
+            <a:off x="2673727" y="4518730"/>
+            <a:ext cx="1651152" cy="646331"/>
+          </a:xfrm>
+          <a:prstGeom prst="rect">
+            <a:avLst/>
+          </a:prstGeom>
+          <a:noFill/>
+        </p:spPr>
+        <p:txBody>
+          <a:bodyPr wrap="square" rtlCol="0">
+            <a:spAutoFit/>
+          </a:bodyPr>
+          <a:lstStyle/>
+          <a:p>
+            <a:r>
+              <a:rPr lang="en-US" sz="1200" b="1" dirty="0"/>
+              <a:t>Start a new background process to run protector</a:t>
+            </a:r>
+            <a:endParaRPr lang="en-SG" sz="1200" b="1" dirty="0"/>
+          </a:p>
+        </p:txBody>
+      </p:sp>
+      <p:sp>
+        <p:nvSpPr>
+          <p:cNvPr id="47" name="TextBox 46">
+            <a:extLst>
+              <a:ext uri="{FF2B5EF4-FFF2-40B4-BE49-F238E27FC236}">
+                <a16:creationId xmlns:a16="http://schemas.microsoft.com/office/drawing/2014/main" id="{88AD2072-90A3-4057-B422-5687FF489CCE}"/>
+              </a:ext>
+            </a:extLst>
+          </p:cNvPr>
+          <p:cNvSpPr txBox="1"/>
+          <p:nvPr/>
+        </p:nvSpPr>
+        <p:spPr>
+          <a:xfrm>
+            <a:off x="2548500" y="4296431"/>
+            <a:ext cx="539046" cy="276999"/>
+          </a:xfrm>
+          <a:prstGeom prst="rect">
+            <a:avLst/>
+          </a:prstGeom>
+          <a:noFill/>
+        </p:spPr>
+        <p:txBody>
+          <a:bodyPr wrap="square" rtlCol="0">
+            <a:spAutoFit/>
+          </a:bodyPr>
+          <a:lstStyle/>
+          <a:p>
+            <a:r>
+              <a:rPr lang="en-US" sz="1200" b="1" dirty="0"/>
+              <a:t>N</a:t>
+            </a:r>
+            <a:r>
+              <a:rPr lang="en-SG" sz="1200" b="1" dirty="0"/>
+              <a:t>o</a:t>
+            </a:r>
+          </a:p>
+        </p:txBody>
+      </p:sp>
+      <p:cxnSp>
+        <p:nvCxnSpPr>
+          <p:cNvPr id="48" name="Straight Arrow Connector 47">
+            <a:extLst>
+              <a:ext uri="{FF2B5EF4-FFF2-40B4-BE49-F238E27FC236}">
+                <a16:creationId xmlns:a16="http://schemas.microsoft.com/office/drawing/2014/main" id="{13F59141-1A70-2776-4FEB-903F5E7C3AAF}"/>
+              </a:ext>
+            </a:extLst>
+          </p:cNvPr>
+          <p:cNvCxnSpPr>
+            <a:cxnSpLocks/>
+          </p:cNvCxnSpPr>
+          <p:nvPr/>
+        </p:nvCxnSpPr>
+        <p:spPr>
+          <a:xfrm>
+            <a:off x="6338728" y="1884631"/>
+            <a:ext cx="0" cy="327158"/>
+          </a:xfrm>
+          <a:prstGeom prst="straightConnector1">
+            <a:avLst/>
+          </a:prstGeom>
+          <a:ln>
+            <a:tailEnd type="triangle"/>
+          </a:ln>
+        </p:spPr>
+        <p:style>
+          <a:lnRef idx="1">
+            <a:schemeClr val="dk1"/>
+          </a:lnRef>
+          <a:fillRef idx="0">
+            <a:schemeClr val="dk1"/>
+          </a:fillRef>
+          <a:effectRef idx="0">
+            <a:schemeClr val="dk1"/>
+          </a:effectRef>
+          <a:fontRef idx="minor">
+            <a:schemeClr val="tx1"/>
+          </a:fontRef>
+        </p:style>
+      </p:cxnSp>
+      <p:sp>
+        <p:nvSpPr>
+          <p:cNvPr id="49" name="Rectangle 48">
+            <a:extLst>
+              <a:ext uri="{FF2B5EF4-FFF2-40B4-BE49-F238E27FC236}">
+                <a16:creationId xmlns:a16="http://schemas.microsoft.com/office/drawing/2014/main" id="{70555698-5D64-A001-EFBB-6D2AC632EC87}"/>
+              </a:ext>
+            </a:extLst>
+          </p:cNvPr>
+          <p:cNvSpPr/>
+          <p:nvPr/>
+        </p:nvSpPr>
+        <p:spPr>
+          <a:xfrm>
+            <a:off x="5878146" y="2939816"/>
+            <a:ext cx="1373195" cy="397285"/>
+          </a:xfrm>
+          <a:prstGeom prst="rect">
+            <a:avLst/>
+          </a:prstGeom>
+          <a:solidFill>
+            <a:schemeClr val="accent6">
+              <a:lumMod val="75000"/>
+            </a:schemeClr>
+          </a:solidFill>
+        </p:spPr>
+        <p:style>
+          <a:lnRef idx="2">
+            <a:schemeClr val="accent1">
+              <a:shade val="50000"/>
+            </a:schemeClr>
+          </a:lnRef>
+          <a:fillRef idx="1">
+            <a:schemeClr val="accent1"/>
+          </a:fillRef>
+          <a:effectRef idx="0">
+            <a:schemeClr val="accent1"/>
+          </a:effectRef>
+          <a:fontRef idx="minor">
+            <a:schemeClr val="lt1"/>
+          </a:fontRef>
+        </p:style>
+        <p:txBody>
+          <a:bodyPr rtlCol="0" anchor="ctr"/>
+          <a:lstStyle/>
+          <a:p>
+            <a:r>
+              <a:rPr lang="en-US" sz="1200" b="1" dirty="0"/>
+              <a:t>Get protect target’s  info loop</a:t>
+            </a:r>
+            <a:endParaRPr lang="en-SG" sz="1200" b="1" dirty="0"/>
+          </a:p>
+        </p:txBody>
+      </p:sp>
+      <p:cxnSp>
+        <p:nvCxnSpPr>
+          <p:cNvPr id="50" name="Straight Arrow Connector 49">
+            <a:extLst>
+              <a:ext uri="{FF2B5EF4-FFF2-40B4-BE49-F238E27FC236}">
+                <a16:creationId xmlns:a16="http://schemas.microsoft.com/office/drawing/2014/main" id="{ECE6D399-4218-4E7C-5F86-9C9A6A6D1034}"/>
+              </a:ext>
+            </a:extLst>
+          </p:cNvPr>
+          <p:cNvCxnSpPr>
+            <a:cxnSpLocks/>
+          </p:cNvCxnSpPr>
+          <p:nvPr/>
+        </p:nvCxnSpPr>
+        <p:spPr>
+          <a:xfrm>
+            <a:off x="6325817" y="2609074"/>
+            <a:ext cx="0" cy="327158"/>
+          </a:xfrm>
+          <a:prstGeom prst="straightConnector1">
+            <a:avLst/>
+          </a:prstGeom>
+          <a:ln>
+            <a:tailEnd type="triangle"/>
+          </a:ln>
+        </p:spPr>
+        <p:style>
+          <a:lnRef idx="1">
+            <a:schemeClr val="dk1"/>
+          </a:lnRef>
+          <a:fillRef idx="0">
+            <a:schemeClr val="dk1"/>
+          </a:fillRef>
+          <a:effectRef idx="0">
+            <a:schemeClr val="dk1"/>
+          </a:effectRef>
+          <a:fontRef idx="minor">
+            <a:schemeClr val="tx1"/>
+          </a:fontRef>
+        </p:style>
+      </p:cxnSp>
+      <p:cxnSp>
+        <p:nvCxnSpPr>
+          <p:cNvPr id="51" name="Straight Arrow Connector 50">
+            <a:extLst>
+              <a:ext uri="{FF2B5EF4-FFF2-40B4-BE49-F238E27FC236}">
+                <a16:creationId xmlns:a16="http://schemas.microsoft.com/office/drawing/2014/main" id="{98A080DA-A11F-D66A-7B41-30AA5195CBBE}"/>
+              </a:ext>
+            </a:extLst>
+          </p:cNvPr>
+          <p:cNvCxnSpPr>
+            <a:cxnSpLocks/>
+            <a:stCxn id="1026" idx="3"/>
+          </p:cNvCxnSpPr>
+          <p:nvPr/>
+        </p:nvCxnSpPr>
+        <p:spPr>
+          <a:xfrm>
+            <a:off x="4813522" y="2899714"/>
+            <a:ext cx="1072606" cy="230470"/>
+          </a:xfrm>
+          <a:prstGeom prst="straightConnector1">
+            <a:avLst/>
+          </a:prstGeom>
+          <a:ln>
+            <a:headEnd type="triangle"/>
+            <a:tailEnd type="triangle"/>
+          </a:ln>
+        </p:spPr>
+        <p:style>
+          <a:lnRef idx="1">
+            <a:schemeClr val="accent1"/>
+          </a:lnRef>
+          <a:fillRef idx="0">
+            <a:schemeClr val="accent1"/>
+          </a:fillRef>
+          <a:effectRef idx="0">
+            <a:schemeClr val="accent1"/>
+          </a:effectRef>
+          <a:fontRef idx="minor">
+            <a:schemeClr val="tx1"/>
+          </a:fontRef>
+        </p:style>
+      </p:cxnSp>
+      <p:sp>
+        <p:nvSpPr>
+          <p:cNvPr id="53" name="TextBox 52">
+            <a:extLst>
+              <a:ext uri="{FF2B5EF4-FFF2-40B4-BE49-F238E27FC236}">
+                <a16:creationId xmlns:a16="http://schemas.microsoft.com/office/drawing/2014/main" id="{6EC9A46C-ED5F-E6AF-FA9B-087C2F7C435D}"/>
+              </a:ext>
+            </a:extLst>
+          </p:cNvPr>
+          <p:cNvSpPr txBox="1"/>
+          <p:nvPr/>
+        </p:nvSpPr>
+        <p:spPr>
+          <a:xfrm>
+            <a:off x="4958620" y="2543744"/>
+            <a:ext cx="1111526" cy="646331"/>
+          </a:xfrm>
+          <a:prstGeom prst="rect">
+            <a:avLst/>
+          </a:prstGeom>
+          <a:noFill/>
+        </p:spPr>
+        <p:txBody>
+          <a:bodyPr wrap="square" rtlCol="0">
+            <a:spAutoFit/>
+          </a:bodyPr>
+          <a:lstStyle/>
+          <a:p>
+            <a:r>
+              <a:rPr lang="en-US" sz="1200" b="1" dirty="0"/>
+              <a:t>Load/create the process ID record file</a:t>
+            </a:r>
+            <a:endParaRPr lang="en-SG" sz="1200" b="1" dirty="0"/>
+          </a:p>
+        </p:txBody>
+      </p:sp>
+      <p:sp>
+        <p:nvSpPr>
+          <p:cNvPr id="54" name="Flowchart: Decision 53">
+            <a:extLst>
+              <a:ext uri="{FF2B5EF4-FFF2-40B4-BE49-F238E27FC236}">
+                <a16:creationId xmlns:a16="http://schemas.microsoft.com/office/drawing/2014/main" id="{64365C89-1C40-36C7-8B35-69B5B847369F}"/>
+              </a:ext>
+            </a:extLst>
+          </p:cNvPr>
+          <p:cNvSpPr/>
+          <p:nvPr/>
+        </p:nvSpPr>
+        <p:spPr>
+          <a:xfrm>
+            <a:off x="5695059" y="3688373"/>
+            <a:ext cx="1297999" cy="600075"/>
+          </a:xfrm>
+          <a:prstGeom prst="flowChartDecision">
+            <a:avLst/>
+          </a:prstGeom>
+        </p:spPr>
+        <p:style>
+          <a:lnRef idx="2">
+            <a:schemeClr val="accent1">
+              <a:shade val="15000"/>
+            </a:schemeClr>
+          </a:lnRef>
+          <a:fillRef idx="1">
+            <a:schemeClr val="accent1"/>
+          </a:fillRef>
+          <a:effectRef idx="0">
+            <a:schemeClr val="accent1"/>
+          </a:effectRef>
+          <a:fontRef idx="minor">
+            <a:schemeClr val="lt1"/>
+          </a:fontRef>
+        </p:style>
+        <p:txBody>
+          <a:bodyPr rtlCol="0" anchor="ctr"/>
+          <a:lstStyle/>
+          <a:p>
+            <a:pPr algn="ctr"/>
+            <a:r>
+              <a:rPr lang="en-SG" sz="1000" b="1" dirty="0"/>
+              <a:t>Target process exist ? </a:t>
+            </a:r>
+            <a:r>
+              <a:rPr lang="en-SG" sz="800" b="1" dirty="0"/>
+              <a:t> </a:t>
+            </a:r>
+          </a:p>
+        </p:txBody>
+      </p:sp>
+      <p:cxnSp>
+        <p:nvCxnSpPr>
+          <p:cNvPr id="55" name="Straight Arrow Connector 54">
+            <a:extLst>
+              <a:ext uri="{FF2B5EF4-FFF2-40B4-BE49-F238E27FC236}">
+                <a16:creationId xmlns:a16="http://schemas.microsoft.com/office/drawing/2014/main" id="{5FBCC4B2-81AF-B020-B2D3-C7B372CD9A73}"/>
+              </a:ext>
+            </a:extLst>
+          </p:cNvPr>
+          <p:cNvCxnSpPr>
+            <a:cxnSpLocks/>
+          </p:cNvCxnSpPr>
+          <p:nvPr/>
+        </p:nvCxnSpPr>
+        <p:spPr>
+          <a:xfrm>
+            <a:off x="6344059" y="3344042"/>
+            <a:ext cx="0" cy="327158"/>
+          </a:xfrm>
+          <a:prstGeom prst="straightConnector1">
+            <a:avLst/>
+          </a:prstGeom>
+          <a:ln>
+            <a:tailEnd type="triangle"/>
+          </a:ln>
+        </p:spPr>
+        <p:style>
+          <a:lnRef idx="1">
+            <a:schemeClr val="dk1"/>
+          </a:lnRef>
+          <a:fillRef idx="0">
+            <a:schemeClr val="dk1"/>
+          </a:fillRef>
+          <a:effectRef idx="0">
+            <a:schemeClr val="dk1"/>
+          </a:effectRef>
+          <a:fontRef idx="minor">
+            <a:schemeClr val="tx1"/>
+          </a:fontRef>
+        </p:style>
+      </p:cxnSp>
+      <p:cxnSp>
+        <p:nvCxnSpPr>
+          <p:cNvPr id="56" name="Connector: Elbow 55">
+            <a:extLst>
+              <a:ext uri="{FF2B5EF4-FFF2-40B4-BE49-F238E27FC236}">
+                <a16:creationId xmlns:a16="http://schemas.microsoft.com/office/drawing/2014/main" id="{37B7AA6F-1A7B-3288-E465-11BBAE51C821}"/>
+              </a:ext>
+            </a:extLst>
+          </p:cNvPr>
+          <p:cNvCxnSpPr>
+            <a:cxnSpLocks/>
+            <a:stCxn id="54" idx="3"/>
+            <a:endCxn id="49" idx="3"/>
+          </p:cNvCxnSpPr>
+          <p:nvPr/>
+        </p:nvCxnSpPr>
+        <p:spPr>
+          <a:xfrm flipV="1">
+            <a:off x="6993058" y="3138459"/>
+            <a:ext cx="258283" cy="849952"/>
+          </a:xfrm>
+          <a:prstGeom prst="bentConnector3">
+            <a:avLst>
+              <a:gd name="adj1" fmla="val 188508"/>
+            </a:avLst>
+          </a:prstGeom>
+          <a:ln>
+            <a:tailEnd type="triangle"/>
+          </a:ln>
+        </p:spPr>
+        <p:style>
+          <a:lnRef idx="1">
+            <a:schemeClr val="accent1"/>
+          </a:lnRef>
+          <a:fillRef idx="0">
+            <a:schemeClr val="accent1"/>
+          </a:fillRef>
+          <a:effectRef idx="0">
+            <a:schemeClr val="accent1"/>
+          </a:effectRef>
+          <a:fontRef idx="minor">
+            <a:schemeClr val="tx1"/>
+          </a:fontRef>
+        </p:style>
+      </p:cxnSp>
+      <p:sp>
+        <p:nvSpPr>
+          <p:cNvPr id="57" name="TextBox 56">
+            <a:extLst>
+              <a:ext uri="{FF2B5EF4-FFF2-40B4-BE49-F238E27FC236}">
+                <a16:creationId xmlns:a16="http://schemas.microsoft.com/office/drawing/2014/main" id="{8F9A935F-C8D1-9E8C-E7FC-575DF9097403}"/>
+              </a:ext>
+            </a:extLst>
+          </p:cNvPr>
+          <p:cNvSpPr txBox="1"/>
+          <p:nvPr/>
+        </p:nvSpPr>
+        <p:spPr>
+          <a:xfrm>
+            <a:off x="7081437" y="3461534"/>
+            <a:ext cx="832526" cy="276999"/>
+          </a:xfrm>
+          <a:prstGeom prst="rect">
+            <a:avLst/>
+          </a:prstGeom>
+          <a:noFill/>
+        </p:spPr>
+        <p:txBody>
+          <a:bodyPr wrap="square" rtlCol="0">
+            <a:spAutoFit/>
+          </a:bodyPr>
+          <a:lstStyle/>
+          <a:p>
+            <a:r>
+              <a:rPr lang="en-SG" sz="1200" b="1" dirty="0"/>
+              <a:t>Yes</a:t>
+            </a:r>
+          </a:p>
+        </p:txBody>
+      </p:sp>
+      <p:cxnSp>
+        <p:nvCxnSpPr>
+          <p:cNvPr id="60" name="Connector: Elbow 59">
+            <a:extLst>
+              <a:ext uri="{FF2B5EF4-FFF2-40B4-BE49-F238E27FC236}">
+                <a16:creationId xmlns:a16="http://schemas.microsoft.com/office/drawing/2014/main" id="{9968E2E1-5607-54A3-8682-428CBB5C4C91}"/>
+              </a:ext>
+            </a:extLst>
+          </p:cNvPr>
+          <p:cNvCxnSpPr>
+            <a:cxnSpLocks/>
+            <a:stCxn id="54" idx="2"/>
+            <a:endCxn id="4" idx="0"/>
+          </p:cNvCxnSpPr>
+          <p:nvPr/>
+        </p:nvCxnSpPr>
+        <p:spPr>
+          <a:xfrm rot="5400000" flipH="1">
+            <a:off x="2792710" y="737099"/>
+            <a:ext cx="2880984" cy="4221714"/>
+          </a:xfrm>
+          <a:prstGeom prst="bentConnector5">
+            <a:avLst>
+              <a:gd name="adj1" fmla="val -7935"/>
+              <a:gd name="adj2" fmla="val -39616"/>
+              <a:gd name="adj3" fmla="val 114419"/>
+            </a:avLst>
+          </a:prstGeom>
+          <a:ln>
+            <a:tailEnd type="triangle"/>
+          </a:ln>
+        </p:spPr>
+        <p:style>
+          <a:lnRef idx="1">
+            <a:schemeClr val="accent1"/>
+          </a:lnRef>
+          <a:fillRef idx="0">
+            <a:schemeClr val="accent1"/>
+          </a:fillRef>
+          <a:effectRef idx="0">
+            <a:schemeClr val="accent1"/>
+          </a:effectRef>
+          <a:fontRef idx="minor">
+            <a:schemeClr val="tx1"/>
+          </a:fontRef>
+        </p:style>
+      </p:cxnSp>
+      <p:sp>
+        <p:nvSpPr>
+          <p:cNvPr id="1028" name="TextBox 1027">
+            <a:extLst>
+              <a:ext uri="{FF2B5EF4-FFF2-40B4-BE49-F238E27FC236}">
+                <a16:creationId xmlns:a16="http://schemas.microsoft.com/office/drawing/2014/main" id="{F710C165-797F-B73D-4E49-0E4AA2F0D0A3}"/>
+              </a:ext>
+            </a:extLst>
+          </p:cNvPr>
+          <p:cNvSpPr txBox="1"/>
+          <p:nvPr/>
+        </p:nvSpPr>
+        <p:spPr>
+          <a:xfrm>
+            <a:off x="6432343" y="4288449"/>
+            <a:ext cx="539046" cy="276999"/>
+          </a:xfrm>
+          <a:prstGeom prst="rect">
+            <a:avLst/>
+          </a:prstGeom>
+          <a:noFill/>
+        </p:spPr>
+        <p:txBody>
+          <a:bodyPr wrap="square" rtlCol="0">
+            <a:spAutoFit/>
+          </a:bodyPr>
+          <a:lstStyle/>
+          <a:p>
+            <a:r>
+              <a:rPr lang="en-US" sz="1200" b="1" dirty="0"/>
+              <a:t>N</a:t>
+            </a:r>
+            <a:r>
+              <a:rPr lang="en-SG" sz="1200" b="1" dirty="0"/>
+              <a:t>o</a:t>
+            </a:r>
+          </a:p>
+        </p:txBody>
+      </p:sp>
+      <p:cxnSp>
+        <p:nvCxnSpPr>
+          <p:cNvPr id="1029" name="Connector: Elbow 1028">
+            <a:extLst>
+              <a:ext uri="{FF2B5EF4-FFF2-40B4-BE49-F238E27FC236}">
+                <a16:creationId xmlns:a16="http://schemas.microsoft.com/office/drawing/2014/main" id="{6DD1B6E2-0E2F-C273-298C-213C755F0711}"/>
+              </a:ext>
+            </a:extLst>
+          </p:cNvPr>
+          <p:cNvCxnSpPr>
+            <a:cxnSpLocks/>
+            <a:stCxn id="54" idx="1"/>
+          </p:cNvCxnSpPr>
+          <p:nvPr/>
+        </p:nvCxnSpPr>
+        <p:spPr>
+          <a:xfrm rot="10800000">
+            <a:off x="4681051" y="3190077"/>
+            <a:ext cx="1014008" cy="798334"/>
+          </a:xfrm>
+          <a:prstGeom prst="bentConnector3">
+            <a:avLst>
+              <a:gd name="adj1" fmla="val 50000"/>
+            </a:avLst>
+          </a:prstGeom>
+          <a:ln>
+            <a:tailEnd type="triangle"/>
+          </a:ln>
+        </p:spPr>
+        <p:style>
+          <a:lnRef idx="1">
+            <a:schemeClr val="accent1"/>
+          </a:lnRef>
+          <a:fillRef idx="0">
+            <a:schemeClr val="accent1"/>
+          </a:fillRef>
+          <a:effectRef idx="0">
+            <a:schemeClr val="accent1"/>
+          </a:effectRef>
+          <a:fontRef idx="minor">
+            <a:schemeClr val="tx1"/>
+          </a:fontRef>
+        </p:style>
+      </p:cxnSp>
+      <p:sp>
+        <p:nvSpPr>
+          <p:cNvPr id="1034" name="TextBox 1033">
+            <a:extLst>
+              <a:ext uri="{FF2B5EF4-FFF2-40B4-BE49-F238E27FC236}">
+                <a16:creationId xmlns:a16="http://schemas.microsoft.com/office/drawing/2014/main" id="{C484BCD4-5AF0-60B6-DA8C-BD94B2EC7A70}"/>
+              </a:ext>
+            </a:extLst>
+          </p:cNvPr>
+          <p:cNvSpPr txBox="1"/>
+          <p:nvPr/>
+        </p:nvSpPr>
+        <p:spPr>
+          <a:xfrm>
+            <a:off x="5008793" y="4076360"/>
+            <a:ext cx="1195774" cy="646331"/>
+          </a:xfrm>
+          <a:prstGeom prst="rect">
+            <a:avLst/>
+          </a:prstGeom>
+          <a:noFill/>
+        </p:spPr>
+        <p:txBody>
+          <a:bodyPr wrap="square" rtlCol="0">
+            <a:spAutoFit/>
+          </a:bodyPr>
+          <a:lstStyle/>
+          <a:p>
+            <a:r>
+              <a:rPr lang="en-US" sz="1200" b="1" dirty="0"/>
+              <a:t>Update new protector’s </a:t>
+            </a:r>
+            <a:r>
+              <a:rPr lang="en-US" sz="1200" b="1" dirty="0" err="1"/>
+              <a:t>Pid</a:t>
+            </a:r>
+            <a:r>
+              <a:rPr lang="en-US" sz="1200" b="1" dirty="0"/>
+              <a:t> in record file</a:t>
+            </a:r>
+            <a:endParaRPr lang="en-SG" sz="1200" b="1" dirty="0"/>
+          </a:p>
+        </p:txBody>
+      </p:sp>
+      <p:sp>
+        <p:nvSpPr>
+          <p:cNvPr id="1035" name="TextBox 1034">
+            <a:extLst>
+              <a:ext uri="{FF2B5EF4-FFF2-40B4-BE49-F238E27FC236}">
+                <a16:creationId xmlns:a16="http://schemas.microsoft.com/office/drawing/2014/main" id="{D365C537-0ABD-A6C8-51CA-647AB8CE8927}"/>
+              </a:ext>
+            </a:extLst>
+          </p:cNvPr>
+          <p:cNvSpPr txBox="1"/>
+          <p:nvPr/>
+        </p:nvSpPr>
+        <p:spPr>
+          <a:xfrm>
+            <a:off x="7309304" y="4565448"/>
+            <a:ext cx="1195774" cy="830997"/>
+          </a:xfrm>
+          <a:prstGeom prst="rect">
+            <a:avLst/>
+          </a:prstGeom>
+          <a:noFill/>
+        </p:spPr>
+        <p:txBody>
+          <a:bodyPr wrap="square" rtlCol="0">
+            <a:spAutoFit/>
+          </a:bodyPr>
+          <a:lstStyle/>
+          <a:p>
+            <a:r>
+              <a:rPr lang="en-US" sz="1200" b="1" dirty="0"/>
+              <a:t>Start a new background process to run Trojan</a:t>
+            </a:r>
+            <a:endParaRPr lang="en-SG" sz="1200" b="1" dirty="0"/>
+          </a:p>
+        </p:txBody>
+      </p:sp>
+      <p:sp>
+        <p:nvSpPr>
+          <p:cNvPr id="1039" name="TextBox 1038">
+            <a:extLst>
+              <a:ext uri="{FF2B5EF4-FFF2-40B4-BE49-F238E27FC236}">
+                <a16:creationId xmlns:a16="http://schemas.microsoft.com/office/drawing/2014/main" id="{34DEE419-205D-3712-152F-2A141B4091C5}"/>
+              </a:ext>
+            </a:extLst>
+          </p:cNvPr>
+          <p:cNvSpPr txBox="1"/>
+          <p:nvPr/>
+        </p:nvSpPr>
+        <p:spPr>
+          <a:xfrm>
+            <a:off x="4083094" y="128421"/>
+            <a:ext cx="893136" cy="1200329"/>
+          </a:xfrm>
+          <a:prstGeom prst="rect">
+            <a:avLst/>
+          </a:prstGeom>
+          <a:noFill/>
+        </p:spPr>
+        <p:txBody>
+          <a:bodyPr wrap="square">
+            <a:spAutoFit/>
+          </a:bodyPr>
+          <a:lstStyle/>
+          <a:p>
+            <a:r>
+              <a:rPr lang="en-SG" sz="7200" b="0" i="0" dirty="0">
+                <a:solidFill>
+                  <a:schemeClr val="bg1">
+                    <a:lumMod val="65000"/>
+                  </a:schemeClr>
+                </a:solidFill>
+                <a:effectLst/>
+                <a:latin typeface="Arial" panose="020B0604020202020204" pitchFamily="34" charset="0"/>
+              </a:rPr>
+              <a:t>∞</a:t>
+            </a:r>
+            <a:endParaRPr lang="en-SG" sz="7200" dirty="0">
+              <a:solidFill>
+                <a:schemeClr val="bg1">
+                  <a:lumMod val="65000"/>
+                </a:schemeClr>
+              </a:solidFill>
+            </a:endParaRPr>
+          </a:p>
+        </p:txBody>
+      </p:sp>
+    </p:spTree>
+    <p:extLst>
+      <p:ext uri="{BB962C8B-B14F-4D97-AF65-F5344CB8AC3E}">
+        <p14:creationId xmlns:p14="http://schemas.microsoft.com/office/powerpoint/2010/main" val="389719796"/>
       </p:ext>
     </p:extLst>
   </p:cSld>

</xml_diff>

<commit_message>
Update the program usage section.
</commit_message>
<xml_diff>
--- a/doc/designDoc.pptx
+++ b/doc/designDoc.pptx
@@ -5,7 +5,7 @@
     <p:sldMasterId id="2147483648" r:id="rId1"/>
   </p:sldMasterIdLst>
   <p:notesMasterIdLst>
-    <p:notesMasterId r:id="rId9"/>
+    <p:notesMasterId r:id="rId10"/>
   </p:notesMasterIdLst>
   <p:sldIdLst>
     <p:sldId id="256" r:id="rId2"/>
@@ -15,6 +15,7 @@
     <p:sldId id="290" r:id="rId6"/>
     <p:sldId id="292" r:id="rId7"/>
     <p:sldId id="296" r:id="rId8"/>
+    <p:sldId id="297" r:id="rId9"/>
   </p:sldIdLst>
   <p:sldSz cx="12192000" cy="6858000"/>
   <p:notesSz cx="6858000" cy="9144000"/>
@@ -18286,7 +18287,7 @@
         </p:blipFill>
         <p:spPr bwMode="auto">
           <a:xfrm>
-            <a:off x="4248763" y="2617334"/>
+            <a:off x="4203300" y="2816240"/>
             <a:ext cx="564759" cy="564759"/>
           </a:xfrm>
           <a:prstGeom prst="rect">
@@ -18321,9 +18322,9 @@
           <p:nvPr/>
         </p:nvCxnSpPr>
         <p:spPr>
-          <a:xfrm flipV="1">
-            <a:off x="3288997" y="2899714"/>
-            <a:ext cx="959766" cy="198906"/>
+          <a:xfrm>
+            <a:off x="3288997" y="3098620"/>
+            <a:ext cx="914303" cy="0"/>
           </a:xfrm>
           <a:prstGeom prst="straightConnector1">
             <a:avLst/>
@@ -18362,7 +18363,7 @@
         </p:nvSpPr>
         <p:spPr>
           <a:xfrm>
-            <a:off x="3341478" y="2294168"/>
+            <a:off x="3315180" y="2478253"/>
             <a:ext cx="1111526" cy="646331"/>
           </a:xfrm>
           <a:prstGeom prst="rect">
@@ -18966,7 +18967,7 @@
           <a:lstStyle/>
           <a:p>
             <a:r>
-              <a:rPr lang="en-SG" sz="1200" b="1">
+              <a:rPr lang="en-SG" sz="1200" b="1" dirty="0">
                 <a:solidFill>
                   <a:schemeClr val="accent6">
                     <a:lumMod val="75000"/>
@@ -18975,13 +18976,6 @@
               </a:rPr>
               <a:t>Watchdog sub-thread</a:t>
             </a:r>
-            <a:endParaRPr lang="en-SG" sz="1200" b="1" dirty="0">
-              <a:solidFill>
-                <a:schemeClr val="accent6">
-                  <a:lumMod val="75000"/>
-                </a:schemeClr>
-              </a:solidFill>
-            </a:endParaRPr>
           </a:p>
         </p:txBody>
       </p:sp>
@@ -19009,7 +19003,7 @@
           <a:prstGeom prst="bentConnector5">
             <a:avLst>
               <a:gd name="adj1" fmla="val -7964"/>
-              <a:gd name="adj2" fmla="val 55720"/>
+              <a:gd name="adj2" fmla="val 57730"/>
               <a:gd name="adj3" fmla="val 107964"/>
             </a:avLst>
           </a:prstGeom>
@@ -19019,13 +19013,13 @@
         </p:spPr>
         <p:style>
           <a:lnRef idx="1">
-            <a:schemeClr val="accent1"/>
+            <a:schemeClr val="dk1"/>
           </a:lnRef>
           <a:fillRef idx="0">
-            <a:schemeClr val="accent1"/>
+            <a:schemeClr val="dk1"/>
           </a:fillRef>
           <a:effectRef idx="0">
-            <a:schemeClr val="accent1"/>
+            <a:schemeClr val="dk1"/>
           </a:effectRef>
           <a:fontRef idx="minor">
             <a:schemeClr val="tx1"/>
@@ -19049,8 +19043,8 @@
         </p:nvCxnSpPr>
         <p:spPr>
           <a:xfrm flipV="1">
-            <a:off x="3241653" y="3056410"/>
-            <a:ext cx="1091241" cy="939984"/>
+            <a:off x="3241653" y="3322863"/>
+            <a:ext cx="988906" cy="673531"/>
           </a:xfrm>
           <a:prstGeom prst="bentConnector3">
             <a:avLst/>
@@ -19346,8 +19340,8 @@
         </p:nvCxnSpPr>
         <p:spPr>
           <a:xfrm>
-            <a:off x="4813522" y="2899714"/>
-            <a:ext cx="1072606" cy="230470"/>
+            <a:off x="4768059" y="3098620"/>
+            <a:ext cx="1101405" cy="14076"/>
           </a:xfrm>
           <a:prstGeom prst="straightConnector1">
             <a:avLst/>
@@ -19386,7 +19380,7 @@
         </p:nvSpPr>
         <p:spPr>
           <a:xfrm>
-            <a:off x="4958620" y="2543744"/>
+            <a:off x="4930916" y="2478254"/>
             <a:ext cx="1111526" cy="646331"/>
           </a:xfrm>
           <a:prstGeom prst="rect">
@@ -19611,6 +19605,9 @@
             </a:avLst>
           </a:prstGeom>
           <a:ln>
+            <a:solidFill>
+              <a:schemeClr val="tx1"/>
+            </a:solidFill>
             <a:tailEnd type="triangle"/>
           </a:ln>
         </p:spPr>
@@ -19685,8 +19682,8 @@
         </p:nvCxnSpPr>
         <p:spPr>
           <a:xfrm rot="10800000">
-            <a:off x="4681051" y="3190077"/>
-            <a:ext cx="1014008" cy="798334"/>
+            <a:off x="4709073" y="3268473"/>
+            <a:ext cx="985987" cy="719938"/>
           </a:xfrm>
           <a:prstGeom prst="bentConnector3">
             <a:avLst>
@@ -19770,8 +19767,8 @@
         </p:nvSpPr>
         <p:spPr>
           <a:xfrm>
-            <a:off x="7309304" y="4565448"/>
-            <a:ext cx="1195774" cy="830997"/>
+            <a:off x="6429476" y="4565448"/>
+            <a:ext cx="2136448" cy="461665"/>
           </a:xfrm>
           <a:prstGeom prst="rect">
             <a:avLst/>
@@ -19846,6 +19843,689 @@
     <p:extLst>
       <p:ext uri="{BB962C8B-B14F-4D97-AF65-F5344CB8AC3E}">
         <p14:creationId xmlns:p14="http://schemas.microsoft.com/office/powerpoint/2010/main" val="389719796"/>
+      </p:ext>
+    </p:extLst>
+  </p:cSld>
+  <p:clrMapOvr>
+    <a:masterClrMapping/>
+  </p:clrMapOvr>
+</p:sld>
+</file>
+
+<file path=ppt/slides/slide8.xml><?xml version="1.0" encoding="utf-8"?>
+<p:sld xmlns:a="http://schemas.openxmlformats.org/drawingml/2006/main" xmlns:r="http://schemas.openxmlformats.org/officeDocument/2006/relationships" xmlns:p="http://schemas.openxmlformats.org/presentationml/2006/main">
+  <p:cSld>
+    <p:spTree>
+      <p:nvGrpSpPr>
+        <p:cNvPr id="1" name=""/>
+        <p:cNvGrpSpPr/>
+        <p:nvPr/>
+      </p:nvGrpSpPr>
+      <p:grpSpPr>
+        <a:xfrm>
+          <a:off x="0" y="0"/>
+          <a:ext cx="0" cy="0"/>
+          <a:chOff x="0" y="0"/>
+          <a:chExt cx="0" cy="0"/>
+        </a:xfrm>
+      </p:grpSpPr>
+      <p:sp>
+        <p:nvSpPr>
+          <p:cNvPr id="15" name="TextBox 14">
+            <a:extLst>
+              <a:ext uri="{FF2B5EF4-FFF2-40B4-BE49-F238E27FC236}">
+                <a16:creationId xmlns:a16="http://schemas.microsoft.com/office/drawing/2014/main" id="{F238E1FA-E144-2D06-7017-A56E2BF74503}"/>
+              </a:ext>
+            </a:extLst>
+          </p:cNvPr>
+          <p:cNvSpPr txBox="1"/>
+          <p:nvPr/>
+        </p:nvSpPr>
+        <p:spPr>
+          <a:xfrm>
+            <a:off x="256314" y="3287048"/>
+            <a:ext cx="1280965" cy="461665"/>
+          </a:xfrm>
+          <a:prstGeom prst="rect">
+            <a:avLst/>
+          </a:prstGeom>
+          <a:noFill/>
+        </p:spPr>
+        <p:txBody>
+          <a:bodyPr wrap="square" rtlCol="0">
+            <a:spAutoFit/>
+          </a:bodyPr>
+          <a:lstStyle/>
+          <a:p>
+            <a:r>
+              <a:rPr lang="en-SG" sz="1200" b="1" dirty="0"/>
+              <a:t>Trojan selection dropdown menu</a:t>
+            </a:r>
+          </a:p>
+        </p:txBody>
+      </p:sp>
+      <p:pic>
+        <p:nvPicPr>
+          <p:cNvPr id="5" name="Picture 4" descr="A screenshot of a computer&#10;&#10;Description automatically generated">
+            <a:extLst>
+              <a:ext uri="{FF2B5EF4-FFF2-40B4-BE49-F238E27FC236}">
+                <a16:creationId xmlns:a16="http://schemas.microsoft.com/office/drawing/2014/main" id="{798A9B62-A0B7-2EC1-E3DC-A6620354B6F2}"/>
+              </a:ext>
+            </a:extLst>
+          </p:cNvPr>
+          <p:cNvPicPr>
+            <a:picLocks noChangeAspect="1"/>
+          </p:cNvPicPr>
+          <p:nvPr/>
+        </p:nvPicPr>
+        <p:blipFill>
+          <a:blip r:embed="rId2">
+            <a:extLst>
+              <a:ext uri="{28A0092B-C50C-407E-A947-70E740481C1C}">
+                <a14:useLocalDpi xmlns:a14="http://schemas.microsoft.com/office/drawing/2010/main" val="0"/>
+              </a:ext>
+            </a:extLst>
+          </a:blip>
+          <a:stretch>
+            <a:fillRect/>
+          </a:stretch>
+        </p:blipFill>
+        <p:spPr>
+          <a:xfrm>
+            <a:off x="1812944" y="1026517"/>
+            <a:ext cx="8438095" cy="4695238"/>
+          </a:xfrm>
+          <a:prstGeom prst="rect">
+            <a:avLst/>
+          </a:prstGeom>
+        </p:spPr>
+      </p:pic>
+      <p:sp>
+        <p:nvSpPr>
+          <p:cNvPr id="6" name="Rectangle 5">
+            <a:extLst>
+              <a:ext uri="{FF2B5EF4-FFF2-40B4-BE49-F238E27FC236}">
+                <a16:creationId xmlns:a16="http://schemas.microsoft.com/office/drawing/2014/main" id="{682570C7-96AB-88B9-F547-35EE248EA53C}"/>
+              </a:ext>
+            </a:extLst>
+          </p:cNvPr>
+          <p:cNvSpPr/>
+          <p:nvPr/>
+        </p:nvSpPr>
+        <p:spPr>
+          <a:xfrm>
+            <a:off x="3425641" y="2658292"/>
+            <a:ext cx="460559" cy="313508"/>
+          </a:xfrm>
+          <a:prstGeom prst="rect">
+            <a:avLst/>
+          </a:prstGeom>
+          <a:noFill/>
+          <a:ln w="28575" cap="flat" cmpd="sng" algn="ctr">
+            <a:solidFill>
+              <a:srgbClr val="FF0000"/>
+            </a:solidFill>
+            <a:prstDash val="solid"/>
+            <a:round/>
+            <a:headEnd type="none" w="med" len="med"/>
+            <a:tailEnd type="none" w="med" len="med"/>
+          </a:ln>
+        </p:spPr>
+        <p:style>
+          <a:lnRef idx="0">
+            <a:scrgbClr r="0" g="0" b="0"/>
+          </a:lnRef>
+          <a:fillRef idx="0">
+            <a:scrgbClr r="0" g="0" b="0"/>
+          </a:fillRef>
+          <a:effectRef idx="0">
+            <a:scrgbClr r="0" g="0" b="0"/>
+          </a:effectRef>
+          <a:fontRef idx="minor">
+            <a:schemeClr val="dk1"/>
+          </a:fontRef>
+        </p:style>
+        <p:txBody>
+          <a:bodyPr rtlCol="0" anchor="ctr"/>
+          <a:lstStyle/>
+          <a:p>
+            <a:pPr algn="ctr"/>
+            <a:endParaRPr lang="en-SG"/>
+          </a:p>
+        </p:txBody>
+      </p:sp>
+      <p:cxnSp>
+        <p:nvCxnSpPr>
+          <p:cNvPr id="8" name="Straight Arrow Connector 7">
+            <a:extLst>
+              <a:ext uri="{FF2B5EF4-FFF2-40B4-BE49-F238E27FC236}">
+                <a16:creationId xmlns:a16="http://schemas.microsoft.com/office/drawing/2014/main" id="{FB63F7DB-A6D6-AAD2-D743-AA9160600A5D}"/>
+              </a:ext>
+            </a:extLst>
+          </p:cNvPr>
+          <p:cNvCxnSpPr>
+            <a:cxnSpLocks/>
+          </p:cNvCxnSpPr>
+          <p:nvPr/>
+        </p:nvCxnSpPr>
+        <p:spPr>
+          <a:xfrm>
+            <a:off x="1481328" y="2897342"/>
+            <a:ext cx="1944313" cy="0"/>
+          </a:xfrm>
+          <a:prstGeom prst="straightConnector1">
+            <a:avLst/>
+          </a:prstGeom>
+          <a:ln>
+            <a:solidFill>
+              <a:srgbClr val="FF0000"/>
+            </a:solidFill>
+            <a:tailEnd type="triangle"/>
+          </a:ln>
+        </p:spPr>
+        <p:style>
+          <a:lnRef idx="1">
+            <a:schemeClr val="accent1"/>
+          </a:lnRef>
+          <a:fillRef idx="0">
+            <a:schemeClr val="accent1"/>
+          </a:fillRef>
+          <a:effectRef idx="0">
+            <a:schemeClr val="accent1"/>
+          </a:effectRef>
+          <a:fontRef idx="minor">
+            <a:schemeClr val="tx1"/>
+          </a:fontRef>
+        </p:style>
+      </p:cxnSp>
+      <p:sp>
+        <p:nvSpPr>
+          <p:cNvPr id="10" name="TextBox 9">
+            <a:extLst>
+              <a:ext uri="{FF2B5EF4-FFF2-40B4-BE49-F238E27FC236}">
+                <a16:creationId xmlns:a16="http://schemas.microsoft.com/office/drawing/2014/main" id="{58898892-060D-6382-034E-CD4BE9865D64}"/>
+              </a:ext>
+            </a:extLst>
+          </p:cNvPr>
+          <p:cNvSpPr txBox="1"/>
+          <p:nvPr/>
+        </p:nvSpPr>
+        <p:spPr>
+          <a:xfrm>
+            <a:off x="256314" y="2721973"/>
+            <a:ext cx="1528910" cy="461665"/>
+          </a:xfrm>
+          <a:prstGeom prst="rect">
+            <a:avLst/>
+          </a:prstGeom>
+          <a:noFill/>
+        </p:spPr>
+        <p:txBody>
+          <a:bodyPr wrap="square" rtlCol="0">
+            <a:spAutoFit/>
+          </a:bodyPr>
+          <a:lstStyle/>
+          <a:p>
+            <a:r>
+              <a:rPr lang="en-SG" sz="1200" b="1" dirty="0"/>
+              <a:t>Number of trojan registered </a:t>
+            </a:r>
+          </a:p>
+        </p:txBody>
+      </p:sp>
+      <p:cxnSp>
+        <p:nvCxnSpPr>
+          <p:cNvPr id="11" name="Straight Arrow Connector 10">
+            <a:extLst>
+              <a:ext uri="{FF2B5EF4-FFF2-40B4-BE49-F238E27FC236}">
+                <a16:creationId xmlns:a16="http://schemas.microsoft.com/office/drawing/2014/main" id="{73464D12-A692-52D0-951C-36CA7AE11142}"/>
+              </a:ext>
+            </a:extLst>
+          </p:cNvPr>
+          <p:cNvCxnSpPr>
+            <a:cxnSpLocks/>
+          </p:cNvCxnSpPr>
+          <p:nvPr/>
+        </p:nvCxnSpPr>
+        <p:spPr>
+          <a:xfrm>
+            <a:off x="1481328" y="3506942"/>
+            <a:ext cx="423361" cy="0"/>
+          </a:xfrm>
+          <a:prstGeom prst="straightConnector1">
+            <a:avLst/>
+          </a:prstGeom>
+          <a:ln>
+            <a:solidFill>
+              <a:srgbClr val="FF0000"/>
+            </a:solidFill>
+            <a:tailEnd type="triangle"/>
+          </a:ln>
+        </p:spPr>
+        <p:style>
+          <a:lnRef idx="1">
+            <a:schemeClr val="accent1"/>
+          </a:lnRef>
+          <a:fillRef idx="0">
+            <a:schemeClr val="accent1"/>
+          </a:fillRef>
+          <a:effectRef idx="0">
+            <a:schemeClr val="accent1"/>
+          </a:effectRef>
+          <a:fontRef idx="minor">
+            <a:schemeClr val="tx1"/>
+          </a:fontRef>
+        </p:style>
+      </p:cxnSp>
+      <p:cxnSp>
+        <p:nvCxnSpPr>
+          <p:cNvPr id="16" name="Straight Arrow Connector 15">
+            <a:extLst>
+              <a:ext uri="{FF2B5EF4-FFF2-40B4-BE49-F238E27FC236}">
+                <a16:creationId xmlns:a16="http://schemas.microsoft.com/office/drawing/2014/main" id="{B25DB95E-1023-CA0A-94C6-C81291C58E75}"/>
+              </a:ext>
+            </a:extLst>
+          </p:cNvPr>
+          <p:cNvCxnSpPr>
+            <a:cxnSpLocks/>
+          </p:cNvCxnSpPr>
+          <p:nvPr/>
+        </p:nvCxnSpPr>
+        <p:spPr>
+          <a:xfrm>
+            <a:off x="1452216" y="4079966"/>
+            <a:ext cx="423361" cy="0"/>
+          </a:xfrm>
+          <a:prstGeom prst="straightConnector1">
+            <a:avLst/>
+          </a:prstGeom>
+          <a:ln>
+            <a:solidFill>
+              <a:srgbClr val="FF0000"/>
+            </a:solidFill>
+            <a:tailEnd type="triangle"/>
+          </a:ln>
+        </p:spPr>
+        <p:style>
+          <a:lnRef idx="1">
+            <a:schemeClr val="accent1"/>
+          </a:lnRef>
+          <a:fillRef idx="0">
+            <a:schemeClr val="accent1"/>
+          </a:fillRef>
+          <a:effectRef idx="0">
+            <a:schemeClr val="accent1"/>
+          </a:effectRef>
+          <a:fontRef idx="minor">
+            <a:schemeClr val="tx1"/>
+          </a:fontRef>
+        </p:style>
+      </p:cxnSp>
+      <p:sp>
+        <p:nvSpPr>
+          <p:cNvPr id="17" name="TextBox 16">
+            <a:extLst>
+              <a:ext uri="{FF2B5EF4-FFF2-40B4-BE49-F238E27FC236}">
+                <a16:creationId xmlns:a16="http://schemas.microsoft.com/office/drawing/2014/main" id="{B9577432-3B49-5E9D-4586-EA282999238D}"/>
+              </a:ext>
+            </a:extLst>
+          </p:cNvPr>
+          <p:cNvSpPr txBox="1"/>
+          <p:nvPr/>
+        </p:nvSpPr>
+        <p:spPr>
+          <a:xfrm>
+            <a:off x="256314" y="3847883"/>
+            <a:ext cx="1343598" cy="461665"/>
+          </a:xfrm>
+          <a:prstGeom prst="rect">
+            <a:avLst/>
+          </a:prstGeom>
+          <a:noFill/>
+        </p:spPr>
+        <p:txBody>
+          <a:bodyPr wrap="square" rtlCol="0">
+            <a:spAutoFit/>
+          </a:bodyPr>
+          <a:lstStyle/>
+          <a:p>
+            <a:r>
+              <a:rPr lang="en-SG" sz="1200" b="1" dirty="0"/>
+              <a:t>Function selection dropdown menu</a:t>
+            </a:r>
+          </a:p>
+        </p:txBody>
+      </p:sp>
+      <p:cxnSp>
+        <p:nvCxnSpPr>
+          <p:cNvPr id="18" name="Straight Arrow Connector 17">
+            <a:extLst>
+              <a:ext uri="{FF2B5EF4-FFF2-40B4-BE49-F238E27FC236}">
+                <a16:creationId xmlns:a16="http://schemas.microsoft.com/office/drawing/2014/main" id="{24154B28-1809-E961-DBF8-0142D941D194}"/>
+              </a:ext>
+            </a:extLst>
+          </p:cNvPr>
+          <p:cNvCxnSpPr>
+            <a:cxnSpLocks/>
+          </p:cNvCxnSpPr>
+          <p:nvPr/>
+        </p:nvCxnSpPr>
+        <p:spPr>
+          <a:xfrm>
+            <a:off x="1459680" y="4552406"/>
+            <a:ext cx="423361" cy="0"/>
+          </a:xfrm>
+          <a:prstGeom prst="straightConnector1">
+            <a:avLst/>
+          </a:prstGeom>
+          <a:ln>
+            <a:solidFill>
+              <a:srgbClr val="FF0000"/>
+            </a:solidFill>
+            <a:tailEnd type="triangle"/>
+          </a:ln>
+        </p:spPr>
+        <p:style>
+          <a:lnRef idx="1">
+            <a:schemeClr val="accent1"/>
+          </a:lnRef>
+          <a:fillRef idx="0">
+            <a:schemeClr val="accent1"/>
+          </a:fillRef>
+          <a:effectRef idx="0">
+            <a:schemeClr val="accent1"/>
+          </a:effectRef>
+          <a:fontRef idx="minor">
+            <a:schemeClr val="tx1"/>
+          </a:fontRef>
+        </p:style>
+      </p:cxnSp>
+      <p:sp>
+        <p:nvSpPr>
+          <p:cNvPr id="19" name="TextBox 18">
+            <a:extLst>
+              <a:ext uri="{FF2B5EF4-FFF2-40B4-BE49-F238E27FC236}">
+                <a16:creationId xmlns:a16="http://schemas.microsoft.com/office/drawing/2014/main" id="{54479500-A05D-EB81-CF51-3E8195592D0F}"/>
+              </a:ext>
+            </a:extLst>
+          </p:cNvPr>
+          <p:cNvSpPr txBox="1"/>
+          <p:nvPr/>
+        </p:nvSpPr>
+        <p:spPr>
+          <a:xfrm>
+            <a:off x="292714" y="4321736"/>
+            <a:ext cx="1343598" cy="461665"/>
+          </a:xfrm>
+          <a:prstGeom prst="rect">
+            <a:avLst/>
+          </a:prstGeom>
+          <a:noFill/>
+        </p:spPr>
+        <p:txBody>
+          <a:bodyPr wrap="square" rtlCol="0">
+            <a:spAutoFit/>
+          </a:bodyPr>
+          <a:lstStyle/>
+          <a:p>
+            <a:r>
+              <a:rPr lang="en-SG" sz="1200" b="1" dirty="0"/>
+              <a:t>Task parameter input text field</a:t>
+            </a:r>
+          </a:p>
+        </p:txBody>
+      </p:sp>
+      <p:cxnSp>
+        <p:nvCxnSpPr>
+          <p:cNvPr id="20" name="Straight Arrow Connector 19">
+            <a:extLst>
+              <a:ext uri="{FF2B5EF4-FFF2-40B4-BE49-F238E27FC236}">
+                <a16:creationId xmlns:a16="http://schemas.microsoft.com/office/drawing/2014/main" id="{70F5148D-460B-06F9-A231-C737640C3BFD}"/>
+              </a:ext>
+            </a:extLst>
+          </p:cNvPr>
+          <p:cNvCxnSpPr>
+            <a:cxnSpLocks/>
+          </p:cNvCxnSpPr>
+          <p:nvPr/>
+        </p:nvCxnSpPr>
+        <p:spPr>
+          <a:xfrm>
+            <a:off x="1447176" y="4969982"/>
+            <a:ext cx="423361" cy="0"/>
+          </a:xfrm>
+          <a:prstGeom prst="straightConnector1">
+            <a:avLst/>
+          </a:prstGeom>
+          <a:ln>
+            <a:solidFill>
+              <a:srgbClr val="FF0000"/>
+            </a:solidFill>
+            <a:tailEnd type="triangle"/>
+          </a:ln>
+        </p:spPr>
+        <p:style>
+          <a:lnRef idx="1">
+            <a:schemeClr val="accent1"/>
+          </a:lnRef>
+          <a:fillRef idx="0">
+            <a:schemeClr val="accent1"/>
+          </a:fillRef>
+          <a:effectRef idx="0">
+            <a:schemeClr val="accent1"/>
+          </a:effectRef>
+          <a:fontRef idx="minor">
+            <a:schemeClr val="tx1"/>
+          </a:fontRef>
+        </p:style>
+      </p:cxnSp>
+      <p:sp>
+        <p:nvSpPr>
+          <p:cNvPr id="21" name="TextBox 20">
+            <a:extLst>
+              <a:ext uri="{FF2B5EF4-FFF2-40B4-BE49-F238E27FC236}">
+                <a16:creationId xmlns:a16="http://schemas.microsoft.com/office/drawing/2014/main" id="{823847F5-F329-3F87-DA69-16E27E23EF6D}"/>
+              </a:ext>
+            </a:extLst>
+          </p:cNvPr>
+          <p:cNvSpPr txBox="1"/>
+          <p:nvPr/>
+        </p:nvSpPr>
+        <p:spPr>
+          <a:xfrm>
+            <a:off x="256314" y="4794176"/>
+            <a:ext cx="1492510" cy="830997"/>
+          </a:xfrm>
+          <a:prstGeom prst="rect">
+            <a:avLst/>
+          </a:prstGeom>
+          <a:noFill/>
+        </p:spPr>
+        <p:txBody>
+          <a:bodyPr wrap="square" rtlCol="0">
+            <a:spAutoFit/>
+          </a:bodyPr>
+          <a:lstStyle/>
+          <a:p>
+            <a:r>
+              <a:rPr lang="en-SG" sz="1200" b="1" dirty="0"/>
+              <a:t>Execution button (press then the tasks will be assigned to the related trojan )</a:t>
+            </a:r>
+          </a:p>
+        </p:txBody>
+      </p:sp>
+      <p:sp>
+        <p:nvSpPr>
+          <p:cNvPr id="22" name="Rectangle 21">
+            <a:extLst>
+              <a:ext uri="{FF2B5EF4-FFF2-40B4-BE49-F238E27FC236}">
+                <a16:creationId xmlns:a16="http://schemas.microsoft.com/office/drawing/2014/main" id="{3A44BF95-3939-ED57-AA0E-B828CDD768A7}"/>
+              </a:ext>
+            </a:extLst>
+          </p:cNvPr>
+          <p:cNvSpPr/>
+          <p:nvPr/>
+        </p:nvSpPr>
+        <p:spPr>
+          <a:xfrm>
+            <a:off x="4876489" y="1399032"/>
+            <a:ext cx="4368095" cy="4078224"/>
+          </a:xfrm>
+          <a:prstGeom prst="rect">
+            <a:avLst/>
+          </a:prstGeom>
+          <a:noFill/>
+          <a:ln w="28575" cap="flat" cmpd="sng" algn="ctr">
+            <a:solidFill>
+              <a:srgbClr val="FF0000"/>
+            </a:solidFill>
+            <a:prstDash val="solid"/>
+            <a:round/>
+            <a:headEnd type="none" w="med" len="med"/>
+            <a:tailEnd type="none" w="med" len="med"/>
+          </a:ln>
+        </p:spPr>
+        <p:style>
+          <a:lnRef idx="0">
+            <a:scrgbClr r="0" g="0" b="0"/>
+          </a:lnRef>
+          <a:fillRef idx="0">
+            <a:scrgbClr r="0" g="0" b="0"/>
+          </a:fillRef>
+          <a:effectRef idx="0">
+            <a:scrgbClr r="0" g="0" b="0"/>
+          </a:effectRef>
+          <a:fontRef idx="minor">
+            <a:schemeClr val="dk1"/>
+          </a:fontRef>
+        </p:style>
+        <p:txBody>
+          <a:bodyPr rtlCol="0" anchor="ctr"/>
+          <a:lstStyle/>
+          <a:p>
+            <a:pPr algn="ctr"/>
+            <a:endParaRPr lang="en-SG"/>
+          </a:p>
+        </p:txBody>
+      </p:sp>
+      <p:sp>
+        <p:nvSpPr>
+          <p:cNvPr id="23" name="TextBox 22">
+            <a:extLst>
+              <a:ext uri="{FF2B5EF4-FFF2-40B4-BE49-F238E27FC236}">
+                <a16:creationId xmlns:a16="http://schemas.microsoft.com/office/drawing/2014/main" id="{244C8609-CFA6-D11F-703D-68023E279B01}"/>
+              </a:ext>
+            </a:extLst>
+          </p:cNvPr>
+          <p:cNvSpPr txBox="1"/>
+          <p:nvPr/>
+        </p:nvSpPr>
+        <p:spPr>
+          <a:xfrm>
+            <a:off x="7892306" y="4812637"/>
+            <a:ext cx="1528910" cy="646331"/>
+          </a:xfrm>
+          <a:prstGeom prst="rect">
+            <a:avLst/>
+          </a:prstGeom>
+          <a:noFill/>
+        </p:spPr>
+        <p:txBody>
+          <a:bodyPr wrap="square" rtlCol="0">
+            <a:spAutoFit/>
+          </a:bodyPr>
+          <a:lstStyle/>
+          <a:p>
+            <a:r>
+              <a:rPr lang="en-SG" sz="1200" b="1" dirty="0"/>
+              <a:t>Log display area to show the tasks execution result </a:t>
+            </a:r>
+          </a:p>
+        </p:txBody>
+      </p:sp>
+      <p:cxnSp>
+        <p:nvCxnSpPr>
+          <p:cNvPr id="24" name="Straight Arrow Connector 23">
+            <a:extLst>
+              <a:ext uri="{FF2B5EF4-FFF2-40B4-BE49-F238E27FC236}">
+                <a16:creationId xmlns:a16="http://schemas.microsoft.com/office/drawing/2014/main" id="{5B7BEEE1-F595-BA49-801C-1A651AC3F678}"/>
+              </a:ext>
+            </a:extLst>
+          </p:cNvPr>
+          <p:cNvCxnSpPr>
+            <a:cxnSpLocks/>
+          </p:cNvCxnSpPr>
+          <p:nvPr/>
+        </p:nvCxnSpPr>
+        <p:spPr>
+          <a:xfrm>
+            <a:off x="1447175" y="1848830"/>
+            <a:ext cx="423361" cy="0"/>
+          </a:xfrm>
+          <a:prstGeom prst="straightConnector1">
+            <a:avLst/>
+          </a:prstGeom>
+          <a:ln>
+            <a:solidFill>
+              <a:srgbClr val="FF0000"/>
+            </a:solidFill>
+            <a:tailEnd type="triangle"/>
+          </a:ln>
+        </p:spPr>
+        <p:style>
+          <a:lnRef idx="1">
+            <a:schemeClr val="accent1"/>
+          </a:lnRef>
+          <a:fillRef idx="0">
+            <a:schemeClr val="accent1"/>
+          </a:fillRef>
+          <a:effectRef idx="0">
+            <a:schemeClr val="accent1"/>
+          </a:effectRef>
+          <a:fontRef idx="minor">
+            <a:schemeClr val="tx1"/>
+          </a:fontRef>
+        </p:style>
+      </p:cxnSp>
+      <p:sp>
+        <p:nvSpPr>
+          <p:cNvPr id="25" name="TextBox 24">
+            <a:extLst>
+              <a:ext uri="{FF2B5EF4-FFF2-40B4-BE49-F238E27FC236}">
+                <a16:creationId xmlns:a16="http://schemas.microsoft.com/office/drawing/2014/main" id="{75566F58-CB5D-E0C0-2176-ABA1DB80D698}"/>
+              </a:ext>
+            </a:extLst>
+          </p:cNvPr>
+          <p:cNvSpPr txBox="1"/>
+          <p:nvPr/>
+        </p:nvSpPr>
+        <p:spPr>
+          <a:xfrm>
+            <a:off x="933514" y="1693202"/>
+            <a:ext cx="1528910" cy="276999"/>
+          </a:xfrm>
+          <a:prstGeom prst="rect">
+            <a:avLst/>
+          </a:prstGeom>
+          <a:noFill/>
+        </p:spPr>
+        <p:txBody>
+          <a:bodyPr wrap="square" rtlCol="0">
+            <a:spAutoFit/>
+          </a:bodyPr>
+          <a:lstStyle/>
+          <a:p>
+            <a:r>
+              <a:rPr lang="en-SG" sz="1200" b="1" dirty="0"/>
+              <a:t>Logo</a:t>
+            </a:r>
+          </a:p>
+        </p:txBody>
+      </p:sp>
+    </p:spTree>
+    <p:extLst>
+      <p:ext uri="{BB962C8B-B14F-4D97-AF65-F5344CB8AC3E}">
+        <p14:creationId xmlns:p14="http://schemas.microsoft.com/office/powerpoint/2010/main" val="4249483064"/>
       </p:ext>
     </p:extLst>
   </p:cSld>

</xml_diff>

<commit_message>
Update the watchdog code document and added the malware recovery folder.
</commit_message>
<xml_diff>
--- a/doc/designDoc.pptx
+++ b/doc/designDoc.pptx
@@ -5,7 +5,7 @@
     <p:sldMasterId id="2147483648" r:id="rId1"/>
   </p:sldMasterIdLst>
   <p:notesMasterIdLst>
-    <p:notesMasterId r:id="rId14"/>
+    <p:notesMasterId r:id="rId15"/>
   </p:notesMasterIdLst>
   <p:sldIdLst>
     <p:sldId id="256" r:id="rId2"/>
@@ -20,6 +20,7 @@
     <p:sldId id="299" r:id="rId11"/>
     <p:sldId id="300" r:id="rId12"/>
     <p:sldId id="301" r:id="rId13"/>
+    <p:sldId id="302" r:id="rId14"/>
   </p:sldIdLst>
   <p:sldSz cx="12192000" cy="6858000"/>
   <p:notesSz cx="6858000" cy="9144000"/>
@@ -2091,7 +2092,7 @@
           <a:p>
             <a:fld id="{30462BEA-6C65-41CB-B521-7C9DB089D720}" type="datetimeFigureOut">
               <a:rPr lang="en-SG" smtClean="0"/>
-              <a:t>26/11/2023</a:t>
+              <a:t>29/11/2023</a:t>
             </a:fld>
             <a:endParaRPr lang="en-SG"/>
           </a:p>
@@ -2676,7 +2677,7 @@
           <a:p>
             <a:fld id="{435F7F91-36DA-4AC3-B0AA-56077EB606D8}" type="datetimeFigureOut">
               <a:rPr lang="en-SG" smtClean="0"/>
-              <a:t>26/11/2023</a:t>
+              <a:t>29/11/2023</a:t>
             </a:fld>
             <a:endParaRPr lang="en-SG"/>
           </a:p>
@@ -2876,7 +2877,7 @@
           <a:p>
             <a:fld id="{435F7F91-36DA-4AC3-B0AA-56077EB606D8}" type="datetimeFigureOut">
               <a:rPr lang="en-SG" smtClean="0"/>
-              <a:t>26/11/2023</a:t>
+              <a:t>29/11/2023</a:t>
             </a:fld>
             <a:endParaRPr lang="en-SG"/>
           </a:p>
@@ -3086,7 +3087,7 @@
           <a:p>
             <a:fld id="{435F7F91-36DA-4AC3-B0AA-56077EB606D8}" type="datetimeFigureOut">
               <a:rPr lang="en-SG" smtClean="0"/>
-              <a:t>26/11/2023</a:t>
+              <a:t>29/11/2023</a:t>
             </a:fld>
             <a:endParaRPr lang="en-SG"/>
           </a:p>
@@ -3286,7 +3287,7 @@
           <a:p>
             <a:fld id="{435F7F91-36DA-4AC3-B0AA-56077EB606D8}" type="datetimeFigureOut">
               <a:rPr lang="en-SG" smtClean="0"/>
-              <a:t>26/11/2023</a:t>
+              <a:t>29/11/2023</a:t>
             </a:fld>
             <a:endParaRPr lang="en-SG"/>
           </a:p>
@@ -3562,7 +3563,7 @@
           <a:p>
             <a:fld id="{435F7F91-36DA-4AC3-B0AA-56077EB606D8}" type="datetimeFigureOut">
               <a:rPr lang="en-SG" smtClean="0"/>
-              <a:t>26/11/2023</a:t>
+              <a:t>29/11/2023</a:t>
             </a:fld>
             <a:endParaRPr lang="en-SG"/>
           </a:p>
@@ -3830,7 +3831,7 @@
           <a:p>
             <a:fld id="{435F7F91-36DA-4AC3-B0AA-56077EB606D8}" type="datetimeFigureOut">
               <a:rPr lang="en-SG" smtClean="0"/>
-              <a:t>26/11/2023</a:t>
+              <a:t>29/11/2023</a:t>
             </a:fld>
             <a:endParaRPr lang="en-SG"/>
           </a:p>
@@ -4245,7 +4246,7 @@
           <a:p>
             <a:fld id="{435F7F91-36DA-4AC3-B0AA-56077EB606D8}" type="datetimeFigureOut">
               <a:rPr lang="en-SG" smtClean="0"/>
-              <a:t>26/11/2023</a:t>
+              <a:t>29/11/2023</a:t>
             </a:fld>
             <a:endParaRPr lang="en-SG"/>
           </a:p>
@@ -4387,7 +4388,7 @@
           <a:p>
             <a:fld id="{435F7F91-36DA-4AC3-B0AA-56077EB606D8}" type="datetimeFigureOut">
               <a:rPr lang="en-SG" smtClean="0"/>
-              <a:t>26/11/2023</a:t>
+              <a:t>29/11/2023</a:t>
             </a:fld>
             <a:endParaRPr lang="en-SG"/>
           </a:p>
@@ -4500,7 +4501,7 @@
           <a:p>
             <a:fld id="{435F7F91-36DA-4AC3-B0AA-56077EB606D8}" type="datetimeFigureOut">
               <a:rPr lang="en-SG" smtClean="0"/>
-              <a:t>26/11/2023</a:t>
+              <a:t>29/11/2023</a:t>
             </a:fld>
             <a:endParaRPr lang="en-SG"/>
           </a:p>
@@ -4813,7 +4814,7 @@
           <a:p>
             <a:fld id="{435F7F91-36DA-4AC3-B0AA-56077EB606D8}" type="datetimeFigureOut">
               <a:rPr lang="en-SG" smtClean="0"/>
-              <a:t>26/11/2023</a:t>
+              <a:t>29/11/2023</a:t>
             </a:fld>
             <a:endParaRPr lang="en-SG"/>
           </a:p>
@@ -5102,7 +5103,7 @@
           <a:p>
             <a:fld id="{435F7F91-36DA-4AC3-B0AA-56077EB606D8}" type="datetimeFigureOut">
               <a:rPr lang="en-SG" smtClean="0"/>
-              <a:t>26/11/2023</a:t>
+              <a:t>29/11/2023</a:t>
             </a:fld>
             <a:endParaRPr lang="en-SG"/>
           </a:p>
@@ -5345,7 +5346,7 @@
           <a:p>
             <a:fld id="{435F7F91-36DA-4AC3-B0AA-56077EB606D8}" type="datetimeFigureOut">
               <a:rPr lang="en-SG" smtClean="0"/>
-              <a:t>26/11/2023</a:t>
+              <a:t>29/11/2023</a:t>
             </a:fld>
             <a:endParaRPr lang="en-SG"/>
           </a:p>
@@ -5762,12 +5763,64 @@
           <a:chExt cx="0" cy="0"/>
         </a:xfrm>
       </p:grpSpPr>
+      <p:sp>
+        <p:nvSpPr>
+          <p:cNvPr id="5" name="Rectangle 4">
+            <a:extLst>
+              <a:ext uri="{FF2B5EF4-FFF2-40B4-BE49-F238E27FC236}">
+                <a16:creationId xmlns:a16="http://schemas.microsoft.com/office/drawing/2014/main" id="{3AEA2579-31FE-C014-DB24-88B8451B1573}"/>
+              </a:ext>
+            </a:extLst>
+          </p:cNvPr>
+          <p:cNvSpPr/>
+          <p:nvPr/>
+        </p:nvSpPr>
+        <p:spPr>
+          <a:xfrm>
+            <a:off x="2479040" y="4430541"/>
+            <a:ext cx="3139440" cy="2346180"/>
+          </a:xfrm>
+          <a:prstGeom prst="rect">
+            <a:avLst/>
+          </a:prstGeom>
+          <a:solidFill>
+            <a:schemeClr val="accent4">
+              <a:lumMod val="40000"/>
+              <a:lumOff val="60000"/>
+            </a:schemeClr>
+          </a:solidFill>
+        </p:spPr>
+        <p:style>
+          <a:lnRef idx="2">
+            <a:schemeClr val="accent1">
+              <a:shade val="15000"/>
+            </a:schemeClr>
+          </a:lnRef>
+          <a:fillRef idx="1">
+            <a:schemeClr val="accent1"/>
+          </a:fillRef>
+          <a:effectRef idx="0">
+            <a:schemeClr val="accent1"/>
+          </a:effectRef>
+          <a:fontRef idx="minor">
+            <a:schemeClr val="lt1"/>
+          </a:fontRef>
+        </p:style>
+        <p:txBody>
+          <a:bodyPr rtlCol="0" anchor="ctr"/>
+          <a:lstStyle/>
+          <a:p>
+            <a:pPr algn="ctr"/>
+            <a:endParaRPr lang="en-SG" dirty="0"/>
+          </a:p>
+        </p:txBody>
+      </p:sp>
       <p:pic>
         <p:nvPicPr>
-          <p:cNvPr id="9" name="Picture 8" descr="A red logo with a circle and a circle with a letter&#10;&#10;Description automatically generated">
-            <a:extLst>
-              <a:ext uri="{FF2B5EF4-FFF2-40B4-BE49-F238E27FC236}">
-                <a16:creationId xmlns:a16="http://schemas.microsoft.com/office/drawing/2014/main" id="{798F547A-85B8-4CCC-2E5A-8B50295F08C5}"/>
+          <p:cNvPr id="4" name="Picture 3">
+            <a:extLst>
+              <a:ext uri="{FF2B5EF4-FFF2-40B4-BE49-F238E27FC236}">
+                <a16:creationId xmlns:a16="http://schemas.microsoft.com/office/drawing/2014/main" id="{52FF3C29-E05A-D5AF-3C5D-447C5F17B5D8}"/>
               </a:ext>
             </a:extLst>
           </p:cNvPr>
@@ -5778,11 +5831,16 @@
         </p:nvPicPr>
         <p:blipFill>
           <a:blip r:embed="rId2">
-            <a:extLst>
-              <a:ext uri="{28A0092B-C50C-407E-A947-70E740481C1C}">
-                <a14:useLocalDpi xmlns:a14="http://schemas.microsoft.com/office/drawing/2010/main" val="0"/>
-              </a:ext>
-            </a:extLst>
+            <a:clrChange>
+              <a:clrFrom>
+                <a:srgbClr val="F7F7F7"/>
+              </a:clrFrom>
+              <a:clrTo>
+                <a:srgbClr val="F7F7F7">
+                  <a:alpha val="0"/>
+                </a:srgbClr>
+              </a:clrTo>
+            </a:clrChange>
           </a:blip>
           <a:stretch>
             <a:fillRect/>
@@ -5790,8 +5848,8 @@
         </p:blipFill>
         <p:spPr>
           <a:xfrm>
-            <a:off x="2034095" y="1757571"/>
-            <a:ext cx="8123809" cy="3342857"/>
+            <a:off x="4676350" y="5783467"/>
+            <a:ext cx="596690" cy="586962"/>
           </a:xfrm>
           <a:prstGeom prst="rect">
             <a:avLst/>
@@ -5800,10 +5858,10 @@
       </p:pic>
       <p:pic>
         <p:nvPicPr>
-          <p:cNvPr id="11" name="Picture 10" descr="A red horse on wheels&#10;&#10;Description automatically generated">
-            <a:extLst>
-              <a:ext uri="{FF2B5EF4-FFF2-40B4-BE49-F238E27FC236}">
-                <a16:creationId xmlns:a16="http://schemas.microsoft.com/office/drawing/2014/main" id="{7D44EF3A-85A3-97B8-8AAB-9092C4103FCC}"/>
+          <p:cNvPr id="9" name="Picture 8" descr="A red logo with a circle and a circle with a letter&#10;&#10;Description automatically generated">
+            <a:extLst>
+              <a:ext uri="{FF2B5EF4-FFF2-40B4-BE49-F238E27FC236}">
+                <a16:creationId xmlns:a16="http://schemas.microsoft.com/office/drawing/2014/main" id="{798F547A-85B8-4CCC-2E5A-8B50295F08C5}"/>
               </a:ext>
             </a:extLst>
           </p:cNvPr>
@@ -5826,8 +5884,8 @@
         </p:blipFill>
         <p:spPr>
           <a:xfrm>
-            <a:off x="8840898" y="1886640"/>
-            <a:ext cx="942087" cy="942087"/>
+            <a:off x="784415" y="487571"/>
+            <a:ext cx="8123809" cy="3342857"/>
           </a:xfrm>
           <a:prstGeom prst="rect">
             <a:avLst/>
@@ -5836,10 +5894,10 @@
       </p:pic>
       <p:pic>
         <p:nvPicPr>
-          <p:cNvPr id="12" name="Picture 11" descr="A red horse on wheels&#10;&#10;Description automatically generated">
-            <a:extLst>
-              <a:ext uri="{FF2B5EF4-FFF2-40B4-BE49-F238E27FC236}">
-                <a16:creationId xmlns:a16="http://schemas.microsoft.com/office/drawing/2014/main" id="{15DC1F0A-A3B3-BA08-F68E-6FB562AEC7A2}"/>
+          <p:cNvPr id="11" name="Picture 10" descr="A red horse on wheels&#10;&#10;Description automatically generated">
+            <a:extLst>
+              <a:ext uri="{FF2B5EF4-FFF2-40B4-BE49-F238E27FC236}">
+                <a16:creationId xmlns:a16="http://schemas.microsoft.com/office/drawing/2014/main" id="{7D44EF3A-85A3-97B8-8AAB-9092C4103FCC}"/>
               </a:ext>
             </a:extLst>
           </p:cNvPr>
@@ -5849,7 +5907,7 @@
           <p:nvPr/>
         </p:nvPicPr>
         <p:blipFill>
-          <a:blip r:embed="rId3">
+          <a:blip r:embed="rId4">
             <a:extLst>
               <a:ext uri="{28A0092B-C50C-407E-A947-70E740481C1C}">
                 <a14:useLocalDpi xmlns:a14="http://schemas.microsoft.com/office/drawing/2010/main" val="0"/>
@@ -5862,7 +5920,7 @@
         </p:blipFill>
         <p:spPr>
           <a:xfrm>
-            <a:off x="8840898" y="3169691"/>
+            <a:off x="7591218" y="616640"/>
             <a:ext cx="942087" cy="942087"/>
           </a:xfrm>
           <a:prstGeom prst="rect">
@@ -5872,10 +5930,10 @@
       </p:pic>
       <p:pic>
         <p:nvPicPr>
-          <p:cNvPr id="13" name="Picture 12" descr="A red horse on wheels&#10;&#10;Description automatically generated">
-            <a:extLst>
-              <a:ext uri="{FF2B5EF4-FFF2-40B4-BE49-F238E27FC236}">
-                <a16:creationId xmlns:a16="http://schemas.microsoft.com/office/drawing/2014/main" id="{CE80410A-611A-50E1-B7DD-30353C907D35}"/>
+          <p:cNvPr id="12" name="Picture 11" descr="A red horse on wheels&#10;&#10;Description automatically generated">
+            <a:extLst>
+              <a:ext uri="{FF2B5EF4-FFF2-40B4-BE49-F238E27FC236}">
+                <a16:creationId xmlns:a16="http://schemas.microsoft.com/office/drawing/2014/main" id="{15DC1F0A-A3B3-BA08-F68E-6FB562AEC7A2}"/>
               </a:ext>
             </a:extLst>
           </p:cNvPr>
@@ -5885,7 +5943,7 @@
           <p:nvPr/>
         </p:nvPicPr>
         <p:blipFill>
-          <a:blip r:embed="rId3">
+          <a:blip r:embed="rId4">
             <a:extLst>
               <a:ext uri="{28A0092B-C50C-407E-A947-70E740481C1C}">
                 <a14:useLocalDpi xmlns:a14="http://schemas.microsoft.com/office/drawing/2010/main" val="0"/>
@@ -5898,7 +5956,7 @@
         </p:blipFill>
         <p:spPr>
           <a:xfrm>
-            <a:off x="7867496" y="2468078"/>
+            <a:off x="7591218" y="1899691"/>
             <a:ext cx="942087" cy="942087"/>
           </a:xfrm>
           <a:prstGeom prst="rect">
@@ -5908,10 +5966,10 @@
       </p:pic>
       <p:pic>
         <p:nvPicPr>
-          <p:cNvPr id="14" name="Picture 13" descr="A red horse on wheels&#10;&#10;Description automatically generated">
-            <a:extLst>
-              <a:ext uri="{FF2B5EF4-FFF2-40B4-BE49-F238E27FC236}">
-                <a16:creationId xmlns:a16="http://schemas.microsoft.com/office/drawing/2014/main" id="{50C2D75A-21AB-1F81-2738-EB93C84380E6}"/>
+          <p:cNvPr id="13" name="Picture 12" descr="A red horse on wheels&#10;&#10;Description automatically generated">
+            <a:extLst>
+              <a:ext uri="{FF2B5EF4-FFF2-40B4-BE49-F238E27FC236}">
+                <a16:creationId xmlns:a16="http://schemas.microsoft.com/office/drawing/2014/main" id="{CE80410A-611A-50E1-B7DD-30353C907D35}"/>
               </a:ext>
             </a:extLst>
           </p:cNvPr>
@@ -5921,7 +5979,7 @@
           <p:nvPr/>
         </p:nvPicPr>
         <p:blipFill>
-          <a:blip r:embed="rId3">
+          <a:blip r:embed="rId4">
             <a:extLst>
               <a:ext uri="{28A0092B-C50C-407E-A947-70E740481C1C}">
                 <a14:useLocalDpi xmlns:a14="http://schemas.microsoft.com/office/drawing/2010/main" val="0"/>
@@ -5933,8 +5991,8 @@
           </a:stretch>
         </p:blipFill>
         <p:spPr>
-          <a:xfrm flipH="1">
-            <a:off x="2392693" y="1886641"/>
+          <a:xfrm>
+            <a:off x="6617816" y="1198078"/>
             <a:ext cx="942087" cy="942087"/>
           </a:xfrm>
           <a:prstGeom prst="rect">
@@ -5944,10 +6002,10 @@
       </p:pic>
       <p:pic>
         <p:nvPicPr>
-          <p:cNvPr id="15" name="Picture 14" descr="A red horse on wheels&#10;&#10;Description automatically generated">
-            <a:extLst>
-              <a:ext uri="{FF2B5EF4-FFF2-40B4-BE49-F238E27FC236}">
-                <a16:creationId xmlns:a16="http://schemas.microsoft.com/office/drawing/2014/main" id="{3449A035-1A6A-677A-DFEB-FFEFBDCD21BD}"/>
+          <p:cNvPr id="14" name="Picture 13" descr="A red horse on wheels&#10;&#10;Description automatically generated">
+            <a:extLst>
+              <a:ext uri="{FF2B5EF4-FFF2-40B4-BE49-F238E27FC236}">
+                <a16:creationId xmlns:a16="http://schemas.microsoft.com/office/drawing/2014/main" id="{50C2D75A-21AB-1F81-2738-EB93C84380E6}"/>
               </a:ext>
             </a:extLst>
           </p:cNvPr>
@@ -5957,7 +6015,7 @@
           <p:nvPr/>
         </p:nvPicPr>
         <p:blipFill>
-          <a:blip r:embed="rId3">
+          <a:blip r:embed="rId4">
             <a:extLst>
               <a:ext uri="{28A0092B-C50C-407E-A947-70E740481C1C}">
                 <a14:useLocalDpi xmlns:a14="http://schemas.microsoft.com/office/drawing/2010/main" val="0"/>
@@ -5970,7 +6028,7 @@
         </p:blipFill>
         <p:spPr>
           <a:xfrm flipH="1">
-            <a:off x="3334780" y="2425980"/>
+            <a:off x="1143013" y="616641"/>
             <a:ext cx="942087" cy="942087"/>
           </a:xfrm>
           <a:prstGeom prst="rect">
@@ -5980,10 +6038,10 @@
       </p:pic>
       <p:pic>
         <p:nvPicPr>
-          <p:cNvPr id="16" name="Picture 15" descr="A red horse on wheels&#10;&#10;Description automatically generated">
-            <a:extLst>
-              <a:ext uri="{FF2B5EF4-FFF2-40B4-BE49-F238E27FC236}">
-                <a16:creationId xmlns:a16="http://schemas.microsoft.com/office/drawing/2014/main" id="{349D22AC-6231-C7FE-3C20-DCD1F9A263E1}"/>
+          <p:cNvPr id="15" name="Picture 14" descr="A red horse on wheels&#10;&#10;Description automatically generated">
+            <a:extLst>
+              <a:ext uri="{FF2B5EF4-FFF2-40B4-BE49-F238E27FC236}">
+                <a16:creationId xmlns:a16="http://schemas.microsoft.com/office/drawing/2014/main" id="{3449A035-1A6A-677A-DFEB-FFEFBDCD21BD}"/>
               </a:ext>
             </a:extLst>
           </p:cNvPr>
@@ -5993,7 +6051,7 @@
           <p:nvPr/>
         </p:nvPicPr>
         <p:blipFill>
-          <a:blip r:embed="rId3">
+          <a:blip r:embed="rId4">
             <a:extLst>
               <a:ext uri="{28A0092B-C50C-407E-A947-70E740481C1C}">
                 <a14:useLocalDpi xmlns:a14="http://schemas.microsoft.com/office/drawing/2010/main" val="0"/>
@@ -6006,7 +6064,43 @@
         </p:blipFill>
         <p:spPr>
           <a:xfrm flipH="1">
-            <a:off x="2513739" y="3217265"/>
+            <a:off x="2085100" y="1155980"/>
+            <a:ext cx="942087" cy="942087"/>
+          </a:xfrm>
+          <a:prstGeom prst="rect">
+            <a:avLst/>
+          </a:prstGeom>
+        </p:spPr>
+      </p:pic>
+      <p:pic>
+        <p:nvPicPr>
+          <p:cNvPr id="16" name="Picture 15" descr="A red horse on wheels&#10;&#10;Description automatically generated">
+            <a:extLst>
+              <a:ext uri="{FF2B5EF4-FFF2-40B4-BE49-F238E27FC236}">
+                <a16:creationId xmlns:a16="http://schemas.microsoft.com/office/drawing/2014/main" id="{349D22AC-6231-C7FE-3C20-DCD1F9A263E1}"/>
+              </a:ext>
+            </a:extLst>
+          </p:cNvPr>
+          <p:cNvPicPr>
+            <a:picLocks noChangeAspect="1"/>
+          </p:cNvPicPr>
+          <p:nvPr/>
+        </p:nvPicPr>
+        <p:blipFill>
+          <a:blip r:embed="rId4">
+            <a:extLst>
+              <a:ext uri="{28A0092B-C50C-407E-A947-70E740481C1C}">
+                <a14:useLocalDpi xmlns:a14="http://schemas.microsoft.com/office/drawing/2010/main" val="0"/>
+              </a:ext>
+            </a:extLst>
+          </a:blip>
+          <a:stretch>
+            <a:fillRect/>
+          </a:stretch>
+        </p:blipFill>
+        <p:spPr>
+          <a:xfrm flipH="1">
+            <a:off x="1264059" y="1947265"/>
             <a:ext cx="942087" cy="942087"/>
           </a:xfrm>
           <a:prstGeom prst="rect">
@@ -6030,7 +6124,7 @@
         </p:nvCxnSpPr>
         <p:spPr>
           <a:xfrm flipH="1">
-            <a:off x="4011691" y="2897023"/>
+            <a:off x="2762011" y="1627023"/>
             <a:ext cx="615173" cy="0"/>
           </a:xfrm>
           <a:prstGeom prst="line">
@@ -6073,7 +6167,7 @@
         </p:nvCxnSpPr>
         <p:spPr>
           <a:xfrm flipH="1">
-            <a:off x="3010824" y="2357683"/>
+            <a:off x="1761144" y="1087683"/>
             <a:ext cx="1616040" cy="0"/>
           </a:xfrm>
           <a:prstGeom prst="line">
@@ -6116,7 +6210,7 @@
         </p:nvCxnSpPr>
         <p:spPr>
           <a:xfrm flipH="1">
-            <a:off x="3203671" y="3640735"/>
+            <a:off x="1953991" y="2370735"/>
             <a:ext cx="1616040" cy="0"/>
           </a:xfrm>
           <a:prstGeom prst="line">
@@ -6159,7 +6253,7 @@
         </p:nvCxnSpPr>
         <p:spPr>
           <a:xfrm flipH="1">
-            <a:off x="7496664" y="2357683"/>
+            <a:off x="6246984" y="1087683"/>
             <a:ext cx="1616040" cy="0"/>
           </a:xfrm>
           <a:prstGeom prst="line">
@@ -6202,7 +6296,7 @@
         </p:nvCxnSpPr>
         <p:spPr>
           <a:xfrm flipH="1">
-            <a:off x="7496664" y="2907406"/>
+            <a:off x="6246984" y="1637406"/>
             <a:ext cx="615173" cy="0"/>
           </a:xfrm>
           <a:prstGeom prst="line">
@@ -6245,7 +6339,7 @@
         </p:nvCxnSpPr>
         <p:spPr>
           <a:xfrm flipH="1">
-            <a:off x="7496664" y="3599642"/>
+            <a:off x="6246984" y="2329642"/>
             <a:ext cx="1616040" cy="0"/>
           </a:xfrm>
           <a:prstGeom prst="line">
@@ -6272,6 +6366,42 @@
           </a:fontRef>
         </p:style>
       </p:cxnSp>
+      <p:pic>
+        <p:nvPicPr>
+          <p:cNvPr id="3" name="Picture 2" descr="A dog with a shield and eye&#10;&#10;Description automatically generated">
+            <a:extLst>
+              <a:ext uri="{FF2B5EF4-FFF2-40B4-BE49-F238E27FC236}">
+                <a16:creationId xmlns:a16="http://schemas.microsoft.com/office/drawing/2014/main" id="{F3016ED1-F2A8-01B5-B3C0-B2D4DF217F32}"/>
+              </a:ext>
+            </a:extLst>
+          </p:cNvPr>
+          <p:cNvPicPr>
+            <a:picLocks noChangeAspect="1"/>
+          </p:cNvPicPr>
+          <p:nvPr/>
+        </p:nvPicPr>
+        <p:blipFill>
+          <a:blip r:embed="rId5">
+            <a:extLst>
+              <a:ext uri="{28A0092B-C50C-407E-A947-70E740481C1C}">
+                <a14:useLocalDpi xmlns:a14="http://schemas.microsoft.com/office/drawing/2010/main" val="0"/>
+              </a:ext>
+            </a:extLst>
+          </a:blip>
+          <a:stretch>
+            <a:fillRect/>
+          </a:stretch>
+        </p:blipFill>
+        <p:spPr>
+          <a:xfrm>
+            <a:off x="2762011" y="4574139"/>
+            <a:ext cx="2419589" cy="2131074"/>
+          </a:xfrm>
+          <a:prstGeom prst="rect">
+            <a:avLst/>
+          </a:prstGeom>
+        </p:spPr>
+      </p:pic>
     </p:spTree>
     <p:extLst>
       <p:ext uri="{BB962C8B-B14F-4D97-AF65-F5344CB8AC3E}">
@@ -10216,6 +10346,86 @@
     <p:extLst>
       <p:ext uri="{BB962C8B-B14F-4D97-AF65-F5344CB8AC3E}">
         <p14:creationId xmlns:p14="http://schemas.microsoft.com/office/powerpoint/2010/main" val="1629007476"/>
+      </p:ext>
+    </p:extLst>
+  </p:cSld>
+  <p:clrMapOvr>
+    <a:masterClrMapping/>
+  </p:clrMapOvr>
+</p:sld>
+</file>
+
+<file path=ppt/slides/slide13.xml><?xml version="1.0" encoding="utf-8"?>
+<p:sld xmlns:a="http://schemas.openxmlformats.org/drawingml/2006/main" xmlns:r="http://schemas.openxmlformats.org/officeDocument/2006/relationships" xmlns:p="http://schemas.openxmlformats.org/presentationml/2006/main">
+  <p:cSld>
+    <p:spTree>
+      <p:nvGrpSpPr>
+        <p:cNvPr id="1" name=""/>
+        <p:cNvGrpSpPr/>
+        <p:nvPr/>
+      </p:nvGrpSpPr>
+      <p:grpSpPr>
+        <a:xfrm>
+          <a:off x="0" y="0"/>
+          <a:ext cx="0" cy="0"/>
+          <a:chOff x="0" y="0"/>
+          <a:chExt cx="0" cy="0"/>
+        </a:xfrm>
+      </p:grpSpPr>
+      <p:sp>
+        <p:nvSpPr>
+          <p:cNvPr id="2" name="Title 1">
+            <a:extLst>
+              <a:ext uri="{FF2B5EF4-FFF2-40B4-BE49-F238E27FC236}">
+                <a16:creationId xmlns:a16="http://schemas.microsoft.com/office/drawing/2014/main" id="{6180A1AA-66D5-29F8-1A75-D4D596DAA791}"/>
+              </a:ext>
+            </a:extLst>
+          </p:cNvPr>
+          <p:cNvSpPr>
+            <a:spLocks noGrp="1"/>
+          </p:cNvSpPr>
+          <p:nvPr>
+            <p:ph type="title"/>
+          </p:nvPr>
+        </p:nvSpPr>
+        <p:spPr/>
+        <p:txBody>
+          <a:bodyPr/>
+          <a:lstStyle/>
+          <a:p>
+            <a:endParaRPr lang="en-SG"/>
+          </a:p>
+        </p:txBody>
+      </p:sp>
+      <p:sp>
+        <p:nvSpPr>
+          <p:cNvPr id="3" name="Content Placeholder 2">
+            <a:extLst>
+              <a:ext uri="{FF2B5EF4-FFF2-40B4-BE49-F238E27FC236}">
+                <a16:creationId xmlns:a16="http://schemas.microsoft.com/office/drawing/2014/main" id="{344F3D58-B778-A426-75DE-1507D985A9D0}"/>
+              </a:ext>
+            </a:extLst>
+          </p:cNvPr>
+          <p:cNvSpPr>
+            <a:spLocks noGrp="1"/>
+          </p:cNvSpPr>
+          <p:nvPr>
+            <p:ph idx="1"/>
+          </p:nvPr>
+        </p:nvSpPr>
+        <p:spPr/>
+        <p:txBody>
+          <a:bodyPr/>
+          <a:lstStyle/>
+          <a:p>
+            <a:endParaRPr lang="en-SG" dirty="0"/>
+          </a:p>
+        </p:txBody>
+      </p:sp>
+    </p:spTree>
+    <p:extLst>
+      <p:ext uri="{BB962C8B-B14F-4D97-AF65-F5344CB8AC3E}">
+        <p14:creationId xmlns:p14="http://schemas.microsoft.com/office/powerpoint/2010/main" val="3098780687"/>
       </p:ext>
     </p:extLst>
   </p:cSld>

</xml_diff>

<commit_message>
Added the C2 server emulator flask main program.
</commit_message>
<xml_diff>
--- a/doc/designDoc.pptx
+++ b/doc/designDoc.pptx
@@ -2093,7 +2093,7 @@
           <a:p>
             <a:fld id="{30462BEA-6C65-41CB-B521-7C9DB089D720}" type="datetimeFigureOut">
               <a:rPr lang="en-SG" smtClean="0"/>
-              <a:t>1/12/2023</a:t>
+              <a:t>13/12/2023</a:t>
             </a:fld>
             <a:endParaRPr lang="en-SG"/>
           </a:p>
@@ -2678,7 +2678,7 @@
           <a:p>
             <a:fld id="{435F7F91-36DA-4AC3-B0AA-56077EB606D8}" type="datetimeFigureOut">
               <a:rPr lang="en-SG" smtClean="0"/>
-              <a:t>1/12/2023</a:t>
+              <a:t>13/12/2023</a:t>
             </a:fld>
             <a:endParaRPr lang="en-SG"/>
           </a:p>
@@ -2878,7 +2878,7 @@
           <a:p>
             <a:fld id="{435F7F91-36DA-4AC3-B0AA-56077EB606D8}" type="datetimeFigureOut">
               <a:rPr lang="en-SG" smtClean="0"/>
-              <a:t>1/12/2023</a:t>
+              <a:t>13/12/2023</a:t>
             </a:fld>
             <a:endParaRPr lang="en-SG"/>
           </a:p>
@@ -3088,7 +3088,7 @@
           <a:p>
             <a:fld id="{435F7F91-36DA-4AC3-B0AA-56077EB606D8}" type="datetimeFigureOut">
               <a:rPr lang="en-SG" smtClean="0"/>
-              <a:t>1/12/2023</a:t>
+              <a:t>13/12/2023</a:t>
             </a:fld>
             <a:endParaRPr lang="en-SG"/>
           </a:p>
@@ -3288,7 +3288,7 @@
           <a:p>
             <a:fld id="{435F7F91-36DA-4AC3-B0AA-56077EB606D8}" type="datetimeFigureOut">
               <a:rPr lang="en-SG" smtClean="0"/>
-              <a:t>1/12/2023</a:t>
+              <a:t>13/12/2023</a:t>
             </a:fld>
             <a:endParaRPr lang="en-SG"/>
           </a:p>
@@ -3564,7 +3564,7 @@
           <a:p>
             <a:fld id="{435F7F91-36DA-4AC3-B0AA-56077EB606D8}" type="datetimeFigureOut">
               <a:rPr lang="en-SG" smtClean="0"/>
-              <a:t>1/12/2023</a:t>
+              <a:t>13/12/2023</a:t>
             </a:fld>
             <a:endParaRPr lang="en-SG"/>
           </a:p>
@@ -3832,7 +3832,7 @@
           <a:p>
             <a:fld id="{435F7F91-36DA-4AC3-B0AA-56077EB606D8}" type="datetimeFigureOut">
               <a:rPr lang="en-SG" smtClean="0"/>
-              <a:t>1/12/2023</a:t>
+              <a:t>13/12/2023</a:t>
             </a:fld>
             <a:endParaRPr lang="en-SG"/>
           </a:p>
@@ -4247,7 +4247,7 @@
           <a:p>
             <a:fld id="{435F7F91-36DA-4AC3-B0AA-56077EB606D8}" type="datetimeFigureOut">
               <a:rPr lang="en-SG" smtClean="0"/>
-              <a:t>1/12/2023</a:t>
+              <a:t>13/12/2023</a:t>
             </a:fld>
             <a:endParaRPr lang="en-SG"/>
           </a:p>
@@ -4389,7 +4389,7 @@
           <a:p>
             <a:fld id="{435F7F91-36DA-4AC3-B0AA-56077EB606D8}" type="datetimeFigureOut">
               <a:rPr lang="en-SG" smtClean="0"/>
-              <a:t>1/12/2023</a:t>
+              <a:t>13/12/2023</a:t>
             </a:fld>
             <a:endParaRPr lang="en-SG"/>
           </a:p>
@@ -4502,7 +4502,7 @@
           <a:p>
             <a:fld id="{435F7F91-36DA-4AC3-B0AA-56077EB606D8}" type="datetimeFigureOut">
               <a:rPr lang="en-SG" smtClean="0"/>
-              <a:t>1/12/2023</a:t>
+              <a:t>13/12/2023</a:t>
             </a:fld>
             <a:endParaRPr lang="en-SG"/>
           </a:p>
@@ -4815,7 +4815,7 @@
           <a:p>
             <a:fld id="{435F7F91-36DA-4AC3-B0AA-56077EB606D8}" type="datetimeFigureOut">
               <a:rPr lang="en-SG" smtClean="0"/>
-              <a:t>1/12/2023</a:t>
+              <a:t>13/12/2023</a:t>
             </a:fld>
             <a:endParaRPr lang="en-SG"/>
           </a:p>
@@ -5104,7 +5104,7 @@
           <a:p>
             <a:fld id="{435F7F91-36DA-4AC3-B0AA-56077EB606D8}" type="datetimeFigureOut">
               <a:rPr lang="en-SG" smtClean="0"/>
-              <a:t>1/12/2023</a:t>
+              <a:t>13/12/2023</a:t>
             </a:fld>
             <a:endParaRPr lang="en-SG"/>
           </a:p>
@@ -5347,7 +5347,7 @@
           <a:p>
             <a:fld id="{435F7F91-36DA-4AC3-B0AA-56077EB606D8}" type="datetimeFigureOut">
               <a:rPr lang="en-SG" smtClean="0"/>
-              <a:t>1/12/2023</a:t>
+              <a:t>13/12/2023</a:t>
             </a:fld>
             <a:endParaRPr lang="en-SG"/>
           </a:p>
@@ -6401,6 +6401,42 @@
           <a:prstGeom prst="rect">
             <a:avLst/>
           </a:prstGeom>
+        </p:spPr>
+      </p:pic>
+      <p:pic>
+        <p:nvPicPr>
+          <p:cNvPr id="6" name="Picture 5">
+            <a:extLst>
+              <a:ext uri="{FF2B5EF4-FFF2-40B4-BE49-F238E27FC236}">
+                <a16:creationId xmlns:a16="http://schemas.microsoft.com/office/drawing/2014/main" id="{7E4E2267-B76A-4432-F33F-B4D17222D9C2}"/>
+              </a:ext>
+            </a:extLst>
+          </p:cNvPr>
+          <p:cNvPicPr>
+            <a:picLocks noChangeAspect="1"/>
+          </p:cNvPicPr>
+          <p:nvPr/>
+        </p:nvPicPr>
+        <p:blipFill>
+          <a:blip r:embed="rId6"/>
+          <a:stretch>
+            <a:fillRect/>
+          </a:stretch>
+        </p:blipFill>
+        <p:spPr>
+          <a:xfrm>
+            <a:off x="6862157" y="4812948"/>
+            <a:ext cx="2692398" cy="1238893"/>
+          </a:xfrm>
+          <a:prstGeom prst="rect">
+            <a:avLst/>
+          </a:prstGeom>
+          <a:ln w="28575">
+            <a:solidFill>
+              <a:srgbClr val="FF0000"/>
+            </a:solidFill>
+            <a:prstDash val="sysDash"/>
+          </a:ln>
         </p:spPr>
       </p:pic>
     </p:spTree>

</xml_diff>

<commit_message>
Update the C2 emulator readme file.
</commit_message>
<xml_diff>
--- a/doc/designDoc.pptx
+++ b/doc/designDoc.pptx
@@ -37234,6 +37234,2922 @@
           <a:chExt cx="0" cy="0"/>
         </a:xfrm>
       </p:grpSpPr>
+      <p:sp>
+        <p:nvSpPr>
+          <p:cNvPr id="4" name="Rectangle 3">
+            <a:extLst>
+              <a:ext uri="{FF2B5EF4-FFF2-40B4-BE49-F238E27FC236}">
+                <a16:creationId xmlns:a16="http://schemas.microsoft.com/office/drawing/2014/main" id="{8CC5EA39-26C4-1D07-F972-85F76A5CED9B}"/>
+              </a:ext>
+            </a:extLst>
+          </p:cNvPr>
+          <p:cNvSpPr/>
+          <p:nvPr/>
+        </p:nvSpPr>
+        <p:spPr>
+          <a:xfrm>
+            <a:off x="4638942" y="1662155"/>
+            <a:ext cx="1030338" cy="276999"/>
+          </a:xfrm>
+          <a:prstGeom prst="rect">
+            <a:avLst/>
+          </a:prstGeom>
+          <a:solidFill>
+            <a:schemeClr val="accent6">
+              <a:lumMod val="75000"/>
+            </a:schemeClr>
+          </a:solidFill>
+        </p:spPr>
+        <p:style>
+          <a:lnRef idx="2">
+            <a:schemeClr val="accent1">
+              <a:shade val="50000"/>
+            </a:schemeClr>
+          </a:lnRef>
+          <a:fillRef idx="1">
+            <a:schemeClr val="accent1"/>
+          </a:fillRef>
+          <a:effectRef idx="0">
+            <a:schemeClr val="accent1"/>
+          </a:effectRef>
+          <a:fontRef idx="minor">
+            <a:schemeClr val="lt1"/>
+          </a:fontRef>
+        </p:style>
+        <p:txBody>
+          <a:bodyPr rtlCol="0" anchor="ctr"/>
+          <a:lstStyle/>
+          <a:p>
+            <a:r>
+              <a:rPr lang="en-US" sz="1100" b="1" dirty="0"/>
+              <a:t>RTC2 </a:t>
+            </a:r>
+            <a:r>
+              <a:rPr lang="en-US" sz="1100" b="1" dirty="0" err="1"/>
+              <a:t>init</a:t>
+            </a:r>
+            <a:r>
+              <a:rPr lang="en-US" sz="1100" b="1" dirty="0"/>
+              <a:t> start </a:t>
+            </a:r>
+            <a:endParaRPr lang="en-SG" sz="1100" b="1" dirty="0"/>
+          </a:p>
+        </p:txBody>
+      </p:sp>
+      <p:sp>
+        <p:nvSpPr>
+          <p:cNvPr id="5" name="TextBox 4">
+            <a:extLst>
+              <a:ext uri="{FF2B5EF4-FFF2-40B4-BE49-F238E27FC236}">
+                <a16:creationId xmlns:a16="http://schemas.microsoft.com/office/drawing/2014/main" id="{12724B68-1BFA-EC4F-3376-6C767C081183}"/>
+              </a:ext>
+            </a:extLst>
+          </p:cNvPr>
+          <p:cNvSpPr txBox="1"/>
+          <p:nvPr/>
+        </p:nvSpPr>
+        <p:spPr>
+          <a:xfrm>
+            <a:off x="4481978" y="1215689"/>
+            <a:ext cx="1925097" cy="276999"/>
+          </a:xfrm>
+          <a:prstGeom prst="rect">
+            <a:avLst/>
+          </a:prstGeom>
+          <a:noFill/>
+        </p:spPr>
+        <p:txBody>
+          <a:bodyPr wrap="square" rtlCol="0">
+            <a:spAutoFit/>
+          </a:bodyPr>
+          <a:lstStyle/>
+          <a:p>
+            <a:r>
+              <a:rPr lang="en-US" sz="1200" b="1" dirty="0">
+                <a:solidFill>
+                  <a:schemeClr val="accent6">
+                    <a:lumMod val="75000"/>
+                  </a:schemeClr>
+                </a:solidFill>
+              </a:rPr>
+              <a:t>RTC2 App workflow </a:t>
+            </a:r>
+            <a:endParaRPr lang="en-SG" sz="1200" b="1" dirty="0">
+              <a:solidFill>
+                <a:schemeClr val="accent6">
+                  <a:lumMod val="75000"/>
+                </a:schemeClr>
+              </a:solidFill>
+            </a:endParaRPr>
+          </a:p>
+        </p:txBody>
+      </p:sp>
+      <p:cxnSp>
+        <p:nvCxnSpPr>
+          <p:cNvPr id="6" name="Straight Arrow Connector 5">
+            <a:extLst>
+              <a:ext uri="{FF2B5EF4-FFF2-40B4-BE49-F238E27FC236}">
+                <a16:creationId xmlns:a16="http://schemas.microsoft.com/office/drawing/2014/main" id="{E756366A-71D4-7220-AFE0-E65E1D76931D}"/>
+              </a:ext>
+            </a:extLst>
+          </p:cNvPr>
+          <p:cNvCxnSpPr>
+            <a:cxnSpLocks/>
+            <a:endCxn id="11" idx="0"/>
+          </p:cNvCxnSpPr>
+          <p:nvPr/>
+        </p:nvCxnSpPr>
+        <p:spPr>
+          <a:xfrm>
+            <a:off x="5259262" y="1967374"/>
+            <a:ext cx="1" cy="886117"/>
+          </a:xfrm>
+          <a:prstGeom prst="straightConnector1">
+            <a:avLst/>
+          </a:prstGeom>
+          <a:ln w="19050">
+            <a:solidFill>
+              <a:schemeClr val="accent6">
+                <a:lumMod val="50000"/>
+              </a:schemeClr>
+            </a:solidFill>
+            <a:tailEnd type="triangle"/>
+          </a:ln>
+        </p:spPr>
+        <p:style>
+          <a:lnRef idx="1">
+            <a:schemeClr val="accent1"/>
+          </a:lnRef>
+          <a:fillRef idx="0">
+            <a:schemeClr val="accent1"/>
+          </a:fillRef>
+          <a:effectRef idx="0">
+            <a:schemeClr val="accent1"/>
+          </a:effectRef>
+          <a:fontRef idx="minor">
+            <a:schemeClr val="tx1"/>
+          </a:fontRef>
+        </p:style>
+      </p:cxnSp>
+      <p:sp>
+        <p:nvSpPr>
+          <p:cNvPr id="7" name="TextBox 6">
+            <a:extLst>
+              <a:ext uri="{FF2B5EF4-FFF2-40B4-BE49-F238E27FC236}">
+                <a16:creationId xmlns:a16="http://schemas.microsoft.com/office/drawing/2014/main" id="{BDD562BF-1F95-5C9A-3F56-6F9A65C24976}"/>
+              </a:ext>
+            </a:extLst>
+          </p:cNvPr>
+          <p:cNvSpPr txBox="1"/>
+          <p:nvPr/>
+        </p:nvSpPr>
+        <p:spPr>
+          <a:xfrm>
+            <a:off x="4356544" y="2017437"/>
+            <a:ext cx="1023748" cy="261610"/>
+          </a:xfrm>
+          <a:prstGeom prst="rect">
+            <a:avLst/>
+          </a:prstGeom>
+          <a:noFill/>
+        </p:spPr>
+        <p:txBody>
+          <a:bodyPr wrap="square" rtlCol="0">
+            <a:spAutoFit/>
+          </a:bodyPr>
+          <a:lstStyle/>
+          <a:p>
+            <a:r>
+              <a:rPr lang="en-SG" sz="1100" dirty="0"/>
+              <a:t>Main thread</a:t>
+            </a:r>
+          </a:p>
+        </p:txBody>
+      </p:sp>
+      <p:sp>
+        <p:nvSpPr>
+          <p:cNvPr id="11" name="Rectangle 10">
+            <a:extLst>
+              <a:ext uri="{FF2B5EF4-FFF2-40B4-BE49-F238E27FC236}">
+                <a16:creationId xmlns:a16="http://schemas.microsoft.com/office/drawing/2014/main" id="{27A1EC62-96D9-C7CF-22E6-4D19DA057C05}"/>
+              </a:ext>
+            </a:extLst>
+          </p:cNvPr>
+          <p:cNvSpPr/>
+          <p:nvPr/>
+        </p:nvSpPr>
+        <p:spPr>
+          <a:xfrm>
+            <a:off x="4657229" y="2853491"/>
+            <a:ext cx="1204067" cy="332880"/>
+          </a:xfrm>
+          <a:prstGeom prst="rect">
+            <a:avLst/>
+          </a:prstGeom>
+          <a:solidFill>
+            <a:schemeClr val="accent6">
+              <a:lumMod val="75000"/>
+            </a:schemeClr>
+          </a:solidFill>
+        </p:spPr>
+        <p:style>
+          <a:lnRef idx="2">
+            <a:schemeClr val="accent1">
+              <a:shade val="50000"/>
+            </a:schemeClr>
+          </a:lnRef>
+          <a:fillRef idx="1">
+            <a:schemeClr val="accent1"/>
+          </a:fillRef>
+          <a:effectRef idx="0">
+            <a:schemeClr val="accent1"/>
+          </a:effectRef>
+          <a:fontRef idx="minor">
+            <a:schemeClr val="lt1"/>
+          </a:fontRef>
+        </p:style>
+        <p:txBody>
+          <a:bodyPr rtlCol="0" anchor="ctr"/>
+          <a:lstStyle/>
+          <a:p>
+            <a:r>
+              <a:rPr lang="en-US" sz="1100" b="1" dirty="0"/>
+              <a:t>Flask web host</a:t>
+            </a:r>
+            <a:endParaRPr lang="en-SG" sz="1100" b="1" dirty="0"/>
+          </a:p>
+        </p:txBody>
+      </p:sp>
+      <p:sp>
+        <p:nvSpPr>
+          <p:cNvPr id="13" name="Rectangle 12">
+            <a:extLst>
+              <a:ext uri="{FF2B5EF4-FFF2-40B4-BE49-F238E27FC236}">
+                <a16:creationId xmlns:a16="http://schemas.microsoft.com/office/drawing/2014/main" id="{9790E957-7530-0434-F764-A9FFD8B666C0}"/>
+              </a:ext>
+            </a:extLst>
+          </p:cNvPr>
+          <p:cNvSpPr/>
+          <p:nvPr/>
+        </p:nvSpPr>
+        <p:spPr>
+          <a:xfrm>
+            <a:off x="2626920" y="3515194"/>
+            <a:ext cx="1201824" cy="404821"/>
+          </a:xfrm>
+          <a:prstGeom prst="rect">
+            <a:avLst/>
+          </a:prstGeom>
+          <a:solidFill>
+            <a:schemeClr val="accent6">
+              <a:lumMod val="75000"/>
+            </a:schemeClr>
+          </a:solidFill>
+        </p:spPr>
+        <p:style>
+          <a:lnRef idx="2">
+            <a:schemeClr val="accent1">
+              <a:shade val="50000"/>
+            </a:schemeClr>
+          </a:lnRef>
+          <a:fillRef idx="1">
+            <a:schemeClr val="accent1"/>
+          </a:fillRef>
+          <a:effectRef idx="0">
+            <a:schemeClr val="accent1"/>
+          </a:effectRef>
+          <a:fontRef idx="minor">
+            <a:schemeClr val="lt1"/>
+          </a:fontRef>
+        </p:style>
+        <p:txBody>
+          <a:bodyPr rtlCol="0" anchor="ctr"/>
+          <a:lstStyle/>
+          <a:p>
+            <a:r>
+              <a:rPr lang="en-US" sz="1100" b="1" dirty="0"/>
+              <a:t>User Web control handler API</a:t>
+            </a:r>
+            <a:endParaRPr lang="en-SG" sz="1100" b="1" dirty="0"/>
+          </a:p>
+        </p:txBody>
+      </p:sp>
+      <p:sp>
+        <p:nvSpPr>
+          <p:cNvPr id="14" name="Rectangle 13">
+            <a:extLst>
+              <a:ext uri="{FF2B5EF4-FFF2-40B4-BE49-F238E27FC236}">
+                <a16:creationId xmlns:a16="http://schemas.microsoft.com/office/drawing/2014/main" id="{5FA3A377-5612-2E64-5FAA-DD679B24B9B9}"/>
+              </a:ext>
+            </a:extLst>
+          </p:cNvPr>
+          <p:cNvSpPr/>
+          <p:nvPr/>
+        </p:nvSpPr>
+        <p:spPr>
+          <a:xfrm>
+            <a:off x="2626920" y="4419126"/>
+            <a:ext cx="1201824" cy="404821"/>
+          </a:xfrm>
+          <a:prstGeom prst="rect">
+            <a:avLst/>
+          </a:prstGeom>
+          <a:solidFill>
+            <a:schemeClr val="accent6">
+              <a:lumMod val="75000"/>
+            </a:schemeClr>
+          </a:solidFill>
+        </p:spPr>
+        <p:style>
+          <a:lnRef idx="2">
+            <a:schemeClr val="accent1">
+              <a:shade val="50000"/>
+            </a:schemeClr>
+          </a:lnRef>
+          <a:fillRef idx="1">
+            <a:schemeClr val="accent1"/>
+          </a:fillRef>
+          <a:effectRef idx="0">
+            <a:schemeClr val="accent1"/>
+          </a:effectRef>
+          <a:fontRef idx="minor">
+            <a:schemeClr val="lt1"/>
+          </a:fontRef>
+        </p:style>
+        <p:txBody>
+          <a:bodyPr rtlCol="0" anchor="ctr"/>
+          <a:lstStyle/>
+          <a:p>
+            <a:r>
+              <a:rPr lang="en-US" sz="1100" b="1" dirty="0"/>
+              <a:t>Program control handler API</a:t>
+            </a:r>
+            <a:endParaRPr lang="en-SG" sz="1100" b="1" dirty="0"/>
+          </a:p>
+        </p:txBody>
+      </p:sp>
+      <p:cxnSp>
+        <p:nvCxnSpPr>
+          <p:cNvPr id="16" name="Connector: Elbow 15">
+            <a:extLst>
+              <a:ext uri="{FF2B5EF4-FFF2-40B4-BE49-F238E27FC236}">
+                <a16:creationId xmlns:a16="http://schemas.microsoft.com/office/drawing/2014/main" id="{2C3101D9-36CE-3CE7-075E-043BF48613BD}"/>
+              </a:ext>
+            </a:extLst>
+          </p:cNvPr>
+          <p:cNvCxnSpPr>
+            <a:cxnSpLocks/>
+            <a:stCxn id="11" idx="2"/>
+            <a:endCxn id="13" idx="3"/>
+          </p:cNvCxnSpPr>
+          <p:nvPr/>
+        </p:nvCxnSpPr>
+        <p:spPr>
+          <a:xfrm rot="5400000">
+            <a:off x="4278387" y="2736729"/>
+            <a:ext cx="531234" cy="1430519"/>
+          </a:xfrm>
+          <a:prstGeom prst="bentConnector2">
+            <a:avLst/>
+          </a:prstGeom>
+          <a:ln w="19050">
+            <a:tailEnd type="triangle"/>
+          </a:ln>
+        </p:spPr>
+        <p:style>
+          <a:lnRef idx="1">
+            <a:schemeClr val="dk1"/>
+          </a:lnRef>
+          <a:fillRef idx="0">
+            <a:schemeClr val="dk1"/>
+          </a:fillRef>
+          <a:effectRef idx="0">
+            <a:schemeClr val="dk1"/>
+          </a:effectRef>
+          <a:fontRef idx="minor">
+            <a:schemeClr val="tx1"/>
+          </a:fontRef>
+        </p:style>
+      </p:cxnSp>
+      <p:cxnSp>
+        <p:nvCxnSpPr>
+          <p:cNvPr id="17" name="Connector: Elbow 16">
+            <a:extLst>
+              <a:ext uri="{FF2B5EF4-FFF2-40B4-BE49-F238E27FC236}">
+                <a16:creationId xmlns:a16="http://schemas.microsoft.com/office/drawing/2014/main" id="{71837199-F80F-8192-2A10-8DD326D04CF0}"/>
+              </a:ext>
+            </a:extLst>
+          </p:cNvPr>
+          <p:cNvCxnSpPr>
+            <a:cxnSpLocks/>
+            <a:stCxn id="11" idx="2"/>
+            <a:endCxn id="14" idx="3"/>
+          </p:cNvCxnSpPr>
+          <p:nvPr/>
+        </p:nvCxnSpPr>
+        <p:spPr>
+          <a:xfrm rot="5400000">
+            <a:off x="3826421" y="3188695"/>
+            <a:ext cx="1435166" cy="1430519"/>
+          </a:xfrm>
+          <a:prstGeom prst="bentConnector2">
+            <a:avLst/>
+          </a:prstGeom>
+          <a:ln w="19050">
+            <a:tailEnd type="triangle"/>
+          </a:ln>
+        </p:spPr>
+        <p:style>
+          <a:lnRef idx="1">
+            <a:schemeClr val="dk1"/>
+          </a:lnRef>
+          <a:fillRef idx="0">
+            <a:schemeClr val="dk1"/>
+          </a:fillRef>
+          <a:effectRef idx="0">
+            <a:schemeClr val="dk1"/>
+          </a:effectRef>
+          <a:fontRef idx="minor">
+            <a:schemeClr val="tx1"/>
+          </a:fontRef>
+        </p:style>
+      </p:cxnSp>
+      <p:sp>
+        <p:nvSpPr>
+          <p:cNvPr id="23" name="Rectangle 22">
+            <a:extLst>
+              <a:ext uri="{FF2B5EF4-FFF2-40B4-BE49-F238E27FC236}">
+                <a16:creationId xmlns:a16="http://schemas.microsoft.com/office/drawing/2014/main" id="{C49D2632-CEC2-5180-DC4F-4C818D2722F5}"/>
+              </a:ext>
+            </a:extLst>
+          </p:cNvPr>
+          <p:cNvSpPr/>
+          <p:nvPr/>
+        </p:nvSpPr>
+        <p:spPr>
+          <a:xfrm>
+            <a:off x="6906676" y="5196365"/>
+            <a:ext cx="1652185" cy="404821"/>
+          </a:xfrm>
+          <a:prstGeom prst="rect">
+            <a:avLst/>
+          </a:prstGeom>
+          <a:solidFill>
+            <a:schemeClr val="accent6">
+              <a:lumMod val="75000"/>
+            </a:schemeClr>
+          </a:solidFill>
+        </p:spPr>
+        <p:style>
+          <a:lnRef idx="2">
+            <a:schemeClr val="accent1">
+              <a:shade val="50000"/>
+            </a:schemeClr>
+          </a:lnRef>
+          <a:fillRef idx="1">
+            <a:schemeClr val="accent1"/>
+          </a:fillRef>
+          <a:effectRef idx="0">
+            <a:schemeClr val="accent1"/>
+          </a:effectRef>
+          <a:fontRef idx="minor">
+            <a:schemeClr val="lt1"/>
+          </a:fontRef>
+        </p:style>
+        <p:txBody>
+          <a:bodyPr rtlCol="0" anchor="ctr"/>
+          <a:lstStyle/>
+          <a:p>
+            <a:r>
+              <a:rPr lang="en-US" sz="1100" b="1" dirty="0"/>
+              <a:t>Malware communication handler API</a:t>
+            </a:r>
+            <a:endParaRPr lang="en-SG" sz="1100" b="1" dirty="0"/>
+          </a:p>
+        </p:txBody>
+      </p:sp>
+      <p:cxnSp>
+        <p:nvCxnSpPr>
+          <p:cNvPr id="24" name="Connector: Elbow 23">
+            <a:extLst>
+              <a:ext uri="{FF2B5EF4-FFF2-40B4-BE49-F238E27FC236}">
+                <a16:creationId xmlns:a16="http://schemas.microsoft.com/office/drawing/2014/main" id="{D5B6A5FA-A3E2-CBCB-1354-19640805192F}"/>
+              </a:ext>
+            </a:extLst>
+          </p:cNvPr>
+          <p:cNvCxnSpPr>
+            <a:cxnSpLocks/>
+            <a:stCxn id="11" idx="2"/>
+            <a:endCxn id="23" idx="1"/>
+          </p:cNvCxnSpPr>
+          <p:nvPr/>
+        </p:nvCxnSpPr>
+        <p:spPr>
+          <a:xfrm rot="16200000" flipH="1">
+            <a:off x="4976767" y="3468866"/>
+            <a:ext cx="2212405" cy="1647413"/>
+          </a:xfrm>
+          <a:prstGeom prst="bentConnector2">
+            <a:avLst/>
+          </a:prstGeom>
+          <a:ln w="19050">
+            <a:tailEnd type="triangle"/>
+          </a:ln>
+        </p:spPr>
+        <p:style>
+          <a:lnRef idx="1">
+            <a:schemeClr val="dk1"/>
+          </a:lnRef>
+          <a:fillRef idx="0">
+            <a:schemeClr val="dk1"/>
+          </a:fillRef>
+          <a:effectRef idx="0">
+            <a:schemeClr val="dk1"/>
+          </a:effectRef>
+          <a:fontRef idx="minor">
+            <a:schemeClr val="tx1"/>
+          </a:fontRef>
+        </p:style>
+      </p:cxnSp>
+      <p:cxnSp>
+        <p:nvCxnSpPr>
+          <p:cNvPr id="30" name="Connector: Elbow 29">
+            <a:extLst>
+              <a:ext uri="{FF2B5EF4-FFF2-40B4-BE49-F238E27FC236}">
+                <a16:creationId xmlns:a16="http://schemas.microsoft.com/office/drawing/2014/main" id="{4F8BB537-5E3F-0CDA-EC2A-F48BE47D533A}"/>
+              </a:ext>
+            </a:extLst>
+          </p:cNvPr>
+          <p:cNvCxnSpPr>
+            <a:cxnSpLocks/>
+          </p:cNvCxnSpPr>
+          <p:nvPr/>
+        </p:nvCxnSpPr>
+        <p:spPr>
+          <a:xfrm>
+            <a:off x="5274900" y="2397648"/>
+            <a:ext cx="1234104" cy="1153516"/>
+          </a:xfrm>
+          <a:prstGeom prst="bentConnector3">
+            <a:avLst>
+              <a:gd name="adj1" fmla="val 100384"/>
+            </a:avLst>
+          </a:prstGeom>
+          <a:ln>
+            <a:tailEnd type="triangle"/>
+          </a:ln>
+        </p:spPr>
+        <p:style>
+          <a:lnRef idx="1">
+            <a:schemeClr val="dk1"/>
+          </a:lnRef>
+          <a:fillRef idx="0">
+            <a:schemeClr val="dk1"/>
+          </a:fillRef>
+          <a:effectRef idx="0">
+            <a:schemeClr val="dk1"/>
+          </a:effectRef>
+          <a:fontRef idx="minor">
+            <a:schemeClr val="tx1"/>
+          </a:fontRef>
+        </p:style>
+      </p:cxnSp>
+      <p:cxnSp>
+        <p:nvCxnSpPr>
+          <p:cNvPr id="37" name="Connector: Elbow 36">
+            <a:extLst>
+              <a:ext uri="{FF2B5EF4-FFF2-40B4-BE49-F238E27FC236}">
+                <a16:creationId xmlns:a16="http://schemas.microsoft.com/office/drawing/2014/main" id="{492535A1-DB4B-3D8A-E9FE-C045B89AC581}"/>
+              </a:ext>
+            </a:extLst>
+          </p:cNvPr>
+          <p:cNvCxnSpPr>
+            <a:cxnSpLocks/>
+            <a:stCxn id="13" idx="2"/>
+          </p:cNvCxnSpPr>
+          <p:nvPr/>
+        </p:nvCxnSpPr>
+        <p:spPr>
+          <a:xfrm rot="5400000" flipH="1" flipV="1">
+            <a:off x="4519259" y="2462147"/>
+            <a:ext cx="166441" cy="2749296"/>
+          </a:xfrm>
+          <a:prstGeom prst="bentConnector4">
+            <a:avLst>
+              <a:gd name="adj1" fmla="val -137346"/>
+              <a:gd name="adj2" fmla="val 84875"/>
+            </a:avLst>
+          </a:prstGeom>
+          <a:ln w="12700">
+            <a:solidFill>
+              <a:schemeClr val="accent1">
+                <a:lumMod val="75000"/>
+              </a:schemeClr>
+            </a:solidFill>
+            <a:prstDash val="sysDash"/>
+            <a:tailEnd type="triangle"/>
+          </a:ln>
+        </p:spPr>
+        <p:style>
+          <a:lnRef idx="1">
+            <a:schemeClr val="accent1"/>
+          </a:lnRef>
+          <a:fillRef idx="0">
+            <a:schemeClr val="accent1"/>
+          </a:fillRef>
+          <a:effectRef idx="0">
+            <a:schemeClr val="accent1"/>
+          </a:effectRef>
+          <a:fontRef idx="minor">
+            <a:schemeClr val="tx1"/>
+          </a:fontRef>
+        </p:style>
+      </p:cxnSp>
+      <p:cxnSp>
+        <p:nvCxnSpPr>
+          <p:cNvPr id="44" name="Connector: Elbow 43">
+            <a:extLst>
+              <a:ext uri="{FF2B5EF4-FFF2-40B4-BE49-F238E27FC236}">
+                <a16:creationId xmlns:a16="http://schemas.microsoft.com/office/drawing/2014/main" id="{9F9AB38E-9875-58D4-C7BB-1F0C6B41E1BD}"/>
+              </a:ext>
+            </a:extLst>
+          </p:cNvPr>
+          <p:cNvCxnSpPr>
+            <a:cxnSpLocks/>
+            <a:stCxn id="14" idx="0"/>
+          </p:cNvCxnSpPr>
+          <p:nvPr/>
+        </p:nvCxnSpPr>
+        <p:spPr>
+          <a:xfrm rot="5400000" flipH="1" flipV="1">
+            <a:off x="4636847" y="2546969"/>
+            <a:ext cx="463142" cy="3281172"/>
+          </a:xfrm>
+          <a:prstGeom prst="bentConnector3">
+            <a:avLst>
+              <a:gd name="adj1" fmla="val 50000"/>
+            </a:avLst>
+          </a:prstGeom>
+          <a:ln w="12700">
+            <a:solidFill>
+              <a:schemeClr val="accent1">
+                <a:lumMod val="75000"/>
+              </a:schemeClr>
+            </a:solidFill>
+            <a:prstDash val="sysDash"/>
+            <a:tailEnd type="triangle"/>
+          </a:ln>
+        </p:spPr>
+        <p:style>
+          <a:lnRef idx="1">
+            <a:schemeClr val="accent1"/>
+          </a:lnRef>
+          <a:fillRef idx="0">
+            <a:schemeClr val="accent1"/>
+          </a:fillRef>
+          <a:effectRef idx="0">
+            <a:schemeClr val="accent1"/>
+          </a:effectRef>
+          <a:fontRef idx="minor">
+            <a:schemeClr val="tx1"/>
+          </a:fontRef>
+        </p:style>
+      </p:cxnSp>
+      <p:cxnSp>
+        <p:nvCxnSpPr>
+          <p:cNvPr id="57" name="Connector: Elbow 56">
+            <a:extLst>
+              <a:ext uri="{FF2B5EF4-FFF2-40B4-BE49-F238E27FC236}">
+                <a16:creationId xmlns:a16="http://schemas.microsoft.com/office/drawing/2014/main" id="{ED4B92DD-2AFA-40D7-D5FB-D99A5AC0081C}"/>
+              </a:ext>
+            </a:extLst>
+          </p:cNvPr>
+          <p:cNvCxnSpPr>
+            <a:cxnSpLocks/>
+            <a:endCxn id="23" idx="0"/>
+          </p:cNvCxnSpPr>
+          <p:nvPr/>
+        </p:nvCxnSpPr>
+        <p:spPr>
+          <a:xfrm rot="16200000" flipH="1">
+            <a:off x="6608899" y="4072494"/>
+            <a:ext cx="1229633" cy="1018107"/>
+          </a:xfrm>
+          <a:prstGeom prst="bentConnector3">
+            <a:avLst>
+              <a:gd name="adj1" fmla="val 50000"/>
+            </a:avLst>
+          </a:prstGeom>
+          <a:ln w="12700">
+            <a:solidFill>
+              <a:schemeClr val="accent1">
+                <a:lumMod val="75000"/>
+              </a:schemeClr>
+            </a:solidFill>
+            <a:prstDash val="sysDash"/>
+            <a:tailEnd type="triangle"/>
+          </a:ln>
+        </p:spPr>
+        <p:style>
+          <a:lnRef idx="1">
+            <a:schemeClr val="accent1"/>
+          </a:lnRef>
+          <a:fillRef idx="0">
+            <a:schemeClr val="accent1"/>
+          </a:fillRef>
+          <a:effectRef idx="0">
+            <a:schemeClr val="accent1"/>
+          </a:effectRef>
+          <a:fontRef idx="minor">
+            <a:schemeClr val="tx1"/>
+          </a:fontRef>
+        </p:style>
+      </p:cxnSp>
+      <p:sp>
+        <p:nvSpPr>
+          <p:cNvPr id="58" name="Rectangle 57">
+            <a:extLst>
+              <a:ext uri="{FF2B5EF4-FFF2-40B4-BE49-F238E27FC236}">
+                <a16:creationId xmlns:a16="http://schemas.microsoft.com/office/drawing/2014/main" id="{DE634949-B0B1-7975-CC98-EF7663650BCB}"/>
+              </a:ext>
+            </a:extLst>
+          </p:cNvPr>
+          <p:cNvSpPr/>
+          <p:nvPr/>
+        </p:nvSpPr>
+        <p:spPr>
+          <a:xfrm>
+            <a:off x="5996798" y="3556538"/>
+            <a:ext cx="1145513" cy="404820"/>
+          </a:xfrm>
+          <a:prstGeom prst="rect">
+            <a:avLst/>
+          </a:prstGeom>
+          <a:solidFill>
+            <a:schemeClr val="accent6">
+              <a:lumMod val="75000"/>
+            </a:schemeClr>
+          </a:solidFill>
+        </p:spPr>
+        <p:style>
+          <a:lnRef idx="2">
+            <a:schemeClr val="accent1">
+              <a:shade val="50000"/>
+            </a:schemeClr>
+          </a:lnRef>
+          <a:fillRef idx="1">
+            <a:schemeClr val="accent1"/>
+          </a:fillRef>
+          <a:effectRef idx="0">
+            <a:schemeClr val="accent1"/>
+          </a:effectRef>
+          <a:fontRef idx="minor">
+            <a:schemeClr val="lt1"/>
+          </a:fontRef>
+        </p:style>
+        <p:txBody>
+          <a:bodyPr rtlCol="0" anchor="ctr"/>
+          <a:lstStyle/>
+          <a:p>
+            <a:r>
+              <a:rPr lang="en-US" sz="1100" b="1" dirty="0"/>
+              <a:t>Malware tasks  queue manager </a:t>
+            </a:r>
+            <a:endParaRPr lang="en-SG" sz="1100" b="1" dirty="0"/>
+          </a:p>
+        </p:txBody>
+      </p:sp>
+      <p:sp>
+        <p:nvSpPr>
+          <p:cNvPr id="61" name="Rectangle 60">
+            <a:extLst>
+              <a:ext uri="{FF2B5EF4-FFF2-40B4-BE49-F238E27FC236}">
+                <a16:creationId xmlns:a16="http://schemas.microsoft.com/office/drawing/2014/main" id="{B865B0B4-991C-D9A6-CB45-FA309D6A0CC5}"/>
+              </a:ext>
+            </a:extLst>
+          </p:cNvPr>
+          <p:cNvSpPr/>
+          <p:nvPr/>
+        </p:nvSpPr>
+        <p:spPr>
+          <a:xfrm>
+            <a:off x="7406551" y="3562673"/>
+            <a:ext cx="1063752" cy="404820"/>
+          </a:xfrm>
+          <a:prstGeom prst="rect">
+            <a:avLst/>
+          </a:prstGeom>
+          <a:solidFill>
+            <a:schemeClr val="accent6">
+              <a:lumMod val="75000"/>
+            </a:schemeClr>
+          </a:solidFill>
+        </p:spPr>
+        <p:style>
+          <a:lnRef idx="2">
+            <a:schemeClr val="accent1">
+              <a:shade val="50000"/>
+            </a:schemeClr>
+          </a:lnRef>
+          <a:fillRef idx="1">
+            <a:schemeClr val="accent1"/>
+          </a:fillRef>
+          <a:effectRef idx="0">
+            <a:schemeClr val="accent1"/>
+          </a:effectRef>
+          <a:fontRef idx="minor">
+            <a:schemeClr val="lt1"/>
+          </a:fontRef>
+        </p:style>
+        <p:txBody>
+          <a:bodyPr rtlCol="0" anchor="ctr"/>
+          <a:lstStyle/>
+          <a:p>
+            <a:r>
+              <a:rPr lang="en-US" sz="1100" b="1" dirty="0"/>
+              <a:t>Malware data manager </a:t>
+            </a:r>
+            <a:endParaRPr lang="en-SG" sz="1100" b="1" dirty="0"/>
+          </a:p>
+        </p:txBody>
+      </p:sp>
+      <p:cxnSp>
+        <p:nvCxnSpPr>
+          <p:cNvPr id="66" name="Connector: Elbow 65">
+            <a:extLst>
+              <a:ext uri="{FF2B5EF4-FFF2-40B4-BE49-F238E27FC236}">
+                <a16:creationId xmlns:a16="http://schemas.microsoft.com/office/drawing/2014/main" id="{AAC8FF4F-CF4C-EF1C-D88C-F3ABBF044499}"/>
+              </a:ext>
+            </a:extLst>
+          </p:cNvPr>
+          <p:cNvCxnSpPr>
+            <a:cxnSpLocks/>
+            <a:endCxn id="61" idx="0"/>
+          </p:cNvCxnSpPr>
+          <p:nvPr/>
+        </p:nvCxnSpPr>
+        <p:spPr>
+          <a:xfrm>
+            <a:off x="5278831" y="2548672"/>
+            <a:ext cx="2659596" cy="1014001"/>
+          </a:xfrm>
+          <a:prstGeom prst="bentConnector2">
+            <a:avLst/>
+          </a:prstGeom>
+          <a:ln>
+            <a:tailEnd type="triangle"/>
+          </a:ln>
+        </p:spPr>
+        <p:style>
+          <a:lnRef idx="1">
+            <a:schemeClr val="dk1"/>
+          </a:lnRef>
+          <a:fillRef idx="0">
+            <a:schemeClr val="dk1"/>
+          </a:fillRef>
+          <a:effectRef idx="0">
+            <a:schemeClr val="dk1"/>
+          </a:effectRef>
+          <a:fontRef idx="minor">
+            <a:schemeClr val="tx1"/>
+          </a:fontRef>
+        </p:style>
+      </p:cxnSp>
+      <p:cxnSp>
+        <p:nvCxnSpPr>
+          <p:cNvPr id="71" name="Straight Arrow Connector 70">
+            <a:extLst>
+              <a:ext uri="{FF2B5EF4-FFF2-40B4-BE49-F238E27FC236}">
+                <a16:creationId xmlns:a16="http://schemas.microsoft.com/office/drawing/2014/main" id="{EAB22497-291B-EC3B-568D-9D31180314C6}"/>
+              </a:ext>
+            </a:extLst>
+          </p:cNvPr>
+          <p:cNvCxnSpPr>
+            <a:cxnSpLocks/>
+            <a:endCxn id="61" idx="2"/>
+          </p:cNvCxnSpPr>
+          <p:nvPr/>
+        </p:nvCxnSpPr>
+        <p:spPr>
+          <a:xfrm flipV="1">
+            <a:off x="7938427" y="3967493"/>
+            <a:ext cx="0" cy="1228871"/>
+          </a:xfrm>
+          <a:prstGeom prst="straightConnector1">
+            <a:avLst/>
+          </a:prstGeom>
+          <a:ln>
+            <a:solidFill>
+              <a:schemeClr val="accent6">
+                <a:lumMod val="75000"/>
+              </a:schemeClr>
+            </a:solidFill>
+            <a:prstDash val="dash"/>
+            <a:tailEnd type="triangle"/>
+          </a:ln>
+        </p:spPr>
+        <p:style>
+          <a:lnRef idx="1">
+            <a:schemeClr val="accent1"/>
+          </a:lnRef>
+          <a:fillRef idx="0">
+            <a:schemeClr val="accent1"/>
+          </a:fillRef>
+          <a:effectRef idx="0">
+            <a:schemeClr val="accent1"/>
+          </a:effectRef>
+          <a:fontRef idx="minor">
+            <a:schemeClr val="tx1"/>
+          </a:fontRef>
+        </p:style>
+      </p:cxnSp>
+      <p:cxnSp>
+        <p:nvCxnSpPr>
+          <p:cNvPr id="74" name="Connector: Elbow 73">
+            <a:extLst>
+              <a:ext uri="{FF2B5EF4-FFF2-40B4-BE49-F238E27FC236}">
+                <a16:creationId xmlns:a16="http://schemas.microsoft.com/office/drawing/2014/main" id="{98F02C1D-12E6-BBCA-D1DE-2BE55B495274}"/>
+              </a:ext>
+            </a:extLst>
+          </p:cNvPr>
+          <p:cNvCxnSpPr>
+            <a:cxnSpLocks/>
+          </p:cNvCxnSpPr>
+          <p:nvPr/>
+        </p:nvCxnSpPr>
+        <p:spPr>
+          <a:xfrm rot="10800000" flipV="1">
+            <a:off x="3828744" y="3955982"/>
+            <a:ext cx="3904024" cy="824054"/>
+          </a:xfrm>
+          <a:prstGeom prst="bentConnector3">
+            <a:avLst>
+              <a:gd name="adj1" fmla="val 4093"/>
+            </a:avLst>
+          </a:prstGeom>
+          <a:ln>
+            <a:solidFill>
+              <a:schemeClr val="accent6">
+                <a:lumMod val="75000"/>
+              </a:schemeClr>
+            </a:solidFill>
+            <a:prstDash val="dash"/>
+            <a:tailEnd type="triangle"/>
+          </a:ln>
+        </p:spPr>
+        <p:style>
+          <a:lnRef idx="1">
+            <a:schemeClr val="accent1"/>
+          </a:lnRef>
+          <a:fillRef idx="0">
+            <a:schemeClr val="accent1"/>
+          </a:fillRef>
+          <a:effectRef idx="0">
+            <a:schemeClr val="accent1"/>
+          </a:effectRef>
+          <a:fontRef idx="minor">
+            <a:schemeClr val="tx1"/>
+          </a:fontRef>
+        </p:style>
+      </p:cxnSp>
+      <p:cxnSp>
+        <p:nvCxnSpPr>
+          <p:cNvPr id="78" name="Connector: Elbow 77">
+            <a:extLst>
+              <a:ext uri="{FF2B5EF4-FFF2-40B4-BE49-F238E27FC236}">
+                <a16:creationId xmlns:a16="http://schemas.microsoft.com/office/drawing/2014/main" id="{B3ED620E-8C5E-6CA0-AC77-232FA54F5586}"/>
+              </a:ext>
+            </a:extLst>
+          </p:cNvPr>
+          <p:cNvCxnSpPr>
+            <a:cxnSpLocks/>
+          </p:cNvCxnSpPr>
+          <p:nvPr/>
+        </p:nvCxnSpPr>
+        <p:spPr>
+          <a:xfrm rot="10800000">
+            <a:off x="3828742" y="3836798"/>
+            <a:ext cx="1136450" cy="943239"/>
+          </a:xfrm>
+          <a:prstGeom prst="bentConnector3">
+            <a:avLst>
+              <a:gd name="adj1" fmla="val 50000"/>
+            </a:avLst>
+          </a:prstGeom>
+          <a:ln>
+            <a:solidFill>
+              <a:schemeClr val="accent6">
+                <a:lumMod val="75000"/>
+              </a:schemeClr>
+            </a:solidFill>
+            <a:prstDash val="dash"/>
+            <a:tailEnd type="triangle"/>
+          </a:ln>
+        </p:spPr>
+        <p:style>
+          <a:lnRef idx="1">
+            <a:schemeClr val="accent1"/>
+          </a:lnRef>
+          <a:fillRef idx="0">
+            <a:schemeClr val="accent1"/>
+          </a:fillRef>
+          <a:effectRef idx="0">
+            <a:schemeClr val="accent1"/>
+          </a:effectRef>
+          <a:fontRef idx="minor">
+            <a:schemeClr val="tx1"/>
+          </a:fontRef>
+        </p:style>
+      </p:cxnSp>
+      <p:sp>
+        <p:nvSpPr>
+          <p:cNvPr id="83" name="TextBox 82">
+            <a:extLst>
+              <a:ext uri="{FF2B5EF4-FFF2-40B4-BE49-F238E27FC236}">
+                <a16:creationId xmlns:a16="http://schemas.microsoft.com/office/drawing/2014/main" id="{6432BE0A-A020-D739-91C2-DB6938048A46}"/>
+              </a:ext>
+            </a:extLst>
+          </p:cNvPr>
+          <p:cNvSpPr txBox="1"/>
+          <p:nvPr/>
+        </p:nvSpPr>
+        <p:spPr>
+          <a:xfrm>
+            <a:off x="5576303" y="2163698"/>
+            <a:ext cx="1647412" cy="261610"/>
+          </a:xfrm>
+          <a:prstGeom prst="rect">
+            <a:avLst/>
+          </a:prstGeom>
+          <a:noFill/>
+        </p:spPr>
+        <p:txBody>
+          <a:bodyPr wrap="square" rtlCol="0">
+            <a:spAutoFit/>
+          </a:bodyPr>
+          <a:lstStyle/>
+          <a:p>
+            <a:r>
+              <a:rPr lang="en-US" sz="1100" dirty="0"/>
+              <a:t>Control module thread</a:t>
+            </a:r>
+            <a:endParaRPr lang="en-SG" sz="1100" dirty="0"/>
+          </a:p>
+        </p:txBody>
+      </p:sp>
+      <p:sp>
+        <p:nvSpPr>
+          <p:cNvPr id="84" name="TextBox 83">
+            <a:extLst>
+              <a:ext uri="{FF2B5EF4-FFF2-40B4-BE49-F238E27FC236}">
+                <a16:creationId xmlns:a16="http://schemas.microsoft.com/office/drawing/2014/main" id="{A80CCCDC-85AD-6419-A3C3-F24F59F57242}"/>
+              </a:ext>
+            </a:extLst>
+          </p:cNvPr>
+          <p:cNvSpPr txBox="1"/>
+          <p:nvPr/>
+        </p:nvSpPr>
+        <p:spPr>
+          <a:xfrm>
+            <a:off x="3191821" y="3954126"/>
+            <a:ext cx="1452944" cy="430887"/>
+          </a:xfrm>
+          <a:prstGeom prst="rect">
+            <a:avLst/>
+          </a:prstGeom>
+          <a:noFill/>
+        </p:spPr>
+        <p:txBody>
+          <a:bodyPr wrap="square" rtlCol="0">
+            <a:spAutoFit/>
+          </a:bodyPr>
+          <a:lstStyle/>
+          <a:p>
+            <a:r>
+              <a:rPr lang="en-US" sz="1100" dirty="0">
+                <a:solidFill>
+                  <a:schemeClr val="accent1">
+                    <a:lumMod val="50000"/>
+                  </a:schemeClr>
+                </a:solidFill>
+              </a:rPr>
+              <a:t>Malware task assignment request </a:t>
+            </a:r>
+            <a:endParaRPr lang="en-SG" sz="1100" dirty="0">
+              <a:solidFill>
+                <a:schemeClr val="accent1">
+                  <a:lumMod val="50000"/>
+                </a:schemeClr>
+              </a:solidFill>
+            </a:endParaRPr>
+          </a:p>
+        </p:txBody>
+      </p:sp>
+      <p:sp>
+        <p:nvSpPr>
+          <p:cNvPr id="85" name="TextBox 84">
+            <a:extLst>
+              <a:ext uri="{FF2B5EF4-FFF2-40B4-BE49-F238E27FC236}">
+                <a16:creationId xmlns:a16="http://schemas.microsoft.com/office/drawing/2014/main" id="{31983B2A-C8A5-7D87-4A09-DB2335D2D096}"/>
+              </a:ext>
+            </a:extLst>
+          </p:cNvPr>
+          <p:cNvSpPr txBox="1"/>
+          <p:nvPr/>
+        </p:nvSpPr>
+        <p:spPr>
+          <a:xfrm>
+            <a:off x="7577679" y="4056838"/>
+            <a:ext cx="1034366" cy="430887"/>
+          </a:xfrm>
+          <a:prstGeom prst="rect">
+            <a:avLst/>
+          </a:prstGeom>
+          <a:noFill/>
+        </p:spPr>
+        <p:txBody>
+          <a:bodyPr wrap="square" rtlCol="0">
+            <a:spAutoFit/>
+          </a:bodyPr>
+          <a:lstStyle/>
+          <a:p>
+            <a:r>
+              <a:rPr lang="en-US" sz="1100" dirty="0">
+                <a:solidFill>
+                  <a:schemeClr val="accent6">
+                    <a:lumMod val="75000"/>
+                  </a:schemeClr>
+                </a:solidFill>
+              </a:rPr>
+              <a:t>Malware state feedback data</a:t>
+            </a:r>
+            <a:endParaRPr lang="en-SG" sz="1100" dirty="0">
+              <a:solidFill>
+                <a:schemeClr val="accent6">
+                  <a:lumMod val="75000"/>
+                </a:schemeClr>
+              </a:solidFill>
+            </a:endParaRPr>
+          </a:p>
+        </p:txBody>
+      </p:sp>
+      <p:pic>
+        <p:nvPicPr>
+          <p:cNvPr id="86" name="Picture 85">
+            <a:extLst>
+              <a:ext uri="{FF2B5EF4-FFF2-40B4-BE49-F238E27FC236}">
+                <a16:creationId xmlns:a16="http://schemas.microsoft.com/office/drawing/2014/main" id="{1C753E98-B339-648C-8214-50D1B51C4C21}"/>
+              </a:ext>
+            </a:extLst>
+          </p:cNvPr>
+          <p:cNvPicPr>
+            <a:picLocks noChangeAspect="1"/>
+          </p:cNvPicPr>
+          <p:nvPr/>
+        </p:nvPicPr>
+        <p:blipFill>
+          <a:blip r:embed="rId2"/>
+          <a:stretch>
+            <a:fillRect/>
+          </a:stretch>
+        </p:blipFill>
+        <p:spPr>
+          <a:xfrm>
+            <a:off x="840137" y="2063359"/>
+            <a:ext cx="2295431" cy="1231881"/>
+          </a:xfrm>
+          <a:prstGeom prst="rect">
+            <a:avLst/>
+          </a:prstGeom>
+          <a:ln w="6350">
+            <a:solidFill>
+              <a:schemeClr val="tx1"/>
+            </a:solidFill>
+          </a:ln>
+        </p:spPr>
+      </p:pic>
+      <p:cxnSp>
+        <p:nvCxnSpPr>
+          <p:cNvPr id="88" name="Connector: Elbow 87">
+            <a:extLst>
+              <a:ext uri="{FF2B5EF4-FFF2-40B4-BE49-F238E27FC236}">
+                <a16:creationId xmlns:a16="http://schemas.microsoft.com/office/drawing/2014/main" id="{42EE0748-A296-EEC5-0F05-2F7B463B1E66}"/>
+              </a:ext>
+            </a:extLst>
+          </p:cNvPr>
+          <p:cNvCxnSpPr>
+            <a:cxnSpLocks/>
+            <a:endCxn id="96" idx="3"/>
+          </p:cNvCxnSpPr>
+          <p:nvPr/>
+        </p:nvCxnSpPr>
+        <p:spPr>
+          <a:xfrm rot="5400000">
+            <a:off x="1237562" y="3566224"/>
+            <a:ext cx="590155" cy="2584"/>
+          </a:xfrm>
+          <a:prstGeom prst="bentConnector3">
+            <a:avLst>
+              <a:gd name="adj1" fmla="val 50000"/>
+            </a:avLst>
+          </a:prstGeom>
+          <a:ln>
+            <a:headEnd type="triangle"/>
+            <a:tailEnd type="triangle"/>
+          </a:ln>
+        </p:spPr>
+        <p:style>
+          <a:lnRef idx="1">
+            <a:schemeClr val="accent1"/>
+          </a:lnRef>
+          <a:fillRef idx="0">
+            <a:schemeClr val="accent1"/>
+          </a:fillRef>
+          <a:effectRef idx="0">
+            <a:schemeClr val="accent1"/>
+          </a:effectRef>
+          <a:fontRef idx="minor">
+            <a:schemeClr val="tx1"/>
+          </a:fontRef>
+        </p:style>
+      </p:cxnSp>
+      <p:sp>
+        <p:nvSpPr>
+          <p:cNvPr id="89" name="TextBox 88">
+            <a:extLst>
+              <a:ext uri="{FF2B5EF4-FFF2-40B4-BE49-F238E27FC236}">
+                <a16:creationId xmlns:a16="http://schemas.microsoft.com/office/drawing/2014/main" id="{16C01D49-CD69-3369-7C35-FAE17A52F767}"/>
+              </a:ext>
+            </a:extLst>
+          </p:cNvPr>
+          <p:cNvSpPr txBox="1"/>
+          <p:nvPr/>
+        </p:nvSpPr>
+        <p:spPr>
+          <a:xfrm>
+            <a:off x="694981" y="1786359"/>
+            <a:ext cx="1057737" cy="276999"/>
+          </a:xfrm>
+          <a:prstGeom prst="rect">
+            <a:avLst/>
+          </a:prstGeom>
+          <a:noFill/>
+        </p:spPr>
+        <p:txBody>
+          <a:bodyPr wrap="square" rtlCol="0">
+            <a:spAutoFit/>
+          </a:bodyPr>
+          <a:lstStyle/>
+          <a:p>
+            <a:r>
+              <a:rPr lang="en-US" sz="1200" b="1" dirty="0"/>
+              <a:t>RTC2 Web-UI</a:t>
+            </a:r>
+            <a:endParaRPr lang="en-SG" sz="1200" b="1" dirty="0"/>
+          </a:p>
+        </p:txBody>
+      </p:sp>
+      <p:pic>
+        <p:nvPicPr>
+          <p:cNvPr id="91" name="Picture 90">
+            <a:extLst>
+              <a:ext uri="{FF2B5EF4-FFF2-40B4-BE49-F238E27FC236}">
+                <a16:creationId xmlns:a16="http://schemas.microsoft.com/office/drawing/2014/main" id="{236DD7EF-7A0B-65B5-43B1-507636046B32}"/>
+              </a:ext>
+            </a:extLst>
+          </p:cNvPr>
+          <p:cNvPicPr>
+            <a:picLocks noChangeAspect="1"/>
+          </p:cNvPicPr>
+          <p:nvPr/>
+        </p:nvPicPr>
+        <p:blipFill>
+          <a:blip r:embed="rId3"/>
+          <a:stretch>
+            <a:fillRect/>
+          </a:stretch>
+        </p:blipFill>
+        <p:spPr>
+          <a:xfrm>
+            <a:off x="1293919" y="5094476"/>
+            <a:ext cx="474854" cy="521753"/>
+          </a:xfrm>
+          <a:prstGeom prst="rect">
+            <a:avLst/>
+          </a:prstGeom>
+          <a:ln w="3175">
+            <a:solidFill>
+              <a:schemeClr val="tx1"/>
+            </a:solidFill>
+          </a:ln>
+        </p:spPr>
+      </p:pic>
+      <p:cxnSp>
+        <p:nvCxnSpPr>
+          <p:cNvPr id="92" name="Connector: Elbow 91">
+            <a:extLst>
+              <a:ext uri="{FF2B5EF4-FFF2-40B4-BE49-F238E27FC236}">
+                <a16:creationId xmlns:a16="http://schemas.microsoft.com/office/drawing/2014/main" id="{D168B791-DCEF-5234-39BC-6E194F032B2B}"/>
+              </a:ext>
+            </a:extLst>
+          </p:cNvPr>
+          <p:cNvCxnSpPr>
+            <a:cxnSpLocks/>
+            <a:stCxn id="91" idx="0"/>
+            <a:endCxn id="96" idx="1"/>
+          </p:cNvCxnSpPr>
+          <p:nvPr/>
+        </p:nvCxnSpPr>
+        <p:spPr>
+          <a:xfrm rot="5400000" flipH="1" flipV="1">
+            <a:off x="1202443" y="4765573"/>
+            <a:ext cx="657807" cy="1"/>
+          </a:xfrm>
+          <a:prstGeom prst="bentConnector3">
+            <a:avLst>
+              <a:gd name="adj1" fmla="val 50000"/>
+            </a:avLst>
+          </a:prstGeom>
+          <a:ln>
+            <a:headEnd type="triangle"/>
+            <a:tailEnd type="triangle"/>
+          </a:ln>
+        </p:spPr>
+        <p:style>
+          <a:lnRef idx="1">
+            <a:schemeClr val="accent1"/>
+          </a:lnRef>
+          <a:fillRef idx="0">
+            <a:schemeClr val="accent1"/>
+          </a:fillRef>
+          <a:effectRef idx="0">
+            <a:schemeClr val="accent1"/>
+          </a:effectRef>
+          <a:fontRef idx="minor">
+            <a:schemeClr val="tx1"/>
+          </a:fontRef>
+        </p:style>
+      </p:cxnSp>
+      <p:sp>
+        <p:nvSpPr>
+          <p:cNvPr id="95" name="TextBox 94">
+            <a:extLst>
+              <a:ext uri="{FF2B5EF4-FFF2-40B4-BE49-F238E27FC236}">
+                <a16:creationId xmlns:a16="http://schemas.microsoft.com/office/drawing/2014/main" id="{1CED2168-E07E-47CB-68C1-5B8A5C1B5A6F}"/>
+              </a:ext>
+            </a:extLst>
+          </p:cNvPr>
+          <p:cNvSpPr txBox="1"/>
+          <p:nvPr/>
+        </p:nvSpPr>
+        <p:spPr>
+          <a:xfrm>
+            <a:off x="1756322" y="5092225"/>
+            <a:ext cx="1534074" cy="461665"/>
+          </a:xfrm>
+          <a:prstGeom prst="rect">
+            <a:avLst/>
+          </a:prstGeom>
+          <a:noFill/>
+        </p:spPr>
+        <p:txBody>
+          <a:bodyPr wrap="square" rtlCol="0">
+            <a:spAutoFit/>
+          </a:bodyPr>
+          <a:lstStyle/>
+          <a:p>
+            <a:r>
+              <a:rPr lang="en-US" sz="1200" b="1" dirty="0"/>
+              <a:t>User customized program all RTC2 API</a:t>
+            </a:r>
+            <a:endParaRPr lang="en-SG" sz="1200" b="1" dirty="0"/>
+          </a:p>
+        </p:txBody>
+      </p:sp>
+      <p:sp>
+        <p:nvSpPr>
+          <p:cNvPr id="96" name="Cloud 95">
+            <a:extLst>
+              <a:ext uri="{FF2B5EF4-FFF2-40B4-BE49-F238E27FC236}">
+                <a16:creationId xmlns:a16="http://schemas.microsoft.com/office/drawing/2014/main" id="{67888D0D-3BAB-8CAA-3A71-A3DA432A750A}"/>
+              </a:ext>
+            </a:extLst>
+          </p:cNvPr>
+          <p:cNvSpPr/>
+          <p:nvPr/>
+        </p:nvSpPr>
+        <p:spPr>
+          <a:xfrm>
+            <a:off x="963425" y="3827741"/>
+            <a:ext cx="1135843" cy="609577"/>
+          </a:xfrm>
+          <a:prstGeom prst="cloud">
+            <a:avLst/>
+          </a:prstGeom>
+          <a:solidFill>
+            <a:schemeClr val="accent1">
+              <a:lumMod val="60000"/>
+              <a:lumOff val="40000"/>
+            </a:schemeClr>
+          </a:solidFill>
+        </p:spPr>
+        <p:style>
+          <a:lnRef idx="2">
+            <a:schemeClr val="accent1">
+              <a:shade val="15000"/>
+            </a:schemeClr>
+          </a:lnRef>
+          <a:fillRef idx="1">
+            <a:schemeClr val="accent1"/>
+          </a:fillRef>
+          <a:effectRef idx="0">
+            <a:schemeClr val="accent1"/>
+          </a:effectRef>
+          <a:fontRef idx="minor">
+            <a:schemeClr val="lt1"/>
+          </a:fontRef>
+        </p:style>
+        <p:txBody>
+          <a:bodyPr rtlCol="0" anchor="ctr"/>
+          <a:lstStyle/>
+          <a:p>
+            <a:pPr algn="ctr"/>
+            <a:r>
+              <a:rPr lang="en-SG" sz="1200" b="1" dirty="0">
+                <a:solidFill>
+                  <a:schemeClr val="tx1"/>
+                </a:solidFill>
+              </a:rPr>
+              <a:t>Internet</a:t>
+            </a:r>
+            <a:r>
+              <a:rPr lang="en-SG" dirty="0">
+                <a:solidFill>
+                  <a:schemeClr val="tx1"/>
+                </a:solidFill>
+              </a:rPr>
+              <a:t> </a:t>
+            </a:r>
+          </a:p>
+        </p:txBody>
+      </p:sp>
+      <p:cxnSp>
+        <p:nvCxnSpPr>
+          <p:cNvPr id="103" name="Connector: Elbow 102">
+            <a:extLst>
+              <a:ext uri="{FF2B5EF4-FFF2-40B4-BE49-F238E27FC236}">
+                <a16:creationId xmlns:a16="http://schemas.microsoft.com/office/drawing/2014/main" id="{CCE1C33B-52B3-5CA1-DCDD-5AFD669B9EF0}"/>
+              </a:ext>
+            </a:extLst>
+          </p:cNvPr>
+          <p:cNvCxnSpPr>
+            <a:cxnSpLocks/>
+            <a:stCxn id="14" idx="1"/>
+          </p:cNvCxnSpPr>
+          <p:nvPr/>
+        </p:nvCxnSpPr>
+        <p:spPr>
+          <a:xfrm rot="10800000">
+            <a:off x="2017418" y="4316491"/>
+            <a:ext cx="609503" cy="305047"/>
+          </a:xfrm>
+          <a:prstGeom prst="bentConnector3">
+            <a:avLst>
+              <a:gd name="adj1" fmla="val 50000"/>
+            </a:avLst>
+          </a:prstGeom>
+          <a:ln>
+            <a:headEnd type="triangle"/>
+            <a:tailEnd type="triangle"/>
+          </a:ln>
+        </p:spPr>
+        <p:style>
+          <a:lnRef idx="1">
+            <a:schemeClr val="accent1"/>
+          </a:lnRef>
+          <a:fillRef idx="0">
+            <a:schemeClr val="accent1"/>
+          </a:fillRef>
+          <a:effectRef idx="0">
+            <a:schemeClr val="accent1"/>
+          </a:effectRef>
+          <a:fontRef idx="minor">
+            <a:schemeClr val="tx1"/>
+          </a:fontRef>
+        </p:style>
+      </p:cxnSp>
+      <p:cxnSp>
+        <p:nvCxnSpPr>
+          <p:cNvPr id="106" name="Connector: Elbow 105">
+            <a:extLst>
+              <a:ext uri="{FF2B5EF4-FFF2-40B4-BE49-F238E27FC236}">
+                <a16:creationId xmlns:a16="http://schemas.microsoft.com/office/drawing/2014/main" id="{4769893A-1D31-75CE-CBB6-1FC4F19E0A26}"/>
+              </a:ext>
+            </a:extLst>
+          </p:cNvPr>
+          <p:cNvCxnSpPr>
+            <a:cxnSpLocks/>
+            <a:stCxn id="13" idx="1"/>
+          </p:cNvCxnSpPr>
+          <p:nvPr/>
+        </p:nvCxnSpPr>
+        <p:spPr>
+          <a:xfrm rot="10800000" flipV="1">
+            <a:off x="2003638" y="3717605"/>
+            <a:ext cx="623283" cy="144990"/>
+          </a:xfrm>
+          <a:prstGeom prst="bentConnector3">
+            <a:avLst>
+              <a:gd name="adj1" fmla="val 50000"/>
+            </a:avLst>
+          </a:prstGeom>
+          <a:ln>
+            <a:headEnd type="triangle"/>
+            <a:tailEnd type="triangle"/>
+          </a:ln>
+        </p:spPr>
+        <p:style>
+          <a:lnRef idx="1">
+            <a:schemeClr val="accent1"/>
+          </a:lnRef>
+          <a:fillRef idx="0">
+            <a:schemeClr val="accent1"/>
+          </a:fillRef>
+          <a:effectRef idx="0">
+            <a:schemeClr val="accent1"/>
+          </a:effectRef>
+          <a:fontRef idx="minor">
+            <a:schemeClr val="tx1"/>
+          </a:fontRef>
+        </p:style>
+      </p:cxnSp>
+      <p:sp>
+        <p:nvSpPr>
+          <p:cNvPr id="112" name="Cloud 111">
+            <a:extLst>
+              <a:ext uri="{FF2B5EF4-FFF2-40B4-BE49-F238E27FC236}">
+                <a16:creationId xmlns:a16="http://schemas.microsoft.com/office/drawing/2014/main" id="{DCCC4B3D-8DD9-AE33-DC25-7E89EC69BE3C}"/>
+              </a:ext>
+            </a:extLst>
+          </p:cNvPr>
+          <p:cNvSpPr/>
+          <p:nvPr/>
+        </p:nvSpPr>
+        <p:spPr>
+          <a:xfrm>
+            <a:off x="9257364" y="4080224"/>
+            <a:ext cx="1135843" cy="609577"/>
+          </a:xfrm>
+          <a:prstGeom prst="cloud">
+            <a:avLst/>
+          </a:prstGeom>
+          <a:solidFill>
+            <a:schemeClr val="accent1">
+              <a:lumMod val="60000"/>
+              <a:lumOff val="40000"/>
+            </a:schemeClr>
+          </a:solidFill>
+        </p:spPr>
+        <p:style>
+          <a:lnRef idx="2">
+            <a:schemeClr val="accent1">
+              <a:shade val="15000"/>
+            </a:schemeClr>
+          </a:lnRef>
+          <a:fillRef idx="1">
+            <a:schemeClr val="accent1"/>
+          </a:fillRef>
+          <a:effectRef idx="0">
+            <a:schemeClr val="accent1"/>
+          </a:effectRef>
+          <a:fontRef idx="minor">
+            <a:schemeClr val="lt1"/>
+          </a:fontRef>
+        </p:style>
+        <p:txBody>
+          <a:bodyPr rtlCol="0" anchor="ctr"/>
+          <a:lstStyle/>
+          <a:p>
+            <a:pPr algn="ctr"/>
+            <a:r>
+              <a:rPr lang="en-SG" sz="1200" b="1" dirty="0">
+                <a:solidFill>
+                  <a:schemeClr val="tx1"/>
+                </a:solidFill>
+              </a:rPr>
+              <a:t>Internet</a:t>
+            </a:r>
+            <a:r>
+              <a:rPr lang="en-SG" dirty="0">
+                <a:solidFill>
+                  <a:schemeClr val="tx1"/>
+                </a:solidFill>
+              </a:rPr>
+              <a:t> </a:t>
+            </a:r>
+          </a:p>
+        </p:txBody>
+      </p:sp>
+      <p:sp>
+        <p:nvSpPr>
+          <p:cNvPr id="117" name="Rectangle 116">
+            <a:extLst>
+              <a:ext uri="{FF2B5EF4-FFF2-40B4-BE49-F238E27FC236}">
+                <a16:creationId xmlns:a16="http://schemas.microsoft.com/office/drawing/2014/main" id="{49E304DE-D56A-CB95-BE71-5174AA39F1AB}"/>
+              </a:ext>
+            </a:extLst>
+          </p:cNvPr>
+          <p:cNvSpPr/>
+          <p:nvPr/>
+        </p:nvSpPr>
+        <p:spPr>
+          <a:xfrm>
+            <a:off x="10757811" y="1877604"/>
+            <a:ext cx="884473" cy="401443"/>
+          </a:xfrm>
+          <a:prstGeom prst="rect">
+            <a:avLst/>
+          </a:prstGeom>
+          <a:solidFill>
+            <a:srgbClr val="C00000"/>
+          </a:solidFill>
+        </p:spPr>
+        <p:style>
+          <a:lnRef idx="2">
+            <a:schemeClr val="accent1">
+              <a:shade val="50000"/>
+            </a:schemeClr>
+          </a:lnRef>
+          <a:fillRef idx="1">
+            <a:schemeClr val="accent1"/>
+          </a:fillRef>
+          <a:effectRef idx="0">
+            <a:schemeClr val="accent1"/>
+          </a:effectRef>
+          <a:fontRef idx="minor">
+            <a:schemeClr val="lt1"/>
+          </a:fontRef>
+        </p:style>
+        <p:txBody>
+          <a:bodyPr rtlCol="0" anchor="ctr"/>
+          <a:lstStyle/>
+          <a:p>
+            <a:r>
+              <a:rPr lang="en-US" sz="1100" b="1" dirty="0"/>
+              <a:t>Malware </a:t>
+            </a:r>
+            <a:r>
+              <a:rPr lang="en-US" sz="1100" b="1" dirty="0" err="1"/>
+              <a:t>init</a:t>
+            </a:r>
+            <a:r>
+              <a:rPr lang="en-US" sz="1100" b="1" dirty="0"/>
+              <a:t> start  </a:t>
+            </a:r>
+            <a:endParaRPr lang="en-SG" sz="1100" b="1" dirty="0"/>
+          </a:p>
+        </p:txBody>
+      </p:sp>
+      <p:sp>
+        <p:nvSpPr>
+          <p:cNvPr id="118" name="Rectangle 117">
+            <a:extLst>
+              <a:ext uri="{FF2B5EF4-FFF2-40B4-BE49-F238E27FC236}">
+                <a16:creationId xmlns:a16="http://schemas.microsoft.com/office/drawing/2014/main" id="{ABDC2E7D-B9B2-B453-1A31-722423930C7B}"/>
+              </a:ext>
+            </a:extLst>
+          </p:cNvPr>
+          <p:cNvSpPr/>
+          <p:nvPr/>
+        </p:nvSpPr>
+        <p:spPr>
+          <a:xfrm>
+            <a:off x="9694062" y="2839641"/>
+            <a:ext cx="884473" cy="283697"/>
+          </a:xfrm>
+          <a:prstGeom prst="rect">
+            <a:avLst/>
+          </a:prstGeom>
+          <a:solidFill>
+            <a:srgbClr val="C00000"/>
+          </a:solidFill>
+        </p:spPr>
+        <p:style>
+          <a:lnRef idx="2">
+            <a:schemeClr val="accent1">
+              <a:shade val="50000"/>
+            </a:schemeClr>
+          </a:lnRef>
+          <a:fillRef idx="1">
+            <a:schemeClr val="accent1"/>
+          </a:fillRef>
+          <a:effectRef idx="0">
+            <a:schemeClr val="accent1"/>
+          </a:effectRef>
+          <a:fontRef idx="minor">
+            <a:schemeClr val="lt1"/>
+          </a:fontRef>
+        </p:style>
+        <p:txBody>
+          <a:bodyPr rtlCol="0" anchor="ctr"/>
+          <a:lstStyle/>
+          <a:p>
+            <a:r>
+              <a:rPr lang="en-US" sz="1100" b="1" dirty="0"/>
+              <a:t>RTC2 client </a:t>
+            </a:r>
+          </a:p>
+        </p:txBody>
+      </p:sp>
+      <p:sp>
+        <p:nvSpPr>
+          <p:cNvPr id="121" name="Rectangle 120">
+            <a:extLst>
+              <a:ext uri="{FF2B5EF4-FFF2-40B4-BE49-F238E27FC236}">
+                <a16:creationId xmlns:a16="http://schemas.microsoft.com/office/drawing/2014/main" id="{A0E1C03F-312D-0848-3EFF-E6D1F5BFEBFD}"/>
+              </a:ext>
+            </a:extLst>
+          </p:cNvPr>
+          <p:cNvSpPr/>
+          <p:nvPr/>
+        </p:nvSpPr>
+        <p:spPr>
+          <a:xfrm>
+            <a:off x="11021156" y="3096230"/>
+            <a:ext cx="1063750" cy="430887"/>
+          </a:xfrm>
+          <a:prstGeom prst="rect">
+            <a:avLst/>
+          </a:prstGeom>
+          <a:solidFill>
+            <a:srgbClr val="C00000"/>
+          </a:solidFill>
+        </p:spPr>
+        <p:style>
+          <a:lnRef idx="2">
+            <a:schemeClr val="accent1">
+              <a:shade val="50000"/>
+            </a:schemeClr>
+          </a:lnRef>
+          <a:fillRef idx="1">
+            <a:schemeClr val="accent1"/>
+          </a:fillRef>
+          <a:effectRef idx="0">
+            <a:schemeClr val="accent1"/>
+          </a:effectRef>
+          <a:fontRef idx="minor">
+            <a:schemeClr val="lt1"/>
+          </a:fontRef>
+        </p:style>
+        <p:txBody>
+          <a:bodyPr rtlCol="0" anchor="ctr"/>
+          <a:lstStyle/>
+          <a:p>
+            <a:r>
+              <a:rPr lang="en-US" sz="1100" b="1" dirty="0"/>
+              <a:t>Malware data manager </a:t>
+            </a:r>
+          </a:p>
+        </p:txBody>
+      </p:sp>
+      <p:cxnSp>
+        <p:nvCxnSpPr>
+          <p:cNvPr id="122" name="Straight Arrow Connector 121">
+            <a:extLst>
+              <a:ext uri="{FF2B5EF4-FFF2-40B4-BE49-F238E27FC236}">
+                <a16:creationId xmlns:a16="http://schemas.microsoft.com/office/drawing/2014/main" id="{3BA6EAD8-8CCD-18BA-10E7-478536D1135F}"/>
+              </a:ext>
+            </a:extLst>
+          </p:cNvPr>
+          <p:cNvCxnSpPr>
+            <a:cxnSpLocks/>
+          </p:cNvCxnSpPr>
+          <p:nvPr/>
+        </p:nvCxnSpPr>
+        <p:spPr>
+          <a:xfrm flipH="1">
+            <a:off x="11200047" y="2294503"/>
+            <a:ext cx="2" cy="789804"/>
+          </a:xfrm>
+          <a:prstGeom prst="straightConnector1">
+            <a:avLst/>
+          </a:prstGeom>
+          <a:ln w="19050">
+            <a:solidFill>
+              <a:schemeClr val="accent6">
+                <a:lumMod val="50000"/>
+              </a:schemeClr>
+            </a:solidFill>
+            <a:tailEnd type="triangle"/>
+          </a:ln>
+        </p:spPr>
+        <p:style>
+          <a:lnRef idx="1">
+            <a:schemeClr val="accent1"/>
+          </a:lnRef>
+          <a:fillRef idx="0">
+            <a:schemeClr val="accent1"/>
+          </a:fillRef>
+          <a:effectRef idx="0">
+            <a:schemeClr val="accent1"/>
+          </a:effectRef>
+          <a:fontRef idx="minor">
+            <a:schemeClr val="tx1"/>
+          </a:fontRef>
+        </p:style>
+      </p:cxnSp>
+      <p:cxnSp>
+        <p:nvCxnSpPr>
+          <p:cNvPr id="125" name="Connector: Elbow 124">
+            <a:extLst>
+              <a:ext uri="{FF2B5EF4-FFF2-40B4-BE49-F238E27FC236}">
+                <a16:creationId xmlns:a16="http://schemas.microsoft.com/office/drawing/2014/main" id="{9823CC5D-D01A-652A-2302-1F5D79C13141}"/>
+              </a:ext>
+            </a:extLst>
+          </p:cNvPr>
+          <p:cNvCxnSpPr>
+            <a:cxnSpLocks/>
+            <a:stCxn id="117" idx="1"/>
+            <a:endCxn id="118" idx="0"/>
+          </p:cNvCxnSpPr>
+          <p:nvPr/>
+        </p:nvCxnSpPr>
+        <p:spPr>
+          <a:xfrm rot="10800000" flipV="1">
+            <a:off x="10136299" y="2078325"/>
+            <a:ext cx="621512" cy="761315"/>
+          </a:xfrm>
+          <a:prstGeom prst="bentConnector2">
+            <a:avLst/>
+          </a:prstGeom>
+          <a:ln>
+            <a:tailEnd type="triangle"/>
+          </a:ln>
+        </p:spPr>
+        <p:style>
+          <a:lnRef idx="1">
+            <a:schemeClr val="dk1"/>
+          </a:lnRef>
+          <a:fillRef idx="0">
+            <a:schemeClr val="dk1"/>
+          </a:fillRef>
+          <a:effectRef idx="0">
+            <a:schemeClr val="dk1"/>
+          </a:effectRef>
+          <a:fontRef idx="minor">
+            <a:schemeClr val="tx1"/>
+          </a:fontRef>
+        </p:style>
+      </p:cxnSp>
+      <p:sp>
+        <p:nvSpPr>
+          <p:cNvPr id="128" name="TextBox 127">
+            <a:extLst>
+              <a:ext uri="{FF2B5EF4-FFF2-40B4-BE49-F238E27FC236}">
+                <a16:creationId xmlns:a16="http://schemas.microsoft.com/office/drawing/2014/main" id="{C6B7F592-D999-8728-E573-46033D360567}"/>
+              </a:ext>
+            </a:extLst>
+          </p:cNvPr>
+          <p:cNvSpPr txBox="1"/>
+          <p:nvPr/>
+        </p:nvSpPr>
+        <p:spPr>
+          <a:xfrm>
+            <a:off x="11198038" y="2430140"/>
+            <a:ext cx="1023748" cy="261610"/>
+          </a:xfrm>
+          <a:prstGeom prst="rect">
+            <a:avLst/>
+          </a:prstGeom>
+          <a:noFill/>
+        </p:spPr>
+        <p:txBody>
+          <a:bodyPr wrap="square" rtlCol="0">
+            <a:spAutoFit/>
+          </a:bodyPr>
+          <a:lstStyle/>
+          <a:p>
+            <a:r>
+              <a:rPr lang="en-SG" sz="1100" dirty="0"/>
+              <a:t>Main thread</a:t>
+            </a:r>
+          </a:p>
+        </p:txBody>
+      </p:sp>
+      <p:cxnSp>
+        <p:nvCxnSpPr>
+          <p:cNvPr id="129" name="Connector: Elbow 128">
+            <a:extLst>
+              <a:ext uri="{FF2B5EF4-FFF2-40B4-BE49-F238E27FC236}">
+                <a16:creationId xmlns:a16="http://schemas.microsoft.com/office/drawing/2014/main" id="{152AFA19-AE6F-6491-3B15-2917EF40CE1A}"/>
+              </a:ext>
+            </a:extLst>
+          </p:cNvPr>
+          <p:cNvCxnSpPr>
+            <a:cxnSpLocks/>
+          </p:cNvCxnSpPr>
+          <p:nvPr/>
+        </p:nvCxnSpPr>
+        <p:spPr>
+          <a:xfrm rot="5400000" flipH="1" flipV="1">
+            <a:off x="9290921" y="3612748"/>
+            <a:ext cx="991739" cy="1"/>
+          </a:xfrm>
+          <a:prstGeom prst="bentConnector3">
+            <a:avLst>
+              <a:gd name="adj1" fmla="val 50000"/>
+            </a:avLst>
+          </a:prstGeom>
+          <a:ln w="12700">
+            <a:solidFill>
+              <a:schemeClr val="accent1">
+                <a:lumMod val="75000"/>
+              </a:schemeClr>
+            </a:solidFill>
+            <a:prstDash val="sysDash"/>
+            <a:tailEnd type="triangle"/>
+          </a:ln>
+        </p:spPr>
+        <p:style>
+          <a:lnRef idx="1">
+            <a:schemeClr val="accent1"/>
+          </a:lnRef>
+          <a:fillRef idx="0">
+            <a:schemeClr val="accent1"/>
+          </a:fillRef>
+          <a:effectRef idx="0">
+            <a:schemeClr val="accent1"/>
+          </a:effectRef>
+          <a:fontRef idx="minor">
+            <a:schemeClr val="tx1"/>
+          </a:fontRef>
+        </p:style>
+      </p:cxnSp>
+      <p:cxnSp>
+        <p:nvCxnSpPr>
+          <p:cNvPr id="132" name="Straight Arrow Connector 131">
+            <a:extLst>
+              <a:ext uri="{FF2B5EF4-FFF2-40B4-BE49-F238E27FC236}">
+                <a16:creationId xmlns:a16="http://schemas.microsoft.com/office/drawing/2014/main" id="{AF2C4C95-37AF-8EDD-BF7C-2E93443098DF}"/>
+              </a:ext>
+            </a:extLst>
+          </p:cNvPr>
+          <p:cNvCxnSpPr>
+            <a:cxnSpLocks/>
+          </p:cNvCxnSpPr>
+          <p:nvPr/>
+        </p:nvCxnSpPr>
+        <p:spPr>
+          <a:xfrm flipH="1">
+            <a:off x="9967862" y="3146581"/>
+            <a:ext cx="257" cy="953790"/>
+          </a:xfrm>
+          <a:prstGeom prst="straightConnector1">
+            <a:avLst/>
+          </a:prstGeom>
+          <a:ln>
+            <a:solidFill>
+              <a:schemeClr val="accent6">
+                <a:lumMod val="75000"/>
+              </a:schemeClr>
+            </a:solidFill>
+            <a:prstDash val="dash"/>
+            <a:tailEnd type="triangle"/>
+          </a:ln>
+        </p:spPr>
+        <p:style>
+          <a:lnRef idx="1">
+            <a:schemeClr val="accent1"/>
+          </a:lnRef>
+          <a:fillRef idx="0">
+            <a:schemeClr val="accent1"/>
+          </a:fillRef>
+          <a:effectRef idx="0">
+            <a:schemeClr val="accent1"/>
+          </a:effectRef>
+          <a:fontRef idx="minor">
+            <a:schemeClr val="tx1"/>
+          </a:fontRef>
+        </p:style>
+      </p:cxnSp>
+      <p:cxnSp>
+        <p:nvCxnSpPr>
+          <p:cNvPr id="136" name="Connector: Elbow 135">
+            <a:extLst>
+              <a:ext uri="{FF2B5EF4-FFF2-40B4-BE49-F238E27FC236}">
+                <a16:creationId xmlns:a16="http://schemas.microsoft.com/office/drawing/2014/main" id="{E73DA3ED-AF07-F41B-860F-AEFC9E526268}"/>
+              </a:ext>
+            </a:extLst>
+          </p:cNvPr>
+          <p:cNvCxnSpPr>
+            <a:cxnSpLocks/>
+            <a:stCxn id="23" idx="3"/>
+            <a:endCxn id="112" idx="2"/>
+          </p:cNvCxnSpPr>
+          <p:nvPr/>
+        </p:nvCxnSpPr>
+        <p:spPr>
+          <a:xfrm flipV="1">
+            <a:off x="8558861" y="4385013"/>
+            <a:ext cx="702026" cy="1013763"/>
+          </a:xfrm>
+          <a:prstGeom prst="bentConnector3">
+            <a:avLst>
+              <a:gd name="adj1" fmla="val 50000"/>
+            </a:avLst>
+          </a:prstGeom>
+          <a:ln w="12700">
+            <a:solidFill>
+              <a:schemeClr val="accent1">
+                <a:lumMod val="75000"/>
+              </a:schemeClr>
+            </a:solidFill>
+            <a:prstDash val="sysDash"/>
+            <a:tailEnd type="triangle"/>
+          </a:ln>
+        </p:spPr>
+        <p:style>
+          <a:lnRef idx="1">
+            <a:schemeClr val="accent1"/>
+          </a:lnRef>
+          <a:fillRef idx="0">
+            <a:schemeClr val="accent1"/>
+          </a:fillRef>
+          <a:effectRef idx="0">
+            <a:schemeClr val="accent1"/>
+          </a:effectRef>
+          <a:fontRef idx="minor">
+            <a:schemeClr val="tx1"/>
+          </a:fontRef>
+        </p:style>
+      </p:cxnSp>
+      <p:cxnSp>
+        <p:nvCxnSpPr>
+          <p:cNvPr id="141" name="Connector: Elbow 140">
+            <a:extLst>
+              <a:ext uri="{FF2B5EF4-FFF2-40B4-BE49-F238E27FC236}">
+                <a16:creationId xmlns:a16="http://schemas.microsoft.com/office/drawing/2014/main" id="{FB167114-A472-C856-A45A-900F1BD706AE}"/>
+              </a:ext>
+            </a:extLst>
+          </p:cNvPr>
+          <p:cNvCxnSpPr>
+            <a:cxnSpLocks/>
+            <a:stCxn id="112" idx="1"/>
+          </p:cNvCxnSpPr>
+          <p:nvPr/>
+        </p:nvCxnSpPr>
+        <p:spPr>
+          <a:xfrm rot="5400000">
+            <a:off x="8763102" y="4491706"/>
+            <a:ext cx="864739" cy="1259631"/>
+          </a:xfrm>
+          <a:prstGeom prst="bentConnector2">
+            <a:avLst/>
+          </a:prstGeom>
+          <a:ln>
+            <a:solidFill>
+              <a:schemeClr val="accent6">
+                <a:lumMod val="75000"/>
+              </a:schemeClr>
+            </a:solidFill>
+            <a:prstDash val="dash"/>
+            <a:tailEnd type="triangle"/>
+          </a:ln>
+        </p:spPr>
+        <p:style>
+          <a:lnRef idx="1">
+            <a:schemeClr val="accent1"/>
+          </a:lnRef>
+          <a:fillRef idx="0">
+            <a:schemeClr val="accent1"/>
+          </a:fillRef>
+          <a:effectRef idx="0">
+            <a:schemeClr val="accent1"/>
+          </a:effectRef>
+          <a:fontRef idx="minor">
+            <a:schemeClr val="tx1"/>
+          </a:fontRef>
+        </p:style>
+      </p:cxnSp>
+      <p:cxnSp>
+        <p:nvCxnSpPr>
+          <p:cNvPr id="144" name="Straight Arrow Connector 143">
+            <a:extLst>
+              <a:ext uri="{FF2B5EF4-FFF2-40B4-BE49-F238E27FC236}">
+                <a16:creationId xmlns:a16="http://schemas.microsoft.com/office/drawing/2014/main" id="{313FE385-168C-28FA-FFAE-D7B47332D5F5}"/>
+              </a:ext>
+            </a:extLst>
+          </p:cNvPr>
+          <p:cNvCxnSpPr>
+            <a:cxnSpLocks/>
+          </p:cNvCxnSpPr>
+          <p:nvPr/>
+        </p:nvCxnSpPr>
+        <p:spPr>
+          <a:xfrm flipH="1">
+            <a:off x="7123807" y="3612748"/>
+            <a:ext cx="282744" cy="0"/>
+          </a:xfrm>
+          <a:prstGeom prst="straightConnector1">
+            <a:avLst/>
+          </a:prstGeom>
+          <a:ln w="28575">
+            <a:solidFill>
+              <a:srgbClr val="7030A0"/>
+            </a:solidFill>
+            <a:tailEnd type="triangle"/>
+          </a:ln>
+        </p:spPr>
+        <p:style>
+          <a:lnRef idx="1">
+            <a:schemeClr val="accent1"/>
+          </a:lnRef>
+          <a:fillRef idx="0">
+            <a:schemeClr val="accent1"/>
+          </a:fillRef>
+          <a:effectRef idx="0">
+            <a:schemeClr val="accent1"/>
+          </a:effectRef>
+          <a:fontRef idx="minor">
+            <a:schemeClr val="tx1"/>
+          </a:fontRef>
+        </p:style>
+      </p:cxnSp>
+      <p:cxnSp>
+        <p:nvCxnSpPr>
+          <p:cNvPr id="148" name="Straight Arrow Connector 147">
+            <a:extLst>
+              <a:ext uri="{FF2B5EF4-FFF2-40B4-BE49-F238E27FC236}">
+                <a16:creationId xmlns:a16="http://schemas.microsoft.com/office/drawing/2014/main" id="{0F172A10-31A1-7E5A-B100-4D8D4D5EE299}"/>
+              </a:ext>
+            </a:extLst>
+          </p:cNvPr>
+          <p:cNvCxnSpPr>
+            <a:cxnSpLocks/>
+          </p:cNvCxnSpPr>
+          <p:nvPr/>
+        </p:nvCxnSpPr>
+        <p:spPr>
+          <a:xfrm>
+            <a:off x="11202227" y="3518613"/>
+            <a:ext cx="0" cy="309128"/>
+          </a:xfrm>
+          <a:prstGeom prst="straightConnector1">
+            <a:avLst/>
+          </a:prstGeom>
+          <a:ln w="19050">
+            <a:solidFill>
+              <a:schemeClr val="accent6">
+                <a:lumMod val="50000"/>
+              </a:schemeClr>
+            </a:solidFill>
+            <a:tailEnd type="triangle"/>
+          </a:ln>
+        </p:spPr>
+        <p:style>
+          <a:lnRef idx="1">
+            <a:schemeClr val="accent1"/>
+          </a:lnRef>
+          <a:fillRef idx="0">
+            <a:schemeClr val="accent1"/>
+          </a:fillRef>
+          <a:effectRef idx="0">
+            <a:schemeClr val="accent1"/>
+          </a:effectRef>
+          <a:fontRef idx="minor">
+            <a:schemeClr val="tx1"/>
+          </a:fontRef>
+        </p:style>
+      </p:cxnSp>
+      <p:sp>
+        <p:nvSpPr>
+          <p:cNvPr id="150" name="Rectangle 149">
+            <a:extLst>
+              <a:ext uri="{FF2B5EF4-FFF2-40B4-BE49-F238E27FC236}">
+                <a16:creationId xmlns:a16="http://schemas.microsoft.com/office/drawing/2014/main" id="{E77BAE04-6976-38DB-2510-1EB55E3935C3}"/>
+              </a:ext>
+            </a:extLst>
+          </p:cNvPr>
+          <p:cNvSpPr/>
+          <p:nvPr/>
+        </p:nvSpPr>
+        <p:spPr>
+          <a:xfrm>
+            <a:off x="11021156" y="3835219"/>
+            <a:ext cx="1063750" cy="430887"/>
+          </a:xfrm>
+          <a:prstGeom prst="rect">
+            <a:avLst/>
+          </a:prstGeom>
+          <a:solidFill>
+            <a:srgbClr val="C00000"/>
+          </a:solidFill>
+        </p:spPr>
+        <p:style>
+          <a:lnRef idx="2">
+            <a:schemeClr val="accent1">
+              <a:shade val="50000"/>
+            </a:schemeClr>
+          </a:lnRef>
+          <a:fillRef idx="1">
+            <a:schemeClr val="accent1"/>
+          </a:fillRef>
+          <a:effectRef idx="0">
+            <a:schemeClr val="accent1"/>
+          </a:effectRef>
+          <a:fontRef idx="minor">
+            <a:schemeClr val="lt1"/>
+          </a:fontRef>
+        </p:style>
+        <p:txBody>
+          <a:bodyPr rtlCol="0" anchor="ctr"/>
+          <a:lstStyle/>
+          <a:p>
+            <a:r>
+              <a:rPr lang="en-US" sz="1100" b="1" dirty="0"/>
+              <a:t>Malware main functions</a:t>
+            </a:r>
+          </a:p>
+        </p:txBody>
+      </p:sp>
+      <p:cxnSp>
+        <p:nvCxnSpPr>
+          <p:cNvPr id="151" name="Connector: Elbow 150">
+            <a:extLst>
+              <a:ext uri="{FF2B5EF4-FFF2-40B4-BE49-F238E27FC236}">
+                <a16:creationId xmlns:a16="http://schemas.microsoft.com/office/drawing/2014/main" id="{DADB53EB-E374-4743-54DC-649FE2B42FE2}"/>
+              </a:ext>
+            </a:extLst>
+          </p:cNvPr>
+          <p:cNvCxnSpPr>
+            <a:cxnSpLocks/>
+            <a:stCxn id="121" idx="1"/>
+            <a:endCxn id="118" idx="3"/>
+          </p:cNvCxnSpPr>
+          <p:nvPr/>
+        </p:nvCxnSpPr>
+        <p:spPr>
+          <a:xfrm rot="10800000">
+            <a:off x="10578536" y="2981490"/>
+            <a:ext cx="442621" cy="330184"/>
+          </a:xfrm>
+          <a:prstGeom prst="bentConnector3">
+            <a:avLst>
+              <a:gd name="adj1" fmla="val 50000"/>
+            </a:avLst>
+          </a:prstGeom>
+          <a:ln>
+            <a:solidFill>
+              <a:schemeClr val="accent6">
+                <a:lumMod val="75000"/>
+              </a:schemeClr>
+            </a:solidFill>
+            <a:prstDash val="dash"/>
+            <a:tailEnd type="triangle"/>
+          </a:ln>
+        </p:spPr>
+        <p:style>
+          <a:lnRef idx="1">
+            <a:schemeClr val="accent1"/>
+          </a:lnRef>
+          <a:fillRef idx="0">
+            <a:schemeClr val="accent1"/>
+          </a:fillRef>
+          <a:effectRef idx="0">
+            <a:schemeClr val="accent1"/>
+          </a:effectRef>
+          <a:fontRef idx="minor">
+            <a:schemeClr val="tx1"/>
+          </a:fontRef>
+        </p:style>
+      </p:cxnSp>
+      <p:cxnSp>
+        <p:nvCxnSpPr>
+          <p:cNvPr id="154" name="Connector: Elbow 153">
+            <a:extLst>
+              <a:ext uri="{FF2B5EF4-FFF2-40B4-BE49-F238E27FC236}">
+                <a16:creationId xmlns:a16="http://schemas.microsoft.com/office/drawing/2014/main" id="{A7FEBCE4-12B9-D66B-48CA-E89ABD35540D}"/>
+              </a:ext>
+            </a:extLst>
+          </p:cNvPr>
+          <p:cNvCxnSpPr>
+            <a:cxnSpLocks/>
+            <a:endCxn id="150" idx="1"/>
+          </p:cNvCxnSpPr>
+          <p:nvPr/>
+        </p:nvCxnSpPr>
+        <p:spPr>
+          <a:xfrm rot="16200000" flipH="1">
+            <a:off x="10245552" y="3275059"/>
+            <a:ext cx="880116" cy="671092"/>
+          </a:xfrm>
+          <a:prstGeom prst="bentConnector2">
+            <a:avLst/>
+          </a:prstGeom>
+          <a:ln w="12700">
+            <a:solidFill>
+              <a:schemeClr val="accent1">
+                <a:lumMod val="75000"/>
+              </a:schemeClr>
+            </a:solidFill>
+            <a:prstDash val="sysDash"/>
+            <a:tailEnd type="triangle"/>
+          </a:ln>
+        </p:spPr>
+        <p:style>
+          <a:lnRef idx="1">
+            <a:schemeClr val="accent1"/>
+          </a:lnRef>
+          <a:fillRef idx="0">
+            <a:schemeClr val="accent1"/>
+          </a:fillRef>
+          <a:effectRef idx="0">
+            <a:schemeClr val="accent1"/>
+          </a:effectRef>
+          <a:fontRef idx="minor">
+            <a:schemeClr val="tx1"/>
+          </a:fontRef>
+        </p:style>
+      </p:cxnSp>
+      <p:sp>
+        <p:nvSpPr>
+          <p:cNvPr id="157" name="TextBox 156">
+            <a:extLst>
+              <a:ext uri="{FF2B5EF4-FFF2-40B4-BE49-F238E27FC236}">
+                <a16:creationId xmlns:a16="http://schemas.microsoft.com/office/drawing/2014/main" id="{330589DC-ACF3-0E35-3A0E-6881FF6F9E98}"/>
+              </a:ext>
+            </a:extLst>
+          </p:cNvPr>
+          <p:cNvSpPr txBox="1"/>
+          <p:nvPr/>
+        </p:nvSpPr>
+        <p:spPr>
+          <a:xfrm>
+            <a:off x="9430658" y="1295258"/>
+            <a:ext cx="1925097" cy="461665"/>
+          </a:xfrm>
+          <a:prstGeom prst="rect">
+            <a:avLst/>
+          </a:prstGeom>
+          <a:noFill/>
+        </p:spPr>
+        <p:txBody>
+          <a:bodyPr wrap="square" rtlCol="0">
+            <a:spAutoFit/>
+          </a:bodyPr>
+          <a:lstStyle/>
+          <a:p>
+            <a:r>
+              <a:rPr lang="en-US" sz="1200" b="1" dirty="0">
+                <a:solidFill>
+                  <a:srgbClr val="C00000"/>
+                </a:solidFill>
+              </a:rPr>
+              <a:t>Malicious action emulation program workflow </a:t>
+            </a:r>
+            <a:endParaRPr lang="en-SG" sz="1200" b="1" dirty="0">
+              <a:solidFill>
+                <a:srgbClr val="C00000"/>
+              </a:solidFill>
+            </a:endParaRPr>
+          </a:p>
+        </p:txBody>
+      </p:sp>
+      <p:sp>
+        <p:nvSpPr>
+          <p:cNvPr id="158" name="TextBox 157">
+            <a:extLst>
+              <a:ext uri="{FF2B5EF4-FFF2-40B4-BE49-F238E27FC236}">
+                <a16:creationId xmlns:a16="http://schemas.microsoft.com/office/drawing/2014/main" id="{97E62AE0-D45A-BD76-A097-29E52B347514}"/>
+              </a:ext>
+            </a:extLst>
+          </p:cNvPr>
+          <p:cNvSpPr txBox="1"/>
+          <p:nvPr/>
+        </p:nvSpPr>
+        <p:spPr>
+          <a:xfrm>
+            <a:off x="694981" y="1220503"/>
+            <a:ext cx="1925097" cy="461665"/>
+          </a:xfrm>
+          <a:prstGeom prst="rect">
+            <a:avLst/>
+          </a:prstGeom>
+          <a:noFill/>
+        </p:spPr>
+        <p:txBody>
+          <a:bodyPr wrap="square" rtlCol="0">
+            <a:spAutoFit/>
+          </a:bodyPr>
+          <a:lstStyle/>
+          <a:p>
+            <a:r>
+              <a:rPr lang="en-US" sz="1200" b="1" dirty="0">
+                <a:solidFill>
+                  <a:schemeClr val="accent1">
+                    <a:lumMod val="75000"/>
+                  </a:schemeClr>
+                </a:solidFill>
+              </a:rPr>
+              <a:t>Red team user / program workflow </a:t>
+            </a:r>
+            <a:endParaRPr lang="en-SG" sz="1200" b="1" dirty="0">
+              <a:solidFill>
+                <a:schemeClr val="accent1">
+                  <a:lumMod val="75000"/>
+                </a:schemeClr>
+              </a:solidFill>
+            </a:endParaRPr>
+          </a:p>
+        </p:txBody>
+      </p:sp>
+      <p:cxnSp>
+        <p:nvCxnSpPr>
+          <p:cNvPr id="159" name="Straight Arrow Connector 158">
+            <a:extLst>
+              <a:ext uri="{FF2B5EF4-FFF2-40B4-BE49-F238E27FC236}">
+                <a16:creationId xmlns:a16="http://schemas.microsoft.com/office/drawing/2014/main" id="{E3CBC29D-53C8-988F-5B93-4FF4102D912F}"/>
+              </a:ext>
+            </a:extLst>
+          </p:cNvPr>
+          <p:cNvCxnSpPr>
+            <a:cxnSpLocks/>
+          </p:cNvCxnSpPr>
+          <p:nvPr/>
+        </p:nvCxnSpPr>
+        <p:spPr>
+          <a:xfrm>
+            <a:off x="3053272" y="6130621"/>
+            <a:ext cx="351080" cy="0"/>
+          </a:xfrm>
+          <a:prstGeom prst="straightConnector1">
+            <a:avLst/>
+          </a:prstGeom>
+          <a:ln>
+            <a:headEnd type="triangle"/>
+            <a:tailEnd type="triangle"/>
+          </a:ln>
+        </p:spPr>
+        <p:style>
+          <a:lnRef idx="1">
+            <a:schemeClr val="accent1"/>
+          </a:lnRef>
+          <a:fillRef idx="0">
+            <a:schemeClr val="accent1"/>
+          </a:fillRef>
+          <a:effectRef idx="0">
+            <a:schemeClr val="accent1"/>
+          </a:effectRef>
+          <a:fontRef idx="minor">
+            <a:schemeClr val="tx1"/>
+          </a:fontRef>
+        </p:style>
+      </p:cxnSp>
+      <p:cxnSp>
+        <p:nvCxnSpPr>
+          <p:cNvPr id="161" name="Straight Arrow Connector 160">
+            <a:extLst>
+              <a:ext uri="{FF2B5EF4-FFF2-40B4-BE49-F238E27FC236}">
+                <a16:creationId xmlns:a16="http://schemas.microsoft.com/office/drawing/2014/main" id="{65F67AB9-A5EA-B2BB-E6BA-4B206C5D540F}"/>
+              </a:ext>
+            </a:extLst>
+          </p:cNvPr>
+          <p:cNvCxnSpPr>
+            <a:cxnSpLocks/>
+          </p:cNvCxnSpPr>
+          <p:nvPr/>
+        </p:nvCxnSpPr>
+        <p:spPr>
+          <a:xfrm>
+            <a:off x="951826" y="6096069"/>
+            <a:ext cx="390259" cy="0"/>
+          </a:xfrm>
+          <a:prstGeom prst="straightConnector1">
+            <a:avLst/>
+          </a:prstGeom>
+          <a:ln>
+            <a:tailEnd type="triangle"/>
+          </a:ln>
+        </p:spPr>
+        <p:style>
+          <a:lnRef idx="1">
+            <a:schemeClr val="dk1"/>
+          </a:lnRef>
+          <a:fillRef idx="0">
+            <a:schemeClr val="dk1"/>
+          </a:fillRef>
+          <a:effectRef idx="0">
+            <a:schemeClr val="dk1"/>
+          </a:effectRef>
+          <a:fontRef idx="minor">
+            <a:schemeClr val="tx1"/>
+          </a:fontRef>
+        </p:style>
+      </p:cxnSp>
+      <p:sp>
+        <p:nvSpPr>
+          <p:cNvPr id="162" name="TextBox 161">
+            <a:extLst>
+              <a:ext uri="{FF2B5EF4-FFF2-40B4-BE49-F238E27FC236}">
+                <a16:creationId xmlns:a16="http://schemas.microsoft.com/office/drawing/2014/main" id="{91C9723B-BBF7-EFD0-8A82-8AC6321C2705}"/>
+              </a:ext>
+            </a:extLst>
+          </p:cNvPr>
+          <p:cNvSpPr txBox="1"/>
+          <p:nvPr/>
+        </p:nvSpPr>
+        <p:spPr>
+          <a:xfrm>
+            <a:off x="1342085" y="5978654"/>
+            <a:ext cx="1793483" cy="246221"/>
+          </a:xfrm>
+          <a:prstGeom prst="rect">
+            <a:avLst/>
+          </a:prstGeom>
+          <a:noFill/>
+        </p:spPr>
+        <p:txBody>
+          <a:bodyPr wrap="square" rtlCol="0">
+            <a:spAutoFit/>
+          </a:bodyPr>
+          <a:lstStyle/>
+          <a:p>
+            <a:r>
+              <a:rPr lang="en-US" sz="1000" b="1" dirty="0"/>
+              <a:t>Program execution flow </a:t>
+            </a:r>
+            <a:endParaRPr lang="en-SG" sz="1000" b="1" dirty="0"/>
+          </a:p>
+        </p:txBody>
+      </p:sp>
+      <p:sp>
+        <p:nvSpPr>
+          <p:cNvPr id="167" name="TextBox 166">
+            <a:extLst>
+              <a:ext uri="{FF2B5EF4-FFF2-40B4-BE49-F238E27FC236}">
+                <a16:creationId xmlns:a16="http://schemas.microsoft.com/office/drawing/2014/main" id="{AD60869D-5619-FBDA-DB5E-11076CDDF64A}"/>
+              </a:ext>
+            </a:extLst>
+          </p:cNvPr>
+          <p:cNvSpPr txBox="1"/>
+          <p:nvPr/>
+        </p:nvSpPr>
+        <p:spPr>
+          <a:xfrm>
+            <a:off x="3425581" y="6003934"/>
+            <a:ext cx="1793483" cy="246221"/>
+          </a:xfrm>
+          <a:prstGeom prst="rect">
+            <a:avLst/>
+          </a:prstGeom>
+          <a:noFill/>
+        </p:spPr>
+        <p:txBody>
+          <a:bodyPr wrap="square" rtlCol="0">
+            <a:spAutoFit/>
+          </a:bodyPr>
+          <a:lstStyle/>
+          <a:p>
+            <a:r>
+              <a:rPr lang="en-US" sz="1000" b="1" dirty="0"/>
+              <a:t>Red team communication</a:t>
+            </a:r>
+            <a:endParaRPr lang="en-SG" sz="1000" b="1" dirty="0"/>
+          </a:p>
+        </p:txBody>
+      </p:sp>
+      <p:cxnSp>
+        <p:nvCxnSpPr>
+          <p:cNvPr id="168" name="Straight Arrow Connector 167">
+            <a:extLst>
+              <a:ext uri="{FF2B5EF4-FFF2-40B4-BE49-F238E27FC236}">
+                <a16:creationId xmlns:a16="http://schemas.microsoft.com/office/drawing/2014/main" id="{BFC1D2ED-D582-C15A-0A83-A086C8ED7B5C}"/>
+              </a:ext>
+            </a:extLst>
+          </p:cNvPr>
+          <p:cNvCxnSpPr>
+            <a:cxnSpLocks/>
+          </p:cNvCxnSpPr>
+          <p:nvPr/>
+        </p:nvCxnSpPr>
+        <p:spPr>
+          <a:xfrm>
+            <a:off x="5125531" y="6145204"/>
+            <a:ext cx="293088" cy="0"/>
+          </a:xfrm>
+          <a:prstGeom prst="straightConnector1">
+            <a:avLst/>
+          </a:prstGeom>
+          <a:ln w="19050">
+            <a:solidFill>
+              <a:srgbClr val="0070C0"/>
+            </a:solidFill>
+            <a:prstDash val="sysDash"/>
+            <a:tailEnd type="triangle"/>
+          </a:ln>
+        </p:spPr>
+        <p:style>
+          <a:lnRef idx="1">
+            <a:schemeClr val="accent1"/>
+          </a:lnRef>
+          <a:fillRef idx="0">
+            <a:schemeClr val="accent1"/>
+          </a:fillRef>
+          <a:effectRef idx="0">
+            <a:schemeClr val="accent1"/>
+          </a:effectRef>
+          <a:fontRef idx="minor">
+            <a:schemeClr val="tx1"/>
+          </a:fontRef>
+        </p:style>
+      </p:cxnSp>
+      <p:sp>
+        <p:nvSpPr>
+          <p:cNvPr id="170" name="TextBox 169">
+            <a:extLst>
+              <a:ext uri="{FF2B5EF4-FFF2-40B4-BE49-F238E27FC236}">
+                <a16:creationId xmlns:a16="http://schemas.microsoft.com/office/drawing/2014/main" id="{509A2FDA-0F54-C698-D5B6-5DA9F29E8859}"/>
+              </a:ext>
+            </a:extLst>
+          </p:cNvPr>
+          <p:cNvSpPr txBox="1"/>
+          <p:nvPr/>
+        </p:nvSpPr>
+        <p:spPr>
+          <a:xfrm>
+            <a:off x="5390699" y="6022093"/>
+            <a:ext cx="1936044" cy="246221"/>
+          </a:xfrm>
+          <a:prstGeom prst="rect">
+            <a:avLst/>
+          </a:prstGeom>
+          <a:noFill/>
+        </p:spPr>
+        <p:txBody>
+          <a:bodyPr wrap="square" rtlCol="0">
+            <a:spAutoFit/>
+          </a:bodyPr>
+          <a:lstStyle/>
+          <a:p>
+            <a:r>
+              <a:rPr lang="en-US" sz="1000" b="1" dirty="0"/>
+              <a:t>Malware tasks assignment flow</a:t>
+            </a:r>
+            <a:endParaRPr lang="en-SG" sz="1000" b="1" dirty="0"/>
+          </a:p>
+        </p:txBody>
+      </p:sp>
+      <p:cxnSp>
+        <p:nvCxnSpPr>
+          <p:cNvPr id="171" name="Straight Arrow Connector 170">
+            <a:extLst>
+              <a:ext uri="{FF2B5EF4-FFF2-40B4-BE49-F238E27FC236}">
+                <a16:creationId xmlns:a16="http://schemas.microsoft.com/office/drawing/2014/main" id="{C4ECD996-008E-A6B7-37E6-A7AF8711BDC6}"/>
+              </a:ext>
+            </a:extLst>
+          </p:cNvPr>
+          <p:cNvCxnSpPr>
+            <a:cxnSpLocks/>
+          </p:cNvCxnSpPr>
+          <p:nvPr/>
+        </p:nvCxnSpPr>
+        <p:spPr>
+          <a:xfrm>
+            <a:off x="7390675" y="6166941"/>
+            <a:ext cx="293088" cy="0"/>
+          </a:xfrm>
+          <a:prstGeom prst="straightConnector1">
+            <a:avLst/>
+          </a:prstGeom>
+          <a:ln w="19050">
+            <a:solidFill>
+              <a:schemeClr val="accent6">
+                <a:lumMod val="75000"/>
+              </a:schemeClr>
+            </a:solidFill>
+            <a:prstDash val="sysDash"/>
+            <a:tailEnd type="triangle"/>
+          </a:ln>
+        </p:spPr>
+        <p:style>
+          <a:lnRef idx="1">
+            <a:schemeClr val="accent1"/>
+          </a:lnRef>
+          <a:fillRef idx="0">
+            <a:schemeClr val="accent1"/>
+          </a:fillRef>
+          <a:effectRef idx="0">
+            <a:schemeClr val="accent1"/>
+          </a:effectRef>
+          <a:fontRef idx="minor">
+            <a:schemeClr val="tx1"/>
+          </a:fontRef>
+        </p:style>
+      </p:cxnSp>
+      <p:sp>
+        <p:nvSpPr>
+          <p:cNvPr id="172" name="TextBox 171">
+            <a:extLst>
+              <a:ext uri="{FF2B5EF4-FFF2-40B4-BE49-F238E27FC236}">
+                <a16:creationId xmlns:a16="http://schemas.microsoft.com/office/drawing/2014/main" id="{7E95235A-5B69-B613-7148-416C934BA6CC}"/>
+              </a:ext>
+            </a:extLst>
+          </p:cNvPr>
+          <p:cNvSpPr txBox="1"/>
+          <p:nvPr/>
+        </p:nvSpPr>
+        <p:spPr>
+          <a:xfrm>
+            <a:off x="7692742" y="6031256"/>
+            <a:ext cx="1936044" cy="246221"/>
+          </a:xfrm>
+          <a:prstGeom prst="rect">
+            <a:avLst/>
+          </a:prstGeom>
+          <a:noFill/>
+        </p:spPr>
+        <p:txBody>
+          <a:bodyPr wrap="square" rtlCol="0">
+            <a:spAutoFit/>
+          </a:bodyPr>
+          <a:lstStyle/>
+          <a:p>
+            <a:r>
+              <a:rPr lang="en-US" sz="1000" b="1" dirty="0"/>
+              <a:t>Malware state data flow</a:t>
+            </a:r>
+            <a:endParaRPr lang="en-SG" sz="1000" b="1" dirty="0"/>
+          </a:p>
+        </p:txBody>
+      </p:sp>
+      <p:cxnSp>
+        <p:nvCxnSpPr>
+          <p:cNvPr id="173" name="Straight Arrow Connector 172">
+            <a:extLst>
+              <a:ext uri="{FF2B5EF4-FFF2-40B4-BE49-F238E27FC236}">
+                <a16:creationId xmlns:a16="http://schemas.microsoft.com/office/drawing/2014/main" id="{F9CACC38-251D-921D-FA2B-6F5A9C64D619}"/>
+              </a:ext>
+            </a:extLst>
+          </p:cNvPr>
+          <p:cNvCxnSpPr>
+            <a:cxnSpLocks/>
+          </p:cNvCxnSpPr>
+          <p:nvPr/>
+        </p:nvCxnSpPr>
+        <p:spPr>
+          <a:xfrm flipH="1">
+            <a:off x="9430658" y="6145204"/>
+            <a:ext cx="282744" cy="0"/>
+          </a:xfrm>
+          <a:prstGeom prst="straightConnector1">
+            <a:avLst/>
+          </a:prstGeom>
+          <a:ln w="28575">
+            <a:solidFill>
+              <a:srgbClr val="7030A0"/>
+            </a:solidFill>
+            <a:tailEnd type="triangle"/>
+          </a:ln>
+        </p:spPr>
+        <p:style>
+          <a:lnRef idx="1">
+            <a:schemeClr val="accent1"/>
+          </a:lnRef>
+          <a:fillRef idx="0">
+            <a:schemeClr val="accent1"/>
+          </a:fillRef>
+          <a:effectRef idx="0">
+            <a:schemeClr val="accent1"/>
+          </a:effectRef>
+          <a:fontRef idx="minor">
+            <a:schemeClr val="tx1"/>
+          </a:fontRef>
+        </p:style>
+      </p:cxnSp>
+      <p:sp>
+        <p:nvSpPr>
+          <p:cNvPr id="174" name="TextBox 173">
+            <a:extLst>
+              <a:ext uri="{FF2B5EF4-FFF2-40B4-BE49-F238E27FC236}">
+                <a16:creationId xmlns:a16="http://schemas.microsoft.com/office/drawing/2014/main" id="{EF275A41-76DF-04E0-261F-5B7F715DA158}"/>
+              </a:ext>
+            </a:extLst>
+          </p:cNvPr>
+          <p:cNvSpPr txBox="1"/>
+          <p:nvPr/>
+        </p:nvSpPr>
+        <p:spPr>
+          <a:xfrm>
+            <a:off x="9694062" y="6003933"/>
+            <a:ext cx="1936044" cy="246221"/>
+          </a:xfrm>
+          <a:prstGeom prst="rect">
+            <a:avLst/>
+          </a:prstGeom>
+          <a:noFill/>
+        </p:spPr>
+        <p:txBody>
+          <a:bodyPr wrap="square" rtlCol="0">
+            <a:spAutoFit/>
+          </a:bodyPr>
+          <a:lstStyle/>
+          <a:p>
+            <a:r>
+              <a:rPr lang="en-US" sz="1000" b="1" dirty="0"/>
+              <a:t>Internal function call</a:t>
+            </a:r>
+            <a:endParaRPr lang="en-SG" sz="1000" b="1" dirty="0"/>
+          </a:p>
+        </p:txBody>
+      </p:sp>
+      <p:cxnSp>
+        <p:nvCxnSpPr>
+          <p:cNvPr id="175" name="Straight Arrow Connector 174">
+            <a:extLst>
+              <a:ext uri="{FF2B5EF4-FFF2-40B4-BE49-F238E27FC236}">
+                <a16:creationId xmlns:a16="http://schemas.microsoft.com/office/drawing/2014/main" id="{9E2142F1-2715-1BEA-CAD3-CF550B8D898A}"/>
+              </a:ext>
+            </a:extLst>
+          </p:cNvPr>
+          <p:cNvCxnSpPr>
+            <a:cxnSpLocks/>
+          </p:cNvCxnSpPr>
+          <p:nvPr/>
+        </p:nvCxnSpPr>
+        <p:spPr>
+          <a:xfrm>
+            <a:off x="7051017" y="3961358"/>
+            <a:ext cx="0" cy="1256699"/>
+          </a:xfrm>
+          <a:prstGeom prst="straightConnector1">
+            <a:avLst/>
+          </a:prstGeom>
+          <a:ln w="28575">
+            <a:solidFill>
+              <a:srgbClr val="7030A0"/>
+            </a:solidFill>
+            <a:tailEnd type="triangle"/>
+          </a:ln>
+        </p:spPr>
+        <p:style>
+          <a:lnRef idx="1">
+            <a:schemeClr val="accent1"/>
+          </a:lnRef>
+          <a:fillRef idx="0">
+            <a:schemeClr val="accent1"/>
+          </a:fillRef>
+          <a:effectRef idx="0">
+            <a:schemeClr val="accent1"/>
+          </a:effectRef>
+          <a:fontRef idx="minor">
+            <a:schemeClr val="tx1"/>
+          </a:fontRef>
+        </p:style>
+      </p:cxnSp>
+      <p:cxnSp>
+        <p:nvCxnSpPr>
+          <p:cNvPr id="179" name="Straight Arrow Connector 178">
+            <a:extLst>
+              <a:ext uri="{FF2B5EF4-FFF2-40B4-BE49-F238E27FC236}">
+                <a16:creationId xmlns:a16="http://schemas.microsoft.com/office/drawing/2014/main" id="{81FE3935-8B32-E464-74C4-EE6BE2D81B46}"/>
+              </a:ext>
+            </a:extLst>
+          </p:cNvPr>
+          <p:cNvCxnSpPr>
+            <a:cxnSpLocks/>
+          </p:cNvCxnSpPr>
+          <p:nvPr/>
+        </p:nvCxnSpPr>
+        <p:spPr>
+          <a:xfrm>
+            <a:off x="8328129" y="4050662"/>
+            <a:ext cx="0" cy="1145702"/>
+          </a:xfrm>
+          <a:prstGeom prst="straightConnector1">
+            <a:avLst/>
+          </a:prstGeom>
+          <a:ln w="28575">
+            <a:solidFill>
+              <a:srgbClr val="7030A0"/>
+            </a:solidFill>
+            <a:tailEnd type="triangle"/>
+          </a:ln>
+        </p:spPr>
+        <p:style>
+          <a:lnRef idx="1">
+            <a:schemeClr val="accent1"/>
+          </a:lnRef>
+          <a:fillRef idx="0">
+            <a:schemeClr val="accent1"/>
+          </a:fillRef>
+          <a:effectRef idx="0">
+            <a:schemeClr val="accent1"/>
+          </a:effectRef>
+          <a:fontRef idx="minor">
+            <a:schemeClr val="tx1"/>
+          </a:fontRef>
+        </p:style>
+      </p:cxnSp>
     </p:spTree>
     <p:extLst>
       <p:ext uri="{BB962C8B-B14F-4D97-AF65-F5344CB8AC3E}">

</xml_diff>

<commit_message>
update the readme file usage section.
</commit_message>
<xml_diff>
--- a/doc/designDoc.pptx
+++ b/doc/designDoc.pptx
@@ -5,7 +5,7 @@
     <p:sldMasterId id="2147483648" r:id="rId1"/>
   </p:sldMasterIdLst>
   <p:notesMasterIdLst>
-    <p:notesMasterId r:id="rId17"/>
+    <p:notesMasterId r:id="rId18"/>
   </p:notesMasterIdLst>
   <p:sldIdLst>
     <p:sldId id="256" r:id="rId2"/>
@@ -23,6 +23,7 @@
     <p:sldId id="300" r:id="rId14"/>
     <p:sldId id="301" r:id="rId15"/>
     <p:sldId id="302" r:id="rId16"/>
+    <p:sldId id="305" r:id="rId17"/>
   </p:sldIdLst>
   <p:sldSz cx="12192000" cy="6858000"/>
   <p:notesSz cx="6858000" cy="9144000"/>
@@ -17069,6 +17070,36 @@
 </p:sld>
 </file>
 
+<file path=ppt/slides/slide16.xml><?xml version="1.0" encoding="utf-8"?>
+<p:sld xmlns:a="http://schemas.openxmlformats.org/drawingml/2006/main" xmlns:r="http://schemas.openxmlformats.org/officeDocument/2006/relationships" xmlns:p="http://schemas.openxmlformats.org/presentationml/2006/main">
+  <p:cSld>
+    <p:spTree>
+      <p:nvGrpSpPr>
+        <p:cNvPr id="1" name=""/>
+        <p:cNvGrpSpPr/>
+        <p:nvPr/>
+      </p:nvGrpSpPr>
+      <p:grpSpPr>
+        <a:xfrm>
+          <a:off x="0" y="0"/>
+          <a:ext cx="0" cy="0"/>
+          <a:chOff x="0" y="0"/>
+          <a:chExt cx="0" cy="0"/>
+        </a:xfrm>
+      </p:grpSpPr>
+    </p:spTree>
+    <p:extLst>
+      <p:ext uri="{BB962C8B-B14F-4D97-AF65-F5344CB8AC3E}">
+        <p14:creationId xmlns:p14="http://schemas.microsoft.com/office/powerpoint/2010/main" val="1192740326"/>
+      </p:ext>
+    </p:extLst>
+  </p:cSld>
+  <p:clrMapOvr>
+    <a:masterClrMapping/>
+  </p:clrMapOvr>
+</p:sld>
+</file>
+
 <file path=ppt/slides/slide2.xml><?xml version="1.0" encoding="utf-8"?>
 <p:sld xmlns:a="http://schemas.openxmlformats.org/drawingml/2006/main" xmlns:r="http://schemas.openxmlformats.org/officeDocument/2006/relationships" xmlns:p="http://schemas.openxmlformats.org/presentationml/2006/main">
   <p:cSld>

</xml_diff>

<commit_message>
Added the false data injection background knowledge.
</commit_message>
<xml_diff>
--- a/doc/designDoc.pptx
+++ b/doc/designDoc.pptx
@@ -2095,7 +2095,7 @@
           <a:p>
             <a:fld id="{30462BEA-6C65-41CB-B521-7C9DB089D720}" type="datetimeFigureOut">
               <a:rPr lang="en-SG" smtClean="0"/>
-              <a:t>17/12/2023</a:t>
+              <a:t>1/1/2024</a:t>
             </a:fld>
             <a:endParaRPr lang="en-SG"/>
           </a:p>
@@ -2680,7 +2680,7 @@
           <a:p>
             <a:fld id="{435F7F91-36DA-4AC3-B0AA-56077EB606D8}" type="datetimeFigureOut">
               <a:rPr lang="en-SG" smtClean="0"/>
-              <a:t>17/12/2023</a:t>
+              <a:t>1/1/2024</a:t>
             </a:fld>
             <a:endParaRPr lang="en-SG"/>
           </a:p>
@@ -2880,7 +2880,7 @@
           <a:p>
             <a:fld id="{435F7F91-36DA-4AC3-B0AA-56077EB606D8}" type="datetimeFigureOut">
               <a:rPr lang="en-SG" smtClean="0"/>
-              <a:t>17/12/2023</a:t>
+              <a:t>1/1/2024</a:t>
             </a:fld>
             <a:endParaRPr lang="en-SG"/>
           </a:p>
@@ -3090,7 +3090,7 @@
           <a:p>
             <a:fld id="{435F7F91-36DA-4AC3-B0AA-56077EB606D8}" type="datetimeFigureOut">
               <a:rPr lang="en-SG" smtClean="0"/>
-              <a:t>17/12/2023</a:t>
+              <a:t>1/1/2024</a:t>
             </a:fld>
             <a:endParaRPr lang="en-SG"/>
           </a:p>
@@ -3290,7 +3290,7 @@
           <a:p>
             <a:fld id="{435F7F91-36DA-4AC3-B0AA-56077EB606D8}" type="datetimeFigureOut">
               <a:rPr lang="en-SG" smtClean="0"/>
-              <a:t>17/12/2023</a:t>
+              <a:t>1/1/2024</a:t>
             </a:fld>
             <a:endParaRPr lang="en-SG"/>
           </a:p>
@@ -3566,7 +3566,7 @@
           <a:p>
             <a:fld id="{435F7F91-36DA-4AC3-B0AA-56077EB606D8}" type="datetimeFigureOut">
               <a:rPr lang="en-SG" smtClean="0"/>
-              <a:t>17/12/2023</a:t>
+              <a:t>1/1/2024</a:t>
             </a:fld>
             <a:endParaRPr lang="en-SG"/>
           </a:p>
@@ -3834,7 +3834,7 @@
           <a:p>
             <a:fld id="{435F7F91-36DA-4AC3-B0AA-56077EB606D8}" type="datetimeFigureOut">
               <a:rPr lang="en-SG" smtClean="0"/>
-              <a:t>17/12/2023</a:t>
+              <a:t>1/1/2024</a:t>
             </a:fld>
             <a:endParaRPr lang="en-SG"/>
           </a:p>
@@ -4249,7 +4249,7 @@
           <a:p>
             <a:fld id="{435F7F91-36DA-4AC3-B0AA-56077EB606D8}" type="datetimeFigureOut">
               <a:rPr lang="en-SG" smtClean="0"/>
-              <a:t>17/12/2023</a:t>
+              <a:t>1/1/2024</a:t>
             </a:fld>
             <a:endParaRPr lang="en-SG"/>
           </a:p>
@@ -4391,7 +4391,7 @@
           <a:p>
             <a:fld id="{435F7F91-36DA-4AC3-B0AA-56077EB606D8}" type="datetimeFigureOut">
               <a:rPr lang="en-SG" smtClean="0"/>
-              <a:t>17/12/2023</a:t>
+              <a:t>1/1/2024</a:t>
             </a:fld>
             <a:endParaRPr lang="en-SG"/>
           </a:p>
@@ -4504,7 +4504,7 @@
           <a:p>
             <a:fld id="{435F7F91-36DA-4AC3-B0AA-56077EB606D8}" type="datetimeFigureOut">
               <a:rPr lang="en-SG" smtClean="0"/>
-              <a:t>17/12/2023</a:t>
+              <a:t>1/1/2024</a:t>
             </a:fld>
             <a:endParaRPr lang="en-SG"/>
           </a:p>
@@ -4817,7 +4817,7 @@
           <a:p>
             <a:fld id="{435F7F91-36DA-4AC3-B0AA-56077EB606D8}" type="datetimeFigureOut">
               <a:rPr lang="en-SG" smtClean="0"/>
-              <a:t>17/12/2023</a:t>
+              <a:t>1/1/2024</a:t>
             </a:fld>
             <a:endParaRPr lang="en-SG"/>
           </a:p>
@@ -5106,7 +5106,7 @@
           <a:p>
             <a:fld id="{435F7F91-36DA-4AC3-B0AA-56077EB606D8}" type="datetimeFigureOut">
               <a:rPr lang="en-SG" smtClean="0"/>
-              <a:t>17/12/2023</a:t>
+              <a:t>1/1/2024</a:t>
             </a:fld>
             <a:endParaRPr lang="en-SG"/>
           </a:p>
@@ -5349,7 +5349,7 @@
           <a:p>
             <a:fld id="{435F7F91-36DA-4AC3-B0AA-56077EB606D8}" type="datetimeFigureOut">
               <a:rPr lang="en-SG" smtClean="0"/>
-              <a:t>17/12/2023</a:t>
+              <a:t>1/1/2024</a:t>
             </a:fld>
             <a:endParaRPr lang="en-SG"/>
           </a:p>

</xml_diff>

<commit_message>
C2 emulator update : 1. Added the API for client get the last task execution result, 2 Change the postTask API to use the malware ID instead of index. 3 update the readme file to added program setup section.
</commit_message>
<xml_diff>
--- a/doc/designDoc.pptx
+++ b/doc/designDoc.pptx
@@ -2095,7 +2095,7 @@
           <a:p>
             <a:fld id="{30462BEA-6C65-41CB-B521-7C9DB089D720}" type="datetimeFigureOut">
               <a:rPr lang="en-SG" smtClean="0"/>
-              <a:t>1/1/2024</a:t>
+              <a:t>12/1/2024</a:t>
             </a:fld>
             <a:endParaRPr lang="en-SG"/>
           </a:p>
@@ -2680,7 +2680,7 @@
           <a:p>
             <a:fld id="{435F7F91-36DA-4AC3-B0AA-56077EB606D8}" type="datetimeFigureOut">
               <a:rPr lang="en-SG" smtClean="0"/>
-              <a:t>1/1/2024</a:t>
+              <a:t>12/1/2024</a:t>
             </a:fld>
             <a:endParaRPr lang="en-SG"/>
           </a:p>
@@ -2880,7 +2880,7 @@
           <a:p>
             <a:fld id="{435F7F91-36DA-4AC3-B0AA-56077EB606D8}" type="datetimeFigureOut">
               <a:rPr lang="en-SG" smtClean="0"/>
-              <a:t>1/1/2024</a:t>
+              <a:t>12/1/2024</a:t>
             </a:fld>
             <a:endParaRPr lang="en-SG"/>
           </a:p>
@@ -3090,7 +3090,7 @@
           <a:p>
             <a:fld id="{435F7F91-36DA-4AC3-B0AA-56077EB606D8}" type="datetimeFigureOut">
               <a:rPr lang="en-SG" smtClean="0"/>
-              <a:t>1/1/2024</a:t>
+              <a:t>12/1/2024</a:t>
             </a:fld>
             <a:endParaRPr lang="en-SG"/>
           </a:p>
@@ -3290,7 +3290,7 @@
           <a:p>
             <a:fld id="{435F7F91-36DA-4AC3-B0AA-56077EB606D8}" type="datetimeFigureOut">
               <a:rPr lang="en-SG" smtClean="0"/>
-              <a:t>1/1/2024</a:t>
+              <a:t>12/1/2024</a:t>
             </a:fld>
             <a:endParaRPr lang="en-SG"/>
           </a:p>
@@ -3566,7 +3566,7 @@
           <a:p>
             <a:fld id="{435F7F91-36DA-4AC3-B0AA-56077EB606D8}" type="datetimeFigureOut">
               <a:rPr lang="en-SG" smtClean="0"/>
-              <a:t>1/1/2024</a:t>
+              <a:t>12/1/2024</a:t>
             </a:fld>
             <a:endParaRPr lang="en-SG"/>
           </a:p>
@@ -3834,7 +3834,7 @@
           <a:p>
             <a:fld id="{435F7F91-36DA-4AC3-B0AA-56077EB606D8}" type="datetimeFigureOut">
               <a:rPr lang="en-SG" smtClean="0"/>
-              <a:t>1/1/2024</a:t>
+              <a:t>12/1/2024</a:t>
             </a:fld>
             <a:endParaRPr lang="en-SG"/>
           </a:p>
@@ -4249,7 +4249,7 @@
           <a:p>
             <a:fld id="{435F7F91-36DA-4AC3-B0AA-56077EB606D8}" type="datetimeFigureOut">
               <a:rPr lang="en-SG" smtClean="0"/>
-              <a:t>1/1/2024</a:t>
+              <a:t>12/1/2024</a:t>
             </a:fld>
             <a:endParaRPr lang="en-SG"/>
           </a:p>
@@ -4391,7 +4391,7 @@
           <a:p>
             <a:fld id="{435F7F91-36DA-4AC3-B0AA-56077EB606D8}" type="datetimeFigureOut">
               <a:rPr lang="en-SG" smtClean="0"/>
-              <a:t>1/1/2024</a:t>
+              <a:t>12/1/2024</a:t>
             </a:fld>
             <a:endParaRPr lang="en-SG"/>
           </a:p>
@@ -4504,7 +4504,7 @@
           <a:p>
             <a:fld id="{435F7F91-36DA-4AC3-B0AA-56077EB606D8}" type="datetimeFigureOut">
               <a:rPr lang="en-SG" smtClean="0"/>
-              <a:t>1/1/2024</a:t>
+              <a:t>12/1/2024</a:t>
             </a:fld>
             <a:endParaRPr lang="en-SG"/>
           </a:p>
@@ -4817,7 +4817,7 @@
           <a:p>
             <a:fld id="{435F7F91-36DA-4AC3-B0AA-56077EB606D8}" type="datetimeFigureOut">
               <a:rPr lang="en-SG" smtClean="0"/>
-              <a:t>1/1/2024</a:t>
+              <a:t>12/1/2024</a:t>
             </a:fld>
             <a:endParaRPr lang="en-SG"/>
           </a:p>
@@ -5106,7 +5106,7 @@
           <a:p>
             <a:fld id="{435F7F91-36DA-4AC3-B0AA-56077EB606D8}" type="datetimeFigureOut">
               <a:rPr lang="en-SG" smtClean="0"/>
-              <a:t>1/1/2024</a:t>
+              <a:t>12/1/2024</a:t>
             </a:fld>
             <a:endParaRPr lang="en-SG"/>
           </a:p>
@@ -5349,7 +5349,7 @@
           <a:p>
             <a:fld id="{435F7F91-36DA-4AC3-B0AA-56077EB606D8}" type="datetimeFigureOut">
               <a:rPr lang="en-SG" smtClean="0"/>
-              <a:t>1/1/2024</a:t>
+              <a:t>12/1/2024</a:t>
             </a:fld>
             <a:endParaRPr lang="en-SG"/>
           </a:p>
@@ -37817,13 +37817,13 @@
           <p:nvPr/>
         </p:nvCxnSpPr>
         <p:spPr>
-          <a:xfrm>
-            <a:off x="5274900" y="2397648"/>
-            <a:ext cx="1234104" cy="1153516"/>
+          <a:xfrm rot="16200000" flipH="1">
+            <a:off x="5235671" y="2277831"/>
+            <a:ext cx="1279132" cy="1267534"/>
           </a:xfrm>
           <a:prstGeom prst="bentConnector3">
             <a:avLst>
-              <a:gd name="adj1" fmla="val 100384"/>
+              <a:gd name="adj1" fmla="val -3614"/>
             </a:avLst>
           </a:prstGeom>
           <a:ln>
@@ -40163,6 +40163,149 @@
             <a:solidFill>
               <a:srgbClr val="7030A0"/>
             </a:solidFill>
+            <a:tailEnd type="triangle"/>
+          </a:ln>
+        </p:spPr>
+        <p:style>
+          <a:lnRef idx="1">
+            <a:schemeClr val="accent1"/>
+          </a:lnRef>
+          <a:fillRef idx="0">
+            <a:schemeClr val="accent1"/>
+          </a:fillRef>
+          <a:effectRef idx="0">
+            <a:schemeClr val="accent1"/>
+          </a:effectRef>
+          <a:fontRef idx="minor">
+            <a:schemeClr val="tx1"/>
+          </a:fontRef>
+        </p:style>
+      </p:cxnSp>
+      <p:sp>
+        <p:nvSpPr>
+          <p:cNvPr id="2" name="Rectangle 1">
+            <a:extLst>
+              <a:ext uri="{FF2B5EF4-FFF2-40B4-BE49-F238E27FC236}">
+                <a16:creationId xmlns:a16="http://schemas.microsoft.com/office/drawing/2014/main" id="{D1248B0A-C34F-BA44-BD16-9805838B5DC0}"/>
+              </a:ext>
+            </a:extLst>
+          </p:cNvPr>
+          <p:cNvSpPr/>
+          <p:nvPr/>
+        </p:nvSpPr>
+        <p:spPr>
+          <a:xfrm>
+            <a:off x="3232448" y="3111150"/>
+            <a:ext cx="1107248" cy="294686"/>
+          </a:xfrm>
+          <a:prstGeom prst="rect">
+            <a:avLst/>
+          </a:prstGeom>
+          <a:solidFill>
+            <a:schemeClr val="accent6">
+              <a:lumMod val="75000"/>
+            </a:schemeClr>
+          </a:solidFill>
+        </p:spPr>
+        <p:style>
+          <a:lnRef idx="2">
+            <a:schemeClr val="accent1">
+              <a:shade val="50000"/>
+            </a:schemeClr>
+          </a:lnRef>
+          <a:fillRef idx="1">
+            <a:schemeClr val="accent1"/>
+          </a:fillRef>
+          <a:effectRef idx="0">
+            <a:schemeClr val="accent1"/>
+          </a:effectRef>
+          <a:fontRef idx="minor">
+            <a:schemeClr val="lt1"/>
+          </a:fontRef>
+        </p:style>
+        <p:txBody>
+          <a:bodyPr rtlCol="0" anchor="ctr"/>
+          <a:lstStyle/>
+          <a:p>
+            <a:r>
+              <a:rPr lang="en-US" sz="1100" b="1" dirty="0" err="1"/>
+              <a:t>SocketIO</a:t>
+            </a:r>
+            <a:r>
+              <a:rPr lang="en-US" sz="1100" b="1" dirty="0"/>
+              <a:t> Server</a:t>
+            </a:r>
+            <a:endParaRPr lang="en-SG" sz="1100" b="1" dirty="0"/>
+          </a:p>
+        </p:txBody>
+      </p:sp>
+      <p:cxnSp>
+        <p:nvCxnSpPr>
+          <p:cNvPr id="12" name="Connector: Elbow 11">
+            <a:extLst>
+              <a:ext uri="{FF2B5EF4-FFF2-40B4-BE49-F238E27FC236}">
+                <a16:creationId xmlns:a16="http://schemas.microsoft.com/office/drawing/2014/main" id="{9F53A701-84D5-16A5-6A32-FB5496006A13}"/>
+              </a:ext>
+            </a:extLst>
+          </p:cNvPr>
+          <p:cNvCxnSpPr>
+            <a:cxnSpLocks/>
+            <a:endCxn id="2" idx="3"/>
+          </p:cNvCxnSpPr>
+          <p:nvPr/>
+        </p:nvCxnSpPr>
+        <p:spPr>
+          <a:xfrm rot="10800000">
+            <a:off x="4339697" y="3258493"/>
+            <a:ext cx="926121" cy="268624"/>
+          </a:xfrm>
+          <a:prstGeom prst="bentConnector3">
+            <a:avLst/>
+          </a:prstGeom>
+          <a:ln>
+            <a:tailEnd type="triangle"/>
+          </a:ln>
+        </p:spPr>
+        <p:style>
+          <a:lnRef idx="1">
+            <a:schemeClr val="dk1"/>
+          </a:lnRef>
+          <a:fillRef idx="0">
+            <a:schemeClr val="dk1"/>
+          </a:fillRef>
+          <a:effectRef idx="0">
+            <a:schemeClr val="dk1"/>
+          </a:effectRef>
+          <a:fontRef idx="minor">
+            <a:schemeClr val="tx1"/>
+          </a:fontRef>
+        </p:style>
+      </p:cxnSp>
+      <p:cxnSp>
+        <p:nvCxnSpPr>
+          <p:cNvPr id="18" name="Connector: Elbow 17">
+            <a:extLst>
+              <a:ext uri="{FF2B5EF4-FFF2-40B4-BE49-F238E27FC236}">
+                <a16:creationId xmlns:a16="http://schemas.microsoft.com/office/drawing/2014/main" id="{AE6E9E59-CF00-F3BA-4735-BC973C25DDD6}"/>
+              </a:ext>
+            </a:extLst>
+          </p:cNvPr>
+          <p:cNvCxnSpPr>
+            <a:cxnSpLocks/>
+            <a:stCxn id="2" idx="0"/>
+          </p:cNvCxnSpPr>
+          <p:nvPr/>
+        </p:nvCxnSpPr>
+        <p:spPr>
+          <a:xfrm rot="16200000" flipV="1">
+            <a:off x="3216287" y="2541364"/>
+            <a:ext cx="431740" cy="707831"/>
+          </a:xfrm>
+          <a:prstGeom prst="bentConnector2">
+            <a:avLst/>
+          </a:prstGeom>
+          <a:ln>
+            <a:headEnd type="triangle"/>
             <a:tailEnd type="triangle"/>
           </a:ln>
         </p:spPr>

</xml_diff>

<commit_message>
Update the spyTrojan readme file.
</commit_message>
<xml_diff>
--- a/doc/designDoc.pptx
+++ b/doc/designDoc.pptx
@@ -5,7 +5,7 @@
     <p:sldMasterId id="2147483648" r:id="rId1"/>
   </p:sldMasterIdLst>
   <p:notesMasterIdLst>
-    <p:notesMasterId r:id="rId18"/>
+    <p:notesMasterId r:id="rId19"/>
   </p:notesMasterIdLst>
   <p:sldIdLst>
     <p:sldId id="256" r:id="rId2"/>
@@ -24,6 +24,7 @@
     <p:sldId id="301" r:id="rId15"/>
     <p:sldId id="302" r:id="rId16"/>
     <p:sldId id="305" r:id="rId17"/>
+    <p:sldId id="306" r:id="rId18"/>
   </p:sldIdLst>
   <p:sldSz cx="12192000" cy="6858000"/>
   <p:notesSz cx="6858000" cy="9144000"/>
@@ -2095,7 +2096,7 @@
           <a:p>
             <a:fld id="{30462BEA-6C65-41CB-B521-7C9DB089D720}" type="datetimeFigureOut">
               <a:rPr lang="en-SG" smtClean="0"/>
-              <a:t>12/1/2024</a:t>
+              <a:t>16/1/2024</a:t>
             </a:fld>
             <a:endParaRPr lang="en-SG"/>
           </a:p>
@@ -2531,6 +2532,90 @@
 </p:notes>
 </file>
 
+<file path=ppt/notesSlides/notesSlide3.xml><?xml version="1.0" encoding="utf-8"?>
+<p:notes xmlns:a="http://schemas.openxmlformats.org/drawingml/2006/main" xmlns:r="http://schemas.openxmlformats.org/officeDocument/2006/relationships" xmlns:p="http://schemas.openxmlformats.org/presentationml/2006/main">
+  <p:cSld>
+    <p:spTree>
+      <p:nvGrpSpPr>
+        <p:cNvPr id="1" name=""/>
+        <p:cNvGrpSpPr/>
+        <p:nvPr/>
+      </p:nvGrpSpPr>
+      <p:grpSpPr>
+        <a:xfrm>
+          <a:off x="0" y="0"/>
+          <a:ext cx="0" cy="0"/>
+          <a:chOff x="0" y="0"/>
+          <a:chExt cx="0" cy="0"/>
+        </a:xfrm>
+      </p:grpSpPr>
+      <p:sp>
+        <p:nvSpPr>
+          <p:cNvPr id="2" name="Slide Image Placeholder 1"/>
+          <p:cNvSpPr>
+            <a:spLocks noGrp="1" noRot="1" noChangeAspect="1"/>
+          </p:cNvSpPr>
+          <p:nvPr>
+            <p:ph type="sldImg"/>
+          </p:nvPr>
+        </p:nvSpPr>
+        <p:spPr/>
+      </p:sp>
+      <p:sp>
+        <p:nvSpPr>
+          <p:cNvPr id="3" name="Notes Placeholder 2"/>
+          <p:cNvSpPr>
+            <a:spLocks noGrp="1"/>
+          </p:cNvSpPr>
+          <p:nvPr>
+            <p:ph type="body" idx="1"/>
+          </p:nvPr>
+        </p:nvSpPr>
+        <p:spPr/>
+        <p:txBody>
+          <a:bodyPr/>
+          <a:lstStyle/>
+          <a:p>
+            <a:endParaRPr lang="en-SG"/>
+          </a:p>
+        </p:txBody>
+      </p:sp>
+      <p:sp>
+        <p:nvSpPr>
+          <p:cNvPr id="4" name="Slide Number Placeholder 3"/>
+          <p:cNvSpPr>
+            <a:spLocks noGrp="1"/>
+          </p:cNvSpPr>
+          <p:nvPr>
+            <p:ph type="sldNum" sz="quarter" idx="5"/>
+          </p:nvPr>
+        </p:nvSpPr>
+        <p:spPr/>
+        <p:txBody>
+          <a:bodyPr/>
+          <a:lstStyle/>
+          <a:p>
+            <a:fld id="{692AACD3-E340-4597-A58C-8551D22C54A3}" type="slidenum">
+              <a:rPr lang="en-SG" smtClean="0"/>
+              <a:t>17</a:t>
+            </a:fld>
+            <a:endParaRPr lang="en-SG"/>
+          </a:p>
+        </p:txBody>
+      </p:sp>
+    </p:spTree>
+    <p:extLst>
+      <p:ext uri="{BB962C8B-B14F-4D97-AF65-F5344CB8AC3E}">
+        <p14:creationId xmlns:p14="http://schemas.microsoft.com/office/powerpoint/2010/main" val="536014101"/>
+      </p:ext>
+    </p:extLst>
+  </p:cSld>
+  <p:clrMapOvr>
+    <a:masterClrMapping/>
+  </p:clrMapOvr>
+</p:notes>
+</file>
+
 <file path=ppt/slideLayouts/slideLayout1.xml><?xml version="1.0" encoding="utf-8"?>
 <p:sldLayout xmlns:a="http://schemas.openxmlformats.org/drawingml/2006/main" xmlns:r="http://schemas.openxmlformats.org/officeDocument/2006/relationships" xmlns:p="http://schemas.openxmlformats.org/presentationml/2006/main" type="title" preserve="1">
   <p:cSld name="Title Slide">
@@ -2680,7 +2765,7 @@
           <a:p>
             <a:fld id="{435F7F91-36DA-4AC3-B0AA-56077EB606D8}" type="datetimeFigureOut">
               <a:rPr lang="en-SG" smtClean="0"/>
-              <a:t>12/1/2024</a:t>
+              <a:t>16/1/2024</a:t>
             </a:fld>
             <a:endParaRPr lang="en-SG"/>
           </a:p>
@@ -2880,7 +2965,7 @@
           <a:p>
             <a:fld id="{435F7F91-36DA-4AC3-B0AA-56077EB606D8}" type="datetimeFigureOut">
               <a:rPr lang="en-SG" smtClean="0"/>
-              <a:t>12/1/2024</a:t>
+              <a:t>16/1/2024</a:t>
             </a:fld>
             <a:endParaRPr lang="en-SG"/>
           </a:p>
@@ -3090,7 +3175,7 @@
           <a:p>
             <a:fld id="{435F7F91-36DA-4AC3-B0AA-56077EB606D8}" type="datetimeFigureOut">
               <a:rPr lang="en-SG" smtClean="0"/>
-              <a:t>12/1/2024</a:t>
+              <a:t>16/1/2024</a:t>
             </a:fld>
             <a:endParaRPr lang="en-SG"/>
           </a:p>
@@ -3290,7 +3375,7 @@
           <a:p>
             <a:fld id="{435F7F91-36DA-4AC3-B0AA-56077EB606D8}" type="datetimeFigureOut">
               <a:rPr lang="en-SG" smtClean="0"/>
-              <a:t>12/1/2024</a:t>
+              <a:t>16/1/2024</a:t>
             </a:fld>
             <a:endParaRPr lang="en-SG"/>
           </a:p>
@@ -3566,7 +3651,7 @@
           <a:p>
             <a:fld id="{435F7F91-36DA-4AC3-B0AA-56077EB606D8}" type="datetimeFigureOut">
               <a:rPr lang="en-SG" smtClean="0"/>
-              <a:t>12/1/2024</a:t>
+              <a:t>16/1/2024</a:t>
             </a:fld>
             <a:endParaRPr lang="en-SG"/>
           </a:p>
@@ -3834,7 +3919,7 @@
           <a:p>
             <a:fld id="{435F7F91-36DA-4AC3-B0AA-56077EB606D8}" type="datetimeFigureOut">
               <a:rPr lang="en-SG" smtClean="0"/>
-              <a:t>12/1/2024</a:t>
+              <a:t>16/1/2024</a:t>
             </a:fld>
             <a:endParaRPr lang="en-SG"/>
           </a:p>
@@ -4249,7 +4334,7 @@
           <a:p>
             <a:fld id="{435F7F91-36DA-4AC3-B0AA-56077EB606D8}" type="datetimeFigureOut">
               <a:rPr lang="en-SG" smtClean="0"/>
-              <a:t>12/1/2024</a:t>
+              <a:t>16/1/2024</a:t>
             </a:fld>
             <a:endParaRPr lang="en-SG"/>
           </a:p>
@@ -4391,7 +4476,7 @@
           <a:p>
             <a:fld id="{435F7F91-36DA-4AC3-B0AA-56077EB606D8}" type="datetimeFigureOut">
               <a:rPr lang="en-SG" smtClean="0"/>
-              <a:t>12/1/2024</a:t>
+              <a:t>16/1/2024</a:t>
             </a:fld>
             <a:endParaRPr lang="en-SG"/>
           </a:p>
@@ -4504,7 +4589,7 @@
           <a:p>
             <a:fld id="{435F7F91-36DA-4AC3-B0AA-56077EB606D8}" type="datetimeFigureOut">
               <a:rPr lang="en-SG" smtClean="0"/>
-              <a:t>12/1/2024</a:t>
+              <a:t>16/1/2024</a:t>
             </a:fld>
             <a:endParaRPr lang="en-SG"/>
           </a:p>
@@ -4817,7 +4902,7 @@
           <a:p>
             <a:fld id="{435F7F91-36DA-4AC3-B0AA-56077EB606D8}" type="datetimeFigureOut">
               <a:rPr lang="en-SG" smtClean="0"/>
-              <a:t>12/1/2024</a:t>
+              <a:t>16/1/2024</a:t>
             </a:fld>
             <a:endParaRPr lang="en-SG"/>
           </a:p>
@@ -5106,7 +5191,7 @@
           <a:p>
             <a:fld id="{435F7F91-36DA-4AC3-B0AA-56077EB606D8}" type="datetimeFigureOut">
               <a:rPr lang="en-SG" smtClean="0"/>
-              <a:t>12/1/2024</a:t>
+              <a:t>16/1/2024</a:t>
             </a:fld>
             <a:endParaRPr lang="en-SG"/>
           </a:p>
@@ -5349,7 +5434,7 @@
           <a:p>
             <a:fld id="{435F7F91-36DA-4AC3-B0AA-56077EB606D8}" type="datetimeFigureOut">
               <a:rPr lang="en-SG" smtClean="0"/>
-              <a:t>12/1/2024</a:t>
+              <a:t>16/1/2024</a:t>
             </a:fld>
             <a:endParaRPr lang="en-SG"/>
           </a:p>
@@ -17087,10 +17172,3632 @@
           <a:chExt cx="0" cy="0"/>
         </a:xfrm>
       </p:grpSpPr>
+      <p:sp>
+        <p:nvSpPr>
+          <p:cNvPr id="2" name="Rectangle 1">
+            <a:extLst>
+              <a:ext uri="{FF2B5EF4-FFF2-40B4-BE49-F238E27FC236}">
+                <a16:creationId xmlns:a16="http://schemas.microsoft.com/office/drawing/2014/main" id="{A55A4400-56FA-83CD-948A-EF879CA0455B}"/>
+              </a:ext>
+            </a:extLst>
+          </p:cNvPr>
+          <p:cNvSpPr/>
+          <p:nvPr/>
+        </p:nvSpPr>
+        <p:spPr>
+          <a:xfrm>
+            <a:off x="4373766" y="647171"/>
+            <a:ext cx="1030338" cy="276999"/>
+          </a:xfrm>
+          <a:prstGeom prst="rect">
+            <a:avLst/>
+          </a:prstGeom>
+          <a:solidFill>
+            <a:schemeClr val="accent6">
+              <a:lumMod val="75000"/>
+            </a:schemeClr>
+          </a:solidFill>
+        </p:spPr>
+        <p:style>
+          <a:lnRef idx="2">
+            <a:schemeClr val="accent1">
+              <a:shade val="50000"/>
+            </a:schemeClr>
+          </a:lnRef>
+          <a:fillRef idx="1">
+            <a:schemeClr val="accent1"/>
+          </a:fillRef>
+          <a:effectRef idx="0">
+            <a:schemeClr val="accent1"/>
+          </a:effectRef>
+          <a:fontRef idx="minor">
+            <a:schemeClr val="lt1"/>
+          </a:fontRef>
+        </p:style>
+        <p:txBody>
+          <a:bodyPr rtlCol="0" anchor="ctr"/>
+          <a:lstStyle/>
+          <a:p>
+            <a:r>
+              <a:rPr lang="en-US" sz="1100" b="1" dirty="0"/>
+              <a:t>RTC2 </a:t>
+            </a:r>
+            <a:r>
+              <a:rPr lang="en-US" sz="1100" b="1" dirty="0" err="1"/>
+              <a:t>init</a:t>
+            </a:r>
+            <a:r>
+              <a:rPr lang="en-US" sz="1100" b="1" dirty="0"/>
+              <a:t> start </a:t>
+            </a:r>
+            <a:endParaRPr lang="en-SG" sz="1100" b="1" dirty="0"/>
+          </a:p>
+        </p:txBody>
+      </p:sp>
+      <p:sp>
+        <p:nvSpPr>
+          <p:cNvPr id="3" name="TextBox 2">
+            <a:extLst>
+              <a:ext uri="{FF2B5EF4-FFF2-40B4-BE49-F238E27FC236}">
+                <a16:creationId xmlns:a16="http://schemas.microsoft.com/office/drawing/2014/main" id="{D372D319-A6FE-60A0-EDF5-C9C48935A4AC}"/>
+              </a:ext>
+            </a:extLst>
+          </p:cNvPr>
+          <p:cNvSpPr txBox="1"/>
+          <p:nvPr/>
+        </p:nvSpPr>
+        <p:spPr>
+          <a:xfrm>
+            <a:off x="4216802" y="200705"/>
+            <a:ext cx="1925097" cy="276999"/>
+          </a:xfrm>
+          <a:prstGeom prst="rect">
+            <a:avLst/>
+          </a:prstGeom>
+          <a:noFill/>
+        </p:spPr>
+        <p:txBody>
+          <a:bodyPr wrap="square" rtlCol="0">
+            <a:spAutoFit/>
+          </a:bodyPr>
+          <a:lstStyle/>
+          <a:p>
+            <a:r>
+              <a:rPr lang="en-US" sz="1200" b="1" dirty="0">
+                <a:solidFill>
+                  <a:schemeClr val="accent6">
+                    <a:lumMod val="75000"/>
+                  </a:schemeClr>
+                </a:solidFill>
+              </a:rPr>
+              <a:t>RTC2 App workflow </a:t>
+            </a:r>
+            <a:endParaRPr lang="en-SG" sz="1200" b="1" dirty="0">
+              <a:solidFill>
+                <a:schemeClr val="accent6">
+                  <a:lumMod val="75000"/>
+                </a:schemeClr>
+              </a:solidFill>
+            </a:endParaRPr>
+          </a:p>
+        </p:txBody>
+      </p:sp>
+      <p:cxnSp>
+        <p:nvCxnSpPr>
+          <p:cNvPr id="4" name="Straight Arrow Connector 3">
+            <a:extLst>
+              <a:ext uri="{FF2B5EF4-FFF2-40B4-BE49-F238E27FC236}">
+                <a16:creationId xmlns:a16="http://schemas.microsoft.com/office/drawing/2014/main" id="{15313A56-B982-E7BF-6431-442F356AB0D2}"/>
+              </a:ext>
+            </a:extLst>
+          </p:cNvPr>
+          <p:cNvCxnSpPr>
+            <a:cxnSpLocks/>
+            <a:endCxn id="6" idx="0"/>
+          </p:cNvCxnSpPr>
+          <p:nvPr/>
+        </p:nvCxnSpPr>
+        <p:spPr>
+          <a:xfrm>
+            <a:off x="4994086" y="952390"/>
+            <a:ext cx="1" cy="886117"/>
+          </a:xfrm>
+          <a:prstGeom prst="straightConnector1">
+            <a:avLst/>
+          </a:prstGeom>
+          <a:ln w="19050">
+            <a:solidFill>
+              <a:schemeClr val="accent6">
+                <a:lumMod val="50000"/>
+              </a:schemeClr>
+            </a:solidFill>
+            <a:tailEnd type="triangle"/>
+          </a:ln>
+        </p:spPr>
+        <p:style>
+          <a:lnRef idx="1">
+            <a:schemeClr val="accent1"/>
+          </a:lnRef>
+          <a:fillRef idx="0">
+            <a:schemeClr val="accent1"/>
+          </a:fillRef>
+          <a:effectRef idx="0">
+            <a:schemeClr val="accent1"/>
+          </a:effectRef>
+          <a:fontRef idx="minor">
+            <a:schemeClr val="tx1"/>
+          </a:fontRef>
+        </p:style>
+      </p:cxnSp>
+      <p:sp>
+        <p:nvSpPr>
+          <p:cNvPr id="5" name="TextBox 4">
+            <a:extLst>
+              <a:ext uri="{FF2B5EF4-FFF2-40B4-BE49-F238E27FC236}">
+                <a16:creationId xmlns:a16="http://schemas.microsoft.com/office/drawing/2014/main" id="{A903D139-7BA3-F821-2668-7090FDE31890}"/>
+              </a:ext>
+            </a:extLst>
+          </p:cNvPr>
+          <p:cNvSpPr txBox="1"/>
+          <p:nvPr/>
+        </p:nvSpPr>
+        <p:spPr>
+          <a:xfrm>
+            <a:off x="4091368" y="1002453"/>
+            <a:ext cx="1023748" cy="261610"/>
+          </a:xfrm>
+          <a:prstGeom prst="rect">
+            <a:avLst/>
+          </a:prstGeom>
+          <a:noFill/>
+        </p:spPr>
+        <p:txBody>
+          <a:bodyPr wrap="square" rtlCol="0">
+            <a:spAutoFit/>
+          </a:bodyPr>
+          <a:lstStyle/>
+          <a:p>
+            <a:r>
+              <a:rPr lang="en-SG" sz="1100" dirty="0"/>
+              <a:t>Main thread</a:t>
+            </a:r>
+          </a:p>
+        </p:txBody>
+      </p:sp>
+      <p:sp>
+        <p:nvSpPr>
+          <p:cNvPr id="6" name="Rectangle 5">
+            <a:extLst>
+              <a:ext uri="{FF2B5EF4-FFF2-40B4-BE49-F238E27FC236}">
+                <a16:creationId xmlns:a16="http://schemas.microsoft.com/office/drawing/2014/main" id="{EAAEA4C6-C51D-F320-3DAC-737500A64024}"/>
+              </a:ext>
+            </a:extLst>
+          </p:cNvPr>
+          <p:cNvSpPr/>
+          <p:nvPr/>
+        </p:nvSpPr>
+        <p:spPr>
+          <a:xfrm>
+            <a:off x="4392053" y="1838507"/>
+            <a:ext cx="1204067" cy="332880"/>
+          </a:xfrm>
+          <a:prstGeom prst="rect">
+            <a:avLst/>
+          </a:prstGeom>
+          <a:solidFill>
+            <a:schemeClr val="accent6">
+              <a:lumMod val="75000"/>
+            </a:schemeClr>
+          </a:solidFill>
+        </p:spPr>
+        <p:style>
+          <a:lnRef idx="2">
+            <a:schemeClr val="accent1">
+              <a:shade val="50000"/>
+            </a:schemeClr>
+          </a:lnRef>
+          <a:fillRef idx="1">
+            <a:schemeClr val="accent1"/>
+          </a:fillRef>
+          <a:effectRef idx="0">
+            <a:schemeClr val="accent1"/>
+          </a:effectRef>
+          <a:fontRef idx="minor">
+            <a:schemeClr val="lt1"/>
+          </a:fontRef>
+        </p:style>
+        <p:txBody>
+          <a:bodyPr rtlCol="0" anchor="ctr"/>
+          <a:lstStyle/>
+          <a:p>
+            <a:r>
+              <a:rPr lang="en-US" sz="1100" b="1" dirty="0"/>
+              <a:t>Flask web host</a:t>
+            </a:r>
+            <a:endParaRPr lang="en-SG" sz="1100" b="1" dirty="0"/>
+          </a:p>
+        </p:txBody>
+      </p:sp>
+      <p:sp>
+        <p:nvSpPr>
+          <p:cNvPr id="7" name="Rectangle 6">
+            <a:extLst>
+              <a:ext uri="{FF2B5EF4-FFF2-40B4-BE49-F238E27FC236}">
+                <a16:creationId xmlns:a16="http://schemas.microsoft.com/office/drawing/2014/main" id="{3F1520C4-33D3-E2F0-DA67-3AF4B4DC961B}"/>
+              </a:ext>
+            </a:extLst>
+          </p:cNvPr>
+          <p:cNvSpPr/>
+          <p:nvPr/>
+        </p:nvSpPr>
+        <p:spPr>
+          <a:xfrm>
+            <a:off x="2361744" y="2500210"/>
+            <a:ext cx="1201824" cy="404821"/>
+          </a:xfrm>
+          <a:prstGeom prst="rect">
+            <a:avLst/>
+          </a:prstGeom>
+          <a:solidFill>
+            <a:schemeClr val="accent6">
+              <a:lumMod val="75000"/>
+            </a:schemeClr>
+          </a:solidFill>
+        </p:spPr>
+        <p:style>
+          <a:lnRef idx="2">
+            <a:schemeClr val="accent1">
+              <a:shade val="50000"/>
+            </a:schemeClr>
+          </a:lnRef>
+          <a:fillRef idx="1">
+            <a:schemeClr val="accent1"/>
+          </a:fillRef>
+          <a:effectRef idx="0">
+            <a:schemeClr val="accent1"/>
+          </a:effectRef>
+          <a:fontRef idx="minor">
+            <a:schemeClr val="lt1"/>
+          </a:fontRef>
+        </p:style>
+        <p:txBody>
+          <a:bodyPr rtlCol="0" anchor="ctr"/>
+          <a:lstStyle/>
+          <a:p>
+            <a:r>
+              <a:rPr lang="en-US" sz="1100" b="1" dirty="0"/>
+              <a:t>User Web control handler API</a:t>
+            </a:r>
+            <a:endParaRPr lang="en-SG" sz="1100" b="1" dirty="0"/>
+          </a:p>
+        </p:txBody>
+      </p:sp>
+      <p:sp>
+        <p:nvSpPr>
+          <p:cNvPr id="8" name="Rectangle 7">
+            <a:extLst>
+              <a:ext uri="{FF2B5EF4-FFF2-40B4-BE49-F238E27FC236}">
+                <a16:creationId xmlns:a16="http://schemas.microsoft.com/office/drawing/2014/main" id="{2116EC80-B7B1-44E3-912A-BC9C0B5FC0BD}"/>
+              </a:ext>
+            </a:extLst>
+          </p:cNvPr>
+          <p:cNvSpPr/>
+          <p:nvPr/>
+        </p:nvSpPr>
+        <p:spPr>
+          <a:xfrm>
+            <a:off x="2361744" y="3404142"/>
+            <a:ext cx="1201824" cy="404821"/>
+          </a:xfrm>
+          <a:prstGeom prst="rect">
+            <a:avLst/>
+          </a:prstGeom>
+          <a:solidFill>
+            <a:schemeClr val="accent6">
+              <a:lumMod val="75000"/>
+            </a:schemeClr>
+          </a:solidFill>
+        </p:spPr>
+        <p:style>
+          <a:lnRef idx="2">
+            <a:schemeClr val="accent1">
+              <a:shade val="50000"/>
+            </a:schemeClr>
+          </a:lnRef>
+          <a:fillRef idx="1">
+            <a:schemeClr val="accent1"/>
+          </a:fillRef>
+          <a:effectRef idx="0">
+            <a:schemeClr val="accent1"/>
+          </a:effectRef>
+          <a:fontRef idx="minor">
+            <a:schemeClr val="lt1"/>
+          </a:fontRef>
+        </p:style>
+        <p:txBody>
+          <a:bodyPr rtlCol="0" anchor="ctr"/>
+          <a:lstStyle/>
+          <a:p>
+            <a:r>
+              <a:rPr lang="en-US" sz="1100" b="1" dirty="0"/>
+              <a:t>Program control handler API</a:t>
+            </a:r>
+            <a:endParaRPr lang="en-SG" sz="1100" b="1" dirty="0"/>
+          </a:p>
+        </p:txBody>
+      </p:sp>
+      <p:cxnSp>
+        <p:nvCxnSpPr>
+          <p:cNvPr id="9" name="Connector: Elbow 8">
+            <a:extLst>
+              <a:ext uri="{FF2B5EF4-FFF2-40B4-BE49-F238E27FC236}">
+                <a16:creationId xmlns:a16="http://schemas.microsoft.com/office/drawing/2014/main" id="{A771E682-7256-5850-EE40-5E5163646A85}"/>
+              </a:ext>
+            </a:extLst>
+          </p:cNvPr>
+          <p:cNvCxnSpPr>
+            <a:cxnSpLocks/>
+            <a:stCxn id="6" idx="2"/>
+            <a:endCxn id="7" idx="3"/>
+          </p:cNvCxnSpPr>
+          <p:nvPr/>
+        </p:nvCxnSpPr>
+        <p:spPr>
+          <a:xfrm rot="5400000">
+            <a:off x="4013211" y="1721745"/>
+            <a:ext cx="531234" cy="1430519"/>
+          </a:xfrm>
+          <a:prstGeom prst="bentConnector2">
+            <a:avLst/>
+          </a:prstGeom>
+          <a:ln w="19050">
+            <a:tailEnd type="triangle"/>
+          </a:ln>
+        </p:spPr>
+        <p:style>
+          <a:lnRef idx="1">
+            <a:schemeClr val="dk1"/>
+          </a:lnRef>
+          <a:fillRef idx="0">
+            <a:schemeClr val="dk1"/>
+          </a:fillRef>
+          <a:effectRef idx="0">
+            <a:schemeClr val="dk1"/>
+          </a:effectRef>
+          <a:fontRef idx="minor">
+            <a:schemeClr val="tx1"/>
+          </a:fontRef>
+        </p:style>
+      </p:cxnSp>
+      <p:cxnSp>
+        <p:nvCxnSpPr>
+          <p:cNvPr id="10" name="Connector: Elbow 9">
+            <a:extLst>
+              <a:ext uri="{FF2B5EF4-FFF2-40B4-BE49-F238E27FC236}">
+                <a16:creationId xmlns:a16="http://schemas.microsoft.com/office/drawing/2014/main" id="{A89DF7BA-C5DD-EF2F-72B9-8AFD751F3F4F}"/>
+              </a:ext>
+            </a:extLst>
+          </p:cNvPr>
+          <p:cNvCxnSpPr>
+            <a:cxnSpLocks/>
+            <a:stCxn id="6" idx="2"/>
+            <a:endCxn id="8" idx="3"/>
+          </p:cNvCxnSpPr>
+          <p:nvPr/>
+        </p:nvCxnSpPr>
+        <p:spPr>
+          <a:xfrm rot="5400000">
+            <a:off x="3561245" y="2173711"/>
+            <a:ext cx="1435166" cy="1430519"/>
+          </a:xfrm>
+          <a:prstGeom prst="bentConnector2">
+            <a:avLst/>
+          </a:prstGeom>
+          <a:ln w="19050">
+            <a:tailEnd type="triangle"/>
+          </a:ln>
+        </p:spPr>
+        <p:style>
+          <a:lnRef idx="1">
+            <a:schemeClr val="dk1"/>
+          </a:lnRef>
+          <a:fillRef idx="0">
+            <a:schemeClr val="dk1"/>
+          </a:fillRef>
+          <a:effectRef idx="0">
+            <a:schemeClr val="dk1"/>
+          </a:effectRef>
+          <a:fontRef idx="minor">
+            <a:schemeClr val="tx1"/>
+          </a:fontRef>
+        </p:style>
+      </p:cxnSp>
+      <p:sp>
+        <p:nvSpPr>
+          <p:cNvPr id="11" name="Rectangle 10">
+            <a:extLst>
+              <a:ext uri="{FF2B5EF4-FFF2-40B4-BE49-F238E27FC236}">
+                <a16:creationId xmlns:a16="http://schemas.microsoft.com/office/drawing/2014/main" id="{D6AF654E-C1D6-AD4A-766F-6E351A88BFF6}"/>
+              </a:ext>
+            </a:extLst>
+          </p:cNvPr>
+          <p:cNvSpPr/>
+          <p:nvPr/>
+        </p:nvSpPr>
+        <p:spPr>
+          <a:xfrm>
+            <a:off x="6641500" y="4181381"/>
+            <a:ext cx="1652185" cy="404821"/>
+          </a:xfrm>
+          <a:prstGeom prst="rect">
+            <a:avLst/>
+          </a:prstGeom>
+          <a:solidFill>
+            <a:schemeClr val="accent6">
+              <a:lumMod val="75000"/>
+            </a:schemeClr>
+          </a:solidFill>
+        </p:spPr>
+        <p:style>
+          <a:lnRef idx="2">
+            <a:schemeClr val="accent1">
+              <a:shade val="50000"/>
+            </a:schemeClr>
+          </a:lnRef>
+          <a:fillRef idx="1">
+            <a:schemeClr val="accent1"/>
+          </a:fillRef>
+          <a:effectRef idx="0">
+            <a:schemeClr val="accent1"/>
+          </a:effectRef>
+          <a:fontRef idx="minor">
+            <a:schemeClr val="lt1"/>
+          </a:fontRef>
+        </p:style>
+        <p:txBody>
+          <a:bodyPr rtlCol="0" anchor="ctr"/>
+          <a:lstStyle/>
+          <a:p>
+            <a:r>
+              <a:rPr lang="en-US" sz="1100" b="1" dirty="0"/>
+              <a:t>Malware communication handler API</a:t>
+            </a:r>
+            <a:endParaRPr lang="en-SG" sz="1100" b="1" dirty="0"/>
+          </a:p>
+        </p:txBody>
+      </p:sp>
+      <p:cxnSp>
+        <p:nvCxnSpPr>
+          <p:cNvPr id="12" name="Connector: Elbow 11">
+            <a:extLst>
+              <a:ext uri="{FF2B5EF4-FFF2-40B4-BE49-F238E27FC236}">
+                <a16:creationId xmlns:a16="http://schemas.microsoft.com/office/drawing/2014/main" id="{FDA4E122-C004-C5F0-A7CF-8C062C1B48DC}"/>
+              </a:ext>
+            </a:extLst>
+          </p:cNvPr>
+          <p:cNvCxnSpPr>
+            <a:cxnSpLocks/>
+            <a:stCxn id="6" idx="2"/>
+            <a:endCxn id="11" idx="1"/>
+          </p:cNvCxnSpPr>
+          <p:nvPr/>
+        </p:nvCxnSpPr>
+        <p:spPr>
+          <a:xfrm rot="16200000" flipH="1">
+            <a:off x="4711591" y="2453882"/>
+            <a:ext cx="2212405" cy="1647413"/>
+          </a:xfrm>
+          <a:prstGeom prst="bentConnector2">
+            <a:avLst/>
+          </a:prstGeom>
+          <a:ln w="19050">
+            <a:tailEnd type="triangle"/>
+          </a:ln>
+        </p:spPr>
+        <p:style>
+          <a:lnRef idx="1">
+            <a:schemeClr val="dk1"/>
+          </a:lnRef>
+          <a:fillRef idx="0">
+            <a:schemeClr val="dk1"/>
+          </a:fillRef>
+          <a:effectRef idx="0">
+            <a:schemeClr val="dk1"/>
+          </a:effectRef>
+          <a:fontRef idx="minor">
+            <a:schemeClr val="tx1"/>
+          </a:fontRef>
+        </p:style>
+      </p:cxnSp>
+      <p:cxnSp>
+        <p:nvCxnSpPr>
+          <p:cNvPr id="13" name="Connector: Elbow 12">
+            <a:extLst>
+              <a:ext uri="{FF2B5EF4-FFF2-40B4-BE49-F238E27FC236}">
+                <a16:creationId xmlns:a16="http://schemas.microsoft.com/office/drawing/2014/main" id="{17ED465E-1462-0BA6-9FC6-1D9450800486}"/>
+              </a:ext>
+            </a:extLst>
+          </p:cNvPr>
+          <p:cNvCxnSpPr>
+            <a:cxnSpLocks/>
+          </p:cNvCxnSpPr>
+          <p:nvPr/>
+        </p:nvCxnSpPr>
+        <p:spPr>
+          <a:xfrm rot="16200000" flipH="1">
+            <a:off x="4970495" y="1262847"/>
+            <a:ext cx="1279132" cy="1267534"/>
+          </a:xfrm>
+          <a:prstGeom prst="bentConnector3">
+            <a:avLst>
+              <a:gd name="adj1" fmla="val -3614"/>
+            </a:avLst>
+          </a:prstGeom>
+          <a:ln>
+            <a:tailEnd type="triangle"/>
+          </a:ln>
+        </p:spPr>
+        <p:style>
+          <a:lnRef idx="1">
+            <a:schemeClr val="dk1"/>
+          </a:lnRef>
+          <a:fillRef idx="0">
+            <a:schemeClr val="dk1"/>
+          </a:fillRef>
+          <a:effectRef idx="0">
+            <a:schemeClr val="dk1"/>
+          </a:effectRef>
+          <a:fontRef idx="minor">
+            <a:schemeClr val="tx1"/>
+          </a:fontRef>
+        </p:style>
+      </p:cxnSp>
+      <p:cxnSp>
+        <p:nvCxnSpPr>
+          <p:cNvPr id="14" name="Connector: Elbow 13">
+            <a:extLst>
+              <a:ext uri="{FF2B5EF4-FFF2-40B4-BE49-F238E27FC236}">
+                <a16:creationId xmlns:a16="http://schemas.microsoft.com/office/drawing/2014/main" id="{A9D23208-D4D1-43C9-5917-5E646D7C7469}"/>
+              </a:ext>
+            </a:extLst>
+          </p:cNvPr>
+          <p:cNvCxnSpPr>
+            <a:cxnSpLocks/>
+            <a:stCxn id="7" idx="2"/>
+          </p:cNvCxnSpPr>
+          <p:nvPr/>
+        </p:nvCxnSpPr>
+        <p:spPr>
+          <a:xfrm rot="5400000" flipH="1" flipV="1">
+            <a:off x="4254083" y="1447163"/>
+            <a:ext cx="166441" cy="2749296"/>
+          </a:xfrm>
+          <a:prstGeom prst="bentConnector4">
+            <a:avLst>
+              <a:gd name="adj1" fmla="val -137346"/>
+              <a:gd name="adj2" fmla="val 84875"/>
+            </a:avLst>
+          </a:prstGeom>
+          <a:ln w="12700">
+            <a:solidFill>
+              <a:schemeClr val="accent1">
+                <a:lumMod val="75000"/>
+              </a:schemeClr>
+            </a:solidFill>
+            <a:prstDash val="sysDash"/>
+            <a:tailEnd type="triangle"/>
+          </a:ln>
+        </p:spPr>
+        <p:style>
+          <a:lnRef idx="1">
+            <a:schemeClr val="accent1"/>
+          </a:lnRef>
+          <a:fillRef idx="0">
+            <a:schemeClr val="accent1"/>
+          </a:fillRef>
+          <a:effectRef idx="0">
+            <a:schemeClr val="accent1"/>
+          </a:effectRef>
+          <a:fontRef idx="minor">
+            <a:schemeClr val="tx1"/>
+          </a:fontRef>
+        </p:style>
+      </p:cxnSp>
+      <p:cxnSp>
+        <p:nvCxnSpPr>
+          <p:cNvPr id="15" name="Connector: Elbow 14">
+            <a:extLst>
+              <a:ext uri="{FF2B5EF4-FFF2-40B4-BE49-F238E27FC236}">
+                <a16:creationId xmlns:a16="http://schemas.microsoft.com/office/drawing/2014/main" id="{7E5F2A36-F26F-081D-6DF1-571FDACF6BE8}"/>
+              </a:ext>
+            </a:extLst>
+          </p:cNvPr>
+          <p:cNvCxnSpPr>
+            <a:cxnSpLocks/>
+            <a:stCxn id="8" idx="0"/>
+          </p:cNvCxnSpPr>
+          <p:nvPr/>
+        </p:nvCxnSpPr>
+        <p:spPr>
+          <a:xfrm rot="5400000" flipH="1" flipV="1">
+            <a:off x="4371671" y="1531985"/>
+            <a:ext cx="463142" cy="3281172"/>
+          </a:xfrm>
+          <a:prstGeom prst="bentConnector3">
+            <a:avLst>
+              <a:gd name="adj1" fmla="val 50000"/>
+            </a:avLst>
+          </a:prstGeom>
+          <a:ln w="12700">
+            <a:solidFill>
+              <a:schemeClr val="accent1">
+                <a:lumMod val="75000"/>
+              </a:schemeClr>
+            </a:solidFill>
+            <a:prstDash val="sysDash"/>
+            <a:tailEnd type="triangle"/>
+          </a:ln>
+        </p:spPr>
+        <p:style>
+          <a:lnRef idx="1">
+            <a:schemeClr val="accent1"/>
+          </a:lnRef>
+          <a:fillRef idx="0">
+            <a:schemeClr val="accent1"/>
+          </a:fillRef>
+          <a:effectRef idx="0">
+            <a:schemeClr val="accent1"/>
+          </a:effectRef>
+          <a:fontRef idx="minor">
+            <a:schemeClr val="tx1"/>
+          </a:fontRef>
+        </p:style>
+      </p:cxnSp>
+      <p:cxnSp>
+        <p:nvCxnSpPr>
+          <p:cNvPr id="16" name="Connector: Elbow 15">
+            <a:extLst>
+              <a:ext uri="{FF2B5EF4-FFF2-40B4-BE49-F238E27FC236}">
+                <a16:creationId xmlns:a16="http://schemas.microsoft.com/office/drawing/2014/main" id="{89BCAE93-6305-36E2-40D9-1D8498619C3C}"/>
+              </a:ext>
+            </a:extLst>
+          </p:cNvPr>
+          <p:cNvCxnSpPr>
+            <a:cxnSpLocks/>
+            <a:endCxn id="11" idx="0"/>
+          </p:cNvCxnSpPr>
+          <p:nvPr/>
+        </p:nvCxnSpPr>
+        <p:spPr>
+          <a:xfrm rot="16200000" flipH="1">
+            <a:off x="6343723" y="3057510"/>
+            <a:ext cx="1229633" cy="1018107"/>
+          </a:xfrm>
+          <a:prstGeom prst="bentConnector3">
+            <a:avLst>
+              <a:gd name="adj1" fmla="val 50000"/>
+            </a:avLst>
+          </a:prstGeom>
+          <a:ln w="12700">
+            <a:solidFill>
+              <a:schemeClr val="accent1">
+                <a:lumMod val="75000"/>
+              </a:schemeClr>
+            </a:solidFill>
+            <a:prstDash val="sysDash"/>
+            <a:tailEnd type="triangle"/>
+          </a:ln>
+        </p:spPr>
+        <p:style>
+          <a:lnRef idx="1">
+            <a:schemeClr val="accent1"/>
+          </a:lnRef>
+          <a:fillRef idx="0">
+            <a:schemeClr val="accent1"/>
+          </a:fillRef>
+          <a:effectRef idx="0">
+            <a:schemeClr val="accent1"/>
+          </a:effectRef>
+          <a:fontRef idx="minor">
+            <a:schemeClr val="tx1"/>
+          </a:fontRef>
+        </p:style>
+      </p:cxnSp>
+      <p:sp>
+        <p:nvSpPr>
+          <p:cNvPr id="17" name="Rectangle 16">
+            <a:extLst>
+              <a:ext uri="{FF2B5EF4-FFF2-40B4-BE49-F238E27FC236}">
+                <a16:creationId xmlns:a16="http://schemas.microsoft.com/office/drawing/2014/main" id="{0C132BF1-9FEB-74EB-52CE-FB4ED874250C}"/>
+              </a:ext>
+            </a:extLst>
+          </p:cNvPr>
+          <p:cNvSpPr/>
+          <p:nvPr/>
+        </p:nvSpPr>
+        <p:spPr>
+          <a:xfrm>
+            <a:off x="5731622" y="2541554"/>
+            <a:ext cx="1145513" cy="404820"/>
+          </a:xfrm>
+          <a:prstGeom prst="rect">
+            <a:avLst/>
+          </a:prstGeom>
+          <a:solidFill>
+            <a:schemeClr val="accent6">
+              <a:lumMod val="75000"/>
+            </a:schemeClr>
+          </a:solidFill>
+        </p:spPr>
+        <p:style>
+          <a:lnRef idx="2">
+            <a:schemeClr val="accent1">
+              <a:shade val="50000"/>
+            </a:schemeClr>
+          </a:lnRef>
+          <a:fillRef idx="1">
+            <a:schemeClr val="accent1"/>
+          </a:fillRef>
+          <a:effectRef idx="0">
+            <a:schemeClr val="accent1"/>
+          </a:effectRef>
+          <a:fontRef idx="minor">
+            <a:schemeClr val="lt1"/>
+          </a:fontRef>
+        </p:style>
+        <p:txBody>
+          <a:bodyPr rtlCol="0" anchor="ctr"/>
+          <a:lstStyle/>
+          <a:p>
+            <a:r>
+              <a:rPr lang="en-US" sz="1100" b="1" dirty="0"/>
+              <a:t>Malware tasks  queue manager </a:t>
+            </a:r>
+            <a:endParaRPr lang="en-SG" sz="1100" b="1" dirty="0"/>
+          </a:p>
+        </p:txBody>
+      </p:sp>
+      <p:sp>
+        <p:nvSpPr>
+          <p:cNvPr id="18" name="Rectangle 17">
+            <a:extLst>
+              <a:ext uri="{FF2B5EF4-FFF2-40B4-BE49-F238E27FC236}">
+                <a16:creationId xmlns:a16="http://schemas.microsoft.com/office/drawing/2014/main" id="{89FFF971-4062-F477-074B-AFAE4101CD5F}"/>
+              </a:ext>
+            </a:extLst>
+          </p:cNvPr>
+          <p:cNvSpPr/>
+          <p:nvPr/>
+        </p:nvSpPr>
+        <p:spPr>
+          <a:xfrm>
+            <a:off x="7141375" y="2547689"/>
+            <a:ext cx="1063752" cy="404820"/>
+          </a:xfrm>
+          <a:prstGeom prst="rect">
+            <a:avLst/>
+          </a:prstGeom>
+          <a:solidFill>
+            <a:schemeClr val="accent6">
+              <a:lumMod val="75000"/>
+            </a:schemeClr>
+          </a:solidFill>
+        </p:spPr>
+        <p:style>
+          <a:lnRef idx="2">
+            <a:schemeClr val="accent1">
+              <a:shade val="50000"/>
+            </a:schemeClr>
+          </a:lnRef>
+          <a:fillRef idx="1">
+            <a:schemeClr val="accent1"/>
+          </a:fillRef>
+          <a:effectRef idx="0">
+            <a:schemeClr val="accent1"/>
+          </a:effectRef>
+          <a:fontRef idx="minor">
+            <a:schemeClr val="lt1"/>
+          </a:fontRef>
+        </p:style>
+        <p:txBody>
+          <a:bodyPr rtlCol="0" anchor="ctr"/>
+          <a:lstStyle/>
+          <a:p>
+            <a:r>
+              <a:rPr lang="en-US" sz="1100" b="1" dirty="0"/>
+              <a:t>Malware data manager </a:t>
+            </a:r>
+            <a:endParaRPr lang="en-SG" sz="1100" b="1" dirty="0"/>
+          </a:p>
+        </p:txBody>
+      </p:sp>
+      <p:cxnSp>
+        <p:nvCxnSpPr>
+          <p:cNvPr id="19" name="Connector: Elbow 18">
+            <a:extLst>
+              <a:ext uri="{FF2B5EF4-FFF2-40B4-BE49-F238E27FC236}">
+                <a16:creationId xmlns:a16="http://schemas.microsoft.com/office/drawing/2014/main" id="{7D6A7B9B-5D1D-A76F-A938-7911F78DB895}"/>
+              </a:ext>
+            </a:extLst>
+          </p:cNvPr>
+          <p:cNvCxnSpPr>
+            <a:cxnSpLocks/>
+            <a:endCxn id="18" idx="0"/>
+          </p:cNvCxnSpPr>
+          <p:nvPr/>
+        </p:nvCxnSpPr>
+        <p:spPr>
+          <a:xfrm>
+            <a:off x="5013655" y="1533688"/>
+            <a:ext cx="2659596" cy="1014001"/>
+          </a:xfrm>
+          <a:prstGeom prst="bentConnector2">
+            <a:avLst/>
+          </a:prstGeom>
+          <a:ln>
+            <a:tailEnd type="triangle"/>
+          </a:ln>
+        </p:spPr>
+        <p:style>
+          <a:lnRef idx="1">
+            <a:schemeClr val="dk1"/>
+          </a:lnRef>
+          <a:fillRef idx="0">
+            <a:schemeClr val="dk1"/>
+          </a:fillRef>
+          <a:effectRef idx="0">
+            <a:schemeClr val="dk1"/>
+          </a:effectRef>
+          <a:fontRef idx="minor">
+            <a:schemeClr val="tx1"/>
+          </a:fontRef>
+        </p:style>
+      </p:cxnSp>
+      <p:cxnSp>
+        <p:nvCxnSpPr>
+          <p:cNvPr id="20" name="Straight Arrow Connector 19">
+            <a:extLst>
+              <a:ext uri="{FF2B5EF4-FFF2-40B4-BE49-F238E27FC236}">
+                <a16:creationId xmlns:a16="http://schemas.microsoft.com/office/drawing/2014/main" id="{360C8CB8-F1A8-CD90-A321-21892541F910}"/>
+              </a:ext>
+            </a:extLst>
+          </p:cNvPr>
+          <p:cNvCxnSpPr>
+            <a:cxnSpLocks/>
+            <a:endCxn id="18" idx="2"/>
+          </p:cNvCxnSpPr>
+          <p:nvPr/>
+        </p:nvCxnSpPr>
+        <p:spPr>
+          <a:xfrm flipV="1">
+            <a:off x="7673251" y="2952509"/>
+            <a:ext cx="0" cy="1228871"/>
+          </a:xfrm>
+          <a:prstGeom prst="straightConnector1">
+            <a:avLst/>
+          </a:prstGeom>
+          <a:ln>
+            <a:solidFill>
+              <a:schemeClr val="accent6">
+                <a:lumMod val="75000"/>
+              </a:schemeClr>
+            </a:solidFill>
+            <a:prstDash val="dash"/>
+            <a:tailEnd type="triangle"/>
+          </a:ln>
+        </p:spPr>
+        <p:style>
+          <a:lnRef idx="1">
+            <a:schemeClr val="accent1"/>
+          </a:lnRef>
+          <a:fillRef idx="0">
+            <a:schemeClr val="accent1"/>
+          </a:fillRef>
+          <a:effectRef idx="0">
+            <a:schemeClr val="accent1"/>
+          </a:effectRef>
+          <a:fontRef idx="minor">
+            <a:schemeClr val="tx1"/>
+          </a:fontRef>
+        </p:style>
+      </p:cxnSp>
+      <p:cxnSp>
+        <p:nvCxnSpPr>
+          <p:cNvPr id="21" name="Connector: Elbow 20">
+            <a:extLst>
+              <a:ext uri="{FF2B5EF4-FFF2-40B4-BE49-F238E27FC236}">
+                <a16:creationId xmlns:a16="http://schemas.microsoft.com/office/drawing/2014/main" id="{146DD078-73F4-C961-7CE8-1D9F43C8EE56}"/>
+              </a:ext>
+            </a:extLst>
+          </p:cNvPr>
+          <p:cNvCxnSpPr>
+            <a:cxnSpLocks/>
+          </p:cNvCxnSpPr>
+          <p:nvPr/>
+        </p:nvCxnSpPr>
+        <p:spPr>
+          <a:xfrm rot="10800000" flipV="1">
+            <a:off x="3563568" y="2940998"/>
+            <a:ext cx="3904024" cy="824054"/>
+          </a:xfrm>
+          <a:prstGeom prst="bentConnector3">
+            <a:avLst>
+              <a:gd name="adj1" fmla="val 4093"/>
+            </a:avLst>
+          </a:prstGeom>
+          <a:ln>
+            <a:solidFill>
+              <a:schemeClr val="accent6">
+                <a:lumMod val="75000"/>
+              </a:schemeClr>
+            </a:solidFill>
+            <a:prstDash val="dash"/>
+            <a:tailEnd type="triangle"/>
+          </a:ln>
+        </p:spPr>
+        <p:style>
+          <a:lnRef idx="1">
+            <a:schemeClr val="accent1"/>
+          </a:lnRef>
+          <a:fillRef idx="0">
+            <a:schemeClr val="accent1"/>
+          </a:fillRef>
+          <a:effectRef idx="0">
+            <a:schemeClr val="accent1"/>
+          </a:effectRef>
+          <a:fontRef idx="minor">
+            <a:schemeClr val="tx1"/>
+          </a:fontRef>
+        </p:style>
+      </p:cxnSp>
+      <p:cxnSp>
+        <p:nvCxnSpPr>
+          <p:cNvPr id="22" name="Connector: Elbow 21">
+            <a:extLst>
+              <a:ext uri="{FF2B5EF4-FFF2-40B4-BE49-F238E27FC236}">
+                <a16:creationId xmlns:a16="http://schemas.microsoft.com/office/drawing/2014/main" id="{A5708532-049B-8675-BAAE-DF32DCE2799A}"/>
+              </a:ext>
+            </a:extLst>
+          </p:cNvPr>
+          <p:cNvCxnSpPr>
+            <a:cxnSpLocks/>
+          </p:cNvCxnSpPr>
+          <p:nvPr/>
+        </p:nvCxnSpPr>
+        <p:spPr>
+          <a:xfrm rot="10800000">
+            <a:off x="3563566" y="2821814"/>
+            <a:ext cx="1136450" cy="943239"/>
+          </a:xfrm>
+          <a:prstGeom prst="bentConnector3">
+            <a:avLst>
+              <a:gd name="adj1" fmla="val 50000"/>
+            </a:avLst>
+          </a:prstGeom>
+          <a:ln>
+            <a:solidFill>
+              <a:schemeClr val="accent6">
+                <a:lumMod val="75000"/>
+              </a:schemeClr>
+            </a:solidFill>
+            <a:prstDash val="dash"/>
+            <a:tailEnd type="triangle"/>
+          </a:ln>
+        </p:spPr>
+        <p:style>
+          <a:lnRef idx="1">
+            <a:schemeClr val="accent1"/>
+          </a:lnRef>
+          <a:fillRef idx="0">
+            <a:schemeClr val="accent1"/>
+          </a:fillRef>
+          <a:effectRef idx="0">
+            <a:schemeClr val="accent1"/>
+          </a:effectRef>
+          <a:fontRef idx="minor">
+            <a:schemeClr val="tx1"/>
+          </a:fontRef>
+        </p:style>
+      </p:cxnSp>
+      <p:sp>
+        <p:nvSpPr>
+          <p:cNvPr id="23" name="TextBox 22">
+            <a:extLst>
+              <a:ext uri="{FF2B5EF4-FFF2-40B4-BE49-F238E27FC236}">
+                <a16:creationId xmlns:a16="http://schemas.microsoft.com/office/drawing/2014/main" id="{77E9B9BB-9569-C81B-5186-BB2F7B78F9BE}"/>
+              </a:ext>
+            </a:extLst>
+          </p:cNvPr>
+          <p:cNvSpPr txBox="1"/>
+          <p:nvPr/>
+        </p:nvSpPr>
+        <p:spPr>
+          <a:xfrm>
+            <a:off x="5311127" y="1148714"/>
+            <a:ext cx="1647412" cy="261610"/>
+          </a:xfrm>
+          <a:prstGeom prst="rect">
+            <a:avLst/>
+          </a:prstGeom>
+          <a:noFill/>
+        </p:spPr>
+        <p:txBody>
+          <a:bodyPr wrap="square" rtlCol="0">
+            <a:spAutoFit/>
+          </a:bodyPr>
+          <a:lstStyle/>
+          <a:p>
+            <a:r>
+              <a:rPr lang="en-US" sz="1100" dirty="0"/>
+              <a:t>Control module thread</a:t>
+            </a:r>
+            <a:endParaRPr lang="en-SG" sz="1100" dirty="0"/>
+          </a:p>
+        </p:txBody>
+      </p:sp>
+      <p:sp>
+        <p:nvSpPr>
+          <p:cNvPr id="24" name="TextBox 23">
+            <a:extLst>
+              <a:ext uri="{FF2B5EF4-FFF2-40B4-BE49-F238E27FC236}">
+                <a16:creationId xmlns:a16="http://schemas.microsoft.com/office/drawing/2014/main" id="{72135EF5-004C-93E4-E43E-B88C9514C14B}"/>
+              </a:ext>
+            </a:extLst>
+          </p:cNvPr>
+          <p:cNvSpPr txBox="1"/>
+          <p:nvPr/>
+        </p:nvSpPr>
+        <p:spPr>
+          <a:xfrm>
+            <a:off x="2926645" y="2939142"/>
+            <a:ext cx="1452944" cy="430887"/>
+          </a:xfrm>
+          <a:prstGeom prst="rect">
+            <a:avLst/>
+          </a:prstGeom>
+          <a:noFill/>
+        </p:spPr>
+        <p:txBody>
+          <a:bodyPr wrap="square" rtlCol="0">
+            <a:spAutoFit/>
+          </a:bodyPr>
+          <a:lstStyle/>
+          <a:p>
+            <a:r>
+              <a:rPr lang="en-US" sz="1100" dirty="0">
+                <a:solidFill>
+                  <a:schemeClr val="accent1">
+                    <a:lumMod val="50000"/>
+                  </a:schemeClr>
+                </a:solidFill>
+              </a:rPr>
+              <a:t>Malware task assignment request </a:t>
+            </a:r>
+            <a:endParaRPr lang="en-SG" sz="1100" dirty="0">
+              <a:solidFill>
+                <a:schemeClr val="accent1">
+                  <a:lumMod val="50000"/>
+                </a:schemeClr>
+              </a:solidFill>
+            </a:endParaRPr>
+          </a:p>
+        </p:txBody>
+      </p:sp>
+      <p:sp>
+        <p:nvSpPr>
+          <p:cNvPr id="25" name="TextBox 24">
+            <a:extLst>
+              <a:ext uri="{FF2B5EF4-FFF2-40B4-BE49-F238E27FC236}">
+                <a16:creationId xmlns:a16="http://schemas.microsoft.com/office/drawing/2014/main" id="{EAF3836D-4CF7-992C-0F68-7EB6160E6AFA}"/>
+              </a:ext>
+            </a:extLst>
+          </p:cNvPr>
+          <p:cNvSpPr txBox="1"/>
+          <p:nvPr/>
+        </p:nvSpPr>
+        <p:spPr>
+          <a:xfrm>
+            <a:off x="7312503" y="3041854"/>
+            <a:ext cx="1034366" cy="430887"/>
+          </a:xfrm>
+          <a:prstGeom prst="rect">
+            <a:avLst/>
+          </a:prstGeom>
+          <a:noFill/>
+        </p:spPr>
+        <p:txBody>
+          <a:bodyPr wrap="square" rtlCol="0">
+            <a:spAutoFit/>
+          </a:bodyPr>
+          <a:lstStyle/>
+          <a:p>
+            <a:r>
+              <a:rPr lang="en-US" sz="1100" dirty="0">
+                <a:solidFill>
+                  <a:schemeClr val="accent6">
+                    <a:lumMod val="75000"/>
+                  </a:schemeClr>
+                </a:solidFill>
+              </a:rPr>
+              <a:t>Malware state feedback data</a:t>
+            </a:r>
+            <a:endParaRPr lang="en-SG" sz="1100" dirty="0">
+              <a:solidFill>
+                <a:schemeClr val="accent6">
+                  <a:lumMod val="75000"/>
+                </a:schemeClr>
+              </a:solidFill>
+            </a:endParaRPr>
+          </a:p>
+        </p:txBody>
+      </p:sp>
+      <p:pic>
+        <p:nvPicPr>
+          <p:cNvPr id="26" name="Picture 25">
+            <a:extLst>
+              <a:ext uri="{FF2B5EF4-FFF2-40B4-BE49-F238E27FC236}">
+                <a16:creationId xmlns:a16="http://schemas.microsoft.com/office/drawing/2014/main" id="{6BF83198-0E6B-05E2-FBD8-68648F27E10C}"/>
+              </a:ext>
+            </a:extLst>
+          </p:cNvPr>
+          <p:cNvPicPr>
+            <a:picLocks noChangeAspect="1"/>
+          </p:cNvPicPr>
+          <p:nvPr/>
+        </p:nvPicPr>
+        <p:blipFill>
+          <a:blip r:embed="rId2"/>
+          <a:stretch>
+            <a:fillRect/>
+          </a:stretch>
+        </p:blipFill>
+        <p:spPr>
+          <a:xfrm>
+            <a:off x="574961" y="1048375"/>
+            <a:ext cx="2295431" cy="1231881"/>
+          </a:xfrm>
+          <a:prstGeom prst="rect">
+            <a:avLst/>
+          </a:prstGeom>
+          <a:ln w="6350">
+            <a:solidFill>
+              <a:schemeClr val="tx1"/>
+            </a:solidFill>
+          </a:ln>
+        </p:spPr>
+      </p:pic>
+      <p:cxnSp>
+        <p:nvCxnSpPr>
+          <p:cNvPr id="27" name="Connector: Elbow 26">
+            <a:extLst>
+              <a:ext uri="{FF2B5EF4-FFF2-40B4-BE49-F238E27FC236}">
+                <a16:creationId xmlns:a16="http://schemas.microsoft.com/office/drawing/2014/main" id="{CAE2308B-4905-C1A8-1C7D-911E88485644}"/>
+              </a:ext>
+            </a:extLst>
+          </p:cNvPr>
+          <p:cNvCxnSpPr>
+            <a:cxnSpLocks/>
+            <a:endCxn id="32" idx="3"/>
+          </p:cNvCxnSpPr>
+          <p:nvPr/>
+        </p:nvCxnSpPr>
+        <p:spPr>
+          <a:xfrm rot="5400000">
+            <a:off x="972386" y="2551240"/>
+            <a:ext cx="590155" cy="2584"/>
+          </a:xfrm>
+          <a:prstGeom prst="bentConnector3">
+            <a:avLst>
+              <a:gd name="adj1" fmla="val 50000"/>
+            </a:avLst>
+          </a:prstGeom>
+          <a:ln>
+            <a:headEnd type="triangle"/>
+            <a:tailEnd type="triangle"/>
+          </a:ln>
+        </p:spPr>
+        <p:style>
+          <a:lnRef idx="1">
+            <a:schemeClr val="accent1"/>
+          </a:lnRef>
+          <a:fillRef idx="0">
+            <a:schemeClr val="accent1"/>
+          </a:fillRef>
+          <a:effectRef idx="0">
+            <a:schemeClr val="accent1"/>
+          </a:effectRef>
+          <a:fontRef idx="minor">
+            <a:schemeClr val="tx1"/>
+          </a:fontRef>
+        </p:style>
+      </p:cxnSp>
+      <p:sp>
+        <p:nvSpPr>
+          <p:cNvPr id="28" name="TextBox 27">
+            <a:extLst>
+              <a:ext uri="{FF2B5EF4-FFF2-40B4-BE49-F238E27FC236}">
+                <a16:creationId xmlns:a16="http://schemas.microsoft.com/office/drawing/2014/main" id="{A839F894-54B4-3843-2846-FAEBBE3EB3A0}"/>
+              </a:ext>
+            </a:extLst>
+          </p:cNvPr>
+          <p:cNvSpPr txBox="1"/>
+          <p:nvPr/>
+        </p:nvSpPr>
+        <p:spPr>
+          <a:xfrm>
+            <a:off x="429805" y="771375"/>
+            <a:ext cx="1057737" cy="276999"/>
+          </a:xfrm>
+          <a:prstGeom prst="rect">
+            <a:avLst/>
+          </a:prstGeom>
+          <a:noFill/>
+        </p:spPr>
+        <p:txBody>
+          <a:bodyPr wrap="square" rtlCol="0">
+            <a:spAutoFit/>
+          </a:bodyPr>
+          <a:lstStyle/>
+          <a:p>
+            <a:r>
+              <a:rPr lang="en-US" sz="1200" b="1" dirty="0"/>
+              <a:t>RTC2 Web-UI</a:t>
+            </a:r>
+            <a:endParaRPr lang="en-SG" sz="1200" b="1" dirty="0"/>
+          </a:p>
+        </p:txBody>
+      </p:sp>
+      <p:pic>
+        <p:nvPicPr>
+          <p:cNvPr id="29" name="Picture 28">
+            <a:extLst>
+              <a:ext uri="{FF2B5EF4-FFF2-40B4-BE49-F238E27FC236}">
+                <a16:creationId xmlns:a16="http://schemas.microsoft.com/office/drawing/2014/main" id="{109DFAA9-BA30-8AC8-FF0A-9D7F9F0236FC}"/>
+              </a:ext>
+            </a:extLst>
+          </p:cNvPr>
+          <p:cNvPicPr>
+            <a:picLocks noChangeAspect="1"/>
+          </p:cNvPicPr>
+          <p:nvPr/>
+        </p:nvPicPr>
+        <p:blipFill>
+          <a:blip r:embed="rId3"/>
+          <a:stretch>
+            <a:fillRect/>
+          </a:stretch>
+        </p:blipFill>
+        <p:spPr>
+          <a:xfrm>
+            <a:off x="1028743" y="4079492"/>
+            <a:ext cx="474854" cy="521753"/>
+          </a:xfrm>
+          <a:prstGeom prst="rect">
+            <a:avLst/>
+          </a:prstGeom>
+          <a:ln w="3175">
+            <a:solidFill>
+              <a:schemeClr val="tx1"/>
+            </a:solidFill>
+          </a:ln>
+        </p:spPr>
+      </p:pic>
+      <p:cxnSp>
+        <p:nvCxnSpPr>
+          <p:cNvPr id="30" name="Connector: Elbow 29">
+            <a:extLst>
+              <a:ext uri="{FF2B5EF4-FFF2-40B4-BE49-F238E27FC236}">
+                <a16:creationId xmlns:a16="http://schemas.microsoft.com/office/drawing/2014/main" id="{161BBFE7-89FB-D379-757A-D2149E313D95}"/>
+              </a:ext>
+            </a:extLst>
+          </p:cNvPr>
+          <p:cNvCxnSpPr>
+            <a:cxnSpLocks/>
+            <a:stCxn id="29" idx="0"/>
+            <a:endCxn id="32" idx="1"/>
+          </p:cNvCxnSpPr>
+          <p:nvPr/>
+        </p:nvCxnSpPr>
+        <p:spPr>
+          <a:xfrm rot="5400000" flipH="1" flipV="1">
+            <a:off x="937267" y="3750589"/>
+            <a:ext cx="657807" cy="1"/>
+          </a:xfrm>
+          <a:prstGeom prst="bentConnector3">
+            <a:avLst>
+              <a:gd name="adj1" fmla="val 50000"/>
+            </a:avLst>
+          </a:prstGeom>
+          <a:ln>
+            <a:headEnd type="triangle"/>
+            <a:tailEnd type="triangle"/>
+          </a:ln>
+        </p:spPr>
+        <p:style>
+          <a:lnRef idx="1">
+            <a:schemeClr val="accent1"/>
+          </a:lnRef>
+          <a:fillRef idx="0">
+            <a:schemeClr val="accent1"/>
+          </a:fillRef>
+          <a:effectRef idx="0">
+            <a:schemeClr val="accent1"/>
+          </a:effectRef>
+          <a:fontRef idx="minor">
+            <a:schemeClr val="tx1"/>
+          </a:fontRef>
+        </p:style>
+      </p:cxnSp>
+      <p:sp>
+        <p:nvSpPr>
+          <p:cNvPr id="31" name="TextBox 30">
+            <a:extLst>
+              <a:ext uri="{FF2B5EF4-FFF2-40B4-BE49-F238E27FC236}">
+                <a16:creationId xmlns:a16="http://schemas.microsoft.com/office/drawing/2014/main" id="{B0C2748E-80F6-E3CD-4A00-A5E5CEDA3FD2}"/>
+              </a:ext>
+            </a:extLst>
+          </p:cNvPr>
+          <p:cNvSpPr txBox="1"/>
+          <p:nvPr/>
+        </p:nvSpPr>
+        <p:spPr>
+          <a:xfrm>
+            <a:off x="1491146" y="4077241"/>
+            <a:ext cx="1534074" cy="461665"/>
+          </a:xfrm>
+          <a:prstGeom prst="rect">
+            <a:avLst/>
+          </a:prstGeom>
+          <a:noFill/>
+        </p:spPr>
+        <p:txBody>
+          <a:bodyPr wrap="square" rtlCol="0">
+            <a:spAutoFit/>
+          </a:bodyPr>
+          <a:lstStyle/>
+          <a:p>
+            <a:r>
+              <a:rPr lang="en-US" sz="1200" b="1" dirty="0"/>
+              <a:t>User customized program all RTC2 API</a:t>
+            </a:r>
+            <a:endParaRPr lang="en-SG" sz="1200" b="1" dirty="0"/>
+          </a:p>
+        </p:txBody>
+      </p:sp>
+      <p:sp>
+        <p:nvSpPr>
+          <p:cNvPr id="32" name="Cloud 31">
+            <a:extLst>
+              <a:ext uri="{FF2B5EF4-FFF2-40B4-BE49-F238E27FC236}">
+                <a16:creationId xmlns:a16="http://schemas.microsoft.com/office/drawing/2014/main" id="{130CB04D-A554-E7FE-BFA1-338A65289C61}"/>
+              </a:ext>
+            </a:extLst>
+          </p:cNvPr>
+          <p:cNvSpPr/>
+          <p:nvPr/>
+        </p:nvSpPr>
+        <p:spPr>
+          <a:xfrm>
+            <a:off x="698249" y="2812757"/>
+            <a:ext cx="1135843" cy="609577"/>
+          </a:xfrm>
+          <a:prstGeom prst="cloud">
+            <a:avLst/>
+          </a:prstGeom>
+          <a:solidFill>
+            <a:schemeClr val="accent1">
+              <a:lumMod val="60000"/>
+              <a:lumOff val="40000"/>
+            </a:schemeClr>
+          </a:solidFill>
+        </p:spPr>
+        <p:style>
+          <a:lnRef idx="2">
+            <a:schemeClr val="accent1">
+              <a:shade val="15000"/>
+            </a:schemeClr>
+          </a:lnRef>
+          <a:fillRef idx="1">
+            <a:schemeClr val="accent1"/>
+          </a:fillRef>
+          <a:effectRef idx="0">
+            <a:schemeClr val="accent1"/>
+          </a:effectRef>
+          <a:fontRef idx="minor">
+            <a:schemeClr val="lt1"/>
+          </a:fontRef>
+        </p:style>
+        <p:txBody>
+          <a:bodyPr rtlCol="0" anchor="ctr"/>
+          <a:lstStyle/>
+          <a:p>
+            <a:pPr algn="ctr"/>
+            <a:r>
+              <a:rPr lang="en-SG" sz="1200" b="1" dirty="0">
+                <a:solidFill>
+                  <a:schemeClr val="tx1"/>
+                </a:solidFill>
+              </a:rPr>
+              <a:t>Internet</a:t>
+            </a:r>
+            <a:r>
+              <a:rPr lang="en-SG" dirty="0">
+                <a:solidFill>
+                  <a:schemeClr val="tx1"/>
+                </a:solidFill>
+              </a:rPr>
+              <a:t> </a:t>
+            </a:r>
+          </a:p>
+        </p:txBody>
+      </p:sp>
+      <p:cxnSp>
+        <p:nvCxnSpPr>
+          <p:cNvPr id="33" name="Connector: Elbow 32">
+            <a:extLst>
+              <a:ext uri="{FF2B5EF4-FFF2-40B4-BE49-F238E27FC236}">
+                <a16:creationId xmlns:a16="http://schemas.microsoft.com/office/drawing/2014/main" id="{1B53BE38-7120-5FA5-4409-00A423E2EDCC}"/>
+              </a:ext>
+            </a:extLst>
+          </p:cNvPr>
+          <p:cNvCxnSpPr>
+            <a:cxnSpLocks/>
+            <a:stCxn id="8" idx="1"/>
+          </p:cNvCxnSpPr>
+          <p:nvPr/>
+        </p:nvCxnSpPr>
+        <p:spPr>
+          <a:xfrm rot="10800000">
+            <a:off x="1752242" y="3301507"/>
+            <a:ext cx="609503" cy="305047"/>
+          </a:xfrm>
+          <a:prstGeom prst="bentConnector3">
+            <a:avLst>
+              <a:gd name="adj1" fmla="val 50000"/>
+            </a:avLst>
+          </a:prstGeom>
+          <a:ln>
+            <a:headEnd type="triangle"/>
+            <a:tailEnd type="triangle"/>
+          </a:ln>
+        </p:spPr>
+        <p:style>
+          <a:lnRef idx="1">
+            <a:schemeClr val="accent1"/>
+          </a:lnRef>
+          <a:fillRef idx="0">
+            <a:schemeClr val="accent1"/>
+          </a:fillRef>
+          <a:effectRef idx="0">
+            <a:schemeClr val="accent1"/>
+          </a:effectRef>
+          <a:fontRef idx="minor">
+            <a:schemeClr val="tx1"/>
+          </a:fontRef>
+        </p:style>
+      </p:cxnSp>
+      <p:cxnSp>
+        <p:nvCxnSpPr>
+          <p:cNvPr id="34" name="Connector: Elbow 33">
+            <a:extLst>
+              <a:ext uri="{FF2B5EF4-FFF2-40B4-BE49-F238E27FC236}">
+                <a16:creationId xmlns:a16="http://schemas.microsoft.com/office/drawing/2014/main" id="{AB2C85D1-2541-8728-5427-C28FD8D36204}"/>
+              </a:ext>
+            </a:extLst>
+          </p:cNvPr>
+          <p:cNvCxnSpPr>
+            <a:cxnSpLocks/>
+            <a:stCxn id="7" idx="1"/>
+          </p:cNvCxnSpPr>
+          <p:nvPr/>
+        </p:nvCxnSpPr>
+        <p:spPr>
+          <a:xfrm rot="10800000" flipV="1">
+            <a:off x="1738462" y="2702621"/>
+            <a:ext cx="623283" cy="144990"/>
+          </a:xfrm>
+          <a:prstGeom prst="bentConnector3">
+            <a:avLst>
+              <a:gd name="adj1" fmla="val 50000"/>
+            </a:avLst>
+          </a:prstGeom>
+          <a:ln>
+            <a:headEnd type="triangle"/>
+            <a:tailEnd type="triangle"/>
+          </a:ln>
+        </p:spPr>
+        <p:style>
+          <a:lnRef idx="1">
+            <a:schemeClr val="accent1"/>
+          </a:lnRef>
+          <a:fillRef idx="0">
+            <a:schemeClr val="accent1"/>
+          </a:fillRef>
+          <a:effectRef idx="0">
+            <a:schemeClr val="accent1"/>
+          </a:effectRef>
+          <a:fontRef idx="minor">
+            <a:schemeClr val="tx1"/>
+          </a:fontRef>
+        </p:style>
+      </p:cxnSp>
+      <p:sp>
+        <p:nvSpPr>
+          <p:cNvPr id="35" name="Cloud 34">
+            <a:extLst>
+              <a:ext uri="{FF2B5EF4-FFF2-40B4-BE49-F238E27FC236}">
+                <a16:creationId xmlns:a16="http://schemas.microsoft.com/office/drawing/2014/main" id="{9EC90015-A52F-C40F-F4BA-A16FCE7FA9B3}"/>
+              </a:ext>
+            </a:extLst>
+          </p:cNvPr>
+          <p:cNvSpPr/>
+          <p:nvPr/>
+        </p:nvSpPr>
+        <p:spPr>
+          <a:xfrm>
+            <a:off x="8992188" y="3065240"/>
+            <a:ext cx="1135843" cy="609577"/>
+          </a:xfrm>
+          <a:prstGeom prst="cloud">
+            <a:avLst/>
+          </a:prstGeom>
+          <a:solidFill>
+            <a:schemeClr val="accent1">
+              <a:lumMod val="60000"/>
+              <a:lumOff val="40000"/>
+            </a:schemeClr>
+          </a:solidFill>
+        </p:spPr>
+        <p:style>
+          <a:lnRef idx="2">
+            <a:schemeClr val="accent1">
+              <a:shade val="15000"/>
+            </a:schemeClr>
+          </a:lnRef>
+          <a:fillRef idx="1">
+            <a:schemeClr val="accent1"/>
+          </a:fillRef>
+          <a:effectRef idx="0">
+            <a:schemeClr val="accent1"/>
+          </a:effectRef>
+          <a:fontRef idx="minor">
+            <a:schemeClr val="lt1"/>
+          </a:fontRef>
+        </p:style>
+        <p:txBody>
+          <a:bodyPr rtlCol="0" anchor="ctr"/>
+          <a:lstStyle/>
+          <a:p>
+            <a:pPr algn="ctr"/>
+            <a:r>
+              <a:rPr lang="en-SG" sz="1200" b="1" dirty="0">
+                <a:solidFill>
+                  <a:schemeClr val="tx1"/>
+                </a:solidFill>
+              </a:rPr>
+              <a:t>Internet</a:t>
+            </a:r>
+            <a:r>
+              <a:rPr lang="en-SG" dirty="0">
+                <a:solidFill>
+                  <a:schemeClr val="tx1"/>
+                </a:solidFill>
+              </a:rPr>
+              <a:t> </a:t>
+            </a:r>
+          </a:p>
+        </p:txBody>
+      </p:sp>
+      <p:sp>
+        <p:nvSpPr>
+          <p:cNvPr id="36" name="Rectangle 35">
+            <a:extLst>
+              <a:ext uri="{FF2B5EF4-FFF2-40B4-BE49-F238E27FC236}">
+                <a16:creationId xmlns:a16="http://schemas.microsoft.com/office/drawing/2014/main" id="{2DF02A89-FE81-5BF6-4921-A538277C7B34}"/>
+              </a:ext>
+            </a:extLst>
+          </p:cNvPr>
+          <p:cNvSpPr/>
+          <p:nvPr/>
+        </p:nvSpPr>
+        <p:spPr>
+          <a:xfrm>
+            <a:off x="10492635" y="862620"/>
+            <a:ext cx="884473" cy="401443"/>
+          </a:xfrm>
+          <a:prstGeom prst="rect">
+            <a:avLst/>
+          </a:prstGeom>
+          <a:solidFill>
+            <a:srgbClr val="C00000"/>
+          </a:solidFill>
+        </p:spPr>
+        <p:style>
+          <a:lnRef idx="2">
+            <a:schemeClr val="accent1">
+              <a:shade val="50000"/>
+            </a:schemeClr>
+          </a:lnRef>
+          <a:fillRef idx="1">
+            <a:schemeClr val="accent1"/>
+          </a:fillRef>
+          <a:effectRef idx="0">
+            <a:schemeClr val="accent1"/>
+          </a:effectRef>
+          <a:fontRef idx="minor">
+            <a:schemeClr val="lt1"/>
+          </a:fontRef>
+        </p:style>
+        <p:txBody>
+          <a:bodyPr rtlCol="0" anchor="ctr"/>
+          <a:lstStyle/>
+          <a:p>
+            <a:r>
+              <a:rPr lang="en-US" sz="1100" b="1" dirty="0"/>
+              <a:t>Malware </a:t>
+            </a:r>
+            <a:r>
+              <a:rPr lang="en-US" sz="1100" b="1" dirty="0" err="1"/>
+              <a:t>init</a:t>
+            </a:r>
+            <a:r>
+              <a:rPr lang="en-US" sz="1100" b="1" dirty="0"/>
+              <a:t> start  </a:t>
+            </a:r>
+            <a:endParaRPr lang="en-SG" sz="1100" b="1" dirty="0"/>
+          </a:p>
+        </p:txBody>
+      </p:sp>
+      <p:sp>
+        <p:nvSpPr>
+          <p:cNvPr id="37" name="Rectangle 36">
+            <a:extLst>
+              <a:ext uri="{FF2B5EF4-FFF2-40B4-BE49-F238E27FC236}">
+                <a16:creationId xmlns:a16="http://schemas.microsoft.com/office/drawing/2014/main" id="{7BE00A86-1959-E5D9-F977-5EFF6BD00282}"/>
+              </a:ext>
+            </a:extLst>
+          </p:cNvPr>
+          <p:cNvSpPr/>
+          <p:nvPr/>
+        </p:nvSpPr>
+        <p:spPr>
+          <a:xfrm>
+            <a:off x="9428886" y="1824657"/>
+            <a:ext cx="884473" cy="283697"/>
+          </a:xfrm>
+          <a:prstGeom prst="rect">
+            <a:avLst/>
+          </a:prstGeom>
+          <a:solidFill>
+            <a:srgbClr val="C00000"/>
+          </a:solidFill>
+        </p:spPr>
+        <p:style>
+          <a:lnRef idx="2">
+            <a:schemeClr val="accent1">
+              <a:shade val="50000"/>
+            </a:schemeClr>
+          </a:lnRef>
+          <a:fillRef idx="1">
+            <a:schemeClr val="accent1"/>
+          </a:fillRef>
+          <a:effectRef idx="0">
+            <a:schemeClr val="accent1"/>
+          </a:effectRef>
+          <a:fontRef idx="minor">
+            <a:schemeClr val="lt1"/>
+          </a:fontRef>
+        </p:style>
+        <p:txBody>
+          <a:bodyPr rtlCol="0" anchor="ctr"/>
+          <a:lstStyle/>
+          <a:p>
+            <a:r>
+              <a:rPr lang="en-US" sz="1100" b="1" dirty="0"/>
+              <a:t>RTC2 client </a:t>
+            </a:r>
+          </a:p>
+        </p:txBody>
+      </p:sp>
+      <p:sp>
+        <p:nvSpPr>
+          <p:cNvPr id="38" name="Rectangle 37">
+            <a:extLst>
+              <a:ext uri="{FF2B5EF4-FFF2-40B4-BE49-F238E27FC236}">
+                <a16:creationId xmlns:a16="http://schemas.microsoft.com/office/drawing/2014/main" id="{1903A312-669A-01CA-B9F1-D8CD23D35DD3}"/>
+              </a:ext>
+            </a:extLst>
+          </p:cNvPr>
+          <p:cNvSpPr/>
+          <p:nvPr/>
+        </p:nvSpPr>
+        <p:spPr>
+          <a:xfrm>
+            <a:off x="10755980" y="2081246"/>
+            <a:ext cx="1063750" cy="430887"/>
+          </a:xfrm>
+          <a:prstGeom prst="rect">
+            <a:avLst/>
+          </a:prstGeom>
+          <a:solidFill>
+            <a:srgbClr val="C00000"/>
+          </a:solidFill>
+        </p:spPr>
+        <p:style>
+          <a:lnRef idx="2">
+            <a:schemeClr val="accent1">
+              <a:shade val="50000"/>
+            </a:schemeClr>
+          </a:lnRef>
+          <a:fillRef idx="1">
+            <a:schemeClr val="accent1"/>
+          </a:fillRef>
+          <a:effectRef idx="0">
+            <a:schemeClr val="accent1"/>
+          </a:effectRef>
+          <a:fontRef idx="minor">
+            <a:schemeClr val="lt1"/>
+          </a:fontRef>
+        </p:style>
+        <p:txBody>
+          <a:bodyPr rtlCol="0" anchor="ctr"/>
+          <a:lstStyle/>
+          <a:p>
+            <a:r>
+              <a:rPr lang="en-US" sz="1100" b="1" dirty="0"/>
+              <a:t>Malware data manager </a:t>
+            </a:r>
+          </a:p>
+        </p:txBody>
+      </p:sp>
+      <p:cxnSp>
+        <p:nvCxnSpPr>
+          <p:cNvPr id="39" name="Straight Arrow Connector 38">
+            <a:extLst>
+              <a:ext uri="{FF2B5EF4-FFF2-40B4-BE49-F238E27FC236}">
+                <a16:creationId xmlns:a16="http://schemas.microsoft.com/office/drawing/2014/main" id="{6ABA3723-9FDD-E8E5-F861-FC91F186E145}"/>
+              </a:ext>
+            </a:extLst>
+          </p:cNvPr>
+          <p:cNvCxnSpPr>
+            <a:cxnSpLocks/>
+          </p:cNvCxnSpPr>
+          <p:nvPr/>
+        </p:nvCxnSpPr>
+        <p:spPr>
+          <a:xfrm flipH="1">
+            <a:off x="10934871" y="1279519"/>
+            <a:ext cx="2" cy="789804"/>
+          </a:xfrm>
+          <a:prstGeom prst="straightConnector1">
+            <a:avLst/>
+          </a:prstGeom>
+          <a:ln w="19050">
+            <a:solidFill>
+              <a:schemeClr val="accent6">
+                <a:lumMod val="50000"/>
+              </a:schemeClr>
+            </a:solidFill>
+            <a:tailEnd type="triangle"/>
+          </a:ln>
+        </p:spPr>
+        <p:style>
+          <a:lnRef idx="1">
+            <a:schemeClr val="accent1"/>
+          </a:lnRef>
+          <a:fillRef idx="0">
+            <a:schemeClr val="accent1"/>
+          </a:fillRef>
+          <a:effectRef idx="0">
+            <a:schemeClr val="accent1"/>
+          </a:effectRef>
+          <a:fontRef idx="minor">
+            <a:schemeClr val="tx1"/>
+          </a:fontRef>
+        </p:style>
+      </p:cxnSp>
+      <p:cxnSp>
+        <p:nvCxnSpPr>
+          <p:cNvPr id="40" name="Connector: Elbow 39">
+            <a:extLst>
+              <a:ext uri="{FF2B5EF4-FFF2-40B4-BE49-F238E27FC236}">
+                <a16:creationId xmlns:a16="http://schemas.microsoft.com/office/drawing/2014/main" id="{387550A8-ADC3-2904-F315-1C4A6B070E76}"/>
+              </a:ext>
+            </a:extLst>
+          </p:cNvPr>
+          <p:cNvCxnSpPr>
+            <a:cxnSpLocks/>
+            <a:stCxn id="36" idx="1"/>
+            <a:endCxn id="37" idx="0"/>
+          </p:cNvCxnSpPr>
+          <p:nvPr/>
+        </p:nvCxnSpPr>
+        <p:spPr>
+          <a:xfrm rot="10800000" flipV="1">
+            <a:off x="9871123" y="1063341"/>
+            <a:ext cx="621512" cy="761315"/>
+          </a:xfrm>
+          <a:prstGeom prst="bentConnector2">
+            <a:avLst/>
+          </a:prstGeom>
+          <a:ln>
+            <a:tailEnd type="triangle"/>
+          </a:ln>
+        </p:spPr>
+        <p:style>
+          <a:lnRef idx="1">
+            <a:schemeClr val="dk1"/>
+          </a:lnRef>
+          <a:fillRef idx="0">
+            <a:schemeClr val="dk1"/>
+          </a:fillRef>
+          <a:effectRef idx="0">
+            <a:schemeClr val="dk1"/>
+          </a:effectRef>
+          <a:fontRef idx="minor">
+            <a:schemeClr val="tx1"/>
+          </a:fontRef>
+        </p:style>
+      </p:cxnSp>
+      <p:cxnSp>
+        <p:nvCxnSpPr>
+          <p:cNvPr id="41" name="Connector: Elbow 40">
+            <a:extLst>
+              <a:ext uri="{FF2B5EF4-FFF2-40B4-BE49-F238E27FC236}">
+                <a16:creationId xmlns:a16="http://schemas.microsoft.com/office/drawing/2014/main" id="{21A37570-0E0E-24B8-0AE7-B219BC170E61}"/>
+              </a:ext>
+            </a:extLst>
+          </p:cNvPr>
+          <p:cNvCxnSpPr>
+            <a:cxnSpLocks/>
+          </p:cNvCxnSpPr>
+          <p:nvPr/>
+        </p:nvCxnSpPr>
+        <p:spPr>
+          <a:xfrm rot="5400000" flipH="1" flipV="1">
+            <a:off x="9025745" y="2597764"/>
+            <a:ext cx="991739" cy="1"/>
+          </a:xfrm>
+          <a:prstGeom prst="bentConnector3">
+            <a:avLst>
+              <a:gd name="adj1" fmla="val 50000"/>
+            </a:avLst>
+          </a:prstGeom>
+          <a:ln w="12700">
+            <a:solidFill>
+              <a:schemeClr val="accent1">
+                <a:lumMod val="75000"/>
+              </a:schemeClr>
+            </a:solidFill>
+            <a:prstDash val="sysDash"/>
+            <a:tailEnd type="triangle"/>
+          </a:ln>
+        </p:spPr>
+        <p:style>
+          <a:lnRef idx="1">
+            <a:schemeClr val="accent1"/>
+          </a:lnRef>
+          <a:fillRef idx="0">
+            <a:schemeClr val="accent1"/>
+          </a:fillRef>
+          <a:effectRef idx="0">
+            <a:schemeClr val="accent1"/>
+          </a:effectRef>
+          <a:fontRef idx="minor">
+            <a:schemeClr val="tx1"/>
+          </a:fontRef>
+        </p:style>
+      </p:cxnSp>
+      <p:cxnSp>
+        <p:nvCxnSpPr>
+          <p:cNvPr id="42" name="Straight Arrow Connector 41">
+            <a:extLst>
+              <a:ext uri="{FF2B5EF4-FFF2-40B4-BE49-F238E27FC236}">
+                <a16:creationId xmlns:a16="http://schemas.microsoft.com/office/drawing/2014/main" id="{8DB7EEA1-76C6-0FE5-F853-4EF648EB4B02}"/>
+              </a:ext>
+            </a:extLst>
+          </p:cNvPr>
+          <p:cNvCxnSpPr>
+            <a:cxnSpLocks/>
+          </p:cNvCxnSpPr>
+          <p:nvPr/>
+        </p:nvCxnSpPr>
+        <p:spPr>
+          <a:xfrm flipH="1">
+            <a:off x="9702686" y="2131597"/>
+            <a:ext cx="257" cy="953790"/>
+          </a:xfrm>
+          <a:prstGeom prst="straightConnector1">
+            <a:avLst/>
+          </a:prstGeom>
+          <a:ln>
+            <a:solidFill>
+              <a:schemeClr val="accent6">
+                <a:lumMod val="75000"/>
+              </a:schemeClr>
+            </a:solidFill>
+            <a:prstDash val="dash"/>
+            <a:tailEnd type="triangle"/>
+          </a:ln>
+        </p:spPr>
+        <p:style>
+          <a:lnRef idx="1">
+            <a:schemeClr val="accent1"/>
+          </a:lnRef>
+          <a:fillRef idx="0">
+            <a:schemeClr val="accent1"/>
+          </a:fillRef>
+          <a:effectRef idx="0">
+            <a:schemeClr val="accent1"/>
+          </a:effectRef>
+          <a:fontRef idx="minor">
+            <a:schemeClr val="tx1"/>
+          </a:fontRef>
+        </p:style>
+      </p:cxnSp>
+      <p:cxnSp>
+        <p:nvCxnSpPr>
+          <p:cNvPr id="43" name="Connector: Elbow 42">
+            <a:extLst>
+              <a:ext uri="{FF2B5EF4-FFF2-40B4-BE49-F238E27FC236}">
+                <a16:creationId xmlns:a16="http://schemas.microsoft.com/office/drawing/2014/main" id="{C96F01F5-A54D-6765-B5AC-443685E683E5}"/>
+              </a:ext>
+            </a:extLst>
+          </p:cNvPr>
+          <p:cNvCxnSpPr>
+            <a:cxnSpLocks/>
+            <a:stCxn id="11" idx="3"/>
+            <a:endCxn id="35" idx="2"/>
+          </p:cNvCxnSpPr>
+          <p:nvPr/>
+        </p:nvCxnSpPr>
+        <p:spPr>
+          <a:xfrm flipV="1">
+            <a:off x="8293685" y="3370029"/>
+            <a:ext cx="702026" cy="1013763"/>
+          </a:xfrm>
+          <a:prstGeom prst="bentConnector3">
+            <a:avLst>
+              <a:gd name="adj1" fmla="val 50000"/>
+            </a:avLst>
+          </a:prstGeom>
+          <a:ln w="12700">
+            <a:solidFill>
+              <a:schemeClr val="accent1">
+                <a:lumMod val="75000"/>
+              </a:schemeClr>
+            </a:solidFill>
+            <a:prstDash val="sysDash"/>
+            <a:tailEnd type="triangle"/>
+          </a:ln>
+        </p:spPr>
+        <p:style>
+          <a:lnRef idx="1">
+            <a:schemeClr val="accent1"/>
+          </a:lnRef>
+          <a:fillRef idx="0">
+            <a:schemeClr val="accent1"/>
+          </a:fillRef>
+          <a:effectRef idx="0">
+            <a:schemeClr val="accent1"/>
+          </a:effectRef>
+          <a:fontRef idx="minor">
+            <a:schemeClr val="tx1"/>
+          </a:fontRef>
+        </p:style>
+      </p:cxnSp>
+      <p:cxnSp>
+        <p:nvCxnSpPr>
+          <p:cNvPr id="44" name="Connector: Elbow 43">
+            <a:extLst>
+              <a:ext uri="{FF2B5EF4-FFF2-40B4-BE49-F238E27FC236}">
+                <a16:creationId xmlns:a16="http://schemas.microsoft.com/office/drawing/2014/main" id="{F41B4A4B-3371-892F-DF9F-38A86A2F9CD3}"/>
+              </a:ext>
+            </a:extLst>
+          </p:cNvPr>
+          <p:cNvCxnSpPr>
+            <a:cxnSpLocks/>
+            <a:stCxn id="35" idx="1"/>
+          </p:cNvCxnSpPr>
+          <p:nvPr/>
+        </p:nvCxnSpPr>
+        <p:spPr>
+          <a:xfrm rot="5400000">
+            <a:off x="8497926" y="3476722"/>
+            <a:ext cx="864739" cy="1259631"/>
+          </a:xfrm>
+          <a:prstGeom prst="bentConnector2">
+            <a:avLst/>
+          </a:prstGeom>
+          <a:ln>
+            <a:solidFill>
+              <a:schemeClr val="accent6">
+                <a:lumMod val="75000"/>
+              </a:schemeClr>
+            </a:solidFill>
+            <a:prstDash val="dash"/>
+            <a:tailEnd type="triangle"/>
+          </a:ln>
+        </p:spPr>
+        <p:style>
+          <a:lnRef idx="1">
+            <a:schemeClr val="accent1"/>
+          </a:lnRef>
+          <a:fillRef idx="0">
+            <a:schemeClr val="accent1"/>
+          </a:fillRef>
+          <a:effectRef idx="0">
+            <a:schemeClr val="accent1"/>
+          </a:effectRef>
+          <a:fontRef idx="minor">
+            <a:schemeClr val="tx1"/>
+          </a:fontRef>
+        </p:style>
+      </p:cxnSp>
+      <p:cxnSp>
+        <p:nvCxnSpPr>
+          <p:cNvPr id="45" name="Straight Arrow Connector 44">
+            <a:extLst>
+              <a:ext uri="{FF2B5EF4-FFF2-40B4-BE49-F238E27FC236}">
+                <a16:creationId xmlns:a16="http://schemas.microsoft.com/office/drawing/2014/main" id="{7F1B9E13-8770-9EDD-05C8-49835ED07DA4}"/>
+              </a:ext>
+            </a:extLst>
+          </p:cNvPr>
+          <p:cNvCxnSpPr>
+            <a:cxnSpLocks/>
+          </p:cNvCxnSpPr>
+          <p:nvPr/>
+        </p:nvCxnSpPr>
+        <p:spPr>
+          <a:xfrm flipH="1">
+            <a:off x="6858631" y="2597764"/>
+            <a:ext cx="282744" cy="0"/>
+          </a:xfrm>
+          <a:prstGeom prst="straightConnector1">
+            <a:avLst/>
+          </a:prstGeom>
+          <a:ln w="28575">
+            <a:solidFill>
+              <a:srgbClr val="7030A0"/>
+            </a:solidFill>
+            <a:tailEnd type="triangle"/>
+          </a:ln>
+        </p:spPr>
+        <p:style>
+          <a:lnRef idx="1">
+            <a:schemeClr val="accent1"/>
+          </a:lnRef>
+          <a:fillRef idx="0">
+            <a:schemeClr val="accent1"/>
+          </a:fillRef>
+          <a:effectRef idx="0">
+            <a:schemeClr val="accent1"/>
+          </a:effectRef>
+          <a:fontRef idx="minor">
+            <a:schemeClr val="tx1"/>
+          </a:fontRef>
+        </p:style>
+      </p:cxnSp>
+      <p:cxnSp>
+        <p:nvCxnSpPr>
+          <p:cNvPr id="46" name="Straight Arrow Connector 45">
+            <a:extLst>
+              <a:ext uri="{FF2B5EF4-FFF2-40B4-BE49-F238E27FC236}">
+                <a16:creationId xmlns:a16="http://schemas.microsoft.com/office/drawing/2014/main" id="{B297F204-70F8-30BE-116D-0393C0F92585}"/>
+              </a:ext>
+            </a:extLst>
+          </p:cNvPr>
+          <p:cNvCxnSpPr>
+            <a:cxnSpLocks/>
+          </p:cNvCxnSpPr>
+          <p:nvPr/>
+        </p:nvCxnSpPr>
+        <p:spPr>
+          <a:xfrm>
+            <a:off x="10937051" y="2503629"/>
+            <a:ext cx="0" cy="309128"/>
+          </a:xfrm>
+          <a:prstGeom prst="straightConnector1">
+            <a:avLst/>
+          </a:prstGeom>
+          <a:ln w="19050">
+            <a:solidFill>
+              <a:schemeClr val="accent6">
+                <a:lumMod val="50000"/>
+              </a:schemeClr>
+            </a:solidFill>
+            <a:tailEnd type="triangle"/>
+          </a:ln>
+        </p:spPr>
+        <p:style>
+          <a:lnRef idx="1">
+            <a:schemeClr val="accent1"/>
+          </a:lnRef>
+          <a:fillRef idx="0">
+            <a:schemeClr val="accent1"/>
+          </a:fillRef>
+          <a:effectRef idx="0">
+            <a:schemeClr val="accent1"/>
+          </a:effectRef>
+          <a:fontRef idx="minor">
+            <a:schemeClr val="tx1"/>
+          </a:fontRef>
+        </p:style>
+      </p:cxnSp>
+      <p:sp>
+        <p:nvSpPr>
+          <p:cNvPr id="47" name="Rectangle 46">
+            <a:extLst>
+              <a:ext uri="{FF2B5EF4-FFF2-40B4-BE49-F238E27FC236}">
+                <a16:creationId xmlns:a16="http://schemas.microsoft.com/office/drawing/2014/main" id="{39FEE6B3-B6D5-DFE5-694D-8C73EC107BD0}"/>
+              </a:ext>
+            </a:extLst>
+          </p:cNvPr>
+          <p:cNvSpPr/>
+          <p:nvPr/>
+        </p:nvSpPr>
+        <p:spPr>
+          <a:xfrm>
+            <a:off x="10755980" y="2820235"/>
+            <a:ext cx="1063750" cy="430887"/>
+          </a:xfrm>
+          <a:prstGeom prst="rect">
+            <a:avLst/>
+          </a:prstGeom>
+          <a:solidFill>
+            <a:srgbClr val="C00000"/>
+          </a:solidFill>
+        </p:spPr>
+        <p:style>
+          <a:lnRef idx="2">
+            <a:schemeClr val="accent1">
+              <a:shade val="50000"/>
+            </a:schemeClr>
+          </a:lnRef>
+          <a:fillRef idx="1">
+            <a:schemeClr val="accent1"/>
+          </a:fillRef>
+          <a:effectRef idx="0">
+            <a:schemeClr val="accent1"/>
+          </a:effectRef>
+          <a:fontRef idx="minor">
+            <a:schemeClr val="lt1"/>
+          </a:fontRef>
+        </p:style>
+        <p:txBody>
+          <a:bodyPr rtlCol="0" anchor="ctr"/>
+          <a:lstStyle/>
+          <a:p>
+            <a:r>
+              <a:rPr lang="en-US" sz="1100" b="1" dirty="0"/>
+              <a:t>Malware main functions</a:t>
+            </a:r>
+          </a:p>
+        </p:txBody>
+      </p:sp>
+      <p:cxnSp>
+        <p:nvCxnSpPr>
+          <p:cNvPr id="48" name="Connector: Elbow 47">
+            <a:extLst>
+              <a:ext uri="{FF2B5EF4-FFF2-40B4-BE49-F238E27FC236}">
+                <a16:creationId xmlns:a16="http://schemas.microsoft.com/office/drawing/2014/main" id="{1104D198-167D-BBB7-D633-2026DE1848E3}"/>
+              </a:ext>
+            </a:extLst>
+          </p:cNvPr>
+          <p:cNvCxnSpPr>
+            <a:cxnSpLocks/>
+            <a:stCxn id="38" idx="1"/>
+            <a:endCxn id="37" idx="3"/>
+          </p:cNvCxnSpPr>
+          <p:nvPr/>
+        </p:nvCxnSpPr>
+        <p:spPr>
+          <a:xfrm rot="10800000">
+            <a:off x="10313360" y="1966506"/>
+            <a:ext cx="442621" cy="330184"/>
+          </a:xfrm>
+          <a:prstGeom prst="bentConnector3">
+            <a:avLst>
+              <a:gd name="adj1" fmla="val 50000"/>
+            </a:avLst>
+          </a:prstGeom>
+          <a:ln>
+            <a:solidFill>
+              <a:schemeClr val="accent6">
+                <a:lumMod val="75000"/>
+              </a:schemeClr>
+            </a:solidFill>
+            <a:prstDash val="dash"/>
+            <a:tailEnd type="triangle"/>
+          </a:ln>
+        </p:spPr>
+        <p:style>
+          <a:lnRef idx="1">
+            <a:schemeClr val="accent1"/>
+          </a:lnRef>
+          <a:fillRef idx="0">
+            <a:schemeClr val="accent1"/>
+          </a:fillRef>
+          <a:effectRef idx="0">
+            <a:schemeClr val="accent1"/>
+          </a:effectRef>
+          <a:fontRef idx="minor">
+            <a:schemeClr val="tx1"/>
+          </a:fontRef>
+        </p:style>
+      </p:cxnSp>
+      <p:cxnSp>
+        <p:nvCxnSpPr>
+          <p:cNvPr id="49" name="Connector: Elbow 48">
+            <a:extLst>
+              <a:ext uri="{FF2B5EF4-FFF2-40B4-BE49-F238E27FC236}">
+                <a16:creationId xmlns:a16="http://schemas.microsoft.com/office/drawing/2014/main" id="{42384B8F-E271-6AA5-BC4C-13E09FE86CDD}"/>
+              </a:ext>
+            </a:extLst>
+          </p:cNvPr>
+          <p:cNvCxnSpPr>
+            <a:cxnSpLocks/>
+            <a:endCxn id="47" idx="1"/>
+          </p:cNvCxnSpPr>
+          <p:nvPr/>
+        </p:nvCxnSpPr>
+        <p:spPr>
+          <a:xfrm rot="16200000" flipH="1">
+            <a:off x="9980376" y="2260075"/>
+            <a:ext cx="880116" cy="671092"/>
+          </a:xfrm>
+          <a:prstGeom prst="bentConnector2">
+            <a:avLst/>
+          </a:prstGeom>
+          <a:ln w="12700">
+            <a:solidFill>
+              <a:schemeClr val="accent1">
+                <a:lumMod val="75000"/>
+              </a:schemeClr>
+            </a:solidFill>
+            <a:prstDash val="sysDash"/>
+            <a:tailEnd type="triangle"/>
+          </a:ln>
+        </p:spPr>
+        <p:style>
+          <a:lnRef idx="1">
+            <a:schemeClr val="accent1"/>
+          </a:lnRef>
+          <a:fillRef idx="0">
+            <a:schemeClr val="accent1"/>
+          </a:fillRef>
+          <a:effectRef idx="0">
+            <a:schemeClr val="accent1"/>
+          </a:effectRef>
+          <a:fontRef idx="minor">
+            <a:schemeClr val="tx1"/>
+          </a:fontRef>
+        </p:style>
+      </p:cxnSp>
+      <p:sp>
+        <p:nvSpPr>
+          <p:cNvPr id="50" name="TextBox 49">
+            <a:extLst>
+              <a:ext uri="{FF2B5EF4-FFF2-40B4-BE49-F238E27FC236}">
+                <a16:creationId xmlns:a16="http://schemas.microsoft.com/office/drawing/2014/main" id="{CFAFFBBA-160B-4E33-ADD1-02888F28F3E8}"/>
+              </a:ext>
+            </a:extLst>
+          </p:cNvPr>
+          <p:cNvSpPr txBox="1"/>
+          <p:nvPr/>
+        </p:nvSpPr>
+        <p:spPr>
+          <a:xfrm>
+            <a:off x="9165482" y="280274"/>
+            <a:ext cx="1925097" cy="276999"/>
+          </a:xfrm>
+          <a:prstGeom prst="rect">
+            <a:avLst/>
+          </a:prstGeom>
+          <a:noFill/>
+        </p:spPr>
+        <p:txBody>
+          <a:bodyPr wrap="square" rtlCol="0">
+            <a:spAutoFit/>
+          </a:bodyPr>
+          <a:lstStyle/>
+          <a:p>
+            <a:r>
+              <a:rPr lang="en-US" sz="1200" b="1" dirty="0">
+                <a:solidFill>
+                  <a:srgbClr val="C00000"/>
+                </a:solidFill>
+              </a:rPr>
+              <a:t>Spy Trojan workflow </a:t>
+            </a:r>
+            <a:endParaRPr lang="en-SG" sz="1200" b="1" dirty="0">
+              <a:solidFill>
+                <a:srgbClr val="C00000"/>
+              </a:solidFill>
+            </a:endParaRPr>
+          </a:p>
+        </p:txBody>
+      </p:sp>
+      <p:sp>
+        <p:nvSpPr>
+          <p:cNvPr id="51" name="TextBox 50">
+            <a:extLst>
+              <a:ext uri="{FF2B5EF4-FFF2-40B4-BE49-F238E27FC236}">
+                <a16:creationId xmlns:a16="http://schemas.microsoft.com/office/drawing/2014/main" id="{9E7ADEDD-1A64-4DA1-12C2-3856E0096D65}"/>
+              </a:ext>
+            </a:extLst>
+          </p:cNvPr>
+          <p:cNvSpPr txBox="1"/>
+          <p:nvPr/>
+        </p:nvSpPr>
+        <p:spPr>
+          <a:xfrm>
+            <a:off x="429805" y="205519"/>
+            <a:ext cx="1925097" cy="461665"/>
+          </a:xfrm>
+          <a:prstGeom prst="rect">
+            <a:avLst/>
+          </a:prstGeom>
+          <a:noFill/>
+        </p:spPr>
+        <p:txBody>
+          <a:bodyPr wrap="square" rtlCol="0">
+            <a:spAutoFit/>
+          </a:bodyPr>
+          <a:lstStyle/>
+          <a:p>
+            <a:r>
+              <a:rPr lang="en-US" sz="1200" b="1" dirty="0">
+                <a:solidFill>
+                  <a:schemeClr val="accent1">
+                    <a:lumMod val="75000"/>
+                  </a:schemeClr>
+                </a:solidFill>
+              </a:rPr>
+              <a:t>Red team user / program workflow </a:t>
+            </a:r>
+            <a:endParaRPr lang="en-SG" sz="1200" b="1" dirty="0">
+              <a:solidFill>
+                <a:schemeClr val="accent1">
+                  <a:lumMod val="75000"/>
+                </a:schemeClr>
+              </a:solidFill>
+            </a:endParaRPr>
+          </a:p>
+        </p:txBody>
+      </p:sp>
+      <p:cxnSp>
+        <p:nvCxnSpPr>
+          <p:cNvPr id="52" name="Straight Arrow Connector 51">
+            <a:extLst>
+              <a:ext uri="{FF2B5EF4-FFF2-40B4-BE49-F238E27FC236}">
+                <a16:creationId xmlns:a16="http://schemas.microsoft.com/office/drawing/2014/main" id="{090FE0FE-123E-15E2-18C2-2CA43A16980C}"/>
+              </a:ext>
+            </a:extLst>
+          </p:cNvPr>
+          <p:cNvCxnSpPr>
+            <a:cxnSpLocks/>
+          </p:cNvCxnSpPr>
+          <p:nvPr/>
+        </p:nvCxnSpPr>
+        <p:spPr>
+          <a:xfrm>
+            <a:off x="6785841" y="2946374"/>
+            <a:ext cx="0" cy="1256699"/>
+          </a:xfrm>
+          <a:prstGeom prst="straightConnector1">
+            <a:avLst/>
+          </a:prstGeom>
+          <a:ln w="28575">
+            <a:solidFill>
+              <a:srgbClr val="7030A0"/>
+            </a:solidFill>
+            <a:tailEnd type="triangle"/>
+          </a:ln>
+        </p:spPr>
+        <p:style>
+          <a:lnRef idx="1">
+            <a:schemeClr val="accent1"/>
+          </a:lnRef>
+          <a:fillRef idx="0">
+            <a:schemeClr val="accent1"/>
+          </a:fillRef>
+          <a:effectRef idx="0">
+            <a:schemeClr val="accent1"/>
+          </a:effectRef>
+          <a:fontRef idx="minor">
+            <a:schemeClr val="tx1"/>
+          </a:fontRef>
+        </p:style>
+      </p:cxnSp>
+      <p:cxnSp>
+        <p:nvCxnSpPr>
+          <p:cNvPr id="53" name="Straight Arrow Connector 52">
+            <a:extLst>
+              <a:ext uri="{FF2B5EF4-FFF2-40B4-BE49-F238E27FC236}">
+                <a16:creationId xmlns:a16="http://schemas.microsoft.com/office/drawing/2014/main" id="{03917197-D8F1-FF8B-DA1B-96AB2F0268E9}"/>
+              </a:ext>
+            </a:extLst>
+          </p:cNvPr>
+          <p:cNvCxnSpPr>
+            <a:cxnSpLocks/>
+          </p:cNvCxnSpPr>
+          <p:nvPr/>
+        </p:nvCxnSpPr>
+        <p:spPr>
+          <a:xfrm>
+            <a:off x="8062953" y="3035678"/>
+            <a:ext cx="0" cy="1145702"/>
+          </a:xfrm>
+          <a:prstGeom prst="straightConnector1">
+            <a:avLst/>
+          </a:prstGeom>
+          <a:ln w="28575">
+            <a:solidFill>
+              <a:srgbClr val="7030A0"/>
+            </a:solidFill>
+            <a:tailEnd type="triangle"/>
+          </a:ln>
+        </p:spPr>
+        <p:style>
+          <a:lnRef idx="1">
+            <a:schemeClr val="accent1"/>
+          </a:lnRef>
+          <a:fillRef idx="0">
+            <a:schemeClr val="accent1"/>
+          </a:fillRef>
+          <a:effectRef idx="0">
+            <a:schemeClr val="accent1"/>
+          </a:effectRef>
+          <a:fontRef idx="minor">
+            <a:schemeClr val="tx1"/>
+          </a:fontRef>
+        </p:style>
+      </p:cxnSp>
+      <p:sp>
+        <p:nvSpPr>
+          <p:cNvPr id="54" name="Rectangle 53">
+            <a:extLst>
+              <a:ext uri="{FF2B5EF4-FFF2-40B4-BE49-F238E27FC236}">
+                <a16:creationId xmlns:a16="http://schemas.microsoft.com/office/drawing/2014/main" id="{413BA923-A533-B481-853A-E34B7F7EF833}"/>
+              </a:ext>
+            </a:extLst>
+          </p:cNvPr>
+          <p:cNvSpPr/>
+          <p:nvPr/>
+        </p:nvSpPr>
+        <p:spPr>
+          <a:xfrm>
+            <a:off x="2967272" y="2096166"/>
+            <a:ext cx="1107248" cy="294686"/>
+          </a:xfrm>
+          <a:prstGeom prst="rect">
+            <a:avLst/>
+          </a:prstGeom>
+          <a:solidFill>
+            <a:schemeClr val="accent6">
+              <a:lumMod val="75000"/>
+            </a:schemeClr>
+          </a:solidFill>
+        </p:spPr>
+        <p:style>
+          <a:lnRef idx="2">
+            <a:schemeClr val="accent1">
+              <a:shade val="50000"/>
+            </a:schemeClr>
+          </a:lnRef>
+          <a:fillRef idx="1">
+            <a:schemeClr val="accent1"/>
+          </a:fillRef>
+          <a:effectRef idx="0">
+            <a:schemeClr val="accent1"/>
+          </a:effectRef>
+          <a:fontRef idx="minor">
+            <a:schemeClr val="lt1"/>
+          </a:fontRef>
+        </p:style>
+        <p:txBody>
+          <a:bodyPr rtlCol="0" anchor="ctr"/>
+          <a:lstStyle/>
+          <a:p>
+            <a:r>
+              <a:rPr lang="en-US" sz="1100" b="1" dirty="0" err="1"/>
+              <a:t>SocketIO</a:t>
+            </a:r>
+            <a:r>
+              <a:rPr lang="en-US" sz="1100" b="1" dirty="0"/>
+              <a:t> Server</a:t>
+            </a:r>
+            <a:endParaRPr lang="en-SG" sz="1100" b="1" dirty="0"/>
+          </a:p>
+        </p:txBody>
+      </p:sp>
+      <p:cxnSp>
+        <p:nvCxnSpPr>
+          <p:cNvPr id="55" name="Connector: Elbow 54">
+            <a:extLst>
+              <a:ext uri="{FF2B5EF4-FFF2-40B4-BE49-F238E27FC236}">
+                <a16:creationId xmlns:a16="http://schemas.microsoft.com/office/drawing/2014/main" id="{2D1D8027-ADF9-2740-17A2-57EA6666EA77}"/>
+              </a:ext>
+            </a:extLst>
+          </p:cNvPr>
+          <p:cNvCxnSpPr>
+            <a:cxnSpLocks/>
+            <a:endCxn id="54" idx="3"/>
+          </p:cNvCxnSpPr>
+          <p:nvPr/>
+        </p:nvCxnSpPr>
+        <p:spPr>
+          <a:xfrm rot="10800000">
+            <a:off x="4074521" y="2243509"/>
+            <a:ext cx="926121" cy="268624"/>
+          </a:xfrm>
+          <a:prstGeom prst="bentConnector3">
+            <a:avLst/>
+          </a:prstGeom>
+          <a:ln>
+            <a:tailEnd type="triangle"/>
+          </a:ln>
+        </p:spPr>
+        <p:style>
+          <a:lnRef idx="1">
+            <a:schemeClr val="dk1"/>
+          </a:lnRef>
+          <a:fillRef idx="0">
+            <a:schemeClr val="dk1"/>
+          </a:fillRef>
+          <a:effectRef idx="0">
+            <a:schemeClr val="dk1"/>
+          </a:effectRef>
+          <a:fontRef idx="minor">
+            <a:schemeClr val="tx1"/>
+          </a:fontRef>
+        </p:style>
+      </p:cxnSp>
+      <p:cxnSp>
+        <p:nvCxnSpPr>
+          <p:cNvPr id="56" name="Connector: Elbow 55">
+            <a:extLst>
+              <a:ext uri="{FF2B5EF4-FFF2-40B4-BE49-F238E27FC236}">
+                <a16:creationId xmlns:a16="http://schemas.microsoft.com/office/drawing/2014/main" id="{496957B3-6741-2245-1629-1ABD4A4CC39F}"/>
+              </a:ext>
+            </a:extLst>
+          </p:cNvPr>
+          <p:cNvCxnSpPr>
+            <a:cxnSpLocks/>
+            <a:stCxn id="54" idx="0"/>
+          </p:cNvCxnSpPr>
+          <p:nvPr/>
+        </p:nvCxnSpPr>
+        <p:spPr>
+          <a:xfrm rot="16200000" flipV="1">
+            <a:off x="2951111" y="1526380"/>
+            <a:ext cx="431740" cy="707831"/>
+          </a:xfrm>
+          <a:prstGeom prst="bentConnector2">
+            <a:avLst/>
+          </a:prstGeom>
+          <a:ln>
+            <a:headEnd type="triangle"/>
+            <a:tailEnd type="triangle"/>
+          </a:ln>
+        </p:spPr>
+        <p:style>
+          <a:lnRef idx="1">
+            <a:schemeClr val="accent1"/>
+          </a:lnRef>
+          <a:fillRef idx="0">
+            <a:schemeClr val="accent1"/>
+          </a:fillRef>
+          <a:effectRef idx="0">
+            <a:schemeClr val="accent1"/>
+          </a:effectRef>
+          <a:fontRef idx="minor">
+            <a:schemeClr val="tx1"/>
+          </a:fontRef>
+        </p:style>
+      </p:cxnSp>
     </p:spTree>
     <p:extLst>
       <p:ext uri="{BB962C8B-B14F-4D97-AF65-F5344CB8AC3E}">
         <p14:creationId xmlns:p14="http://schemas.microsoft.com/office/powerpoint/2010/main" val="1192740326"/>
+      </p:ext>
+    </p:extLst>
+  </p:cSld>
+  <p:clrMapOvr>
+    <a:masterClrMapping/>
+  </p:clrMapOvr>
+</p:sld>
+</file>
+
+<file path=ppt/slides/slide17.xml><?xml version="1.0" encoding="utf-8"?>
+<p:sld xmlns:a="http://schemas.openxmlformats.org/drawingml/2006/main" xmlns:r="http://schemas.openxmlformats.org/officeDocument/2006/relationships" xmlns:p="http://schemas.openxmlformats.org/presentationml/2006/main">
+  <p:cSld>
+    <p:spTree>
+      <p:nvGrpSpPr>
+        <p:cNvPr id="1" name=""/>
+        <p:cNvGrpSpPr/>
+        <p:nvPr/>
+      </p:nvGrpSpPr>
+      <p:grpSpPr>
+        <a:xfrm>
+          <a:off x="0" y="0"/>
+          <a:ext cx="0" cy="0"/>
+          <a:chOff x="0" y="0"/>
+          <a:chExt cx="0" cy="0"/>
+        </a:xfrm>
+      </p:grpSpPr>
+      <p:pic>
+        <p:nvPicPr>
+          <p:cNvPr id="5" name="Picture 4">
+            <a:extLst>
+              <a:ext uri="{FF2B5EF4-FFF2-40B4-BE49-F238E27FC236}">
+                <a16:creationId xmlns:a16="http://schemas.microsoft.com/office/drawing/2014/main" id="{E7ADE0A9-99C9-1218-9FF8-973DCB057B0F}"/>
+              </a:ext>
+            </a:extLst>
+          </p:cNvPr>
+          <p:cNvPicPr>
+            <a:picLocks noChangeAspect="1"/>
+          </p:cNvPicPr>
+          <p:nvPr/>
+        </p:nvPicPr>
+        <p:blipFill>
+          <a:blip r:embed="rId3"/>
+          <a:stretch>
+            <a:fillRect/>
+          </a:stretch>
+        </p:blipFill>
+        <p:spPr>
+          <a:xfrm>
+            <a:off x="789183" y="3429000"/>
+            <a:ext cx="6047729" cy="3262222"/>
+          </a:xfrm>
+          <a:prstGeom prst="rect">
+            <a:avLst/>
+          </a:prstGeom>
+          <a:ln w="9525">
+            <a:solidFill>
+              <a:schemeClr val="tx1"/>
+            </a:solidFill>
+          </a:ln>
+        </p:spPr>
+      </p:pic>
+      <p:pic>
+        <p:nvPicPr>
+          <p:cNvPr id="7" name="Picture 6">
+            <a:extLst>
+              <a:ext uri="{FF2B5EF4-FFF2-40B4-BE49-F238E27FC236}">
+                <a16:creationId xmlns:a16="http://schemas.microsoft.com/office/drawing/2014/main" id="{D9270BAF-7B72-D90F-4A94-F58F0B6D22A1}"/>
+              </a:ext>
+            </a:extLst>
+          </p:cNvPr>
+          <p:cNvPicPr>
+            <a:picLocks noChangeAspect="1"/>
+          </p:cNvPicPr>
+          <p:nvPr/>
+        </p:nvPicPr>
+        <p:blipFill>
+          <a:blip r:embed="rId4"/>
+          <a:stretch>
+            <a:fillRect/>
+          </a:stretch>
+        </p:blipFill>
+        <p:spPr>
+          <a:xfrm>
+            <a:off x="3813048" y="336635"/>
+            <a:ext cx="7384896" cy="2897285"/>
+          </a:xfrm>
+          <a:prstGeom prst="rect">
+            <a:avLst/>
+          </a:prstGeom>
+          <a:ln w="3175">
+            <a:solidFill>
+              <a:schemeClr val="tx1"/>
+            </a:solidFill>
+          </a:ln>
+        </p:spPr>
+      </p:pic>
+      <p:sp>
+        <p:nvSpPr>
+          <p:cNvPr id="10" name="Cloud 9">
+            <a:extLst>
+              <a:ext uri="{FF2B5EF4-FFF2-40B4-BE49-F238E27FC236}">
+                <a16:creationId xmlns:a16="http://schemas.microsoft.com/office/drawing/2014/main" id="{AAA17614-900F-2863-B6FB-24ACA10A405B}"/>
+              </a:ext>
+            </a:extLst>
+          </p:cNvPr>
+          <p:cNvSpPr/>
+          <p:nvPr/>
+        </p:nvSpPr>
+        <p:spPr>
+          <a:xfrm>
+            <a:off x="2188721" y="2520149"/>
+            <a:ext cx="1135843" cy="609577"/>
+          </a:xfrm>
+          <a:prstGeom prst="cloud">
+            <a:avLst/>
+          </a:prstGeom>
+          <a:solidFill>
+            <a:schemeClr val="accent1">
+              <a:lumMod val="60000"/>
+              <a:lumOff val="40000"/>
+            </a:schemeClr>
+          </a:solidFill>
+        </p:spPr>
+        <p:style>
+          <a:lnRef idx="2">
+            <a:schemeClr val="accent1">
+              <a:shade val="15000"/>
+            </a:schemeClr>
+          </a:lnRef>
+          <a:fillRef idx="1">
+            <a:schemeClr val="accent1"/>
+          </a:fillRef>
+          <a:effectRef idx="0">
+            <a:schemeClr val="accent1"/>
+          </a:effectRef>
+          <a:fontRef idx="minor">
+            <a:schemeClr val="lt1"/>
+          </a:fontRef>
+        </p:style>
+        <p:txBody>
+          <a:bodyPr rtlCol="0" anchor="ctr"/>
+          <a:lstStyle/>
+          <a:p>
+            <a:pPr algn="ctr"/>
+            <a:r>
+              <a:rPr lang="en-SG" sz="1200" b="1" dirty="0">
+                <a:solidFill>
+                  <a:schemeClr val="tx1"/>
+                </a:solidFill>
+              </a:rPr>
+              <a:t>Internet</a:t>
+            </a:r>
+            <a:r>
+              <a:rPr lang="en-SG" dirty="0">
+                <a:solidFill>
+                  <a:schemeClr val="tx1"/>
+                </a:solidFill>
+              </a:rPr>
+              <a:t> </a:t>
+            </a:r>
+          </a:p>
+        </p:txBody>
+      </p:sp>
+      <p:sp>
+        <p:nvSpPr>
+          <p:cNvPr id="11" name="Rectangle 10">
+            <a:extLst>
+              <a:ext uri="{FF2B5EF4-FFF2-40B4-BE49-F238E27FC236}">
+                <a16:creationId xmlns:a16="http://schemas.microsoft.com/office/drawing/2014/main" id="{C44A81F7-F2D1-76FC-AD2C-E2A3523D317A}"/>
+              </a:ext>
+            </a:extLst>
+          </p:cNvPr>
+          <p:cNvSpPr/>
+          <p:nvPr/>
+        </p:nvSpPr>
+        <p:spPr>
+          <a:xfrm>
+            <a:off x="1243584" y="5468112"/>
+            <a:ext cx="713232" cy="457200"/>
+          </a:xfrm>
+          <a:prstGeom prst="rect">
+            <a:avLst/>
+          </a:prstGeom>
+          <a:noFill/>
+        </p:spPr>
+        <p:style>
+          <a:lnRef idx="2">
+            <a:schemeClr val="dk1"/>
+          </a:lnRef>
+          <a:fillRef idx="1">
+            <a:schemeClr val="lt1"/>
+          </a:fillRef>
+          <a:effectRef idx="0">
+            <a:schemeClr val="dk1"/>
+          </a:effectRef>
+          <a:fontRef idx="minor">
+            <a:schemeClr val="dk1"/>
+          </a:fontRef>
+        </p:style>
+        <p:txBody>
+          <a:bodyPr rtlCol="0" anchor="ctr"/>
+          <a:lstStyle/>
+          <a:p>
+            <a:pPr algn="ctr"/>
+            <a:endParaRPr lang="en-SG" dirty="0"/>
+          </a:p>
+        </p:txBody>
+      </p:sp>
+      <p:cxnSp>
+        <p:nvCxnSpPr>
+          <p:cNvPr id="13" name="Connector: Elbow 12">
+            <a:extLst>
+              <a:ext uri="{FF2B5EF4-FFF2-40B4-BE49-F238E27FC236}">
+                <a16:creationId xmlns:a16="http://schemas.microsoft.com/office/drawing/2014/main" id="{50B9C6C7-2444-1CB1-C5FF-E428021FB29F}"/>
+              </a:ext>
+            </a:extLst>
+          </p:cNvPr>
+          <p:cNvCxnSpPr>
+            <a:stCxn id="11" idx="1"/>
+            <a:endCxn id="10" idx="2"/>
+          </p:cNvCxnSpPr>
+          <p:nvPr/>
+        </p:nvCxnSpPr>
+        <p:spPr>
+          <a:xfrm rot="10800000" flipH="1">
+            <a:off x="1243584" y="2824938"/>
+            <a:ext cx="948660" cy="2871774"/>
+          </a:xfrm>
+          <a:prstGeom prst="bentConnector3">
+            <a:avLst>
+              <a:gd name="adj1" fmla="val -79039"/>
+            </a:avLst>
+          </a:prstGeom>
+          <a:ln w="19050">
+            <a:tailEnd type="triangle"/>
+          </a:ln>
+        </p:spPr>
+        <p:style>
+          <a:lnRef idx="1">
+            <a:schemeClr val="accent1"/>
+          </a:lnRef>
+          <a:fillRef idx="0">
+            <a:schemeClr val="accent1"/>
+          </a:fillRef>
+          <a:effectRef idx="0">
+            <a:schemeClr val="accent1"/>
+          </a:effectRef>
+          <a:fontRef idx="minor">
+            <a:schemeClr val="tx1"/>
+          </a:fontRef>
+        </p:style>
+      </p:cxnSp>
+      <p:sp>
+        <p:nvSpPr>
+          <p:cNvPr id="15" name="Rectangle 14">
+            <a:extLst>
+              <a:ext uri="{FF2B5EF4-FFF2-40B4-BE49-F238E27FC236}">
+                <a16:creationId xmlns:a16="http://schemas.microsoft.com/office/drawing/2014/main" id="{48FB8FB4-8B4D-F228-BEBA-3730BB472C96}"/>
+              </a:ext>
+            </a:extLst>
+          </p:cNvPr>
+          <p:cNvSpPr/>
+          <p:nvPr/>
+        </p:nvSpPr>
+        <p:spPr>
+          <a:xfrm>
+            <a:off x="4045358" y="2770066"/>
+            <a:ext cx="1466088" cy="463854"/>
+          </a:xfrm>
+          <a:prstGeom prst="rect">
+            <a:avLst/>
+          </a:prstGeom>
+          <a:noFill/>
+        </p:spPr>
+        <p:style>
+          <a:lnRef idx="2">
+            <a:schemeClr val="dk1"/>
+          </a:lnRef>
+          <a:fillRef idx="1">
+            <a:schemeClr val="lt1"/>
+          </a:fillRef>
+          <a:effectRef idx="0">
+            <a:schemeClr val="dk1"/>
+          </a:effectRef>
+          <a:fontRef idx="minor">
+            <a:schemeClr val="dk1"/>
+          </a:fontRef>
+        </p:style>
+        <p:txBody>
+          <a:bodyPr rtlCol="0" anchor="ctr"/>
+          <a:lstStyle/>
+          <a:p>
+            <a:pPr algn="ctr"/>
+            <a:endParaRPr lang="en-SG" dirty="0"/>
+          </a:p>
+        </p:txBody>
+      </p:sp>
+      <p:cxnSp>
+        <p:nvCxnSpPr>
+          <p:cNvPr id="16" name="Connector: Elbow 15">
+            <a:extLst>
+              <a:ext uri="{FF2B5EF4-FFF2-40B4-BE49-F238E27FC236}">
+                <a16:creationId xmlns:a16="http://schemas.microsoft.com/office/drawing/2014/main" id="{6A0DF9AE-99F9-129E-AD9D-9D381509889A}"/>
+              </a:ext>
+            </a:extLst>
+          </p:cNvPr>
+          <p:cNvCxnSpPr>
+            <a:cxnSpLocks/>
+            <a:stCxn id="10" idx="0"/>
+          </p:cNvCxnSpPr>
+          <p:nvPr/>
+        </p:nvCxnSpPr>
+        <p:spPr>
+          <a:xfrm>
+            <a:off x="3323617" y="2824938"/>
+            <a:ext cx="721741" cy="212460"/>
+          </a:xfrm>
+          <a:prstGeom prst="bentConnector3">
+            <a:avLst>
+              <a:gd name="adj1" fmla="val 50000"/>
+            </a:avLst>
+          </a:prstGeom>
+          <a:ln w="19050">
+            <a:tailEnd type="triangle"/>
+          </a:ln>
+        </p:spPr>
+        <p:style>
+          <a:lnRef idx="1">
+            <a:schemeClr val="accent1"/>
+          </a:lnRef>
+          <a:fillRef idx="0">
+            <a:schemeClr val="accent1"/>
+          </a:fillRef>
+          <a:effectRef idx="0">
+            <a:schemeClr val="accent1"/>
+          </a:effectRef>
+          <a:fontRef idx="minor">
+            <a:schemeClr val="tx1"/>
+          </a:fontRef>
+        </p:style>
+      </p:cxnSp>
+      <p:pic>
+        <p:nvPicPr>
+          <p:cNvPr id="19" name="Picture 18">
+            <a:extLst>
+              <a:ext uri="{FF2B5EF4-FFF2-40B4-BE49-F238E27FC236}">
+                <a16:creationId xmlns:a16="http://schemas.microsoft.com/office/drawing/2014/main" id="{E3722959-8BF2-1440-AEE8-93883554F3BB}"/>
+              </a:ext>
+            </a:extLst>
+          </p:cNvPr>
+          <p:cNvPicPr>
+            <a:picLocks noChangeAspect="1"/>
+          </p:cNvPicPr>
+          <p:nvPr/>
+        </p:nvPicPr>
+        <p:blipFill>
+          <a:blip r:embed="rId5"/>
+          <a:stretch>
+            <a:fillRect/>
+          </a:stretch>
+        </p:blipFill>
+        <p:spPr>
+          <a:xfrm>
+            <a:off x="7291313" y="5978650"/>
+            <a:ext cx="489507" cy="542715"/>
+          </a:xfrm>
+          <a:prstGeom prst="rect">
+            <a:avLst/>
+          </a:prstGeom>
+          <a:ln w="9525">
+            <a:solidFill>
+              <a:schemeClr val="tx1"/>
+            </a:solidFill>
+          </a:ln>
+        </p:spPr>
+      </p:pic>
+      <p:sp>
+        <p:nvSpPr>
+          <p:cNvPr id="20" name="TextBox 19">
+            <a:extLst>
+              <a:ext uri="{FF2B5EF4-FFF2-40B4-BE49-F238E27FC236}">
+                <a16:creationId xmlns:a16="http://schemas.microsoft.com/office/drawing/2014/main" id="{6ADB3DBD-854D-2FBF-34C8-ACB67C225AB0}"/>
+              </a:ext>
+            </a:extLst>
+          </p:cNvPr>
+          <p:cNvSpPr txBox="1"/>
+          <p:nvPr/>
+        </p:nvSpPr>
+        <p:spPr>
+          <a:xfrm>
+            <a:off x="7203745" y="6552722"/>
+            <a:ext cx="1549730" cy="276999"/>
+          </a:xfrm>
+          <a:prstGeom prst="rect">
+            <a:avLst/>
+          </a:prstGeom>
+          <a:noFill/>
+        </p:spPr>
+        <p:txBody>
+          <a:bodyPr wrap="square" rtlCol="0">
+            <a:spAutoFit/>
+          </a:bodyPr>
+          <a:lstStyle/>
+          <a:p>
+            <a:r>
+              <a:rPr lang="en-US" sz="1200" b="1" dirty="0"/>
+              <a:t>Red team members </a:t>
+            </a:r>
+            <a:endParaRPr lang="en-SG" sz="1200" b="1" dirty="0"/>
+          </a:p>
+        </p:txBody>
+      </p:sp>
+      <p:pic>
+        <p:nvPicPr>
+          <p:cNvPr id="21" name="Picture 20" descr="A screenshot of a computer&#10;&#10;Description automatically generated">
+            <a:extLst>
+              <a:ext uri="{FF2B5EF4-FFF2-40B4-BE49-F238E27FC236}">
+                <a16:creationId xmlns:a16="http://schemas.microsoft.com/office/drawing/2014/main" id="{AF17D7D4-F183-0827-B4F0-1130CFE22922}"/>
+              </a:ext>
+            </a:extLst>
+          </p:cNvPr>
+          <p:cNvPicPr>
+            <a:picLocks noChangeAspect="1"/>
+          </p:cNvPicPr>
+          <p:nvPr/>
+        </p:nvPicPr>
+        <p:blipFill>
+          <a:blip r:embed="rId6">
+            <a:extLst>
+              <a:ext uri="{28A0092B-C50C-407E-A947-70E740481C1C}">
+                <a14:useLocalDpi xmlns:a14="http://schemas.microsoft.com/office/drawing/2010/main" val="0"/>
+              </a:ext>
+            </a:extLst>
+          </a:blip>
+          <a:stretch>
+            <a:fillRect/>
+          </a:stretch>
+        </p:blipFill>
+        <p:spPr>
+          <a:xfrm>
+            <a:off x="7232061" y="3624081"/>
+            <a:ext cx="3716355" cy="1997541"/>
+          </a:xfrm>
+          <a:prstGeom prst="rect">
+            <a:avLst/>
+          </a:prstGeom>
+          <a:ln w="12700">
+            <a:solidFill>
+              <a:schemeClr val="tx1"/>
+            </a:solidFill>
+          </a:ln>
+        </p:spPr>
+      </p:pic>
+      <p:pic>
+        <p:nvPicPr>
+          <p:cNvPr id="22" name="Picture 21">
+            <a:extLst>
+              <a:ext uri="{FF2B5EF4-FFF2-40B4-BE49-F238E27FC236}">
+                <a16:creationId xmlns:a16="http://schemas.microsoft.com/office/drawing/2014/main" id="{9AB6DD89-7C24-E914-6D9D-0B46309772AE}"/>
+              </a:ext>
+            </a:extLst>
+          </p:cNvPr>
+          <p:cNvPicPr>
+            <a:picLocks noChangeAspect="1"/>
+          </p:cNvPicPr>
+          <p:nvPr/>
+        </p:nvPicPr>
+        <p:blipFill>
+          <a:blip r:embed="rId5"/>
+          <a:stretch>
+            <a:fillRect/>
+          </a:stretch>
+        </p:blipFill>
+        <p:spPr>
+          <a:xfrm>
+            <a:off x="7990467" y="5969084"/>
+            <a:ext cx="489507" cy="542715"/>
+          </a:xfrm>
+          <a:prstGeom prst="rect">
+            <a:avLst/>
+          </a:prstGeom>
+          <a:ln w="9525">
+            <a:solidFill>
+              <a:schemeClr val="tx1"/>
+            </a:solidFill>
+          </a:ln>
+        </p:spPr>
+      </p:pic>
+      <p:pic>
+        <p:nvPicPr>
+          <p:cNvPr id="23" name="Picture 22">
+            <a:extLst>
+              <a:ext uri="{FF2B5EF4-FFF2-40B4-BE49-F238E27FC236}">
+                <a16:creationId xmlns:a16="http://schemas.microsoft.com/office/drawing/2014/main" id="{35D4A445-988D-DE2D-ADD3-9FF8DBF71D79}"/>
+              </a:ext>
+            </a:extLst>
+          </p:cNvPr>
+          <p:cNvPicPr>
+            <a:picLocks noChangeAspect="1"/>
+          </p:cNvPicPr>
+          <p:nvPr/>
+        </p:nvPicPr>
+        <p:blipFill>
+          <a:blip r:embed="rId5"/>
+          <a:stretch>
+            <a:fillRect/>
+          </a:stretch>
+        </p:blipFill>
+        <p:spPr>
+          <a:xfrm>
+            <a:off x="8689621" y="5969083"/>
+            <a:ext cx="489507" cy="542715"/>
+          </a:xfrm>
+          <a:prstGeom prst="rect">
+            <a:avLst/>
+          </a:prstGeom>
+          <a:ln w="9525">
+            <a:solidFill>
+              <a:schemeClr val="tx1"/>
+            </a:solidFill>
+          </a:ln>
+        </p:spPr>
+      </p:pic>
+      <p:cxnSp>
+        <p:nvCxnSpPr>
+          <p:cNvPr id="28" name="Straight Arrow Connector 27">
+            <a:extLst>
+              <a:ext uri="{FF2B5EF4-FFF2-40B4-BE49-F238E27FC236}">
+                <a16:creationId xmlns:a16="http://schemas.microsoft.com/office/drawing/2014/main" id="{EC45693F-BE02-E153-A12F-426495E92790}"/>
+              </a:ext>
+            </a:extLst>
+          </p:cNvPr>
+          <p:cNvCxnSpPr>
+            <a:stCxn id="19" idx="0"/>
+          </p:cNvCxnSpPr>
+          <p:nvPr/>
+        </p:nvCxnSpPr>
+        <p:spPr>
+          <a:xfrm flipH="1" flipV="1">
+            <a:off x="7536066" y="5621622"/>
+            <a:ext cx="1" cy="357028"/>
+          </a:xfrm>
+          <a:prstGeom prst="straightConnector1">
+            <a:avLst/>
+          </a:prstGeom>
+          <a:ln w="28575">
+            <a:tailEnd type="triangle"/>
+          </a:ln>
+        </p:spPr>
+        <p:style>
+          <a:lnRef idx="1">
+            <a:schemeClr val="accent1"/>
+          </a:lnRef>
+          <a:fillRef idx="0">
+            <a:schemeClr val="accent1"/>
+          </a:fillRef>
+          <a:effectRef idx="0">
+            <a:schemeClr val="accent1"/>
+          </a:effectRef>
+          <a:fontRef idx="minor">
+            <a:schemeClr val="tx1"/>
+          </a:fontRef>
+        </p:style>
+      </p:cxnSp>
+      <p:cxnSp>
+        <p:nvCxnSpPr>
+          <p:cNvPr id="29" name="Straight Arrow Connector 28">
+            <a:extLst>
+              <a:ext uri="{FF2B5EF4-FFF2-40B4-BE49-F238E27FC236}">
+                <a16:creationId xmlns:a16="http://schemas.microsoft.com/office/drawing/2014/main" id="{26650F2A-B653-570B-692E-CA28C10395B0}"/>
+              </a:ext>
+            </a:extLst>
+          </p:cNvPr>
+          <p:cNvCxnSpPr/>
+          <p:nvPr/>
+        </p:nvCxnSpPr>
+        <p:spPr>
+          <a:xfrm flipH="1" flipV="1">
+            <a:off x="8235220" y="5612055"/>
+            <a:ext cx="1" cy="357028"/>
+          </a:xfrm>
+          <a:prstGeom prst="straightConnector1">
+            <a:avLst/>
+          </a:prstGeom>
+          <a:ln w="28575">
+            <a:tailEnd type="triangle"/>
+          </a:ln>
+        </p:spPr>
+        <p:style>
+          <a:lnRef idx="1">
+            <a:schemeClr val="accent1"/>
+          </a:lnRef>
+          <a:fillRef idx="0">
+            <a:schemeClr val="accent1"/>
+          </a:fillRef>
+          <a:effectRef idx="0">
+            <a:schemeClr val="accent1"/>
+          </a:effectRef>
+          <a:fontRef idx="minor">
+            <a:schemeClr val="tx1"/>
+          </a:fontRef>
+        </p:style>
+      </p:cxnSp>
+      <p:cxnSp>
+        <p:nvCxnSpPr>
+          <p:cNvPr id="30" name="Straight Arrow Connector 29">
+            <a:extLst>
+              <a:ext uri="{FF2B5EF4-FFF2-40B4-BE49-F238E27FC236}">
+                <a16:creationId xmlns:a16="http://schemas.microsoft.com/office/drawing/2014/main" id="{1FA2E80C-6BC3-B8A4-8FB8-755EDC7D27D3}"/>
+              </a:ext>
+            </a:extLst>
+          </p:cNvPr>
+          <p:cNvCxnSpPr/>
+          <p:nvPr/>
+        </p:nvCxnSpPr>
+        <p:spPr>
+          <a:xfrm flipH="1" flipV="1">
+            <a:off x="8934374" y="5606223"/>
+            <a:ext cx="1" cy="357028"/>
+          </a:xfrm>
+          <a:prstGeom prst="straightConnector1">
+            <a:avLst/>
+          </a:prstGeom>
+          <a:ln w="28575">
+            <a:tailEnd type="triangle"/>
+          </a:ln>
+        </p:spPr>
+        <p:style>
+          <a:lnRef idx="1">
+            <a:schemeClr val="accent1"/>
+          </a:lnRef>
+          <a:fillRef idx="0">
+            <a:schemeClr val="accent1"/>
+          </a:fillRef>
+          <a:effectRef idx="0">
+            <a:schemeClr val="accent1"/>
+          </a:effectRef>
+          <a:fontRef idx="minor">
+            <a:schemeClr val="tx1"/>
+          </a:fontRef>
+        </p:style>
+      </p:cxnSp>
+      <p:cxnSp>
+        <p:nvCxnSpPr>
+          <p:cNvPr id="31" name="Straight Arrow Connector 30">
+            <a:extLst>
+              <a:ext uri="{FF2B5EF4-FFF2-40B4-BE49-F238E27FC236}">
+                <a16:creationId xmlns:a16="http://schemas.microsoft.com/office/drawing/2014/main" id="{0E0F71ED-3FBD-63F5-DFF9-F6B2CFEA4D69}"/>
+              </a:ext>
+            </a:extLst>
+          </p:cNvPr>
+          <p:cNvCxnSpPr>
+            <a:cxnSpLocks/>
+            <a:stCxn id="21" idx="1"/>
+          </p:cNvCxnSpPr>
+          <p:nvPr/>
+        </p:nvCxnSpPr>
+        <p:spPr>
+          <a:xfrm flipH="1">
+            <a:off x="6677025" y="4622852"/>
+            <a:ext cx="555036" cy="0"/>
+          </a:xfrm>
+          <a:prstGeom prst="straightConnector1">
+            <a:avLst/>
+          </a:prstGeom>
+          <a:ln w="28575">
+            <a:tailEnd type="triangle"/>
+          </a:ln>
+        </p:spPr>
+        <p:style>
+          <a:lnRef idx="1">
+            <a:schemeClr val="accent1"/>
+          </a:lnRef>
+          <a:fillRef idx="0">
+            <a:schemeClr val="accent1"/>
+          </a:fillRef>
+          <a:effectRef idx="0">
+            <a:schemeClr val="accent1"/>
+          </a:effectRef>
+          <a:fontRef idx="minor">
+            <a:schemeClr val="tx1"/>
+          </a:fontRef>
+        </p:style>
+      </p:cxnSp>
+      <p:cxnSp>
+        <p:nvCxnSpPr>
+          <p:cNvPr id="34" name="Straight Arrow Connector 33">
+            <a:extLst>
+              <a:ext uri="{FF2B5EF4-FFF2-40B4-BE49-F238E27FC236}">
+                <a16:creationId xmlns:a16="http://schemas.microsoft.com/office/drawing/2014/main" id="{01E4A44E-0312-9048-42A4-5FEF96AF2EEB}"/>
+              </a:ext>
+            </a:extLst>
+          </p:cNvPr>
+          <p:cNvCxnSpPr>
+            <a:cxnSpLocks/>
+          </p:cNvCxnSpPr>
+          <p:nvPr/>
+        </p:nvCxnSpPr>
+        <p:spPr>
+          <a:xfrm flipH="1">
+            <a:off x="3684487" y="1154355"/>
+            <a:ext cx="316293" cy="0"/>
+          </a:xfrm>
+          <a:prstGeom prst="straightConnector1">
+            <a:avLst/>
+          </a:prstGeom>
+          <a:ln w="28575">
+            <a:tailEnd type="triangle"/>
+          </a:ln>
+        </p:spPr>
+        <p:style>
+          <a:lnRef idx="1">
+            <a:schemeClr val="accent1"/>
+          </a:lnRef>
+          <a:fillRef idx="0">
+            <a:schemeClr val="accent1"/>
+          </a:fillRef>
+          <a:effectRef idx="0">
+            <a:schemeClr val="accent1"/>
+          </a:effectRef>
+          <a:fontRef idx="minor">
+            <a:schemeClr val="tx1"/>
+          </a:fontRef>
+        </p:style>
+      </p:cxnSp>
+      <p:pic>
+        <p:nvPicPr>
+          <p:cNvPr id="36" name="Picture 35">
+            <a:extLst>
+              <a:ext uri="{FF2B5EF4-FFF2-40B4-BE49-F238E27FC236}">
+                <a16:creationId xmlns:a16="http://schemas.microsoft.com/office/drawing/2014/main" id="{688637D3-B159-3139-460D-8CD177E7A529}"/>
+              </a:ext>
+            </a:extLst>
+          </p:cNvPr>
+          <p:cNvPicPr>
+            <a:picLocks noChangeAspect="1"/>
+          </p:cNvPicPr>
+          <p:nvPr/>
+        </p:nvPicPr>
+        <p:blipFill>
+          <a:blip r:embed="rId7"/>
+          <a:stretch>
+            <a:fillRect/>
+          </a:stretch>
+        </p:blipFill>
+        <p:spPr>
+          <a:xfrm>
+            <a:off x="10795013" y="2753652"/>
+            <a:ext cx="891414" cy="503386"/>
+          </a:xfrm>
+          <a:prstGeom prst="rect">
+            <a:avLst/>
+          </a:prstGeom>
+        </p:spPr>
+      </p:pic>
+      <p:pic>
+        <p:nvPicPr>
+          <p:cNvPr id="37" name="Picture 36" descr="A red horse on wheels&#10;&#10;Description automatically generated">
+            <a:extLst>
+              <a:ext uri="{FF2B5EF4-FFF2-40B4-BE49-F238E27FC236}">
+                <a16:creationId xmlns:a16="http://schemas.microsoft.com/office/drawing/2014/main" id="{E79D020C-9CFF-62F1-1A42-6C57896E455B}"/>
+              </a:ext>
+            </a:extLst>
+          </p:cNvPr>
+          <p:cNvPicPr>
+            <a:picLocks noChangeAspect="1"/>
+          </p:cNvPicPr>
+          <p:nvPr/>
+        </p:nvPicPr>
+        <p:blipFill>
+          <a:blip r:embed="rId8">
+            <a:extLst>
+              <a:ext uri="{28A0092B-C50C-407E-A947-70E740481C1C}">
+                <a14:useLocalDpi xmlns:a14="http://schemas.microsoft.com/office/drawing/2010/main" val="0"/>
+              </a:ext>
+            </a:extLst>
+          </a:blip>
+          <a:stretch>
+            <a:fillRect/>
+          </a:stretch>
+        </p:blipFill>
+        <p:spPr>
+          <a:xfrm flipH="1">
+            <a:off x="10730320" y="2954060"/>
+            <a:ext cx="395317" cy="395317"/>
+          </a:xfrm>
+          <a:prstGeom prst="rect">
+            <a:avLst/>
+          </a:prstGeom>
+          <a:ln w="19050">
+            <a:solidFill>
+              <a:srgbClr val="FF0000"/>
+            </a:solidFill>
+          </a:ln>
+        </p:spPr>
+      </p:pic>
+      <p:sp>
+        <p:nvSpPr>
+          <p:cNvPr id="38" name="TextBox 37">
+            <a:extLst>
+              <a:ext uri="{FF2B5EF4-FFF2-40B4-BE49-F238E27FC236}">
+                <a16:creationId xmlns:a16="http://schemas.microsoft.com/office/drawing/2014/main" id="{823F5522-502E-0F9C-28C6-E9D869C9D12C}"/>
+              </a:ext>
+            </a:extLst>
+          </p:cNvPr>
+          <p:cNvSpPr txBox="1"/>
+          <p:nvPr/>
+        </p:nvSpPr>
+        <p:spPr>
+          <a:xfrm>
+            <a:off x="10685054" y="2461441"/>
+            <a:ext cx="1001373" cy="261610"/>
+          </a:xfrm>
+          <a:prstGeom prst="rect">
+            <a:avLst/>
+          </a:prstGeom>
+          <a:noFill/>
+        </p:spPr>
+        <p:txBody>
+          <a:bodyPr wrap="square" rtlCol="0">
+            <a:spAutoFit/>
+          </a:bodyPr>
+          <a:lstStyle/>
+          <a:p>
+            <a:r>
+              <a:rPr lang="en-US" sz="1100" b="1" dirty="0">
+                <a:solidFill>
+                  <a:srgbClr val="FF0000"/>
+                </a:solidFill>
+              </a:rPr>
+              <a:t>Victim nodes</a:t>
+            </a:r>
+            <a:endParaRPr lang="en-SG" sz="1100" b="1" dirty="0">
+              <a:solidFill>
+                <a:srgbClr val="FF0000"/>
+              </a:solidFill>
+            </a:endParaRPr>
+          </a:p>
+        </p:txBody>
+      </p:sp>
+      <p:cxnSp>
+        <p:nvCxnSpPr>
+          <p:cNvPr id="39" name="Connector: Elbow 38">
+            <a:extLst>
+              <a:ext uri="{FF2B5EF4-FFF2-40B4-BE49-F238E27FC236}">
+                <a16:creationId xmlns:a16="http://schemas.microsoft.com/office/drawing/2014/main" id="{E2156F00-2606-1FD3-29DC-D9A77EF00DD9}"/>
+              </a:ext>
+            </a:extLst>
+          </p:cNvPr>
+          <p:cNvCxnSpPr>
+            <a:cxnSpLocks/>
+            <a:endCxn id="36" idx="3"/>
+          </p:cNvCxnSpPr>
+          <p:nvPr/>
+        </p:nvCxnSpPr>
+        <p:spPr>
+          <a:xfrm rot="16200000" flipH="1">
+            <a:off x="10999487" y="2318405"/>
+            <a:ext cx="813090" cy="560790"/>
+          </a:xfrm>
+          <a:prstGeom prst="bentConnector4">
+            <a:avLst>
+              <a:gd name="adj1" fmla="val -1793"/>
+              <a:gd name="adj2" fmla="val 140764"/>
+            </a:avLst>
+          </a:prstGeom>
+          <a:ln w="19050">
+            <a:tailEnd type="triangle"/>
+          </a:ln>
+        </p:spPr>
+        <p:style>
+          <a:lnRef idx="1">
+            <a:schemeClr val="accent1"/>
+          </a:lnRef>
+          <a:fillRef idx="0">
+            <a:schemeClr val="accent1"/>
+          </a:fillRef>
+          <a:effectRef idx="0">
+            <a:schemeClr val="accent1"/>
+          </a:effectRef>
+          <a:fontRef idx="minor">
+            <a:schemeClr val="tx1"/>
+          </a:fontRef>
+        </p:style>
+      </p:cxnSp>
+      <p:pic>
+        <p:nvPicPr>
+          <p:cNvPr id="45" name="Picture 44" descr="A screenshot of a computer&#10;&#10;Description automatically generated">
+            <a:extLst>
+              <a:ext uri="{FF2B5EF4-FFF2-40B4-BE49-F238E27FC236}">
+                <a16:creationId xmlns:a16="http://schemas.microsoft.com/office/drawing/2014/main" id="{506511D2-21B8-AF25-D704-0CCF40B58D8C}"/>
+              </a:ext>
+            </a:extLst>
+          </p:cNvPr>
+          <p:cNvPicPr>
+            <a:picLocks noChangeAspect="1"/>
+          </p:cNvPicPr>
+          <p:nvPr/>
+        </p:nvPicPr>
+        <p:blipFill>
+          <a:blip r:embed="rId9">
+            <a:extLst>
+              <a:ext uri="{28A0092B-C50C-407E-A947-70E740481C1C}">
+                <a14:useLocalDpi xmlns:a14="http://schemas.microsoft.com/office/drawing/2010/main" val="0"/>
+              </a:ext>
+            </a:extLst>
+          </a:blip>
+          <a:stretch>
+            <a:fillRect/>
+          </a:stretch>
+        </p:blipFill>
+        <p:spPr>
+          <a:xfrm>
+            <a:off x="118567" y="859483"/>
+            <a:ext cx="3747033" cy="1442608"/>
+          </a:xfrm>
+          <a:prstGeom prst="rect">
+            <a:avLst/>
+          </a:prstGeom>
+        </p:spPr>
+      </p:pic>
+      <p:sp>
+        <p:nvSpPr>
+          <p:cNvPr id="47" name="TextBox 46">
+            <a:extLst>
+              <a:ext uri="{FF2B5EF4-FFF2-40B4-BE49-F238E27FC236}">
+                <a16:creationId xmlns:a16="http://schemas.microsoft.com/office/drawing/2014/main" id="{D825C267-C832-C2E8-0C55-C67D51FA7794}"/>
+              </a:ext>
+            </a:extLst>
+          </p:cNvPr>
+          <p:cNvSpPr txBox="1"/>
+          <p:nvPr/>
+        </p:nvSpPr>
+        <p:spPr>
+          <a:xfrm>
+            <a:off x="291152" y="292329"/>
+            <a:ext cx="2261548" cy="338554"/>
+          </a:xfrm>
+          <a:prstGeom prst="rect">
+            <a:avLst/>
+          </a:prstGeom>
+          <a:noFill/>
+        </p:spPr>
+        <p:txBody>
+          <a:bodyPr wrap="square" rtlCol="0">
+            <a:spAutoFit/>
+          </a:bodyPr>
+          <a:lstStyle/>
+          <a:p>
+            <a:r>
+              <a:rPr lang="en-US" sz="1600" b="1" dirty="0"/>
+              <a:t>RTC2 Emulation system</a:t>
+            </a:r>
+            <a:endParaRPr lang="en-SG" sz="1600" b="1" dirty="0"/>
+          </a:p>
+        </p:txBody>
+      </p:sp>
+      <p:sp>
+        <p:nvSpPr>
+          <p:cNvPr id="48" name="TextBox 47">
+            <a:extLst>
+              <a:ext uri="{FF2B5EF4-FFF2-40B4-BE49-F238E27FC236}">
+                <a16:creationId xmlns:a16="http://schemas.microsoft.com/office/drawing/2014/main" id="{445A0180-A370-436A-F051-444B65080500}"/>
+              </a:ext>
+            </a:extLst>
+          </p:cNvPr>
+          <p:cNvSpPr txBox="1"/>
+          <p:nvPr/>
+        </p:nvSpPr>
+        <p:spPr>
+          <a:xfrm>
+            <a:off x="7140423" y="3282667"/>
+            <a:ext cx="2937025" cy="338554"/>
+          </a:xfrm>
+          <a:prstGeom prst="rect">
+            <a:avLst/>
+          </a:prstGeom>
+          <a:noFill/>
+        </p:spPr>
+        <p:txBody>
+          <a:bodyPr wrap="square" rtlCol="0">
+            <a:spAutoFit/>
+          </a:bodyPr>
+          <a:lstStyle/>
+          <a:p>
+            <a:r>
+              <a:rPr lang="en-US" sz="1600" b="1" dirty="0"/>
+              <a:t>User Action emulation system </a:t>
+            </a:r>
+            <a:endParaRPr lang="en-SG" sz="1600" b="1" dirty="0"/>
+          </a:p>
+        </p:txBody>
+      </p:sp>
+    </p:spTree>
+    <p:extLst>
+      <p:ext uri="{BB962C8B-B14F-4D97-AF65-F5344CB8AC3E}">
+        <p14:creationId xmlns:p14="http://schemas.microsoft.com/office/powerpoint/2010/main" val="31922960"/>
       </p:ext>
     </p:extLst>
   </p:cSld>

</xml_diff>

<commit_message>
update the ninja system document.
</commit_message>
<xml_diff>
--- a/doc/designDoc.pptx
+++ b/doc/designDoc.pptx
@@ -21,7 +21,7 @@
     <p:sldId id="298" r:id="rId12"/>
     <p:sldId id="299" r:id="rId13"/>
     <p:sldId id="300" r:id="rId14"/>
-    <p:sldId id="301" r:id="rId15"/>
+    <p:sldId id="307" r:id="rId15"/>
     <p:sldId id="302" r:id="rId16"/>
     <p:sldId id="305" r:id="rId17"/>
     <p:sldId id="306" r:id="rId18"/>
@@ -754,7 +754,7 @@
           <c:smooth val="0"/>
           <c:extLst>
             <c:ext xmlns:c16="http://schemas.microsoft.com/office/drawing/2014/chart" uri="{C3380CC4-5D6E-409C-BE32-E72D297353CC}">
-              <c16:uniqueId val="{00000000-956C-4998-966A-11D6E0E9BDB7}"/>
+              <c16:uniqueId val="{00000000-AC0A-444A-B440-67691A512AB4}"/>
             </c:ext>
           </c:extLst>
         </c:ser>
@@ -2096,7 +2096,7 @@
           <a:p>
             <a:fld id="{30462BEA-6C65-41CB-B521-7C9DB089D720}" type="datetimeFigureOut">
               <a:rPr lang="en-SG" smtClean="0"/>
-              <a:t>16/1/2024</a:t>
+              <a:t>28/1/2024</a:t>
             </a:fld>
             <a:endParaRPr lang="en-SG"/>
           </a:p>
@@ -2765,7 +2765,7 @@
           <a:p>
             <a:fld id="{435F7F91-36DA-4AC3-B0AA-56077EB606D8}" type="datetimeFigureOut">
               <a:rPr lang="en-SG" smtClean="0"/>
-              <a:t>16/1/2024</a:t>
+              <a:t>28/1/2024</a:t>
             </a:fld>
             <a:endParaRPr lang="en-SG"/>
           </a:p>
@@ -2965,7 +2965,7 @@
           <a:p>
             <a:fld id="{435F7F91-36DA-4AC3-B0AA-56077EB606D8}" type="datetimeFigureOut">
               <a:rPr lang="en-SG" smtClean="0"/>
-              <a:t>16/1/2024</a:t>
+              <a:t>28/1/2024</a:t>
             </a:fld>
             <a:endParaRPr lang="en-SG"/>
           </a:p>
@@ -3175,7 +3175,7 @@
           <a:p>
             <a:fld id="{435F7F91-36DA-4AC3-B0AA-56077EB606D8}" type="datetimeFigureOut">
               <a:rPr lang="en-SG" smtClean="0"/>
-              <a:t>16/1/2024</a:t>
+              <a:t>28/1/2024</a:t>
             </a:fld>
             <a:endParaRPr lang="en-SG"/>
           </a:p>
@@ -3375,7 +3375,7 @@
           <a:p>
             <a:fld id="{435F7F91-36DA-4AC3-B0AA-56077EB606D8}" type="datetimeFigureOut">
               <a:rPr lang="en-SG" smtClean="0"/>
-              <a:t>16/1/2024</a:t>
+              <a:t>28/1/2024</a:t>
             </a:fld>
             <a:endParaRPr lang="en-SG"/>
           </a:p>
@@ -3651,7 +3651,7 @@
           <a:p>
             <a:fld id="{435F7F91-36DA-4AC3-B0AA-56077EB606D8}" type="datetimeFigureOut">
               <a:rPr lang="en-SG" smtClean="0"/>
-              <a:t>16/1/2024</a:t>
+              <a:t>28/1/2024</a:t>
             </a:fld>
             <a:endParaRPr lang="en-SG"/>
           </a:p>
@@ -3919,7 +3919,7 @@
           <a:p>
             <a:fld id="{435F7F91-36DA-4AC3-B0AA-56077EB606D8}" type="datetimeFigureOut">
               <a:rPr lang="en-SG" smtClean="0"/>
-              <a:t>16/1/2024</a:t>
+              <a:t>28/1/2024</a:t>
             </a:fld>
             <a:endParaRPr lang="en-SG"/>
           </a:p>
@@ -4334,7 +4334,7 @@
           <a:p>
             <a:fld id="{435F7F91-36DA-4AC3-B0AA-56077EB606D8}" type="datetimeFigureOut">
               <a:rPr lang="en-SG" smtClean="0"/>
-              <a:t>16/1/2024</a:t>
+              <a:t>28/1/2024</a:t>
             </a:fld>
             <a:endParaRPr lang="en-SG"/>
           </a:p>
@@ -4476,7 +4476,7 @@
           <a:p>
             <a:fld id="{435F7F91-36DA-4AC3-B0AA-56077EB606D8}" type="datetimeFigureOut">
               <a:rPr lang="en-SG" smtClean="0"/>
-              <a:t>16/1/2024</a:t>
+              <a:t>28/1/2024</a:t>
             </a:fld>
             <a:endParaRPr lang="en-SG"/>
           </a:p>
@@ -4589,7 +4589,7 @@
           <a:p>
             <a:fld id="{435F7F91-36DA-4AC3-B0AA-56077EB606D8}" type="datetimeFigureOut">
               <a:rPr lang="en-SG" smtClean="0"/>
-              <a:t>16/1/2024</a:t>
+              <a:t>28/1/2024</a:t>
             </a:fld>
             <a:endParaRPr lang="en-SG"/>
           </a:p>
@@ -4902,7 +4902,7 @@
           <a:p>
             <a:fld id="{435F7F91-36DA-4AC3-B0AA-56077EB606D8}" type="datetimeFigureOut">
               <a:rPr lang="en-SG" smtClean="0"/>
-              <a:t>16/1/2024</a:t>
+              <a:t>28/1/2024</a:t>
             </a:fld>
             <a:endParaRPr lang="en-SG"/>
           </a:p>
@@ -5191,7 +5191,7 @@
           <a:p>
             <a:fld id="{435F7F91-36DA-4AC3-B0AA-56077EB606D8}" type="datetimeFigureOut">
               <a:rPr lang="en-SG" smtClean="0"/>
-              <a:t>16/1/2024</a:t>
+              <a:t>28/1/2024</a:t>
             </a:fld>
             <a:endParaRPr lang="en-SG"/>
           </a:p>
@@ -5434,7 +5434,7 @@
           <a:p>
             <a:fld id="{435F7F91-36DA-4AC3-B0AA-56077EB606D8}" type="datetimeFigureOut">
               <a:rPr lang="en-SG" smtClean="0"/>
-              <a:t>16/1/2024</a:t>
+              <a:t>28/1/2024</a:t>
             </a:fld>
             <a:endParaRPr lang="en-SG"/>
           </a:p>
@@ -14413,18 +14413,48 @@
             <p:ph idx="1"/>
             <p:extLst>
               <p:ext uri="{D42A27DB-BD31-4B8C-83A1-F6EECF244321}">
-                <p14:modId xmlns:p14="http://schemas.microsoft.com/office/powerpoint/2010/main" val="3924083288"/>
+                <p14:modId xmlns:p14="http://schemas.microsoft.com/office/powerpoint/2010/main" val="3928318002"/>
               </p:ext>
             </p:extLst>
           </p:nvPr>
         </p:nvGraphicFramePr>
         <p:xfrm>
-          <a:off x="350519" y="621665"/>
-          <a:ext cx="8360995" cy="3443708"/>
+          <a:off x="421639" y="447040"/>
+          <a:ext cx="7005321" cy="2484120"/>
         </p:xfrm>
         <a:graphic>
           <a:graphicData uri="http://schemas.openxmlformats.org/drawingml/2006/chart">
             <c:chart xmlns:c="http://schemas.openxmlformats.org/drawingml/2006/chart" xmlns:r="http://schemas.openxmlformats.org/officeDocument/2006/relationships" r:id="rId2"/>
+          </a:graphicData>
+        </a:graphic>
+      </p:graphicFrame>
+      <p:graphicFrame>
+        <p:nvGraphicFramePr>
+          <p:cNvPr id="4" name="Content Placeholder 5">
+            <a:extLst>
+              <a:ext uri="{FF2B5EF4-FFF2-40B4-BE49-F238E27FC236}">
+                <a16:creationId xmlns:a16="http://schemas.microsoft.com/office/drawing/2014/main" id="{C633DAB0-F06B-8096-6FF1-B817C1A140D0}"/>
+              </a:ext>
+            </a:extLst>
+          </p:cNvPr>
+          <p:cNvGraphicFramePr>
+            <a:graphicFrameLocks/>
+          </p:cNvGraphicFramePr>
+          <p:nvPr>
+            <p:extLst>
+              <p:ext uri="{D42A27DB-BD31-4B8C-83A1-F6EECF244321}">
+                <p14:modId xmlns:p14="http://schemas.microsoft.com/office/powerpoint/2010/main" val="2333621376"/>
+              </p:ext>
+            </p:extLst>
+          </p:nvPr>
+        </p:nvGraphicFramePr>
+        <p:xfrm>
+          <a:off x="421638" y="3525520"/>
+          <a:ext cx="7005321" cy="2747289"/>
+        </p:xfrm>
+        <a:graphic>
+          <a:graphicData uri="http://schemas.openxmlformats.org/drawingml/2006/chart">
+            <c:chart xmlns:c="http://schemas.openxmlformats.org/drawingml/2006/chart" xmlns:r="http://schemas.openxmlformats.org/officeDocument/2006/relationships" r:id="rId3"/>
           </a:graphicData>
         </a:graphic>
       </p:graphicFrame>
@@ -14458,40 +14488,1365 @@
           <a:chExt cx="0" cy="0"/>
         </a:xfrm>
       </p:grpSpPr>
-      <p:graphicFrame>
-        <p:nvGraphicFramePr>
-          <p:cNvPr id="4" name="Content Placeholder 5">
-            <a:extLst>
-              <a:ext uri="{FF2B5EF4-FFF2-40B4-BE49-F238E27FC236}">
-                <a16:creationId xmlns:a16="http://schemas.microsoft.com/office/drawing/2014/main" id="{C633DAB0-F06B-8096-6FF1-B817C1A140D0}"/>
-              </a:ext>
-            </a:extLst>
-          </p:cNvPr>
-          <p:cNvGraphicFramePr>
-            <a:graphicFrameLocks/>
-          </p:cNvGraphicFramePr>
-          <p:nvPr>
-            <p:extLst>
-              <p:ext uri="{D42A27DB-BD31-4B8C-83A1-F6EECF244321}">
-                <p14:modId xmlns:p14="http://schemas.microsoft.com/office/powerpoint/2010/main" val="1227492542"/>
-              </p:ext>
-            </p:extLst>
-          </p:nvPr>
-        </p:nvGraphicFramePr>
-        <p:xfrm>
-          <a:off x="407323" y="455410"/>
-          <a:ext cx="8119160" cy="3582199"/>
-        </p:xfrm>
-        <a:graphic>
-          <a:graphicData uri="http://schemas.openxmlformats.org/drawingml/2006/chart">
-            <c:chart xmlns:c="http://schemas.openxmlformats.org/drawingml/2006/chart" xmlns:r="http://schemas.openxmlformats.org/officeDocument/2006/relationships" r:id="rId2"/>
-          </a:graphicData>
-        </a:graphic>
-      </p:graphicFrame>
+      <p:sp>
+        <p:nvSpPr>
+          <p:cNvPr id="4" name="Rectangle 3">
+            <a:extLst>
+              <a:ext uri="{FF2B5EF4-FFF2-40B4-BE49-F238E27FC236}">
+                <a16:creationId xmlns:a16="http://schemas.microsoft.com/office/drawing/2014/main" id="{C66D4881-48DF-E2B5-4837-655F4368E55B}"/>
+              </a:ext>
+            </a:extLst>
+          </p:cNvPr>
+          <p:cNvSpPr/>
+          <p:nvPr/>
+        </p:nvSpPr>
+        <p:spPr>
+          <a:xfrm>
+            <a:off x="4087253" y="761546"/>
+            <a:ext cx="1124827" cy="335733"/>
+          </a:xfrm>
+          <a:prstGeom prst="rect">
+            <a:avLst/>
+          </a:prstGeom>
+          <a:solidFill>
+            <a:schemeClr val="accent6">
+              <a:lumMod val="75000"/>
+            </a:schemeClr>
+          </a:solidFill>
+        </p:spPr>
+        <p:style>
+          <a:lnRef idx="2">
+            <a:schemeClr val="accent1">
+              <a:shade val="50000"/>
+            </a:schemeClr>
+          </a:lnRef>
+          <a:fillRef idx="1">
+            <a:schemeClr val="accent1"/>
+          </a:fillRef>
+          <a:effectRef idx="0">
+            <a:schemeClr val="accent1"/>
+          </a:effectRef>
+          <a:fontRef idx="minor">
+            <a:schemeClr val="lt1"/>
+          </a:fontRef>
+        </p:style>
+        <p:txBody>
+          <a:bodyPr rtlCol="0" anchor="ctr"/>
+          <a:lstStyle/>
+          <a:p>
+            <a:r>
+              <a:rPr lang="en-SG" sz="1100" b="1" dirty="0"/>
+              <a:t>Ninja Malware</a:t>
+            </a:r>
+          </a:p>
+        </p:txBody>
+      </p:sp>
+      <p:cxnSp>
+        <p:nvCxnSpPr>
+          <p:cNvPr id="5" name="Straight Arrow Connector 4">
+            <a:extLst>
+              <a:ext uri="{FF2B5EF4-FFF2-40B4-BE49-F238E27FC236}">
+                <a16:creationId xmlns:a16="http://schemas.microsoft.com/office/drawing/2014/main" id="{9A6E4E27-A91C-0F36-C59F-8080B54A028D}"/>
+              </a:ext>
+            </a:extLst>
+          </p:cNvPr>
+          <p:cNvCxnSpPr>
+            <a:cxnSpLocks/>
+          </p:cNvCxnSpPr>
+          <p:nvPr/>
+        </p:nvCxnSpPr>
+        <p:spPr>
+          <a:xfrm flipH="1" flipV="1">
+            <a:off x="4649666" y="1097279"/>
+            <a:ext cx="775774" cy="600119"/>
+          </a:xfrm>
+          <a:prstGeom prst="straightConnector1">
+            <a:avLst/>
+          </a:prstGeom>
+          <a:ln w="19050">
+            <a:solidFill>
+              <a:schemeClr val="accent6">
+                <a:lumMod val="50000"/>
+              </a:schemeClr>
+            </a:solidFill>
+            <a:tailEnd type="triangle"/>
+          </a:ln>
+        </p:spPr>
+        <p:style>
+          <a:lnRef idx="1">
+            <a:schemeClr val="accent1"/>
+          </a:lnRef>
+          <a:fillRef idx="0">
+            <a:schemeClr val="accent1"/>
+          </a:fillRef>
+          <a:effectRef idx="0">
+            <a:schemeClr val="accent1"/>
+          </a:effectRef>
+          <a:fontRef idx="minor">
+            <a:schemeClr val="tx1"/>
+          </a:fontRef>
+        </p:style>
+      </p:cxnSp>
+      <p:sp>
+        <p:nvSpPr>
+          <p:cNvPr id="8" name="Rectangle 7">
+            <a:extLst>
+              <a:ext uri="{FF2B5EF4-FFF2-40B4-BE49-F238E27FC236}">
+                <a16:creationId xmlns:a16="http://schemas.microsoft.com/office/drawing/2014/main" id="{741CDDCE-2CF0-2BAD-9C06-2AC8791C0D19}"/>
+              </a:ext>
+            </a:extLst>
+          </p:cNvPr>
+          <p:cNvSpPr/>
+          <p:nvPr/>
+        </p:nvSpPr>
+        <p:spPr>
+          <a:xfrm>
+            <a:off x="4964626" y="1697398"/>
+            <a:ext cx="1243134" cy="335733"/>
+          </a:xfrm>
+          <a:prstGeom prst="rect">
+            <a:avLst/>
+          </a:prstGeom>
+          <a:solidFill>
+            <a:schemeClr val="accent6">
+              <a:lumMod val="75000"/>
+            </a:schemeClr>
+          </a:solidFill>
+        </p:spPr>
+        <p:style>
+          <a:lnRef idx="2">
+            <a:schemeClr val="accent1">
+              <a:shade val="50000"/>
+            </a:schemeClr>
+          </a:lnRef>
+          <a:fillRef idx="1">
+            <a:schemeClr val="accent1"/>
+          </a:fillRef>
+          <a:effectRef idx="0">
+            <a:schemeClr val="accent1"/>
+          </a:effectRef>
+          <a:fontRef idx="minor">
+            <a:schemeClr val="lt1"/>
+          </a:fontRef>
+        </p:style>
+        <p:txBody>
+          <a:bodyPr rtlCol="0" anchor="ctr"/>
+          <a:lstStyle/>
+          <a:p>
+            <a:r>
+              <a:rPr lang="en-SG" sz="1100" b="1" dirty="0"/>
+              <a:t>Trojan  Malware</a:t>
+            </a:r>
+          </a:p>
+        </p:txBody>
+      </p:sp>
+      <p:cxnSp>
+        <p:nvCxnSpPr>
+          <p:cNvPr id="9" name="Straight Arrow Connector 8">
+            <a:extLst>
+              <a:ext uri="{FF2B5EF4-FFF2-40B4-BE49-F238E27FC236}">
+                <a16:creationId xmlns:a16="http://schemas.microsoft.com/office/drawing/2014/main" id="{A31E532A-632C-79D1-03FA-F52205CFC634}"/>
+              </a:ext>
+            </a:extLst>
+          </p:cNvPr>
+          <p:cNvCxnSpPr>
+            <a:cxnSpLocks/>
+            <a:stCxn id="12" idx="0"/>
+            <a:endCxn id="4" idx="2"/>
+          </p:cNvCxnSpPr>
+          <p:nvPr/>
+        </p:nvCxnSpPr>
+        <p:spPr>
+          <a:xfrm flipV="1">
+            <a:off x="3441411" y="1097279"/>
+            <a:ext cx="1208256" cy="935852"/>
+          </a:xfrm>
+          <a:prstGeom prst="straightConnector1">
+            <a:avLst/>
+          </a:prstGeom>
+          <a:ln w="19050">
+            <a:solidFill>
+              <a:schemeClr val="accent6">
+                <a:lumMod val="50000"/>
+              </a:schemeClr>
+            </a:solidFill>
+            <a:tailEnd type="triangle"/>
+          </a:ln>
+        </p:spPr>
+        <p:style>
+          <a:lnRef idx="1">
+            <a:schemeClr val="accent1"/>
+          </a:lnRef>
+          <a:fillRef idx="0">
+            <a:schemeClr val="accent1"/>
+          </a:fillRef>
+          <a:effectRef idx="0">
+            <a:schemeClr val="accent1"/>
+          </a:effectRef>
+          <a:fontRef idx="minor">
+            <a:schemeClr val="tx1"/>
+          </a:fontRef>
+        </p:style>
+      </p:cxnSp>
+      <p:sp>
+        <p:nvSpPr>
+          <p:cNvPr id="12" name="Rectangle 11">
+            <a:extLst>
+              <a:ext uri="{FF2B5EF4-FFF2-40B4-BE49-F238E27FC236}">
+                <a16:creationId xmlns:a16="http://schemas.microsoft.com/office/drawing/2014/main" id="{BD7F0B4C-DD25-FA3E-7FB6-29D5C3223326}"/>
+              </a:ext>
+            </a:extLst>
+          </p:cNvPr>
+          <p:cNvSpPr/>
+          <p:nvPr/>
+        </p:nvSpPr>
+        <p:spPr>
+          <a:xfrm>
+            <a:off x="2795568" y="2033131"/>
+            <a:ext cx="1291685" cy="396241"/>
+          </a:xfrm>
+          <a:prstGeom prst="rect">
+            <a:avLst/>
+          </a:prstGeom>
+          <a:solidFill>
+            <a:schemeClr val="accent6">
+              <a:lumMod val="75000"/>
+            </a:schemeClr>
+          </a:solidFill>
+        </p:spPr>
+        <p:style>
+          <a:lnRef idx="2">
+            <a:schemeClr val="accent1">
+              <a:shade val="50000"/>
+            </a:schemeClr>
+          </a:lnRef>
+          <a:fillRef idx="1">
+            <a:schemeClr val="accent1"/>
+          </a:fillRef>
+          <a:effectRef idx="0">
+            <a:schemeClr val="accent1"/>
+          </a:effectRef>
+          <a:fontRef idx="minor">
+            <a:schemeClr val="lt1"/>
+          </a:fontRef>
+        </p:style>
+        <p:txBody>
+          <a:bodyPr rtlCol="0" anchor="ctr"/>
+          <a:lstStyle/>
+          <a:p>
+            <a:r>
+              <a:rPr lang="en-SG" sz="1100" b="1" dirty="0"/>
+              <a:t>Ettercap wrapper Malware</a:t>
+            </a:r>
+          </a:p>
+        </p:txBody>
+      </p:sp>
+      <p:cxnSp>
+        <p:nvCxnSpPr>
+          <p:cNvPr id="16" name="Straight Arrow Connector 15">
+            <a:extLst>
+              <a:ext uri="{FF2B5EF4-FFF2-40B4-BE49-F238E27FC236}">
+                <a16:creationId xmlns:a16="http://schemas.microsoft.com/office/drawing/2014/main" id="{D262BF0F-9B86-C5DA-316C-979189DBC5EA}"/>
+              </a:ext>
+            </a:extLst>
+          </p:cNvPr>
+          <p:cNvCxnSpPr>
+            <a:cxnSpLocks/>
+            <a:endCxn id="12" idx="2"/>
+          </p:cNvCxnSpPr>
+          <p:nvPr/>
+        </p:nvCxnSpPr>
+        <p:spPr>
+          <a:xfrm flipV="1">
+            <a:off x="3441410" y="2429372"/>
+            <a:ext cx="1" cy="384948"/>
+          </a:xfrm>
+          <a:prstGeom prst="straightConnector1">
+            <a:avLst/>
+          </a:prstGeom>
+          <a:ln w="19050">
+            <a:solidFill>
+              <a:schemeClr val="accent6">
+                <a:lumMod val="50000"/>
+              </a:schemeClr>
+            </a:solidFill>
+            <a:tailEnd type="triangle"/>
+          </a:ln>
+        </p:spPr>
+        <p:style>
+          <a:lnRef idx="1">
+            <a:schemeClr val="accent1"/>
+          </a:lnRef>
+          <a:fillRef idx="0">
+            <a:schemeClr val="accent1"/>
+          </a:fillRef>
+          <a:effectRef idx="0">
+            <a:schemeClr val="accent1"/>
+          </a:effectRef>
+          <a:fontRef idx="minor">
+            <a:schemeClr val="tx1"/>
+          </a:fontRef>
+        </p:style>
+      </p:cxnSp>
+      <p:sp>
+        <p:nvSpPr>
+          <p:cNvPr id="19" name="Rectangle 18">
+            <a:extLst>
+              <a:ext uri="{FF2B5EF4-FFF2-40B4-BE49-F238E27FC236}">
+                <a16:creationId xmlns:a16="http://schemas.microsoft.com/office/drawing/2014/main" id="{68689F0D-2CEC-A15D-C867-CAD600464D1E}"/>
+              </a:ext>
+            </a:extLst>
+          </p:cNvPr>
+          <p:cNvSpPr/>
+          <p:nvPr/>
+        </p:nvSpPr>
+        <p:spPr>
+          <a:xfrm>
+            <a:off x="2753854" y="2814320"/>
+            <a:ext cx="1291685" cy="396241"/>
+          </a:xfrm>
+          <a:prstGeom prst="rect">
+            <a:avLst/>
+          </a:prstGeom>
+          <a:solidFill>
+            <a:schemeClr val="accent6">
+              <a:lumMod val="75000"/>
+            </a:schemeClr>
+          </a:solidFill>
+        </p:spPr>
+        <p:style>
+          <a:lnRef idx="2">
+            <a:schemeClr val="accent1">
+              <a:shade val="50000"/>
+            </a:schemeClr>
+          </a:lnRef>
+          <a:fillRef idx="1">
+            <a:schemeClr val="accent1"/>
+          </a:fillRef>
+          <a:effectRef idx="0">
+            <a:schemeClr val="accent1"/>
+          </a:effectRef>
+          <a:fontRef idx="minor">
+            <a:schemeClr val="lt1"/>
+          </a:fontRef>
+        </p:style>
+        <p:txBody>
+          <a:bodyPr rtlCol="0" anchor="ctr"/>
+          <a:lstStyle/>
+          <a:p>
+            <a:r>
+              <a:rPr lang="en-SG" sz="1100" b="1" dirty="0"/>
+              <a:t>ARP spoofing attack Malware</a:t>
+            </a:r>
+          </a:p>
+        </p:txBody>
+      </p:sp>
+      <p:sp>
+        <p:nvSpPr>
+          <p:cNvPr id="20" name="Rectangle 19">
+            <a:extLst>
+              <a:ext uri="{FF2B5EF4-FFF2-40B4-BE49-F238E27FC236}">
+                <a16:creationId xmlns:a16="http://schemas.microsoft.com/office/drawing/2014/main" id="{629E675F-D658-8576-9381-3FFB790253D8}"/>
+              </a:ext>
+            </a:extLst>
+          </p:cNvPr>
+          <p:cNvSpPr/>
+          <p:nvPr/>
+        </p:nvSpPr>
+        <p:spPr>
+          <a:xfrm>
+            <a:off x="2753853" y="3647439"/>
+            <a:ext cx="1291685" cy="396241"/>
+          </a:xfrm>
+          <a:prstGeom prst="rect">
+            <a:avLst/>
+          </a:prstGeom>
+          <a:solidFill>
+            <a:schemeClr val="accent6">
+              <a:lumMod val="75000"/>
+            </a:schemeClr>
+          </a:solidFill>
+        </p:spPr>
+        <p:style>
+          <a:lnRef idx="2">
+            <a:schemeClr val="accent1">
+              <a:shade val="50000"/>
+            </a:schemeClr>
+          </a:lnRef>
+          <a:fillRef idx="1">
+            <a:schemeClr val="accent1"/>
+          </a:fillRef>
+          <a:effectRef idx="0">
+            <a:schemeClr val="accent1"/>
+          </a:effectRef>
+          <a:fontRef idx="minor">
+            <a:schemeClr val="lt1"/>
+          </a:fontRef>
+        </p:style>
+        <p:txBody>
+          <a:bodyPr rtlCol="0" anchor="ctr"/>
+          <a:lstStyle/>
+          <a:p>
+            <a:r>
+              <a:rPr lang="en-SG" sz="1100" b="1" dirty="0"/>
+              <a:t>Man in the middle attack Malware</a:t>
+            </a:r>
+          </a:p>
+        </p:txBody>
+      </p:sp>
+      <p:cxnSp>
+        <p:nvCxnSpPr>
+          <p:cNvPr id="21" name="Straight Arrow Connector 20">
+            <a:extLst>
+              <a:ext uri="{FF2B5EF4-FFF2-40B4-BE49-F238E27FC236}">
+                <a16:creationId xmlns:a16="http://schemas.microsoft.com/office/drawing/2014/main" id="{8F76725B-DC37-0AB0-CC70-562258EA5C08}"/>
+              </a:ext>
+            </a:extLst>
+          </p:cNvPr>
+          <p:cNvCxnSpPr>
+            <a:cxnSpLocks/>
+          </p:cNvCxnSpPr>
+          <p:nvPr/>
+        </p:nvCxnSpPr>
+        <p:spPr>
+          <a:xfrm flipV="1">
+            <a:off x="3441410" y="3236526"/>
+            <a:ext cx="1" cy="384948"/>
+          </a:xfrm>
+          <a:prstGeom prst="straightConnector1">
+            <a:avLst/>
+          </a:prstGeom>
+          <a:ln w="19050">
+            <a:solidFill>
+              <a:schemeClr val="accent6">
+                <a:lumMod val="50000"/>
+              </a:schemeClr>
+            </a:solidFill>
+            <a:tailEnd type="triangle"/>
+          </a:ln>
+        </p:spPr>
+        <p:style>
+          <a:lnRef idx="1">
+            <a:schemeClr val="accent1"/>
+          </a:lnRef>
+          <a:fillRef idx="0">
+            <a:schemeClr val="accent1"/>
+          </a:fillRef>
+          <a:effectRef idx="0">
+            <a:schemeClr val="accent1"/>
+          </a:effectRef>
+          <a:fontRef idx="minor">
+            <a:schemeClr val="tx1"/>
+          </a:fontRef>
+        </p:style>
+      </p:cxnSp>
+      <p:cxnSp>
+        <p:nvCxnSpPr>
+          <p:cNvPr id="23" name="Straight Arrow Connector 22">
+            <a:extLst>
+              <a:ext uri="{FF2B5EF4-FFF2-40B4-BE49-F238E27FC236}">
+                <a16:creationId xmlns:a16="http://schemas.microsoft.com/office/drawing/2014/main" id="{BAD031FA-A303-6683-5011-E56DB3674EBC}"/>
+              </a:ext>
+            </a:extLst>
+          </p:cNvPr>
+          <p:cNvCxnSpPr>
+            <a:cxnSpLocks/>
+            <a:stCxn id="26" idx="0"/>
+            <a:endCxn id="8" idx="2"/>
+          </p:cNvCxnSpPr>
+          <p:nvPr/>
+        </p:nvCxnSpPr>
+        <p:spPr>
+          <a:xfrm flipV="1">
+            <a:off x="5140960" y="2033131"/>
+            <a:ext cx="445233" cy="533853"/>
+          </a:xfrm>
+          <a:prstGeom prst="straightConnector1">
+            <a:avLst/>
+          </a:prstGeom>
+          <a:ln w="19050">
+            <a:solidFill>
+              <a:schemeClr val="accent6">
+                <a:lumMod val="50000"/>
+              </a:schemeClr>
+            </a:solidFill>
+            <a:tailEnd type="triangle"/>
+          </a:ln>
+        </p:spPr>
+        <p:style>
+          <a:lnRef idx="1">
+            <a:schemeClr val="accent1"/>
+          </a:lnRef>
+          <a:fillRef idx="0">
+            <a:schemeClr val="accent1"/>
+          </a:fillRef>
+          <a:effectRef idx="0">
+            <a:schemeClr val="accent1"/>
+          </a:effectRef>
+          <a:fontRef idx="minor">
+            <a:schemeClr val="tx1"/>
+          </a:fontRef>
+        </p:style>
+      </p:cxnSp>
+      <p:sp>
+        <p:nvSpPr>
+          <p:cNvPr id="26" name="Rectangle 25">
+            <a:extLst>
+              <a:ext uri="{FF2B5EF4-FFF2-40B4-BE49-F238E27FC236}">
+                <a16:creationId xmlns:a16="http://schemas.microsoft.com/office/drawing/2014/main" id="{207EB1E1-F92D-9015-ACF1-FF6A3108464B}"/>
+              </a:ext>
+            </a:extLst>
+          </p:cNvPr>
+          <p:cNvSpPr/>
+          <p:nvPr/>
+        </p:nvSpPr>
+        <p:spPr>
+          <a:xfrm>
+            <a:off x="4495117" y="2566984"/>
+            <a:ext cx="1291685" cy="396241"/>
+          </a:xfrm>
+          <a:prstGeom prst="rect">
+            <a:avLst/>
+          </a:prstGeom>
+          <a:solidFill>
+            <a:schemeClr val="accent6">
+              <a:lumMod val="75000"/>
+            </a:schemeClr>
+          </a:solidFill>
+        </p:spPr>
+        <p:style>
+          <a:lnRef idx="2">
+            <a:schemeClr val="accent1">
+              <a:shade val="50000"/>
+            </a:schemeClr>
+          </a:lnRef>
+          <a:fillRef idx="1">
+            <a:schemeClr val="accent1"/>
+          </a:fillRef>
+          <a:effectRef idx="0">
+            <a:schemeClr val="accent1"/>
+          </a:effectRef>
+          <a:fontRef idx="minor">
+            <a:schemeClr val="lt1"/>
+          </a:fontRef>
+        </p:style>
+        <p:txBody>
+          <a:bodyPr rtlCol="0" anchor="ctr"/>
+          <a:lstStyle/>
+          <a:p>
+            <a:r>
+              <a:rPr lang="en-SG" sz="1100" b="1" dirty="0"/>
+              <a:t>Backdoor trojan Malware</a:t>
+            </a:r>
+          </a:p>
+        </p:txBody>
+      </p:sp>
+      <p:cxnSp>
+        <p:nvCxnSpPr>
+          <p:cNvPr id="28" name="Straight Arrow Connector 27">
+            <a:extLst>
+              <a:ext uri="{FF2B5EF4-FFF2-40B4-BE49-F238E27FC236}">
+                <a16:creationId xmlns:a16="http://schemas.microsoft.com/office/drawing/2014/main" id="{B0DD7636-26E8-13DD-E0D6-ADD93F1E6096}"/>
+              </a:ext>
+            </a:extLst>
+          </p:cNvPr>
+          <p:cNvCxnSpPr>
+            <a:cxnSpLocks/>
+            <a:endCxn id="8" idx="2"/>
+          </p:cNvCxnSpPr>
+          <p:nvPr/>
+        </p:nvCxnSpPr>
+        <p:spPr>
+          <a:xfrm flipH="1" flipV="1">
+            <a:off x="5586193" y="2033131"/>
+            <a:ext cx="978295" cy="533852"/>
+          </a:xfrm>
+          <a:prstGeom prst="straightConnector1">
+            <a:avLst/>
+          </a:prstGeom>
+          <a:ln w="19050">
+            <a:solidFill>
+              <a:schemeClr val="accent6">
+                <a:lumMod val="50000"/>
+              </a:schemeClr>
+            </a:solidFill>
+            <a:tailEnd type="triangle"/>
+          </a:ln>
+        </p:spPr>
+        <p:style>
+          <a:lnRef idx="1">
+            <a:schemeClr val="accent1"/>
+          </a:lnRef>
+          <a:fillRef idx="0">
+            <a:schemeClr val="accent1"/>
+          </a:fillRef>
+          <a:effectRef idx="0">
+            <a:schemeClr val="accent1"/>
+          </a:effectRef>
+          <a:fontRef idx="minor">
+            <a:schemeClr val="tx1"/>
+          </a:fontRef>
+        </p:style>
+      </p:cxnSp>
+      <p:sp>
+        <p:nvSpPr>
+          <p:cNvPr id="31" name="Rectangle 30">
+            <a:extLst>
+              <a:ext uri="{FF2B5EF4-FFF2-40B4-BE49-F238E27FC236}">
+                <a16:creationId xmlns:a16="http://schemas.microsoft.com/office/drawing/2014/main" id="{8D374611-9BA4-E6EC-5923-9703EE881DB0}"/>
+              </a:ext>
+            </a:extLst>
+          </p:cNvPr>
+          <p:cNvSpPr/>
+          <p:nvPr/>
+        </p:nvSpPr>
+        <p:spPr>
+          <a:xfrm>
+            <a:off x="6194665" y="2566983"/>
+            <a:ext cx="978295" cy="396241"/>
+          </a:xfrm>
+          <a:prstGeom prst="rect">
+            <a:avLst/>
+          </a:prstGeom>
+          <a:solidFill>
+            <a:schemeClr val="accent6">
+              <a:lumMod val="75000"/>
+            </a:schemeClr>
+          </a:solidFill>
+        </p:spPr>
+        <p:style>
+          <a:lnRef idx="2">
+            <a:schemeClr val="accent1">
+              <a:shade val="50000"/>
+            </a:schemeClr>
+          </a:lnRef>
+          <a:fillRef idx="1">
+            <a:schemeClr val="accent1"/>
+          </a:fillRef>
+          <a:effectRef idx="0">
+            <a:schemeClr val="accent1"/>
+          </a:effectRef>
+          <a:fontRef idx="minor">
+            <a:schemeClr val="lt1"/>
+          </a:fontRef>
+        </p:style>
+        <p:txBody>
+          <a:bodyPr rtlCol="0" anchor="ctr"/>
+          <a:lstStyle/>
+          <a:p>
+            <a:r>
+              <a:rPr lang="en-SG" sz="1100" b="1" dirty="0"/>
+              <a:t>Spy trojan Malware</a:t>
+            </a:r>
+          </a:p>
+        </p:txBody>
+      </p:sp>
+      <p:cxnSp>
+        <p:nvCxnSpPr>
+          <p:cNvPr id="33" name="Straight Arrow Connector 32">
+            <a:extLst>
+              <a:ext uri="{FF2B5EF4-FFF2-40B4-BE49-F238E27FC236}">
+                <a16:creationId xmlns:a16="http://schemas.microsoft.com/office/drawing/2014/main" id="{8FDAA1C3-1969-BB79-F283-CA92AF6188FF}"/>
+              </a:ext>
+            </a:extLst>
+          </p:cNvPr>
+          <p:cNvCxnSpPr>
+            <a:cxnSpLocks/>
+          </p:cNvCxnSpPr>
+          <p:nvPr/>
+        </p:nvCxnSpPr>
+        <p:spPr>
+          <a:xfrm flipV="1">
+            <a:off x="5120100" y="2968191"/>
+            <a:ext cx="1" cy="384948"/>
+          </a:xfrm>
+          <a:prstGeom prst="straightConnector1">
+            <a:avLst/>
+          </a:prstGeom>
+          <a:ln w="19050">
+            <a:solidFill>
+              <a:schemeClr val="accent6">
+                <a:lumMod val="50000"/>
+              </a:schemeClr>
+            </a:solidFill>
+            <a:tailEnd type="triangle"/>
+          </a:ln>
+        </p:spPr>
+        <p:style>
+          <a:lnRef idx="1">
+            <a:schemeClr val="accent1"/>
+          </a:lnRef>
+          <a:fillRef idx="0">
+            <a:schemeClr val="accent1"/>
+          </a:fillRef>
+          <a:effectRef idx="0">
+            <a:schemeClr val="accent1"/>
+          </a:effectRef>
+          <a:fontRef idx="minor">
+            <a:schemeClr val="tx1"/>
+          </a:fontRef>
+        </p:style>
+      </p:cxnSp>
+      <p:sp>
+        <p:nvSpPr>
+          <p:cNvPr id="34" name="Rectangle 33">
+            <a:extLst>
+              <a:ext uri="{FF2B5EF4-FFF2-40B4-BE49-F238E27FC236}">
+                <a16:creationId xmlns:a16="http://schemas.microsoft.com/office/drawing/2014/main" id="{CD6A02AB-A947-1F80-DE76-87BB60445C32}"/>
+              </a:ext>
+            </a:extLst>
+          </p:cNvPr>
+          <p:cNvSpPr/>
+          <p:nvPr/>
+        </p:nvSpPr>
+        <p:spPr>
+          <a:xfrm>
+            <a:off x="4517294" y="3365789"/>
+            <a:ext cx="1291685" cy="396241"/>
+          </a:xfrm>
+          <a:prstGeom prst="rect">
+            <a:avLst/>
+          </a:prstGeom>
+          <a:solidFill>
+            <a:schemeClr val="accent6">
+              <a:lumMod val="75000"/>
+            </a:schemeClr>
+          </a:solidFill>
+        </p:spPr>
+        <p:style>
+          <a:lnRef idx="2">
+            <a:schemeClr val="accent1">
+              <a:shade val="50000"/>
+            </a:schemeClr>
+          </a:lnRef>
+          <a:fillRef idx="1">
+            <a:schemeClr val="accent1"/>
+          </a:fillRef>
+          <a:effectRef idx="0">
+            <a:schemeClr val="accent1"/>
+          </a:effectRef>
+          <a:fontRef idx="minor">
+            <a:schemeClr val="lt1"/>
+          </a:fontRef>
+        </p:style>
+        <p:txBody>
+          <a:bodyPr rtlCol="0" anchor="ctr"/>
+          <a:lstStyle/>
+          <a:p>
+            <a:r>
+              <a:rPr lang="en-SG" sz="1100" b="1" dirty="0"/>
+              <a:t>False Data injector Malware</a:t>
+            </a:r>
+          </a:p>
+        </p:txBody>
+      </p:sp>
+      <p:cxnSp>
+        <p:nvCxnSpPr>
+          <p:cNvPr id="35" name="Straight Arrow Connector 34">
+            <a:extLst>
+              <a:ext uri="{FF2B5EF4-FFF2-40B4-BE49-F238E27FC236}">
+                <a16:creationId xmlns:a16="http://schemas.microsoft.com/office/drawing/2014/main" id="{070D1791-74A0-8EFF-66AC-2514C108D441}"/>
+              </a:ext>
+            </a:extLst>
+          </p:cNvPr>
+          <p:cNvCxnSpPr>
+            <a:cxnSpLocks/>
+            <a:stCxn id="39" idx="0"/>
+            <a:endCxn id="4" idx="2"/>
+          </p:cNvCxnSpPr>
+          <p:nvPr/>
+        </p:nvCxnSpPr>
+        <p:spPr>
+          <a:xfrm flipV="1">
+            <a:off x="1680217" y="1097279"/>
+            <a:ext cx="2969450" cy="1073463"/>
+          </a:xfrm>
+          <a:prstGeom prst="straightConnector1">
+            <a:avLst/>
+          </a:prstGeom>
+          <a:ln w="19050">
+            <a:solidFill>
+              <a:schemeClr val="accent6">
+                <a:lumMod val="50000"/>
+              </a:schemeClr>
+            </a:solidFill>
+            <a:tailEnd type="triangle"/>
+          </a:ln>
+        </p:spPr>
+        <p:style>
+          <a:lnRef idx="1">
+            <a:schemeClr val="accent1"/>
+          </a:lnRef>
+          <a:fillRef idx="0">
+            <a:schemeClr val="accent1"/>
+          </a:fillRef>
+          <a:effectRef idx="0">
+            <a:schemeClr val="accent1"/>
+          </a:effectRef>
+          <a:fontRef idx="minor">
+            <a:schemeClr val="tx1"/>
+          </a:fontRef>
+        </p:style>
+      </p:cxnSp>
+      <p:sp>
+        <p:nvSpPr>
+          <p:cNvPr id="39" name="Rectangle 38">
+            <a:extLst>
+              <a:ext uri="{FF2B5EF4-FFF2-40B4-BE49-F238E27FC236}">
+                <a16:creationId xmlns:a16="http://schemas.microsoft.com/office/drawing/2014/main" id="{439F0A68-F376-2FFF-E325-A57962F9FDAB}"/>
+              </a:ext>
+            </a:extLst>
+          </p:cNvPr>
+          <p:cNvSpPr/>
+          <p:nvPr/>
+        </p:nvSpPr>
+        <p:spPr>
+          <a:xfrm>
+            <a:off x="1191069" y="2170742"/>
+            <a:ext cx="978295" cy="396241"/>
+          </a:xfrm>
+          <a:prstGeom prst="rect">
+            <a:avLst/>
+          </a:prstGeom>
+          <a:solidFill>
+            <a:schemeClr val="accent6">
+              <a:lumMod val="75000"/>
+            </a:schemeClr>
+          </a:solidFill>
+        </p:spPr>
+        <p:style>
+          <a:lnRef idx="2">
+            <a:schemeClr val="accent1">
+              <a:shade val="50000"/>
+            </a:schemeClr>
+          </a:lnRef>
+          <a:fillRef idx="1">
+            <a:schemeClr val="accent1"/>
+          </a:fillRef>
+          <a:effectRef idx="0">
+            <a:schemeClr val="accent1"/>
+          </a:effectRef>
+          <a:fontRef idx="minor">
+            <a:schemeClr val="lt1"/>
+          </a:fontRef>
+        </p:style>
+        <p:txBody>
+          <a:bodyPr rtlCol="0" anchor="ctr"/>
+          <a:lstStyle/>
+          <a:p>
+            <a:r>
+              <a:rPr lang="en-SG" sz="1100" b="1" dirty="0"/>
+              <a:t>OS attack Malware</a:t>
+            </a:r>
+          </a:p>
+        </p:txBody>
+      </p:sp>
+      <p:cxnSp>
+        <p:nvCxnSpPr>
+          <p:cNvPr id="41" name="Straight Arrow Connector 40">
+            <a:extLst>
+              <a:ext uri="{FF2B5EF4-FFF2-40B4-BE49-F238E27FC236}">
+                <a16:creationId xmlns:a16="http://schemas.microsoft.com/office/drawing/2014/main" id="{F0BB9CDC-98C4-ED81-1771-5B0033E27D75}"/>
+              </a:ext>
+            </a:extLst>
+          </p:cNvPr>
+          <p:cNvCxnSpPr>
+            <a:cxnSpLocks/>
+            <a:stCxn id="42" idx="0"/>
+            <a:endCxn id="39" idx="2"/>
+          </p:cNvCxnSpPr>
+          <p:nvPr/>
+        </p:nvCxnSpPr>
+        <p:spPr>
+          <a:xfrm flipV="1">
+            <a:off x="715040" y="2566983"/>
+            <a:ext cx="965177" cy="505230"/>
+          </a:xfrm>
+          <a:prstGeom prst="straightConnector1">
+            <a:avLst/>
+          </a:prstGeom>
+          <a:ln w="19050">
+            <a:solidFill>
+              <a:schemeClr val="accent6">
+                <a:lumMod val="50000"/>
+              </a:schemeClr>
+            </a:solidFill>
+            <a:tailEnd type="triangle"/>
+          </a:ln>
+        </p:spPr>
+        <p:style>
+          <a:lnRef idx="1">
+            <a:schemeClr val="accent1"/>
+          </a:lnRef>
+          <a:fillRef idx="0">
+            <a:schemeClr val="accent1"/>
+          </a:fillRef>
+          <a:effectRef idx="0">
+            <a:schemeClr val="accent1"/>
+          </a:effectRef>
+          <a:fontRef idx="minor">
+            <a:schemeClr val="tx1"/>
+          </a:fontRef>
+        </p:style>
+      </p:cxnSp>
+      <p:sp>
+        <p:nvSpPr>
+          <p:cNvPr id="42" name="Rectangle 41">
+            <a:extLst>
+              <a:ext uri="{FF2B5EF4-FFF2-40B4-BE49-F238E27FC236}">
+                <a16:creationId xmlns:a16="http://schemas.microsoft.com/office/drawing/2014/main" id="{A5D3ED57-3F2A-CA72-A99C-38AD620BEFA6}"/>
+              </a:ext>
+            </a:extLst>
+          </p:cNvPr>
+          <p:cNvSpPr/>
+          <p:nvPr/>
+        </p:nvSpPr>
+        <p:spPr>
+          <a:xfrm>
+            <a:off x="239010" y="3072213"/>
+            <a:ext cx="952059" cy="549261"/>
+          </a:xfrm>
+          <a:prstGeom prst="rect">
+            <a:avLst/>
+          </a:prstGeom>
+          <a:solidFill>
+            <a:schemeClr val="accent6">
+              <a:lumMod val="75000"/>
+            </a:schemeClr>
+          </a:solidFill>
+        </p:spPr>
+        <p:style>
+          <a:lnRef idx="2">
+            <a:schemeClr val="accent1">
+              <a:shade val="50000"/>
+            </a:schemeClr>
+          </a:lnRef>
+          <a:fillRef idx="1">
+            <a:schemeClr val="accent1"/>
+          </a:fillRef>
+          <a:effectRef idx="0">
+            <a:schemeClr val="accent1"/>
+          </a:effectRef>
+          <a:fontRef idx="minor">
+            <a:schemeClr val="lt1"/>
+          </a:fontRef>
+        </p:style>
+        <p:txBody>
+          <a:bodyPr rtlCol="0" anchor="ctr"/>
+          <a:lstStyle/>
+          <a:p>
+            <a:r>
+              <a:rPr lang="en-SG" sz="1100" b="1" dirty="0"/>
+              <a:t>User action collection  Malware</a:t>
+            </a:r>
+          </a:p>
+        </p:txBody>
+      </p:sp>
+      <p:cxnSp>
+        <p:nvCxnSpPr>
+          <p:cNvPr id="47" name="Straight Arrow Connector 46">
+            <a:extLst>
+              <a:ext uri="{FF2B5EF4-FFF2-40B4-BE49-F238E27FC236}">
+                <a16:creationId xmlns:a16="http://schemas.microsoft.com/office/drawing/2014/main" id="{8E895E13-5467-E9BB-17CF-15B84EBF3A16}"/>
+              </a:ext>
+            </a:extLst>
+          </p:cNvPr>
+          <p:cNvCxnSpPr>
+            <a:cxnSpLocks/>
+            <a:endCxn id="39" idx="2"/>
+          </p:cNvCxnSpPr>
+          <p:nvPr/>
+        </p:nvCxnSpPr>
+        <p:spPr>
+          <a:xfrm flipV="1">
+            <a:off x="1662825" y="2566983"/>
+            <a:ext cx="17392" cy="1195047"/>
+          </a:xfrm>
+          <a:prstGeom prst="straightConnector1">
+            <a:avLst/>
+          </a:prstGeom>
+          <a:ln w="19050">
+            <a:solidFill>
+              <a:schemeClr val="accent6">
+                <a:lumMod val="50000"/>
+              </a:schemeClr>
+            </a:solidFill>
+            <a:tailEnd type="triangle"/>
+          </a:ln>
+        </p:spPr>
+        <p:style>
+          <a:lnRef idx="1">
+            <a:schemeClr val="accent1"/>
+          </a:lnRef>
+          <a:fillRef idx="0">
+            <a:schemeClr val="accent1"/>
+          </a:fillRef>
+          <a:effectRef idx="0">
+            <a:schemeClr val="accent1"/>
+          </a:effectRef>
+          <a:fontRef idx="minor">
+            <a:schemeClr val="tx1"/>
+          </a:fontRef>
+        </p:style>
+      </p:cxnSp>
+      <p:sp>
+        <p:nvSpPr>
+          <p:cNvPr id="55" name="Rectangle 54">
+            <a:extLst>
+              <a:ext uri="{FF2B5EF4-FFF2-40B4-BE49-F238E27FC236}">
+                <a16:creationId xmlns:a16="http://schemas.microsoft.com/office/drawing/2014/main" id="{44050D91-919C-2F67-70C9-6FBC4E78EEA0}"/>
+              </a:ext>
+            </a:extLst>
+          </p:cNvPr>
+          <p:cNvSpPr/>
+          <p:nvPr/>
+        </p:nvSpPr>
+        <p:spPr>
+          <a:xfrm>
+            <a:off x="1034373" y="3730463"/>
+            <a:ext cx="1291685" cy="396241"/>
+          </a:xfrm>
+          <a:prstGeom prst="rect">
+            <a:avLst/>
+          </a:prstGeom>
+          <a:solidFill>
+            <a:schemeClr val="accent6">
+              <a:lumMod val="75000"/>
+            </a:schemeClr>
+          </a:solidFill>
+        </p:spPr>
+        <p:style>
+          <a:lnRef idx="2">
+            <a:schemeClr val="accent1">
+              <a:shade val="50000"/>
+            </a:schemeClr>
+          </a:lnRef>
+          <a:fillRef idx="1">
+            <a:schemeClr val="accent1"/>
+          </a:fillRef>
+          <a:effectRef idx="0">
+            <a:schemeClr val="accent1"/>
+          </a:effectRef>
+          <a:fontRef idx="minor">
+            <a:schemeClr val="lt1"/>
+          </a:fontRef>
+        </p:style>
+        <p:txBody>
+          <a:bodyPr rtlCol="0" anchor="ctr"/>
+          <a:lstStyle/>
+          <a:p>
+            <a:r>
+              <a:rPr lang="en-SG" sz="1100" b="1" dirty="0"/>
+              <a:t>Ransomware Malware</a:t>
+            </a:r>
+          </a:p>
+        </p:txBody>
+      </p:sp>
+      <p:cxnSp>
+        <p:nvCxnSpPr>
+          <p:cNvPr id="56" name="Straight Arrow Connector 55">
+            <a:extLst>
+              <a:ext uri="{FF2B5EF4-FFF2-40B4-BE49-F238E27FC236}">
+                <a16:creationId xmlns:a16="http://schemas.microsoft.com/office/drawing/2014/main" id="{ADB6DDBA-E38B-BFC3-44E9-0D85B6300141}"/>
+              </a:ext>
+            </a:extLst>
+          </p:cNvPr>
+          <p:cNvCxnSpPr>
+            <a:cxnSpLocks/>
+            <a:stCxn id="59" idx="0"/>
+            <a:endCxn id="4" idx="2"/>
+          </p:cNvCxnSpPr>
+          <p:nvPr/>
+        </p:nvCxnSpPr>
+        <p:spPr>
+          <a:xfrm flipH="1" flipV="1">
+            <a:off x="4649667" y="1097279"/>
+            <a:ext cx="2494619" cy="867045"/>
+          </a:xfrm>
+          <a:prstGeom prst="straightConnector1">
+            <a:avLst/>
+          </a:prstGeom>
+          <a:ln w="19050">
+            <a:solidFill>
+              <a:schemeClr val="accent6">
+                <a:lumMod val="50000"/>
+              </a:schemeClr>
+            </a:solidFill>
+            <a:tailEnd type="triangle"/>
+          </a:ln>
+        </p:spPr>
+        <p:style>
+          <a:lnRef idx="1">
+            <a:schemeClr val="accent1"/>
+          </a:lnRef>
+          <a:fillRef idx="0">
+            <a:schemeClr val="accent1"/>
+          </a:fillRef>
+          <a:effectRef idx="0">
+            <a:schemeClr val="accent1"/>
+          </a:effectRef>
+          <a:fontRef idx="minor">
+            <a:schemeClr val="tx1"/>
+          </a:fontRef>
+        </p:style>
+      </p:cxnSp>
+      <p:sp>
+        <p:nvSpPr>
+          <p:cNvPr id="59" name="Rectangle 58">
+            <a:extLst>
+              <a:ext uri="{FF2B5EF4-FFF2-40B4-BE49-F238E27FC236}">
+                <a16:creationId xmlns:a16="http://schemas.microsoft.com/office/drawing/2014/main" id="{ADAC5FD1-AD1C-BB66-3318-14F2A2350D36}"/>
+              </a:ext>
+            </a:extLst>
+          </p:cNvPr>
+          <p:cNvSpPr/>
+          <p:nvPr/>
+        </p:nvSpPr>
+        <p:spPr>
+          <a:xfrm>
+            <a:off x="6522719" y="1964324"/>
+            <a:ext cx="1243134" cy="335733"/>
+          </a:xfrm>
+          <a:prstGeom prst="rect">
+            <a:avLst/>
+          </a:prstGeom>
+          <a:solidFill>
+            <a:schemeClr val="accent6">
+              <a:lumMod val="75000"/>
+            </a:schemeClr>
+          </a:solidFill>
+        </p:spPr>
+        <p:style>
+          <a:lnRef idx="2">
+            <a:schemeClr val="accent1">
+              <a:shade val="50000"/>
+            </a:schemeClr>
+          </a:lnRef>
+          <a:fillRef idx="1">
+            <a:schemeClr val="accent1"/>
+          </a:fillRef>
+          <a:effectRef idx="0">
+            <a:schemeClr val="accent1"/>
+          </a:effectRef>
+          <a:fontRef idx="minor">
+            <a:schemeClr val="lt1"/>
+          </a:fontRef>
+        </p:style>
+        <p:txBody>
+          <a:bodyPr rtlCol="0" anchor="ctr"/>
+          <a:lstStyle/>
+          <a:p>
+            <a:r>
+              <a:rPr lang="en-SG" sz="1100" b="1" dirty="0"/>
+              <a:t>DDoS Attack Malware</a:t>
+            </a:r>
+          </a:p>
+        </p:txBody>
+      </p:sp>
+      <p:cxnSp>
+        <p:nvCxnSpPr>
+          <p:cNvPr id="61" name="Straight Arrow Connector 60">
+            <a:extLst>
+              <a:ext uri="{FF2B5EF4-FFF2-40B4-BE49-F238E27FC236}">
+                <a16:creationId xmlns:a16="http://schemas.microsoft.com/office/drawing/2014/main" id="{F8EC33C1-189E-B4E4-05D7-4FE83CBBE889}"/>
+              </a:ext>
+            </a:extLst>
+          </p:cNvPr>
+          <p:cNvCxnSpPr>
+            <a:cxnSpLocks/>
+          </p:cNvCxnSpPr>
+          <p:nvPr/>
+        </p:nvCxnSpPr>
+        <p:spPr>
+          <a:xfrm flipV="1">
+            <a:off x="5140958" y="3741756"/>
+            <a:ext cx="1" cy="384948"/>
+          </a:xfrm>
+          <a:prstGeom prst="straightConnector1">
+            <a:avLst/>
+          </a:prstGeom>
+          <a:ln w="19050">
+            <a:solidFill>
+              <a:schemeClr val="accent6">
+                <a:lumMod val="50000"/>
+              </a:schemeClr>
+            </a:solidFill>
+            <a:tailEnd type="triangle"/>
+          </a:ln>
+        </p:spPr>
+        <p:style>
+          <a:lnRef idx="1">
+            <a:schemeClr val="accent1"/>
+          </a:lnRef>
+          <a:fillRef idx="0">
+            <a:schemeClr val="accent1"/>
+          </a:fillRef>
+          <a:effectRef idx="0">
+            <a:schemeClr val="accent1"/>
+          </a:effectRef>
+          <a:fontRef idx="minor">
+            <a:schemeClr val="tx1"/>
+          </a:fontRef>
+        </p:style>
+      </p:cxnSp>
+      <p:sp>
+        <p:nvSpPr>
+          <p:cNvPr id="62" name="Rectangle 61">
+            <a:extLst>
+              <a:ext uri="{FF2B5EF4-FFF2-40B4-BE49-F238E27FC236}">
+                <a16:creationId xmlns:a16="http://schemas.microsoft.com/office/drawing/2014/main" id="{D0F6DFCF-1ED3-50B4-2039-80542A8AD983}"/>
+              </a:ext>
+            </a:extLst>
+          </p:cNvPr>
+          <p:cNvSpPr/>
+          <p:nvPr/>
+        </p:nvSpPr>
+        <p:spPr>
+          <a:xfrm>
+            <a:off x="4566237" y="4123503"/>
+            <a:ext cx="1291685" cy="396241"/>
+          </a:xfrm>
+          <a:prstGeom prst="rect">
+            <a:avLst/>
+          </a:prstGeom>
+          <a:solidFill>
+            <a:schemeClr val="accent6">
+              <a:lumMod val="75000"/>
+            </a:schemeClr>
+          </a:solidFill>
+        </p:spPr>
+        <p:style>
+          <a:lnRef idx="2">
+            <a:schemeClr val="accent1">
+              <a:shade val="50000"/>
+            </a:schemeClr>
+          </a:lnRef>
+          <a:fillRef idx="1">
+            <a:schemeClr val="accent1"/>
+          </a:fillRef>
+          <a:effectRef idx="0">
+            <a:schemeClr val="accent1"/>
+          </a:effectRef>
+          <a:fontRef idx="minor">
+            <a:schemeClr val="lt1"/>
+          </a:fontRef>
+        </p:style>
+        <p:txBody>
+          <a:bodyPr rtlCol="0" anchor="ctr"/>
+          <a:lstStyle/>
+          <a:p>
+            <a:r>
+              <a:rPr lang="en-SG" sz="1100" b="1" dirty="0"/>
+              <a:t>False Command  injector Malware</a:t>
+            </a:r>
+          </a:p>
+        </p:txBody>
+      </p:sp>
+      <p:sp>
+        <p:nvSpPr>
+          <p:cNvPr id="65" name="Rectangle 64">
+            <a:extLst>
+              <a:ext uri="{FF2B5EF4-FFF2-40B4-BE49-F238E27FC236}">
+                <a16:creationId xmlns:a16="http://schemas.microsoft.com/office/drawing/2014/main" id="{3DE2B185-9B19-FB17-FF78-BC5A17227B14}"/>
+              </a:ext>
+            </a:extLst>
+          </p:cNvPr>
+          <p:cNvSpPr/>
+          <p:nvPr/>
+        </p:nvSpPr>
+        <p:spPr>
+          <a:xfrm>
+            <a:off x="8008911" y="1964324"/>
+            <a:ext cx="1243134" cy="335733"/>
+          </a:xfrm>
+          <a:prstGeom prst="rect">
+            <a:avLst/>
+          </a:prstGeom>
+          <a:solidFill>
+            <a:schemeClr val="accent6">
+              <a:lumMod val="75000"/>
+            </a:schemeClr>
+          </a:solidFill>
+        </p:spPr>
+        <p:style>
+          <a:lnRef idx="2">
+            <a:schemeClr val="accent1">
+              <a:shade val="50000"/>
+            </a:schemeClr>
+          </a:lnRef>
+          <a:fillRef idx="1">
+            <a:schemeClr val="accent1"/>
+          </a:fillRef>
+          <a:effectRef idx="0">
+            <a:schemeClr val="accent1"/>
+          </a:effectRef>
+          <a:fontRef idx="minor">
+            <a:schemeClr val="lt1"/>
+          </a:fontRef>
+        </p:style>
+        <p:txBody>
+          <a:bodyPr rtlCol="0" anchor="ctr"/>
+          <a:lstStyle/>
+          <a:p>
+            <a:r>
+              <a:rPr lang="en-SG" sz="1100" b="1" dirty="0"/>
+              <a:t>Phishing email distributor </a:t>
+            </a:r>
+          </a:p>
+        </p:txBody>
+      </p:sp>
+      <p:cxnSp>
+        <p:nvCxnSpPr>
+          <p:cNvPr id="66" name="Straight Arrow Connector 65">
+            <a:extLst>
+              <a:ext uri="{FF2B5EF4-FFF2-40B4-BE49-F238E27FC236}">
+                <a16:creationId xmlns:a16="http://schemas.microsoft.com/office/drawing/2014/main" id="{13DCCCB3-AECE-7CBD-B2AE-769911BF4FE3}"/>
+              </a:ext>
+            </a:extLst>
+          </p:cNvPr>
+          <p:cNvCxnSpPr>
+            <a:cxnSpLocks/>
+            <a:stCxn id="65" idx="0"/>
+            <a:endCxn id="4" idx="2"/>
+          </p:cNvCxnSpPr>
+          <p:nvPr/>
+        </p:nvCxnSpPr>
+        <p:spPr>
+          <a:xfrm flipH="1" flipV="1">
+            <a:off x="4649667" y="1097279"/>
+            <a:ext cx="3980811" cy="867045"/>
+          </a:xfrm>
+          <a:prstGeom prst="straightConnector1">
+            <a:avLst/>
+          </a:prstGeom>
+          <a:ln w="19050">
+            <a:solidFill>
+              <a:schemeClr val="accent6">
+                <a:lumMod val="50000"/>
+              </a:schemeClr>
+            </a:solidFill>
+            <a:tailEnd type="triangle"/>
+          </a:ln>
+        </p:spPr>
+        <p:style>
+          <a:lnRef idx="1">
+            <a:schemeClr val="accent1"/>
+          </a:lnRef>
+          <a:fillRef idx="0">
+            <a:schemeClr val="accent1"/>
+          </a:fillRef>
+          <a:effectRef idx="0">
+            <a:schemeClr val="accent1"/>
+          </a:effectRef>
+          <a:fontRef idx="minor">
+            <a:schemeClr val="tx1"/>
+          </a:fontRef>
+        </p:style>
+      </p:cxnSp>
     </p:spTree>
     <p:extLst>
       <p:ext uri="{BB962C8B-B14F-4D97-AF65-F5344CB8AC3E}">
-        <p14:creationId xmlns:p14="http://schemas.microsoft.com/office/powerpoint/2010/main" val="1629007476"/>
+        <p14:creationId xmlns:p14="http://schemas.microsoft.com/office/powerpoint/2010/main" val="1842238072"/>
       </p:ext>
     </p:extLst>
   </p:cSld>

</xml_diff>

<commit_message>
update the design doc and fix typo.
</commit_message>
<xml_diff>
--- a/doc/designDoc.pptx
+++ b/doc/designDoc.pptx
@@ -2098,7 +2098,7 @@
           <a:p>
             <a:fld id="{30462BEA-6C65-41CB-B521-7C9DB089D720}" type="datetimeFigureOut">
               <a:rPr lang="en-SG" smtClean="0"/>
-              <a:t>6/7/2024</a:t>
+              <a:t>7/7/2024</a:t>
             </a:fld>
             <a:endParaRPr lang="en-SG"/>
           </a:p>
@@ -2767,7 +2767,7 @@
           <a:p>
             <a:fld id="{435F7F91-36DA-4AC3-B0AA-56077EB606D8}" type="datetimeFigureOut">
               <a:rPr lang="en-SG" smtClean="0"/>
-              <a:t>6/7/2024</a:t>
+              <a:t>7/7/2024</a:t>
             </a:fld>
             <a:endParaRPr lang="en-SG"/>
           </a:p>
@@ -2967,7 +2967,7 @@
           <a:p>
             <a:fld id="{435F7F91-36DA-4AC3-B0AA-56077EB606D8}" type="datetimeFigureOut">
               <a:rPr lang="en-SG" smtClean="0"/>
-              <a:t>6/7/2024</a:t>
+              <a:t>7/7/2024</a:t>
             </a:fld>
             <a:endParaRPr lang="en-SG"/>
           </a:p>
@@ -3177,7 +3177,7 @@
           <a:p>
             <a:fld id="{435F7F91-36DA-4AC3-B0AA-56077EB606D8}" type="datetimeFigureOut">
               <a:rPr lang="en-SG" smtClean="0"/>
-              <a:t>6/7/2024</a:t>
+              <a:t>7/7/2024</a:t>
             </a:fld>
             <a:endParaRPr lang="en-SG"/>
           </a:p>
@@ -3377,7 +3377,7 @@
           <a:p>
             <a:fld id="{435F7F91-36DA-4AC3-B0AA-56077EB606D8}" type="datetimeFigureOut">
               <a:rPr lang="en-SG" smtClean="0"/>
-              <a:t>6/7/2024</a:t>
+              <a:t>7/7/2024</a:t>
             </a:fld>
             <a:endParaRPr lang="en-SG"/>
           </a:p>
@@ -3653,7 +3653,7 @@
           <a:p>
             <a:fld id="{435F7F91-36DA-4AC3-B0AA-56077EB606D8}" type="datetimeFigureOut">
               <a:rPr lang="en-SG" smtClean="0"/>
-              <a:t>6/7/2024</a:t>
+              <a:t>7/7/2024</a:t>
             </a:fld>
             <a:endParaRPr lang="en-SG"/>
           </a:p>
@@ -3921,7 +3921,7 @@
           <a:p>
             <a:fld id="{435F7F91-36DA-4AC3-B0AA-56077EB606D8}" type="datetimeFigureOut">
               <a:rPr lang="en-SG" smtClean="0"/>
-              <a:t>6/7/2024</a:t>
+              <a:t>7/7/2024</a:t>
             </a:fld>
             <a:endParaRPr lang="en-SG"/>
           </a:p>
@@ -4336,7 +4336,7 @@
           <a:p>
             <a:fld id="{435F7F91-36DA-4AC3-B0AA-56077EB606D8}" type="datetimeFigureOut">
               <a:rPr lang="en-SG" smtClean="0"/>
-              <a:t>6/7/2024</a:t>
+              <a:t>7/7/2024</a:t>
             </a:fld>
             <a:endParaRPr lang="en-SG"/>
           </a:p>
@@ -4478,7 +4478,7 @@
           <a:p>
             <a:fld id="{435F7F91-36DA-4AC3-B0AA-56077EB606D8}" type="datetimeFigureOut">
               <a:rPr lang="en-SG" smtClean="0"/>
-              <a:t>6/7/2024</a:t>
+              <a:t>7/7/2024</a:t>
             </a:fld>
             <a:endParaRPr lang="en-SG"/>
           </a:p>
@@ -4591,7 +4591,7 @@
           <a:p>
             <a:fld id="{435F7F91-36DA-4AC3-B0AA-56077EB606D8}" type="datetimeFigureOut">
               <a:rPr lang="en-SG" smtClean="0"/>
-              <a:t>6/7/2024</a:t>
+              <a:t>7/7/2024</a:t>
             </a:fld>
             <a:endParaRPr lang="en-SG"/>
           </a:p>
@@ -4904,7 +4904,7 @@
           <a:p>
             <a:fld id="{435F7F91-36DA-4AC3-B0AA-56077EB606D8}" type="datetimeFigureOut">
               <a:rPr lang="en-SG" smtClean="0"/>
-              <a:t>6/7/2024</a:t>
+              <a:t>7/7/2024</a:t>
             </a:fld>
             <a:endParaRPr lang="en-SG"/>
           </a:p>
@@ -5193,7 +5193,7 @@
           <a:p>
             <a:fld id="{435F7F91-36DA-4AC3-B0AA-56077EB606D8}" type="datetimeFigureOut">
               <a:rPr lang="en-SG" smtClean="0"/>
-              <a:t>6/7/2024</a:t>
+              <a:t>7/7/2024</a:t>
             </a:fld>
             <a:endParaRPr lang="en-SG"/>
           </a:p>
@@ -5436,7 +5436,7 @@
           <a:p>
             <a:fld id="{435F7F91-36DA-4AC3-B0AA-56077EB606D8}" type="datetimeFigureOut">
               <a:rPr lang="en-SG" smtClean="0"/>
-              <a:t>6/7/2024</a:t>
+              <a:t>7/7/2024</a:t>
             </a:fld>
             <a:endParaRPr lang="en-SG"/>
           </a:p>

</xml_diff>